<commit_message>
presentacion: xxi riesgos y casos reales
</commit_message>
<xml_diff>
--- a/Presentacion/Fuga de Información.pptx
+++ b/Presentacion/Fuga de Información.pptx
@@ -5,10 +5,10 @@
     <p:sldMasterId id="2147483648" r:id="rId2"/>
   </p:sldMasterIdLst>
   <p:notesMasterIdLst>
-    <p:notesMasterId r:id="rId39"/>
+    <p:notesMasterId r:id="rId43"/>
   </p:notesMasterIdLst>
   <p:handoutMasterIdLst>
-    <p:handoutMasterId r:id="rId40"/>
+    <p:handoutMasterId r:id="rId44"/>
   </p:handoutMasterIdLst>
   <p:sldIdLst>
     <p:sldId id="265" r:id="rId3"/>
@@ -40,18 +40,22 @@
     <p:sldId id="325" r:id="rId29"/>
     <p:sldId id="326" r:id="rId30"/>
     <p:sldId id="327" r:id="rId31"/>
-    <p:sldId id="331" r:id="rId32"/>
-    <p:sldId id="333" r:id="rId33"/>
-    <p:sldId id="362" r:id="rId34"/>
-    <p:sldId id="351" r:id="rId35"/>
-    <p:sldId id="352" r:id="rId36"/>
-    <p:sldId id="353" r:id="rId37"/>
-    <p:sldId id="319" r:id="rId38"/>
+    <p:sldId id="363" r:id="rId32"/>
+    <p:sldId id="364" r:id="rId33"/>
+    <p:sldId id="365" r:id="rId34"/>
+    <p:sldId id="366" r:id="rId35"/>
+    <p:sldId id="367" r:id="rId36"/>
+    <p:sldId id="368" r:id="rId37"/>
+    <p:sldId id="362" r:id="rId38"/>
+    <p:sldId id="351" r:id="rId39"/>
+    <p:sldId id="352" r:id="rId40"/>
+    <p:sldId id="353" r:id="rId41"/>
+    <p:sldId id="319" r:id="rId42"/>
   </p:sldIdLst>
   <p:sldSz cx="12188825" cy="6858000"/>
   <p:notesSz cx="6858000" cy="9144000"/>
   <p:custDataLst>
-    <p:tags r:id="rId41"/>
+    <p:tags r:id="rId45"/>
   </p:custDataLst>
   <p:defaultTextStyle>
     <a:defPPr>
@@ -150,7 +154,7 @@
   </p:defaultTextStyle>
   <p:extLst>
     <p:ext uri="{EFAFB233-063F-42B5-8137-9DF3F51BA10A}">
-      <p15:sldGuideLst xmlns:p15="http://schemas.microsoft.com/office/powerpoint/2012/main">
+      <p15:sldGuideLst xmlns:p15="http://schemas.microsoft.com/office/powerpoint/2012/main" xmlns="">
         <p15:guide id="1" pos="3839" userDrawn="1">
           <p15:clr>
             <a:srgbClr val="A4A3A4"/>
@@ -164,7 +168,7 @@
       </p15:sldGuideLst>
     </p:ext>
     <p:ext uri="{2D200454-40CA-4A62-9FC3-DE9A4176ACB9}">
-      <p15:notesGuideLst xmlns:p15="http://schemas.microsoft.com/office/powerpoint/2012/main"/>
+      <p15:notesGuideLst xmlns:p15="http://schemas.microsoft.com/office/powerpoint/2012/main" xmlns=""/>
     </p:ext>
   </p:extLst>
 </p:presentation>
@@ -329,7 +333,7 @@
     </p:spTree>
     <p:extLst>
       <p:ext uri="{BB962C8B-B14F-4D97-AF65-F5344CB8AC3E}">
-        <p14:creationId xmlns:p14="http://schemas.microsoft.com/office/powerpoint/2010/main" val="3932065745"/>
+        <p14:creationId xmlns:p14="http://schemas.microsoft.com/office/powerpoint/2010/main" xmlns="" val="3932065745"/>
       </p:ext>
     </p:extLst>
   </p:cSld>
@@ -588,7 +592,7 @@
     </p:spTree>
     <p:extLst>
       <p:ext uri="{BB962C8B-B14F-4D97-AF65-F5344CB8AC3E}">
-        <p14:creationId xmlns:p14="http://schemas.microsoft.com/office/powerpoint/2010/main" val="4276579820"/>
+        <p14:creationId xmlns:p14="http://schemas.microsoft.com/office/powerpoint/2010/main" xmlns="" val="4276579820"/>
       </p:ext>
     </p:extLst>
   </p:cSld>
@@ -1083,7 +1087,347 @@
     </p:spTree>
     <p:extLst>
       <p:ext uri="{BB962C8B-B14F-4D97-AF65-F5344CB8AC3E}">
-        <p14:creationId xmlns:p14="http://schemas.microsoft.com/office/powerpoint/2010/main" val="246766428"/>
+        <p14:creationId xmlns:p14="http://schemas.microsoft.com/office/powerpoint/2010/main" xmlns="" val="246766428"/>
+      </p:ext>
+    </p:extLst>
+  </p:cSld>
+  <p:clrMapOvr>
+    <a:masterClrMapping/>
+  </p:clrMapOvr>
+</p:notes>
+</file>
+
+<file path=ppt/notesSlides/notesSlide10.xml><?xml version="1.0" encoding="utf-8"?>
+<p:notes xmlns:a="http://schemas.openxmlformats.org/drawingml/2006/main" xmlns:r="http://schemas.openxmlformats.org/officeDocument/2006/relationships" xmlns:p="http://schemas.openxmlformats.org/presentationml/2006/main">
+  <p:cSld>
+    <p:spTree>
+      <p:nvGrpSpPr>
+        <p:cNvPr id="1" name=""/>
+        <p:cNvGrpSpPr/>
+        <p:nvPr/>
+      </p:nvGrpSpPr>
+      <p:grpSpPr>
+        <a:xfrm>
+          <a:off x="0" y="0"/>
+          <a:ext cx="0" cy="0"/>
+          <a:chOff x="0" y="0"/>
+          <a:chExt cx="0" cy="0"/>
+        </a:xfrm>
+      </p:grpSpPr>
+      <p:sp>
+        <p:nvSpPr>
+          <p:cNvPr id="2" name="Slide Image Placeholder 1"/>
+          <p:cNvSpPr>
+            <a:spLocks noGrp="1" noRot="1" noChangeAspect="1"/>
+          </p:cNvSpPr>
+          <p:nvPr>
+            <p:ph type="sldImg"/>
+          </p:nvPr>
+        </p:nvSpPr>
+        <p:spPr/>
+      </p:sp>
+      <p:sp>
+        <p:nvSpPr>
+          <p:cNvPr id="3" name="Notes Placeholder 2"/>
+          <p:cNvSpPr>
+            <a:spLocks noGrp="1"/>
+          </p:cNvSpPr>
+          <p:nvPr>
+            <p:ph type="body" idx="1"/>
+          </p:nvPr>
+        </p:nvSpPr>
+        <p:spPr/>
+        <p:txBody>
+          <a:bodyPr/>
+          <a:lstStyle/>
+          <a:p>
+            <a:endParaRPr lang="en-US"/>
+          </a:p>
+        </p:txBody>
+      </p:sp>
+      <p:sp>
+        <p:nvSpPr>
+          <p:cNvPr id="4" name="Slide Number Placeholder 3"/>
+          <p:cNvSpPr>
+            <a:spLocks noGrp="1"/>
+          </p:cNvSpPr>
+          <p:nvPr>
+            <p:ph type="sldNum" sz="quarter" idx="10"/>
+          </p:nvPr>
+        </p:nvSpPr>
+        <p:spPr/>
+        <p:txBody>
+          <a:bodyPr/>
+          <a:lstStyle/>
+          <a:p>
+            <a:fld id="{F93199CD-3E1B-4AE6-990F-76F925F5EA9F}" type="slidenum">
+              <a:rPr lang="en-US" smtClean="0"/>
+              <a:pPr/>
+              <a:t>32</a:t>
+            </a:fld>
+            <a:endParaRPr lang="en-US"/>
+          </a:p>
+        </p:txBody>
+      </p:sp>
+    </p:spTree>
+    <p:extLst>
+      <p:ext uri="{BB962C8B-B14F-4D97-AF65-F5344CB8AC3E}">
+        <p14:creationId xmlns:p14="http://schemas.microsoft.com/office/powerpoint/2010/main" xmlns="" val="127681626"/>
+      </p:ext>
+    </p:extLst>
+  </p:cSld>
+  <p:clrMapOvr>
+    <a:masterClrMapping/>
+  </p:clrMapOvr>
+</p:notes>
+</file>
+
+<file path=ppt/notesSlides/notesSlide11.xml><?xml version="1.0" encoding="utf-8"?>
+<p:notes xmlns:a="http://schemas.openxmlformats.org/drawingml/2006/main" xmlns:r="http://schemas.openxmlformats.org/officeDocument/2006/relationships" xmlns:p="http://schemas.openxmlformats.org/presentationml/2006/main">
+  <p:cSld>
+    <p:spTree>
+      <p:nvGrpSpPr>
+        <p:cNvPr id="1" name=""/>
+        <p:cNvGrpSpPr/>
+        <p:nvPr/>
+      </p:nvGrpSpPr>
+      <p:grpSpPr>
+        <a:xfrm>
+          <a:off x="0" y="0"/>
+          <a:ext cx="0" cy="0"/>
+          <a:chOff x="0" y="0"/>
+          <a:chExt cx="0" cy="0"/>
+        </a:xfrm>
+      </p:grpSpPr>
+      <p:sp>
+        <p:nvSpPr>
+          <p:cNvPr id="2" name="Slide Image Placeholder 1"/>
+          <p:cNvSpPr>
+            <a:spLocks noGrp="1" noRot="1" noChangeAspect="1"/>
+          </p:cNvSpPr>
+          <p:nvPr>
+            <p:ph type="sldImg"/>
+          </p:nvPr>
+        </p:nvSpPr>
+        <p:spPr/>
+      </p:sp>
+      <p:sp>
+        <p:nvSpPr>
+          <p:cNvPr id="3" name="Notes Placeholder 2"/>
+          <p:cNvSpPr>
+            <a:spLocks noGrp="1"/>
+          </p:cNvSpPr>
+          <p:nvPr>
+            <p:ph type="body" idx="1"/>
+          </p:nvPr>
+        </p:nvSpPr>
+        <p:spPr/>
+        <p:txBody>
+          <a:bodyPr/>
+          <a:lstStyle/>
+          <a:p>
+            <a:endParaRPr lang="en-US"/>
+          </a:p>
+        </p:txBody>
+      </p:sp>
+      <p:sp>
+        <p:nvSpPr>
+          <p:cNvPr id="4" name="Slide Number Placeholder 3"/>
+          <p:cNvSpPr>
+            <a:spLocks noGrp="1"/>
+          </p:cNvSpPr>
+          <p:nvPr>
+            <p:ph type="sldNum" sz="quarter" idx="10"/>
+          </p:nvPr>
+        </p:nvSpPr>
+        <p:spPr/>
+        <p:txBody>
+          <a:bodyPr/>
+          <a:lstStyle/>
+          <a:p>
+            <a:fld id="{F93199CD-3E1B-4AE6-990F-76F925F5EA9F}" type="slidenum">
+              <a:rPr lang="en-US" smtClean="0"/>
+              <a:pPr/>
+              <a:t>33</a:t>
+            </a:fld>
+            <a:endParaRPr lang="en-US"/>
+          </a:p>
+        </p:txBody>
+      </p:sp>
+    </p:spTree>
+    <p:extLst>
+      <p:ext uri="{BB962C8B-B14F-4D97-AF65-F5344CB8AC3E}">
+        <p14:creationId xmlns:p14="http://schemas.microsoft.com/office/powerpoint/2010/main" xmlns="" val="127681626"/>
+      </p:ext>
+    </p:extLst>
+  </p:cSld>
+  <p:clrMapOvr>
+    <a:masterClrMapping/>
+  </p:clrMapOvr>
+</p:notes>
+</file>
+
+<file path=ppt/notesSlides/notesSlide12.xml><?xml version="1.0" encoding="utf-8"?>
+<p:notes xmlns:a="http://schemas.openxmlformats.org/drawingml/2006/main" xmlns:r="http://schemas.openxmlformats.org/officeDocument/2006/relationships" xmlns:p="http://schemas.openxmlformats.org/presentationml/2006/main">
+  <p:cSld>
+    <p:spTree>
+      <p:nvGrpSpPr>
+        <p:cNvPr id="1" name=""/>
+        <p:cNvGrpSpPr/>
+        <p:nvPr/>
+      </p:nvGrpSpPr>
+      <p:grpSpPr>
+        <a:xfrm>
+          <a:off x="0" y="0"/>
+          <a:ext cx="0" cy="0"/>
+          <a:chOff x="0" y="0"/>
+          <a:chExt cx="0" cy="0"/>
+        </a:xfrm>
+      </p:grpSpPr>
+      <p:sp>
+        <p:nvSpPr>
+          <p:cNvPr id="2" name="Slide Image Placeholder 1"/>
+          <p:cNvSpPr>
+            <a:spLocks noGrp="1" noRot="1" noChangeAspect="1"/>
+          </p:cNvSpPr>
+          <p:nvPr>
+            <p:ph type="sldImg"/>
+          </p:nvPr>
+        </p:nvSpPr>
+        <p:spPr/>
+      </p:sp>
+      <p:sp>
+        <p:nvSpPr>
+          <p:cNvPr id="3" name="Notes Placeholder 2"/>
+          <p:cNvSpPr>
+            <a:spLocks noGrp="1"/>
+          </p:cNvSpPr>
+          <p:nvPr>
+            <p:ph type="body" idx="1"/>
+          </p:nvPr>
+        </p:nvSpPr>
+        <p:spPr/>
+        <p:txBody>
+          <a:bodyPr/>
+          <a:lstStyle/>
+          <a:p>
+            <a:endParaRPr lang="en-US"/>
+          </a:p>
+        </p:txBody>
+      </p:sp>
+      <p:sp>
+        <p:nvSpPr>
+          <p:cNvPr id="4" name="Slide Number Placeholder 3"/>
+          <p:cNvSpPr>
+            <a:spLocks noGrp="1"/>
+          </p:cNvSpPr>
+          <p:nvPr>
+            <p:ph type="sldNum" sz="quarter" idx="10"/>
+          </p:nvPr>
+        </p:nvSpPr>
+        <p:spPr/>
+        <p:txBody>
+          <a:bodyPr/>
+          <a:lstStyle/>
+          <a:p>
+            <a:fld id="{F93199CD-3E1B-4AE6-990F-76F925F5EA9F}" type="slidenum">
+              <a:rPr lang="en-US" smtClean="0"/>
+              <a:pPr/>
+              <a:t>34</a:t>
+            </a:fld>
+            <a:endParaRPr lang="en-US"/>
+          </a:p>
+        </p:txBody>
+      </p:sp>
+    </p:spTree>
+    <p:extLst>
+      <p:ext uri="{BB962C8B-B14F-4D97-AF65-F5344CB8AC3E}">
+        <p14:creationId xmlns:p14="http://schemas.microsoft.com/office/powerpoint/2010/main" xmlns="" val="127681626"/>
+      </p:ext>
+    </p:extLst>
+  </p:cSld>
+  <p:clrMapOvr>
+    <a:masterClrMapping/>
+  </p:clrMapOvr>
+</p:notes>
+</file>
+
+<file path=ppt/notesSlides/notesSlide13.xml><?xml version="1.0" encoding="utf-8"?>
+<p:notes xmlns:a="http://schemas.openxmlformats.org/drawingml/2006/main" xmlns:r="http://schemas.openxmlformats.org/officeDocument/2006/relationships" xmlns:p="http://schemas.openxmlformats.org/presentationml/2006/main">
+  <p:cSld>
+    <p:spTree>
+      <p:nvGrpSpPr>
+        <p:cNvPr id="1" name=""/>
+        <p:cNvGrpSpPr/>
+        <p:nvPr/>
+      </p:nvGrpSpPr>
+      <p:grpSpPr>
+        <a:xfrm>
+          <a:off x="0" y="0"/>
+          <a:ext cx="0" cy="0"/>
+          <a:chOff x="0" y="0"/>
+          <a:chExt cx="0" cy="0"/>
+        </a:xfrm>
+      </p:grpSpPr>
+      <p:sp>
+        <p:nvSpPr>
+          <p:cNvPr id="2" name="Slide Image Placeholder 1"/>
+          <p:cNvSpPr>
+            <a:spLocks noGrp="1" noRot="1" noChangeAspect="1"/>
+          </p:cNvSpPr>
+          <p:nvPr>
+            <p:ph type="sldImg"/>
+          </p:nvPr>
+        </p:nvSpPr>
+        <p:spPr/>
+      </p:sp>
+      <p:sp>
+        <p:nvSpPr>
+          <p:cNvPr id="3" name="Notes Placeholder 2"/>
+          <p:cNvSpPr>
+            <a:spLocks noGrp="1"/>
+          </p:cNvSpPr>
+          <p:nvPr>
+            <p:ph type="body" idx="1"/>
+          </p:nvPr>
+        </p:nvSpPr>
+        <p:spPr/>
+        <p:txBody>
+          <a:bodyPr/>
+          <a:lstStyle/>
+          <a:p>
+            <a:endParaRPr lang="en-US"/>
+          </a:p>
+        </p:txBody>
+      </p:sp>
+      <p:sp>
+        <p:nvSpPr>
+          <p:cNvPr id="4" name="Slide Number Placeholder 3"/>
+          <p:cNvSpPr>
+            <a:spLocks noGrp="1"/>
+          </p:cNvSpPr>
+          <p:nvPr>
+            <p:ph type="sldNum" sz="quarter" idx="10"/>
+          </p:nvPr>
+        </p:nvSpPr>
+        <p:spPr/>
+        <p:txBody>
+          <a:bodyPr/>
+          <a:lstStyle/>
+          <a:p>
+            <a:fld id="{F93199CD-3E1B-4AE6-990F-76F925F5EA9F}" type="slidenum">
+              <a:rPr lang="en-US" smtClean="0"/>
+              <a:pPr/>
+              <a:t>35</a:t>
+            </a:fld>
+            <a:endParaRPr lang="en-US"/>
+          </a:p>
+        </p:txBody>
+      </p:sp>
+    </p:spTree>
+    <p:extLst>
+      <p:ext uri="{BB962C8B-B14F-4D97-AF65-F5344CB8AC3E}">
+        <p14:creationId xmlns:p14="http://schemas.microsoft.com/office/powerpoint/2010/main" xmlns="" val="127681626"/>
       </p:ext>
     </p:extLst>
   </p:cSld>
@@ -1168,7 +1512,7 @@
     </p:spTree>
     <p:extLst>
       <p:ext uri="{BB962C8B-B14F-4D97-AF65-F5344CB8AC3E}">
-        <p14:creationId xmlns:p14="http://schemas.microsoft.com/office/powerpoint/2010/main" val="2586394931"/>
+        <p14:creationId xmlns:p14="http://schemas.microsoft.com/office/powerpoint/2010/main" xmlns="" val="2586394931"/>
       </p:ext>
     </p:extLst>
   </p:cSld>
@@ -1253,7 +1597,7 @@
     </p:spTree>
     <p:extLst>
       <p:ext uri="{BB962C8B-B14F-4D97-AF65-F5344CB8AC3E}">
-        <p14:creationId xmlns:p14="http://schemas.microsoft.com/office/powerpoint/2010/main" val="1362585539"/>
+        <p14:creationId xmlns:p14="http://schemas.microsoft.com/office/powerpoint/2010/main" xmlns="" val="1362585539"/>
       </p:ext>
     </p:extLst>
   </p:cSld>
@@ -1639,7 +1983,7 @@
     </p:spTree>
     <p:extLst>
       <p:ext uri="{BB962C8B-B14F-4D97-AF65-F5344CB8AC3E}">
-        <p14:creationId xmlns:p14="http://schemas.microsoft.com/office/powerpoint/2010/main" val="3805029774"/>
+        <p14:creationId xmlns:p14="http://schemas.microsoft.com/office/powerpoint/2010/main" xmlns="" val="3805029774"/>
       </p:ext>
     </p:extLst>
   </p:cSld>
@@ -1724,7 +2068,7 @@
     </p:spTree>
     <p:extLst>
       <p:ext uri="{BB962C8B-B14F-4D97-AF65-F5344CB8AC3E}">
-        <p14:creationId xmlns:p14="http://schemas.microsoft.com/office/powerpoint/2010/main" val="655676726"/>
+        <p14:creationId xmlns:p14="http://schemas.microsoft.com/office/powerpoint/2010/main" xmlns="" val="655676726"/>
       </p:ext>
     </p:extLst>
   </p:cSld>
@@ -2261,7 +2605,7 @@
     </p:spTree>
     <p:extLst>
       <p:ext uri="{BB962C8B-B14F-4D97-AF65-F5344CB8AC3E}">
-        <p14:creationId xmlns:p14="http://schemas.microsoft.com/office/powerpoint/2010/main" val="2488318766"/>
+        <p14:creationId xmlns:p14="http://schemas.microsoft.com/office/powerpoint/2010/main" xmlns="" val="2488318766"/>
       </p:ext>
     </p:extLst>
   </p:cSld>
@@ -2807,7 +3151,7 @@
     </p:spTree>
     <p:extLst>
       <p:ext uri="{BB962C8B-B14F-4D97-AF65-F5344CB8AC3E}">
-        <p14:creationId xmlns:p14="http://schemas.microsoft.com/office/powerpoint/2010/main" val="707643668"/>
+        <p14:creationId xmlns:p14="http://schemas.microsoft.com/office/powerpoint/2010/main" xmlns="" val="707643668"/>
       </p:ext>
     </p:extLst>
   </p:cSld>
@@ -2892,7 +3236,7 @@
     </p:spTree>
     <p:extLst>
       <p:ext uri="{BB962C8B-B14F-4D97-AF65-F5344CB8AC3E}">
-        <p14:creationId xmlns:p14="http://schemas.microsoft.com/office/powerpoint/2010/main" val="1014212789"/>
+        <p14:creationId xmlns:p14="http://schemas.microsoft.com/office/powerpoint/2010/main" xmlns="" val="1014212789"/>
       </p:ext>
     </p:extLst>
   </p:cSld>
@@ -2977,7 +3321,7 @@
     </p:spTree>
     <p:extLst>
       <p:ext uri="{BB962C8B-B14F-4D97-AF65-F5344CB8AC3E}">
-        <p14:creationId xmlns:p14="http://schemas.microsoft.com/office/powerpoint/2010/main" val="127681626"/>
+        <p14:creationId xmlns:p14="http://schemas.microsoft.com/office/powerpoint/2010/main" xmlns="" val="1014212789"/>
       </p:ext>
     </p:extLst>
   </p:cSld>
@@ -3184,20 +3528,20 @@
     </p:spTree>
     <p:extLst>
       <p:ext uri="{BB962C8B-B14F-4D97-AF65-F5344CB8AC3E}">
-        <p14:creationId xmlns:p14="http://schemas.microsoft.com/office/powerpoint/2010/main" val="94999051"/>
+        <p14:creationId xmlns:p14="http://schemas.microsoft.com/office/powerpoint/2010/main" xmlns="" val="94999051"/>
       </p:ext>
     </p:extLst>
   </p:cSld>
   <p:clrMapOvr>
     <a:masterClrMapping/>
   </p:clrMapOvr>
-  <mc:AlternateContent xmlns:mc="http://schemas.openxmlformats.org/markup-compatibility/2006" xmlns:p14="http://schemas.microsoft.com/office/powerpoint/2010/main">
-    <mc:Choice Requires="p14">
+  <mc:AlternateContent xmlns:mc="http://schemas.openxmlformats.org/markup-compatibility/2006">
+    <mc:Choice xmlns:p14="http://schemas.microsoft.com/office/powerpoint/2010/main" xmlns="" Requires="p14">
       <p:transition spd="med" p14:dur="700">
         <p:fade/>
       </p:transition>
     </mc:Choice>
-    <mc:Fallback xmlns="">
+    <mc:Fallback>
       <p:transition spd="med">
         <p:fade/>
       </p:transition>
@@ -3375,20 +3719,20 @@
     </p:spTree>
     <p:extLst>
       <p:ext uri="{BB962C8B-B14F-4D97-AF65-F5344CB8AC3E}">
-        <p14:creationId xmlns:p14="http://schemas.microsoft.com/office/powerpoint/2010/main" val="460095310"/>
+        <p14:creationId xmlns:p14="http://schemas.microsoft.com/office/powerpoint/2010/main" xmlns="" val="460095310"/>
       </p:ext>
     </p:extLst>
   </p:cSld>
   <p:clrMapOvr>
     <a:masterClrMapping/>
   </p:clrMapOvr>
-  <mc:AlternateContent xmlns:mc="http://schemas.openxmlformats.org/markup-compatibility/2006" xmlns:p14="http://schemas.microsoft.com/office/powerpoint/2010/main">
-    <mc:Choice Requires="p14">
+  <mc:AlternateContent xmlns:mc="http://schemas.openxmlformats.org/markup-compatibility/2006">
+    <mc:Choice xmlns:p14="http://schemas.microsoft.com/office/powerpoint/2010/main" xmlns="" Requires="p14">
       <p:transition spd="med" p14:dur="700">
         <p:fade/>
       </p:transition>
     </mc:Choice>
-    <mc:Fallback xmlns="">
+    <mc:Fallback>
       <p:transition spd="med">
         <p:fade/>
       </p:transition>
@@ -3576,20 +3920,20 @@
     </p:spTree>
     <p:extLst>
       <p:ext uri="{BB962C8B-B14F-4D97-AF65-F5344CB8AC3E}">
-        <p14:creationId xmlns:p14="http://schemas.microsoft.com/office/powerpoint/2010/main" val="4079035419"/>
+        <p14:creationId xmlns:p14="http://schemas.microsoft.com/office/powerpoint/2010/main" xmlns="" val="4079035419"/>
       </p:ext>
     </p:extLst>
   </p:cSld>
   <p:clrMapOvr>
     <a:masterClrMapping/>
   </p:clrMapOvr>
-  <mc:AlternateContent xmlns:mc="http://schemas.openxmlformats.org/markup-compatibility/2006" xmlns:p14="http://schemas.microsoft.com/office/powerpoint/2010/main">
-    <mc:Choice Requires="p14">
+  <mc:AlternateContent xmlns:mc="http://schemas.openxmlformats.org/markup-compatibility/2006">
+    <mc:Choice xmlns:p14="http://schemas.microsoft.com/office/powerpoint/2010/main" xmlns="" Requires="p14">
       <p:transition spd="med" p14:dur="700">
         <p:fade/>
       </p:transition>
     </mc:Choice>
-    <mc:Fallback xmlns="">
+    <mc:Fallback>
       <p:transition spd="med">
         <p:fade/>
       </p:transition>
@@ -3774,20 +4118,20 @@
     </p:spTree>
     <p:extLst>
       <p:ext uri="{BB962C8B-B14F-4D97-AF65-F5344CB8AC3E}">
-        <p14:creationId xmlns:p14="http://schemas.microsoft.com/office/powerpoint/2010/main" val="2738254095"/>
+        <p14:creationId xmlns:p14="http://schemas.microsoft.com/office/powerpoint/2010/main" xmlns="" val="2738254095"/>
       </p:ext>
     </p:extLst>
   </p:cSld>
   <p:clrMapOvr>
     <a:masterClrMapping/>
   </p:clrMapOvr>
-  <mc:AlternateContent xmlns:mc="http://schemas.openxmlformats.org/markup-compatibility/2006" xmlns:p14="http://schemas.microsoft.com/office/powerpoint/2010/main">
-    <mc:Choice Requires="p14">
+  <mc:AlternateContent xmlns:mc="http://schemas.openxmlformats.org/markup-compatibility/2006">
+    <mc:Choice xmlns:p14="http://schemas.microsoft.com/office/powerpoint/2010/main" xmlns="" Requires="p14">
       <p:transition spd="med" p14:dur="700">
         <p:fade/>
       </p:transition>
     </mc:Choice>
-    <mc:Fallback xmlns="">
+    <mc:Fallback>
       <p:transition spd="med">
         <p:fade/>
       </p:transition>
@@ -4063,20 +4407,20 @@
     </p:spTree>
     <p:extLst>
       <p:ext uri="{BB962C8B-B14F-4D97-AF65-F5344CB8AC3E}">
-        <p14:creationId xmlns:p14="http://schemas.microsoft.com/office/powerpoint/2010/main" val="1761813311"/>
+        <p14:creationId xmlns:p14="http://schemas.microsoft.com/office/powerpoint/2010/main" xmlns="" val="1761813311"/>
       </p:ext>
     </p:extLst>
   </p:cSld>
   <p:clrMapOvr>
     <a:masterClrMapping/>
   </p:clrMapOvr>
-  <mc:AlternateContent xmlns:mc="http://schemas.openxmlformats.org/markup-compatibility/2006" xmlns:p14="http://schemas.microsoft.com/office/powerpoint/2010/main">
-    <mc:Choice Requires="p14">
+  <mc:AlternateContent xmlns:mc="http://schemas.openxmlformats.org/markup-compatibility/2006">
+    <mc:Choice xmlns:p14="http://schemas.microsoft.com/office/powerpoint/2010/main" xmlns="" Requires="p14">
       <p:transition spd="med" p14:dur="700">
         <p:fade/>
       </p:transition>
     </mc:Choice>
-    <mc:Fallback xmlns="">
+    <mc:Fallback>
       <p:transition spd="med">
         <p:fade/>
       </p:transition>
@@ -4376,20 +4720,20 @@
     </p:spTree>
     <p:extLst>
       <p:ext uri="{BB962C8B-B14F-4D97-AF65-F5344CB8AC3E}">
-        <p14:creationId xmlns:p14="http://schemas.microsoft.com/office/powerpoint/2010/main" val="2825340762"/>
+        <p14:creationId xmlns:p14="http://schemas.microsoft.com/office/powerpoint/2010/main" xmlns="" val="2825340762"/>
       </p:ext>
     </p:extLst>
   </p:cSld>
   <p:clrMapOvr>
     <a:masterClrMapping/>
   </p:clrMapOvr>
-  <mc:AlternateContent xmlns:mc="http://schemas.openxmlformats.org/markup-compatibility/2006" xmlns:p14="http://schemas.microsoft.com/office/powerpoint/2010/main">
-    <mc:Choice Requires="p14">
+  <mc:AlternateContent xmlns:mc="http://schemas.openxmlformats.org/markup-compatibility/2006">
+    <mc:Choice xmlns:p14="http://schemas.microsoft.com/office/powerpoint/2010/main" xmlns="" Requires="p14">
       <p:transition spd="med" p14:dur="700">
         <p:fade/>
       </p:transition>
     </mc:Choice>
-    <mc:Fallback xmlns="">
+    <mc:Fallback>
       <p:transition spd="med">
         <p:fade/>
       </p:transition>
@@ -4841,20 +5185,20 @@
     </p:spTree>
     <p:extLst>
       <p:ext uri="{BB962C8B-B14F-4D97-AF65-F5344CB8AC3E}">
-        <p14:creationId xmlns:p14="http://schemas.microsoft.com/office/powerpoint/2010/main" val="4208419506"/>
+        <p14:creationId xmlns:p14="http://schemas.microsoft.com/office/powerpoint/2010/main" xmlns="" val="4208419506"/>
       </p:ext>
     </p:extLst>
   </p:cSld>
   <p:clrMapOvr>
     <a:masterClrMapping/>
   </p:clrMapOvr>
-  <mc:AlternateContent xmlns:mc="http://schemas.openxmlformats.org/markup-compatibility/2006" xmlns:p14="http://schemas.microsoft.com/office/powerpoint/2010/main">
-    <mc:Choice Requires="p14">
+  <mc:AlternateContent xmlns:mc="http://schemas.openxmlformats.org/markup-compatibility/2006">
+    <mc:Choice xmlns:p14="http://schemas.microsoft.com/office/powerpoint/2010/main" xmlns="" Requires="p14">
       <p:transition spd="med" p14:dur="700">
         <p:fade/>
       </p:transition>
     </mc:Choice>
-    <mc:Fallback xmlns="">
+    <mc:Fallback>
       <p:transition spd="med">
         <p:fade/>
       </p:transition>
@@ -4980,20 +5324,20 @@
     </p:spTree>
     <p:extLst>
       <p:ext uri="{BB962C8B-B14F-4D97-AF65-F5344CB8AC3E}">
-        <p14:creationId xmlns:p14="http://schemas.microsoft.com/office/powerpoint/2010/main" val="1626631400"/>
+        <p14:creationId xmlns:p14="http://schemas.microsoft.com/office/powerpoint/2010/main" xmlns="" val="1626631400"/>
       </p:ext>
     </p:extLst>
   </p:cSld>
   <p:clrMapOvr>
     <a:masterClrMapping/>
   </p:clrMapOvr>
-  <mc:AlternateContent xmlns:mc="http://schemas.openxmlformats.org/markup-compatibility/2006" xmlns:p14="http://schemas.microsoft.com/office/powerpoint/2010/main">
-    <mc:Choice Requires="p14">
+  <mc:AlternateContent xmlns:mc="http://schemas.openxmlformats.org/markup-compatibility/2006">
+    <mc:Choice xmlns:p14="http://schemas.microsoft.com/office/powerpoint/2010/main" xmlns="" Requires="p14">
       <p:transition spd="med" p14:dur="700">
         <p:fade/>
       </p:transition>
     </mc:Choice>
-    <mc:Fallback xmlns="">
+    <mc:Fallback>
       <p:transition spd="med">
         <p:fade/>
       </p:transition>
@@ -5104,20 +5448,20 @@
     </p:spTree>
     <p:extLst>
       <p:ext uri="{BB962C8B-B14F-4D97-AF65-F5344CB8AC3E}">
-        <p14:creationId xmlns:p14="http://schemas.microsoft.com/office/powerpoint/2010/main" val="3607540120"/>
+        <p14:creationId xmlns:p14="http://schemas.microsoft.com/office/powerpoint/2010/main" xmlns="" val="3607540120"/>
       </p:ext>
     </p:extLst>
   </p:cSld>
   <p:clrMapOvr>
     <a:masterClrMapping/>
   </p:clrMapOvr>
-  <mc:AlternateContent xmlns:mc="http://schemas.openxmlformats.org/markup-compatibility/2006" xmlns:p14="http://schemas.microsoft.com/office/powerpoint/2010/main">
-    <mc:Choice Requires="p14">
+  <mc:AlternateContent xmlns:mc="http://schemas.openxmlformats.org/markup-compatibility/2006">
+    <mc:Choice xmlns:p14="http://schemas.microsoft.com/office/powerpoint/2010/main" xmlns="" Requires="p14">
       <p:transition spd="med" p14:dur="700">
         <p:fade/>
       </p:transition>
     </mc:Choice>
-    <mc:Fallback xmlns="">
+    <mc:Fallback>
       <p:transition spd="med">
         <p:fade/>
       </p:transition>
@@ -5435,20 +5779,20 @@
     </p:spTree>
     <p:extLst>
       <p:ext uri="{BB962C8B-B14F-4D97-AF65-F5344CB8AC3E}">
-        <p14:creationId xmlns:p14="http://schemas.microsoft.com/office/powerpoint/2010/main" val="2544981540"/>
+        <p14:creationId xmlns:p14="http://schemas.microsoft.com/office/powerpoint/2010/main" xmlns="" val="2544981540"/>
       </p:ext>
     </p:extLst>
   </p:cSld>
   <p:clrMapOvr>
     <a:masterClrMapping/>
   </p:clrMapOvr>
-  <mc:AlternateContent xmlns:mc="http://schemas.openxmlformats.org/markup-compatibility/2006" xmlns:p14="http://schemas.microsoft.com/office/powerpoint/2010/main">
-    <mc:Choice Requires="p14">
+  <mc:AlternateContent xmlns:mc="http://schemas.openxmlformats.org/markup-compatibility/2006">
+    <mc:Choice xmlns:p14="http://schemas.microsoft.com/office/powerpoint/2010/main" xmlns="" Requires="p14">
       <p:transition spd="med" p14:dur="700">
         <p:fade/>
       </p:transition>
     </mc:Choice>
-    <mc:Fallback xmlns="">
+    <mc:Fallback>
       <p:transition spd="med">
         <p:fade/>
       </p:transition>
@@ -5755,20 +6099,20 @@
     </p:spTree>
     <p:extLst>
       <p:ext uri="{BB962C8B-B14F-4D97-AF65-F5344CB8AC3E}">
-        <p14:creationId xmlns:p14="http://schemas.microsoft.com/office/powerpoint/2010/main" val="2249172152"/>
+        <p14:creationId xmlns:p14="http://schemas.microsoft.com/office/powerpoint/2010/main" xmlns="" val="2249172152"/>
       </p:ext>
     </p:extLst>
   </p:cSld>
   <p:clrMapOvr>
     <a:masterClrMapping/>
   </p:clrMapOvr>
-  <mc:AlternateContent xmlns:mc="http://schemas.openxmlformats.org/markup-compatibility/2006" xmlns:p14="http://schemas.microsoft.com/office/powerpoint/2010/main">
-    <mc:Choice Requires="p14">
+  <mc:AlternateContent xmlns:mc="http://schemas.openxmlformats.org/markup-compatibility/2006">
+    <mc:Choice xmlns:p14="http://schemas.microsoft.com/office/powerpoint/2010/main" xmlns="" Requires="p14">
       <p:transition spd="med" p14:dur="700">
         <p:fade/>
       </p:transition>
     </mc:Choice>
-    <mc:Fallback xmlns="">
+    <mc:Fallback>
       <p:transition spd="med">
         <p:fade/>
       </p:transition>
@@ -6034,7 +6378,7 @@
     </p:spTree>
     <p:extLst>
       <p:ext uri="{BB962C8B-B14F-4D97-AF65-F5344CB8AC3E}">
-        <p14:creationId xmlns:p14="http://schemas.microsoft.com/office/powerpoint/2010/main" val="1403059996"/>
+        <p14:creationId xmlns:p14="http://schemas.microsoft.com/office/powerpoint/2010/main" xmlns="" val="1403059996"/>
       </p:ext>
     </p:extLst>
   </p:cSld>
@@ -6052,13 +6396,13 @@
     <p:sldLayoutId id="2147483658" r:id="rId10"/>
     <p:sldLayoutId id="2147483659" r:id="rId11"/>
   </p:sldLayoutIdLst>
-  <mc:AlternateContent xmlns:mc="http://schemas.openxmlformats.org/markup-compatibility/2006" xmlns:p14="http://schemas.microsoft.com/office/powerpoint/2010/main">
-    <mc:Choice Requires="p14">
+  <mc:AlternateContent xmlns:mc="http://schemas.openxmlformats.org/markup-compatibility/2006">
+    <mc:Choice xmlns:p14="http://schemas.microsoft.com/office/powerpoint/2010/main" xmlns="" Requires="p14">
       <p:transition spd="med" p14:dur="700">
         <p:fade/>
       </p:transition>
     </mc:Choice>
-    <mc:Fallback xmlns="">
+    <mc:Fallback>
       <p:transition spd="med">
         <p:fade/>
       </p:transition>
@@ -6373,7 +6717,7 @@
   </p:txStyles>
   <p:extLst mod="1">
     <p:ext uri="{27BBF7A9-308A-43DC-89C8-2F10F3537804}">
-      <p15:sldGuideLst xmlns:p15="http://schemas.microsoft.com/office/powerpoint/2012/main">
+      <p15:sldGuideLst xmlns:p15="http://schemas.microsoft.com/office/powerpoint/2012/main" xmlns="">
         <p15:guide id="1" pos="3839" userDrawn="1">
           <p15:clr>
             <a:srgbClr val="F26B43"/>
@@ -6425,13 +6769,13 @@
           <a:lstStyle/>
           <a:p>
             <a:r>
-              <a:rPr lang="es-AR" sz="6000" dirty="0" smtClean="0">
+              <a:rPr lang="es-AR" sz="6000" smtClean="0">
                 <a:latin typeface="Segoe UI" panose="020B0502040204020203" pitchFamily="34" charset="0"/>
                 <a:cs typeface="Segoe UI" panose="020B0502040204020203" pitchFamily="34" charset="0"/>
               </a:rPr>
               <a:t>Fuga de Información en los Siglos XIX y XXI</a:t>
             </a:r>
-            <a:endParaRPr lang="es-AR" sz="6000" dirty="0">
+            <a:endParaRPr lang="es-AR" sz="6000">
               <a:latin typeface="Segoe UI" panose="020B0502040204020203" pitchFamily="34" charset="0"/>
               <a:cs typeface="Segoe UI" panose="020B0502040204020203" pitchFamily="34" charset="0"/>
             </a:endParaRPr>
@@ -6454,29 +6798,22 @@
           <a:lstStyle/>
           <a:p>
             <a:r>
-              <a:rPr lang="es-AR" dirty="0" err="1" smtClean="0">
-                <a:latin typeface="Segoe UI" panose="020B0502040204020203" pitchFamily="34" charset="0"/>
-                <a:cs typeface="Segoe UI" panose="020B0502040204020203" pitchFamily="34" charset="0"/>
-              </a:rPr>
-              <a:t>Fiuba</a:t>
-            </a:r>
-            <a:r>
-              <a:rPr lang="es-AR" dirty="0" smtClean="0">
-                <a:latin typeface="Segoe UI" panose="020B0502040204020203" pitchFamily="34" charset="0"/>
-                <a:cs typeface="Segoe UI" panose="020B0502040204020203" pitchFamily="34" charset="0"/>
-              </a:rPr>
-              <a:t> – implantación de sistemas</a:t>
-            </a:r>
-          </a:p>
-          <a:p>
-            <a:r>
-              <a:rPr lang="es-AR" dirty="0" smtClean="0">
+              <a:rPr lang="es-AR" smtClean="0">
+                <a:latin typeface="Segoe UI" panose="020B0502040204020203" pitchFamily="34" charset="0"/>
+                <a:cs typeface="Segoe UI" panose="020B0502040204020203" pitchFamily="34" charset="0"/>
+              </a:rPr>
+              <a:t>Fiuba – implantación de sistemas</a:t>
+            </a:r>
+          </a:p>
+          <a:p>
+            <a:r>
+              <a:rPr lang="es-AR" smtClean="0">
                 <a:latin typeface="Segoe UI" panose="020B0502040204020203" pitchFamily="34" charset="0"/>
                 <a:cs typeface="Segoe UI" panose="020B0502040204020203" pitchFamily="34" charset="0"/>
               </a:rPr>
               <a:t>Noviembre de 2014</a:t>
             </a:r>
-            <a:endParaRPr lang="es-AR" dirty="0">
+            <a:endParaRPr lang="es-AR">
               <a:latin typeface="Segoe UI" panose="020B0502040204020203" pitchFamily="34" charset="0"/>
               <a:cs typeface="Segoe UI" panose="020B0502040204020203" pitchFamily="34" charset="0"/>
             </a:endParaRPr>
@@ -6495,7 +6832,7 @@
           <a:blip r:embed="rId2" cstate="print">
             <a:extLst>
               <a:ext uri="{28A0092B-C50C-407E-A947-70E740481C1C}">
-                <a14:useLocalDpi xmlns:a14="http://schemas.microsoft.com/office/drawing/2010/main" val="0"/>
+                <a14:useLocalDpi xmlns:a14="http://schemas.microsoft.com/office/drawing/2010/main" xmlns="" val="0"/>
               </a:ext>
             </a:extLst>
           </a:blip>
@@ -6515,7 +6852,7 @@
           <a:noFill/>
           <a:extLst>
             <a:ext uri="{909E8E84-426E-40DD-AFC4-6F175D3DCCD1}">
-              <a14:hiddenFill xmlns:a14="http://schemas.microsoft.com/office/drawing/2010/main">
+              <a14:hiddenFill xmlns:a14="http://schemas.microsoft.com/office/drawing/2010/main" xmlns="">
                 <a:solidFill>
                   <a:srgbClr val="FFFFFF"/>
                 </a:solidFill>
@@ -6527,20 +6864,20 @@
     </p:spTree>
     <p:extLst>
       <p:ext uri="{BB962C8B-B14F-4D97-AF65-F5344CB8AC3E}">
-        <p14:creationId xmlns:p14="http://schemas.microsoft.com/office/powerpoint/2010/main" val="2808920126"/>
+        <p14:creationId xmlns:p14="http://schemas.microsoft.com/office/powerpoint/2010/main" xmlns="" val="2808920126"/>
       </p:ext>
     </p:extLst>
   </p:cSld>
   <p:clrMapOvr>
     <a:masterClrMapping/>
   </p:clrMapOvr>
-  <mc:AlternateContent xmlns:mc="http://schemas.openxmlformats.org/markup-compatibility/2006" xmlns:p14="http://schemas.microsoft.com/office/powerpoint/2010/main">
-    <mc:Choice Requires="p14">
+  <mc:AlternateContent xmlns:mc="http://schemas.openxmlformats.org/markup-compatibility/2006">
+    <mc:Choice xmlns:p14="http://schemas.microsoft.com/office/powerpoint/2010/main" xmlns="" Requires="p14">
       <p:transition spd="med" p14:dur="700">
         <p:fade/>
       </p:transition>
     </mc:Choice>
-    <mc:Fallback xmlns="">
+    <mc:Fallback>
       <p:transition spd="med">
         <p:fade/>
       </p:transition>
@@ -6778,20 +7115,20 @@
     </p:spTree>
     <p:extLst>
       <p:ext uri="{BB962C8B-B14F-4D97-AF65-F5344CB8AC3E}">
-        <p14:creationId xmlns:p14="http://schemas.microsoft.com/office/powerpoint/2010/main" val="4207303638"/>
+        <p14:creationId xmlns:p14="http://schemas.microsoft.com/office/powerpoint/2010/main" xmlns="" val="4207303638"/>
       </p:ext>
     </p:extLst>
   </p:cSld>
   <p:clrMapOvr>
     <a:masterClrMapping/>
   </p:clrMapOvr>
-  <mc:AlternateContent xmlns:mc="http://schemas.openxmlformats.org/markup-compatibility/2006" xmlns:p14="http://schemas.microsoft.com/office/powerpoint/2010/main">
-    <mc:Choice Requires="p14">
+  <mc:AlternateContent xmlns:mc="http://schemas.openxmlformats.org/markup-compatibility/2006">
+    <mc:Choice xmlns:p14="http://schemas.microsoft.com/office/powerpoint/2010/main" xmlns="" Requires="p14">
       <p:transition spd="med" p14:dur="700">
         <p:fade/>
       </p:transition>
     </mc:Choice>
-    <mc:Fallback xmlns="">
+    <mc:Fallback>
       <p:transition spd="med">
         <p:fade/>
       </p:transition>
@@ -6885,20 +7222,20 @@
     </p:spTree>
     <p:extLst>
       <p:ext uri="{BB962C8B-B14F-4D97-AF65-F5344CB8AC3E}">
-        <p14:creationId xmlns:p14="http://schemas.microsoft.com/office/powerpoint/2010/main" val="3772183175"/>
+        <p14:creationId xmlns:p14="http://schemas.microsoft.com/office/powerpoint/2010/main" xmlns="" val="3772183175"/>
       </p:ext>
     </p:extLst>
   </p:cSld>
   <p:clrMapOvr>
     <a:masterClrMapping/>
   </p:clrMapOvr>
-  <mc:AlternateContent xmlns:mc="http://schemas.openxmlformats.org/markup-compatibility/2006" xmlns:p14="http://schemas.microsoft.com/office/powerpoint/2010/main">
-    <mc:Choice Requires="p14">
+  <mc:AlternateContent xmlns:mc="http://schemas.openxmlformats.org/markup-compatibility/2006">
+    <mc:Choice xmlns:p14="http://schemas.microsoft.com/office/powerpoint/2010/main" xmlns="" Requires="p14">
       <p:transition spd="med" p14:dur="700">
         <p:fade/>
       </p:transition>
     </mc:Choice>
-    <mc:Fallback xmlns="">
+    <mc:Fallback>
       <p:transition spd="med">
         <p:fade/>
       </p:transition>
@@ -7106,20 +7443,20 @@
     </p:spTree>
     <p:extLst>
       <p:ext uri="{BB962C8B-B14F-4D97-AF65-F5344CB8AC3E}">
-        <p14:creationId xmlns:p14="http://schemas.microsoft.com/office/powerpoint/2010/main" val="911844652"/>
+        <p14:creationId xmlns:p14="http://schemas.microsoft.com/office/powerpoint/2010/main" xmlns="" val="911844652"/>
       </p:ext>
     </p:extLst>
   </p:cSld>
   <p:clrMapOvr>
     <a:masterClrMapping/>
   </p:clrMapOvr>
-  <mc:AlternateContent xmlns:mc="http://schemas.openxmlformats.org/markup-compatibility/2006" xmlns:p14="http://schemas.microsoft.com/office/powerpoint/2010/main">
-    <mc:Choice Requires="p14">
+  <mc:AlternateContent xmlns:mc="http://schemas.openxmlformats.org/markup-compatibility/2006">
+    <mc:Choice xmlns:p14="http://schemas.microsoft.com/office/powerpoint/2010/main" xmlns="" Requires="p14">
       <p:transition spd="med" p14:dur="700">
         <p:fade/>
       </p:transition>
     </mc:Choice>
-    <mc:Fallback xmlns="">
+    <mc:Fallback>
       <p:transition spd="med">
         <p:fade/>
       </p:transition>
@@ -7289,20 +7626,20 @@
     </p:spTree>
     <p:extLst>
       <p:ext uri="{BB962C8B-B14F-4D97-AF65-F5344CB8AC3E}">
-        <p14:creationId xmlns:p14="http://schemas.microsoft.com/office/powerpoint/2010/main" val="3751154171"/>
+        <p14:creationId xmlns:p14="http://schemas.microsoft.com/office/powerpoint/2010/main" xmlns="" val="3751154171"/>
       </p:ext>
     </p:extLst>
   </p:cSld>
   <p:clrMapOvr>
     <a:masterClrMapping/>
   </p:clrMapOvr>
-  <mc:AlternateContent xmlns:mc="http://schemas.openxmlformats.org/markup-compatibility/2006" xmlns:p14="http://schemas.microsoft.com/office/powerpoint/2010/main">
-    <mc:Choice Requires="p14">
+  <mc:AlternateContent xmlns:mc="http://schemas.openxmlformats.org/markup-compatibility/2006">
+    <mc:Choice xmlns:p14="http://schemas.microsoft.com/office/powerpoint/2010/main" xmlns="" Requires="p14">
       <p:transition spd="med" p14:dur="700">
         <p:fade/>
       </p:transition>
     </mc:Choice>
-    <mc:Fallback xmlns="">
+    <mc:Fallback>
       <p:transition spd="med">
         <p:fade/>
       </p:transition>
@@ -7474,20 +7811,20 @@
     </p:spTree>
     <p:extLst>
       <p:ext uri="{BB962C8B-B14F-4D97-AF65-F5344CB8AC3E}">
-        <p14:creationId xmlns:p14="http://schemas.microsoft.com/office/powerpoint/2010/main" val="2714171304"/>
+        <p14:creationId xmlns:p14="http://schemas.microsoft.com/office/powerpoint/2010/main" xmlns="" val="2714171304"/>
       </p:ext>
     </p:extLst>
   </p:cSld>
   <p:clrMapOvr>
     <a:masterClrMapping/>
   </p:clrMapOvr>
-  <mc:AlternateContent xmlns:mc="http://schemas.openxmlformats.org/markup-compatibility/2006" xmlns:p14="http://schemas.microsoft.com/office/powerpoint/2010/main">
-    <mc:Choice Requires="p14">
+  <mc:AlternateContent xmlns:mc="http://schemas.openxmlformats.org/markup-compatibility/2006">
+    <mc:Choice xmlns:p14="http://schemas.microsoft.com/office/powerpoint/2010/main" xmlns="" Requires="p14">
       <p:transition spd="med" p14:dur="700">
         <p:fade/>
       </p:transition>
     </mc:Choice>
-    <mc:Fallback xmlns="">
+    <mc:Fallback>
       <p:transition spd="med">
         <p:fade/>
       </p:transition>
@@ -7660,20 +7997,20 @@
     </p:spTree>
     <p:extLst>
       <p:ext uri="{BB962C8B-B14F-4D97-AF65-F5344CB8AC3E}">
-        <p14:creationId xmlns:p14="http://schemas.microsoft.com/office/powerpoint/2010/main" val="2246987516"/>
+        <p14:creationId xmlns:p14="http://schemas.microsoft.com/office/powerpoint/2010/main" xmlns="" val="2246987516"/>
       </p:ext>
     </p:extLst>
   </p:cSld>
   <p:clrMapOvr>
     <a:masterClrMapping/>
   </p:clrMapOvr>
-  <mc:AlternateContent xmlns:mc="http://schemas.openxmlformats.org/markup-compatibility/2006" xmlns:p14="http://schemas.microsoft.com/office/powerpoint/2010/main">
-    <mc:Choice Requires="p14">
+  <mc:AlternateContent xmlns:mc="http://schemas.openxmlformats.org/markup-compatibility/2006">
+    <mc:Choice xmlns:p14="http://schemas.microsoft.com/office/powerpoint/2010/main" xmlns="" Requires="p14">
       <p:transition spd="med" p14:dur="700">
         <p:fade/>
       </p:transition>
     </mc:Choice>
-    <mc:Fallback xmlns="">
+    <mc:Fallback>
       <p:transition spd="med">
         <p:fade/>
       </p:transition>
@@ -7825,20 +8162,20 @@
     </p:spTree>
     <p:extLst>
       <p:ext uri="{BB962C8B-B14F-4D97-AF65-F5344CB8AC3E}">
-        <p14:creationId xmlns:p14="http://schemas.microsoft.com/office/powerpoint/2010/main" val="3025649002"/>
+        <p14:creationId xmlns:p14="http://schemas.microsoft.com/office/powerpoint/2010/main" xmlns="" val="3025649002"/>
       </p:ext>
     </p:extLst>
   </p:cSld>
   <p:clrMapOvr>
     <a:masterClrMapping/>
   </p:clrMapOvr>
-  <mc:AlternateContent xmlns:mc="http://schemas.openxmlformats.org/markup-compatibility/2006" xmlns:p14="http://schemas.microsoft.com/office/powerpoint/2010/main">
-    <mc:Choice Requires="p14">
+  <mc:AlternateContent xmlns:mc="http://schemas.openxmlformats.org/markup-compatibility/2006">
+    <mc:Choice xmlns:p14="http://schemas.microsoft.com/office/powerpoint/2010/main" xmlns="" Requires="p14">
       <p:transition spd="med" p14:dur="700">
         <p:fade/>
       </p:transition>
     </mc:Choice>
-    <mc:Fallback xmlns="">
+    <mc:Fallback>
       <p:transition spd="med">
         <p:fade/>
       </p:transition>
@@ -7943,34 +8280,16 @@
                 <a:latin typeface="Segoe UI" panose="020B0502040204020203" pitchFamily="34" charset="0"/>
                 <a:cs typeface="Segoe UI" panose="020B0502040204020203" pitchFamily="34" charset="0"/>
               </a:rPr>
-              <a:t>Patentes de </a:t>
-            </a:r>
+              <a:t>Patentes de invención</a:t>
+            </a:r>
+          </a:p>
+          <a:p>
             <a:r>
               <a:rPr lang="es-AR" dirty="0" smtClean="0">
                 <a:latin typeface="Segoe UI" panose="020B0502040204020203" pitchFamily="34" charset="0"/>
                 <a:cs typeface="Segoe UI" panose="020B0502040204020203" pitchFamily="34" charset="0"/>
               </a:rPr>
-              <a:t>invención</a:t>
-            </a:r>
-            <a:endParaRPr lang="es-AR" dirty="0" smtClean="0">
-              <a:latin typeface="Segoe UI" panose="020B0502040204020203" pitchFamily="34" charset="0"/>
-              <a:cs typeface="Segoe UI" panose="020B0502040204020203" pitchFamily="34" charset="0"/>
-            </a:endParaRPr>
-          </a:p>
-          <a:p>
-            <a:r>
-              <a:rPr lang="es-AR" dirty="0" smtClean="0">
-                <a:latin typeface="Segoe UI" panose="020B0502040204020203" pitchFamily="34" charset="0"/>
-                <a:cs typeface="Segoe UI" panose="020B0502040204020203" pitchFamily="34" charset="0"/>
-              </a:rPr>
-              <a:t>Cajas </a:t>
-            </a:r>
-            <a:r>
-              <a:rPr lang="es-AR" dirty="0" smtClean="0">
-                <a:latin typeface="Segoe UI" panose="020B0502040204020203" pitchFamily="34" charset="0"/>
-                <a:cs typeface="Segoe UI" panose="020B0502040204020203" pitchFamily="34" charset="0"/>
-              </a:rPr>
-              <a:t>de seguridad</a:t>
+              <a:t>Cajas de seguridad</a:t>
             </a:r>
           </a:p>
           <a:p>
@@ -7987,20 +8306,20 @@
     </p:spTree>
     <p:extLst>
       <p:ext uri="{BB962C8B-B14F-4D97-AF65-F5344CB8AC3E}">
-        <p14:creationId xmlns:p14="http://schemas.microsoft.com/office/powerpoint/2010/main" val="3410413250"/>
+        <p14:creationId xmlns:p14="http://schemas.microsoft.com/office/powerpoint/2010/main" xmlns="" val="3410413250"/>
       </p:ext>
     </p:extLst>
   </p:cSld>
   <p:clrMapOvr>
     <a:masterClrMapping/>
   </p:clrMapOvr>
-  <mc:AlternateContent xmlns:mc="http://schemas.openxmlformats.org/markup-compatibility/2006" xmlns:p14="http://schemas.microsoft.com/office/powerpoint/2010/main">
-    <mc:Choice Requires="p14">
+  <mc:AlternateContent xmlns:mc="http://schemas.openxmlformats.org/markup-compatibility/2006">
+    <mc:Choice xmlns:p14="http://schemas.microsoft.com/office/powerpoint/2010/main" xmlns="" Requires="p14">
       <p:transition spd="med" p14:dur="700">
         <p:fade/>
       </p:transition>
     </mc:Choice>
-    <mc:Fallback xmlns="">
+    <mc:Fallback>
       <p:transition spd="med">
         <p:fade/>
       </p:transition>
@@ -8200,20 +8519,20 @@
     </p:spTree>
     <p:extLst>
       <p:ext uri="{BB962C8B-B14F-4D97-AF65-F5344CB8AC3E}">
-        <p14:creationId xmlns:p14="http://schemas.microsoft.com/office/powerpoint/2010/main" val="23673588"/>
+        <p14:creationId xmlns:p14="http://schemas.microsoft.com/office/powerpoint/2010/main" xmlns="" val="23673588"/>
       </p:ext>
     </p:extLst>
   </p:cSld>
   <p:clrMapOvr>
     <a:masterClrMapping/>
   </p:clrMapOvr>
-  <mc:AlternateContent xmlns:mc="http://schemas.openxmlformats.org/markup-compatibility/2006" xmlns:p14="http://schemas.microsoft.com/office/powerpoint/2010/main">
-    <mc:Choice Requires="p14">
+  <mc:AlternateContent xmlns:mc="http://schemas.openxmlformats.org/markup-compatibility/2006">
+    <mc:Choice xmlns:p14="http://schemas.microsoft.com/office/powerpoint/2010/main" xmlns="" Requires="p14">
       <p:transition spd="med" p14:dur="700">
         <p:fade/>
       </p:transition>
     </mc:Choice>
-    <mc:Fallback xmlns="">
+    <mc:Fallback>
       <p:transition spd="med">
         <p:fade/>
       </p:transition>
@@ -8472,20 +8791,20 @@
     </p:spTree>
     <p:extLst>
       <p:ext uri="{BB962C8B-B14F-4D97-AF65-F5344CB8AC3E}">
-        <p14:creationId xmlns:p14="http://schemas.microsoft.com/office/powerpoint/2010/main" val="3632379430"/>
+        <p14:creationId xmlns:p14="http://schemas.microsoft.com/office/powerpoint/2010/main" xmlns="" val="3632379430"/>
       </p:ext>
     </p:extLst>
   </p:cSld>
   <p:clrMapOvr>
     <a:masterClrMapping/>
   </p:clrMapOvr>
-  <mc:AlternateContent xmlns:mc="http://schemas.openxmlformats.org/markup-compatibility/2006" xmlns:p14="http://schemas.microsoft.com/office/powerpoint/2010/main">
-    <mc:Choice Requires="p14">
+  <mc:AlternateContent xmlns:mc="http://schemas.openxmlformats.org/markup-compatibility/2006">
+    <mc:Choice xmlns:p14="http://schemas.microsoft.com/office/powerpoint/2010/main" xmlns="" Requires="p14">
       <p:transition spd="med" p14:dur="700">
         <p:fade/>
       </p:transition>
     </mc:Choice>
-    <mc:Fallback xmlns="">
+    <mc:Fallback>
       <p:transition spd="med">
         <p:fade/>
       </p:transition>
@@ -8534,7 +8853,7 @@
           <a:lstStyle/>
           <a:p>
             <a:r>
-              <a:rPr lang="en-US" spc="0" dirty="0" err="1" smtClean="0">
+              <a:rPr lang="es-AR" spc="0" smtClean="0">
                 <a:ln w="0"/>
                 <a:solidFill>
                   <a:schemeClr val="accent1"/>
@@ -8551,7 +8870,7 @@
               </a:rPr>
               <a:t>Integrantes</a:t>
             </a:r>
-            <a:endParaRPr lang="en-US" spc="0" dirty="0">
+            <a:endParaRPr lang="es-AR" spc="0">
               <a:ln w="0"/>
               <a:solidFill>
                 <a:schemeClr val="accent1"/>
@@ -8585,7 +8904,7 @@
           <a:lstStyle/>
           <a:p>
             <a:r>
-              <a:rPr lang="en-US" dirty="0" smtClean="0">
+              <a:rPr lang="es-AR" smtClean="0">
                 <a:latin typeface="Segoe UI" panose="020B0502040204020203" pitchFamily="34" charset="0"/>
                 <a:cs typeface="Segoe UI" panose="020B0502040204020203" pitchFamily="34" charset="0"/>
               </a:rPr>
@@ -8594,63 +8913,106 @@
           </a:p>
           <a:p>
             <a:r>
-              <a:rPr lang="en-US" dirty="0" smtClean="0">
-                <a:latin typeface="Segoe UI" panose="020B0502040204020203" pitchFamily="34" charset="0"/>
-                <a:cs typeface="Segoe UI" panose="020B0502040204020203" pitchFamily="34" charset="0"/>
-              </a:rPr>
-              <a:t>Santiago Maraggi</a:t>
-            </a:r>
-          </a:p>
-          <a:p>
-            <a:r>
-              <a:rPr lang="en-US" dirty="0" smtClean="0">
-                <a:latin typeface="Segoe UI" panose="020B0502040204020203" pitchFamily="34" charset="0"/>
-                <a:cs typeface="Segoe UI" panose="020B0502040204020203" pitchFamily="34" charset="0"/>
-              </a:rPr>
-              <a:t>Yi Cheng Zhang</a:t>
-            </a:r>
-          </a:p>
-          <a:p>
-            <a:r>
-              <a:rPr lang="es-AR" dirty="0" smtClean="0">
-                <a:latin typeface="Segoe UI" panose="020B0502040204020203" pitchFamily="34" charset="0"/>
-                <a:cs typeface="Segoe UI" panose="020B0502040204020203" pitchFamily="34" charset="0"/>
-              </a:rPr>
-              <a:t>Miguel Angel Schmidt</a:t>
-            </a:r>
-          </a:p>
-          <a:p>
-            <a:r>
-              <a:rPr lang="es-AR" dirty="0" smtClean="0">
-                <a:latin typeface="Segoe UI" panose="020B0502040204020203" pitchFamily="34" charset="0"/>
-                <a:cs typeface="Segoe UI" panose="020B0502040204020203" pitchFamily="34" charset="0"/>
-              </a:rPr>
-              <a:t>María Inés Parnisari</a:t>
-            </a:r>
-            <a:endParaRPr lang="en-US" dirty="0" smtClean="0">
+              <a:rPr lang="es-AR" smtClean="0">
+                <a:latin typeface="Segoe UI" panose="020B0502040204020203" pitchFamily="34" charset="0"/>
+                <a:cs typeface="Segoe UI" panose="020B0502040204020203" pitchFamily="34" charset="0"/>
+              </a:rPr>
+              <a:t>Santiago </a:t>
+            </a:r>
+            <a:r>
+              <a:rPr lang="es-AR" smtClean="0">
+                <a:latin typeface="Segoe UI" panose="020B0502040204020203" pitchFamily="34" charset="0"/>
+                <a:cs typeface="Segoe UI" panose="020B0502040204020203" pitchFamily="34" charset="0"/>
+              </a:rPr>
+              <a:t>Maraggi</a:t>
+            </a:r>
+            <a:endParaRPr lang="es-AR" smtClean="0">
               <a:latin typeface="Segoe UI" panose="020B0502040204020203" pitchFamily="34" charset="0"/>
               <a:cs typeface="Segoe UI" panose="020B0502040204020203" pitchFamily="34" charset="0"/>
             </a:endParaRPr>
           </a:p>
+          <a:p>
+            <a:r>
+              <a:rPr lang="es-AR" smtClean="0">
+                <a:latin typeface="Segoe UI" panose="020B0502040204020203" pitchFamily="34" charset="0"/>
+                <a:cs typeface="Segoe UI" panose="020B0502040204020203" pitchFamily="34" charset="0"/>
+              </a:rPr>
+              <a:t>Yi Cheng </a:t>
+            </a:r>
+            <a:r>
+              <a:rPr lang="es-AR" smtClean="0">
+                <a:latin typeface="Segoe UI" panose="020B0502040204020203" pitchFamily="34" charset="0"/>
+                <a:cs typeface="Segoe UI" panose="020B0502040204020203" pitchFamily="34" charset="0"/>
+              </a:rPr>
+              <a:t>Zhang</a:t>
+            </a:r>
+            <a:endParaRPr lang="es-AR" smtClean="0">
+              <a:latin typeface="Segoe UI" panose="020B0502040204020203" pitchFamily="34" charset="0"/>
+              <a:cs typeface="Segoe UI" panose="020B0502040204020203" pitchFamily="34" charset="0"/>
+            </a:endParaRPr>
+          </a:p>
+          <a:p>
+            <a:r>
+              <a:rPr lang="es-AR" smtClean="0">
+                <a:latin typeface="Segoe UI" panose="020B0502040204020203" pitchFamily="34" charset="0"/>
+                <a:cs typeface="Segoe UI" panose="020B0502040204020203" pitchFamily="34" charset="0"/>
+              </a:rPr>
+              <a:t>Miguel </a:t>
+            </a:r>
+            <a:r>
+              <a:rPr lang="es-AR" smtClean="0">
+                <a:latin typeface="Segoe UI" panose="020B0502040204020203" pitchFamily="34" charset="0"/>
+                <a:cs typeface="Segoe UI" panose="020B0502040204020203" pitchFamily="34" charset="0"/>
+              </a:rPr>
+              <a:t>Angel Schmidt</a:t>
+            </a:r>
+          </a:p>
+          <a:p>
+            <a:r>
+              <a:rPr lang="es-AR" smtClean="0">
+                <a:latin typeface="Segoe UI" panose="020B0502040204020203" pitchFamily="34" charset="0"/>
+                <a:cs typeface="Segoe UI" panose="020B0502040204020203" pitchFamily="34" charset="0"/>
+              </a:rPr>
+              <a:t>María </a:t>
+            </a:r>
+            <a:r>
+              <a:rPr lang="es-AR" smtClean="0">
+                <a:latin typeface="Segoe UI" panose="020B0502040204020203" pitchFamily="34" charset="0"/>
+                <a:cs typeface="Segoe UI" panose="020B0502040204020203" pitchFamily="34" charset="0"/>
+              </a:rPr>
+              <a:t>Inés </a:t>
+            </a:r>
+            <a:r>
+              <a:rPr lang="es-AR" smtClean="0">
+                <a:latin typeface="Segoe UI" panose="020B0502040204020203" pitchFamily="34" charset="0"/>
+                <a:cs typeface="Segoe UI" panose="020B0502040204020203" pitchFamily="34" charset="0"/>
+              </a:rPr>
+              <a:t>Parnisari</a:t>
+            </a:r>
+            <a:endParaRPr lang="es-AR" smtClean="0">
+              <a:latin typeface="Segoe UI" panose="020B0502040204020203" pitchFamily="34" charset="0"/>
+              <a:cs typeface="Segoe UI" panose="020B0502040204020203" pitchFamily="34" charset="0"/>
+            </a:endParaRPr>
+          </a:p>
         </p:txBody>
       </p:sp>
     </p:spTree>
     <p:extLst>
       <p:ext uri="{BB962C8B-B14F-4D97-AF65-F5344CB8AC3E}">
-        <p14:creationId xmlns:p14="http://schemas.microsoft.com/office/powerpoint/2010/main" val="2139132589"/>
+        <p14:creationId xmlns:p14="http://schemas.microsoft.com/office/powerpoint/2010/main" xmlns="" val="2139132589"/>
       </p:ext>
     </p:extLst>
   </p:cSld>
   <p:clrMapOvr>
     <a:masterClrMapping/>
   </p:clrMapOvr>
-  <mc:AlternateContent xmlns:mc="http://schemas.openxmlformats.org/markup-compatibility/2006" xmlns:p14="http://schemas.microsoft.com/office/powerpoint/2010/main">
-    <mc:Choice Requires="p14">
+  <mc:AlternateContent xmlns:mc="http://schemas.openxmlformats.org/markup-compatibility/2006">
+    <mc:Choice xmlns:p14="http://schemas.microsoft.com/office/powerpoint/2010/main" xmlns="" Requires="p14">
       <p:transition spd="med" p14:dur="700">
         <p:fade/>
       </p:transition>
     </mc:Choice>
-    <mc:Fallback xmlns="">
+    <mc:Fallback>
       <p:transition spd="med">
         <p:fade/>
       </p:transition>
@@ -8878,20 +9240,20 @@
     </p:spTree>
     <p:extLst>
       <p:ext uri="{BB962C8B-B14F-4D97-AF65-F5344CB8AC3E}">
-        <p14:creationId xmlns:p14="http://schemas.microsoft.com/office/powerpoint/2010/main" val="3204325395"/>
+        <p14:creationId xmlns:p14="http://schemas.microsoft.com/office/powerpoint/2010/main" xmlns="" val="3204325395"/>
       </p:ext>
     </p:extLst>
   </p:cSld>
   <p:clrMapOvr>
     <a:masterClrMapping/>
   </p:clrMapOvr>
-  <mc:AlternateContent xmlns:mc="http://schemas.openxmlformats.org/markup-compatibility/2006" xmlns:p14="http://schemas.microsoft.com/office/powerpoint/2010/main">
-    <mc:Choice Requires="p14">
+  <mc:AlternateContent xmlns:mc="http://schemas.openxmlformats.org/markup-compatibility/2006">
+    <mc:Choice xmlns:p14="http://schemas.microsoft.com/office/powerpoint/2010/main" xmlns="" Requires="p14">
       <p:transition spd="med" p14:dur="700">
         <p:fade/>
       </p:transition>
     </mc:Choice>
-    <mc:Fallback xmlns="">
+    <mc:Fallback>
       <p:transition spd="med">
         <p:fade/>
       </p:transition>
@@ -9077,20 +9439,20 @@
     </p:spTree>
     <p:extLst>
       <p:ext uri="{BB962C8B-B14F-4D97-AF65-F5344CB8AC3E}">
-        <p14:creationId xmlns:p14="http://schemas.microsoft.com/office/powerpoint/2010/main" val="1496383053"/>
+        <p14:creationId xmlns:p14="http://schemas.microsoft.com/office/powerpoint/2010/main" xmlns="" val="1496383053"/>
       </p:ext>
     </p:extLst>
   </p:cSld>
   <p:clrMapOvr>
     <a:masterClrMapping/>
   </p:clrMapOvr>
-  <mc:AlternateContent xmlns:mc="http://schemas.openxmlformats.org/markup-compatibility/2006" xmlns:p14="http://schemas.microsoft.com/office/powerpoint/2010/main">
-    <mc:Choice Requires="p14">
+  <mc:AlternateContent xmlns:mc="http://schemas.openxmlformats.org/markup-compatibility/2006">
+    <mc:Choice xmlns:p14="http://schemas.microsoft.com/office/powerpoint/2010/main" xmlns="" Requires="p14">
       <p:transition spd="med" p14:dur="700">
         <p:fade/>
       </p:transition>
     </mc:Choice>
-    <mc:Fallback xmlns="">
+    <mc:Fallback>
       <p:transition spd="med">
         <p:fade/>
       </p:transition>
@@ -9139,7 +9501,7 @@
           <a:lstStyle/>
           <a:p>
             <a:r>
-              <a:rPr lang="en-US" spc="0" dirty="0" err="1">
+              <a:rPr lang="es-AR" spc="0" smtClean="0">
                 <a:ln w="0"/>
                 <a:solidFill>
                   <a:schemeClr val="accent1"/>
@@ -9157,7 +9519,7 @@
               <a:t>Siglo</a:t>
             </a:r>
             <a:r>
-              <a:rPr lang="en-US" spc="0" dirty="0">
+              <a:rPr lang="es-AR" spc="0" smtClean="0">
                 <a:ln w="0"/>
                 <a:solidFill>
                   <a:schemeClr val="accent1"/>
@@ -9175,7 +9537,7 @@
               <a:t> XIX – </a:t>
             </a:r>
             <a:r>
-              <a:rPr lang="en-US" spc="0" dirty="0" err="1" smtClean="0">
+              <a:rPr lang="es-AR" spc="0" smtClean="0">
                 <a:ln w="0"/>
                 <a:solidFill>
                   <a:schemeClr val="accent1"/>
@@ -9192,7 +9554,7 @@
               </a:rPr>
               <a:t>Riesgos</a:t>
             </a:r>
-            <a:endParaRPr lang="en-US" spc="0" dirty="0">
+            <a:endParaRPr lang="es-AR" spc="0">
               <a:ln w="0"/>
               <a:solidFill>
                 <a:schemeClr val="accent1"/>
@@ -9226,7 +9588,7 @@
           <a:lstStyle/>
           <a:p>
             <a:r>
-              <a:rPr lang="es-AR" dirty="0" smtClean="0">
+              <a:rPr lang="es-AR" smtClean="0">
                 <a:latin typeface="Segoe UI" pitchFamily="34" charset="0"/>
                 <a:ea typeface="Segoe UI" pitchFamily="34" charset="0"/>
                 <a:cs typeface="Segoe UI" pitchFamily="34" charset="0"/>
@@ -9236,7 +9598,7 @@
           </a:p>
           <a:p>
             <a:r>
-              <a:rPr lang="es-AR" dirty="0" smtClean="0">
+              <a:rPr lang="es-AR" smtClean="0">
                 <a:latin typeface="Segoe UI" pitchFamily="34" charset="0"/>
                 <a:ea typeface="Segoe UI" pitchFamily="34" charset="0"/>
                 <a:cs typeface="Segoe UI" pitchFamily="34" charset="0"/>
@@ -9246,7 +9608,7 @@
           </a:p>
           <a:p>
             <a:r>
-              <a:rPr lang="es-AR" dirty="0" smtClean="0">
+              <a:rPr lang="es-AR" smtClean="0">
                 <a:latin typeface="Segoe UI" pitchFamily="34" charset="0"/>
                 <a:ea typeface="Segoe UI" pitchFamily="34" charset="0"/>
                 <a:cs typeface="Segoe UI" pitchFamily="34" charset="0"/>
@@ -9256,7 +9618,7 @@
           </a:p>
           <a:p>
             <a:r>
-              <a:rPr lang="es-AR" dirty="0" smtClean="0">
+              <a:rPr lang="es-AR" smtClean="0">
                 <a:latin typeface="Segoe UI" pitchFamily="34" charset="0"/>
                 <a:ea typeface="Segoe UI" pitchFamily="34" charset="0"/>
                 <a:cs typeface="Segoe UI" pitchFamily="34" charset="0"/>
@@ -9266,7 +9628,7 @@
           </a:p>
           <a:p>
             <a:r>
-              <a:rPr lang="es-AR" dirty="0" smtClean="0">
+              <a:rPr lang="es-AR" smtClean="0">
                 <a:latin typeface="Segoe UI" pitchFamily="34" charset="0"/>
                 <a:ea typeface="Segoe UI" pitchFamily="34" charset="0"/>
                 <a:cs typeface="Segoe UI" pitchFamily="34" charset="0"/>
@@ -9276,7 +9638,7 @@
           </a:p>
           <a:p>
             <a:r>
-              <a:rPr lang="es-AR" dirty="0" smtClean="0">
+              <a:rPr lang="es-AR" smtClean="0">
                 <a:latin typeface="Segoe UI" pitchFamily="34" charset="0"/>
                 <a:ea typeface="Segoe UI" pitchFamily="34" charset="0"/>
                 <a:cs typeface="Segoe UI" pitchFamily="34" charset="0"/>
@@ -9287,7 +9649,7 @@
           <a:p>
             <a:pPr lvl="1"/>
             <a:r>
-              <a:rPr lang="es-AR" dirty="0" smtClean="0">
+              <a:rPr lang="es-AR" smtClean="0">
                 <a:latin typeface="Segoe UI" pitchFamily="34" charset="0"/>
                 <a:ea typeface="Segoe UI" pitchFamily="34" charset="0"/>
                 <a:cs typeface="Segoe UI" pitchFamily="34" charset="0"/>
@@ -9300,20 +9662,20 @@
     </p:spTree>
     <p:extLst>
       <p:ext uri="{BB962C8B-B14F-4D97-AF65-F5344CB8AC3E}">
-        <p14:creationId xmlns:p14="http://schemas.microsoft.com/office/powerpoint/2010/main" val="1679218424"/>
+        <p14:creationId xmlns:p14="http://schemas.microsoft.com/office/powerpoint/2010/main" xmlns="" val="1679218424"/>
       </p:ext>
     </p:extLst>
   </p:cSld>
   <p:clrMapOvr>
     <a:masterClrMapping/>
   </p:clrMapOvr>
-  <mc:AlternateContent xmlns:mc="http://schemas.openxmlformats.org/markup-compatibility/2006" xmlns:p14="http://schemas.microsoft.com/office/powerpoint/2010/main">
-    <mc:Choice Requires="p14">
+  <mc:AlternateContent xmlns:mc="http://schemas.openxmlformats.org/markup-compatibility/2006">
+    <mc:Choice xmlns:p14="http://schemas.microsoft.com/office/powerpoint/2010/main" xmlns="" Requires="p14">
       <p:transition spd="med" p14:dur="700">
         <p:fade/>
       </p:transition>
     </mc:Choice>
-    <mc:Fallback xmlns="">
+    <mc:Fallback>
       <p:transition spd="med">
         <p:fade/>
       </p:transition>
@@ -9551,13 +9913,13 @@
   <p:clrMapOvr>
     <a:masterClrMapping/>
   </p:clrMapOvr>
-  <mc:AlternateContent xmlns:mc="http://schemas.openxmlformats.org/markup-compatibility/2006" xmlns:p14="http://schemas.microsoft.com/office/powerpoint/2010/main">
-    <mc:Choice Requires="p14">
+  <mc:AlternateContent xmlns:mc="http://schemas.openxmlformats.org/markup-compatibility/2006">
+    <mc:Choice xmlns:p14="http://schemas.microsoft.com/office/powerpoint/2010/main" xmlns="" Requires="p14">
       <p:transition spd="med" p14:dur="700">
         <p:fade/>
       </p:transition>
     </mc:Choice>
-    <mc:Fallback xmlns="">
+    <mc:Fallback>
       <p:transition spd="med">
         <p:fade/>
       </p:transition>
@@ -9781,13 +10143,13 @@
   <p:clrMapOvr>
     <a:masterClrMapping/>
   </p:clrMapOvr>
-  <mc:AlternateContent xmlns:mc="http://schemas.openxmlformats.org/markup-compatibility/2006" xmlns:p14="http://schemas.microsoft.com/office/powerpoint/2010/main">
-    <mc:Choice Requires="p14">
+  <mc:AlternateContent xmlns:mc="http://schemas.openxmlformats.org/markup-compatibility/2006">
+    <mc:Choice xmlns:p14="http://schemas.microsoft.com/office/powerpoint/2010/main" xmlns="" Requires="p14">
       <p:transition spd="med" p14:dur="700">
         <p:fade/>
       </p:transition>
     </mc:Choice>
-    <mc:Fallback xmlns="">
+    <mc:Fallback>
       <p:transition spd="med">
         <p:fade/>
       </p:transition>
@@ -9881,20 +10243,20 @@
     </p:spTree>
     <p:extLst>
       <p:ext uri="{BB962C8B-B14F-4D97-AF65-F5344CB8AC3E}">
-        <p14:creationId xmlns:p14="http://schemas.microsoft.com/office/powerpoint/2010/main" val="3439397754"/>
+        <p14:creationId xmlns:p14="http://schemas.microsoft.com/office/powerpoint/2010/main" xmlns="" val="3439397754"/>
       </p:ext>
     </p:extLst>
   </p:cSld>
   <p:clrMapOvr>
     <a:masterClrMapping/>
   </p:clrMapOvr>
-  <mc:AlternateContent xmlns:mc="http://schemas.openxmlformats.org/markup-compatibility/2006" xmlns:p14="http://schemas.microsoft.com/office/powerpoint/2010/main">
-    <mc:Choice Requires="p14">
+  <mc:AlternateContent xmlns:mc="http://schemas.openxmlformats.org/markup-compatibility/2006">
+    <mc:Choice xmlns:p14="http://schemas.microsoft.com/office/powerpoint/2010/main" xmlns="" Requires="p14">
       <p:transition spd="med" p14:dur="700">
         <p:fade/>
       </p:transition>
     </mc:Choice>
-    <mc:Fallback xmlns="">
+    <mc:Fallback>
       <p:transition spd="med">
         <p:fade/>
       </p:transition>
@@ -10063,20 +10425,20 @@
     </p:spTree>
     <p:extLst>
       <p:ext uri="{BB962C8B-B14F-4D97-AF65-F5344CB8AC3E}">
-        <p14:creationId xmlns:p14="http://schemas.microsoft.com/office/powerpoint/2010/main" val="2675216716"/>
+        <p14:creationId xmlns:p14="http://schemas.microsoft.com/office/powerpoint/2010/main" xmlns="" val="2675216716"/>
       </p:ext>
     </p:extLst>
   </p:cSld>
   <p:clrMapOvr>
     <a:masterClrMapping/>
   </p:clrMapOvr>
-  <mc:AlternateContent xmlns:mc="http://schemas.openxmlformats.org/markup-compatibility/2006" xmlns:p14="http://schemas.microsoft.com/office/powerpoint/2010/main">
-    <mc:Choice Requires="p14">
+  <mc:AlternateContent xmlns:mc="http://schemas.openxmlformats.org/markup-compatibility/2006">
+    <mc:Choice xmlns:p14="http://schemas.microsoft.com/office/powerpoint/2010/main" xmlns="" Requires="p14">
       <p:transition spd="med" p14:dur="700">
         <p:fade/>
       </p:transition>
     </mc:Choice>
-    <mc:Fallback xmlns="">
+    <mc:Fallback>
       <p:transition spd="med">
         <p:fade/>
       </p:transition>
@@ -10574,7 +10936,7 @@
           <a:blip r:embed="rId3" cstate="print">
             <a:extLst>
               <a:ext uri="{28A0092B-C50C-407E-A947-70E740481C1C}">
-                <a14:useLocalDpi xmlns:a14="http://schemas.microsoft.com/office/drawing/2010/main" val="0"/>
+                <a14:useLocalDpi xmlns:a14="http://schemas.microsoft.com/office/drawing/2010/main" xmlns="" val="0"/>
               </a:ext>
             </a:extLst>
           </a:blip>
@@ -10594,7 +10956,7 @@
           <a:noFill/>
           <a:extLst>
             <a:ext uri="{909E8E84-426E-40DD-AFC4-6F175D3DCCD1}">
-              <a14:hiddenFill xmlns:a14="http://schemas.microsoft.com/office/drawing/2010/main">
+              <a14:hiddenFill xmlns:a14="http://schemas.microsoft.com/office/drawing/2010/main" xmlns="">
                 <a:solidFill>
                   <a:srgbClr val="FFFFFF"/>
                 </a:solidFill>
@@ -10615,7 +10977,7 @@
           <a:blip r:embed="rId4" cstate="print">
             <a:extLst>
               <a:ext uri="{28A0092B-C50C-407E-A947-70E740481C1C}">
-                <a14:useLocalDpi xmlns:a14="http://schemas.microsoft.com/office/drawing/2010/main" val="0"/>
+                <a14:useLocalDpi xmlns:a14="http://schemas.microsoft.com/office/drawing/2010/main" xmlns="" val="0"/>
               </a:ext>
             </a:extLst>
           </a:blip>
@@ -10635,7 +10997,7 @@
           <a:noFill/>
           <a:extLst>
             <a:ext uri="{909E8E84-426E-40DD-AFC4-6F175D3DCCD1}">
-              <a14:hiddenFill xmlns:a14="http://schemas.microsoft.com/office/drawing/2010/main">
+              <a14:hiddenFill xmlns:a14="http://schemas.microsoft.com/office/drawing/2010/main" xmlns="">
                 <a:solidFill>
                   <a:srgbClr val="FFFFFF"/>
                 </a:solidFill>
@@ -10656,7 +11018,7 @@
           <a:blip r:embed="rId5" cstate="print">
             <a:extLst>
               <a:ext uri="{28A0092B-C50C-407E-A947-70E740481C1C}">
-                <a14:useLocalDpi xmlns:a14="http://schemas.microsoft.com/office/drawing/2010/main" val="0"/>
+                <a14:useLocalDpi xmlns:a14="http://schemas.microsoft.com/office/drawing/2010/main" xmlns="" val="0"/>
               </a:ext>
             </a:extLst>
           </a:blip>
@@ -10676,7 +11038,7 @@
           <a:noFill/>
           <a:extLst>
             <a:ext uri="{909E8E84-426E-40DD-AFC4-6F175D3DCCD1}">
-              <a14:hiddenFill xmlns:a14="http://schemas.microsoft.com/office/drawing/2010/main">
+              <a14:hiddenFill xmlns:a14="http://schemas.microsoft.com/office/drawing/2010/main" xmlns="">
                 <a:solidFill>
                   <a:srgbClr val="FFFFFF"/>
                 </a:solidFill>
@@ -10697,7 +11059,7 @@
           <a:blip r:embed="rId6" cstate="print">
             <a:extLst>
               <a:ext uri="{28A0092B-C50C-407E-A947-70E740481C1C}">
-                <a14:useLocalDpi xmlns:a14="http://schemas.microsoft.com/office/drawing/2010/main" val="0"/>
+                <a14:useLocalDpi xmlns:a14="http://schemas.microsoft.com/office/drawing/2010/main" xmlns="" val="0"/>
               </a:ext>
             </a:extLst>
           </a:blip>
@@ -10717,7 +11079,7 @@
           <a:noFill/>
           <a:extLst>
             <a:ext uri="{909E8E84-426E-40DD-AFC4-6F175D3DCCD1}">
-              <a14:hiddenFill xmlns:a14="http://schemas.microsoft.com/office/drawing/2010/main">
+              <a14:hiddenFill xmlns:a14="http://schemas.microsoft.com/office/drawing/2010/main" xmlns="">
                 <a:solidFill>
                   <a:srgbClr val="FFFFFF"/>
                 </a:solidFill>
@@ -10729,20 +11091,20 @@
     </p:spTree>
     <p:extLst>
       <p:ext uri="{BB962C8B-B14F-4D97-AF65-F5344CB8AC3E}">
-        <p14:creationId xmlns:p14="http://schemas.microsoft.com/office/powerpoint/2010/main" val="2564182459"/>
+        <p14:creationId xmlns:p14="http://schemas.microsoft.com/office/powerpoint/2010/main" xmlns="" val="2564182459"/>
       </p:ext>
     </p:extLst>
   </p:cSld>
   <p:clrMapOvr>
     <a:masterClrMapping/>
   </p:clrMapOvr>
-  <mc:AlternateContent xmlns:mc="http://schemas.openxmlformats.org/markup-compatibility/2006" xmlns:p14="http://schemas.microsoft.com/office/powerpoint/2010/main">
-    <mc:Choice Requires="p14">
+  <mc:AlternateContent xmlns:mc="http://schemas.openxmlformats.org/markup-compatibility/2006">
+    <mc:Choice xmlns:p14="http://schemas.microsoft.com/office/powerpoint/2010/main" xmlns="" Requires="p14">
       <p:transition spd="med" p14:dur="700">
         <p:fade/>
       </p:transition>
     </mc:Choice>
-    <mc:Fallback xmlns="">
+    <mc:Fallback>
       <p:transition spd="med">
         <p:fade/>
       </p:transition>
@@ -10824,25 +11186,7 @@
                 <a:latin typeface="Segoe UI" panose="020B0502040204020203" pitchFamily="34" charset="0"/>
                 <a:cs typeface="Segoe UI" panose="020B0502040204020203" pitchFamily="34" charset="0"/>
               </a:rPr>
-              <a:t> </a:t>
-            </a:r>
-            <a:r>
-              <a:rPr lang="en-US" spc="0" dirty="0" smtClean="0">
-                <a:ln w="0"/>
-                <a:solidFill>
-                  <a:schemeClr val="accent1"/>
-                </a:solidFill>
-                <a:effectLst>
-                  <a:outerShdw blurRad="38100" dist="25400" dir="5400000" algn="ctr" rotWithShape="0">
-                    <a:srgbClr val="6E747A">
-                      <a:alpha val="43000"/>
-                    </a:srgbClr>
-                  </a:outerShdw>
-                </a:effectLst>
-                <a:latin typeface="Segoe UI" panose="020B0502040204020203" pitchFamily="34" charset="0"/>
-                <a:cs typeface="Segoe UI" panose="020B0502040204020203" pitchFamily="34" charset="0"/>
-              </a:rPr>
-              <a:t>de </a:t>
+              <a:t> de </a:t>
             </a:r>
             <a:r>
               <a:rPr lang="en-US" spc="0" dirty="0" err="1" smtClean="0">
@@ -11018,7 +11362,7 @@
           <a:blip r:embed="rId3" cstate="print">
             <a:extLst>
               <a:ext uri="{28A0092B-C50C-407E-A947-70E740481C1C}">
-                <a14:useLocalDpi xmlns:a14="http://schemas.microsoft.com/office/drawing/2010/main" val="0"/>
+                <a14:useLocalDpi xmlns:a14="http://schemas.microsoft.com/office/drawing/2010/main" xmlns="" val="0"/>
               </a:ext>
             </a:extLst>
           </a:blip>
@@ -11038,7 +11382,7 @@
           <a:noFill/>
           <a:extLst>
             <a:ext uri="{909E8E84-426E-40DD-AFC4-6F175D3DCCD1}">
-              <a14:hiddenFill xmlns:a14="http://schemas.microsoft.com/office/drawing/2010/main">
+              <a14:hiddenFill xmlns:a14="http://schemas.microsoft.com/office/drawing/2010/main" xmlns="">
                 <a:solidFill>
                   <a:srgbClr val="FFFFFF"/>
                 </a:solidFill>
@@ -11050,20 +11394,20 @@
     </p:spTree>
     <p:extLst>
       <p:ext uri="{BB962C8B-B14F-4D97-AF65-F5344CB8AC3E}">
-        <p14:creationId xmlns:p14="http://schemas.microsoft.com/office/powerpoint/2010/main" val="3356351472"/>
+        <p14:creationId xmlns:p14="http://schemas.microsoft.com/office/powerpoint/2010/main" xmlns="" val="3356351472"/>
       </p:ext>
     </p:extLst>
   </p:cSld>
   <p:clrMapOvr>
     <a:masterClrMapping/>
   </p:clrMapOvr>
-  <mc:AlternateContent xmlns:mc="http://schemas.openxmlformats.org/markup-compatibility/2006" xmlns:p14="http://schemas.microsoft.com/office/powerpoint/2010/main">
-    <mc:Choice Requires="p14">
+  <mc:AlternateContent xmlns:mc="http://schemas.openxmlformats.org/markup-compatibility/2006">
+    <mc:Choice xmlns:p14="http://schemas.microsoft.com/office/powerpoint/2010/main" xmlns="" Requires="p14">
       <p:transition spd="med" p14:dur="700">
         <p:fade/>
       </p:transition>
     </mc:Choice>
-    <mc:Fallback xmlns="">
+    <mc:Fallback>
       <p:transition spd="med">
         <p:fade/>
       </p:transition>
@@ -11147,25 +11491,7 @@
                 <a:latin typeface="Segoe UI" panose="020B0502040204020203" pitchFamily="34" charset="0"/>
                 <a:cs typeface="Segoe UI" panose="020B0502040204020203" pitchFamily="34" charset="0"/>
               </a:rPr>
-              <a:t> </a:t>
-            </a:r>
-            <a:r>
-              <a:rPr lang="en-US" spc="0" dirty="0" smtClean="0">
-                <a:ln w="0"/>
-                <a:solidFill>
-                  <a:schemeClr val="accent1"/>
-                </a:solidFill>
-                <a:effectLst>
-                  <a:outerShdw blurRad="38100" dist="25400" dir="5400000" algn="ctr" rotWithShape="0">
-                    <a:srgbClr val="6E747A">
-                      <a:alpha val="43000"/>
-                    </a:srgbClr>
-                  </a:outerShdw>
-                </a:effectLst>
-                <a:latin typeface="Segoe UI" panose="020B0502040204020203" pitchFamily="34" charset="0"/>
-                <a:cs typeface="Segoe UI" panose="020B0502040204020203" pitchFamily="34" charset="0"/>
-              </a:rPr>
-              <a:t>de </a:t>
+              <a:t> de </a:t>
             </a:r>
             <a:r>
               <a:rPr lang="en-US" spc="0" dirty="0" err="1" smtClean="0">
@@ -11309,7 +11635,7 @@
           <a:blip r:embed="rId3" cstate="print">
             <a:extLst>
               <a:ext uri="{28A0092B-C50C-407E-A947-70E740481C1C}">
-                <a14:useLocalDpi xmlns:a14="http://schemas.microsoft.com/office/drawing/2010/main" val="0"/>
+                <a14:useLocalDpi xmlns:a14="http://schemas.microsoft.com/office/drawing/2010/main" xmlns="" val="0"/>
               </a:ext>
             </a:extLst>
           </a:blip>
@@ -11329,7 +11655,7 @@
           <a:noFill/>
           <a:extLst>
             <a:ext uri="{909E8E84-426E-40DD-AFC4-6F175D3DCCD1}">
-              <a14:hiddenFill xmlns:a14="http://schemas.microsoft.com/office/drawing/2010/main">
+              <a14:hiddenFill xmlns:a14="http://schemas.microsoft.com/office/drawing/2010/main" xmlns="">
                 <a:solidFill>
                   <a:srgbClr val="FFFFFF"/>
                 </a:solidFill>
@@ -11341,20 +11667,20 @@
     </p:spTree>
     <p:extLst>
       <p:ext uri="{BB962C8B-B14F-4D97-AF65-F5344CB8AC3E}">
-        <p14:creationId xmlns:p14="http://schemas.microsoft.com/office/powerpoint/2010/main" val="3374507202"/>
+        <p14:creationId xmlns:p14="http://schemas.microsoft.com/office/powerpoint/2010/main" xmlns="" val="3374507202"/>
       </p:ext>
     </p:extLst>
   </p:cSld>
   <p:clrMapOvr>
     <a:masterClrMapping/>
   </p:clrMapOvr>
-  <mc:AlternateContent xmlns:mc="http://schemas.openxmlformats.org/markup-compatibility/2006" xmlns:p14="http://schemas.microsoft.com/office/powerpoint/2010/main">
-    <mc:Choice Requires="p14">
+  <mc:AlternateContent xmlns:mc="http://schemas.openxmlformats.org/markup-compatibility/2006">
+    <mc:Choice xmlns:p14="http://schemas.microsoft.com/office/powerpoint/2010/main" xmlns="" Requires="p14">
       <p:transition spd="med" p14:dur="700">
         <p:fade/>
       </p:transition>
     </mc:Choice>
-    <mc:Fallback xmlns="">
+    <mc:Fallback>
       <p:transition spd="med">
         <p:fade/>
       </p:transition>
@@ -11403,7 +11729,7 @@
           <a:lstStyle/>
           <a:p>
             <a:r>
-              <a:rPr lang="en-US" spc="0" dirty="0" err="1" smtClean="0">
+              <a:rPr lang="es-AR" spc="0" smtClean="0">
                 <a:ln w="0"/>
                 <a:solidFill>
                   <a:schemeClr val="accent1"/>
@@ -11420,7 +11746,7 @@
               </a:rPr>
               <a:t>Introducción</a:t>
             </a:r>
-            <a:endParaRPr lang="en-US" spc="0" dirty="0">
+            <a:endParaRPr lang="es-AR" spc="0">
               <a:ln w="0"/>
               <a:solidFill>
                 <a:schemeClr val="accent1"/>
@@ -11454,7 +11780,7 @@
           <a:lstStyle/>
           <a:p>
             <a:r>
-              <a:rPr lang="es-AR" dirty="0" smtClean="0">
+              <a:rPr lang="es-AR" smtClean="0">
                 <a:latin typeface="Segoe UI" panose="020B0502040204020203" pitchFamily="34" charset="0"/>
                 <a:cs typeface="Segoe UI" panose="020B0502040204020203" pitchFamily="34" charset="0"/>
               </a:rPr>
@@ -11463,7 +11789,7 @@
           </a:p>
           <a:p>
             <a:r>
-              <a:rPr lang="es-AR" dirty="0" smtClean="0">
+              <a:rPr lang="es-AR" smtClean="0">
                 <a:latin typeface="Segoe UI" panose="020B0502040204020203" pitchFamily="34" charset="0"/>
                 <a:cs typeface="Segoe UI" panose="020B0502040204020203" pitchFamily="34" charset="0"/>
               </a:rPr>
@@ -11472,7 +11798,7 @@
           </a:p>
           <a:p>
             <a:r>
-              <a:rPr lang="es-AR" dirty="0">
+              <a:rPr lang="es-AR">
                 <a:latin typeface="Segoe UI" panose="020B0502040204020203" pitchFamily="34" charset="0"/>
                 <a:cs typeface="Segoe UI" panose="020B0502040204020203" pitchFamily="34" charset="0"/>
               </a:rPr>
@@ -11481,7 +11807,7 @@
           </a:p>
           <a:p>
             <a:r>
-              <a:rPr lang="es-AR" dirty="0" smtClean="0">
+              <a:rPr lang="es-AR" smtClean="0">
                 <a:latin typeface="Segoe UI" panose="020B0502040204020203" pitchFamily="34" charset="0"/>
                 <a:cs typeface="Segoe UI" panose="020B0502040204020203" pitchFamily="34" charset="0"/>
               </a:rPr>
@@ -11490,13 +11816,27 @@
           </a:p>
           <a:p>
             <a:r>
-              <a:rPr lang="es-AR" dirty="0" smtClean="0">
-                <a:latin typeface="Segoe UI" panose="020B0502040204020203" pitchFamily="34" charset="0"/>
-                <a:cs typeface="Segoe UI" panose="020B0502040204020203" pitchFamily="34" charset="0"/>
-              </a:rPr>
-              <a:t>Tipos de controles</a:t>
-            </a:r>
-            <a:endParaRPr lang="en-US" dirty="0">
+              <a:rPr lang="es-AR" smtClean="0">
+                <a:latin typeface="Segoe UI" panose="020B0502040204020203" pitchFamily="34" charset="0"/>
+                <a:cs typeface="Segoe UI" panose="020B0502040204020203" pitchFamily="34" charset="0"/>
+              </a:rPr>
+              <a:t>Tipos </a:t>
+            </a:r>
+            <a:r>
+              <a:rPr lang="es-AR" smtClean="0">
+                <a:latin typeface="Segoe UI" panose="020B0502040204020203" pitchFamily="34" charset="0"/>
+                <a:cs typeface="Segoe UI" panose="020B0502040204020203" pitchFamily="34" charset="0"/>
+              </a:rPr>
+              <a:t>de </a:t>
+            </a:r>
+            <a:r>
+              <a:rPr lang="es-AR" smtClean="0">
+                <a:latin typeface="Segoe UI" panose="020B0502040204020203" pitchFamily="34" charset="0"/>
+                <a:cs typeface="Segoe UI" panose="020B0502040204020203" pitchFamily="34" charset="0"/>
+              </a:rPr>
+              <a:t>controles</a:t>
+            </a:r>
+            <a:endParaRPr lang="es-AR">
               <a:latin typeface="Segoe UI" panose="020B0502040204020203" pitchFamily="34" charset="0"/>
               <a:cs typeface="Segoe UI" panose="020B0502040204020203" pitchFamily="34" charset="0"/>
             </a:endParaRPr>
@@ -11506,20 +11846,20 @@
     </p:spTree>
     <p:extLst>
       <p:ext uri="{BB962C8B-B14F-4D97-AF65-F5344CB8AC3E}">
-        <p14:creationId xmlns:p14="http://schemas.microsoft.com/office/powerpoint/2010/main" val="3106206852"/>
+        <p14:creationId xmlns:p14="http://schemas.microsoft.com/office/powerpoint/2010/main" xmlns="" val="3106206852"/>
       </p:ext>
     </p:extLst>
   </p:cSld>
   <p:clrMapOvr>
     <a:masterClrMapping/>
   </p:clrMapOvr>
-  <mc:AlternateContent xmlns:mc="http://schemas.openxmlformats.org/markup-compatibility/2006" xmlns:p14="http://schemas.microsoft.com/office/powerpoint/2010/main">
-    <mc:Choice Requires="p14">
+  <mc:AlternateContent xmlns:mc="http://schemas.openxmlformats.org/markup-compatibility/2006">
+    <mc:Choice xmlns:p14="http://schemas.microsoft.com/office/powerpoint/2010/main" xmlns="" Requires="p14">
       <p:transition spd="med" p14:dur="700">
         <p:fade/>
       </p:transition>
     </mc:Choice>
-    <mc:Fallback xmlns="">
+    <mc:Fallback>
       <p:transition spd="med">
         <p:fade/>
       </p:transition>
@@ -11568,7 +11908,7 @@
           <a:lstStyle/>
           <a:p>
             <a:r>
-              <a:rPr lang="en-US" spc="0" dirty="0" err="1" smtClean="0">
+              <a:rPr lang="es-AR" spc="0" dirty="0" smtClean="0">
                 <a:ln w="0"/>
                 <a:solidFill>
                   <a:schemeClr val="accent1"/>
@@ -11583,9 +11923,9 @@
                 <a:latin typeface="Segoe UI" panose="020B0502040204020203" pitchFamily="34" charset="0"/>
                 <a:cs typeface="Segoe UI" panose="020B0502040204020203" pitchFamily="34" charset="0"/>
               </a:rPr>
-              <a:t>Riesgos</a:t>
-            </a:r>
-            <a:endParaRPr lang="en-US" spc="0" dirty="0">
+              <a:t>Siglo XXI – Riesgos  (I)</a:t>
+            </a:r>
+            <a:endParaRPr lang="es-AR" spc="0" dirty="0">
               <a:ln w="0"/>
               <a:solidFill>
                 <a:schemeClr val="accent1"/>
@@ -11613,42 +11953,106 @@
             <p:ph idx="1"/>
           </p:nvPr>
         </p:nvSpPr>
-        <p:spPr/>
-        <p:txBody>
-          <a:bodyPr/>
+        <p:spPr>
+          <a:xfrm>
+            <a:off x="1522413" y="2276872"/>
+            <a:ext cx="9756575" cy="3742928"/>
+          </a:xfrm>
+        </p:spPr>
+        <p:txBody>
+          <a:bodyPr>
+            <a:normAutofit lnSpcReduction="10000"/>
+          </a:bodyPr>
           <a:lstStyle/>
           <a:p>
+            <a:pPr>
+              <a:lnSpc>
+                <a:spcPct val="150000"/>
+              </a:lnSpc>
+            </a:pPr>
             <a:r>
               <a:rPr lang="es-AR" dirty="0" smtClean="0">
                 <a:latin typeface="Segoe UI" panose="020B0502040204020203" pitchFamily="34" charset="0"/>
                 <a:cs typeface="Segoe UI" panose="020B0502040204020203" pitchFamily="34" charset="0"/>
               </a:rPr>
-              <a:t>(COMPLETAR)</a:t>
-            </a:r>
-            <a:endParaRPr lang="en-US" dirty="0">
-              <a:latin typeface="Segoe UI" panose="020B0502040204020203" pitchFamily="34" charset="0"/>
-              <a:cs typeface="Segoe UI" panose="020B0502040204020203" pitchFamily="34" charset="0"/>
-            </a:endParaRPr>
+              <a:t>Personal deshonesto</a:t>
+            </a:r>
+          </a:p>
+          <a:p>
+            <a:pPr>
+              <a:lnSpc>
+                <a:spcPct val="150000"/>
+              </a:lnSpc>
+            </a:pPr>
+            <a:r>
+              <a:rPr lang="es-AR" dirty="0" smtClean="0">
+                <a:latin typeface="Segoe UI" panose="020B0502040204020203" pitchFamily="34" charset="0"/>
+                <a:cs typeface="Segoe UI" panose="020B0502040204020203" pitchFamily="34" charset="0"/>
+              </a:rPr>
+              <a:t>Robo, alteración y/o pérdida de información (políticas inapropiadas)</a:t>
+            </a:r>
+          </a:p>
+          <a:p>
+            <a:pPr>
+              <a:lnSpc>
+                <a:spcPct val="150000"/>
+              </a:lnSpc>
+            </a:pPr>
+            <a:r>
+              <a:rPr lang="es-AR" dirty="0" smtClean="0">
+                <a:latin typeface="Segoe UI" panose="020B0502040204020203" pitchFamily="34" charset="0"/>
+                <a:cs typeface="Segoe UI" panose="020B0502040204020203" pitchFamily="34" charset="0"/>
+              </a:rPr>
+              <a:t>Espionaje industrial</a:t>
+            </a:r>
+          </a:p>
+          <a:p>
+            <a:pPr>
+              <a:lnSpc>
+                <a:spcPct val="150000"/>
+              </a:lnSpc>
+            </a:pPr>
+            <a:r>
+              <a:rPr lang="es-AR" dirty="0" smtClean="0">
+                <a:latin typeface="Segoe UI" panose="020B0502040204020203" pitchFamily="34" charset="0"/>
+                <a:cs typeface="Segoe UI" panose="020B0502040204020203" pitchFamily="34" charset="0"/>
+              </a:rPr>
+              <a:t>Dependencia de los sistemas informáticos</a:t>
+            </a:r>
+          </a:p>
+          <a:p>
+            <a:pPr>
+              <a:lnSpc>
+                <a:spcPct val="150000"/>
+              </a:lnSpc>
+            </a:pPr>
+            <a:r>
+              <a:rPr lang="es-AR" dirty="0" smtClean="0">
+                <a:latin typeface="Segoe UI" panose="020B0502040204020203" pitchFamily="34" charset="0"/>
+                <a:cs typeface="Segoe UI" panose="020B0502040204020203" pitchFamily="34" charset="0"/>
+              </a:rPr>
+              <a:t>Necesidad de capacitación de operarios</a:t>
+            </a:r>
           </a:p>
         </p:txBody>
       </p:sp>
     </p:spTree>
     <p:extLst>
       <p:ext uri="{BB962C8B-B14F-4D97-AF65-F5344CB8AC3E}">
-        <p14:creationId xmlns:p14="http://schemas.microsoft.com/office/powerpoint/2010/main" val="2283345473"/>
+        <p14:creationId xmlns:p14="http://schemas.microsoft.com/office/powerpoint/2010/main" xmlns="" val="2283345473"/>
       </p:ext>
     </p:extLst>
   </p:cSld>
   <p:clrMapOvr>
     <a:masterClrMapping/>
   </p:clrMapOvr>
-  <mc:AlternateContent xmlns:mc="http://schemas.openxmlformats.org/markup-compatibility/2006" xmlns:p14="http://schemas.microsoft.com/office/powerpoint/2010/main">
-    <mc:Choice Requires="p14">
+  <mc:AlternateContent xmlns:mc="http://schemas.openxmlformats.org/markup-compatibility/2006">
+    <mc:Choice xmlns:p14="http://schemas.microsoft.com/office/powerpoint/2010/main" xmlns="" Requires="p14">
       <p:transition spd="med" p14:dur="700">
         <p:fade/>
       </p:transition>
     </mc:Choice>
-    <mc:Fallback xmlns="">
+    <mc:Fallback>
       <p:transition spd="med">
         <p:fade/>
       </p:transition>
@@ -11697,7 +12101,7 @@
           <a:lstStyle/>
           <a:p>
             <a:r>
-              <a:rPr lang="en-US" spc="0" dirty="0" err="1" smtClean="0">
+              <a:rPr lang="es-AR" spc="0" dirty="0" smtClean="0">
                 <a:ln w="0"/>
                 <a:solidFill>
                   <a:schemeClr val="accent1"/>
@@ -11712,45 +12116,9 @@
                 <a:latin typeface="Segoe UI" panose="020B0502040204020203" pitchFamily="34" charset="0"/>
                 <a:cs typeface="Segoe UI" panose="020B0502040204020203" pitchFamily="34" charset="0"/>
               </a:rPr>
-              <a:t>Casos</a:t>
-            </a:r>
-            <a:r>
-              <a:rPr lang="en-US" spc="0" dirty="0" smtClean="0">
-                <a:ln w="0"/>
-                <a:solidFill>
-                  <a:schemeClr val="accent1"/>
-                </a:solidFill>
-                <a:effectLst>
-                  <a:outerShdw blurRad="38100" dist="25400" dir="5400000" algn="ctr" rotWithShape="0">
-                    <a:srgbClr val="6E747A">
-                      <a:alpha val="43000"/>
-                    </a:srgbClr>
-                  </a:outerShdw>
-                </a:effectLst>
-                <a:latin typeface="Segoe UI" panose="020B0502040204020203" pitchFamily="34" charset="0"/>
-                <a:cs typeface="Segoe UI" panose="020B0502040204020203" pitchFamily="34" charset="0"/>
-              </a:rPr>
-              <a:t> </a:t>
-            </a:r>
-            <a:r>
-              <a:rPr lang="en-US" spc="0" dirty="0" err="1" smtClean="0">
-                <a:ln w="0"/>
-                <a:solidFill>
-                  <a:schemeClr val="accent1"/>
-                </a:solidFill>
-                <a:effectLst>
-                  <a:outerShdw blurRad="38100" dist="25400" dir="5400000" algn="ctr" rotWithShape="0">
-                    <a:srgbClr val="6E747A">
-                      <a:alpha val="43000"/>
-                    </a:srgbClr>
-                  </a:outerShdw>
-                </a:effectLst>
-                <a:latin typeface="Segoe UI" panose="020B0502040204020203" pitchFamily="34" charset="0"/>
-                <a:cs typeface="Segoe UI" panose="020B0502040204020203" pitchFamily="34" charset="0"/>
-              </a:rPr>
-              <a:t>reales</a:t>
-            </a:r>
-            <a:endParaRPr lang="en-US" spc="0" dirty="0">
+              <a:t>Siglo XXI – Riesgos  (II)</a:t>
+            </a:r>
+            <a:endParaRPr lang="es-AR" spc="0" dirty="0">
               <a:ln w="0"/>
               <a:solidFill>
                 <a:schemeClr val="accent1"/>
@@ -11778,220 +12146,110 @@
             <p:ph idx="1"/>
           </p:nvPr>
         </p:nvSpPr>
-        <p:spPr/>
+        <p:spPr>
+          <a:xfrm>
+            <a:off x="1522413" y="2204864"/>
+            <a:ext cx="9134391" cy="3814936"/>
+          </a:xfrm>
+        </p:spPr>
         <p:txBody>
           <a:bodyPr>
-            <a:noAutofit/>
+            <a:normAutofit/>
           </a:bodyPr>
           <a:lstStyle/>
           <a:p>
-            <a:r>
-              <a:rPr lang="es-ES" sz="2000" dirty="0" smtClean="0">
-                <a:latin typeface="Segoe UI" panose="020B0502040204020203" pitchFamily="34" charset="0"/>
-                <a:cs typeface="Segoe UI" panose="020B0502040204020203" pitchFamily="34" charset="0"/>
-              </a:rPr>
-              <a:t>1996: </a:t>
-            </a:r>
-            <a:r>
-              <a:rPr lang="es-ES" sz="2000" dirty="0">
-                <a:latin typeface="Segoe UI" panose="020B0502040204020203" pitchFamily="34" charset="0"/>
-                <a:cs typeface="Segoe UI" panose="020B0502040204020203" pitchFamily="34" charset="0"/>
-              </a:rPr>
-              <a:t>se promulgó en Estados Unidos la ley HIPAA (</a:t>
-            </a:r>
-            <a:r>
-              <a:rPr lang="es-ES" sz="2000" dirty="0" err="1">
-                <a:latin typeface="Segoe UI" panose="020B0502040204020203" pitchFamily="34" charset="0"/>
-                <a:cs typeface="Segoe UI" panose="020B0502040204020203" pitchFamily="34" charset="0"/>
-              </a:rPr>
-              <a:t>Health</a:t>
-            </a:r>
-            <a:r>
-              <a:rPr lang="es-ES" sz="2000" dirty="0">
-                <a:latin typeface="Segoe UI" panose="020B0502040204020203" pitchFamily="34" charset="0"/>
-                <a:cs typeface="Segoe UI" panose="020B0502040204020203" pitchFamily="34" charset="0"/>
-              </a:rPr>
-              <a:t> </a:t>
-            </a:r>
-            <a:r>
-              <a:rPr lang="es-ES" sz="2000" dirty="0" err="1">
-                <a:latin typeface="Segoe UI" panose="020B0502040204020203" pitchFamily="34" charset="0"/>
-                <a:cs typeface="Segoe UI" panose="020B0502040204020203" pitchFamily="34" charset="0"/>
-              </a:rPr>
-              <a:t>Insurance</a:t>
-            </a:r>
-            <a:r>
-              <a:rPr lang="es-ES" sz="2000" dirty="0">
-                <a:latin typeface="Segoe UI" panose="020B0502040204020203" pitchFamily="34" charset="0"/>
-                <a:cs typeface="Segoe UI" panose="020B0502040204020203" pitchFamily="34" charset="0"/>
-              </a:rPr>
-              <a:t> </a:t>
-            </a:r>
-            <a:r>
-              <a:rPr lang="es-ES" sz="2000" dirty="0" err="1" smtClean="0">
-                <a:latin typeface="Segoe UI" panose="020B0502040204020203" pitchFamily="34" charset="0"/>
-                <a:cs typeface="Segoe UI" panose="020B0502040204020203" pitchFamily="34" charset="0"/>
-              </a:rPr>
-              <a:t>Portability</a:t>
-            </a:r>
-            <a:r>
-              <a:rPr lang="es-ES" sz="2000" dirty="0" smtClean="0">
-                <a:latin typeface="Segoe UI" panose="020B0502040204020203" pitchFamily="34" charset="0"/>
-                <a:cs typeface="Segoe UI" panose="020B0502040204020203" pitchFamily="34" charset="0"/>
-              </a:rPr>
-              <a:t> </a:t>
-            </a:r>
-            <a:r>
-              <a:rPr lang="es-ES" sz="2000" dirty="0">
-                <a:latin typeface="Segoe UI" panose="020B0502040204020203" pitchFamily="34" charset="0"/>
-                <a:cs typeface="Segoe UI" panose="020B0502040204020203" pitchFamily="34" charset="0"/>
-              </a:rPr>
-              <a:t>and </a:t>
-            </a:r>
-            <a:r>
-              <a:rPr lang="es-ES" sz="2000" dirty="0" err="1">
-                <a:latin typeface="Segoe UI" panose="020B0502040204020203" pitchFamily="34" charset="0"/>
-                <a:cs typeface="Segoe UI" panose="020B0502040204020203" pitchFamily="34" charset="0"/>
-              </a:rPr>
-              <a:t>Accountability</a:t>
-            </a:r>
-            <a:r>
-              <a:rPr lang="es-ES" sz="2000" dirty="0">
-                <a:latin typeface="Segoe UI" panose="020B0502040204020203" pitchFamily="34" charset="0"/>
-                <a:cs typeface="Segoe UI" panose="020B0502040204020203" pitchFamily="34" charset="0"/>
-              </a:rPr>
-              <a:t> </a:t>
-            </a:r>
-            <a:r>
-              <a:rPr lang="es-ES" sz="2000" dirty="0" err="1">
-                <a:latin typeface="Segoe UI" panose="020B0502040204020203" pitchFamily="34" charset="0"/>
-                <a:cs typeface="Segoe UI" panose="020B0502040204020203" pitchFamily="34" charset="0"/>
-              </a:rPr>
-              <a:t>Act</a:t>
-            </a:r>
-            <a:r>
-              <a:rPr lang="es-ES" sz="2000" dirty="0">
-                <a:latin typeface="Segoe UI" panose="020B0502040204020203" pitchFamily="34" charset="0"/>
-                <a:cs typeface="Segoe UI" panose="020B0502040204020203" pitchFamily="34" charset="0"/>
-              </a:rPr>
-              <a:t>), cuyo objetivo es asegurar la privacidad de los pacientes y la seguridad de la información relacionada a </a:t>
-            </a:r>
-            <a:r>
-              <a:rPr lang="es-ES" sz="2000" dirty="0" smtClean="0">
-                <a:latin typeface="Segoe UI" panose="020B0502040204020203" pitchFamily="34" charset="0"/>
-                <a:cs typeface="Segoe UI" panose="020B0502040204020203" pitchFamily="34" charset="0"/>
-              </a:rPr>
-              <a:t>ellos. </a:t>
-            </a:r>
-            <a:r>
-              <a:rPr lang="es-ES" sz="2000" dirty="0">
-                <a:latin typeface="Segoe UI" panose="020B0502040204020203" pitchFamily="34" charset="0"/>
-                <a:cs typeface="Segoe UI" panose="020B0502040204020203" pitchFamily="34" charset="0"/>
-              </a:rPr>
-              <a:t>En el año 2004 se produjo el primer caso de violación a esta ley, cuando un empleado de una asociación de enfermos de cáncer utilizó información de pacientes para obtener tarjetas de crédito.</a:t>
-            </a:r>
-            <a:endParaRPr lang="es-ES" sz="2000" dirty="0" smtClean="0">
+            <a:pPr>
+              <a:lnSpc>
+                <a:spcPct val="150000"/>
+              </a:lnSpc>
+            </a:pPr>
+            <a:r>
+              <a:rPr lang="es-AR" dirty="0" smtClean="0">
+                <a:latin typeface="Segoe UI" panose="020B0502040204020203" pitchFamily="34" charset="0"/>
+                <a:cs typeface="Segoe UI" panose="020B0502040204020203" pitchFamily="34" charset="0"/>
+              </a:rPr>
+              <a:t>Mal administración de perfiles de usuarios y/o contraseñas</a:t>
+            </a:r>
+          </a:p>
+          <a:p>
+            <a:pPr>
+              <a:lnSpc>
+                <a:spcPct val="150000"/>
+              </a:lnSpc>
+            </a:pPr>
+            <a:r>
+              <a:rPr lang="es-AR" dirty="0" smtClean="0">
+                <a:latin typeface="Segoe UI" panose="020B0502040204020203" pitchFamily="34" charset="0"/>
+                <a:cs typeface="Segoe UI" panose="020B0502040204020203" pitchFamily="34" charset="0"/>
+              </a:rPr>
+              <a:t>Dependencia de empleados claves</a:t>
+            </a:r>
+          </a:p>
+          <a:p>
+            <a:pPr>
+              <a:lnSpc>
+                <a:spcPct val="150000"/>
+              </a:lnSpc>
+            </a:pPr>
+            <a:r>
+              <a:rPr lang="es-AR" dirty="0" smtClean="0">
+                <a:latin typeface="Segoe UI" panose="020B0502040204020203" pitchFamily="34" charset="0"/>
+                <a:cs typeface="Segoe UI" panose="020B0502040204020203" pitchFamily="34" charset="0"/>
+              </a:rPr>
+              <a:t>Comodidad y confianza excesiva de sistemas</a:t>
+            </a:r>
+          </a:p>
+          <a:p>
+            <a:pPr>
+              <a:lnSpc>
+                <a:spcPct val="150000"/>
+              </a:lnSpc>
+            </a:pPr>
+            <a:r>
+              <a:rPr lang="es-AR" dirty="0" smtClean="0">
+                <a:latin typeface="Segoe UI" panose="020B0502040204020203" pitchFamily="34" charset="0"/>
+                <a:cs typeface="Segoe UI" panose="020B0502040204020203" pitchFamily="34" charset="0"/>
+              </a:rPr>
+              <a:t>Generación de información residual</a:t>
+            </a:r>
+          </a:p>
+          <a:p>
+            <a:pPr>
+              <a:lnSpc>
+                <a:spcPct val="150000"/>
+              </a:lnSpc>
+            </a:pPr>
+            <a:r>
+              <a:rPr lang="es-AR" dirty="0" smtClean="0">
+                <a:latin typeface="Segoe UI" panose="020B0502040204020203" pitchFamily="34" charset="0"/>
+                <a:cs typeface="Segoe UI" panose="020B0502040204020203" pitchFamily="34" charset="0"/>
+              </a:rPr>
+              <a:t>Siniestro del soporte físico de la información</a:t>
+            </a:r>
+            <a:endParaRPr lang="es-AR" dirty="0">
               <a:latin typeface="Segoe UI" panose="020B0502040204020203" pitchFamily="34" charset="0"/>
               <a:cs typeface="Segoe UI" panose="020B0502040204020203" pitchFamily="34" charset="0"/>
             </a:endParaRPr>
           </a:p>
-          <a:p>
-            <a:r>
-              <a:rPr lang="es-ES" sz="2000" dirty="0" smtClean="0">
-                <a:latin typeface="Segoe UI" panose="020B0502040204020203" pitchFamily="34" charset="0"/>
-                <a:cs typeface="Segoe UI" panose="020B0502040204020203" pitchFamily="34" charset="0"/>
-              </a:rPr>
-              <a:t>2010:  </a:t>
-            </a:r>
-            <a:r>
-              <a:rPr lang="es-ES" sz="2000" dirty="0">
-                <a:latin typeface="Segoe UI" panose="020B0502040204020203" pitchFamily="34" charset="0"/>
-                <a:cs typeface="Segoe UI" panose="020B0502040204020203" pitchFamily="34" charset="0"/>
-              </a:rPr>
-              <a:t>Google detectó que había sido víctima de un ataque desde China, que robó información de su propiedad intelectual. El ataque logró entrar a correos de un grupo de activistas chinos, así como también empresas financieras, tecnológicas, tecnológicas, y medios y químicos.</a:t>
-            </a:r>
-          </a:p>
-          <a:p>
-            <a:r>
-              <a:rPr lang="es-ES" sz="2000" dirty="0" smtClean="0">
-                <a:latin typeface="Segoe UI" panose="020B0502040204020203" pitchFamily="34" charset="0"/>
-                <a:cs typeface="Segoe UI" panose="020B0502040204020203" pitchFamily="34" charset="0"/>
-              </a:rPr>
-              <a:t>2014: </a:t>
-            </a:r>
-            <a:r>
-              <a:rPr lang="es-AR" sz="2000" dirty="0" smtClean="0">
-                <a:latin typeface="Segoe UI" panose="020B0502040204020203" pitchFamily="34" charset="0"/>
-                <a:cs typeface="Segoe UI" panose="020B0502040204020203" pitchFamily="34" charset="0"/>
-              </a:rPr>
-              <a:t>Edward </a:t>
-            </a:r>
-            <a:r>
-              <a:rPr lang="es-AR" sz="2000" dirty="0" err="1" smtClean="0">
-                <a:latin typeface="Segoe UI" panose="020B0502040204020203" pitchFamily="34" charset="0"/>
-                <a:cs typeface="Segoe UI" panose="020B0502040204020203" pitchFamily="34" charset="0"/>
-              </a:rPr>
-              <a:t>Snowden</a:t>
-            </a:r>
-            <a:r>
-              <a:rPr lang="es-AR" sz="2000" dirty="0" smtClean="0">
-                <a:latin typeface="Segoe UI" panose="020B0502040204020203" pitchFamily="34" charset="0"/>
-                <a:cs typeface="Segoe UI" panose="020B0502040204020203" pitchFamily="34" charset="0"/>
-              </a:rPr>
-              <a:t> revela cómo la Casa Blanca y sus organismos espían las comunicaciones en Internet. </a:t>
-            </a:r>
-            <a:r>
-              <a:rPr lang="es-AR" sz="2000" dirty="0" err="1" smtClean="0">
-                <a:latin typeface="Segoe UI" panose="020B0502040204020203" pitchFamily="34" charset="0"/>
-                <a:cs typeface="Segoe UI" panose="020B0502040204020203" pitchFamily="34" charset="0"/>
-              </a:rPr>
-              <a:t>Snowden</a:t>
-            </a:r>
-            <a:r>
-              <a:rPr lang="es-AR" sz="2000" dirty="0">
-                <a:latin typeface="Segoe UI" panose="020B0502040204020203" pitchFamily="34" charset="0"/>
-                <a:cs typeface="Segoe UI" panose="020B0502040204020203" pitchFamily="34" charset="0"/>
-              </a:rPr>
-              <a:t>, asilado político en Rusia, filtró documentos sobre las prácticas de espionaje del Gobierno empleando unidades de memoria USB (“</a:t>
-            </a:r>
-            <a:r>
-              <a:rPr lang="es-AR" sz="2000" dirty="0" err="1">
-                <a:latin typeface="Segoe UI" panose="020B0502040204020203" pitchFamily="34" charset="0"/>
-                <a:cs typeface="Segoe UI" panose="020B0502040204020203" pitchFamily="34" charset="0"/>
-              </a:rPr>
-              <a:t>pendrives</a:t>
-            </a:r>
-            <a:r>
-              <a:rPr lang="es-AR" sz="2000" dirty="0" smtClean="0">
-                <a:latin typeface="Segoe UI" panose="020B0502040204020203" pitchFamily="34" charset="0"/>
-                <a:cs typeface="Segoe UI" panose="020B0502040204020203" pitchFamily="34" charset="0"/>
-              </a:rPr>
-              <a:t>”).</a:t>
-            </a:r>
-            <a:endParaRPr lang="en-US" sz="2000" dirty="0">
-              <a:latin typeface="Segoe UI" panose="020B0502040204020203" pitchFamily="34" charset="0"/>
-              <a:cs typeface="Segoe UI" panose="020B0502040204020203" pitchFamily="34" charset="0"/>
-            </a:endParaRPr>
-          </a:p>
         </p:txBody>
       </p:sp>
     </p:spTree>
     <p:extLst>
       <p:ext uri="{BB962C8B-B14F-4D97-AF65-F5344CB8AC3E}">
-        <p14:creationId xmlns:p14="http://schemas.microsoft.com/office/powerpoint/2010/main" val="659291744"/>
+        <p14:creationId xmlns:p14="http://schemas.microsoft.com/office/powerpoint/2010/main" xmlns="" val="2283345473"/>
       </p:ext>
     </p:extLst>
   </p:cSld>
   <p:clrMapOvr>
     <a:masterClrMapping/>
   </p:clrMapOvr>
-  <mc:AlternateContent xmlns:mc="http://schemas.openxmlformats.org/markup-compatibility/2006" xmlns:p14="http://schemas.microsoft.com/office/powerpoint/2010/main">
-    <mc:Choice Requires="p14">
+  <mc:AlternateContent xmlns:mc="http://schemas.openxmlformats.org/markup-compatibility/2006">
+    <mc:Choice xmlns:p14="http://schemas.microsoft.com/office/powerpoint/2010/main" xmlns="" Requires="p14">
       <p:transition spd="med" p14:dur="700">
         <p:fade/>
       </p:transition>
     </mc:Choice>
-    <mc:Fallback xmlns="">
+    <mc:Fallback>
       <p:transition spd="med">
         <p:fade/>
       </p:transition>
@@ -12026,7 +12284,7 @@
       </p:grpSpPr>
       <p:sp>
         <p:nvSpPr>
-          <p:cNvPr id="2" name="Title 1"/>
+          <p:cNvPr id="13" name="Title 12"/>
           <p:cNvSpPr>
             <a:spLocks noGrp="1"/>
           </p:cNvSpPr>
@@ -12040,36 +12298,105 @@
           <a:lstStyle/>
           <a:p>
             <a:r>
-              <a:rPr lang="es-AR" dirty="0" smtClean="0">
-                <a:latin typeface="Segoe UI" panose="020B0502040204020203" pitchFamily="34" charset="0"/>
-                <a:cs typeface="Segoe UI" panose="020B0502040204020203" pitchFamily="34" charset="0"/>
-              </a:rPr>
-              <a:t>Conclusiones</a:t>
-            </a:r>
-            <a:endParaRPr lang="es-AR" dirty="0">
+              <a:rPr lang="es-AR" spc="0" dirty="0" smtClean="0">
+                <a:ln w="0"/>
+                <a:solidFill>
+                  <a:schemeClr val="accent1"/>
+                </a:solidFill>
+                <a:effectLst>
+                  <a:outerShdw blurRad="38100" dist="25400" dir="5400000" algn="ctr" rotWithShape="0">
+                    <a:srgbClr val="6E747A">
+                      <a:alpha val="43000"/>
+                    </a:srgbClr>
+                  </a:outerShdw>
+                </a:effectLst>
+                <a:latin typeface="Segoe UI" panose="020B0502040204020203" pitchFamily="34" charset="0"/>
+                <a:cs typeface="Segoe UI" panose="020B0502040204020203" pitchFamily="34" charset="0"/>
+              </a:rPr>
+              <a:t>Siglo XXI – Casos reales  (I)</a:t>
+            </a:r>
+            <a:endParaRPr lang="es-AR" spc="0" dirty="0">
+              <a:ln w="0"/>
+              <a:solidFill>
+                <a:schemeClr val="accent1"/>
+              </a:solidFill>
+              <a:effectLst>
+                <a:outerShdw blurRad="38100" dist="25400" dir="5400000" algn="ctr" rotWithShape="0">
+                  <a:srgbClr val="6E747A">
+                    <a:alpha val="43000"/>
+                  </a:srgbClr>
+                </a:outerShdw>
+              </a:effectLst>
               <a:latin typeface="Segoe UI" panose="020B0502040204020203" pitchFamily="34" charset="0"/>
               <a:cs typeface="Segoe UI" panose="020B0502040204020203" pitchFamily="34" charset="0"/>
             </a:endParaRPr>
           </a:p>
         </p:txBody>
       </p:sp>
+      <p:sp>
+        <p:nvSpPr>
+          <p:cNvPr id="2" name="Content Placeholder 1"/>
+          <p:cNvSpPr>
+            <a:spLocks noGrp="1"/>
+          </p:cNvSpPr>
+          <p:nvPr>
+            <p:ph idx="1"/>
+          </p:nvPr>
+        </p:nvSpPr>
+        <p:spPr>
+          <a:xfrm>
+            <a:off x="1522413" y="2276872"/>
+            <a:ext cx="9134391" cy="3742928"/>
+          </a:xfrm>
+        </p:spPr>
+        <p:txBody>
+          <a:bodyPr>
+            <a:noAutofit/>
+          </a:bodyPr>
+          <a:lstStyle/>
+          <a:p>
+            <a:r>
+              <a:rPr lang="es-ES" dirty="0" smtClean="0">
+                <a:latin typeface="Segoe UI" panose="020B0502040204020203" pitchFamily="34" charset="0"/>
+                <a:cs typeface="Segoe UI" panose="020B0502040204020203" pitchFamily="34" charset="0"/>
+              </a:rPr>
+              <a:t>2001: espionaje industrial de la década: implicó a dos empresas rivales en bienes de consumo, “Unilever” y “Procter &amp; Gamble”.</a:t>
+            </a:r>
+          </a:p>
+          <a:p>
+            <a:endParaRPr lang="es-ES" dirty="0" smtClean="0">
+              <a:latin typeface="Segoe UI" panose="020B0502040204020203" pitchFamily="34" charset="0"/>
+              <a:cs typeface="Segoe UI" panose="020B0502040204020203" pitchFamily="34" charset="0"/>
+            </a:endParaRPr>
+          </a:p>
+          <a:p>
+            <a:r>
+              <a:rPr lang="es-AR" dirty="0" smtClean="0">
+                <a:latin typeface="Segoe UI" panose="020B0502040204020203" pitchFamily="34" charset="0"/>
+                <a:cs typeface="Segoe UI" panose="020B0502040204020203" pitchFamily="34" charset="0"/>
+              </a:rPr>
+              <a:t>2002: Este caso muestra como el espionaje industrial puede convertirse en un problema de seguridad nacional. La compañía sueca Ericsson se vio envuelta por sorpresa en un incidente diplomático.</a:t>
+            </a:r>
+          </a:p>
+        </p:txBody>
+      </p:sp>
     </p:spTree>
     <p:extLst>
       <p:ext uri="{BB962C8B-B14F-4D97-AF65-F5344CB8AC3E}">
-        <p14:creationId xmlns:p14="http://schemas.microsoft.com/office/powerpoint/2010/main" val="1539601608"/>
+        <p14:creationId xmlns:p14="http://schemas.microsoft.com/office/powerpoint/2010/main" xmlns="" val="659291744"/>
       </p:ext>
     </p:extLst>
   </p:cSld>
   <p:clrMapOvr>
     <a:masterClrMapping/>
   </p:clrMapOvr>
-  <mc:AlternateContent xmlns:mc="http://schemas.openxmlformats.org/markup-compatibility/2006" xmlns:p14="http://schemas.microsoft.com/office/powerpoint/2010/main">
-    <mc:Choice Requires="p14">
+  <mc:AlternateContent xmlns:mc="http://schemas.openxmlformats.org/markup-compatibility/2006">
+    <mc:Choice xmlns:p14="http://schemas.microsoft.com/office/powerpoint/2010/main" xmlns="" Requires="p14">
       <p:transition spd="med" p14:dur="700">
         <p:fade/>
       </p:transition>
     </mc:Choice>
-    <mc:Fallback xmlns="">
+    <mc:Fallback>
       <p:transition spd="med">
         <p:fade/>
       </p:transition>
@@ -12104,7 +12431,7 @@
       </p:grpSpPr>
       <p:sp>
         <p:nvSpPr>
-          <p:cNvPr id="2" name="Title 1"/>
+          <p:cNvPr id="13" name="Title 12"/>
           <p:cNvSpPr>
             <a:spLocks noGrp="1"/>
           </p:cNvSpPr>
@@ -12118,37 +12445,33 @@
           <a:lstStyle/>
           <a:p>
             <a:r>
-              <a:rPr lang="es-AR" b="1" spc="0" dirty="0" smtClean="0">
-                <a:ln w="9525">
-                  <a:solidFill>
-                    <a:schemeClr val="bg1"/>
-                  </a:solidFill>
-                  <a:prstDash val="solid"/>
-                </a:ln>
+              <a:rPr lang="es-AR" spc="0" dirty="0" smtClean="0">
+                <a:ln w="0"/>
+                <a:solidFill>
+                  <a:schemeClr val="accent1"/>
+                </a:solidFill>
                 <a:effectLst>
-                  <a:outerShdw blurRad="12700" dist="38100" dir="2700000" algn="tl" rotWithShape="0">
-                    <a:schemeClr val="bg1">
-                      <a:lumMod val="50000"/>
-                    </a:schemeClr>
+                  <a:outerShdw blurRad="38100" dist="25400" dir="5400000" algn="ctr" rotWithShape="0">
+                    <a:srgbClr val="6E747A">
+                      <a:alpha val="43000"/>
+                    </a:srgbClr>
                   </a:outerShdw>
                 </a:effectLst>
                 <a:latin typeface="Segoe UI" panose="020B0502040204020203" pitchFamily="34" charset="0"/>
                 <a:cs typeface="Segoe UI" panose="020B0502040204020203" pitchFamily="34" charset="0"/>
               </a:rPr>
-              <a:t>Conclusiones</a:t>
-            </a:r>
-            <a:endParaRPr lang="es-AR" b="1" spc="0" dirty="0">
-              <a:ln w="9525">
-                <a:solidFill>
-                  <a:schemeClr val="bg1"/>
-                </a:solidFill>
-                <a:prstDash val="solid"/>
-              </a:ln>
+              <a:t>Siglo XXI – Casos reales  (II)</a:t>
+            </a:r>
+            <a:endParaRPr lang="es-AR" spc="0" dirty="0">
+              <a:ln w="0"/>
+              <a:solidFill>
+                <a:schemeClr val="accent1"/>
+              </a:solidFill>
               <a:effectLst>
-                <a:outerShdw blurRad="12700" dist="38100" dir="2700000" algn="tl" rotWithShape="0">
-                  <a:schemeClr val="bg1">
-                    <a:lumMod val="50000"/>
-                  </a:schemeClr>
+                <a:outerShdw blurRad="38100" dist="25400" dir="5400000" algn="ctr" rotWithShape="0">
+                  <a:srgbClr val="6E747A">
+                    <a:alpha val="43000"/>
+                  </a:srgbClr>
                 </a:outerShdw>
               </a:effectLst>
               <a:latin typeface="Segoe UI" panose="020B0502040204020203" pitchFamily="34" charset="0"/>
@@ -12159,7 +12482,7 @@
       </p:sp>
       <p:sp>
         <p:nvSpPr>
-          <p:cNvPr id="3" name="Content Placeholder 2"/>
+          <p:cNvPr id="2" name="Content Placeholder 1"/>
           <p:cNvSpPr>
             <a:spLocks noGrp="1"/>
           </p:cNvSpPr>
@@ -12167,76 +12490,158 @@
             <p:ph idx="1"/>
           </p:nvPr>
         </p:nvSpPr>
-        <p:spPr/>
+        <p:spPr>
+          <a:xfrm>
+            <a:off x="1522413" y="2276872"/>
+            <a:ext cx="9134391" cy="3742928"/>
+          </a:xfrm>
+        </p:spPr>
         <p:txBody>
           <a:bodyPr>
-            <a:normAutofit lnSpcReduction="10000"/>
+            <a:noAutofit/>
           </a:bodyPr>
           <a:lstStyle/>
           <a:p>
-            <a:pPr marL="342900" indent="-342900">
-              <a:lnSpc>
-                <a:spcPct val="150000"/>
-              </a:lnSpc>
-            </a:pPr>
             <a:r>
               <a:rPr lang="es-AR" dirty="0" smtClean="0">
                 <a:latin typeface="Segoe UI" panose="020B0502040204020203" pitchFamily="34" charset="0"/>
                 <a:cs typeface="Segoe UI" panose="020B0502040204020203" pitchFamily="34" charset="0"/>
               </a:rPr>
-              <a:t>La amenaza más grande para las organizaciones probablemente no sean los ataques de terceros, ni los empleados maliciosos, sino los empleados descuidados que de forma inintencionada divulgan información sensible</a:t>
-            </a:r>
-          </a:p>
-          <a:p>
-            <a:pPr marL="342900" indent="-342900">
-              <a:lnSpc>
-                <a:spcPct val="150000"/>
-              </a:lnSpc>
-            </a:pPr>
+              <a:t>2004: se descubrió el primer caso de violación a la ley HIPAA (</a:t>
+            </a:r>
+            <a:r>
+              <a:rPr lang="es-AR" dirty="0" err="1" smtClean="0">
+                <a:latin typeface="Segoe UI" panose="020B0502040204020203" pitchFamily="34" charset="0"/>
+                <a:cs typeface="Segoe UI" panose="020B0502040204020203" pitchFamily="34" charset="0"/>
+              </a:rPr>
+              <a:t>Health</a:t>
+            </a:r>
             <a:r>
               <a:rPr lang="es-AR" dirty="0" smtClean="0">
                 <a:latin typeface="Segoe UI" panose="020B0502040204020203" pitchFamily="34" charset="0"/>
                 <a:cs typeface="Segoe UI" panose="020B0502040204020203" pitchFamily="34" charset="0"/>
               </a:rPr>
-              <a:t>Una combinación de protección tecnológica, políticas y procedimientos actualizados, y educación de los usuarios deberían contribuir a paliar los efectos que causan estas fugas</a:t>
-            </a:r>
-          </a:p>
-          <a:p>
-            <a:pPr>
-              <a:lnSpc>
-                <a:spcPct val="150000"/>
-              </a:lnSpc>
-            </a:pPr>
+              <a:t> </a:t>
+            </a:r>
+            <a:r>
+              <a:rPr lang="es-AR" dirty="0" err="1" smtClean="0">
+                <a:latin typeface="Segoe UI" panose="020B0502040204020203" pitchFamily="34" charset="0"/>
+                <a:cs typeface="Segoe UI" panose="020B0502040204020203" pitchFamily="34" charset="0"/>
+              </a:rPr>
+              <a:t>Insurance</a:t>
+            </a:r>
+            <a:r>
+              <a:rPr lang="es-AR" dirty="0" smtClean="0">
+                <a:latin typeface="Segoe UI" panose="020B0502040204020203" pitchFamily="34" charset="0"/>
+                <a:cs typeface="Segoe UI" panose="020B0502040204020203" pitchFamily="34" charset="0"/>
+              </a:rPr>
+              <a:t> </a:t>
+            </a:r>
+            <a:r>
+              <a:rPr lang="es-AR" dirty="0" err="1" smtClean="0">
+                <a:latin typeface="Segoe UI" panose="020B0502040204020203" pitchFamily="34" charset="0"/>
+                <a:cs typeface="Segoe UI" panose="020B0502040204020203" pitchFamily="34" charset="0"/>
+              </a:rPr>
+              <a:t>Portability</a:t>
+            </a:r>
+            <a:r>
+              <a:rPr lang="es-AR" dirty="0" smtClean="0">
+                <a:latin typeface="Segoe UI" panose="020B0502040204020203" pitchFamily="34" charset="0"/>
+                <a:cs typeface="Segoe UI" panose="020B0502040204020203" pitchFamily="34" charset="0"/>
+              </a:rPr>
+              <a:t> and </a:t>
+            </a:r>
+            <a:r>
+              <a:rPr lang="es-AR" dirty="0" err="1" smtClean="0">
+                <a:latin typeface="Segoe UI" panose="020B0502040204020203" pitchFamily="34" charset="0"/>
+                <a:cs typeface="Segoe UI" panose="020B0502040204020203" pitchFamily="34" charset="0"/>
+              </a:rPr>
+              <a:t>Accountability</a:t>
+            </a:r>
+            <a:r>
+              <a:rPr lang="es-AR" dirty="0" smtClean="0">
+                <a:latin typeface="Segoe UI" panose="020B0502040204020203" pitchFamily="34" charset="0"/>
+                <a:cs typeface="Segoe UI" panose="020B0502040204020203" pitchFamily="34" charset="0"/>
+              </a:rPr>
+              <a:t> </a:t>
+            </a:r>
+            <a:r>
+              <a:rPr lang="es-AR" dirty="0" err="1" smtClean="0">
+                <a:latin typeface="Segoe UI" panose="020B0502040204020203" pitchFamily="34" charset="0"/>
+                <a:cs typeface="Segoe UI" panose="020B0502040204020203" pitchFamily="34" charset="0"/>
+              </a:rPr>
+              <a:t>Act</a:t>
+            </a:r>
+            <a:r>
+              <a:rPr lang="es-AR" dirty="0" smtClean="0">
+                <a:latin typeface="Segoe UI" panose="020B0502040204020203" pitchFamily="34" charset="0"/>
+                <a:cs typeface="Segoe UI" panose="020B0502040204020203" pitchFamily="34" charset="0"/>
+              </a:rPr>
+              <a:t>), cuando un empleado de una asociación de enfermos de cáncer utilizó información de pacientes para obtener tarjetas de crédito.</a:t>
+            </a:r>
+          </a:p>
+          <a:p>
             <a:endParaRPr lang="es-AR" dirty="0" smtClean="0">
               <a:latin typeface="Segoe UI" panose="020B0502040204020203" pitchFamily="34" charset="0"/>
               <a:cs typeface="Segoe UI" panose="020B0502040204020203" pitchFamily="34" charset="0"/>
             </a:endParaRPr>
           </a:p>
           <a:p>
-            <a:endParaRPr lang="es-AR" dirty="0">
-              <a:latin typeface="Segoe UI" panose="020B0502040204020203" pitchFamily="34" charset="0"/>
-              <a:cs typeface="Segoe UI" panose="020B0502040204020203" pitchFamily="34" charset="0"/>
-            </a:endParaRPr>
+            <a:r>
+              <a:rPr lang="es-AR" dirty="0" smtClean="0">
+                <a:latin typeface="Segoe UI" panose="020B0502040204020203" pitchFamily="34" charset="0"/>
+                <a:cs typeface="Segoe UI" panose="020B0502040204020203" pitchFamily="34" charset="0"/>
+              </a:rPr>
+              <a:t>2005: empleados de un hospital fueron descubiertos mientras obtenían información de la internación por maternidad de la cantante pop </a:t>
+            </a:r>
+            <a:r>
+              <a:rPr lang="es-AR" dirty="0" err="1" smtClean="0">
+                <a:latin typeface="Segoe UI" panose="020B0502040204020203" pitchFamily="34" charset="0"/>
+                <a:cs typeface="Segoe UI" panose="020B0502040204020203" pitchFamily="34" charset="0"/>
+              </a:rPr>
+              <a:t>Britney</a:t>
+            </a:r>
+            <a:r>
+              <a:rPr lang="es-AR" dirty="0" smtClean="0">
+                <a:latin typeface="Segoe UI" panose="020B0502040204020203" pitchFamily="34" charset="0"/>
+                <a:cs typeface="Segoe UI" panose="020B0502040204020203" pitchFamily="34" charset="0"/>
+              </a:rPr>
+              <a:t> </a:t>
+            </a:r>
+            <a:r>
+              <a:rPr lang="es-AR" dirty="0" err="1" smtClean="0">
+                <a:latin typeface="Segoe UI" panose="020B0502040204020203" pitchFamily="34" charset="0"/>
+                <a:cs typeface="Segoe UI" panose="020B0502040204020203" pitchFamily="34" charset="0"/>
+              </a:rPr>
+              <a:t>Spears</a:t>
+            </a:r>
+            <a:r>
+              <a:rPr lang="es-AR" dirty="0" smtClean="0">
+                <a:latin typeface="Segoe UI" panose="020B0502040204020203" pitchFamily="34" charset="0"/>
+                <a:cs typeface="Segoe UI" panose="020B0502040204020203" pitchFamily="34" charset="0"/>
+              </a:rPr>
+              <a:t>.</a:t>
+            </a:r>
           </a:p>
         </p:txBody>
       </p:sp>
     </p:spTree>
     <p:extLst>
       <p:ext uri="{BB962C8B-B14F-4D97-AF65-F5344CB8AC3E}">
-        <p14:creationId xmlns:p14="http://schemas.microsoft.com/office/powerpoint/2010/main" val="3280227416"/>
+        <p14:creationId xmlns:p14="http://schemas.microsoft.com/office/powerpoint/2010/main" xmlns="" val="659291744"/>
       </p:ext>
     </p:extLst>
   </p:cSld>
   <p:clrMapOvr>
     <a:masterClrMapping/>
   </p:clrMapOvr>
-  <mc:AlternateContent xmlns:mc="http://schemas.openxmlformats.org/markup-compatibility/2006" xmlns:p14="http://schemas.microsoft.com/office/powerpoint/2010/main">
-    <mc:Choice Requires="p14">
+  <mc:AlternateContent xmlns:mc="http://schemas.openxmlformats.org/markup-compatibility/2006">
+    <mc:Choice xmlns:p14="http://schemas.microsoft.com/office/powerpoint/2010/main" xmlns="" Requires="p14">
       <p:transition spd="med" p14:dur="700">
         <p:fade/>
       </p:transition>
     </mc:Choice>
-    <mc:Fallback xmlns="">
+    <mc:Fallback>
       <p:transition spd="med">
         <p:fade/>
       </p:transition>
@@ -12271,7 +12676,7 @@
       </p:grpSpPr>
       <p:sp>
         <p:nvSpPr>
-          <p:cNvPr id="2" name="Title 1"/>
+          <p:cNvPr id="13" name="Title 12"/>
           <p:cNvSpPr>
             <a:spLocks noGrp="1"/>
           </p:cNvSpPr>
@@ -12285,37 +12690,33 @@
           <a:lstStyle/>
           <a:p>
             <a:r>
-              <a:rPr lang="es-AR" b="1" spc="0" dirty="0" smtClean="0">
-                <a:ln w="9525">
-                  <a:solidFill>
-                    <a:schemeClr val="bg1"/>
-                  </a:solidFill>
-                  <a:prstDash val="solid"/>
-                </a:ln>
+              <a:rPr lang="es-AR" spc="0" dirty="0" smtClean="0">
+                <a:ln w="0"/>
+                <a:solidFill>
+                  <a:schemeClr val="accent1"/>
+                </a:solidFill>
                 <a:effectLst>
-                  <a:outerShdw blurRad="12700" dist="38100" dir="2700000" algn="tl" rotWithShape="0">
-                    <a:schemeClr val="bg1">
-                      <a:lumMod val="50000"/>
-                    </a:schemeClr>
+                  <a:outerShdw blurRad="38100" dist="25400" dir="5400000" algn="ctr" rotWithShape="0">
+                    <a:srgbClr val="6E747A">
+                      <a:alpha val="43000"/>
+                    </a:srgbClr>
                   </a:outerShdw>
                 </a:effectLst>
                 <a:latin typeface="Segoe UI" panose="020B0502040204020203" pitchFamily="34" charset="0"/>
                 <a:cs typeface="Segoe UI" panose="020B0502040204020203" pitchFamily="34" charset="0"/>
               </a:rPr>
-              <a:t>Conclusiones (cont.)</a:t>
-            </a:r>
-            <a:endParaRPr lang="es-AR" b="1" spc="0" dirty="0">
-              <a:ln w="9525">
-                <a:solidFill>
-                  <a:schemeClr val="bg1"/>
-                </a:solidFill>
-                <a:prstDash val="solid"/>
-              </a:ln>
+              <a:t>Siglo XXI – Casos reales  (III)</a:t>
+            </a:r>
+            <a:endParaRPr lang="es-AR" spc="0" dirty="0">
+              <a:ln w="0"/>
+              <a:solidFill>
+                <a:schemeClr val="accent1"/>
+              </a:solidFill>
               <a:effectLst>
-                <a:outerShdw blurRad="12700" dist="38100" dir="2700000" algn="tl" rotWithShape="0">
-                  <a:schemeClr val="bg1">
-                    <a:lumMod val="50000"/>
-                  </a:schemeClr>
+                <a:outerShdw blurRad="38100" dist="25400" dir="5400000" algn="ctr" rotWithShape="0">
+                  <a:srgbClr val="6E747A">
+                    <a:alpha val="43000"/>
+                  </a:srgbClr>
                 </a:outerShdw>
               </a:effectLst>
               <a:latin typeface="Segoe UI" panose="020B0502040204020203" pitchFamily="34" charset="0"/>
@@ -12326,7 +12727,7 @@
       </p:sp>
       <p:sp>
         <p:nvSpPr>
-          <p:cNvPr id="3" name="Content Placeholder 2"/>
+          <p:cNvPr id="2" name="Content Placeholder 1"/>
           <p:cNvSpPr>
             <a:spLocks noGrp="1"/>
           </p:cNvSpPr>
@@ -12334,150 +12735,80 @@
             <p:ph idx="1"/>
           </p:nvPr>
         </p:nvSpPr>
-        <p:spPr/>
+        <p:spPr>
+          <a:xfrm>
+            <a:off x="1522413" y="2276872"/>
+            <a:ext cx="9134391" cy="3742928"/>
+          </a:xfrm>
+        </p:spPr>
         <p:txBody>
           <a:bodyPr>
-            <a:normAutofit fontScale="77500" lnSpcReduction="20000"/>
+            <a:noAutofit/>
           </a:bodyPr>
           <a:lstStyle/>
           <a:p>
-            <a:pPr marL="342900" indent="-342900">
-              <a:lnSpc>
-                <a:spcPct val="150000"/>
-              </a:lnSpc>
-            </a:pPr>
-            <a:r>
-              <a:rPr lang="es-AR" dirty="0">
-                <a:latin typeface="Segoe UI" panose="020B0502040204020203" pitchFamily="34" charset="0"/>
-                <a:cs typeface="Segoe UI" panose="020B0502040204020203" pitchFamily="34" charset="0"/>
-              </a:rPr>
-              <a:t>Procedimiento básico para desarrollar una estrategia de protección: </a:t>
-            </a:r>
-          </a:p>
-          <a:p>
-            <a:pPr marL="800100" lvl="1" indent="-342900">
-              <a:lnSpc>
-                <a:spcPct val="150000"/>
-              </a:lnSpc>
-              <a:buFont typeface="Wingdings" panose="05000000000000000000" pitchFamily="2" charset="2"/>
-              <a:buChar char="ü"/>
-            </a:pPr>
-            <a:r>
-              <a:rPr lang="es-AR" sz="2400" dirty="0">
-                <a:latin typeface="Segoe UI" panose="020B0502040204020203" pitchFamily="34" charset="0"/>
-                <a:cs typeface="Segoe UI" panose="020B0502040204020203" pitchFamily="34" charset="0"/>
-              </a:rPr>
-              <a:t>Clasificar la información a proteger</a:t>
-            </a:r>
-          </a:p>
-          <a:p>
-            <a:pPr marL="800100" lvl="1" indent="-342900">
-              <a:lnSpc>
-                <a:spcPct val="150000"/>
-              </a:lnSpc>
-              <a:buFont typeface="Wingdings" panose="05000000000000000000" pitchFamily="2" charset="2"/>
-              <a:buChar char="ü"/>
-            </a:pPr>
-            <a:r>
-              <a:rPr lang="es-AR" sz="2400" dirty="0">
-                <a:latin typeface="Segoe UI" panose="020B0502040204020203" pitchFamily="34" charset="0"/>
-                <a:cs typeface="Segoe UI" panose="020B0502040204020203" pitchFamily="34" charset="0"/>
-              </a:rPr>
-              <a:t>Entender los datos que se manejan </a:t>
-            </a:r>
-          </a:p>
-          <a:p>
-            <a:pPr marL="800100" lvl="1" indent="-342900">
-              <a:lnSpc>
-                <a:spcPct val="150000"/>
-              </a:lnSpc>
-              <a:buFont typeface="Wingdings" panose="05000000000000000000" pitchFamily="2" charset="2"/>
-              <a:buChar char="ü"/>
-            </a:pPr>
-            <a:r>
-              <a:rPr lang="es-AR" sz="2400" dirty="0">
-                <a:latin typeface="Segoe UI" panose="020B0502040204020203" pitchFamily="34" charset="0"/>
-                <a:cs typeface="Segoe UI" panose="020B0502040204020203" pitchFamily="34" charset="0"/>
-              </a:rPr>
-              <a:t>Establecer políticas sobre el manejo de la información</a:t>
-            </a:r>
-          </a:p>
-          <a:p>
-            <a:pPr marL="800100" lvl="1" indent="-342900">
-              <a:lnSpc>
-                <a:spcPct val="150000"/>
-              </a:lnSpc>
-              <a:buFont typeface="Wingdings" panose="05000000000000000000" pitchFamily="2" charset="2"/>
-              <a:buChar char="ü"/>
-            </a:pPr>
-            <a:r>
-              <a:rPr lang="es-AR" sz="2400" dirty="0">
-                <a:latin typeface="Segoe UI" panose="020B0502040204020203" pitchFamily="34" charset="0"/>
-                <a:cs typeface="Segoe UI" panose="020B0502040204020203" pitchFamily="34" charset="0"/>
-              </a:rPr>
-              <a:t>Capacitar al personal en las herramientas </a:t>
-            </a:r>
-          </a:p>
-          <a:p>
-            <a:pPr marL="800100" lvl="1" indent="-342900">
-              <a:lnSpc>
-                <a:spcPct val="150000"/>
-              </a:lnSpc>
-              <a:buFont typeface="Wingdings" panose="05000000000000000000" pitchFamily="2" charset="2"/>
-              <a:buChar char="ü"/>
-            </a:pPr>
-            <a:r>
-              <a:rPr lang="es-AR" sz="2400" dirty="0">
-                <a:latin typeface="Segoe UI" panose="020B0502040204020203" pitchFamily="34" charset="0"/>
-                <a:cs typeface="Segoe UI" panose="020B0502040204020203" pitchFamily="34" charset="0"/>
-              </a:rPr>
-              <a:t>Implementar seguridad a nivel físico</a:t>
-            </a:r>
-          </a:p>
-          <a:p>
-            <a:pPr marL="342900" indent="-342900">
-              <a:lnSpc>
-                <a:spcPct val="150000"/>
-              </a:lnSpc>
-            </a:pPr>
-            <a:r>
-              <a:rPr lang="es-AR" dirty="0">
-                <a:latin typeface="Segoe UI" panose="020B0502040204020203" pitchFamily="34" charset="0"/>
-                <a:cs typeface="Segoe UI" panose="020B0502040204020203" pitchFamily="34" charset="0"/>
-              </a:rPr>
-              <a:t>No debe olvidarse de ejecutar revisiones periódicas, para mantener las políticas actualizadas y en conformidad con los requisitos y las tendencias </a:t>
-            </a:r>
-            <a:r>
-              <a:rPr lang="es-AR" dirty="0" smtClean="0">
-                <a:latin typeface="Segoe UI" panose="020B0502040204020203" pitchFamily="34" charset="0"/>
-                <a:cs typeface="Segoe UI" panose="020B0502040204020203" pitchFamily="34" charset="0"/>
-              </a:rPr>
-              <a:t>tecnológicas </a:t>
-            </a:r>
-            <a:endParaRPr lang="es-AR" dirty="0">
+            <a:r>
+              <a:rPr lang="es-ES" dirty="0" smtClean="0">
+                <a:latin typeface="Segoe UI" panose="020B0502040204020203" pitchFamily="34" charset="0"/>
+                <a:cs typeface="Segoe UI" panose="020B0502040204020203" pitchFamily="34" charset="0"/>
+              </a:rPr>
+              <a:t>2005: se produjo la fuga de información confidencial sobre centrales nucleares en Japón, a través de Internet desde un ordenador infectado por un virus.</a:t>
+            </a:r>
+          </a:p>
+          <a:p>
+            <a:endParaRPr lang="es-AR" dirty="0" smtClean="0">
               <a:latin typeface="Segoe UI" panose="020B0502040204020203" pitchFamily="34" charset="0"/>
               <a:cs typeface="Segoe UI" panose="020B0502040204020203" pitchFamily="34" charset="0"/>
             </a:endParaRPr>
           </a:p>
+          <a:p>
+            <a:r>
+              <a:rPr lang="es-AR" dirty="0" smtClean="0">
+                <a:latin typeface="Segoe UI" panose="020B0502040204020203" pitchFamily="34" charset="0"/>
+                <a:cs typeface="Segoe UI" panose="020B0502040204020203" pitchFamily="34" charset="0"/>
+              </a:rPr>
+              <a:t>2007: el sitio global de búsquedas laborales </a:t>
+            </a:r>
+            <a:r>
+              <a:rPr lang="es-AR" dirty="0" err="1" smtClean="0">
+                <a:latin typeface="Segoe UI" panose="020B0502040204020203" pitchFamily="34" charset="0"/>
+                <a:cs typeface="Segoe UI" panose="020B0502040204020203" pitchFamily="34" charset="0"/>
+              </a:rPr>
+              <a:t>Monster</a:t>
+            </a:r>
+            <a:r>
+              <a:rPr lang="es-AR" dirty="0" smtClean="0">
+                <a:latin typeface="Segoe UI" panose="020B0502040204020203" pitchFamily="34" charset="0"/>
+                <a:cs typeface="Segoe UI" panose="020B0502040204020203" pitchFamily="34" charset="0"/>
+              </a:rPr>
+              <a:t> sufrió el robo de 1,6 millones de datos con información personal de los usuarios registrados. Los atacantes ingresaron a las bases de datos con contraseñas que habían sido obtenidas previamente mediante un troyano.</a:t>
+            </a:r>
+          </a:p>
+          <a:p>
+            <a:endParaRPr lang="es-ES" dirty="0" smtClean="0">
+              <a:latin typeface="Segoe UI" panose="020B0502040204020203" pitchFamily="34" charset="0"/>
+              <a:cs typeface="Segoe UI" panose="020B0502040204020203" pitchFamily="34" charset="0"/>
+            </a:endParaRPr>
+          </a:p>
         </p:txBody>
       </p:sp>
     </p:spTree>
     <p:extLst>
       <p:ext uri="{BB962C8B-B14F-4D97-AF65-F5344CB8AC3E}">
-        <p14:creationId xmlns:p14="http://schemas.microsoft.com/office/powerpoint/2010/main" val="3816537714"/>
+        <p14:creationId xmlns:p14="http://schemas.microsoft.com/office/powerpoint/2010/main" xmlns="" val="659291744"/>
       </p:ext>
     </p:extLst>
   </p:cSld>
   <p:clrMapOvr>
     <a:masterClrMapping/>
   </p:clrMapOvr>
-  <mc:AlternateContent xmlns:mc="http://schemas.openxmlformats.org/markup-compatibility/2006" xmlns:p14="http://schemas.microsoft.com/office/powerpoint/2010/main">
-    <mc:Choice Requires="p14">
+  <mc:AlternateContent xmlns:mc="http://schemas.openxmlformats.org/markup-compatibility/2006">
+    <mc:Choice xmlns:p14="http://schemas.microsoft.com/office/powerpoint/2010/main" xmlns="" Requires="p14">
       <p:transition spd="med" p14:dur="700">
         <p:fade/>
       </p:transition>
     </mc:Choice>
-    <mc:Fallback xmlns="">
+    <mc:Fallback>
       <p:transition spd="med">
         <p:fade/>
       </p:transition>
@@ -12512,7 +12843,7 @@
       </p:grpSpPr>
       <p:sp>
         <p:nvSpPr>
-          <p:cNvPr id="2" name="Title 1"/>
+          <p:cNvPr id="13" name="Title 12"/>
           <p:cNvSpPr>
             <a:spLocks noGrp="1"/>
           </p:cNvSpPr>
@@ -12526,37 +12857,33 @@
           <a:lstStyle/>
           <a:p>
             <a:r>
-              <a:rPr lang="es-AR" b="1" spc="0" dirty="0" smtClean="0">
-                <a:ln w="9525">
-                  <a:solidFill>
-                    <a:schemeClr val="bg1"/>
-                  </a:solidFill>
-                  <a:prstDash val="solid"/>
-                </a:ln>
+              <a:rPr lang="es-AR" spc="0" dirty="0" smtClean="0">
+                <a:ln w="0"/>
+                <a:solidFill>
+                  <a:schemeClr val="accent1"/>
+                </a:solidFill>
                 <a:effectLst>
-                  <a:outerShdw blurRad="12700" dist="38100" dir="2700000" algn="tl" rotWithShape="0">
-                    <a:schemeClr val="bg1">
-                      <a:lumMod val="50000"/>
-                    </a:schemeClr>
+                  <a:outerShdw blurRad="38100" dist="25400" dir="5400000" algn="ctr" rotWithShape="0">
+                    <a:srgbClr val="6E747A">
+                      <a:alpha val="43000"/>
+                    </a:srgbClr>
                   </a:outerShdw>
                 </a:effectLst>
                 <a:latin typeface="Segoe UI" panose="020B0502040204020203" pitchFamily="34" charset="0"/>
                 <a:cs typeface="Segoe UI" panose="020B0502040204020203" pitchFamily="34" charset="0"/>
               </a:rPr>
-              <a:t>Conclusiones (cont.)</a:t>
-            </a:r>
-            <a:endParaRPr lang="es-AR" b="1" spc="0" dirty="0">
-              <a:ln w="9525">
-                <a:solidFill>
-                  <a:schemeClr val="bg1"/>
-                </a:solidFill>
-                <a:prstDash val="solid"/>
-              </a:ln>
+              <a:t>Siglo XXI – Casos reales  (IV)</a:t>
+            </a:r>
+            <a:endParaRPr lang="es-AR" spc="0" dirty="0">
+              <a:ln w="0"/>
+              <a:solidFill>
+                <a:schemeClr val="accent1"/>
+              </a:solidFill>
               <a:effectLst>
-                <a:outerShdw blurRad="12700" dist="38100" dir="2700000" algn="tl" rotWithShape="0">
-                  <a:schemeClr val="bg1">
-                    <a:lumMod val="50000"/>
-                  </a:schemeClr>
+                <a:outerShdw blurRad="38100" dist="25400" dir="5400000" algn="ctr" rotWithShape="0">
+                  <a:srgbClr val="6E747A">
+                    <a:alpha val="43000"/>
+                  </a:srgbClr>
                 </a:outerShdw>
               </a:effectLst>
               <a:latin typeface="Segoe UI" panose="020B0502040204020203" pitchFamily="34" charset="0"/>
@@ -12567,7 +12894,7 @@
       </p:sp>
       <p:sp>
         <p:nvSpPr>
-          <p:cNvPr id="3" name="Content Placeholder 2"/>
+          <p:cNvPr id="2" name="Content Placeholder 1"/>
           <p:cNvSpPr>
             <a:spLocks noGrp="1"/>
           </p:cNvSpPr>
@@ -12575,108 +12902,107 @@
             <p:ph idx="1"/>
           </p:nvPr>
         </p:nvSpPr>
-        <p:spPr/>
+        <p:spPr>
+          <a:xfrm>
+            <a:off x="1522413" y="2276872"/>
+            <a:ext cx="9134391" cy="3742928"/>
+          </a:xfrm>
+        </p:spPr>
         <p:txBody>
           <a:bodyPr>
-            <a:normAutofit/>
+            <a:noAutofit/>
           </a:bodyPr>
           <a:lstStyle/>
           <a:p>
-            <a:pPr marL="342900" indent="-342900"/>
-            <a:r>
-              <a:rPr lang="es-AR" dirty="0">
-                <a:latin typeface="Segoe UI" panose="020B0502040204020203" pitchFamily="34" charset="0"/>
-                <a:cs typeface="Segoe UI" panose="020B0502040204020203" pitchFamily="34" charset="0"/>
-              </a:rPr>
-              <a:t>A pesar de que los ataques maliciosos son una minoría, no deberían ser </a:t>
-            </a:r>
             <a:r>
               <a:rPr lang="es-AR" dirty="0" smtClean="0">
                 <a:latin typeface="Segoe UI" panose="020B0502040204020203" pitchFamily="34" charset="0"/>
                 <a:cs typeface="Segoe UI" panose="020B0502040204020203" pitchFamily="34" charset="0"/>
               </a:rPr>
-              <a:t>ignorados</a:t>
+              <a:t>2009: la red social </a:t>
+            </a:r>
+            <a:r>
+              <a:rPr lang="es-AR" dirty="0" err="1" smtClean="0">
+                <a:latin typeface="Segoe UI" panose="020B0502040204020203" pitchFamily="34" charset="0"/>
+                <a:cs typeface="Segoe UI" panose="020B0502040204020203" pitchFamily="34" charset="0"/>
+              </a:rPr>
+              <a:t>Tuenti</a:t>
+            </a:r>
+            <a:r>
+              <a:rPr lang="es-AR" dirty="0" smtClean="0">
+                <a:latin typeface="Segoe UI" panose="020B0502040204020203" pitchFamily="34" charset="0"/>
+                <a:cs typeface="Segoe UI" panose="020B0502040204020203" pitchFamily="34" charset="0"/>
+              </a:rPr>
+              <a:t> fue afectada por el robo de 4.000 cuentas de usuario y sus contraseñas, por parte de un atacante enojado con la empresa.</a:t>
+            </a:r>
+          </a:p>
+          <a:p>
+            <a:endParaRPr lang="es-AR" dirty="0" smtClean="0">
+              <a:latin typeface="Segoe UI" panose="020B0502040204020203" pitchFamily="34" charset="0"/>
+              <a:cs typeface="Segoe UI" panose="020B0502040204020203" pitchFamily="34" charset="0"/>
+            </a:endParaRPr>
+          </a:p>
+          <a:p>
+            <a:r>
+              <a:rPr lang="es-AR" dirty="0" smtClean="0">
+                <a:latin typeface="Segoe UI" panose="020B0502040204020203" pitchFamily="34" charset="0"/>
+                <a:cs typeface="Segoe UI" panose="020B0502040204020203" pitchFamily="34" charset="0"/>
+              </a:rPr>
+              <a:t>2010:  Google detectó que había sido víctima de un ataque desde China, que robó información de su propiedad intelectual.</a:t>
+            </a:r>
+          </a:p>
+          <a:p>
+            <a:endParaRPr lang="es-AR" dirty="0" smtClean="0">
+              <a:latin typeface="Segoe UI" panose="020B0502040204020203" pitchFamily="34" charset="0"/>
+              <a:cs typeface="Segoe UI" panose="020B0502040204020203" pitchFamily="34" charset="0"/>
+            </a:endParaRPr>
+          </a:p>
+          <a:p>
+            <a:r>
+              <a:rPr lang="es-AR" dirty="0" smtClean="0">
+                <a:latin typeface="Segoe UI" panose="020B0502040204020203" pitchFamily="34" charset="0"/>
+                <a:cs typeface="Segoe UI" panose="020B0502040204020203" pitchFamily="34" charset="0"/>
+              </a:rPr>
+              <a:t>2014: Edward </a:t>
+            </a:r>
+            <a:r>
+              <a:rPr lang="es-AR" dirty="0" err="1" smtClean="0">
+                <a:latin typeface="Segoe UI" panose="020B0502040204020203" pitchFamily="34" charset="0"/>
+                <a:cs typeface="Segoe UI" panose="020B0502040204020203" pitchFamily="34" charset="0"/>
+              </a:rPr>
+              <a:t>Snowden</a:t>
+            </a:r>
+            <a:r>
+              <a:rPr lang="es-AR" dirty="0" smtClean="0">
+                <a:latin typeface="Segoe UI" panose="020B0502040204020203" pitchFamily="34" charset="0"/>
+                <a:cs typeface="Segoe UI" panose="020B0502040204020203" pitchFamily="34" charset="0"/>
+              </a:rPr>
+              <a:t> revela cómo la Casa Blanca y sus organismos espían las comunicaciones en Internet.</a:t>
             </a:r>
             <a:endParaRPr lang="es-AR" dirty="0">
               <a:latin typeface="Segoe UI" panose="020B0502040204020203" pitchFamily="34" charset="0"/>
               <a:cs typeface="Segoe UI" panose="020B0502040204020203" pitchFamily="34" charset="0"/>
             </a:endParaRPr>
           </a:p>
-          <a:p>
-            <a:pPr marL="342900" indent="-342900"/>
-            <a:r>
-              <a:rPr lang="es-AR" dirty="0" smtClean="0">
-                <a:latin typeface="Segoe UI" panose="020B0502040204020203" pitchFamily="34" charset="0"/>
-                <a:cs typeface="Segoe UI" panose="020B0502040204020203" pitchFamily="34" charset="0"/>
-              </a:rPr>
-              <a:t>Existen </a:t>
-            </a:r>
-            <a:r>
-              <a:rPr lang="es-AR" dirty="0">
-                <a:latin typeface="Segoe UI" panose="020B0502040204020203" pitchFamily="34" charset="0"/>
-                <a:cs typeface="Segoe UI" panose="020B0502040204020203" pitchFamily="34" charset="0"/>
-              </a:rPr>
-              <a:t>múltiples vías de escape de información que deben ser </a:t>
-            </a:r>
-            <a:r>
-              <a:rPr lang="es-AR" dirty="0" smtClean="0">
-                <a:latin typeface="Segoe UI" panose="020B0502040204020203" pitchFamily="34" charset="0"/>
-                <a:cs typeface="Segoe UI" panose="020B0502040204020203" pitchFamily="34" charset="0"/>
-              </a:rPr>
-              <a:t>monitoreadas</a:t>
-            </a:r>
-            <a:endParaRPr lang="es-AR" dirty="0">
-              <a:latin typeface="Segoe UI" panose="020B0502040204020203" pitchFamily="34" charset="0"/>
-              <a:cs typeface="Segoe UI" panose="020B0502040204020203" pitchFamily="34" charset="0"/>
-            </a:endParaRPr>
-          </a:p>
-          <a:p>
-            <a:pPr marL="342900" indent="-342900"/>
-            <a:r>
-              <a:rPr lang="es-AR" dirty="0" smtClean="0">
-                <a:latin typeface="Segoe UI" panose="020B0502040204020203" pitchFamily="34" charset="0"/>
-                <a:cs typeface="Segoe UI" panose="020B0502040204020203" pitchFamily="34" charset="0"/>
-              </a:rPr>
-              <a:t>No </a:t>
-            </a:r>
-            <a:r>
-              <a:rPr lang="es-AR" dirty="0">
-                <a:latin typeface="Segoe UI" panose="020B0502040204020203" pitchFamily="34" charset="0"/>
-                <a:cs typeface="Segoe UI" panose="020B0502040204020203" pitchFamily="34" charset="0"/>
-              </a:rPr>
-              <a:t>existen soluciones que protejan los activos intangibles de forma 100% segura, se puede minimizar la probabilidad de que ocurran pérdidas mediante la aplicación de varios métodos </a:t>
-            </a:r>
-            <a:r>
-              <a:rPr lang="es-AR" dirty="0" smtClean="0">
-                <a:latin typeface="Segoe UI" panose="020B0502040204020203" pitchFamily="34" charset="0"/>
-                <a:cs typeface="Segoe UI" panose="020B0502040204020203" pitchFamily="34" charset="0"/>
-              </a:rPr>
-              <a:t>complementarios</a:t>
-            </a:r>
-            <a:endParaRPr lang="es-AR" dirty="0">
-              <a:latin typeface="Segoe UI" panose="020B0502040204020203" pitchFamily="34" charset="0"/>
-              <a:cs typeface="Segoe UI" panose="020B0502040204020203" pitchFamily="34" charset="0"/>
-            </a:endParaRPr>
-          </a:p>
         </p:txBody>
       </p:sp>
     </p:spTree>
     <p:extLst>
       <p:ext uri="{BB962C8B-B14F-4D97-AF65-F5344CB8AC3E}">
-        <p14:creationId xmlns:p14="http://schemas.microsoft.com/office/powerpoint/2010/main" val="2896967631"/>
+        <p14:creationId xmlns:p14="http://schemas.microsoft.com/office/powerpoint/2010/main" xmlns="" val="659291744"/>
       </p:ext>
     </p:extLst>
   </p:cSld>
   <p:clrMapOvr>
     <a:masterClrMapping/>
   </p:clrMapOvr>
-  <mc:AlternateContent xmlns:mc="http://schemas.openxmlformats.org/markup-compatibility/2006" xmlns:p14="http://schemas.microsoft.com/office/powerpoint/2010/main">
-    <mc:Choice Requires="p14">
+  <mc:AlternateContent xmlns:mc="http://schemas.openxmlformats.org/markup-compatibility/2006">
+    <mc:Choice xmlns:p14="http://schemas.microsoft.com/office/powerpoint/2010/main" xmlns="" Requires="p14">
       <p:transition spd="med" p14:dur="700">
         <p:fade/>
       </p:transition>
     </mc:Choice>
-    <mc:Fallback xmlns="">
+    <mc:Fallback>
       <p:transition spd="med">
         <p:fade/>
       </p:transition>
@@ -12711,7 +13037,7 @@
       </p:grpSpPr>
       <p:sp>
         <p:nvSpPr>
-          <p:cNvPr id="3" name="Title 2"/>
+          <p:cNvPr id="2" name="Title 1"/>
           <p:cNvSpPr>
             <a:spLocks noGrp="1"/>
           </p:cNvSpPr>
@@ -12721,73 +13047,647 @@
         </p:nvSpPr>
         <p:spPr/>
         <p:txBody>
-          <a:bodyPr>
-            <a:normAutofit/>
-          </a:bodyPr>
+          <a:bodyPr/>
           <a:lstStyle/>
           <a:p>
             <a:r>
-              <a:rPr lang="es-AR" sz="6600" dirty="0" smtClean="0">
-                <a:latin typeface="Segoe UI" panose="020B0502040204020203" pitchFamily="34" charset="0"/>
-                <a:cs typeface="Segoe UI" panose="020B0502040204020203" pitchFamily="34" charset="0"/>
-              </a:rPr>
-              <a:t>Fin</a:t>
-            </a:r>
-            <a:endParaRPr lang="en-US" sz="6600" dirty="0">
+              <a:rPr lang="es-AR" dirty="0" smtClean="0">
+                <a:latin typeface="Segoe UI" panose="020B0502040204020203" pitchFamily="34" charset="0"/>
+                <a:cs typeface="Segoe UI" panose="020B0502040204020203" pitchFamily="34" charset="0"/>
+              </a:rPr>
+              <a:t>Conclusiones</a:t>
+            </a:r>
+            <a:endParaRPr lang="es-AR" dirty="0">
               <a:latin typeface="Segoe UI" panose="020B0502040204020203" pitchFamily="34" charset="0"/>
               <a:cs typeface="Segoe UI" panose="020B0502040204020203" pitchFamily="34" charset="0"/>
             </a:endParaRPr>
           </a:p>
         </p:txBody>
       </p:sp>
-      <p:sp>
-        <p:nvSpPr>
-          <p:cNvPr id="4" name="Text Placeholder 3"/>
-          <p:cNvSpPr>
-            <a:spLocks noGrp="1"/>
-          </p:cNvSpPr>
-          <p:nvPr>
-            <p:ph type="body" sz="half" idx="2"/>
-          </p:nvPr>
-        </p:nvSpPr>
-        <p:spPr/>
-        <p:txBody>
-          <a:bodyPr>
-            <a:normAutofit/>
-          </a:bodyPr>
-          <a:lstStyle/>
-          <a:p>
-            <a:r>
-              <a:rPr lang="es-AR" sz="3600" dirty="0" smtClean="0">
-                <a:latin typeface="Segoe UI" panose="020B0502040204020203" pitchFamily="34" charset="0"/>
-                <a:cs typeface="Segoe UI" panose="020B0502040204020203" pitchFamily="34" charset="0"/>
-              </a:rPr>
-              <a:t>¿Preguntas?</a:t>
-            </a:r>
-            <a:endParaRPr lang="en-US" sz="3600" dirty="0">
-              <a:latin typeface="Segoe UI" panose="020B0502040204020203" pitchFamily="34" charset="0"/>
-              <a:cs typeface="Segoe UI" panose="020B0502040204020203" pitchFamily="34" charset="0"/>
-            </a:endParaRPr>
-          </a:p>
-        </p:txBody>
-      </p:sp>
     </p:spTree>
     <p:extLst>
       <p:ext uri="{BB962C8B-B14F-4D97-AF65-F5344CB8AC3E}">
-        <p14:creationId xmlns:p14="http://schemas.microsoft.com/office/powerpoint/2010/main" val="1108506989"/>
+        <p14:creationId xmlns:p14="http://schemas.microsoft.com/office/powerpoint/2010/main" xmlns="" val="1539601608"/>
       </p:ext>
     </p:extLst>
   </p:cSld>
   <p:clrMapOvr>
     <a:masterClrMapping/>
   </p:clrMapOvr>
-  <mc:AlternateContent xmlns:mc="http://schemas.openxmlformats.org/markup-compatibility/2006" xmlns:p14="http://schemas.microsoft.com/office/powerpoint/2010/main">
-    <mc:Choice Requires="p14">
+  <mc:AlternateContent xmlns:mc="http://schemas.openxmlformats.org/markup-compatibility/2006">
+    <mc:Choice xmlns:p14="http://schemas.microsoft.com/office/powerpoint/2010/main" xmlns="" Requires="p14">
       <p:transition spd="med" p14:dur="700">
         <p:fade/>
       </p:transition>
     </mc:Choice>
-    <mc:Fallback xmlns="">
+    <mc:Fallback>
+      <p:transition spd="med">
+        <p:fade/>
+      </p:transition>
+    </mc:Fallback>
+  </mc:AlternateContent>
+  <p:timing>
+    <p:tnLst>
+      <p:par>
+        <p:cTn id="1" dur="indefinite" restart="never" nodeType="tmRoot"/>
+      </p:par>
+    </p:tnLst>
+  </p:timing>
+</p:sld>
+</file>
+
+<file path=ppt/slides/slide37.xml><?xml version="1.0" encoding="utf-8"?>
+<p:sld xmlns:a="http://schemas.openxmlformats.org/drawingml/2006/main" xmlns:r="http://schemas.openxmlformats.org/officeDocument/2006/relationships" xmlns:p="http://schemas.openxmlformats.org/presentationml/2006/main">
+  <p:cSld>
+    <p:spTree>
+      <p:nvGrpSpPr>
+        <p:cNvPr id="1" name=""/>
+        <p:cNvGrpSpPr/>
+        <p:nvPr/>
+      </p:nvGrpSpPr>
+      <p:grpSpPr>
+        <a:xfrm>
+          <a:off x="0" y="0"/>
+          <a:ext cx="0" cy="0"/>
+          <a:chOff x="0" y="0"/>
+          <a:chExt cx="0" cy="0"/>
+        </a:xfrm>
+      </p:grpSpPr>
+      <p:sp>
+        <p:nvSpPr>
+          <p:cNvPr id="2" name="Title 1"/>
+          <p:cNvSpPr>
+            <a:spLocks noGrp="1"/>
+          </p:cNvSpPr>
+          <p:nvPr>
+            <p:ph type="title"/>
+          </p:nvPr>
+        </p:nvSpPr>
+        <p:spPr/>
+        <p:txBody>
+          <a:bodyPr/>
+          <a:lstStyle/>
+          <a:p>
+            <a:r>
+              <a:rPr lang="es-AR" b="1" spc="0" dirty="0" smtClean="0">
+                <a:ln w="9525">
+                  <a:solidFill>
+                    <a:schemeClr val="bg1"/>
+                  </a:solidFill>
+                  <a:prstDash val="solid"/>
+                </a:ln>
+                <a:effectLst>
+                  <a:outerShdw blurRad="12700" dist="38100" dir="2700000" algn="tl" rotWithShape="0">
+                    <a:schemeClr val="bg1">
+                      <a:lumMod val="50000"/>
+                    </a:schemeClr>
+                  </a:outerShdw>
+                </a:effectLst>
+                <a:latin typeface="Segoe UI" panose="020B0502040204020203" pitchFamily="34" charset="0"/>
+                <a:cs typeface="Segoe UI" panose="020B0502040204020203" pitchFamily="34" charset="0"/>
+              </a:rPr>
+              <a:t>Conclusiones</a:t>
+            </a:r>
+            <a:endParaRPr lang="es-AR" b="1" spc="0" dirty="0">
+              <a:ln w="9525">
+                <a:solidFill>
+                  <a:schemeClr val="bg1"/>
+                </a:solidFill>
+                <a:prstDash val="solid"/>
+              </a:ln>
+              <a:effectLst>
+                <a:outerShdw blurRad="12700" dist="38100" dir="2700000" algn="tl" rotWithShape="0">
+                  <a:schemeClr val="bg1">
+                    <a:lumMod val="50000"/>
+                  </a:schemeClr>
+                </a:outerShdw>
+              </a:effectLst>
+              <a:latin typeface="Segoe UI" panose="020B0502040204020203" pitchFamily="34" charset="0"/>
+              <a:cs typeface="Segoe UI" panose="020B0502040204020203" pitchFamily="34" charset="0"/>
+            </a:endParaRPr>
+          </a:p>
+        </p:txBody>
+      </p:sp>
+      <p:sp>
+        <p:nvSpPr>
+          <p:cNvPr id="3" name="Content Placeholder 2"/>
+          <p:cNvSpPr>
+            <a:spLocks noGrp="1"/>
+          </p:cNvSpPr>
+          <p:nvPr>
+            <p:ph idx="1"/>
+          </p:nvPr>
+        </p:nvSpPr>
+        <p:spPr/>
+        <p:txBody>
+          <a:bodyPr>
+            <a:normAutofit lnSpcReduction="10000"/>
+          </a:bodyPr>
+          <a:lstStyle/>
+          <a:p>
+            <a:pPr marL="342900" indent="-342900">
+              <a:lnSpc>
+                <a:spcPct val="150000"/>
+              </a:lnSpc>
+            </a:pPr>
+            <a:r>
+              <a:rPr lang="es-AR" dirty="0" smtClean="0">
+                <a:latin typeface="Segoe UI" panose="020B0502040204020203" pitchFamily="34" charset="0"/>
+                <a:cs typeface="Segoe UI" panose="020B0502040204020203" pitchFamily="34" charset="0"/>
+              </a:rPr>
+              <a:t>La amenaza más grande para las organizaciones probablemente no sean los ataques de terceros, ni los empleados maliciosos, sino los empleados descuidados que de forma inintencionada divulgan información sensible</a:t>
+            </a:r>
+          </a:p>
+          <a:p>
+            <a:pPr marL="342900" indent="-342900">
+              <a:lnSpc>
+                <a:spcPct val="150000"/>
+              </a:lnSpc>
+            </a:pPr>
+            <a:r>
+              <a:rPr lang="es-AR" dirty="0" smtClean="0">
+                <a:latin typeface="Segoe UI" panose="020B0502040204020203" pitchFamily="34" charset="0"/>
+                <a:cs typeface="Segoe UI" panose="020B0502040204020203" pitchFamily="34" charset="0"/>
+              </a:rPr>
+              <a:t>Una combinación de protección tecnológica, políticas y procedimientos actualizados, y educación de los usuarios deberían contribuir a paliar los efectos que causan estas fugas</a:t>
+            </a:r>
+          </a:p>
+          <a:p>
+            <a:pPr>
+              <a:lnSpc>
+                <a:spcPct val="150000"/>
+              </a:lnSpc>
+            </a:pPr>
+            <a:endParaRPr lang="es-AR" dirty="0" smtClean="0">
+              <a:latin typeface="Segoe UI" panose="020B0502040204020203" pitchFamily="34" charset="0"/>
+              <a:cs typeface="Segoe UI" panose="020B0502040204020203" pitchFamily="34" charset="0"/>
+            </a:endParaRPr>
+          </a:p>
+          <a:p>
+            <a:endParaRPr lang="es-AR" dirty="0">
+              <a:latin typeface="Segoe UI" panose="020B0502040204020203" pitchFamily="34" charset="0"/>
+              <a:cs typeface="Segoe UI" panose="020B0502040204020203" pitchFamily="34" charset="0"/>
+            </a:endParaRPr>
+          </a:p>
+        </p:txBody>
+      </p:sp>
+    </p:spTree>
+    <p:extLst>
+      <p:ext uri="{BB962C8B-B14F-4D97-AF65-F5344CB8AC3E}">
+        <p14:creationId xmlns:p14="http://schemas.microsoft.com/office/powerpoint/2010/main" xmlns="" val="3280227416"/>
+      </p:ext>
+    </p:extLst>
+  </p:cSld>
+  <p:clrMapOvr>
+    <a:masterClrMapping/>
+  </p:clrMapOvr>
+  <mc:AlternateContent xmlns:mc="http://schemas.openxmlformats.org/markup-compatibility/2006">
+    <mc:Choice xmlns:p14="http://schemas.microsoft.com/office/powerpoint/2010/main" xmlns="" Requires="p14">
+      <p:transition spd="med" p14:dur="700">
+        <p:fade/>
+      </p:transition>
+    </mc:Choice>
+    <mc:Fallback>
+      <p:transition spd="med">
+        <p:fade/>
+      </p:transition>
+    </mc:Fallback>
+  </mc:AlternateContent>
+  <p:timing>
+    <p:tnLst>
+      <p:par>
+        <p:cTn id="1" dur="indefinite" restart="never" nodeType="tmRoot"/>
+      </p:par>
+    </p:tnLst>
+  </p:timing>
+</p:sld>
+</file>
+
+<file path=ppt/slides/slide38.xml><?xml version="1.0" encoding="utf-8"?>
+<p:sld xmlns:a="http://schemas.openxmlformats.org/drawingml/2006/main" xmlns:r="http://schemas.openxmlformats.org/officeDocument/2006/relationships" xmlns:p="http://schemas.openxmlformats.org/presentationml/2006/main">
+  <p:cSld>
+    <p:spTree>
+      <p:nvGrpSpPr>
+        <p:cNvPr id="1" name=""/>
+        <p:cNvGrpSpPr/>
+        <p:nvPr/>
+      </p:nvGrpSpPr>
+      <p:grpSpPr>
+        <a:xfrm>
+          <a:off x="0" y="0"/>
+          <a:ext cx="0" cy="0"/>
+          <a:chOff x="0" y="0"/>
+          <a:chExt cx="0" cy="0"/>
+        </a:xfrm>
+      </p:grpSpPr>
+      <p:sp>
+        <p:nvSpPr>
+          <p:cNvPr id="2" name="Title 1"/>
+          <p:cNvSpPr>
+            <a:spLocks noGrp="1"/>
+          </p:cNvSpPr>
+          <p:nvPr>
+            <p:ph type="title"/>
+          </p:nvPr>
+        </p:nvSpPr>
+        <p:spPr/>
+        <p:txBody>
+          <a:bodyPr/>
+          <a:lstStyle/>
+          <a:p>
+            <a:r>
+              <a:rPr lang="es-AR" b="1" spc="0" dirty="0" smtClean="0">
+                <a:ln w="9525">
+                  <a:solidFill>
+                    <a:schemeClr val="bg1"/>
+                  </a:solidFill>
+                  <a:prstDash val="solid"/>
+                </a:ln>
+                <a:effectLst>
+                  <a:outerShdw blurRad="12700" dist="38100" dir="2700000" algn="tl" rotWithShape="0">
+                    <a:schemeClr val="bg1">
+                      <a:lumMod val="50000"/>
+                    </a:schemeClr>
+                  </a:outerShdw>
+                </a:effectLst>
+                <a:latin typeface="Segoe UI" panose="020B0502040204020203" pitchFamily="34" charset="0"/>
+                <a:cs typeface="Segoe UI" panose="020B0502040204020203" pitchFamily="34" charset="0"/>
+              </a:rPr>
+              <a:t>Conclusiones (cont.)</a:t>
+            </a:r>
+            <a:endParaRPr lang="es-AR" b="1" spc="0" dirty="0">
+              <a:ln w="9525">
+                <a:solidFill>
+                  <a:schemeClr val="bg1"/>
+                </a:solidFill>
+                <a:prstDash val="solid"/>
+              </a:ln>
+              <a:effectLst>
+                <a:outerShdw blurRad="12700" dist="38100" dir="2700000" algn="tl" rotWithShape="0">
+                  <a:schemeClr val="bg1">
+                    <a:lumMod val="50000"/>
+                  </a:schemeClr>
+                </a:outerShdw>
+              </a:effectLst>
+              <a:latin typeface="Segoe UI" panose="020B0502040204020203" pitchFamily="34" charset="0"/>
+              <a:cs typeface="Segoe UI" panose="020B0502040204020203" pitchFamily="34" charset="0"/>
+            </a:endParaRPr>
+          </a:p>
+        </p:txBody>
+      </p:sp>
+      <p:sp>
+        <p:nvSpPr>
+          <p:cNvPr id="3" name="Content Placeholder 2"/>
+          <p:cNvSpPr>
+            <a:spLocks noGrp="1"/>
+          </p:cNvSpPr>
+          <p:nvPr>
+            <p:ph idx="1"/>
+          </p:nvPr>
+        </p:nvSpPr>
+        <p:spPr/>
+        <p:txBody>
+          <a:bodyPr>
+            <a:normAutofit fontScale="77500" lnSpcReduction="20000"/>
+          </a:bodyPr>
+          <a:lstStyle/>
+          <a:p>
+            <a:pPr marL="342900" indent="-342900">
+              <a:lnSpc>
+                <a:spcPct val="150000"/>
+              </a:lnSpc>
+            </a:pPr>
+            <a:r>
+              <a:rPr lang="es-AR" dirty="0">
+                <a:latin typeface="Segoe UI" panose="020B0502040204020203" pitchFamily="34" charset="0"/>
+                <a:cs typeface="Segoe UI" panose="020B0502040204020203" pitchFamily="34" charset="0"/>
+              </a:rPr>
+              <a:t>Procedimiento básico para desarrollar una estrategia de protección: </a:t>
+            </a:r>
+          </a:p>
+          <a:p>
+            <a:pPr marL="800100" lvl="1" indent="-342900">
+              <a:lnSpc>
+                <a:spcPct val="150000"/>
+              </a:lnSpc>
+              <a:buFont typeface="Wingdings" panose="05000000000000000000" pitchFamily="2" charset="2"/>
+              <a:buChar char="ü"/>
+            </a:pPr>
+            <a:r>
+              <a:rPr lang="es-AR" sz="2400" dirty="0">
+                <a:latin typeface="Segoe UI" panose="020B0502040204020203" pitchFamily="34" charset="0"/>
+                <a:cs typeface="Segoe UI" panose="020B0502040204020203" pitchFamily="34" charset="0"/>
+              </a:rPr>
+              <a:t>Clasificar la información a proteger</a:t>
+            </a:r>
+          </a:p>
+          <a:p>
+            <a:pPr marL="800100" lvl="1" indent="-342900">
+              <a:lnSpc>
+                <a:spcPct val="150000"/>
+              </a:lnSpc>
+              <a:buFont typeface="Wingdings" panose="05000000000000000000" pitchFamily="2" charset="2"/>
+              <a:buChar char="ü"/>
+            </a:pPr>
+            <a:r>
+              <a:rPr lang="es-AR" sz="2400" dirty="0">
+                <a:latin typeface="Segoe UI" panose="020B0502040204020203" pitchFamily="34" charset="0"/>
+                <a:cs typeface="Segoe UI" panose="020B0502040204020203" pitchFamily="34" charset="0"/>
+              </a:rPr>
+              <a:t>Entender los datos que se manejan </a:t>
+            </a:r>
+          </a:p>
+          <a:p>
+            <a:pPr marL="800100" lvl="1" indent="-342900">
+              <a:lnSpc>
+                <a:spcPct val="150000"/>
+              </a:lnSpc>
+              <a:buFont typeface="Wingdings" panose="05000000000000000000" pitchFamily="2" charset="2"/>
+              <a:buChar char="ü"/>
+            </a:pPr>
+            <a:r>
+              <a:rPr lang="es-AR" sz="2400" dirty="0">
+                <a:latin typeface="Segoe UI" panose="020B0502040204020203" pitchFamily="34" charset="0"/>
+                <a:cs typeface="Segoe UI" panose="020B0502040204020203" pitchFamily="34" charset="0"/>
+              </a:rPr>
+              <a:t>Establecer políticas sobre el manejo de la información</a:t>
+            </a:r>
+          </a:p>
+          <a:p>
+            <a:pPr marL="800100" lvl="1" indent="-342900">
+              <a:lnSpc>
+                <a:spcPct val="150000"/>
+              </a:lnSpc>
+              <a:buFont typeface="Wingdings" panose="05000000000000000000" pitchFamily="2" charset="2"/>
+              <a:buChar char="ü"/>
+            </a:pPr>
+            <a:r>
+              <a:rPr lang="es-AR" sz="2400" dirty="0">
+                <a:latin typeface="Segoe UI" panose="020B0502040204020203" pitchFamily="34" charset="0"/>
+                <a:cs typeface="Segoe UI" panose="020B0502040204020203" pitchFamily="34" charset="0"/>
+              </a:rPr>
+              <a:t>Capacitar al personal en las herramientas </a:t>
+            </a:r>
+          </a:p>
+          <a:p>
+            <a:pPr marL="800100" lvl="1" indent="-342900">
+              <a:lnSpc>
+                <a:spcPct val="150000"/>
+              </a:lnSpc>
+              <a:buFont typeface="Wingdings" panose="05000000000000000000" pitchFamily="2" charset="2"/>
+              <a:buChar char="ü"/>
+            </a:pPr>
+            <a:r>
+              <a:rPr lang="es-AR" sz="2400" dirty="0">
+                <a:latin typeface="Segoe UI" panose="020B0502040204020203" pitchFamily="34" charset="0"/>
+                <a:cs typeface="Segoe UI" panose="020B0502040204020203" pitchFamily="34" charset="0"/>
+              </a:rPr>
+              <a:t>Implementar seguridad a nivel físico</a:t>
+            </a:r>
+          </a:p>
+          <a:p>
+            <a:pPr marL="342900" indent="-342900">
+              <a:lnSpc>
+                <a:spcPct val="150000"/>
+              </a:lnSpc>
+            </a:pPr>
+            <a:r>
+              <a:rPr lang="es-AR" dirty="0">
+                <a:latin typeface="Segoe UI" panose="020B0502040204020203" pitchFamily="34" charset="0"/>
+                <a:cs typeface="Segoe UI" panose="020B0502040204020203" pitchFamily="34" charset="0"/>
+              </a:rPr>
+              <a:t>No debe olvidarse de ejecutar revisiones periódicas, para mantener las políticas actualizadas y en conformidad con los requisitos y las tendencias </a:t>
+            </a:r>
+            <a:r>
+              <a:rPr lang="es-AR" dirty="0" smtClean="0">
+                <a:latin typeface="Segoe UI" panose="020B0502040204020203" pitchFamily="34" charset="0"/>
+                <a:cs typeface="Segoe UI" panose="020B0502040204020203" pitchFamily="34" charset="0"/>
+              </a:rPr>
+              <a:t>tecnológicas </a:t>
+            </a:r>
+            <a:endParaRPr lang="es-AR" dirty="0">
+              <a:latin typeface="Segoe UI" panose="020B0502040204020203" pitchFamily="34" charset="0"/>
+              <a:cs typeface="Segoe UI" panose="020B0502040204020203" pitchFamily="34" charset="0"/>
+            </a:endParaRPr>
+          </a:p>
+        </p:txBody>
+      </p:sp>
+    </p:spTree>
+    <p:extLst>
+      <p:ext uri="{BB962C8B-B14F-4D97-AF65-F5344CB8AC3E}">
+        <p14:creationId xmlns:p14="http://schemas.microsoft.com/office/powerpoint/2010/main" xmlns="" val="3816537714"/>
+      </p:ext>
+    </p:extLst>
+  </p:cSld>
+  <p:clrMapOvr>
+    <a:masterClrMapping/>
+  </p:clrMapOvr>
+  <mc:AlternateContent xmlns:mc="http://schemas.openxmlformats.org/markup-compatibility/2006">
+    <mc:Choice xmlns:p14="http://schemas.microsoft.com/office/powerpoint/2010/main" xmlns="" Requires="p14">
+      <p:transition spd="med" p14:dur="700">
+        <p:fade/>
+      </p:transition>
+    </mc:Choice>
+    <mc:Fallback>
+      <p:transition spd="med">
+        <p:fade/>
+      </p:transition>
+    </mc:Fallback>
+  </mc:AlternateContent>
+  <p:timing>
+    <p:tnLst>
+      <p:par>
+        <p:cTn id="1" dur="indefinite" restart="never" nodeType="tmRoot"/>
+      </p:par>
+    </p:tnLst>
+  </p:timing>
+</p:sld>
+</file>
+
+<file path=ppt/slides/slide39.xml><?xml version="1.0" encoding="utf-8"?>
+<p:sld xmlns:a="http://schemas.openxmlformats.org/drawingml/2006/main" xmlns:r="http://schemas.openxmlformats.org/officeDocument/2006/relationships" xmlns:p="http://schemas.openxmlformats.org/presentationml/2006/main">
+  <p:cSld>
+    <p:spTree>
+      <p:nvGrpSpPr>
+        <p:cNvPr id="1" name=""/>
+        <p:cNvGrpSpPr/>
+        <p:nvPr/>
+      </p:nvGrpSpPr>
+      <p:grpSpPr>
+        <a:xfrm>
+          <a:off x="0" y="0"/>
+          <a:ext cx="0" cy="0"/>
+          <a:chOff x="0" y="0"/>
+          <a:chExt cx="0" cy="0"/>
+        </a:xfrm>
+      </p:grpSpPr>
+      <p:sp>
+        <p:nvSpPr>
+          <p:cNvPr id="2" name="Title 1"/>
+          <p:cNvSpPr>
+            <a:spLocks noGrp="1"/>
+          </p:cNvSpPr>
+          <p:nvPr>
+            <p:ph type="title"/>
+          </p:nvPr>
+        </p:nvSpPr>
+        <p:spPr/>
+        <p:txBody>
+          <a:bodyPr/>
+          <a:lstStyle/>
+          <a:p>
+            <a:r>
+              <a:rPr lang="es-AR" b="1" spc="0" dirty="0" smtClean="0">
+                <a:ln w="9525">
+                  <a:solidFill>
+                    <a:schemeClr val="bg1"/>
+                  </a:solidFill>
+                  <a:prstDash val="solid"/>
+                </a:ln>
+                <a:effectLst>
+                  <a:outerShdw blurRad="12700" dist="38100" dir="2700000" algn="tl" rotWithShape="0">
+                    <a:schemeClr val="bg1">
+                      <a:lumMod val="50000"/>
+                    </a:schemeClr>
+                  </a:outerShdw>
+                </a:effectLst>
+                <a:latin typeface="Segoe UI" panose="020B0502040204020203" pitchFamily="34" charset="0"/>
+                <a:cs typeface="Segoe UI" panose="020B0502040204020203" pitchFamily="34" charset="0"/>
+              </a:rPr>
+              <a:t>Conclusiones (cont.)</a:t>
+            </a:r>
+            <a:endParaRPr lang="es-AR" b="1" spc="0" dirty="0">
+              <a:ln w="9525">
+                <a:solidFill>
+                  <a:schemeClr val="bg1"/>
+                </a:solidFill>
+                <a:prstDash val="solid"/>
+              </a:ln>
+              <a:effectLst>
+                <a:outerShdw blurRad="12700" dist="38100" dir="2700000" algn="tl" rotWithShape="0">
+                  <a:schemeClr val="bg1">
+                    <a:lumMod val="50000"/>
+                  </a:schemeClr>
+                </a:outerShdw>
+              </a:effectLst>
+              <a:latin typeface="Segoe UI" panose="020B0502040204020203" pitchFamily="34" charset="0"/>
+              <a:cs typeface="Segoe UI" panose="020B0502040204020203" pitchFamily="34" charset="0"/>
+            </a:endParaRPr>
+          </a:p>
+        </p:txBody>
+      </p:sp>
+      <p:sp>
+        <p:nvSpPr>
+          <p:cNvPr id="3" name="Content Placeholder 2"/>
+          <p:cNvSpPr>
+            <a:spLocks noGrp="1"/>
+          </p:cNvSpPr>
+          <p:nvPr>
+            <p:ph idx="1"/>
+          </p:nvPr>
+        </p:nvSpPr>
+        <p:spPr/>
+        <p:txBody>
+          <a:bodyPr>
+            <a:normAutofit/>
+          </a:bodyPr>
+          <a:lstStyle/>
+          <a:p>
+            <a:pPr marL="342900" indent="-342900"/>
+            <a:r>
+              <a:rPr lang="es-AR" dirty="0">
+                <a:latin typeface="Segoe UI" panose="020B0502040204020203" pitchFamily="34" charset="0"/>
+                <a:cs typeface="Segoe UI" panose="020B0502040204020203" pitchFamily="34" charset="0"/>
+              </a:rPr>
+              <a:t>A pesar de que los ataques maliciosos son una minoría, no deberían ser </a:t>
+            </a:r>
+            <a:r>
+              <a:rPr lang="es-AR" dirty="0" smtClean="0">
+                <a:latin typeface="Segoe UI" panose="020B0502040204020203" pitchFamily="34" charset="0"/>
+                <a:cs typeface="Segoe UI" panose="020B0502040204020203" pitchFamily="34" charset="0"/>
+              </a:rPr>
+              <a:t>ignorados</a:t>
+            </a:r>
+            <a:endParaRPr lang="es-AR" dirty="0">
+              <a:latin typeface="Segoe UI" panose="020B0502040204020203" pitchFamily="34" charset="0"/>
+              <a:cs typeface="Segoe UI" panose="020B0502040204020203" pitchFamily="34" charset="0"/>
+            </a:endParaRPr>
+          </a:p>
+          <a:p>
+            <a:pPr marL="342900" indent="-342900"/>
+            <a:r>
+              <a:rPr lang="es-AR" dirty="0" smtClean="0">
+                <a:latin typeface="Segoe UI" panose="020B0502040204020203" pitchFamily="34" charset="0"/>
+                <a:cs typeface="Segoe UI" panose="020B0502040204020203" pitchFamily="34" charset="0"/>
+              </a:rPr>
+              <a:t>Existen </a:t>
+            </a:r>
+            <a:r>
+              <a:rPr lang="es-AR" dirty="0">
+                <a:latin typeface="Segoe UI" panose="020B0502040204020203" pitchFamily="34" charset="0"/>
+                <a:cs typeface="Segoe UI" panose="020B0502040204020203" pitchFamily="34" charset="0"/>
+              </a:rPr>
+              <a:t>múltiples vías de escape de información que deben ser </a:t>
+            </a:r>
+            <a:r>
+              <a:rPr lang="es-AR" dirty="0" smtClean="0">
+                <a:latin typeface="Segoe UI" panose="020B0502040204020203" pitchFamily="34" charset="0"/>
+                <a:cs typeface="Segoe UI" panose="020B0502040204020203" pitchFamily="34" charset="0"/>
+              </a:rPr>
+              <a:t>monitoreadas</a:t>
+            </a:r>
+            <a:endParaRPr lang="es-AR" dirty="0">
+              <a:latin typeface="Segoe UI" panose="020B0502040204020203" pitchFamily="34" charset="0"/>
+              <a:cs typeface="Segoe UI" panose="020B0502040204020203" pitchFamily="34" charset="0"/>
+            </a:endParaRPr>
+          </a:p>
+          <a:p>
+            <a:pPr marL="342900" indent="-342900"/>
+            <a:r>
+              <a:rPr lang="es-AR" dirty="0" smtClean="0">
+                <a:latin typeface="Segoe UI" panose="020B0502040204020203" pitchFamily="34" charset="0"/>
+                <a:cs typeface="Segoe UI" panose="020B0502040204020203" pitchFamily="34" charset="0"/>
+              </a:rPr>
+              <a:t>No </a:t>
+            </a:r>
+            <a:r>
+              <a:rPr lang="es-AR" dirty="0">
+                <a:latin typeface="Segoe UI" panose="020B0502040204020203" pitchFamily="34" charset="0"/>
+                <a:cs typeface="Segoe UI" panose="020B0502040204020203" pitchFamily="34" charset="0"/>
+              </a:rPr>
+              <a:t>existen soluciones que protejan los activos intangibles de forma 100% segura, se puede minimizar la probabilidad de que ocurran pérdidas mediante la aplicación de varios métodos </a:t>
+            </a:r>
+            <a:r>
+              <a:rPr lang="es-AR" dirty="0" smtClean="0">
+                <a:latin typeface="Segoe UI" panose="020B0502040204020203" pitchFamily="34" charset="0"/>
+                <a:cs typeface="Segoe UI" panose="020B0502040204020203" pitchFamily="34" charset="0"/>
+              </a:rPr>
+              <a:t>complementarios</a:t>
+            </a:r>
+            <a:endParaRPr lang="es-AR" dirty="0">
+              <a:latin typeface="Segoe UI" panose="020B0502040204020203" pitchFamily="34" charset="0"/>
+              <a:cs typeface="Segoe UI" panose="020B0502040204020203" pitchFamily="34" charset="0"/>
+            </a:endParaRPr>
+          </a:p>
+        </p:txBody>
+      </p:sp>
+    </p:spTree>
+    <p:extLst>
+      <p:ext uri="{BB962C8B-B14F-4D97-AF65-F5344CB8AC3E}">
+        <p14:creationId xmlns:p14="http://schemas.microsoft.com/office/powerpoint/2010/main" xmlns="" val="2896967631"/>
+      </p:ext>
+    </p:extLst>
+  </p:cSld>
+  <p:clrMapOvr>
+    <a:masterClrMapping/>
+  </p:clrMapOvr>
+  <mc:AlternateContent xmlns:mc="http://schemas.openxmlformats.org/markup-compatibility/2006">
+    <mc:Choice xmlns:p14="http://schemas.microsoft.com/office/powerpoint/2010/main" xmlns="" Requires="p14">
+      <p:transition spd="med" p14:dur="700">
+        <p:fade/>
+      </p:transition>
+    </mc:Choice>
+    <mc:Fallback>
       <p:transition spd="med">
         <p:fade/>
       </p:transition>
@@ -13064,20 +13964,131 @@
     </p:spTree>
     <p:extLst>
       <p:ext uri="{BB962C8B-B14F-4D97-AF65-F5344CB8AC3E}">
-        <p14:creationId xmlns:p14="http://schemas.microsoft.com/office/powerpoint/2010/main" val="3323359930"/>
+        <p14:creationId xmlns:p14="http://schemas.microsoft.com/office/powerpoint/2010/main" xmlns="" val="3323359930"/>
       </p:ext>
     </p:extLst>
   </p:cSld>
   <p:clrMapOvr>
     <a:masterClrMapping/>
   </p:clrMapOvr>
-  <mc:AlternateContent xmlns:mc="http://schemas.openxmlformats.org/markup-compatibility/2006" xmlns:p14="http://schemas.microsoft.com/office/powerpoint/2010/main">
-    <mc:Choice Requires="p14">
+  <mc:AlternateContent xmlns:mc="http://schemas.openxmlformats.org/markup-compatibility/2006">
+    <mc:Choice xmlns:p14="http://schemas.microsoft.com/office/powerpoint/2010/main" xmlns="" Requires="p14">
       <p:transition spd="med" p14:dur="700">
         <p:fade/>
       </p:transition>
     </mc:Choice>
-    <mc:Fallback xmlns="">
+    <mc:Fallback>
+      <p:transition spd="med">
+        <p:fade/>
+      </p:transition>
+    </mc:Fallback>
+  </mc:AlternateContent>
+  <p:timing>
+    <p:tnLst>
+      <p:par>
+        <p:cTn id="1" dur="indefinite" restart="never" nodeType="tmRoot"/>
+      </p:par>
+    </p:tnLst>
+  </p:timing>
+</p:sld>
+</file>
+
+<file path=ppt/slides/slide40.xml><?xml version="1.0" encoding="utf-8"?>
+<p:sld xmlns:a="http://schemas.openxmlformats.org/drawingml/2006/main" xmlns:r="http://schemas.openxmlformats.org/officeDocument/2006/relationships" xmlns:p="http://schemas.openxmlformats.org/presentationml/2006/main">
+  <p:cSld>
+    <p:spTree>
+      <p:nvGrpSpPr>
+        <p:cNvPr id="1" name=""/>
+        <p:cNvGrpSpPr/>
+        <p:nvPr/>
+      </p:nvGrpSpPr>
+      <p:grpSpPr>
+        <a:xfrm>
+          <a:off x="0" y="0"/>
+          <a:ext cx="0" cy="0"/>
+          <a:chOff x="0" y="0"/>
+          <a:chExt cx="0" cy="0"/>
+        </a:xfrm>
+      </p:grpSpPr>
+      <p:sp>
+        <p:nvSpPr>
+          <p:cNvPr id="3" name="Title 2"/>
+          <p:cNvSpPr>
+            <a:spLocks noGrp="1"/>
+          </p:cNvSpPr>
+          <p:nvPr>
+            <p:ph type="title"/>
+          </p:nvPr>
+        </p:nvSpPr>
+        <p:spPr/>
+        <p:txBody>
+          <a:bodyPr>
+            <a:normAutofit/>
+          </a:bodyPr>
+          <a:lstStyle/>
+          <a:p>
+            <a:r>
+              <a:rPr lang="es-AR" sz="6600" dirty="0" smtClean="0">
+                <a:latin typeface="Segoe UI" panose="020B0502040204020203" pitchFamily="34" charset="0"/>
+                <a:cs typeface="Segoe UI" panose="020B0502040204020203" pitchFamily="34" charset="0"/>
+              </a:rPr>
+              <a:t>Fin</a:t>
+            </a:r>
+            <a:endParaRPr lang="en-US" sz="6600" dirty="0">
+              <a:latin typeface="Segoe UI" panose="020B0502040204020203" pitchFamily="34" charset="0"/>
+              <a:cs typeface="Segoe UI" panose="020B0502040204020203" pitchFamily="34" charset="0"/>
+            </a:endParaRPr>
+          </a:p>
+        </p:txBody>
+      </p:sp>
+      <p:sp>
+        <p:nvSpPr>
+          <p:cNvPr id="4" name="Text Placeholder 3"/>
+          <p:cNvSpPr>
+            <a:spLocks noGrp="1"/>
+          </p:cNvSpPr>
+          <p:nvPr>
+            <p:ph type="body" sz="half" idx="2"/>
+          </p:nvPr>
+        </p:nvSpPr>
+        <p:spPr/>
+        <p:txBody>
+          <a:bodyPr>
+            <a:normAutofit/>
+          </a:bodyPr>
+          <a:lstStyle/>
+          <a:p>
+            <a:r>
+              <a:rPr lang="es-AR" sz="3600" dirty="0" smtClean="0">
+                <a:latin typeface="Segoe UI" panose="020B0502040204020203" pitchFamily="34" charset="0"/>
+                <a:cs typeface="Segoe UI" panose="020B0502040204020203" pitchFamily="34" charset="0"/>
+              </a:rPr>
+              <a:t>¿Preguntas?</a:t>
+            </a:r>
+            <a:endParaRPr lang="en-US" sz="3600" dirty="0">
+              <a:latin typeface="Segoe UI" panose="020B0502040204020203" pitchFamily="34" charset="0"/>
+              <a:cs typeface="Segoe UI" panose="020B0502040204020203" pitchFamily="34" charset="0"/>
+            </a:endParaRPr>
+          </a:p>
+        </p:txBody>
+      </p:sp>
+    </p:spTree>
+    <p:extLst>
+      <p:ext uri="{BB962C8B-B14F-4D97-AF65-F5344CB8AC3E}">
+        <p14:creationId xmlns:p14="http://schemas.microsoft.com/office/powerpoint/2010/main" xmlns="" val="1108506989"/>
+      </p:ext>
+    </p:extLst>
+  </p:cSld>
+  <p:clrMapOvr>
+    <a:masterClrMapping/>
+  </p:clrMapOvr>
+  <mc:AlternateContent xmlns:mc="http://schemas.openxmlformats.org/markup-compatibility/2006">
+    <mc:Choice xmlns:p14="http://schemas.microsoft.com/office/powerpoint/2010/main" xmlns="" Requires="p14">
+      <p:transition spd="med" p14:dur="700">
+        <p:fade/>
+      </p:transition>
+    </mc:Choice>
+    <mc:Fallback>
       <p:transition spd="med">
         <p:fade/>
       </p:transition>
@@ -13277,14 +14288,7 @@
                 <a:latin typeface="Segoe UI" panose="020B0502040204020203" pitchFamily="34" charset="0"/>
                 <a:cs typeface="Segoe UI" panose="020B0502040204020203" pitchFamily="34" charset="0"/>
               </a:rPr>
-              <a:t>Negligencia </a:t>
-            </a:r>
-            <a:r>
-              <a:rPr lang="es-AR" sz="2400" dirty="0" smtClean="0">
-                <a:latin typeface="Segoe UI" panose="020B0502040204020203" pitchFamily="34" charset="0"/>
-                <a:cs typeface="Segoe UI" panose="020B0502040204020203" pitchFamily="34" charset="0"/>
-              </a:rPr>
-              <a:t>o desconocimiento</a:t>
+              <a:t>Negligencia o desconocimiento</a:t>
             </a:r>
           </a:p>
           <a:p>
@@ -13310,14 +14314,7 @@
                 <a:latin typeface="Segoe UI" panose="020B0502040204020203" pitchFamily="34" charset="0"/>
                 <a:cs typeface="Segoe UI" panose="020B0502040204020203" pitchFamily="34" charset="0"/>
               </a:rPr>
-              <a:t>Delincuentes </a:t>
-            </a:r>
-            <a:r>
-              <a:rPr lang="es-AR" sz="2400" dirty="0" smtClean="0">
-                <a:latin typeface="Segoe UI" panose="020B0502040204020203" pitchFamily="34" charset="0"/>
-                <a:cs typeface="Segoe UI" panose="020B0502040204020203" pitchFamily="34" charset="0"/>
-              </a:rPr>
-              <a:t>informáticos</a:t>
+              <a:t>Delincuentes informáticos</a:t>
             </a:r>
             <a:endParaRPr lang="es-AR" sz="2400" dirty="0">
               <a:latin typeface="Segoe UI" panose="020B0502040204020203" pitchFamily="34" charset="0"/>
@@ -13342,10 +14339,10 @@
           <p:nvPr/>
         </p:nvPicPr>
         <p:blipFill>
-          <a:blip r:embed="rId2">
+          <a:blip r:embed="rId2" cstate="print">
             <a:extLst>
               <a:ext uri="{28A0092B-C50C-407E-A947-70E740481C1C}">
-                <a14:useLocalDpi xmlns:a14="http://schemas.microsoft.com/office/drawing/2010/main" val="0"/>
+                <a14:useLocalDpi xmlns:a14="http://schemas.microsoft.com/office/drawing/2010/main" xmlns="" val="0"/>
               </a:ext>
             </a:extLst>
           </a:blip>
@@ -13365,7 +14362,7 @@
           <a:noFill/>
           <a:extLst>
             <a:ext uri="{909E8E84-426E-40DD-AFC4-6F175D3DCCD1}">
-              <a14:hiddenFill xmlns:a14="http://schemas.microsoft.com/office/drawing/2010/main">
+              <a14:hiddenFill xmlns:a14="http://schemas.microsoft.com/office/drawing/2010/main" xmlns="">
                 <a:solidFill>
                   <a:srgbClr val="FFFFFF"/>
                 </a:solidFill>
@@ -13377,20 +14374,20 @@
     </p:spTree>
     <p:extLst>
       <p:ext uri="{BB962C8B-B14F-4D97-AF65-F5344CB8AC3E}">
-        <p14:creationId xmlns:p14="http://schemas.microsoft.com/office/powerpoint/2010/main" val="1350001534"/>
+        <p14:creationId xmlns:p14="http://schemas.microsoft.com/office/powerpoint/2010/main" xmlns="" val="1350001534"/>
       </p:ext>
     </p:extLst>
   </p:cSld>
   <p:clrMapOvr>
     <a:masterClrMapping/>
   </p:clrMapOvr>
-  <mc:AlternateContent xmlns:mc="http://schemas.openxmlformats.org/markup-compatibility/2006" xmlns:p14="http://schemas.microsoft.com/office/powerpoint/2010/main">
-    <mc:Choice Requires="p14">
+  <mc:AlternateContent xmlns:mc="http://schemas.openxmlformats.org/markup-compatibility/2006">
+    <mc:Choice xmlns:p14="http://schemas.microsoft.com/office/powerpoint/2010/main" xmlns="" Requires="p14">
       <p:transition spd="med" p14:dur="700">
         <p:fade/>
       </p:transition>
     </mc:Choice>
-    <mc:Fallback xmlns="">
+    <mc:Fallback>
       <p:transition spd="med">
         <p:fade/>
       </p:transition>
@@ -13758,20 +14755,20 @@
     </p:spTree>
     <p:extLst>
       <p:ext uri="{BB962C8B-B14F-4D97-AF65-F5344CB8AC3E}">
-        <p14:creationId xmlns:p14="http://schemas.microsoft.com/office/powerpoint/2010/main" val="3438441757"/>
+        <p14:creationId xmlns:p14="http://schemas.microsoft.com/office/powerpoint/2010/main" xmlns="" val="3438441757"/>
       </p:ext>
     </p:extLst>
   </p:cSld>
   <p:clrMapOvr>
     <a:masterClrMapping/>
   </p:clrMapOvr>
-  <mc:AlternateContent xmlns:mc="http://schemas.openxmlformats.org/markup-compatibility/2006" xmlns:p14="http://schemas.microsoft.com/office/powerpoint/2010/main">
-    <mc:Choice Requires="p14">
+  <mc:AlternateContent xmlns:mc="http://schemas.openxmlformats.org/markup-compatibility/2006">
+    <mc:Choice xmlns:p14="http://schemas.microsoft.com/office/powerpoint/2010/main" xmlns="" Requires="p14">
       <p:transition spd="med" p14:dur="700">
         <p:fade/>
       </p:transition>
     </mc:Choice>
-    <mc:Fallback xmlns="">
+    <mc:Fallback>
       <p:transition spd="med">
         <p:fade/>
       </p:transition>
@@ -14018,20 +15015,20 @@
     </p:spTree>
     <p:extLst>
       <p:ext uri="{BB962C8B-B14F-4D97-AF65-F5344CB8AC3E}">
-        <p14:creationId xmlns:p14="http://schemas.microsoft.com/office/powerpoint/2010/main" val="3833366108"/>
+        <p14:creationId xmlns:p14="http://schemas.microsoft.com/office/powerpoint/2010/main" xmlns="" val="3833366108"/>
       </p:ext>
     </p:extLst>
   </p:cSld>
   <p:clrMapOvr>
     <a:masterClrMapping/>
   </p:clrMapOvr>
-  <mc:AlternateContent xmlns:mc="http://schemas.openxmlformats.org/markup-compatibility/2006" xmlns:p14="http://schemas.microsoft.com/office/powerpoint/2010/main">
-    <mc:Choice Requires="p14">
+  <mc:AlternateContent xmlns:mc="http://schemas.openxmlformats.org/markup-compatibility/2006">
+    <mc:Choice xmlns:p14="http://schemas.microsoft.com/office/powerpoint/2010/main" xmlns="" Requires="p14">
       <p:transition spd="med" p14:dur="700">
         <p:fade/>
       </p:transition>
     </mc:Choice>
-    <mc:Fallback xmlns="">
+    <mc:Fallback>
       <p:transition spd="med">
         <p:fade/>
       </p:transition>
@@ -14113,10 +15110,10 @@
           <p:nvPr/>
         </p:nvPicPr>
         <p:blipFill>
-          <a:blip r:embed="rId2">
+          <a:blip r:embed="rId2" cstate="print">
             <a:extLst>
               <a:ext uri="{28A0092B-C50C-407E-A947-70E740481C1C}">
-                <a14:useLocalDpi xmlns:a14="http://schemas.microsoft.com/office/drawing/2010/main" val="0"/>
+                <a14:useLocalDpi xmlns:a14="http://schemas.microsoft.com/office/drawing/2010/main" xmlns="" val="0"/>
               </a:ext>
             </a:extLst>
           </a:blip>
@@ -14139,14 +15136,14 @@
           </a:ln>
           <a:extLst>
             <a:ext uri="{909E8E84-426E-40DD-AFC4-6F175D3DCCD1}">
-              <a14:hiddenFill xmlns:a14="http://schemas.microsoft.com/office/drawing/2010/main">
+              <a14:hiddenFill xmlns:a14="http://schemas.microsoft.com/office/drawing/2010/main" xmlns="">
                 <a:solidFill>
                   <a:schemeClr val="accent1"/>
                 </a:solidFill>
               </a14:hiddenFill>
             </a:ext>
             <a:ext uri="{91240B29-F687-4F45-9708-019B960494DF}">
-              <a14:hiddenLine xmlns:a14="http://schemas.microsoft.com/office/drawing/2010/main" w="9525">
+              <a14:hiddenLine xmlns:a14="http://schemas.microsoft.com/office/drawing/2010/main" xmlns="" w="9525">
                 <a:solidFill>
                   <a:schemeClr val="tx1"/>
                 </a:solidFill>
@@ -14161,20 +15158,20 @@
     </p:spTree>
     <p:extLst>
       <p:ext uri="{BB962C8B-B14F-4D97-AF65-F5344CB8AC3E}">
-        <p14:creationId xmlns:p14="http://schemas.microsoft.com/office/powerpoint/2010/main" val="2112418618"/>
+        <p14:creationId xmlns:p14="http://schemas.microsoft.com/office/powerpoint/2010/main" xmlns="" val="2112418618"/>
       </p:ext>
     </p:extLst>
   </p:cSld>
   <p:clrMapOvr>
     <a:masterClrMapping/>
   </p:clrMapOvr>
-  <mc:AlternateContent xmlns:mc="http://schemas.openxmlformats.org/markup-compatibility/2006" xmlns:p14="http://schemas.microsoft.com/office/powerpoint/2010/main">
-    <mc:Choice Requires="p14">
+  <mc:AlternateContent xmlns:mc="http://schemas.openxmlformats.org/markup-compatibility/2006">
+    <mc:Choice xmlns:p14="http://schemas.microsoft.com/office/powerpoint/2010/main" xmlns="" Requires="p14">
       <p:transition spd="med" p14:dur="700">
         <p:fade/>
       </p:transition>
     </mc:Choice>
-    <mc:Fallback xmlns="">
+    <mc:Fallback>
       <p:transition spd="med">
         <p:fade/>
       </p:transition>
@@ -14447,10 +15444,10 @@
           <p:nvPr/>
         </p:nvPicPr>
         <p:blipFill>
-          <a:blip r:embed="rId2">
+          <a:blip r:embed="rId2" cstate="print">
             <a:extLst>
               <a:ext uri="{28A0092B-C50C-407E-A947-70E740481C1C}">
-                <a14:useLocalDpi xmlns:a14="http://schemas.microsoft.com/office/drawing/2010/main" val="0"/>
+                <a14:useLocalDpi xmlns:a14="http://schemas.microsoft.com/office/drawing/2010/main" xmlns="" val="0"/>
               </a:ext>
             </a:extLst>
           </a:blip>
@@ -14473,14 +15470,14 @@
           </a:ln>
           <a:extLst>
             <a:ext uri="{909E8E84-426E-40DD-AFC4-6F175D3DCCD1}">
-              <a14:hiddenFill xmlns:a14="http://schemas.microsoft.com/office/drawing/2010/main">
+              <a14:hiddenFill xmlns:a14="http://schemas.microsoft.com/office/drawing/2010/main" xmlns="">
                 <a:solidFill>
                   <a:schemeClr val="accent1"/>
                 </a:solidFill>
               </a14:hiddenFill>
             </a:ext>
             <a:ext uri="{91240B29-F687-4F45-9708-019B960494DF}">
-              <a14:hiddenLine xmlns:a14="http://schemas.microsoft.com/office/drawing/2010/main" w="9525">
+              <a14:hiddenLine xmlns:a14="http://schemas.microsoft.com/office/drawing/2010/main" xmlns="" w="9525">
                 <a:solidFill>
                   <a:schemeClr val="tx1"/>
                 </a:solidFill>
@@ -14495,20 +15492,20 @@
     </p:spTree>
     <p:extLst>
       <p:ext uri="{BB962C8B-B14F-4D97-AF65-F5344CB8AC3E}">
-        <p14:creationId xmlns:p14="http://schemas.microsoft.com/office/powerpoint/2010/main" val="1393713661"/>
+        <p14:creationId xmlns:p14="http://schemas.microsoft.com/office/powerpoint/2010/main" xmlns="" val="1393713661"/>
       </p:ext>
     </p:extLst>
   </p:cSld>
   <p:clrMapOvr>
     <a:masterClrMapping/>
   </p:clrMapOvr>
-  <mc:AlternateContent xmlns:mc="http://schemas.openxmlformats.org/markup-compatibility/2006" xmlns:p14="http://schemas.microsoft.com/office/powerpoint/2010/main">
-    <mc:Choice Requires="p14">
+  <mc:AlternateContent xmlns:mc="http://schemas.openxmlformats.org/markup-compatibility/2006">
+    <mc:Choice xmlns:p14="http://schemas.microsoft.com/office/powerpoint/2010/main" xmlns="" Requires="p14">
       <p:transition spd="med" p14:dur="700">
         <p:fade/>
       </p:transition>
     </mc:Choice>
-    <mc:Fallback xmlns="">
+    <mc:Fallback>
       <p:transition spd="med">
         <p:fade/>
       </p:transition>

</xml_diff>

<commit_message>
agrego diapositiva sobre amenazas del siglo XXI
</commit_message>
<xml_diff>
--- a/Presentacion/Fuga de Información.pptx
+++ b/Presentacion/Fuga de Información.pptx
@@ -5,10 +5,10 @@
     <p:sldMasterId id="2147483648" r:id="rId2"/>
   </p:sldMasterIdLst>
   <p:notesMasterIdLst>
-    <p:notesMasterId r:id="rId43"/>
+    <p:notesMasterId r:id="rId44"/>
   </p:notesMasterIdLst>
   <p:handoutMasterIdLst>
-    <p:handoutMasterId r:id="rId44"/>
+    <p:handoutMasterId r:id="rId45"/>
   </p:handoutMasterIdLst>
   <p:sldIdLst>
     <p:sldId id="265" r:id="rId3"/>
@@ -38,24 +38,25 @@
     <p:sldId id="347" r:id="rId27"/>
     <p:sldId id="321" r:id="rId28"/>
     <p:sldId id="325" r:id="rId29"/>
-    <p:sldId id="326" r:id="rId30"/>
-    <p:sldId id="327" r:id="rId31"/>
-    <p:sldId id="363" r:id="rId32"/>
-    <p:sldId id="364" r:id="rId33"/>
-    <p:sldId id="365" r:id="rId34"/>
-    <p:sldId id="366" r:id="rId35"/>
-    <p:sldId id="367" r:id="rId36"/>
-    <p:sldId id="368" r:id="rId37"/>
-    <p:sldId id="362" r:id="rId38"/>
-    <p:sldId id="351" r:id="rId39"/>
-    <p:sldId id="352" r:id="rId40"/>
-    <p:sldId id="353" r:id="rId41"/>
-    <p:sldId id="319" r:id="rId42"/>
+    <p:sldId id="369" r:id="rId30"/>
+    <p:sldId id="326" r:id="rId31"/>
+    <p:sldId id="327" r:id="rId32"/>
+    <p:sldId id="363" r:id="rId33"/>
+    <p:sldId id="364" r:id="rId34"/>
+    <p:sldId id="365" r:id="rId35"/>
+    <p:sldId id="366" r:id="rId36"/>
+    <p:sldId id="367" r:id="rId37"/>
+    <p:sldId id="368" r:id="rId38"/>
+    <p:sldId id="362" r:id="rId39"/>
+    <p:sldId id="351" r:id="rId40"/>
+    <p:sldId id="352" r:id="rId41"/>
+    <p:sldId id="353" r:id="rId42"/>
+    <p:sldId id="319" r:id="rId43"/>
   </p:sldIdLst>
   <p:sldSz cx="12188825" cy="6858000"/>
   <p:notesSz cx="6858000" cy="9144000"/>
   <p:custDataLst>
-    <p:tags r:id="rId45"/>
+    <p:tags r:id="rId46"/>
   </p:custDataLst>
   <p:defaultTextStyle>
     <a:defPPr>
@@ -1172,7 +1173,7 @@
     </p:spTree>
     <p:extLst>
       <p:ext uri="{BB962C8B-B14F-4D97-AF65-F5344CB8AC3E}">
-        <p14:creationId xmlns:p14="http://schemas.microsoft.com/office/powerpoint/2010/main" val="913013488"/>
+        <p14:creationId xmlns:p14="http://schemas.microsoft.com/office/powerpoint/2010/main" val="2425724269"/>
       </p:ext>
     </p:extLst>
   </p:cSld>
@@ -1257,7 +1258,7 @@
     </p:spTree>
     <p:extLst>
       <p:ext uri="{BB962C8B-B14F-4D97-AF65-F5344CB8AC3E}">
-        <p14:creationId xmlns:p14="http://schemas.microsoft.com/office/powerpoint/2010/main" val="3326557915"/>
+        <p14:creationId xmlns:p14="http://schemas.microsoft.com/office/powerpoint/2010/main" val="913013488"/>
       </p:ext>
     </p:extLst>
   </p:cSld>
@@ -1342,7 +1343,7 @@
     </p:spTree>
     <p:extLst>
       <p:ext uri="{BB962C8B-B14F-4D97-AF65-F5344CB8AC3E}">
-        <p14:creationId xmlns:p14="http://schemas.microsoft.com/office/powerpoint/2010/main" val="3460376957"/>
+        <p14:creationId xmlns:p14="http://schemas.microsoft.com/office/powerpoint/2010/main" val="3326557915"/>
       </p:ext>
     </p:extLst>
   </p:cSld>
@@ -1419,6 +1420,91 @@
               <a:rPr lang="en-US" smtClean="0"/>
               <a:pPr/>
               <a:t>35</a:t>
+            </a:fld>
+            <a:endParaRPr lang="en-US"/>
+          </a:p>
+        </p:txBody>
+      </p:sp>
+    </p:spTree>
+    <p:extLst>
+      <p:ext uri="{BB962C8B-B14F-4D97-AF65-F5344CB8AC3E}">
+        <p14:creationId xmlns:p14="http://schemas.microsoft.com/office/powerpoint/2010/main" val="3460376957"/>
+      </p:ext>
+    </p:extLst>
+  </p:cSld>
+  <p:clrMapOvr>
+    <a:masterClrMapping/>
+  </p:clrMapOvr>
+</p:notes>
+</file>
+
+<file path=ppt/notesSlides/notesSlide14.xml><?xml version="1.0" encoding="utf-8"?>
+<p:notes xmlns:a="http://schemas.openxmlformats.org/drawingml/2006/main" xmlns:r="http://schemas.openxmlformats.org/officeDocument/2006/relationships" xmlns:p="http://schemas.openxmlformats.org/presentationml/2006/main">
+  <p:cSld>
+    <p:spTree>
+      <p:nvGrpSpPr>
+        <p:cNvPr id="1" name=""/>
+        <p:cNvGrpSpPr/>
+        <p:nvPr/>
+      </p:nvGrpSpPr>
+      <p:grpSpPr>
+        <a:xfrm>
+          <a:off x="0" y="0"/>
+          <a:ext cx="0" cy="0"/>
+          <a:chOff x="0" y="0"/>
+          <a:chExt cx="0" cy="0"/>
+        </a:xfrm>
+      </p:grpSpPr>
+      <p:sp>
+        <p:nvSpPr>
+          <p:cNvPr id="2" name="Slide Image Placeholder 1"/>
+          <p:cNvSpPr>
+            <a:spLocks noGrp="1" noRot="1" noChangeAspect="1"/>
+          </p:cNvSpPr>
+          <p:nvPr>
+            <p:ph type="sldImg"/>
+          </p:nvPr>
+        </p:nvSpPr>
+        <p:spPr/>
+      </p:sp>
+      <p:sp>
+        <p:nvSpPr>
+          <p:cNvPr id="3" name="Notes Placeholder 2"/>
+          <p:cNvSpPr>
+            <a:spLocks noGrp="1"/>
+          </p:cNvSpPr>
+          <p:nvPr>
+            <p:ph type="body" idx="1"/>
+          </p:nvPr>
+        </p:nvSpPr>
+        <p:spPr/>
+        <p:txBody>
+          <a:bodyPr/>
+          <a:lstStyle/>
+          <a:p>
+            <a:endParaRPr lang="en-US"/>
+          </a:p>
+        </p:txBody>
+      </p:sp>
+      <p:sp>
+        <p:nvSpPr>
+          <p:cNvPr id="4" name="Slide Number Placeholder 3"/>
+          <p:cNvSpPr>
+            <a:spLocks noGrp="1"/>
+          </p:cNvSpPr>
+          <p:nvPr>
+            <p:ph type="sldNum" sz="quarter" idx="10"/>
+          </p:nvPr>
+        </p:nvSpPr>
+        <p:spPr/>
+        <p:txBody>
+          <a:bodyPr/>
+          <a:lstStyle/>
+          <a:p>
+            <a:fld id="{F93199CD-3E1B-4AE6-990F-76F925F5EA9F}" type="slidenum">
+              <a:rPr lang="en-US" smtClean="0"/>
+              <a:pPr/>
+              <a:t>36</a:t>
             </a:fld>
             <a:endParaRPr lang="en-US"/>
           </a:p>
@@ -2814,6 +2900,340 @@
                 <a:ea typeface="+mn-ea"/>
                 <a:cs typeface="+mn-cs"/>
               </a:rPr>
+              <a:t>Los riesgos que intenta mitigar la seguridad informática pueden ser tanto de origen interno como externo.</a:t>
+            </a:r>
+            <a:endParaRPr lang="en-US" sz="1200" kern="1200" dirty="0" smtClean="0">
+              <a:solidFill>
+                <a:schemeClr val="tx1"/>
+              </a:solidFill>
+              <a:effectLst/>
+              <a:latin typeface="+mn-lt"/>
+              <a:ea typeface="+mn-ea"/>
+              <a:cs typeface="+mn-cs"/>
+            </a:endParaRPr>
+          </a:p>
+          <a:p>
+            <a:pPr marL="0" marR="0" indent="0" algn="l" defTabSz="914400" rtl="0" eaLnBrk="1" fontAlgn="auto" latinLnBrk="0" hangingPunct="1">
+              <a:lnSpc>
+                <a:spcPct val="100000"/>
+              </a:lnSpc>
+              <a:spcBef>
+                <a:spcPts val="0"/>
+              </a:spcBef>
+              <a:spcAft>
+                <a:spcPts val="0"/>
+              </a:spcAft>
+              <a:buClrTx/>
+              <a:buSzTx/>
+              <a:buFontTx/>
+              <a:buNone/>
+              <a:tabLst/>
+              <a:defRPr/>
+            </a:pPr>
+            <a:r>
+              <a:rPr lang="es-AR" sz="1200" kern="1200" dirty="0" smtClean="0">
+                <a:solidFill>
+                  <a:schemeClr val="tx1"/>
+                </a:solidFill>
+                <a:effectLst/>
+                <a:latin typeface="+mn-lt"/>
+                <a:ea typeface="+mn-ea"/>
+                <a:cs typeface="+mn-cs"/>
+              </a:rPr>
+              <a:t>Las amenazas principales que la seguridad informática trata de cubrir son:</a:t>
+            </a:r>
+            <a:endParaRPr lang="en-US" sz="1200" kern="1200" dirty="0" smtClean="0">
+              <a:solidFill>
+                <a:schemeClr val="tx1"/>
+              </a:solidFill>
+              <a:effectLst/>
+              <a:latin typeface="+mn-lt"/>
+              <a:ea typeface="+mn-ea"/>
+              <a:cs typeface="+mn-cs"/>
+            </a:endParaRPr>
+          </a:p>
+          <a:p>
+            <a:pPr marL="171450" lvl="0" indent="-171450">
+              <a:buFont typeface="Arial" panose="020B0604020202020204" pitchFamily="34" charset="0"/>
+              <a:buChar char="•"/>
+            </a:pPr>
+            <a:r>
+              <a:rPr lang="es-AR" u="none" strike="noStrike" dirty="0" smtClean="0">
+                <a:effectLst/>
+              </a:rPr>
+              <a:t>Usuarios: los usuarios pueden ser intencional o </a:t>
+            </a:r>
+            <a:r>
+              <a:rPr lang="es-AR" u="none" strike="noStrike" dirty="0" err="1" smtClean="0">
+                <a:effectLst/>
+              </a:rPr>
+              <a:t>inintencionalmente</a:t>
+            </a:r>
+            <a:r>
+              <a:rPr lang="es-AR" u="none" strike="noStrike" dirty="0" smtClean="0">
+                <a:effectLst/>
+              </a:rPr>
+              <a:t> responsables de fugas de información. Esto puede ser por ejemplo porque no se definieron bien sus perfiles de acceso.</a:t>
+            </a:r>
+            <a:endParaRPr lang="en-US" u="none" strike="noStrike" dirty="0" smtClean="0">
+              <a:effectLst/>
+            </a:endParaRPr>
+          </a:p>
+          <a:p>
+            <a:pPr marL="171450" lvl="0" indent="-171450">
+              <a:buFont typeface="Arial" panose="020B0604020202020204" pitchFamily="34" charset="0"/>
+              <a:buChar char="•"/>
+            </a:pPr>
+            <a:r>
+              <a:rPr lang="es-AR" u="none" strike="noStrike" dirty="0" smtClean="0">
+                <a:effectLst/>
+              </a:rPr>
+              <a:t>Programas maliciosos: son instalados intencionalmente o por error. Pueden dañar los datos existentes, abrir la puerta a intrusos, impedir accesos a programas, enviar información a un tercero, etc.</a:t>
+            </a:r>
+            <a:endParaRPr lang="en-US" u="none" strike="noStrike" dirty="0" smtClean="0">
+              <a:effectLst/>
+            </a:endParaRPr>
+          </a:p>
+          <a:p>
+            <a:pPr marL="171450" lvl="0" indent="-171450">
+              <a:buFont typeface="Arial" panose="020B0604020202020204" pitchFamily="34" charset="0"/>
+              <a:buChar char="•"/>
+            </a:pPr>
+            <a:r>
+              <a:rPr lang="es-AR" u="none" strike="noStrike" dirty="0" smtClean="0">
+                <a:effectLst/>
+              </a:rPr>
+              <a:t>Errores de programación: errores o fallas en programación que pueden dar libre acceso a crackers. Un ejemplo es la reciente vulnerabilidad encontrada en </a:t>
+            </a:r>
+            <a:r>
+              <a:rPr lang="es-AR" u="none" strike="noStrike" dirty="0" err="1" smtClean="0">
+                <a:effectLst/>
+              </a:rPr>
+              <a:t>OpenSSL</a:t>
+            </a:r>
+            <a:r>
+              <a:rPr lang="es-AR" u="none" strike="noStrike" dirty="0" smtClean="0">
+                <a:effectLst/>
+              </a:rPr>
+              <a:t> o el problema en los cajeros automáticos que permitía sacar dinero libremente.</a:t>
+            </a:r>
+            <a:endParaRPr lang="en-US" u="none" strike="noStrike" dirty="0" smtClean="0">
+              <a:effectLst/>
+            </a:endParaRPr>
+          </a:p>
+          <a:p>
+            <a:pPr marL="171450" lvl="0" indent="-171450">
+              <a:buFont typeface="Arial" panose="020B0604020202020204" pitchFamily="34" charset="0"/>
+              <a:buChar char="•"/>
+            </a:pPr>
+            <a:r>
+              <a:rPr lang="es-AR" u="none" strike="noStrike" dirty="0" smtClean="0">
+                <a:effectLst/>
+              </a:rPr>
+              <a:t>Accesos no autorizados/intrusos: un tercero no autorizado que accede a la información dentro de una computadora. Comúnmente se los conoce como hackers.</a:t>
+            </a:r>
+            <a:endParaRPr lang="en-US" u="none" strike="noStrike" dirty="0" smtClean="0">
+              <a:effectLst/>
+            </a:endParaRPr>
+          </a:p>
+          <a:p>
+            <a:pPr marL="171450" lvl="0" indent="-171450">
+              <a:buFont typeface="Arial" panose="020B0604020202020204" pitchFamily="34" charset="0"/>
+              <a:buChar char="•"/>
+            </a:pPr>
+            <a:r>
+              <a:rPr lang="es-AR" u="none" strike="noStrike" dirty="0" smtClean="0">
+                <a:effectLst/>
+              </a:rPr>
+              <a:t>Robos de componentes de hardware (discos o memoria) que contienen información</a:t>
+            </a:r>
+            <a:endParaRPr lang="en-US" u="none" strike="noStrike" dirty="0" smtClean="0">
+              <a:effectLst/>
+            </a:endParaRPr>
+          </a:p>
+          <a:p>
+            <a:pPr marL="171450" lvl="0" indent="-171450">
+              <a:buFont typeface="Arial" panose="020B0604020202020204" pitchFamily="34" charset="0"/>
+              <a:buChar char="•"/>
+            </a:pPr>
+            <a:r>
+              <a:rPr lang="es-AR" u="none" strike="noStrike" dirty="0" smtClean="0">
+                <a:effectLst/>
+              </a:rPr>
+              <a:t>Desastres no previstos como inundaciones, incendios, relámpagos, </a:t>
+            </a:r>
+            <a:r>
+              <a:rPr lang="es-AR" u="none" strike="noStrike" dirty="0" err="1" smtClean="0">
+                <a:effectLst/>
+              </a:rPr>
+              <a:t>etc</a:t>
+            </a:r>
+            <a:r>
+              <a:rPr lang="es-AR" u="none" strike="noStrike" dirty="0" smtClean="0">
+                <a:effectLst/>
+              </a:rPr>
+              <a:t>, que produzcan pérdida de información irrecuperable.</a:t>
+            </a:r>
+            <a:endParaRPr lang="en-US" u="none" strike="noStrike" dirty="0" smtClean="0">
+              <a:effectLst/>
+            </a:endParaRPr>
+          </a:p>
+          <a:p>
+            <a:pPr marL="171450" lvl="0" indent="-171450">
+              <a:buFont typeface="Arial" panose="020B0604020202020204" pitchFamily="34" charset="0"/>
+              <a:buChar char="•"/>
+            </a:pPr>
+            <a:r>
+              <a:rPr lang="es-AR" u="none" strike="noStrike" dirty="0" smtClean="0">
+                <a:effectLst/>
+              </a:rPr>
+              <a:t>Personal interno de la empresa que, por extorsión, enfado hacia la empresa o fin de obtener dinero, roben información para venderla a la competencia.</a:t>
+            </a:r>
+            <a:endParaRPr lang="en-US" u="none" strike="noStrike" dirty="0" smtClean="0">
+              <a:effectLst/>
+            </a:endParaRPr>
+          </a:p>
+          <a:p>
+            <a:pPr marL="171450" lvl="0" indent="-171450">
+              <a:buFont typeface="Arial" panose="020B0604020202020204" pitchFamily="34" charset="0"/>
+              <a:buChar char="•"/>
+            </a:pPr>
+            <a:r>
+              <a:rPr lang="es-AR" u="none" strike="noStrike" dirty="0" smtClean="0">
+                <a:effectLst/>
+              </a:rPr>
+              <a:t>Fallos de hardware	</a:t>
+            </a:r>
+            <a:endParaRPr lang="en-US" u="none" strike="noStrike" dirty="0" smtClean="0">
+              <a:effectLst/>
+            </a:endParaRPr>
+          </a:p>
+          <a:p>
+            <a:pPr marL="171450" lvl="0" indent="-171450">
+              <a:buFont typeface="Arial" panose="020B0604020202020204" pitchFamily="34" charset="0"/>
+              <a:buChar char="•"/>
+            </a:pPr>
+            <a:r>
+              <a:rPr lang="es-AR" u="none" strike="noStrike" dirty="0" smtClean="0">
+                <a:effectLst/>
+              </a:rPr>
+              <a:t>Catástrofes naturales</a:t>
+            </a:r>
+            <a:endParaRPr lang="en-US" u="none" strike="noStrike" dirty="0" smtClean="0">
+              <a:effectLst/>
+            </a:endParaRPr>
+          </a:p>
+          <a:p>
+            <a:pPr marL="171450" lvl="0" indent="-171450">
+              <a:buFont typeface="Arial" panose="020B0604020202020204" pitchFamily="34" charset="0"/>
+              <a:buChar char="•"/>
+            </a:pPr>
+            <a:r>
+              <a:rPr lang="es-AR" u="none" strike="noStrike" dirty="0" err="1" smtClean="0">
+                <a:effectLst/>
+              </a:rPr>
+              <a:t>Phishing</a:t>
+            </a:r>
+            <a:endParaRPr lang="en-US" u="none" strike="noStrike" dirty="0" smtClean="0">
+              <a:effectLst/>
+            </a:endParaRPr>
+          </a:p>
+          <a:p>
+            <a:endParaRPr lang="en-US" dirty="0"/>
+          </a:p>
+        </p:txBody>
+      </p:sp>
+      <p:sp>
+        <p:nvSpPr>
+          <p:cNvPr id="4" name="Slide Number Placeholder 3"/>
+          <p:cNvSpPr>
+            <a:spLocks noGrp="1"/>
+          </p:cNvSpPr>
+          <p:nvPr>
+            <p:ph type="sldNum" sz="quarter" idx="10"/>
+          </p:nvPr>
+        </p:nvSpPr>
+        <p:spPr/>
+        <p:txBody>
+          <a:bodyPr/>
+          <a:lstStyle/>
+          <a:p>
+            <a:fld id="{F93199CD-3E1B-4AE6-990F-76F925F5EA9F}" type="slidenum">
+              <a:rPr lang="en-US" smtClean="0"/>
+              <a:pPr/>
+              <a:t>28</a:t>
+            </a:fld>
+            <a:endParaRPr lang="en-US"/>
+          </a:p>
+        </p:txBody>
+      </p:sp>
+    </p:spTree>
+    <p:extLst>
+      <p:ext uri="{BB962C8B-B14F-4D97-AF65-F5344CB8AC3E}">
+        <p14:creationId xmlns:p14="http://schemas.microsoft.com/office/powerpoint/2010/main" val="1629614161"/>
+      </p:ext>
+    </p:extLst>
+  </p:cSld>
+  <p:clrMapOvr>
+    <a:masterClrMapping/>
+  </p:clrMapOvr>
+</p:notes>
+</file>
+
+<file path=ppt/notesSlides/notesSlide7.xml><?xml version="1.0" encoding="utf-8"?>
+<p:notes xmlns:a="http://schemas.openxmlformats.org/drawingml/2006/main" xmlns:r="http://schemas.openxmlformats.org/officeDocument/2006/relationships" xmlns:p="http://schemas.openxmlformats.org/presentationml/2006/main">
+  <p:cSld>
+    <p:spTree>
+      <p:nvGrpSpPr>
+        <p:cNvPr id="1" name=""/>
+        <p:cNvGrpSpPr/>
+        <p:nvPr/>
+      </p:nvGrpSpPr>
+      <p:grpSpPr>
+        <a:xfrm>
+          <a:off x="0" y="0"/>
+          <a:ext cx="0" cy="0"/>
+          <a:chOff x="0" y="0"/>
+          <a:chExt cx="0" cy="0"/>
+        </a:xfrm>
+      </p:grpSpPr>
+      <p:sp>
+        <p:nvSpPr>
+          <p:cNvPr id="2" name="Slide Image Placeholder 1"/>
+          <p:cNvSpPr>
+            <a:spLocks noGrp="1" noRot="1" noChangeAspect="1"/>
+          </p:cNvSpPr>
+          <p:nvPr>
+            <p:ph type="sldImg"/>
+          </p:nvPr>
+        </p:nvSpPr>
+        <p:spPr/>
+      </p:sp>
+      <p:sp>
+        <p:nvSpPr>
+          <p:cNvPr id="3" name="Notes Placeholder 2"/>
+          <p:cNvSpPr>
+            <a:spLocks noGrp="1"/>
+          </p:cNvSpPr>
+          <p:nvPr>
+            <p:ph type="body" idx="1"/>
+          </p:nvPr>
+        </p:nvSpPr>
+        <p:spPr/>
+        <p:txBody>
+          <a:bodyPr/>
+          <a:lstStyle/>
+          <a:p>
+            <a:r>
+              <a:rPr lang="es-AR" sz="1200" kern="1200" dirty="0" smtClean="0">
+                <a:solidFill>
+                  <a:schemeClr val="tx1"/>
+                </a:solidFill>
+                <a:effectLst/>
+                <a:latin typeface="+mn-lt"/>
+                <a:ea typeface="+mn-ea"/>
+                <a:cs typeface="+mn-cs"/>
+              </a:rPr>
               <a:t>Una </a:t>
             </a:r>
             <a:r>
@@ -3004,7 +3424,10 @@
             </a:endParaRPr>
           </a:p>
           <a:p>
-            <a:pPr lvl="0"/>
+            <a:pPr marL="171450" lvl="0" indent="-171450">
+              <a:buFont typeface="Arial" panose="020B0604020202020204" pitchFamily="34" charset="0"/>
+              <a:buChar char="•"/>
+            </a:pPr>
             <a:r>
               <a:rPr lang="es-AR" sz="1200" u="none" strike="noStrike" kern="1200" dirty="0" smtClean="0">
                 <a:solidFill>
@@ -3022,7 +3445,10 @@
             </a:endParaRPr>
           </a:p>
           <a:p>
-            <a:pPr lvl="0"/>
+            <a:pPr marL="171450" lvl="0" indent="-171450">
+              <a:buFont typeface="Arial" panose="020B0604020202020204" pitchFamily="34" charset="0"/>
+              <a:buChar char="•"/>
+            </a:pPr>
             <a:r>
               <a:rPr lang="es-AR" sz="1200" u="none" strike="noStrike" kern="1200" dirty="0" smtClean="0">
                 <a:solidFill>
@@ -3040,7 +3466,10 @@
             </a:endParaRPr>
           </a:p>
           <a:p>
-            <a:pPr lvl="0"/>
+            <a:pPr marL="171450" lvl="0" indent="-171450">
+              <a:buFont typeface="Arial" panose="020B0604020202020204" pitchFamily="34" charset="0"/>
+              <a:buChar char="•"/>
+            </a:pPr>
             <a:r>
               <a:rPr lang="es-AR" sz="1200" u="none" strike="noStrike" kern="1200" dirty="0" smtClean="0">
                 <a:solidFill>
@@ -3058,7 +3487,10 @@
             </a:endParaRPr>
           </a:p>
           <a:p>
-            <a:pPr lvl="0"/>
+            <a:pPr marL="171450" lvl="0" indent="-171450">
+              <a:buFont typeface="Arial" panose="020B0604020202020204" pitchFamily="34" charset="0"/>
+              <a:buChar char="•"/>
+            </a:pPr>
             <a:r>
               <a:rPr lang="es-AR" sz="1200" u="none" strike="noStrike" kern="1200" dirty="0" smtClean="0">
                 <a:solidFill>
@@ -3076,7 +3508,10 @@
             </a:endParaRPr>
           </a:p>
           <a:p>
-            <a:pPr lvl="0"/>
+            <a:pPr marL="171450" lvl="0" indent="-171450">
+              <a:buFont typeface="Arial" panose="020B0604020202020204" pitchFamily="34" charset="0"/>
+              <a:buChar char="•"/>
+            </a:pPr>
             <a:r>
               <a:rPr lang="es-AR" sz="1200" u="none" strike="noStrike" kern="1200" dirty="0" smtClean="0">
                 <a:solidFill>
@@ -3094,7 +3529,10 @@
             </a:endParaRPr>
           </a:p>
           <a:p>
-            <a:pPr lvl="0"/>
+            <a:pPr marL="171450" lvl="0" indent="-171450">
+              <a:buFont typeface="Arial" panose="020B0604020202020204" pitchFamily="34" charset="0"/>
+              <a:buChar char="•"/>
+            </a:pPr>
             <a:r>
               <a:rPr lang="es-AR" sz="1200" u="none" strike="noStrike" kern="1200" dirty="0" smtClean="0">
                 <a:solidFill>
@@ -3112,7 +3550,10 @@
             </a:endParaRPr>
           </a:p>
           <a:p>
-            <a:pPr lvl="0"/>
+            <a:pPr marL="171450" lvl="0" indent="-171450">
+              <a:buFont typeface="Arial" panose="020B0604020202020204" pitchFamily="34" charset="0"/>
+              <a:buChar char="•"/>
+            </a:pPr>
             <a:r>
               <a:rPr lang="es-AR" sz="1200" u="none" strike="noStrike" kern="1200" dirty="0" smtClean="0">
                 <a:solidFill>
@@ -3130,7 +3571,10 @@
             </a:endParaRPr>
           </a:p>
           <a:p>
-            <a:pPr lvl="0"/>
+            <a:pPr marL="171450" lvl="0" indent="-171450">
+              <a:buFont typeface="Arial" panose="020B0604020202020204" pitchFamily="34" charset="0"/>
+              <a:buChar char="•"/>
+            </a:pPr>
             <a:r>
               <a:rPr lang="es-AR" sz="1200" u="none" strike="noStrike" kern="1200" dirty="0" smtClean="0">
                 <a:solidFill>
@@ -3148,7 +3592,10 @@
             </a:endParaRPr>
           </a:p>
           <a:p>
-            <a:pPr lvl="0"/>
+            <a:pPr marL="171450" lvl="0" indent="-171450">
+              <a:buFont typeface="Arial" panose="020B0604020202020204" pitchFamily="34" charset="0"/>
+              <a:buChar char="•"/>
+            </a:pPr>
             <a:r>
               <a:rPr lang="es-AR" sz="1200" u="none" strike="noStrike" kern="1200" dirty="0" smtClean="0">
                 <a:solidFill>
@@ -3166,7 +3613,10 @@
             </a:endParaRPr>
           </a:p>
           <a:p>
-            <a:pPr lvl="0"/>
+            <a:pPr marL="171450" lvl="0" indent="-171450">
+              <a:buFont typeface="Arial" panose="020B0604020202020204" pitchFamily="34" charset="0"/>
+              <a:buChar char="•"/>
+            </a:pPr>
             <a:r>
               <a:rPr lang="es-AR" sz="1200" u="none" strike="noStrike" kern="1200" dirty="0" smtClean="0">
                 <a:solidFill>
@@ -3184,7 +3634,10 @@
             </a:endParaRPr>
           </a:p>
           <a:p>
-            <a:pPr lvl="0"/>
+            <a:pPr marL="171450" lvl="0" indent="-171450">
+              <a:buFont typeface="Arial" panose="020B0604020202020204" pitchFamily="34" charset="0"/>
+              <a:buChar char="•"/>
+            </a:pPr>
             <a:r>
               <a:rPr lang="es-AR" sz="1200" u="none" strike="noStrike" kern="1200" dirty="0" smtClean="0">
                 <a:solidFill>
@@ -3202,7 +3655,10 @@
             </a:endParaRPr>
           </a:p>
           <a:p>
-            <a:pPr lvl="0"/>
+            <a:pPr marL="171450" lvl="0" indent="-171450">
+              <a:buFont typeface="Arial" panose="020B0604020202020204" pitchFamily="34" charset="0"/>
+              <a:buChar char="•"/>
+            </a:pPr>
             <a:r>
               <a:rPr lang="es-AR" sz="1200" u="none" strike="noStrike" kern="1200" dirty="0" smtClean="0">
                 <a:solidFill>
@@ -3213,136 +3669,10 @@
                 <a:ea typeface="+mn-ea"/>
                 <a:cs typeface="+mn-cs"/>
               </a:rPr>
-              <a:t>Políticas de recuperación ante catástrofes</a:t>
-            </a:r>
-            <a:endParaRPr lang="en-US" u="none" strike="noStrike" dirty="0" smtClean="0">
-              <a:effectLst/>
-            </a:endParaRPr>
-          </a:p>
-          <a:p>
-            <a:pPr marL="0" marR="0" indent="0" algn="l" defTabSz="914400" rtl="0" eaLnBrk="1" fontAlgn="auto" latinLnBrk="0" hangingPunct="1">
-              <a:lnSpc>
-                <a:spcPct val="100000"/>
-              </a:lnSpc>
-              <a:spcBef>
-                <a:spcPts val="0"/>
-              </a:spcBef>
-              <a:spcAft>
-                <a:spcPts val="0"/>
-              </a:spcAft>
-              <a:buClrTx/>
-              <a:buSzTx/>
-              <a:buFontTx/>
-              <a:buNone/>
-              <a:tabLst/>
-              <a:defRPr/>
-            </a:pPr>
-            <a:endParaRPr lang="en-US" sz="1200" kern="1200" dirty="0" smtClean="0">
-              <a:solidFill>
-                <a:schemeClr val="tx1"/>
-              </a:solidFill>
-              <a:effectLst/>
-              <a:latin typeface="+mn-lt"/>
-              <a:ea typeface="+mn-ea"/>
-              <a:cs typeface="+mn-cs"/>
-            </a:endParaRPr>
-          </a:p>
-          <a:p>
-            <a:endParaRPr lang="en-US" sz="1200" kern="1200" dirty="0">
-              <a:solidFill>
-                <a:schemeClr val="tx1"/>
-              </a:solidFill>
-              <a:effectLst/>
-              <a:latin typeface="+mn-lt"/>
-              <a:ea typeface="+mn-ea"/>
-              <a:cs typeface="+mn-cs"/>
-            </a:endParaRPr>
-          </a:p>
-        </p:txBody>
-      </p:sp>
-      <p:sp>
-        <p:nvSpPr>
-          <p:cNvPr id="4" name="Slide Number Placeholder 3"/>
-          <p:cNvSpPr>
-            <a:spLocks noGrp="1"/>
-          </p:cNvSpPr>
-          <p:nvPr>
-            <p:ph type="sldNum" sz="quarter" idx="10"/>
-          </p:nvPr>
-        </p:nvSpPr>
-        <p:spPr/>
-        <p:txBody>
-          <a:bodyPr/>
-          <a:lstStyle/>
-          <a:p>
-            <a:fld id="{F93199CD-3E1B-4AE6-990F-76F925F5EA9F}" type="slidenum">
-              <a:rPr lang="en-US" smtClean="0"/>
-              <a:pPr/>
-              <a:t>28</a:t>
-            </a:fld>
-            <a:endParaRPr lang="en-US"/>
-          </a:p>
-        </p:txBody>
-      </p:sp>
-    </p:spTree>
-    <p:extLst>
-      <p:ext uri="{BB962C8B-B14F-4D97-AF65-F5344CB8AC3E}">
-        <p14:creationId xmlns:p14="http://schemas.microsoft.com/office/powerpoint/2010/main" val="2488318766"/>
-      </p:ext>
-    </p:extLst>
-  </p:cSld>
-  <p:clrMapOvr>
-    <a:masterClrMapping/>
-  </p:clrMapOvr>
-</p:notes>
-</file>
-
-<file path=ppt/notesSlides/notesSlide7.xml><?xml version="1.0" encoding="utf-8"?>
-<p:notes xmlns:a="http://schemas.openxmlformats.org/drawingml/2006/main" xmlns:r="http://schemas.openxmlformats.org/officeDocument/2006/relationships" xmlns:p="http://schemas.openxmlformats.org/presentationml/2006/main">
-  <p:cSld>
-    <p:spTree>
-      <p:nvGrpSpPr>
-        <p:cNvPr id="1" name=""/>
-        <p:cNvGrpSpPr/>
-        <p:nvPr/>
-      </p:nvGrpSpPr>
-      <p:grpSpPr>
-        <a:xfrm>
-          <a:off x="0" y="0"/>
-          <a:ext cx="0" cy="0"/>
-          <a:chOff x="0" y="0"/>
-          <a:chExt cx="0" cy="0"/>
-        </a:xfrm>
-      </p:grpSpPr>
-      <p:sp>
-        <p:nvSpPr>
-          <p:cNvPr id="2" name="Slide Image Placeholder 1"/>
-          <p:cNvSpPr>
-            <a:spLocks noGrp="1" noRot="1" noChangeAspect="1"/>
-          </p:cNvSpPr>
-          <p:nvPr>
-            <p:ph type="sldImg"/>
-          </p:nvPr>
-        </p:nvSpPr>
-        <p:spPr/>
-      </p:sp>
-      <p:sp>
-        <p:nvSpPr>
-          <p:cNvPr id="3" name="Notes Placeholder 2"/>
-          <p:cNvSpPr>
-            <a:spLocks noGrp="1"/>
-          </p:cNvSpPr>
-          <p:nvPr>
-            <p:ph type="body" idx="1"/>
-          </p:nvPr>
-        </p:nvSpPr>
-        <p:spPr/>
-        <p:txBody>
-          <a:bodyPr/>
-          <a:lstStyle/>
-          <a:p>
-            <a:r>
-              <a:rPr lang="es-AR" sz="1200" b="1" kern="1200" dirty="0" smtClean="0">
+              <a:t>Políticas de recuperación ante </a:t>
+            </a:r>
+            <a:r>
+              <a:rPr lang="es-AR" sz="1200" u="none" strike="noStrike" kern="1200" dirty="0" smtClean="0">
                 <a:solidFill>
                   <a:schemeClr val="tx1"/>
                 </a:solidFill>
@@ -3351,457 +3681,10 @@
                 <a:ea typeface="+mn-ea"/>
                 <a:cs typeface="+mn-cs"/>
               </a:rPr>
-              <a:t>Auditorías</a:t>
-            </a:r>
-            <a:endParaRPr lang="en-US" sz="1200" b="1" kern="1200" dirty="0" smtClean="0">
-              <a:solidFill>
-                <a:schemeClr val="tx1"/>
-              </a:solidFill>
-              <a:effectLst/>
-              <a:latin typeface="+mn-lt"/>
-              <a:ea typeface="+mn-ea"/>
-              <a:cs typeface="+mn-cs"/>
-            </a:endParaRPr>
-          </a:p>
-          <a:p>
-            <a:r>
-              <a:rPr lang="es-AR" sz="1200" kern="1200" dirty="0" smtClean="0">
-                <a:solidFill>
-                  <a:schemeClr val="tx1"/>
-                </a:solidFill>
-                <a:effectLst/>
-                <a:latin typeface="+mn-lt"/>
-                <a:ea typeface="+mn-ea"/>
-                <a:cs typeface="+mn-cs"/>
-              </a:rPr>
-              <a:t> </a:t>
-            </a:r>
-            <a:endParaRPr lang="en-US" sz="1200" kern="1200" dirty="0" smtClean="0">
-              <a:solidFill>
-                <a:schemeClr val="tx1"/>
-              </a:solidFill>
-              <a:effectLst/>
-              <a:latin typeface="+mn-lt"/>
-              <a:ea typeface="+mn-ea"/>
-              <a:cs typeface="+mn-cs"/>
-            </a:endParaRPr>
-          </a:p>
-          <a:p>
-            <a:r>
-              <a:rPr lang="es-AR" sz="1200" kern="1200" dirty="0" smtClean="0">
-                <a:solidFill>
-                  <a:schemeClr val="tx1"/>
-                </a:solidFill>
-                <a:effectLst/>
-                <a:latin typeface="+mn-lt"/>
-                <a:ea typeface="+mn-ea"/>
-                <a:cs typeface="+mn-cs"/>
-              </a:rPr>
-              <a:t>En las empresas, para facilitar la trazabilidad de las acciones de los usuarios, se suelen incluir procedimientos mediante los que se garantiza que el uso de los activos de información es efectivamente auditado y que es posible generar </a:t>
-            </a:r>
-            <a:r>
-              <a:rPr lang="es-AR" sz="1200" b="1" kern="1200" dirty="0" smtClean="0">
-                <a:solidFill>
-                  <a:schemeClr val="tx1"/>
-                </a:solidFill>
-                <a:effectLst/>
-                <a:latin typeface="+mn-lt"/>
-                <a:ea typeface="+mn-ea"/>
-                <a:cs typeface="+mn-cs"/>
-              </a:rPr>
-              <a:t>registros (</a:t>
-            </a:r>
-            <a:r>
-              <a:rPr lang="es-AR" sz="1200" b="1" i="1" kern="1200" dirty="0" err="1" smtClean="0">
-                <a:solidFill>
-                  <a:schemeClr val="tx1"/>
-                </a:solidFill>
-                <a:effectLst/>
-                <a:latin typeface="+mn-lt"/>
-                <a:ea typeface="+mn-ea"/>
-                <a:cs typeface="+mn-cs"/>
-              </a:rPr>
-              <a:t>logs</a:t>
-            </a:r>
-            <a:r>
-              <a:rPr lang="es-AR" sz="1200" b="1" kern="1200" dirty="0" smtClean="0">
-                <a:solidFill>
-                  <a:schemeClr val="tx1"/>
-                </a:solidFill>
-                <a:effectLst/>
-                <a:latin typeface="+mn-lt"/>
-                <a:ea typeface="+mn-ea"/>
-                <a:cs typeface="+mn-cs"/>
-              </a:rPr>
-              <a:t>) de las acciones importantes</a:t>
-            </a:r>
-            <a:r>
-              <a:rPr lang="es-AR" sz="1200" kern="1200" dirty="0" smtClean="0">
-                <a:solidFill>
-                  <a:schemeClr val="tx1"/>
-                </a:solidFill>
-                <a:effectLst/>
-                <a:latin typeface="+mn-lt"/>
-                <a:ea typeface="+mn-ea"/>
-                <a:cs typeface="+mn-cs"/>
-              </a:rPr>
-              <a:t> que se hayan definido, que si bien es un proceso técnico, implica un conocimiento de los individuos respecto a su grado de responsabilidad en lo que realizan dentro de una empresa. El conocimiento de la vinculación entre las personas y sus accesos puede evitar en gran medida la fuga de información, ya que en caso de filtrarse hacia el exterior, se podría señalar de manera directa a todos aquellos que tuvieron acceso y se podría analizar su uso previo al incidente, obteniendo posibles conclusiones y responsables. De cualquier manera, dada la imposibilidad de monitorear a las personas más allá de la esfera laboral, es estrictamente necesario que exista un alto grado de concientización y que las políticas de seguridad estén correctamente aplicadas para garantizar que quienes manejen información confidencial tengan asumidos los riesgos relacionados con su filtración.</a:t>
-            </a:r>
-          </a:p>
-          <a:p>
-            <a:endParaRPr lang="es-AR" sz="1200" b="1" kern="1200" dirty="0" smtClean="0">
-              <a:solidFill>
-                <a:schemeClr val="tx1"/>
-              </a:solidFill>
-              <a:effectLst/>
-              <a:latin typeface="+mn-lt"/>
-              <a:ea typeface="+mn-ea"/>
-              <a:cs typeface="+mn-cs"/>
-            </a:endParaRPr>
-          </a:p>
-          <a:p>
-            <a:r>
-              <a:rPr lang="es-AR" sz="1200" b="1" kern="1200" dirty="0" smtClean="0">
-                <a:solidFill>
-                  <a:schemeClr val="tx1"/>
-                </a:solidFill>
-                <a:effectLst/>
-                <a:latin typeface="+mn-lt"/>
-                <a:ea typeface="+mn-ea"/>
-                <a:cs typeface="+mn-cs"/>
-              </a:rPr>
-              <a:t>Utilización de estándares internacionales</a:t>
-            </a:r>
-            <a:endParaRPr lang="en-US" sz="1200" b="1" kern="1200" dirty="0" smtClean="0">
-              <a:solidFill>
-                <a:schemeClr val="tx1"/>
-              </a:solidFill>
-              <a:effectLst/>
-              <a:latin typeface="+mn-lt"/>
-              <a:ea typeface="+mn-ea"/>
-              <a:cs typeface="+mn-cs"/>
-            </a:endParaRPr>
-          </a:p>
-          <a:p>
-            <a:r>
-              <a:rPr lang="es-AR" sz="1200" kern="1200" dirty="0" smtClean="0">
-                <a:solidFill>
-                  <a:schemeClr val="tx1"/>
-                </a:solidFill>
-                <a:effectLst/>
-                <a:latin typeface="+mn-lt"/>
-                <a:ea typeface="+mn-ea"/>
-                <a:cs typeface="+mn-cs"/>
-              </a:rPr>
-              <a:t> </a:t>
-            </a:r>
-            <a:endParaRPr lang="en-US" sz="1200" kern="1200" dirty="0" smtClean="0">
-              <a:solidFill>
-                <a:schemeClr val="tx1"/>
-              </a:solidFill>
-              <a:effectLst/>
-              <a:latin typeface="+mn-lt"/>
-              <a:ea typeface="+mn-ea"/>
-              <a:cs typeface="+mn-cs"/>
-            </a:endParaRPr>
-          </a:p>
-          <a:p>
-            <a:r>
-              <a:rPr lang="es-AR" sz="1200" kern="1200" dirty="0" smtClean="0">
-                <a:solidFill>
-                  <a:schemeClr val="tx1"/>
-                </a:solidFill>
-                <a:effectLst/>
-                <a:latin typeface="+mn-lt"/>
-                <a:ea typeface="+mn-ea"/>
-                <a:cs typeface="+mn-cs"/>
-              </a:rPr>
-              <a:t>Para la mayoría de las actividades es necesario basarse en estándares, normalmente de alcance internacional, y normativas vinculadas a lo que se quiera organizar. La fuga de información está contemplada dentro de la gestión de la seguridad, y como tal se describen contramedidas y técnicas en distintos estándares. Así pues, se apela con frecuencia a la serie de normas ISO 27000, que está especialmente dedicada a seguridad de la información. Dentro de esta familia se encuentran específicamente algunas normas como lo son la 27001, referida a los requisitos para implementar un sistema de gestión de seguridad, la 27002 que define las mejores prácticas, la 27004 que habla sobre las métricas, la 27005 que trata sobre la gestión de riesgos, entre otras.</a:t>
-            </a:r>
-            <a:endParaRPr lang="en-US" sz="1200" kern="1200" dirty="0" smtClean="0">
-              <a:solidFill>
-                <a:schemeClr val="tx1"/>
-              </a:solidFill>
-              <a:effectLst/>
-              <a:latin typeface="+mn-lt"/>
-              <a:ea typeface="+mn-ea"/>
-              <a:cs typeface="+mn-cs"/>
-            </a:endParaRPr>
-          </a:p>
-          <a:p>
-            <a:r>
-              <a:rPr lang="es-AR" sz="1200" kern="1200" dirty="0" smtClean="0">
-                <a:solidFill>
-                  <a:schemeClr val="tx1"/>
-                </a:solidFill>
-                <a:effectLst/>
-                <a:latin typeface="+mn-lt"/>
-                <a:ea typeface="+mn-ea"/>
-                <a:cs typeface="+mn-cs"/>
-              </a:rPr>
-              <a:t> </a:t>
-            </a:r>
-            <a:endParaRPr lang="en-US" sz="1200" kern="1200" dirty="0" smtClean="0">
-              <a:solidFill>
-                <a:schemeClr val="tx1"/>
-              </a:solidFill>
-              <a:effectLst/>
-              <a:latin typeface="+mn-lt"/>
-              <a:ea typeface="+mn-ea"/>
-              <a:cs typeface="+mn-cs"/>
-            </a:endParaRPr>
-          </a:p>
-          <a:p>
-            <a:r>
-              <a:rPr lang="es-AR" sz="1200" b="1" kern="1200" dirty="0" smtClean="0">
-                <a:solidFill>
-                  <a:schemeClr val="tx1"/>
-                </a:solidFill>
-                <a:effectLst/>
-                <a:latin typeface="+mn-lt"/>
-                <a:ea typeface="+mn-ea"/>
-                <a:cs typeface="+mn-cs"/>
-              </a:rPr>
-              <a:t>Uso de </a:t>
-            </a:r>
-            <a:r>
-              <a:rPr lang="es-AR" sz="1200" b="1" i="1" kern="1200" dirty="0" err="1" smtClean="0">
-                <a:solidFill>
-                  <a:schemeClr val="tx1"/>
-                </a:solidFill>
-                <a:effectLst/>
-                <a:latin typeface="+mn-lt"/>
-                <a:ea typeface="+mn-ea"/>
-                <a:cs typeface="+mn-cs"/>
-              </a:rPr>
-              <a:t>code</a:t>
-            </a:r>
-            <a:r>
-              <a:rPr lang="es-AR" sz="1200" b="1" i="1" kern="1200" dirty="0" smtClean="0">
-                <a:solidFill>
-                  <a:schemeClr val="tx1"/>
-                </a:solidFill>
-                <a:effectLst/>
-                <a:latin typeface="+mn-lt"/>
-                <a:ea typeface="+mn-ea"/>
-                <a:cs typeface="+mn-cs"/>
-              </a:rPr>
-              <a:t> </a:t>
-            </a:r>
-            <a:r>
-              <a:rPr lang="es-AR" sz="1200" b="1" i="1" kern="1200" dirty="0" err="1" smtClean="0">
-                <a:solidFill>
-                  <a:schemeClr val="tx1"/>
-                </a:solidFill>
-                <a:effectLst/>
-                <a:latin typeface="+mn-lt"/>
-                <a:ea typeface="+mn-ea"/>
-                <a:cs typeface="+mn-cs"/>
-              </a:rPr>
-              <a:t>names</a:t>
-            </a:r>
-            <a:r>
-              <a:rPr lang="es-AR" sz="1200" b="1" i="1" kern="1200" dirty="0" smtClean="0">
-                <a:solidFill>
-                  <a:schemeClr val="tx1"/>
-                </a:solidFill>
-                <a:effectLst/>
-                <a:latin typeface="+mn-lt"/>
-                <a:ea typeface="+mn-ea"/>
-                <a:cs typeface="+mn-cs"/>
-              </a:rPr>
-              <a:t> </a:t>
-            </a:r>
-            <a:r>
-              <a:rPr lang="es-AR" sz="1200" b="1" kern="1200" dirty="0" smtClean="0">
-                <a:solidFill>
-                  <a:schemeClr val="tx1"/>
-                </a:solidFill>
-                <a:effectLst/>
-                <a:latin typeface="+mn-lt"/>
-                <a:ea typeface="+mn-ea"/>
-                <a:cs typeface="+mn-cs"/>
-              </a:rPr>
-              <a:t>para los proyectos</a:t>
-            </a:r>
-            <a:endParaRPr lang="en-US" sz="1200" b="1" kern="1200" dirty="0" smtClean="0">
-              <a:solidFill>
-                <a:schemeClr val="tx1"/>
-              </a:solidFill>
-              <a:effectLst/>
-              <a:latin typeface="+mn-lt"/>
-              <a:ea typeface="+mn-ea"/>
-              <a:cs typeface="+mn-cs"/>
-            </a:endParaRPr>
-          </a:p>
-          <a:p>
-            <a:r>
-              <a:rPr lang="es-AR" sz="1200" kern="1200" dirty="0" smtClean="0">
-                <a:solidFill>
-                  <a:schemeClr val="tx1"/>
-                </a:solidFill>
-                <a:effectLst/>
-                <a:latin typeface="+mn-lt"/>
-                <a:ea typeface="+mn-ea"/>
-                <a:cs typeface="+mn-cs"/>
-              </a:rPr>
-              <a:t> </a:t>
-            </a:r>
-            <a:endParaRPr lang="en-US" sz="1200" kern="1200" dirty="0" smtClean="0">
-              <a:solidFill>
-                <a:schemeClr val="tx1"/>
-              </a:solidFill>
-              <a:effectLst/>
-              <a:latin typeface="+mn-lt"/>
-              <a:ea typeface="+mn-ea"/>
-              <a:cs typeface="+mn-cs"/>
-            </a:endParaRPr>
-          </a:p>
-          <a:p>
-            <a:r>
-              <a:rPr lang="es-AR" sz="1200" kern="1200" dirty="0" smtClean="0">
-                <a:solidFill>
-                  <a:schemeClr val="tx1"/>
-                </a:solidFill>
-                <a:effectLst/>
-                <a:latin typeface="+mn-lt"/>
-                <a:ea typeface="+mn-ea"/>
-                <a:cs typeface="+mn-cs"/>
-              </a:rPr>
-              <a:t>Este mecanismo de defensa solo se aplica a empresas comerciales, particularmente tecnológicas. Gigantes como Microsoft y Apple suelen utilizar nombres clave para los productos que están en fase de desarrollo y aún no se han lanzado al mercado. Como ejemplos podemos mencionar al proyecto </a:t>
-            </a:r>
-            <a:r>
-              <a:rPr lang="es-AR" sz="1200" kern="1200" dirty="0" err="1" smtClean="0">
-                <a:solidFill>
-                  <a:schemeClr val="tx1"/>
-                </a:solidFill>
-                <a:effectLst/>
-                <a:latin typeface="+mn-lt"/>
-                <a:ea typeface="+mn-ea"/>
-                <a:cs typeface="+mn-cs"/>
-              </a:rPr>
-              <a:t>Blackcomb</a:t>
-            </a:r>
-            <a:r>
-              <a:rPr lang="es-AR" sz="1200" kern="1200" dirty="0" smtClean="0">
-                <a:solidFill>
-                  <a:schemeClr val="tx1"/>
-                </a:solidFill>
-                <a:effectLst/>
-                <a:latin typeface="+mn-lt"/>
-                <a:ea typeface="+mn-ea"/>
-                <a:cs typeface="+mn-cs"/>
-              </a:rPr>
-              <a:t> (Windows 7).</a:t>
-            </a:r>
-            <a:endParaRPr lang="en-US" sz="1200" kern="1200" dirty="0" smtClean="0">
-              <a:solidFill>
-                <a:schemeClr val="tx1"/>
-              </a:solidFill>
-              <a:effectLst/>
-              <a:latin typeface="+mn-lt"/>
-              <a:ea typeface="+mn-ea"/>
-              <a:cs typeface="+mn-cs"/>
-            </a:endParaRPr>
-          </a:p>
-          <a:p>
-            <a:r>
-              <a:rPr lang="es-AR" sz="1200" kern="1200" dirty="0" smtClean="0">
-                <a:solidFill>
-                  <a:schemeClr val="tx1"/>
-                </a:solidFill>
-                <a:effectLst/>
-                <a:latin typeface="+mn-lt"/>
-                <a:ea typeface="+mn-ea"/>
-                <a:cs typeface="+mn-cs"/>
-              </a:rPr>
-              <a:t> </a:t>
-            </a:r>
-            <a:endParaRPr lang="en-US" sz="1200" kern="1200" dirty="0" smtClean="0">
-              <a:solidFill>
-                <a:schemeClr val="tx1"/>
-              </a:solidFill>
-              <a:effectLst/>
-              <a:latin typeface="+mn-lt"/>
-              <a:ea typeface="+mn-ea"/>
-              <a:cs typeface="+mn-cs"/>
-            </a:endParaRPr>
-          </a:p>
-          <a:p>
-            <a:r>
-              <a:rPr lang="es-AR" sz="1200" kern="1200" dirty="0" smtClean="0">
-                <a:solidFill>
-                  <a:schemeClr val="tx1"/>
-                </a:solidFill>
-                <a:effectLst/>
-                <a:latin typeface="+mn-lt"/>
-                <a:ea typeface="+mn-ea"/>
-                <a:cs typeface="+mn-cs"/>
-              </a:rPr>
-              <a:t>Las razones para su uso son varias:</a:t>
-            </a:r>
-            <a:endParaRPr lang="en-US" sz="1200" kern="1200" dirty="0" smtClean="0">
-              <a:solidFill>
-                <a:schemeClr val="tx1"/>
-              </a:solidFill>
-              <a:effectLst/>
-              <a:latin typeface="+mn-lt"/>
-              <a:ea typeface="+mn-ea"/>
-              <a:cs typeface="+mn-cs"/>
-            </a:endParaRPr>
-          </a:p>
-          <a:p>
-            <a:pPr lvl="0"/>
-            <a:r>
-              <a:rPr lang="es-AR" sz="1200" u="none" strike="noStrike" kern="1200" dirty="0" smtClean="0">
-                <a:solidFill>
-                  <a:schemeClr val="tx1"/>
-                </a:solidFill>
-                <a:effectLst/>
-                <a:latin typeface="+mn-lt"/>
-                <a:ea typeface="+mn-ea"/>
-                <a:cs typeface="+mn-cs"/>
-              </a:rPr>
-              <a:t>Permiten a los trabajadores de dichos productos hablar sobre los mismos sin revelar de qué se trata a terceros. Al utilizar nombres neutrales, se obliga a enfocarse en el producto y prevenir la generación de asociaciones basándose en el nombre.</a:t>
+              <a:t>catástrofes</a:t>
             </a:r>
             <a:endParaRPr lang="en-US" u="none" strike="noStrike" dirty="0" smtClean="0">
               <a:effectLst/>
-            </a:endParaRPr>
-          </a:p>
-          <a:p>
-            <a:pPr lvl="0"/>
-            <a:r>
-              <a:rPr lang="es-AR" sz="1200" u="none" strike="noStrike" kern="1200" dirty="0" smtClean="0">
-                <a:solidFill>
-                  <a:schemeClr val="tx1"/>
-                </a:solidFill>
-                <a:effectLst/>
-                <a:latin typeface="+mn-lt"/>
-                <a:ea typeface="+mn-ea"/>
-                <a:cs typeface="+mn-cs"/>
-              </a:rPr>
-              <a:t>Permiten crear un impacto positivo en los potenciales consumidores, al utilizar nombres que atraen al mercado.</a:t>
-            </a:r>
-            <a:r>
-              <a:rPr lang="es-AR" sz="1200" i="1" u="sng" strike="noStrike" kern="1200" dirty="0" smtClean="0">
-                <a:solidFill>
-                  <a:schemeClr val="tx1"/>
-                </a:solidFill>
-                <a:effectLst/>
-                <a:latin typeface="+mn-lt"/>
-                <a:ea typeface="+mn-ea"/>
-                <a:cs typeface="+mn-cs"/>
-              </a:rPr>
-              <a:t> </a:t>
-            </a:r>
-            <a:endParaRPr lang="en-US" sz="1200" kern="1200" dirty="0">
-              <a:solidFill>
-                <a:schemeClr val="tx1"/>
-              </a:solidFill>
-              <a:effectLst/>
-              <a:latin typeface="+mn-lt"/>
-              <a:ea typeface="+mn-ea"/>
-              <a:cs typeface="+mn-cs"/>
             </a:endParaRPr>
           </a:p>
         </p:txBody>
@@ -3833,7 +3716,7 @@
     </p:spTree>
     <p:extLst>
       <p:ext uri="{BB962C8B-B14F-4D97-AF65-F5344CB8AC3E}">
-        <p14:creationId xmlns:p14="http://schemas.microsoft.com/office/powerpoint/2010/main" val="707643668"/>
+        <p14:creationId xmlns:p14="http://schemas.microsoft.com/office/powerpoint/2010/main" val="2488318766"/>
       </p:ext>
     </p:extLst>
   </p:cSld>
@@ -3887,7 +3770,468 @@
           <a:bodyPr/>
           <a:lstStyle/>
           <a:p>
-            <a:endParaRPr lang="en-US"/>
+            <a:r>
+              <a:rPr lang="es-AR" sz="1200" b="1" kern="1200" dirty="0" smtClean="0">
+                <a:solidFill>
+                  <a:schemeClr val="tx1"/>
+                </a:solidFill>
+                <a:effectLst/>
+                <a:latin typeface="+mn-lt"/>
+                <a:ea typeface="+mn-ea"/>
+                <a:cs typeface="+mn-cs"/>
+              </a:rPr>
+              <a:t>Auditorías</a:t>
+            </a:r>
+            <a:endParaRPr lang="en-US" sz="1200" b="1" kern="1200" dirty="0" smtClean="0">
+              <a:solidFill>
+                <a:schemeClr val="tx1"/>
+              </a:solidFill>
+              <a:effectLst/>
+              <a:latin typeface="+mn-lt"/>
+              <a:ea typeface="+mn-ea"/>
+              <a:cs typeface="+mn-cs"/>
+            </a:endParaRPr>
+          </a:p>
+          <a:p>
+            <a:r>
+              <a:rPr lang="es-AR" sz="1200" kern="1200" dirty="0" smtClean="0">
+                <a:solidFill>
+                  <a:schemeClr val="tx1"/>
+                </a:solidFill>
+                <a:effectLst/>
+                <a:latin typeface="+mn-lt"/>
+                <a:ea typeface="+mn-ea"/>
+                <a:cs typeface="+mn-cs"/>
+              </a:rPr>
+              <a:t> </a:t>
+            </a:r>
+            <a:endParaRPr lang="en-US" sz="1200" kern="1200" dirty="0" smtClean="0">
+              <a:solidFill>
+                <a:schemeClr val="tx1"/>
+              </a:solidFill>
+              <a:effectLst/>
+              <a:latin typeface="+mn-lt"/>
+              <a:ea typeface="+mn-ea"/>
+              <a:cs typeface="+mn-cs"/>
+            </a:endParaRPr>
+          </a:p>
+          <a:p>
+            <a:r>
+              <a:rPr lang="es-AR" sz="1200" kern="1200" dirty="0" smtClean="0">
+                <a:solidFill>
+                  <a:schemeClr val="tx1"/>
+                </a:solidFill>
+                <a:effectLst/>
+                <a:latin typeface="+mn-lt"/>
+                <a:ea typeface="+mn-ea"/>
+                <a:cs typeface="+mn-cs"/>
+              </a:rPr>
+              <a:t>En las empresas, para facilitar la trazabilidad de las acciones de los usuarios, se suelen incluir procedimientos mediante los que se garantiza que el uso de los activos de información es efectivamente auditado y que es posible generar </a:t>
+            </a:r>
+            <a:r>
+              <a:rPr lang="es-AR" sz="1200" b="1" kern="1200" dirty="0" smtClean="0">
+                <a:solidFill>
+                  <a:schemeClr val="tx1"/>
+                </a:solidFill>
+                <a:effectLst/>
+                <a:latin typeface="+mn-lt"/>
+                <a:ea typeface="+mn-ea"/>
+                <a:cs typeface="+mn-cs"/>
+              </a:rPr>
+              <a:t>registros (</a:t>
+            </a:r>
+            <a:r>
+              <a:rPr lang="es-AR" sz="1200" b="1" i="1" kern="1200" dirty="0" err="1" smtClean="0">
+                <a:solidFill>
+                  <a:schemeClr val="tx1"/>
+                </a:solidFill>
+                <a:effectLst/>
+                <a:latin typeface="+mn-lt"/>
+                <a:ea typeface="+mn-ea"/>
+                <a:cs typeface="+mn-cs"/>
+              </a:rPr>
+              <a:t>logs</a:t>
+            </a:r>
+            <a:r>
+              <a:rPr lang="es-AR" sz="1200" b="1" kern="1200" dirty="0" smtClean="0">
+                <a:solidFill>
+                  <a:schemeClr val="tx1"/>
+                </a:solidFill>
+                <a:effectLst/>
+                <a:latin typeface="+mn-lt"/>
+                <a:ea typeface="+mn-ea"/>
+                <a:cs typeface="+mn-cs"/>
+              </a:rPr>
+              <a:t>) de las acciones importantes</a:t>
+            </a:r>
+            <a:r>
+              <a:rPr lang="es-AR" sz="1200" kern="1200" dirty="0" smtClean="0">
+                <a:solidFill>
+                  <a:schemeClr val="tx1"/>
+                </a:solidFill>
+                <a:effectLst/>
+                <a:latin typeface="+mn-lt"/>
+                <a:ea typeface="+mn-ea"/>
+                <a:cs typeface="+mn-cs"/>
+              </a:rPr>
+              <a:t> que se hayan definido, que si bien es un proceso técnico, implica un conocimiento de los individuos respecto a su grado de responsabilidad en lo que realizan dentro de una empresa. El conocimiento de la vinculación entre las personas y sus accesos puede evitar en gran medida la fuga de información, ya que en caso de filtrarse hacia el exterior, se podría señalar de manera directa a todos aquellos que tuvieron acceso y se podría analizar su uso previo al incidente, obteniendo posibles conclusiones y responsables. De cualquier manera, dada la imposibilidad de monitorear a las personas más allá de la esfera laboral, es estrictamente necesario que exista un alto grado de concientización y que las políticas de seguridad estén correctamente aplicadas para garantizar que quienes manejen información confidencial tengan asumidos los riesgos relacionados con su filtración.</a:t>
+            </a:r>
+          </a:p>
+          <a:p>
+            <a:endParaRPr lang="es-AR" sz="1200" b="1" kern="1200" dirty="0" smtClean="0">
+              <a:solidFill>
+                <a:schemeClr val="tx1"/>
+              </a:solidFill>
+              <a:effectLst/>
+              <a:latin typeface="+mn-lt"/>
+              <a:ea typeface="+mn-ea"/>
+              <a:cs typeface="+mn-cs"/>
+            </a:endParaRPr>
+          </a:p>
+          <a:p>
+            <a:r>
+              <a:rPr lang="es-AR" sz="1200" b="1" kern="1200" dirty="0" smtClean="0">
+                <a:solidFill>
+                  <a:schemeClr val="tx1"/>
+                </a:solidFill>
+                <a:effectLst/>
+                <a:latin typeface="+mn-lt"/>
+                <a:ea typeface="+mn-ea"/>
+                <a:cs typeface="+mn-cs"/>
+              </a:rPr>
+              <a:t>Utilización de estándares internacionales</a:t>
+            </a:r>
+            <a:endParaRPr lang="en-US" sz="1200" b="1" kern="1200" dirty="0" smtClean="0">
+              <a:solidFill>
+                <a:schemeClr val="tx1"/>
+              </a:solidFill>
+              <a:effectLst/>
+              <a:latin typeface="+mn-lt"/>
+              <a:ea typeface="+mn-ea"/>
+              <a:cs typeface="+mn-cs"/>
+            </a:endParaRPr>
+          </a:p>
+          <a:p>
+            <a:r>
+              <a:rPr lang="es-AR" sz="1200" kern="1200" dirty="0" smtClean="0">
+                <a:solidFill>
+                  <a:schemeClr val="tx1"/>
+                </a:solidFill>
+                <a:effectLst/>
+                <a:latin typeface="+mn-lt"/>
+                <a:ea typeface="+mn-ea"/>
+                <a:cs typeface="+mn-cs"/>
+              </a:rPr>
+              <a:t> </a:t>
+            </a:r>
+            <a:endParaRPr lang="en-US" sz="1200" kern="1200" dirty="0" smtClean="0">
+              <a:solidFill>
+                <a:schemeClr val="tx1"/>
+              </a:solidFill>
+              <a:effectLst/>
+              <a:latin typeface="+mn-lt"/>
+              <a:ea typeface="+mn-ea"/>
+              <a:cs typeface="+mn-cs"/>
+            </a:endParaRPr>
+          </a:p>
+          <a:p>
+            <a:r>
+              <a:rPr lang="es-AR" sz="1200" kern="1200" dirty="0" smtClean="0">
+                <a:solidFill>
+                  <a:schemeClr val="tx1"/>
+                </a:solidFill>
+                <a:effectLst/>
+                <a:latin typeface="+mn-lt"/>
+                <a:ea typeface="+mn-ea"/>
+                <a:cs typeface="+mn-cs"/>
+              </a:rPr>
+              <a:t>Para la mayoría de las actividades es necesario basarse en estándares, normalmente de alcance internacional, y normativas vinculadas a lo que se quiera organizar. La fuga de información está contemplada dentro de la gestión de la seguridad, y como tal se describen contramedidas y técnicas en distintos estándares. Así pues, se apela con frecuencia a la serie de normas ISO 27000, que está especialmente dedicada a seguridad de la información. Dentro de esta familia se encuentran específicamente algunas normas como lo son la 27001, referida a los requisitos para implementar un sistema de gestión de seguridad, la 27002 que define las mejores prácticas, la 27004 que habla sobre las métricas, la 27005 que trata sobre la gestión de riesgos, entre otras.</a:t>
+            </a:r>
+            <a:endParaRPr lang="en-US" sz="1200" kern="1200" dirty="0" smtClean="0">
+              <a:solidFill>
+                <a:schemeClr val="tx1"/>
+              </a:solidFill>
+              <a:effectLst/>
+              <a:latin typeface="+mn-lt"/>
+              <a:ea typeface="+mn-ea"/>
+              <a:cs typeface="+mn-cs"/>
+            </a:endParaRPr>
+          </a:p>
+          <a:p>
+            <a:r>
+              <a:rPr lang="es-AR" sz="1200" kern="1200" dirty="0" smtClean="0">
+                <a:solidFill>
+                  <a:schemeClr val="tx1"/>
+                </a:solidFill>
+                <a:effectLst/>
+                <a:latin typeface="+mn-lt"/>
+                <a:ea typeface="+mn-ea"/>
+                <a:cs typeface="+mn-cs"/>
+              </a:rPr>
+              <a:t> </a:t>
+            </a:r>
+            <a:endParaRPr lang="en-US" sz="1200" kern="1200" dirty="0" smtClean="0">
+              <a:solidFill>
+                <a:schemeClr val="tx1"/>
+              </a:solidFill>
+              <a:effectLst/>
+              <a:latin typeface="+mn-lt"/>
+              <a:ea typeface="+mn-ea"/>
+              <a:cs typeface="+mn-cs"/>
+            </a:endParaRPr>
+          </a:p>
+          <a:p>
+            <a:r>
+              <a:rPr lang="es-AR" sz="1200" b="1" kern="1200" dirty="0" smtClean="0">
+                <a:solidFill>
+                  <a:schemeClr val="tx1"/>
+                </a:solidFill>
+                <a:effectLst/>
+                <a:latin typeface="+mn-lt"/>
+                <a:ea typeface="+mn-ea"/>
+                <a:cs typeface="+mn-cs"/>
+              </a:rPr>
+              <a:t>Uso de </a:t>
+            </a:r>
+            <a:r>
+              <a:rPr lang="es-AR" sz="1200" b="1" i="1" kern="1200" dirty="0" err="1" smtClean="0">
+                <a:solidFill>
+                  <a:schemeClr val="tx1"/>
+                </a:solidFill>
+                <a:effectLst/>
+                <a:latin typeface="+mn-lt"/>
+                <a:ea typeface="+mn-ea"/>
+                <a:cs typeface="+mn-cs"/>
+              </a:rPr>
+              <a:t>code</a:t>
+            </a:r>
+            <a:r>
+              <a:rPr lang="es-AR" sz="1200" b="1" i="1" kern="1200" dirty="0" smtClean="0">
+                <a:solidFill>
+                  <a:schemeClr val="tx1"/>
+                </a:solidFill>
+                <a:effectLst/>
+                <a:latin typeface="+mn-lt"/>
+                <a:ea typeface="+mn-ea"/>
+                <a:cs typeface="+mn-cs"/>
+              </a:rPr>
+              <a:t> </a:t>
+            </a:r>
+            <a:r>
+              <a:rPr lang="es-AR" sz="1200" b="1" i="1" kern="1200" dirty="0" err="1" smtClean="0">
+                <a:solidFill>
+                  <a:schemeClr val="tx1"/>
+                </a:solidFill>
+                <a:effectLst/>
+                <a:latin typeface="+mn-lt"/>
+                <a:ea typeface="+mn-ea"/>
+                <a:cs typeface="+mn-cs"/>
+              </a:rPr>
+              <a:t>names</a:t>
+            </a:r>
+            <a:r>
+              <a:rPr lang="es-AR" sz="1200" b="1" i="1" kern="1200" dirty="0" smtClean="0">
+                <a:solidFill>
+                  <a:schemeClr val="tx1"/>
+                </a:solidFill>
+                <a:effectLst/>
+                <a:latin typeface="+mn-lt"/>
+                <a:ea typeface="+mn-ea"/>
+                <a:cs typeface="+mn-cs"/>
+              </a:rPr>
+              <a:t> </a:t>
+            </a:r>
+            <a:r>
+              <a:rPr lang="es-AR" sz="1200" b="1" kern="1200" dirty="0" smtClean="0">
+                <a:solidFill>
+                  <a:schemeClr val="tx1"/>
+                </a:solidFill>
+                <a:effectLst/>
+                <a:latin typeface="+mn-lt"/>
+                <a:ea typeface="+mn-ea"/>
+                <a:cs typeface="+mn-cs"/>
+              </a:rPr>
+              <a:t>para los proyectos</a:t>
+            </a:r>
+            <a:endParaRPr lang="en-US" sz="1200" b="1" kern="1200" dirty="0" smtClean="0">
+              <a:solidFill>
+                <a:schemeClr val="tx1"/>
+              </a:solidFill>
+              <a:effectLst/>
+              <a:latin typeface="+mn-lt"/>
+              <a:ea typeface="+mn-ea"/>
+              <a:cs typeface="+mn-cs"/>
+            </a:endParaRPr>
+          </a:p>
+          <a:p>
+            <a:r>
+              <a:rPr lang="es-AR" sz="1200" kern="1200" dirty="0" smtClean="0">
+                <a:solidFill>
+                  <a:schemeClr val="tx1"/>
+                </a:solidFill>
+                <a:effectLst/>
+                <a:latin typeface="+mn-lt"/>
+                <a:ea typeface="+mn-ea"/>
+                <a:cs typeface="+mn-cs"/>
+              </a:rPr>
+              <a:t> </a:t>
+            </a:r>
+            <a:endParaRPr lang="en-US" sz="1200" kern="1200" dirty="0" smtClean="0">
+              <a:solidFill>
+                <a:schemeClr val="tx1"/>
+              </a:solidFill>
+              <a:effectLst/>
+              <a:latin typeface="+mn-lt"/>
+              <a:ea typeface="+mn-ea"/>
+              <a:cs typeface="+mn-cs"/>
+            </a:endParaRPr>
+          </a:p>
+          <a:p>
+            <a:r>
+              <a:rPr lang="es-AR" sz="1200" kern="1200" dirty="0" smtClean="0">
+                <a:solidFill>
+                  <a:schemeClr val="tx1"/>
+                </a:solidFill>
+                <a:effectLst/>
+                <a:latin typeface="+mn-lt"/>
+                <a:ea typeface="+mn-ea"/>
+                <a:cs typeface="+mn-cs"/>
+              </a:rPr>
+              <a:t>Este mecanismo de defensa solo se aplica a empresas comerciales, particularmente tecnológicas. Gigantes como Microsoft y Apple suelen utilizar nombres clave para los productos que están en fase de desarrollo y aún no se han lanzado al mercado. Como ejemplos podemos mencionar al proyecto </a:t>
+            </a:r>
+            <a:r>
+              <a:rPr lang="es-AR" sz="1200" kern="1200" dirty="0" err="1" smtClean="0">
+                <a:solidFill>
+                  <a:schemeClr val="tx1"/>
+                </a:solidFill>
+                <a:effectLst/>
+                <a:latin typeface="+mn-lt"/>
+                <a:ea typeface="+mn-ea"/>
+                <a:cs typeface="+mn-cs"/>
+              </a:rPr>
+              <a:t>Blackcomb</a:t>
+            </a:r>
+            <a:r>
+              <a:rPr lang="es-AR" sz="1200" kern="1200" dirty="0" smtClean="0">
+                <a:solidFill>
+                  <a:schemeClr val="tx1"/>
+                </a:solidFill>
+                <a:effectLst/>
+                <a:latin typeface="+mn-lt"/>
+                <a:ea typeface="+mn-ea"/>
+                <a:cs typeface="+mn-cs"/>
+              </a:rPr>
+              <a:t> (Windows 7).</a:t>
+            </a:r>
+            <a:endParaRPr lang="en-US" sz="1200" kern="1200" dirty="0" smtClean="0">
+              <a:solidFill>
+                <a:schemeClr val="tx1"/>
+              </a:solidFill>
+              <a:effectLst/>
+              <a:latin typeface="+mn-lt"/>
+              <a:ea typeface="+mn-ea"/>
+              <a:cs typeface="+mn-cs"/>
+            </a:endParaRPr>
+          </a:p>
+          <a:p>
+            <a:r>
+              <a:rPr lang="es-AR" sz="1200" kern="1200" dirty="0" smtClean="0">
+                <a:solidFill>
+                  <a:schemeClr val="tx1"/>
+                </a:solidFill>
+                <a:effectLst/>
+                <a:latin typeface="+mn-lt"/>
+                <a:ea typeface="+mn-ea"/>
+                <a:cs typeface="+mn-cs"/>
+              </a:rPr>
+              <a:t> </a:t>
+            </a:r>
+            <a:endParaRPr lang="en-US" sz="1200" kern="1200" dirty="0" smtClean="0">
+              <a:solidFill>
+                <a:schemeClr val="tx1"/>
+              </a:solidFill>
+              <a:effectLst/>
+              <a:latin typeface="+mn-lt"/>
+              <a:ea typeface="+mn-ea"/>
+              <a:cs typeface="+mn-cs"/>
+            </a:endParaRPr>
+          </a:p>
+          <a:p>
+            <a:r>
+              <a:rPr lang="es-AR" sz="1200" kern="1200" dirty="0" smtClean="0">
+                <a:solidFill>
+                  <a:schemeClr val="tx1"/>
+                </a:solidFill>
+                <a:effectLst/>
+                <a:latin typeface="+mn-lt"/>
+                <a:ea typeface="+mn-ea"/>
+                <a:cs typeface="+mn-cs"/>
+              </a:rPr>
+              <a:t>Las razones para su uso son varias:</a:t>
+            </a:r>
+            <a:endParaRPr lang="en-US" sz="1200" kern="1200" dirty="0" smtClean="0">
+              <a:solidFill>
+                <a:schemeClr val="tx1"/>
+              </a:solidFill>
+              <a:effectLst/>
+              <a:latin typeface="+mn-lt"/>
+              <a:ea typeface="+mn-ea"/>
+              <a:cs typeface="+mn-cs"/>
+            </a:endParaRPr>
+          </a:p>
+          <a:p>
+            <a:pPr lvl="0"/>
+            <a:r>
+              <a:rPr lang="es-AR" sz="1200" u="none" strike="noStrike" kern="1200" dirty="0" smtClean="0">
+                <a:solidFill>
+                  <a:schemeClr val="tx1"/>
+                </a:solidFill>
+                <a:effectLst/>
+                <a:latin typeface="+mn-lt"/>
+                <a:ea typeface="+mn-ea"/>
+                <a:cs typeface="+mn-cs"/>
+              </a:rPr>
+              <a:t>Permiten a los trabajadores de dichos productos hablar sobre los mismos sin revelar de qué se trata a terceros. Al utilizar nombres neutrales, se obliga a enfocarse en el producto y prevenir la generación de asociaciones basándose en el nombre.</a:t>
+            </a:r>
+            <a:endParaRPr lang="en-US" u="none" strike="noStrike" dirty="0" smtClean="0">
+              <a:effectLst/>
+            </a:endParaRPr>
+          </a:p>
+          <a:p>
+            <a:pPr lvl="0"/>
+            <a:r>
+              <a:rPr lang="es-AR" sz="1200" u="none" strike="noStrike" kern="1200" dirty="0" smtClean="0">
+                <a:solidFill>
+                  <a:schemeClr val="tx1"/>
+                </a:solidFill>
+                <a:effectLst/>
+                <a:latin typeface="+mn-lt"/>
+                <a:ea typeface="+mn-ea"/>
+                <a:cs typeface="+mn-cs"/>
+              </a:rPr>
+              <a:t>Permiten crear un impacto positivo en los potenciales consumidores, al utilizar nombres que atraen al mercado.</a:t>
+            </a:r>
+            <a:r>
+              <a:rPr lang="es-AR" sz="1200" i="1" u="sng" strike="noStrike" kern="1200" dirty="0" smtClean="0">
+                <a:solidFill>
+                  <a:schemeClr val="tx1"/>
+                </a:solidFill>
+                <a:effectLst/>
+                <a:latin typeface="+mn-lt"/>
+                <a:ea typeface="+mn-ea"/>
+                <a:cs typeface="+mn-cs"/>
+              </a:rPr>
+              <a:t> </a:t>
+            </a:r>
+            <a:endParaRPr lang="en-US" sz="1200" kern="1200" dirty="0">
+              <a:solidFill>
+                <a:schemeClr val="tx1"/>
+              </a:solidFill>
+              <a:effectLst/>
+              <a:latin typeface="+mn-lt"/>
+              <a:ea typeface="+mn-ea"/>
+              <a:cs typeface="+mn-cs"/>
+            </a:endParaRPr>
           </a:p>
         </p:txBody>
       </p:sp>
@@ -3918,7 +4262,7 @@
     </p:spTree>
     <p:extLst>
       <p:ext uri="{BB962C8B-B14F-4D97-AF65-F5344CB8AC3E}">
-        <p14:creationId xmlns:p14="http://schemas.microsoft.com/office/powerpoint/2010/main" val="1554195"/>
+        <p14:creationId xmlns:p14="http://schemas.microsoft.com/office/powerpoint/2010/main" val="707643668"/>
       </p:ext>
     </p:extLst>
   </p:cSld>
@@ -4003,7 +4347,7 @@
     </p:spTree>
     <p:extLst>
       <p:ext uri="{BB962C8B-B14F-4D97-AF65-F5344CB8AC3E}">
-        <p14:creationId xmlns:p14="http://schemas.microsoft.com/office/powerpoint/2010/main" val="2425724269"/>
+        <p14:creationId xmlns:p14="http://schemas.microsoft.com/office/powerpoint/2010/main" val="1554195"/>
       </p:ext>
     </p:extLst>
   </p:cSld>
@@ -11150,42 +11494,6 @@
               </a:rPr>
               <a:t>Eventos</a:t>
             </a:r>
-            <a:r>
-              <a:rPr lang="en-US" spc="0" dirty="0" smtClean="0">
-                <a:ln w="0"/>
-                <a:solidFill>
-                  <a:schemeClr val="accent1"/>
-                </a:solidFill>
-                <a:effectLst>
-                  <a:outerShdw blurRad="38100" dist="25400" dir="5400000" algn="ctr" rotWithShape="0">
-                    <a:srgbClr val="6E747A">
-                      <a:alpha val="43000"/>
-                    </a:srgbClr>
-                  </a:outerShdw>
-                </a:effectLst>
-                <a:latin typeface="Segoe UI" panose="020B0502040204020203" pitchFamily="34" charset="0"/>
-                <a:cs typeface="Segoe UI" panose="020B0502040204020203" pitchFamily="34" charset="0"/>
-              </a:rPr>
-              <a:t> </a:t>
-            </a:r>
-            <a:r>
-              <a:rPr lang="en-US" spc="0" dirty="0" err="1" smtClean="0">
-                <a:ln w="0"/>
-                <a:solidFill>
-                  <a:schemeClr val="accent1"/>
-                </a:solidFill>
-                <a:effectLst>
-                  <a:outerShdw blurRad="38100" dist="25400" dir="5400000" algn="ctr" rotWithShape="0">
-                    <a:srgbClr val="6E747A">
-                      <a:alpha val="43000"/>
-                    </a:srgbClr>
-                  </a:outerShdw>
-                </a:effectLst>
-                <a:latin typeface="Segoe UI" panose="020B0502040204020203" pitchFamily="34" charset="0"/>
-                <a:cs typeface="Segoe UI" panose="020B0502040204020203" pitchFamily="34" charset="0"/>
-              </a:rPr>
-              <a:t>tecnológicos</a:t>
-            </a:r>
             <a:endParaRPr lang="en-US" spc="0" dirty="0">
               <a:ln w="0"/>
               <a:solidFill>
@@ -11855,43 +12163,7 @@
                 <a:latin typeface="Segoe UI" panose="020B0502040204020203" pitchFamily="34" charset="0"/>
                 <a:cs typeface="Segoe UI" panose="020B0502040204020203" pitchFamily="34" charset="0"/>
               </a:rPr>
-              <a:t>Mecanismos</a:t>
-            </a:r>
-            <a:r>
-              <a:rPr lang="en-US" spc="0" dirty="0" smtClean="0">
-                <a:ln w="0"/>
-                <a:solidFill>
-                  <a:schemeClr val="accent1"/>
-                </a:solidFill>
-                <a:effectLst>
-                  <a:outerShdw blurRad="38100" dist="25400" dir="5400000" algn="ctr" rotWithShape="0">
-                    <a:srgbClr val="6E747A">
-                      <a:alpha val="43000"/>
-                    </a:srgbClr>
-                  </a:outerShdw>
-                </a:effectLst>
-                <a:latin typeface="Segoe UI" panose="020B0502040204020203" pitchFamily="34" charset="0"/>
-                <a:cs typeface="Segoe UI" panose="020B0502040204020203" pitchFamily="34" charset="0"/>
-              </a:rPr>
-              <a:t> de </a:t>
-            </a:r>
-            <a:r>
-              <a:rPr lang="en-US" spc="0" dirty="0" err="1" smtClean="0">
-                <a:ln w="0"/>
-                <a:solidFill>
-                  <a:schemeClr val="accent1"/>
-                </a:solidFill>
-                <a:effectLst>
-                  <a:outerShdw blurRad="38100" dist="25400" dir="5400000" algn="ctr" rotWithShape="0">
-                    <a:srgbClr val="6E747A">
-                      <a:alpha val="43000"/>
-                    </a:srgbClr>
-                  </a:outerShdw>
-                </a:effectLst>
-                <a:latin typeface="Segoe UI" panose="020B0502040204020203" pitchFamily="34" charset="0"/>
-                <a:cs typeface="Segoe UI" panose="020B0502040204020203" pitchFamily="34" charset="0"/>
-              </a:rPr>
-              <a:t>defensa</a:t>
+              <a:t>Amenazas</a:t>
             </a:r>
             <a:endParaRPr lang="en-US" spc="0" dirty="0">
               <a:ln w="0"/>
@@ -11928,160 +12200,69 @@
           </a:bodyPr>
           <a:lstStyle/>
           <a:p>
+            <a:pPr lvl="0"/>
             <a:r>
               <a:rPr lang="es-AR" dirty="0" smtClean="0">
                 <a:latin typeface="Segoe UI" panose="020B0502040204020203" pitchFamily="34" charset="0"/>
                 <a:cs typeface="Segoe UI" panose="020B0502040204020203" pitchFamily="34" charset="0"/>
               </a:rPr>
-              <a:t>Registro de patentes</a:t>
-            </a:r>
-          </a:p>
-          <a:p>
+              <a:t>Usuarios y accesos no autorizados</a:t>
+            </a:r>
+            <a:endParaRPr lang="es-AR" dirty="0">
+              <a:latin typeface="Segoe UI" panose="020B0502040204020203" pitchFamily="34" charset="0"/>
+              <a:cs typeface="Segoe UI" panose="020B0502040204020203" pitchFamily="34" charset="0"/>
+            </a:endParaRPr>
+          </a:p>
+          <a:p>
+            <a:pPr lvl="0"/>
+            <a:r>
+              <a:rPr lang="es-AR" dirty="0" smtClean="0">
+                <a:latin typeface="Segoe UI" panose="020B0502040204020203" pitchFamily="34" charset="0"/>
+                <a:cs typeface="Segoe UI" panose="020B0502040204020203" pitchFamily="34" charset="0"/>
+              </a:rPr>
+              <a:t>Programas maliciosos que roban información</a:t>
+            </a:r>
+          </a:p>
+          <a:p>
+            <a:pPr lvl="0"/>
+            <a:r>
+              <a:rPr lang="es-AR" dirty="0" smtClean="0">
+                <a:latin typeface="Segoe UI" panose="020B0502040204020203" pitchFamily="34" charset="0"/>
+                <a:cs typeface="Segoe UI" panose="020B0502040204020203" pitchFamily="34" charset="0"/>
+              </a:rPr>
+              <a:t>Errores de programación</a:t>
+            </a:r>
+          </a:p>
+          <a:p>
+            <a:pPr lvl="0"/>
+            <a:r>
+              <a:rPr lang="es-AR" dirty="0" smtClean="0">
+                <a:latin typeface="Segoe UI" panose="020B0502040204020203" pitchFamily="34" charset="0"/>
+                <a:cs typeface="Segoe UI" panose="020B0502040204020203" pitchFamily="34" charset="0"/>
+              </a:rPr>
+              <a:t>Desastres no previstos, catástrofes naturales, fallos de hardware</a:t>
+            </a:r>
+          </a:p>
+          <a:p>
+            <a:pPr lvl="0"/>
+            <a:r>
+              <a:rPr lang="es-AR" dirty="0" smtClean="0">
+                <a:latin typeface="Segoe UI" panose="020B0502040204020203" pitchFamily="34" charset="0"/>
+                <a:cs typeface="Segoe UI" panose="020B0502040204020203" pitchFamily="34" charset="0"/>
+              </a:rPr>
+              <a:t>Robo de información</a:t>
+            </a:r>
             <a:endParaRPr lang="es-AR" dirty="0" smtClean="0">
               <a:latin typeface="Segoe UI" panose="020B0502040204020203" pitchFamily="34" charset="0"/>
               <a:cs typeface="Segoe UI" panose="020B0502040204020203" pitchFamily="34" charset="0"/>
             </a:endParaRPr>
           </a:p>
-          <a:p>
-            <a:endParaRPr lang="es-AR" dirty="0" smtClean="0">
-              <a:latin typeface="Segoe UI" panose="020B0502040204020203" pitchFamily="34" charset="0"/>
-              <a:cs typeface="Segoe UI" panose="020B0502040204020203" pitchFamily="34" charset="0"/>
-            </a:endParaRPr>
-          </a:p>
-          <a:p>
-            <a:r>
-              <a:rPr lang="es-AR" dirty="0" smtClean="0">
-                <a:latin typeface="Segoe UI" panose="020B0502040204020203" pitchFamily="34" charset="0"/>
-                <a:cs typeface="Segoe UI" panose="020B0502040204020203" pitchFamily="34" charset="0"/>
-              </a:rPr>
-              <a:t>Controles informáticos</a:t>
-            </a:r>
-          </a:p>
-          <a:p>
-            <a:pPr lvl="1"/>
-            <a:r>
-              <a:rPr lang="es-AR" sz="1800" dirty="0" smtClean="0">
-                <a:latin typeface="Segoe UI" panose="020B0502040204020203" pitchFamily="34" charset="0"/>
-                <a:cs typeface="Segoe UI" panose="020B0502040204020203" pitchFamily="34" charset="0"/>
-              </a:rPr>
-              <a:t>Software desarrollado siguiendo estándares de seguridad (criptografía)</a:t>
-            </a:r>
-          </a:p>
-          <a:p>
-            <a:pPr lvl="1"/>
-            <a:r>
-              <a:rPr lang="es-AR" sz="1800" dirty="0" smtClean="0">
-                <a:latin typeface="Segoe UI" panose="020B0502040204020203" pitchFamily="34" charset="0"/>
-                <a:cs typeface="Segoe UI" panose="020B0502040204020203" pitchFamily="34" charset="0"/>
-              </a:rPr>
-              <a:t>Controles físicos sobre el hardware</a:t>
-            </a:r>
-          </a:p>
-          <a:p>
-            <a:pPr lvl="1"/>
-            <a:r>
-              <a:rPr lang="es-AR" sz="1800" dirty="0" smtClean="0">
-                <a:latin typeface="Segoe UI" panose="020B0502040204020203" pitchFamily="34" charset="0"/>
-                <a:cs typeface="Segoe UI" panose="020B0502040204020203" pitchFamily="34" charset="0"/>
-              </a:rPr>
-              <a:t>Políticas de contraseñas y perfiles de usuario</a:t>
-            </a:r>
-          </a:p>
-          <a:p>
-            <a:pPr lvl="1"/>
-            <a:r>
-              <a:rPr lang="es-AR" sz="1800" dirty="0" smtClean="0">
-                <a:latin typeface="Segoe UI" panose="020B0502040204020203" pitchFamily="34" charset="0"/>
-                <a:cs typeface="Segoe UI" panose="020B0502040204020203" pitchFamily="34" charset="0"/>
-              </a:rPr>
-              <a:t>Monitoreo de tráfico en las redes</a:t>
-            </a:r>
-          </a:p>
-          <a:p>
-            <a:pPr lvl="1"/>
-            <a:r>
-              <a:rPr lang="es-AR" sz="1800" dirty="0" smtClean="0">
-                <a:latin typeface="Segoe UI" panose="020B0502040204020203" pitchFamily="34" charset="0"/>
-                <a:cs typeface="Segoe UI" panose="020B0502040204020203" pitchFamily="34" charset="0"/>
-              </a:rPr>
-              <a:t>Uso de software de protección</a:t>
-            </a:r>
-          </a:p>
-          <a:p>
-            <a:pPr lvl="1"/>
-            <a:r>
-              <a:rPr lang="es-AR" sz="1800" dirty="0" smtClean="0">
-                <a:latin typeface="Segoe UI" panose="020B0502040204020203" pitchFamily="34" charset="0"/>
-                <a:cs typeface="Segoe UI" panose="020B0502040204020203" pitchFamily="34" charset="0"/>
-              </a:rPr>
-              <a:t>Creación de </a:t>
-            </a:r>
-            <a:r>
-              <a:rPr lang="es-AR" sz="1800" i="1" dirty="0" err="1" smtClean="0">
-                <a:latin typeface="Segoe UI" panose="020B0502040204020203" pitchFamily="34" charset="0"/>
-                <a:cs typeface="Segoe UI" panose="020B0502040204020203" pitchFamily="34" charset="0"/>
-              </a:rPr>
-              <a:t>backups</a:t>
-            </a:r>
-            <a:r>
-              <a:rPr lang="es-AR" sz="1800" dirty="0" smtClean="0">
-                <a:latin typeface="Segoe UI" panose="020B0502040204020203" pitchFamily="34" charset="0"/>
-                <a:cs typeface="Segoe UI" panose="020B0502040204020203" pitchFamily="34" charset="0"/>
-              </a:rPr>
-              <a:t> periódicos</a:t>
-            </a:r>
-            <a:endParaRPr lang="en-US" sz="1800" dirty="0">
-              <a:latin typeface="Segoe UI" panose="020B0502040204020203" pitchFamily="34" charset="0"/>
-              <a:cs typeface="Segoe UI" panose="020B0502040204020203" pitchFamily="34" charset="0"/>
-            </a:endParaRPr>
-          </a:p>
-        </p:txBody>
-      </p:sp>
-      <p:pic>
-        <p:nvPicPr>
-          <p:cNvPr id="4" name="Picture 2" descr="C:\Users\MIPARN~1\AppData\Local\Temp\SNAGHTML5cb90bb7.PNG"/>
-          <p:cNvPicPr>
-            <a:picLocks noChangeAspect="1" noChangeArrowheads="1"/>
-          </p:cNvPicPr>
-          <p:nvPr/>
-        </p:nvPicPr>
-        <p:blipFill>
-          <a:blip r:embed="rId3" cstate="print">
-            <a:extLst>
-              <a:ext uri="{28A0092B-C50C-407E-A947-70E740481C1C}">
-                <a14:useLocalDpi xmlns:a14="http://schemas.microsoft.com/office/drawing/2010/main" val="0"/>
-              </a:ext>
-            </a:extLst>
-          </a:blip>
-          <a:srcRect/>
-          <a:stretch>
-            <a:fillRect/>
-          </a:stretch>
-        </p:blipFill>
-        <p:spPr bwMode="auto">
-          <a:xfrm>
-            <a:off x="5014292" y="1988840"/>
-            <a:ext cx="2376264" cy="1477007"/>
-          </a:xfrm>
-          <a:prstGeom prst="rect">
-            <a:avLst/>
-          </a:prstGeom>
-          <a:noFill/>
-          <a:extLst>
-            <a:ext uri="{909E8E84-426E-40DD-AFC4-6F175D3DCCD1}">
-              <a14:hiddenFill xmlns:a14="http://schemas.microsoft.com/office/drawing/2010/main">
-                <a:solidFill>
-                  <a:srgbClr val="FFFFFF"/>
-                </a:solidFill>
-              </a14:hiddenFill>
-            </a:ext>
-          </a:extLst>
-        </p:spPr>
-      </p:pic>
+        </p:txBody>
+      </p:sp>
     </p:spTree>
     <p:extLst>
       <p:ext uri="{BB962C8B-B14F-4D97-AF65-F5344CB8AC3E}">
-        <p14:creationId xmlns:p14="http://schemas.microsoft.com/office/powerpoint/2010/main" val="3356351472"/>
+        <p14:creationId xmlns:p14="http://schemas.microsoft.com/office/powerpoint/2010/main" val="965594786"/>
       </p:ext>
     </p:extLst>
   </p:cSld>
@@ -12139,9 +12320,7 @@
         </p:nvSpPr>
         <p:spPr/>
         <p:txBody>
-          <a:bodyPr>
-            <a:normAutofit/>
-          </a:bodyPr>
+          <a:bodyPr/>
           <a:lstStyle/>
           <a:p>
             <a:r>
@@ -12197,24 +12376,6 @@
                 <a:cs typeface="Segoe UI" panose="020B0502040204020203" pitchFamily="34" charset="0"/>
               </a:rPr>
               <a:t>defensa</a:t>
-            </a:r>
-            <a:r>
-              <a:rPr lang="en-US" spc="0" dirty="0" smtClean="0">
-                <a:ln w="0"/>
-                <a:solidFill>
-                  <a:schemeClr val="accent1"/>
-                </a:solidFill>
-                <a:effectLst>
-                  <a:outerShdw blurRad="38100" dist="25400" dir="5400000" algn="ctr" rotWithShape="0">
-                    <a:srgbClr val="6E747A">
-                      <a:alpha val="43000"/>
-                    </a:srgbClr>
-                  </a:outerShdw>
-                </a:effectLst>
-                <a:latin typeface="Segoe UI" panose="020B0502040204020203" pitchFamily="34" charset="0"/>
-                <a:cs typeface="Segoe UI" panose="020B0502040204020203" pitchFamily="34" charset="0"/>
-              </a:rPr>
-              <a:t> (cont.)</a:t>
             </a:r>
             <a:endParaRPr lang="en-US" spc="0" dirty="0">
               <a:ln w="0"/>
@@ -12252,19 +12413,24 @@
           <a:lstStyle/>
           <a:p>
             <a:r>
-              <a:rPr lang="es-AR" dirty="0">
-                <a:latin typeface="Segoe UI" panose="020B0502040204020203" pitchFamily="34" charset="0"/>
-                <a:cs typeface="Segoe UI" panose="020B0502040204020203" pitchFamily="34" charset="0"/>
-              </a:rPr>
-              <a:t>Auditoría de </a:t>
-            </a:r>
-            <a:r>
               <a:rPr lang="es-AR" dirty="0" smtClean="0">
                 <a:latin typeface="Segoe UI" panose="020B0502040204020203" pitchFamily="34" charset="0"/>
                 <a:cs typeface="Segoe UI" panose="020B0502040204020203" pitchFamily="34" charset="0"/>
               </a:rPr>
-              <a:t>operaciones</a:t>
-            </a:r>
+              <a:t>Registro de patentes</a:t>
+            </a:r>
+          </a:p>
+          <a:p>
+            <a:endParaRPr lang="es-AR" dirty="0" smtClean="0">
+              <a:latin typeface="Segoe UI" panose="020B0502040204020203" pitchFamily="34" charset="0"/>
+              <a:cs typeface="Segoe UI" panose="020B0502040204020203" pitchFamily="34" charset="0"/>
+            </a:endParaRPr>
+          </a:p>
+          <a:p>
+            <a:endParaRPr lang="es-AR" dirty="0" smtClean="0">
+              <a:latin typeface="Segoe UI" panose="020B0502040204020203" pitchFamily="34" charset="0"/>
+              <a:cs typeface="Segoe UI" panose="020B0502040204020203" pitchFamily="34" charset="0"/>
+            </a:endParaRPr>
           </a:p>
           <a:p>
             <a:r>
@@ -12272,7 +12438,7 @@
                 <a:latin typeface="Segoe UI" panose="020B0502040204020203" pitchFamily="34" charset="0"/>
                 <a:cs typeface="Segoe UI" panose="020B0502040204020203" pitchFamily="34" charset="0"/>
               </a:rPr>
-              <a:t>Normas de control</a:t>
+              <a:t>Controles informáticos</a:t>
             </a:r>
           </a:p>
           <a:p>
@@ -12282,37 +12448,82 @@
                 <a:latin typeface="Segoe UI" panose="020B0502040204020203" pitchFamily="34" charset="0"/>
                 <a:cs typeface="Segoe UI" panose="020B0502040204020203" pitchFamily="34" charset="0"/>
               </a:rPr>
-              <a:t>Normas ISO 2700, especialmente </a:t>
-            </a:r>
-            <a:r>
-              <a:rPr lang="es-AR" sz="1800" dirty="0">
-                <a:latin typeface="Segoe UI" panose="020B0502040204020203" pitchFamily="34" charset="0"/>
-                <a:cs typeface="Segoe UI" panose="020B0502040204020203" pitchFamily="34" charset="0"/>
-              </a:rPr>
-              <a:t>dedicada a seguridad de la </a:t>
-            </a:r>
+              <a:t>Software desarrollado siguiendo estándares de seguridad (criptografía)</a:t>
+            </a:r>
+          </a:p>
+          <a:p>
+            <a:pPr lvl="1"/>
             <a:r>
               <a:rPr lang="es-AR" sz="1800" dirty="0" smtClean="0">
                 <a:latin typeface="Segoe UI" panose="020B0502040204020203" pitchFamily="34" charset="0"/>
                 <a:cs typeface="Segoe UI" panose="020B0502040204020203" pitchFamily="34" charset="0"/>
               </a:rPr>
-              <a:t>información</a:t>
-            </a:r>
-          </a:p>
-          <a:p>
-            <a:r>
-              <a:rPr lang="es-AR" sz="2200" dirty="0" smtClean="0">
-                <a:latin typeface="Segoe UI" panose="020B0502040204020203" pitchFamily="34" charset="0"/>
-                <a:cs typeface="Segoe UI" panose="020B0502040204020203" pitchFamily="34" charset="0"/>
-              </a:rPr>
-              <a:t>Uso de nombres en clave para los proyectos tecnológicos</a:t>
-            </a:r>
+              <a:t>Controles físicos sobre el hardware</a:t>
+            </a:r>
+          </a:p>
+          <a:p>
+            <a:pPr lvl="1"/>
+            <a:r>
+              <a:rPr lang="es-AR" sz="1800" dirty="0" smtClean="0">
+                <a:latin typeface="Segoe UI" panose="020B0502040204020203" pitchFamily="34" charset="0"/>
+                <a:cs typeface="Segoe UI" panose="020B0502040204020203" pitchFamily="34" charset="0"/>
+              </a:rPr>
+              <a:t>Políticas de contraseñas y perfiles de usuario</a:t>
+            </a:r>
+          </a:p>
+          <a:p>
+            <a:pPr lvl="1"/>
+            <a:r>
+              <a:rPr lang="es-AR" sz="1800" dirty="0" smtClean="0">
+                <a:latin typeface="Segoe UI" panose="020B0502040204020203" pitchFamily="34" charset="0"/>
+                <a:cs typeface="Segoe UI" panose="020B0502040204020203" pitchFamily="34" charset="0"/>
+              </a:rPr>
+              <a:t>Monitoreo de tráfico en las redes</a:t>
+            </a:r>
+          </a:p>
+          <a:p>
+            <a:pPr lvl="1"/>
+            <a:r>
+              <a:rPr lang="es-AR" sz="1800" dirty="0" smtClean="0">
+                <a:latin typeface="Segoe UI" panose="020B0502040204020203" pitchFamily="34" charset="0"/>
+                <a:cs typeface="Segoe UI" panose="020B0502040204020203" pitchFamily="34" charset="0"/>
+              </a:rPr>
+              <a:t>Uso de software de protección</a:t>
+            </a:r>
+          </a:p>
+          <a:p>
+            <a:pPr lvl="1"/>
+            <a:r>
+              <a:rPr lang="es-AR" sz="1800" dirty="0" smtClean="0">
+                <a:latin typeface="Segoe UI" panose="020B0502040204020203" pitchFamily="34" charset="0"/>
+                <a:cs typeface="Segoe UI" panose="020B0502040204020203" pitchFamily="34" charset="0"/>
+              </a:rPr>
+              <a:t>Creación de </a:t>
+            </a:r>
+            <a:r>
+              <a:rPr lang="es-AR" sz="1800" i="1" dirty="0" err="1" smtClean="0">
+                <a:latin typeface="Segoe UI" panose="020B0502040204020203" pitchFamily="34" charset="0"/>
+                <a:cs typeface="Segoe UI" panose="020B0502040204020203" pitchFamily="34" charset="0"/>
+              </a:rPr>
+              <a:t>backups</a:t>
+            </a:r>
+            <a:r>
+              <a:rPr lang="es-AR" sz="1800" dirty="0" smtClean="0">
+                <a:latin typeface="Segoe UI" panose="020B0502040204020203" pitchFamily="34" charset="0"/>
+                <a:cs typeface="Segoe UI" panose="020B0502040204020203" pitchFamily="34" charset="0"/>
+              </a:rPr>
+              <a:t> periódicos</a:t>
+            </a:r>
+            <a:endParaRPr lang="en-US" sz="1800" dirty="0">
+              <a:latin typeface="Segoe UI" panose="020B0502040204020203" pitchFamily="34" charset="0"/>
+              <a:cs typeface="Segoe UI" panose="020B0502040204020203" pitchFamily="34" charset="0"/>
+            </a:endParaRPr>
           </a:p>
         </p:txBody>
       </p:sp>
       <p:pic>
         <p:nvPicPr>
-          <p:cNvPr id="3074" name="Picture 2" descr="http://www.whoa.com/wp-content/uploads/2014/05/ISO27001.png"/>
+          <p:cNvPr id="4" name="Picture 2" descr="C:\Users\MIPARN~1\AppData\Local\Temp\SNAGHTML5cb90bb7.PNG"/>
           <p:cNvPicPr>
             <a:picLocks noChangeAspect="1" noChangeArrowheads="1"/>
           </p:cNvPicPr>
@@ -12333,8 +12544,8 @@
         </p:blipFill>
         <p:spPr bwMode="auto">
           <a:xfrm>
-            <a:off x="2422004" y="3983194"/>
-            <a:ext cx="2204196" cy="2204196"/>
+            <a:off x="5014292" y="1988840"/>
+            <a:ext cx="2376264" cy="1477007"/>
           </a:xfrm>
           <a:prstGeom prst="rect">
             <a:avLst/>
@@ -12354,7 +12565,7 @@
     </p:spTree>
     <p:extLst>
       <p:ext uri="{BB962C8B-B14F-4D97-AF65-F5344CB8AC3E}">
-        <p14:creationId xmlns:p14="http://schemas.microsoft.com/office/powerpoint/2010/main" val="3374507202"/>
+        <p14:creationId xmlns:p14="http://schemas.microsoft.com/office/powerpoint/2010/main" val="3356351472"/>
       </p:ext>
     </p:extLst>
   </p:cSld>
@@ -12577,11 +12788,13 @@
         </p:nvSpPr>
         <p:spPr/>
         <p:txBody>
-          <a:bodyPr/>
+          <a:bodyPr>
+            <a:normAutofit/>
+          </a:bodyPr>
           <a:lstStyle/>
           <a:p>
             <a:r>
-              <a:rPr lang="es-AR" spc="0" dirty="0" smtClean="0">
+              <a:rPr lang="en-US" spc="0" dirty="0" err="1" smtClean="0">
                 <a:ln w="0"/>
                 <a:solidFill>
                   <a:schemeClr val="accent1"/>
@@ -12596,9 +12809,63 @@
                 <a:latin typeface="Segoe UI" panose="020B0502040204020203" pitchFamily="34" charset="0"/>
                 <a:cs typeface="Segoe UI" panose="020B0502040204020203" pitchFamily="34" charset="0"/>
               </a:rPr>
-              <a:t>Siglo XXI – Riesgos  (I)</a:t>
-            </a:r>
-            <a:endParaRPr lang="es-AR" spc="0" dirty="0">
+              <a:t>Mecanismos</a:t>
+            </a:r>
+            <a:r>
+              <a:rPr lang="en-US" spc="0" dirty="0" smtClean="0">
+                <a:ln w="0"/>
+                <a:solidFill>
+                  <a:schemeClr val="accent1"/>
+                </a:solidFill>
+                <a:effectLst>
+                  <a:outerShdw blurRad="38100" dist="25400" dir="5400000" algn="ctr" rotWithShape="0">
+                    <a:srgbClr val="6E747A">
+                      <a:alpha val="43000"/>
+                    </a:srgbClr>
+                  </a:outerShdw>
+                </a:effectLst>
+                <a:latin typeface="Segoe UI" panose="020B0502040204020203" pitchFamily="34" charset="0"/>
+                <a:cs typeface="Segoe UI" panose="020B0502040204020203" pitchFamily="34" charset="0"/>
+              </a:rPr>
+              <a:t> de </a:t>
+            </a:r>
+            <a:r>
+              <a:rPr lang="en-US" spc="0" dirty="0" err="1" smtClean="0">
+                <a:ln w="0"/>
+                <a:solidFill>
+                  <a:schemeClr val="accent1"/>
+                </a:solidFill>
+                <a:effectLst>
+                  <a:outerShdw blurRad="38100" dist="25400" dir="5400000" algn="ctr" rotWithShape="0">
+                    <a:srgbClr val="6E747A">
+                      <a:alpha val="43000"/>
+                    </a:srgbClr>
+                  </a:outerShdw>
+                </a:effectLst>
+                <a:latin typeface="Segoe UI" panose="020B0502040204020203" pitchFamily="34" charset="0"/>
+                <a:cs typeface="Segoe UI" panose="020B0502040204020203" pitchFamily="34" charset="0"/>
+              </a:rPr>
+              <a:t>defensa</a:t>
+            </a:r>
+            <a:r>
+              <a:rPr lang="en-US" spc="0" dirty="0" smtClean="0">
+                <a:ln w="0"/>
+                <a:solidFill>
+                  <a:schemeClr val="accent1"/>
+                </a:solidFill>
+                <a:effectLst>
+                  <a:outerShdw blurRad="38100" dist="25400" dir="5400000" algn="ctr" rotWithShape="0">
+                    <a:srgbClr val="6E747A">
+                      <a:alpha val="43000"/>
+                    </a:srgbClr>
+                  </a:outerShdw>
+                </a:effectLst>
+                <a:latin typeface="Segoe UI" panose="020B0502040204020203" pitchFamily="34" charset="0"/>
+                <a:cs typeface="Segoe UI" panose="020B0502040204020203" pitchFamily="34" charset="0"/>
+              </a:rPr>
+              <a:t> (cont.)</a:t>
+            </a:r>
+            <a:endParaRPr lang="en-US" spc="0" dirty="0">
               <a:ln w="0"/>
               <a:solidFill>
                 <a:schemeClr val="accent1"/>
@@ -12626,106 +12893,141 @@
             <p:ph idx="1"/>
           </p:nvPr>
         </p:nvSpPr>
-        <p:spPr>
-          <a:xfrm>
-            <a:off x="1522413" y="2276872"/>
-            <a:ext cx="9756575" cy="3742928"/>
-          </a:xfrm>
-        </p:spPr>
+        <p:spPr/>
         <p:txBody>
           <a:bodyPr>
-            <a:normAutofit lnSpcReduction="10000"/>
+            <a:noAutofit/>
           </a:bodyPr>
           <a:lstStyle/>
           <a:p>
-            <a:pPr>
-              <a:lnSpc>
-                <a:spcPct val="150000"/>
-              </a:lnSpc>
-            </a:pPr>
+            <a:r>
+              <a:rPr lang="es-AR" dirty="0">
+                <a:latin typeface="Segoe UI" panose="020B0502040204020203" pitchFamily="34" charset="0"/>
+                <a:cs typeface="Segoe UI" panose="020B0502040204020203" pitchFamily="34" charset="0"/>
+              </a:rPr>
+              <a:t>Auditoría de </a:t>
+            </a:r>
             <a:r>
               <a:rPr lang="es-AR" dirty="0" smtClean="0">
                 <a:latin typeface="Segoe UI" panose="020B0502040204020203" pitchFamily="34" charset="0"/>
                 <a:cs typeface="Segoe UI" panose="020B0502040204020203" pitchFamily="34" charset="0"/>
               </a:rPr>
-              <a:t>Personal deshonesto</a:t>
-            </a:r>
-          </a:p>
-          <a:p>
-            <a:pPr>
-              <a:lnSpc>
-                <a:spcPct val="150000"/>
-              </a:lnSpc>
-            </a:pPr>
+              <a:t>operaciones</a:t>
+            </a:r>
+          </a:p>
+          <a:p>
             <a:r>
               <a:rPr lang="es-AR" dirty="0" smtClean="0">
                 <a:latin typeface="Segoe UI" panose="020B0502040204020203" pitchFamily="34" charset="0"/>
                 <a:cs typeface="Segoe UI" panose="020B0502040204020203" pitchFamily="34" charset="0"/>
               </a:rPr>
-              <a:t>Robo, alteración y/o pérdida de información (políticas inapropiadas)</a:t>
-            </a:r>
-          </a:p>
-          <a:p>
-            <a:pPr>
-              <a:lnSpc>
-                <a:spcPct val="150000"/>
-              </a:lnSpc>
-            </a:pPr>
-            <a:r>
-              <a:rPr lang="es-AR" dirty="0" smtClean="0">
-                <a:latin typeface="Segoe UI" panose="020B0502040204020203" pitchFamily="34" charset="0"/>
-                <a:cs typeface="Segoe UI" panose="020B0502040204020203" pitchFamily="34" charset="0"/>
-              </a:rPr>
-              <a:t>Espionaje industrial</a:t>
-            </a:r>
-          </a:p>
-          <a:p>
-            <a:pPr>
-              <a:lnSpc>
-                <a:spcPct val="150000"/>
-              </a:lnSpc>
-            </a:pPr>
-            <a:r>
-              <a:rPr lang="es-AR" dirty="0" smtClean="0">
-                <a:latin typeface="Segoe UI" panose="020B0502040204020203" pitchFamily="34" charset="0"/>
-                <a:cs typeface="Segoe UI" panose="020B0502040204020203" pitchFamily="34" charset="0"/>
-              </a:rPr>
-              <a:t>Dependencia de los sistemas informáticos</a:t>
-            </a:r>
-          </a:p>
-          <a:p>
-            <a:pPr>
-              <a:lnSpc>
-                <a:spcPct val="150000"/>
-              </a:lnSpc>
-            </a:pPr>
-            <a:r>
-              <a:rPr lang="es-AR" dirty="0" smtClean="0">
-                <a:latin typeface="Segoe UI" panose="020B0502040204020203" pitchFamily="34" charset="0"/>
-                <a:cs typeface="Segoe UI" panose="020B0502040204020203" pitchFamily="34" charset="0"/>
-              </a:rPr>
-              <a:t>Necesidad de capacitación de operarios</a:t>
-            </a:r>
-          </a:p>
-        </p:txBody>
-      </p:sp>
+              <a:t>Normas de control</a:t>
+            </a:r>
+          </a:p>
+          <a:p>
+            <a:pPr lvl="1"/>
+            <a:r>
+              <a:rPr lang="es-AR" sz="1800" dirty="0" smtClean="0">
+                <a:latin typeface="Segoe UI" panose="020B0502040204020203" pitchFamily="34" charset="0"/>
+                <a:cs typeface="Segoe UI" panose="020B0502040204020203" pitchFamily="34" charset="0"/>
+              </a:rPr>
+              <a:t>Normas ISO 2700, especialmente </a:t>
+            </a:r>
+            <a:r>
+              <a:rPr lang="es-AR" sz="1800" dirty="0">
+                <a:latin typeface="Segoe UI" panose="020B0502040204020203" pitchFamily="34" charset="0"/>
+                <a:cs typeface="Segoe UI" panose="020B0502040204020203" pitchFamily="34" charset="0"/>
+              </a:rPr>
+              <a:t>dedicada a seguridad de la </a:t>
+            </a:r>
+            <a:r>
+              <a:rPr lang="es-AR" sz="1800" dirty="0" smtClean="0">
+                <a:latin typeface="Segoe UI" panose="020B0502040204020203" pitchFamily="34" charset="0"/>
+                <a:cs typeface="Segoe UI" panose="020B0502040204020203" pitchFamily="34" charset="0"/>
+              </a:rPr>
+              <a:t>información</a:t>
+            </a:r>
+          </a:p>
+          <a:p>
+            <a:r>
+              <a:rPr lang="es-AR" sz="2200" dirty="0" smtClean="0">
+                <a:latin typeface="Segoe UI" panose="020B0502040204020203" pitchFamily="34" charset="0"/>
+                <a:cs typeface="Segoe UI" panose="020B0502040204020203" pitchFamily="34" charset="0"/>
+              </a:rPr>
+              <a:t>Uso de nombres en clave para los </a:t>
+            </a:r>
+            <a:r>
+              <a:rPr lang="es-AR" sz="2200" dirty="0" smtClean="0">
+                <a:latin typeface="Segoe UI" panose="020B0502040204020203" pitchFamily="34" charset="0"/>
+                <a:cs typeface="Segoe UI" panose="020B0502040204020203" pitchFamily="34" charset="0"/>
+              </a:rPr>
+              <a:t>proyectos</a:t>
+            </a:r>
+            <a:endParaRPr lang="es-AR" sz="2200" dirty="0" smtClean="0">
+              <a:latin typeface="Segoe UI" panose="020B0502040204020203" pitchFamily="34" charset="0"/>
+              <a:cs typeface="Segoe UI" panose="020B0502040204020203" pitchFamily="34" charset="0"/>
+            </a:endParaRPr>
+          </a:p>
+        </p:txBody>
+      </p:sp>
+      <p:pic>
+        <p:nvPicPr>
+          <p:cNvPr id="3074" name="Picture 2" descr="http://www.whoa.com/wp-content/uploads/2014/05/ISO27001.png"/>
+          <p:cNvPicPr>
+            <a:picLocks noChangeAspect="1" noChangeArrowheads="1"/>
+          </p:cNvPicPr>
+          <p:nvPr/>
+        </p:nvPicPr>
+        <p:blipFill>
+          <a:blip r:embed="rId3" cstate="print">
+            <a:extLst>
+              <a:ext uri="{28A0092B-C50C-407E-A947-70E740481C1C}">
+                <a14:useLocalDpi xmlns:a14="http://schemas.microsoft.com/office/drawing/2010/main" val="0"/>
+              </a:ext>
+            </a:extLst>
+          </a:blip>
+          <a:srcRect/>
+          <a:stretch>
+            <a:fillRect/>
+          </a:stretch>
+        </p:blipFill>
+        <p:spPr bwMode="auto">
+          <a:xfrm>
+            <a:off x="2422004" y="3983194"/>
+            <a:ext cx="2204196" cy="2204196"/>
+          </a:xfrm>
+          <a:prstGeom prst="rect">
+            <a:avLst/>
+          </a:prstGeom>
+          <a:noFill/>
+          <a:extLst>
+            <a:ext uri="{909E8E84-426E-40DD-AFC4-6F175D3DCCD1}">
+              <a14:hiddenFill xmlns:a14="http://schemas.microsoft.com/office/drawing/2010/main">
+                <a:solidFill>
+                  <a:srgbClr val="FFFFFF"/>
+                </a:solidFill>
+              </a14:hiddenFill>
+            </a:ext>
+          </a:extLst>
+        </p:spPr>
+      </p:pic>
     </p:spTree>
     <p:extLst>
       <p:ext uri="{BB962C8B-B14F-4D97-AF65-F5344CB8AC3E}">
-        <p14:creationId xmlns:p14="http://schemas.microsoft.com/office/powerpoint/2010/main" val="2238024562"/>
+        <p14:creationId xmlns:p14="http://schemas.microsoft.com/office/powerpoint/2010/main" val="3374507202"/>
       </p:ext>
     </p:extLst>
   </p:cSld>
   <p:clrMapOvr>
     <a:masterClrMapping/>
   </p:clrMapOvr>
-  <mc:AlternateContent xmlns:mc="http://schemas.openxmlformats.org/markup-compatibility/2006">
-    <mc:Choice xmlns:p14="http://schemas.microsoft.com/office/powerpoint/2010/main" Requires="p14">
+  <mc:AlternateContent xmlns:mc="http://schemas.openxmlformats.org/markup-compatibility/2006" xmlns:p14="http://schemas.microsoft.com/office/powerpoint/2010/main">
+    <mc:Choice Requires="p14">
       <p:transition spd="med" p14:dur="700">
         <p:fade/>
       </p:transition>
     </mc:Choice>
-    <mc:Fallback>
+    <mc:Fallback xmlns="">
       <p:transition spd="med">
         <p:fade/>
       </p:transition>
@@ -12789,7 +13091,7 @@
                 <a:latin typeface="Segoe UI" panose="020B0502040204020203" pitchFamily="34" charset="0"/>
                 <a:cs typeface="Segoe UI" panose="020B0502040204020203" pitchFamily="34" charset="0"/>
               </a:rPr>
-              <a:t>Siglo XXI – Riesgos  (II)</a:t>
+              <a:t>Siglo XXI – Riesgos  (I)</a:t>
             </a:r>
             <a:endParaRPr lang="es-AR" spc="0" dirty="0">
               <a:ln w="0"/>
@@ -12821,13 +13123,13 @@
         </p:nvSpPr>
         <p:spPr>
           <a:xfrm>
-            <a:off x="1522413" y="2204864"/>
-            <a:ext cx="9134391" cy="3814936"/>
+            <a:off x="1522413" y="2276872"/>
+            <a:ext cx="9756575" cy="3742928"/>
           </a:xfrm>
         </p:spPr>
         <p:txBody>
           <a:bodyPr>
-            <a:normAutofit/>
+            <a:normAutofit lnSpcReduction="10000"/>
           </a:bodyPr>
           <a:lstStyle/>
           <a:p>
@@ -12841,7 +13143,7 @@
                 <a:latin typeface="Segoe UI" panose="020B0502040204020203" pitchFamily="34" charset="0"/>
                 <a:cs typeface="Segoe UI" panose="020B0502040204020203" pitchFamily="34" charset="0"/>
               </a:rPr>
-              <a:t>Mal administración de perfiles de usuarios y/o contraseñas</a:t>
+              <a:t>Personal deshonesto</a:t>
             </a:r>
           </a:p>
           <a:p>
@@ -12855,7 +13157,7 @@
                 <a:latin typeface="Segoe UI" panose="020B0502040204020203" pitchFamily="34" charset="0"/>
                 <a:cs typeface="Segoe UI" panose="020B0502040204020203" pitchFamily="34" charset="0"/>
               </a:rPr>
-              <a:t>Dependencia de empleados claves</a:t>
+              <a:t>Robo, alteración y/o pérdida de información (políticas inapropiadas)</a:t>
             </a:r>
           </a:p>
           <a:p>
@@ -12869,7 +13171,7 @@
                 <a:latin typeface="Segoe UI" panose="020B0502040204020203" pitchFamily="34" charset="0"/>
                 <a:cs typeface="Segoe UI" panose="020B0502040204020203" pitchFamily="34" charset="0"/>
               </a:rPr>
-              <a:t>Comodidad y confianza excesiva de sistemas</a:t>
+              <a:t>Espionaje industrial</a:t>
             </a:r>
           </a:p>
           <a:p>
@@ -12883,7 +13185,7 @@
                 <a:latin typeface="Segoe UI" panose="020B0502040204020203" pitchFamily="34" charset="0"/>
                 <a:cs typeface="Segoe UI" panose="020B0502040204020203" pitchFamily="34" charset="0"/>
               </a:rPr>
-              <a:t>Generación de información residual</a:t>
+              <a:t>Dependencia de los sistemas informáticos</a:t>
             </a:r>
           </a:p>
           <a:p>
@@ -12897,32 +13199,28 @@
                 <a:latin typeface="Segoe UI" panose="020B0502040204020203" pitchFamily="34" charset="0"/>
                 <a:cs typeface="Segoe UI" panose="020B0502040204020203" pitchFamily="34" charset="0"/>
               </a:rPr>
-              <a:t>Siniestro del soporte físico de la información</a:t>
-            </a:r>
-            <a:endParaRPr lang="es-AR" dirty="0">
-              <a:latin typeface="Segoe UI" panose="020B0502040204020203" pitchFamily="34" charset="0"/>
-              <a:cs typeface="Segoe UI" panose="020B0502040204020203" pitchFamily="34" charset="0"/>
-            </a:endParaRPr>
+              <a:t>Necesidad de capacitación de operarios</a:t>
+            </a:r>
           </a:p>
         </p:txBody>
       </p:sp>
     </p:spTree>
     <p:extLst>
       <p:ext uri="{BB962C8B-B14F-4D97-AF65-F5344CB8AC3E}">
-        <p14:creationId xmlns:p14="http://schemas.microsoft.com/office/powerpoint/2010/main" val="3874537101"/>
+        <p14:creationId xmlns:p14="http://schemas.microsoft.com/office/powerpoint/2010/main" val="2238024562"/>
       </p:ext>
     </p:extLst>
   </p:cSld>
   <p:clrMapOvr>
     <a:masterClrMapping/>
   </p:clrMapOvr>
-  <mc:AlternateContent xmlns:mc="http://schemas.openxmlformats.org/markup-compatibility/2006">
-    <mc:Choice xmlns:p14="http://schemas.microsoft.com/office/powerpoint/2010/main" Requires="p14">
+  <mc:AlternateContent xmlns:mc="http://schemas.openxmlformats.org/markup-compatibility/2006" xmlns:p14="http://schemas.microsoft.com/office/powerpoint/2010/main">
+    <mc:Choice Requires="p14">
       <p:transition spd="med" p14:dur="700">
         <p:fade/>
       </p:transition>
     </mc:Choice>
-    <mc:Fallback>
+    <mc:Fallback xmlns="">
       <p:transition spd="med">
         <p:fade/>
       </p:transition>
@@ -12986,7 +13284,7 @@
                 <a:latin typeface="Segoe UI" panose="020B0502040204020203" pitchFamily="34" charset="0"/>
                 <a:cs typeface="Segoe UI" panose="020B0502040204020203" pitchFamily="34" charset="0"/>
               </a:rPr>
-              <a:t>Siglo XXI – Casos reales  (I)</a:t>
+              <a:t>Siglo XXI – Riesgos  (II)</a:t>
             </a:r>
             <a:endParaRPr lang="es-AR" spc="0" dirty="0">
               <a:ln w="0"/>
@@ -13018,58 +13316,108 @@
         </p:nvSpPr>
         <p:spPr>
           <a:xfrm>
-            <a:off x="1522413" y="2276872"/>
-            <a:ext cx="9134391" cy="3742928"/>
+            <a:off x="1522413" y="2204864"/>
+            <a:ext cx="9134391" cy="3814936"/>
           </a:xfrm>
         </p:spPr>
         <p:txBody>
           <a:bodyPr>
-            <a:noAutofit/>
+            <a:normAutofit/>
           </a:bodyPr>
           <a:lstStyle/>
           <a:p>
-            <a:r>
-              <a:rPr lang="es-ES" dirty="0" smtClean="0">
-                <a:latin typeface="Segoe UI" panose="020B0502040204020203" pitchFamily="34" charset="0"/>
-                <a:cs typeface="Segoe UI" panose="020B0502040204020203" pitchFamily="34" charset="0"/>
-              </a:rPr>
-              <a:t>2001: espionaje industrial de la década: implicó a dos empresas rivales en bienes de consumo, “Unilever” y “Procter &amp; Gamble”.</a:t>
-            </a:r>
-          </a:p>
-          <a:p>
-            <a:endParaRPr lang="es-ES" dirty="0" smtClean="0">
+            <a:pPr>
+              <a:lnSpc>
+                <a:spcPct val="150000"/>
+              </a:lnSpc>
+            </a:pPr>
+            <a:r>
+              <a:rPr lang="es-AR" dirty="0" smtClean="0">
+                <a:latin typeface="Segoe UI" panose="020B0502040204020203" pitchFamily="34" charset="0"/>
+                <a:cs typeface="Segoe UI" panose="020B0502040204020203" pitchFamily="34" charset="0"/>
+              </a:rPr>
+              <a:t>Mal administración de perfiles de usuarios y/o contraseñas</a:t>
+            </a:r>
+          </a:p>
+          <a:p>
+            <a:pPr>
+              <a:lnSpc>
+                <a:spcPct val="150000"/>
+              </a:lnSpc>
+            </a:pPr>
+            <a:r>
+              <a:rPr lang="es-AR" dirty="0" smtClean="0">
+                <a:latin typeface="Segoe UI" panose="020B0502040204020203" pitchFamily="34" charset="0"/>
+                <a:cs typeface="Segoe UI" panose="020B0502040204020203" pitchFamily="34" charset="0"/>
+              </a:rPr>
+              <a:t>Dependencia de empleados claves</a:t>
+            </a:r>
+          </a:p>
+          <a:p>
+            <a:pPr>
+              <a:lnSpc>
+                <a:spcPct val="150000"/>
+              </a:lnSpc>
+            </a:pPr>
+            <a:r>
+              <a:rPr lang="es-AR" dirty="0" smtClean="0">
+                <a:latin typeface="Segoe UI" panose="020B0502040204020203" pitchFamily="34" charset="0"/>
+                <a:cs typeface="Segoe UI" panose="020B0502040204020203" pitchFamily="34" charset="0"/>
+              </a:rPr>
+              <a:t>Comodidad y confianza excesiva de sistemas</a:t>
+            </a:r>
+          </a:p>
+          <a:p>
+            <a:pPr>
+              <a:lnSpc>
+                <a:spcPct val="150000"/>
+              </a:lnSpc>
+            </a:pPr>
+            <a:r>
+              <a:rPr lang="es-AR" dirty="0" smtClean="0">
+                <a:latin typeface="Segoe UI" panose="020B0502040204020203" pitchFamily="34" charset="0"/>
+                <a:cs typeface="Segoe UI" panose="020B0502040204020203" pitchFamily="34" charset="0"/>
+              </a:rPr>
+              <a:t>Generación de información residual</a:t>
+            </a:r>
+          </a:p>
+          <a:p>
+            <a:pPr>
+              <a:lnSpc>
+                <a:spcPct val="150000"/>
+              </a:lnSpc>
+            </a:pPr>
+            <a:r>
+              <a:rPr lang="es-AR" dirty="0" smtClean="0">
+                <a:latin typeface="Segoe UI" panose="020B0502040204020203" pitchFamily="34" charset="0"/>
+                <a:cs typeface="Segoe UI" panose="020B0502040204020203" pitchFamily="34" charset="0"/>
+              </a:rPr>
+              <a:t>Siniestro del soporte físico de la información</a:t>
+            </a:r>
+            <a:endParaRPr lang="es-AR" dirty="0">
               <a:latin typeface="Segoe UI" panose="020B0502040204020203" pitchFamily="34" charset="0"/>
               <a:cs typeface="Segoe UI" panose="020B0502040204020203" pitchFamily="34" charset="0"/>
             </a:endParaRPr>
           </a:p>
-          <a:p>
-            <a:r>
-              <a:rPr lang="es-AR" dirty="0" smtClean="0">
-                <a:latin typeface="Segoe UI" panose="020B0502040204020203" pitchFamily="34" charset="0"/>
-                <a:cs typeface="Segoe UI" panose="020B0502040204020203" pitchFamily="34" charset="0"/>
-              </a:rPr>
-              <a:t>2002: Este caso muestra como el espionaje industrial puede convertirse en un problema de seguridad nacional. La compañía sueca Ericsson se vio envuelta por sorpresa en un incidente diplomático.</a:t>
-            </a:r>
-          </a:p>
         </p:txBody>
       </p:sp>
     </p:spTree>
     <p:extLst>
       <p:ext uri="{BB962C8B-B14F-4D97-AF65-F5344CB8AC3E}">
-        <p14:creationId xmlns:p14="http://schemas.microsoft.com/office/powerpoint/2010/main" val="1202384585"/>
+        <p14:creationId xmlns:p14="http://schemas.microsoft.com/office/powerpoint/2010/main" val="3874537101"/>
       </p:ext>
     </p:extLst>
   </p:cSld>
   <p:clrMapOvr>
     <a:masterClrMapping/>
   </p:clrMapOvr>
-  <mc:AlternateContent xmlns:mc="http://schemas.openxmlformats.org/markup-compatibility/2006">
-    <mc:Choice xmlns:p14="http://schemas.microsoft.com/office/powerpoint/2010/main" Requires="p14">
+  <mc:AlternateContent xmlns:mc="http://schemas.openxmlformats.org/markup-compatibility/2006" xmlns:p14="http://schemas.microsoft.com/office/powerpoint/2010/main">
+    <mc:Choice Requires="p14">
       <p:transition spd="med" p14:dur="700">
         <p:fade/>
       </p:transition>
     </mc:Choice>
-    <mc:Fallback>
+    <mc:Fallback xmlns="">
       <p:transition spd="med">
         <p:fade/>
       </p:transition>
@@ -13133,7 +13481,7 @@
                 <a:latin typeface="Segoe UI" panose="020B0502040204020203" pitchFamily="34" charset="0"/>
                 <a:cs typeface="Segoe UI" panose="020B0502040204020203" pitchFamily="34" charset="0"/>
               </a:rPr>
-              <a:t>Siglo XXI – Casos reales  (II)</a:t>
+              <a:t>Siglo XXI – Casos reales  (I)</a:t>
             </a:r>
             <a:endParaRPr lang="es-AR" spc="0" dirty="0">
               <a:ln w="0"/>
@@ -13176,85 +13524,15 @@
           <a:lstStyle/>
           <a:p>
             <a:r>
-              <a:rPr lang="es-AR" dirty="0" smtClean="0">
-                <a:latin typeface="Segoe UI" panose="020B0502040204020203" pitchFamily="34" charset="0"/>
-                <a:cs typeface="Segoe UI" panose="020B0502040204020203" pitchFamily="34" charset="0"/>
-              </a:rPr>
-              <a:t>2004: se descubrió el primer caso de violación a la ley HIPAA (</a:t>
-            </a:r>
-            <a:r>
-              <a:rPr lang="es-AR" dirty="0" err="1" smtClean="0">
-                <a:latin typeface="Segoe UI" panose="020B0502040204020203" pitchFamily="34" charset="0"/>
-                <a:cs typeface="Segoe UI" panose="020B0502040204020203" pitchFamily="34" charset="0"/>
-              </a:rPr>
-              <a:t>Health</a:t>
-            </a:r>
-            <a:r>
-              <a:rPr lang="es-AR" dirty="0" smtClean="0">
-                <a:latin typeface="Segoe UI" panose="020B0502040204020203" pitchFamily="34" charset="0"/>
-                <a:cs typeface="Segoe UI" panose="020B0502040204020203" pitchFamily="34" charset="0"/>
-              </a:rPr>
-              <a:t> </a:t>
-            </a:r>
-            <a:r>
-              <a:rPr lang="es-AR" dirty="0" err="1" smtClean="0">
-                <a:latin typeface="Segoe UI" panose="020B0502040204020203" pitchFamily="34" charset="0"/>
-                <a:cs typeface="Segoe UI" panose="020B0502040204020203" pitchFamily="34" charset="0"/>
-              </a:rPr>
-              <a:t>Insurance</a:t>
-            </a:r>
-            <a:r>
-              <a:rPr lang="es-AR" dirty="0" smtClean="0">
-                <a:latin typeface="Segoe UI" panose="020B0502040204020203" pitchFamily="34" charset="0"/>
-                <a:cs typeface="Segoe UI" panose="020B0502040204020203" pitchFamily="34" charset="0"/>
-              </a:rPr>
-              <a:t> </a:t>
-            </a:r>
-            <a:r>
-              <a:rPr lang="es-AR" dirty="0" err="1" smtClean="0">
-                <a:latin typeface="Segoe UI" panose="020B0502040204020203" pitchFamily="34" charset="0"/>
-                <a:cs typeface="Segoe UI" panose="020B0502040204020203" pitchFamily="34" charset="0"/>
-              </a:rPr>
-              <a:t>Portability</a:t>
-            </a:r>
-            <a:r>
-              <a:rPr lang="es-AR" dirty="0" smtClean="0">
-                <a:latin typeface="Segoe UI" panose="020B0502040204020203" pitchFamily="34" charset="0"/>
-                <a:cs typeface="Segoe UI" panose="020B0502040204020203" pitchFamily="34" charset="0"/>
-              </a:rPr>
-              <a:t> and </a:t>
-            </a:r>
-            <a:r>
-              <a:rPr lang="es-AR" dirty="0" err="1" smtClean="0">
-                <a:latin typeface="Segoe UI" panose="020B0502040204020203" pitchFamily="34" charset="0"/>
-                <a:cs typeface="Segoe UI" panose="020B0502040204020203" pitchFamily="34" charset="0"/>
-              </a:rPr>
-              <a:t>Accountability</a:t>
-            </a:r>
-            <a:r>
-              <a:rPr lang="es-AR" dirty="0" smtClean="0">
-                <a:latin typeface="Segoe UI" panose="020B0502040204020203" pitchFamily="34" charset="0"/>
-                <a:cs typeface="Segoe UI" panose="020B0502040204020203" pitchFamily="34" charset="0"/>
-              </a:rPr>
-              <a:t> </a:t>
-            </a:r>
-            <a:r>
-              <a:rPr lang="es-AR" dirty="0" err="1" smtClean="0">
-                <a:latin typeface="Segoe UI" panose="020B0502040204020203" pitchFamily="34" charset="0"/>
-                <a:cs typeface="Segoe UI" panose="020B0502040204020203" pitchFamily="34" charset="0"/>
-              </a:rPr>
-              <a:t>Act</a:t>
-            </a:r>
-            <a:r>
-              <a:rPr lang="es-AR" dirty="0" smtClean="0">
-                <a:latin typeface="Segoe UI" panose="020B0502040204020203" pitchFamily="34" charset="0"/>
-                <a:cs typeface="Segoe UI" panose="020B0502040204020203" pitchFamily="34" charset="0"/>
-              </a:rPr>
-              <a:t>), cuando un empleado de una asociación de enfermos de cáncer utilizó información de pacientes para obtener tarjetas de crédito.</a:t>
-            </a:r>
-          </a:p>
-          <a:p>
-            <a:endParaRPr lang="es-AR" dirty="0" smtClean="0">
+              <a:rPr lang="es-ES" dirty="0" smtClean="0">
+                <a:latin typeface="Segoe UI" panose="020B0502040204020203" pitchFamily="34" charset="0"/>
+                <a:cs typeface="Segoe UI" panose="020B0502040204020203" pitchFamily="34" charset="0"/>
+              </a:rPr>
+              <a:t>2001: espionaje industrial de la década: implicó a dos empresas rivales en bienes de consumo, “Unilever” y “Procter &amp; Gamble”.</a:t>
+            </a:r>
+          </a:p>
+          <a:p>
+            <a:endParaRPr lang="es-ES" dirty="0" smtClean="0">
               <a:latin typeface="Segoe UI" panose="020B0502040204020203" pitchFamily="34" charset="0"/>
               <a:cs typeface="Segoe UI" panose="020B0502040204020203" pitchFamily="34" charset="0"/>
             </a:endParaRPr>
@@ -13265,35 +13543,7 @@
                 <a:latin typeface="Segoe UI" panose="020B0502040204020203" pitchFamily="34" charset="0"/>
                 <a:cs typeface="Segoe UI" panose="020B0502040204020203" pitchFamily="34" charset="0"/>
               </a:rPr>
-              <a:t>2005: empleados de un hospital fueron descubiertos mientras obtenían información de la internación por maternidad de la cantante pop </a:t>
-            </a:r>
-            <a:r>
-              <a:rPr lang="es-AR" dirty="0" err="1" smtClean="0">
-                <a:latin typeface="Segoe UI" panose="020B0502040204020203" pitchFamily="34" charset="0"/>
-                <a:cs typeface="Segoe UI" panose="020B0502040204020203" pitchFamily="34" charset="0"/>
-              </a:rPr>
-              <a:t>Britney</a:t>
-            </a:r>
-            <a:r>
-              <a:rPr lang="es-AR" dirty="0" smtClean="0">
-                <a:latin typeface="Segoe UI" panose="020B0502040204020203" pitchFamily="34" charset="0"/>
-                <a:cs typeface="Segoe UI" panose="020B0502040204020203" pitchFamily="34" charset="0"/>
-              </a:rPr>
-              <a:t> </a:t>
-            </a:r>
-            <a:r>
-              <a:rPr lang="es-AR" dirty="0" err="1" smtClean="0">
-                <a:latin typeface="Segoe UI" panose="020B0502040204020203" pitchFamily="34" charset="0"/>
-                <a:cs typeface="Segoe UI" panose="020B0502040204020203" pitchFamily="34" charset="0"/>
-              </a:rPr>
-              <a:t>Spears</a:t>
-            </a:r>
-            <a:r>
-              <a:rPr lang="es-AR" dirty="0" smtClean="0">
-                <a:latin typeface="Segoe UI" panose="020B0502040204020203" pitchFamily="34" charset="0"/>
-                <a:cs typeface="Segoe UI" panose="020B0502040204020203" pitchFamily="34" charset="0"/>
-              </a:rPr>
-              <a:t>.</a:t>
+              <a:t>2002: Este caso muestra como el espionaje industrial puede convertirse en un problema de seguridad nacional. La compañía sueca Ericsson se vio envuelta por sorpresa en un incidente diplomático.</a:t>
             </a:r>
           </a:p>
         </p:txBody>
@@ -13301,20 +13551,20 @@
     </p:spTree>
     <p:extLst>
       <p:ext uri="{BB962C8B-B14F-4D97-AF65-F5344CB8AC3E}">
-        <p14:creationId xmlns:p14="http://schemas.microsoft.com/office/powerpoint/2010/main" val="701687324"/>
+        <p14:creationId xmlns:p14="http://schemas.microsoft.com/office/powerpoint/2010/main" val="1202384585"/>
       </p:ext>
     </p:extLst>
   </p:cSld>
   <p:clrMapOvr>
     <a:masterClrMapping/>
   </p:clrMapOvr>
-  <mc:AlternateContent xmlns:mc="http://schemas.openxmlformats.org/markup-compatibility/2006">
-    <mc:Choice xmlns:p14="http://schemas.microsoft.com/office/powerpoint/2010/main" Requires="p14">
+  <mc:AlternateContent xmlns:mc="http://schemas.openxmlformats.org/markup-compatibility/2006" xmlns:p14="http://schemas.microsoft.com/office/powerpoint/2010/main">
+    <mc:Choice Requires="p14">
       <p:transition spd="med" p14:dur="700">
         <p:fade/>
       </p:transition>
     </mc:Choice>
-    <mc:Fallback>
+    <mc:Fallback xmlns="">
       <p:transition spd="med">
         <p:fade/>
       </p:transition>
@@ -13378,7 +13628,7 @@
                 <a:latin typeface="Segoe UI" panose="020B0502040204020203" pitchFamily="34" charset="0"/>
                 <a:cs typeface="Segoe UI" panose="020B0502040204020203" pitchFamily="34" charset="0"/>
               </a:rPr>
-              <a:t>Siglo XXI – Casos reales  (III)</a:t>
+              <a:t>Siglo XXI – Casos reales  (II)</a:t>
             </a:r>
             <a:endParaRPr lang="es-AR" spc="0" dirty="0">
               <a:ln w="0"/>
@@ -13421,11 +13671,81 @@
           <a:lstStyle/>
           <a:p>
             <a:r>
-              <a:rPr lang="es-ES" dirty="0" smtClean="0">
-                <a:latin typeface="Segoe UI" panose="020B0502040204020203" pitchFamily="34" charset="0"/>
-                <a:cs typeface="Segoe UI" panose="020B0502040204020203" pitchFamily="34" charset="0"/>
-              </a:rPr>
-              <a:t>2005: se produjo la fuga de información confidencial sobre centrales nucleares en Japón, a través de Internet desde un ordenador infectado por un virus.</a:t>
+              <a:rPr lang="es-AR" dirty="0" smtClean="0">
+                <a:latin typeface="Segoe UI" panose="020B0502040204020203" pitchFamily="34" charset="0"/>
+                <a:cs typeface="Segoe UI" panose="020B0502040204020203" pitchFamily="34" charset="0"/>
+              </a:rPr>
+              <a:t>2004: se descubrió el primer caso de violación a la ley HIPAA (</a:t>
+            </a:r>
+            <a:r>
+              <a:rPr lang="es-AR" dirty="0" err="1" smtClean="0">
+                <a:latin typeface="Segoe UI" panose="020B0502040204020203" pitchFamily="34" charset="0"/>
+                <a:cs typeface="Segoe UI" panose="020B0502040204020203" pitchFamily="34" charset="0"/>
+              </a:rPr>
+              <a:t>Health</a:t>
+            </a:r>
+            <a:r>
+              <a:rPr lang="es-AR" dirty="0" smtClean="0">
+                <a:latin typeface="Segoe UI" panose="020B0502040204020203" pitchFamily="34" charset="0"/>
+                <a:cs typeface="Segoe UI" panose="020B0502040204020203" pitchFamily="34" charset="0"/>
+              </a:rPr>
+              <a:t> </a:t>
+            </a:r>
+            <a:r>
+              <a:rPr lang="es-AR" dirty="0" err="1" smtClean="0">
+                <a:latin typeface="Segoe UI" panose="020B0502040204020203" pitchFamily="34" charset="0"/>
+                <a:cs typeface="Segoe UI" panose="020B0502040204020203" pitchFamily="34" charset="0"/>
+              </a:rPr>
+              <a:t>Insurance</a:t>
+            </a:r>
+            <a:r>
+              <a:rPr lang="es-AR" dirty="0" smtClean="0">
+                <a:latin typeface="Segoe UI" panose="020B0502040204020203" pitchFamily="34" charset="0"/>
+                <a:cs typeface="Segoe UI" panose="020B0502040204020203" pitchFamily="34" charset="0"/>
+              </a:rPr>
+              <a:t> </a:t>
+            </a:r>
+            <a:r>
+              <a:rPr lang="es-AR" dirty="0" err="1" smtClean="0">
+                <a:latin typeface="Segoe UI" panose="020B0502040204020203" pitchFamily="34" charset="0"/>
+                <a:cs typeface="Segoe UI" panose="020B0502040204020203" pitchFamily="34" charset="0"/>
+              </a:rPr>
+              <a:t>Portability</a:t>
+            </a:r>
+            <a:r>
+              <a:rPr lang="es-AR" dirty="0" smtClean="0">
+                <a:latin typeface="Segoe UI" panose="020B0502040204020203" pitchFamily="34" charset="0"/>
+                <a:cs typeface="Segoe UI" panose="020B0502040204020203" pitchFamily="34" charset="0"/>
+              </a:rPr>
+              <a:t> and </a:t>
+            </a:r>
+            <a:r>
+              <a:rPr lang="es-AR" dirty="0" err="1" smtClean="0">
+                <a:latin typeface="Segoe UI" panose="020B0502040204020203" pitchFamily="34" charset="0"/>
+                <a:cs typeface="Segoe UI" panose="020B0502040204020203" pitchFamily="34" charset="0"/>
+              </a:rPr>
+              <a:t>Accountability</a:t>
+            </a:r>
+            <a:r>
+              <a:rPr lang="es-AR" dirty="0" smtClean="0">
+                <a:latin typeface="Segoe UI" panose="020B0502040204020203" pitchFamily="34" charset="0"/>
+                <a:cs typeface="Segoe UI" panose="020B0502040204020203" pitchFamily="34" charset="0"/>
+              </a:rPr>
+              <a:t> </a:t>
+            </a:r>
+            <a:r>
+              <a:rPr lang="es-AR" dirty="0" err="1" smtClean="0">
+                <a:latin typeface="Segoe UI" panose="020B0502040204020203" pitchFamily="34" charset="0"/>
+                <a:cs typeface="Segoe UI" panose="020B0502040204020203" pitchFamily="34" charset="0"/>
+              </a:rPr>
+              <a:t>Act</a:t>
+            </a:r>
+            <a:r>
+              <a:rPr lang="es-AR" dirty="0" smtClean="0">
+                <a:latin typeface="Segoe UI" panose="020B0502040204020203" pitchFamily="34" charset="0"/>
+                <a:cs typeface="Segoe UI" panose="020B0502040204020203" pitchFamily="34" charset="0"/>
+              </a:rPr>
+              <a:t>), cuando un empleado de una asociación de enfermos de cáncer utilizó información de pacientes para obtener tarjetas de crédito.</a:t>
             </a:r>
           </a:p>
           <a:p>
@@ -13440,48 +13760,56 @@
                 <a:latin typeface="Segoe UI" panose="020B0502040204020203" pitchFamily="34" charset="0"/>
                 <a:cs typeface="Segoe UI" panose="020B0502040204020203" pitchFamily="34" charset="0"/>
               </a:rPr>
-              <a:t>2007: el sitio global de búsquedas laborales </a:t>
+              <a:t>2005: empleados de un hospital fueron descubiertos mientras obtenían información de la internación por maternidad de la cantante pop </a:t>
             </a:r>
             <a:r>
               <a:rPr lang="es-AR" dirty="0" err="1" smtClean="0">
                 <a:latin typeface="Segoe UI" panose="020B0502040204020203" pitchFamily="34" charset="0"/>
                 <a:cs typeface="Segoe UI" panose="020B0502040204020203" pitchFamily="34" charset="0"/>
               </a:rPr>
-              <a:t>Monster</a:t>
+              <a:t>Britney</a:t>
             </a:r>
             <a:r>
               <a:rPr lang="es-AR" dirty="0" smtClean="0">
                 <a:latin typeface="Segoe UI" panose="020B0502040204020203" pitchFamily="34" charset="0"/>
                 <a:cs typeface="Segoe UI" panose="020B0502040204020203" pitchFamily="34" charset="0"/>
               </a:rPr>
-              <a:t> sufrió el robo de 1,6 millones de datos con información personal de los usuarios registrados. Los atacantes ingresaron a las bases de datos con contraseñas que habían sido obtenidas previamente mediante un troyano.</a:t>
-            </a:r>
-          </a:p>
-          <a:p>
-            <a:endParaRPr lang="es-ES" dirty="0" smtClean="0">
-              <a:latin typeface="Segoe UI" panose="020B0502040204020203" pitchFamily="34" charset="0"/>
-              <a:cs typeface="Segoe UI" panose="020B0502040204020203" pitchFamily="34" charset="0"/>
-            </a:endParaRPr>
+              <a:t> </a:t>
+            </a:r>
+            <a:r>
+              <a:rPr lang="es-AR" dirty="0" err="1" smtClean="0">
+                <a:latin typeface="Segoe UI" panose="020B0502040204020203" pitchFamily="34" charset="0"/>
+                <a:cs typeface="Segoe UI" panose="020B0502040204020203" pitchFamily="34" charset="0"/>
+              </a:rPr>
+              <a:t>Spears</a:t>
+            </a:r>
+            <a:r>
+              <a:rPr lang="es-AR" dirty="0" smtClean="0">
+                <a:latin typeface="Segoe UI" panose="020B0502040204020203" pitchFamily="34" charset="0"/>
+                <a:cs typeface="Segoe UI" panose="020B0502040204020203" pitchFamily="34" charset="0"/>
+              </a:rPr>
+              <a:t>.</a:t>
+            </a:r>
           </a:p>
         </p:txBody>
       </p:sp>
     </p:spTree>
     <p:extLst>
       <p:ext uri="{BB962C8B-B14F-4D97-AF65-F5344CB8AC3E}">
-        <p14:creationId xmlns:p14="http://schemas.microsoft.com/office/powerpoint/2010/main" val="1445017764"/>
+        <p14:creationId xmlns:p14="http://schemas.microsoft.com/office/powerpoint/2010/main" val="701687324"/>
       </p:ext>
     </p:extLst>
   </p:cSld>
   <p:clrMapOvr>
     <a:masterClrMapping/>
   </p:clrMapOvr>
-  <mc:AlternateContent xmlns:mc="http://schemas.openxmlformats.org/markup-compatibility/2006">
-    <mc:Choice xmlns:p14="http://schemas.microsoft.com/office/powerpoint/2010/main" Requires="p14">
+  <mc:AlternateContent xmlns:mc="http://schemas.openxmlformats.org/markup-compatibility/2006" xmlns:p14="http://schemas.microsoft.com/office/powerpoint/2010/main">
+    <mc:Choice Requires="p14">
       <p:transition spd="med" p14:dur="700">
         <p:fade/>
       </p:transition>
     </mc:Choice>
-    <mc:Fallback>
+    <mc:Fallback xmlns="">
       <p:transition spd="med">
         <p:fade/>
       </p:transition>
@@ -13545,7 +13873,7 @@
                 <a:latin typeface="Segoe UI" panose="020B0502040204020203" pitchFamily="34" charset="0"/>
                 <a:cs typeface="Segoe UI" panose="020B0502040204020203" pitchFamily="34" charset="0"/>
               </a:rPr>
-              <a:t>Siglo XXI – Casos reales  (IV)</a:t>
+              <a:t>Siglo XXI – Casos reales  (III)</a:t>
             </a:r>
             <a:endParaRPr lang="es-AR" spc="0" dirty="0">
               <a:ln w="0"/>
@@ -13588,25 +13916,11 @@
           <a:lstStyle/>
           <a:p>
             <a:r>
-              <a:rPr lang="es-AR" dirty="0" smtClean="0">
-                <a:latin typeface="Segoe UI" panose="020B0502040204020203" pitchFamily="34" charset="0"/>
-                <a:cs typeface="Segoe UI" panose="020B0502040204020203" pitchFamily="34" charset="0"/>
-              </a:rPr>
-              <a:t>2009: la red social </a:t>
-            </a:r>
-            <a:r>
-              <a:rPr lang="es-AR" dirty="0" err="1" smtClean="0">
-                <a:latin typeface="Segoe UI" panose="020B0502040204020203" pitchFamily="34" charset="0"/>
-                <a:cs typeface="Segoe UI" panose="020B0502040204020203" pitchFamily="34" charset="0"/>
-              </a:rPr>
-              <a:t>Tuenti</a:t>
-            </a:r>
-            <a:r>
-              <a:rPr lang="es-AR" dirty="0" smtClean="0">
-                <a:latin typeface="Segoe UI" panose="020B0502040204020203" pitchFamily="34" charset="0"/>
-                <a:cs typeface="Segoe UI" panose="020B0502040204020203" pitchFamily="34" charset="0"/>
-              </a:rPr>
-              <a:t> fue afectada por el robo de 4.000 cuentas de usuario y sus contraseñas, por parte de un atacante enojado con la empresa.</a:t>
+              <a:rPr lang="es-ES" dirty="0" smtClean="0">
+                <a:latin typeface="Segoe UI" panose="020B0502040204020203" pitchFamily="34" charset="0"/>
+                <a:cs typeface="Segoe UI" panose="020B0502040204020203" pitchFamily="34" charset="0"/>
+              </a:rPr>
+              <a:t>2005: se produjo la fuga de información confidencial sobre centrales nucleares en Japón, a través de Internet desde un ordenador infectado por un virus.</a:t>
             </a:r>
           </a:p>
           <a:p>
@@ -13621,61 +13935,48 @@
                 <a:latin typeface="Segoe UI" panose="020B0502040204020203" pitchFamily="34" charset="0"/>
                 <a:cs typeface="Segoe UI" panose="020B0502040204020203" pitchFamily="34" charset="0"/>
               </a:rPr>
-              <a:t>2010:  Google detectó que había sido víctima de un ataque desde China, que robó información de su propiedad intelectual.</a:t>
-            </a:r>
-          </a:p>
-          <a:p>
-            <a:endParaRPr lang="es-AR" dirty="0" smtClean="0">
+              <a:t>2007: el sitio global de búsquedas laborales </a:t>
+            </a:r>
+            <a:r>
+              <a:rPr lang="es-AR" dirty="0" err="1" smtClean="0">
+                <a:latin typeface="Segoe UI" panose="020B0502040204020203" pitchFamily="34" charset="0"/>
+                <a:cs typeface="Segoe UI" panose="020B0502040204020203" pitchFamily="34" charset="0"/>
+              </a:rPr>
+              <a:t>Monster</a:t>
+            </a:r>
+            <a:r>
+              <a:rPr lang="es-AR" dirty="0" smtClean="0">
+                <a:latin typeface="Segoe UI" panose="020B0502040204020203" pitchFamily="34" charset="0"/>
+                <a:cs typeface="Segoe UI" panose="020B0502040204020203" pitchFamily="34" charset="0"/>
+              </a:rPr>
+              <a:t> sufrió el robo de 1,6 millones de datos con información personal de los usuarios registrados. Los atacantes ingresaron a las bases de datos con contraseñas que habían sido obtenidas previamente mediante un troyano.</a:t>
+            </a:r>
+          </a:p>
+          <a:p>
+            <a:endParaRPr lang="es-ES" dirty="0" smtClean="0">
               <a:latin typeface="Segoe UI" panose="020B0502040204020203" pitchFamily="34" charset="0"/>
               <a:cs typeface="Segoe UI" panose="020B0502040204020203" pitchFamily="34" charset="0"/>
             </a:endParaRPr>
           </a:p>
-          <a:p>
-            <a:r>
-              <a:rPr lang="es-AR" dirty="0" smtClean="0">
-                <a:latin typeface="Segoe UI" panose="020B0502040204020203" pitchFamily="34" charset="0"/>
-                <a:cs typeface="Segoe UI" panose="020B0502040204020203" pitchFamily="34" charset="0"/>
-              </a:rPr>
-              <a:t>2014: Edward </a:t>
-            </a:r>
-            <a:r>
-              <a:rPr lang="es-AR" dirty="0" err="1" smtClean="0">
-                <a:latin typeface="Segoe UI" panose="020B0502040204020203" pitchFamily="34" charset="0"/>
-                <a:cs typeface="Segoe UI" panose="020B0502040204020203" pitchFamily="34" charset="0"/>
-              </a:rPr>
-              <a:t>Snowden</a:t>
-            </a:r>
-            <a:r>
-              <a:rPr lang="es-AR" dirty="0" smtClean="0">
-                <a:latin typeface="Segoe UI" panose="020B0502040204020203" pitchFamily="34" charset="0"/>
-                <a:cs typeface="Segoe UI" panose="020B0502040204020203" pitchFamily="34" charset="0"/>
-              </a:rPr>
-              <a:t> revela cómo la Casa Blanca y sus organismos espían las comunicaciones en Internet.</a:t>
-            </a:r>
-            <a:endParaRPr lang="es-AR" dirty="0">
-              <a:latin typeface="Segoe UI" panose="020B0502040204020203" pitchFamily="34" charset="0"/>
-              <a:cs typeface="Segoe UI" panose="020B0502040204020203" pitchFamily="34" charset="0"/>
-            </a:endParaRPr>
-          </a:p>
         </p:txBody>
       </p:sp>
     </p:spTree>
     <p:extLst>
       <p:ext uri="{BB962C8B-B14F-4D97-AF65-F5344CB8AC3E}">
-        <p14:creationId xmlns:p14="http://schemas.microsoft.com/office/powerpoint/2010/main" val="3810472897"/>
+        <p14:creationId xmlns:p14="http://schemas.microsoft.com/office/powerpoint/2010/main" val="1445017764"/>
       </p:ext>
     </p:extLst>
   </p:cSld>
   <p:clrMapOvr>
     <a:masterClrMapping/>
   </p:clrMapOvr>
-  <mc:AlternateContent xmlns:mc="http://schemas.openxmlformats.org/markup-compatibility/2006">
-    <mc:Choice xmlns:p14="http://schemas.microsoft.com/office/powerpoint/2010/main" Requires="p14">
+  <mc:AlternateContent xmlns:mc="http://schemas.openxmlformats.org/markup-compatibility/2006" xmlns:p14="http://schemas.microsoft.com/office/powerpoint/2010/main">
+    <mc:Choice Requires="p14">
       <p:transition spd="med" p14:dur="700">
         <p:fade/>
       </p:transition>
     </mc:Choice>
-    <mc:Fallback>
+    <mc:Fallback xmlns="">
       <p:transition spd="med">
         <p:fade/>
       </p:transition>
@@ -13710,7 +14011,7 @@
       </p:grpSpPr>
       <p:sp>
         <p:nvSpPr>
-          <p:cNvPr id="2" name="Title 1"/>
+          <p:cNvPr id="13" name="Title 12"/>
           <p:cNvSpPr>
             <a:spLocks noGrp="1"/>
           </p:cNvSpPr>
@@ -13724,11 +14025,127 @@
           <a:lstStyle/>
           <a:p>
             <a:r>
+              <a:rPr lang="es-AR" spc="0" dirty="0" smtClean="0">
+                <a:ln w="0"/>
+                <a:solidFill>
+                  <a:schemeClr val="accent1"/>
+                </a:solidFill>
+                <a:effectLst>
+                  <a:outerShdw blurRad="38100" dist="25400" dir="5400000" algn="ctr" rotWithShape="0">
+                    <a:srgbClr val="6E747A">
+                      <a:alpha val="43000"/>
+                    </a:srgbClr>
+                  </a:outerShdw>
+                </a:effectLst>
+                <a:latin typeface="Segoe UI" panose="020B0502040204020203" pitchFamily="34" charset="0"/>
+                <a:cs typeface="Segoe UI" panose="020B0502040204020203" pitchFamily="34" charset="0"/>
+              </a:rPr>
+              <a:t>Siglo XXI – Casos reales  (IV)</a:t>
+            </a:r>
+            <a:endParaRPr lang="es-AR" spc="0" dirty="0">
+              <a:ln w="0"/>
+              <a:solidFill>
+                <a:schemeClr val="accent1"/>
+              </a:solidFill>
+              <a:effectLst>
+                <a:outerShdw blurRad="38100" dist="25400" dir="5400000" algn="ctr" rotWithShape="0">
+                  <a:srgbClr val="6E747A">
+                    <a:alpha val="43000"/>
+                  </a:srgbClr>
+                </a:outerShdw>
+              </a:effectLst>
+              <a:latin typeface="Segoe UI" panose="020B0502040204020203" pitchFamily="34" charset="0"/>
+              <a:cs typeface="Segoe UI" panose="020B0502040204020203" pitchFamily="34" charset="0"/>
+            </a:endParaRPr>
+          </a:p>
+        </p:txBody>
+      </p:sp>
+      <p:sp>
+        <p:nvSpPr>
+          <p:cNvPr id="2" name="Content Placeholder 1"/>
+          <p:cNvSpPr>
+            <a:spLocks noGrp="1"/>
+          </p:cNvSpPr>
+          <p:nvPr>
+            <p:ph idx="1"/>
+          </p:nvPr>
+        </p:nvSpPr>
+        <p:spPr>
+          <a:xfrm>
+            <a:off x="1522413" y="2276872"/>
+            <a:ext cx="9134391" cy="3742928"/>
+          </a:xfrm>
+        </p:spPr>
+        <p:txBody>
+          <a:bodyPr>
+            <a:noAutofit/>
+          </a:bodyPr>
+          <a:lstStyle/>
+          <a:p>
+            <a:r>
               <a:rPr lang="es-AR" dirty="0" smtClean="0">
                 <a:latin typeface="Segoe UI" panose="020B0502040204020203" pitchFamily="34" charset="0"/>
                 <a:cs typeface="Segoe UI" panose="020B0502040204020203" pitchFamily="34" charset="0"/>
               </a:rPr>
-              <a:t>Conclusiones</a:t>
+              <a:t>2009: la red social </a:t>
+            </a:r>
+            <a:r>
+              <a:rPr lang="es-AR" dirty="0" err="1" smtClean="0">
+                <a:latin typeface="Segoe UI" panose="020B0502040204020203" pitchFamily="34" charset="0"/>
+                <a:cs typeface="Segoe UI" panose="020B0502040204020203" pitchFamily="34" charset="0"/>
+              </a:rPr>
+              <a:t>Tuenti</a:t>
+            </a:r>
+            <a:r>
+              <a:rPr lang="es-AR" dirty="0" smtClean="0">
+                <a:latin typeface="Segoe UI" panose="020B0502040204020203" pitchFamily="34" charset="0"/>
+                <a:cs typeface="Segoe UI" panose="020B0502040204020203" pitchFamily="34" charset="0"/>
+              </a:rPr>
+              <a:t> fue afectada por el robo de 4.000 cuentas de usuario y sus contraseñas, por parte de un atacante enojado con la empresa.</a:t>
+            </a:r>
+          </a:p>
+          <a:p>
+            <a:endParaRPr lang="es-AR" dirty="0" smtClean="0">
+              <a:latin typeface="Segoe UI" panose="020B0502040204020203" pitchFamily="34" charset="0"/>
+              <a:cs typeface="Segoe UI" panose="020B0502040204020203" pitchFamily="34" charset="0"/>
+            </a:endParaRPr>
+          </a:p>
+          <a:p>
+            <a:r>
+              <a:rPr lang="es-AR" dirty="0" smtClean="0">
+                <a:latin typeface="Segoe UI" panose="020B0502040204020203" pitchFamily="34" charset="0"/>
+                <a:cs typeface="Segoe UI" panose="020B0502040204020203" pitchFamily="34" charset="0"/>
+              </a:rPr>
+              <a:t>2010:  Google detectó que había sido víctima de un ataque desde China, que robó información de su propiedad intelectual.</a:t>
+            </a:r>
+          </a:p>
+          <a:p>
+            <a:endParaRPr lang="es-AR" dirty="0" smtClean="0">
+              <a:latin typeface="Segoe UI" panose="020B0502040204020203" pitchFamily="34" charset="0"/>
+              <a:cs typeface="Segoe UI" panose="020B0502040204020203" pitchFamily="34" charset="0"/>
+            </a:endParaRPr>
+          </a:p>
+          <a:p>
+            <a:r>
+              <a:rPr lang="es-AR" dirty="0" smtClean="0">
+                <a:latin typeface="Segoe UI" panose="020B0502040204020203" pitchFamily="34" charset="0"/>
+                <a:cs typeface="Segoe UI" panose="020B0502040204020203" pitchFamily="34" charset="0"/>
+              </a:rPr>
+              <a:t>2014: Edward </a:t>
+            </a:r>
+            <a:r>
+              <a:rPr lang="es-AR" dirty="0" err="1" smtClean="0">
+                <a:latin typeface="Segoe UI" panose="020B0502040204020203" pitchFamily="34" charset="0"/>
+                <a:cs typeface="Segoe UI" panose="020B0502040204020203" pitchFamily="34" charset="0"/>
+              </a:rPr>
+              <a:t>Snowden</a:t>
+            </a:r>
+            <a:r>
+              <a:rPr lang="es-AR" dirty="0" smtClean="0">
+                <a:latin typeface="Segoe UI" panose="020B0502040204020203" pitchFamily="34" charset="0"/>
+                <a:cs typeface="Segoe UI" panose="020B0502040204020203" pitchFamily="34" charset="0"/>
+              </a:rPr>
+              <a:t> revela cómo la Casa Blanca y sus organismos espían las comunicaciones en Internet.</a:t>
             </a:r>
             <a:endParaRPr lang="es-AR" dirty="0">
               <a:latin typeface="Segoe UI" panose="020B0502040204020203" pitchFamily="34" charset="0"/>
@@ -13740,7 +14157,7 @@
     </p:spTree>
     <p:extLst>
       <p:ext uri="{BB962C8B-B14F-4D97-AF65-F5344CB8AC3E}">
-        <p14:creationId xmlns:p14="http://schemas.microsoft.com/office/powerpoint/2010/main" val="1539601608"/>
+        <p14:creationId xmlns:p14="http://schemas.microsoft.com/office/powerpoint/2010/main" val="3810472897"/>
       </p:ext>
     </p:extLst>
   </p:cSld>
@@ -13802,101 +14219,12 @@
           <a:lstStyle/>
           <a:p>
             <a:r>
-              <a:rPr lang="es-AR" b="1" spc="0" dirty="0" smtClean="0">
-                <a:ln w="9525">
-                  <a:solidFill>
-                    <a:schemeClr val="bg1"/>
-                  </a:solidFill>
-                  <a:prstDash val="solid"/>
-                </a:ln>
-                <a:effectLst>
-                  <a:outerShdw blurRad="12700" dist="38100" dir="2700000" algn="tl" rotWithShape="0">
-                    <a:schemeClr val="bg1">
-                      <a:lumMod val="50000"/>
-                    </a:schemeClr>
-                  </a:outerShdw>
-                </a:effectLst>
+              <a:rPr lang="es-AR" dirty="0" smtClean="0">
                 <a:latin typeface="Segoe UI" panose="020B0502040204020203" pitchFamily="34" charset="0"/>
                 <a:cs typeface="Segoe UI" panose="020B0502040204020203" pitchFamily="34" charset="0"/>
               </a:rPr>
               <a:t>Conclusiones</a:t>
             </a:r>
-            <a:endParaRPr lang="es-AR" b="1" spc="0" dirty="0">
-              <a:ln w="9525">
-                <a:solidFill>
-                  <a:schemeClr val="bg1"/>
-                </a:solidFill>
-                <a:prstDash val="solid"/>
-              </a:ln>
-              <a:effectLst>
-                <a:outerShdw blurRad="12700" dist="38100" dir="2700000" algn="tl" rotWithShape="0">
-                  <a:schemeClr val="bg1">
-                    <a:lumMod val="50000"/>
-                  </a:schemeClr>
-                </a:outerShdw>
-              </a:effectLst>
-              <a:latin typeface="Segoe UI" panose="020B0502040204020203" pitchFamily="34" charset="0"/>
-              <a:cs typeface="Segoe UI" panose="020B0502040204020203" pitchFamily="34" charset="0"/>
-            </a:endParaRPr>
-          </a:p>
-        </p:txBody>
-      </p:sp>
-      <p:sp>
-        <p:nvSpPr>
-          <p:cNvPr id="3" name="Content Placeholder 2"/>
-          <p:cNvSpPr>
-            <a:spLocks noGrp="1"/>
-          </p:cNvSpPr>
-          <p:nvPr>
-            <p:ph idx="1"/>
-          </p:nvPr>
-        </p:nvSpPr>
-        <p:spPr/>
-        <p:txBody>
-          <a:bodyPr>
-            <a:normAutofit lnSpcReduction="10000"/>
-          </a:bodyPr>
-          <a:lstStyle/>
-          <a:p>
-            <a:pPr marL="342900" indent="-342900">
-              <a:lnSpc>
-                <a:spcPct val="150000"/>
-              </a:lnSpc>
-            </a:pPr>
-            <a:r>
-              <a:rPr lang="es-AR" dirty="0" smtClean="0">
-                <a:latin typeface="Segoe UI" panose="020B0502040204020203" pitchFamily="34" charset="0"/>
-                <a:cs typeface="Segoe UI" panose="020B0502040204020203" pitchFamily="34" charset="0"/>
-              </a:rPr>
-              <a:t>La amenaza más grande para las organizaciones probablemente no sean los ataques de terceros, ni los empleados maliciosos, sino los empleados descuidados que de forma inintencionada divulgan información sensible</a:t>
-            </a:r>
-          </a:p>
-          <a:p>
-            <a:pPr marL="342900" indent="-342900">
-              <a:lnSpc>
-                <a:spcPct val="150000"/>
-              </a:lnSpc>
-            </a:pPr>
-            <a:r>
-              <a:rPr lang="es-AR" dirty="0" smtClean="0">
-                <a:latin typeface="Segoe UI" panose="020B0502040204020203" pitchFamily="34" charset="0"/>
-                <a:cs typeface="Segoe UI" panose="020B0502040204020203" pitchFamily="34" charset="0"/>
-              </a:rPr>
-              <a:t>Una combinación de protección tecnológica, políticas y procedimientos actualizados, y educación de los usuarios deberían contribuir a paliar los efectos que causan estas fugas</a:t>
-            </a:r>
-          </a:p>
-          <a:p>
-            <a:pPr>
-              <a:lnSpc>
-                <a:spcPct val="150000"/>
-              </a:lnSpc>
-            </a:pPr>
-            <a:endParaRPr lang="es-AR" dirty="0" smtClean="0">
-              <a:latin typeface="Segoe UI" panose="020B0502040204020203" pitchFamily="34" charset="0"/>
-              <a:cs typeface="Segoe UI" panose="020B0502040204020203" pitchFamily="34" charset="0"/>
-            </a:endParaRPr>
-          </a:p>
-          <a:p>
             <a:endParaRPr lang="es-AR" dirty="0">
               <a:latin typeface="Segoe UI" panose="020B0502040204020203" pitchFamily="34" charset="0"/>
               <a:cs typeface="Segoe UI" panose="020B0502040204020203" pitchFamily="34" charset="0"/>
@@ -13907,7 +14235,7 @@
     </p:spTree>
     <p:extLst>
       <p:ext uri="{BB962C8B-B14F-4D97-AF65-F5344CB8AC3E}">
-        <p14:creationId xmlns:p14="http://schemas.microsoft.com/office/powerpoint/2010/main" val="3280227416"/>
+        <p14:creationId xmlns:p14="http://schemas.microsoft.com/office/powerpoint/2010/main" val="1539601608"/>
       </p:ext>
     </p:extLst>
   </p:cSld>
@@ -13986,7 +14314,7 @@
                 <a:latin typeface="Segoe UI" panose="020B0502040204020203" pitchFamily="34" charset="0"/>
                 <a:cs typeface="Segoe UI" panose="020B0502040204020203" pitchFamily="34" charset="0"/>
               </a:rPr>
-              <a:t>Conclusiones (cont.)</a:t>
+              <a:t>Conclusiones</a:t>
             </a:r>
             <a:endParaRPr lang="es-AR" b="1" spc="0" dirty="0">
               <a:ln w="9525">
@@ -14021,7 +14349,7 @@
         <p:spPr/>
         <p:txBody>
           <a:bodyPr>
-            <a:normAutofit fontScale="77500" lnSpcReduction="20000"/>
+            <a:normAutofit lnSpcReduction="10000"/>
           </a:bodyPr>
           <a:lstStyle/>
           <a:p>
@@ -14031,91 +14359,11 @@
               </a:lnSpc>
             </a:pPr>
             <a:r>
-              <a:rPr lang="es-AR" dirty="0">
-                <a:latin typeface="Segoe UI" panose="020B0502040204020203" pitchFamily="34" charset="0"/>
-                <a:cs typeface="Segoe UI" panose="020B0502040204020203" pitchFamily="34" charset="0"/>
-              </a:rPr>
-              <a:t>Procedimiento básico para desarrollar una estrategia de protección: </a:t>
-            </a:r>
-          </a:p>
-          <a:p>
-            <a:pPr marL="800100" lvl="1" indent="-342900">
-              <a:lnSpc>
-                <a:spcPct val="150000"/>
-              </a:lnSpc>
-              <a:buFont typeface="Wingdings" panose="05000000000000000000" pitchFamily="2" charset="2"/>
-              <a:buChar char="ü"/>
-            </a:pPr>
-            <a:r>
-              <a:rPr lang="es-AR" sz="2400" dirty="0">
-                <a:latin typeface="Segoe UI" panose="020B0502040204020203" pitchFamily="34" charset="0"/>
-                <a:cs typeface="Segoe UI" panose="020B0502040204020203" pitchFamily="34" charset="0"/>
-              </a:rPr>
-              <a:t>Clasificar la información a proteger</a:t>
-            </a:r>
-          </a:p>
-          <a:p>
-            <a:pPr marL="800100" lvl="1" indent="-342900">
-              <a:lnSpc>
-                <a:spcPct val="150000"/>
-              </a:lnSpc>
-              <a:buFont typeface="Wingdings" panose="05000000000000000000" pitchFamily="2" charset="2"/>
-              <a:buChar char="ü"/>
-            </a:pPr>
-            <a:r>
-              <a:rPr lang="es-AR" sz="2400" dirty="0">
-                <a:latin typeface="Segoe UI" panose="020B0502040204020203" pitchFamily="34" charset="0"/>
-                <a:cs typeface="Segoe UI" panose="020B0502040204020203" pitchFamily="34" charset="0"/>
-              </a:rPr>
-              <a:t>Entender los datos que se manejan </a:t>
-            </a:r>
-          </a:p>
-          <a:p>
-            <a:pPr marL="800100" lvl="1" indent="-342900">
-              <a:lnSpc>
-                <a:spcPct val="150000"/>
-              </a:lnSpc>
-              <a:buFont typeface="Wingdings" panose="05000000000000000000" pitchFamily="2" charset="2"/>
-              <a:buChar char="ü"/>
-            </a:pPr>
-            <a:r>
-              <a:rPr lang="es-AR" sz="2400" dirty="0">
-                <a:latin typeface="Segoe UI" panose="020B0502040204020203" pitchFamily="34" charset="0"/>
-                <a:cs typeface="Segoe UI" panose="020B0502040204020203" pitchFamily="34" charset="0"/>
-              </a:rPr>
-              <a:t>Establecer políticas sobre el manejo de la información</a:t>
-            </a:r>
-          </a:p>
-          <a:p>
-            <a:pPr marL="800100" lvl="1" indent="-342900">
-              <a:lnSpc>
-                <a:spcPct val="150000"/>
-              </a:lnSpc>
-              <a:buFont typeface="Wingdings" panose="05000000000000000000" pitchFamily="2" charset="2"/>
-              <a:buChar char="ü"/>
-            </a:pPr>
-            <a:r>
-              <a:rPr lang="es-AR" sz="2400" dirty="0">
-                <a:latin typeface="Segoe UI" panose="020B0502040204020203" pitchFamily="34" charset="0"/>
-                <a:cs typeface="Segoe UI" panose="020B0502040204020203" pitchFamily="34" charset="0"/>
-              </a:rPr>
-              <a:t>Capacitar al personal en las herramientas </a:t>
-            </a:r>
-          </a:p>
-          <a:p>
-            <a:pPr marL="800100" lvl="1" indent="-342900">
-              <a:lnSpc>
-                <a:spcPct val="150000"/>
-              </a:lnSpc>
-              <a:buFont typeface="Wingdings" panose="05000000000000000000" pitchFamily="2" charset="2"/>
-              <a:buChar char="ü"/>
-            </a:pPr>
-            <a:r>
-              <a:rPr lang="es-AR" sz="2400" dirty="0">
-                <a:latin typeface="Segoe UI" panose="020B0502040204020203" pitchFamily="34" charset="0"/>
-                <a:cs typeface="Segoe UI" panose="020B0502040204020203" pitchFamily="34" charset="0"/>
-              </a:rPr>
-              <a:t>Implementar seguridad a nivel físico</a:t>
+              <a:rPr lang="es-AR" dirty="0" smtClean="0">
+                <a:latin typeface="Segoe UI" panose="020B0502040204020203" pitchFamily="34" charset="0"/>
+                <a:cs typeface="Segoe UI" panose="020B0502040204020203" pitchFamily="34" charset="0"/>
+              </a:rPr>
+              <a:t>La amenaza más grande para las organizaciones probablemente no sean los ataques de terceros, ni los empleados maliciosos, sino los empleados descuidados que de forma inintencionada divulgan información sensible</a:t>
             </a:r>
           </a:p>
           <a:p>
@@ -14125,19 +14373,25 @@
               </a:lnSpc>
             </a:pPr>
             <a:r>
-              <a:rPr lang="es-AR" dirty="0">
-                <a:latin typeface="Segoe UI" panose="020B0502040204020203" pitchFamily="34" charset="0"/>
-                <a:cs typeface="Segoe UI" panose="020B0502040204020203" pitchFamily="34" charset="0"/>
-              </a:rPr>
-              <a:t>No debe olvidarse de ejecutar revisiones periódicas, para mantener las políticas actualizadas y en conformidad con los requisitos y las tendencias </a:t>
-            </a:r>
-            <a:r>
               <a:rPr lang="es-AR" dirty="0" smtClean="0">
                 <a:latin typeface="Segoe UI" panose="020B0502040204020203" pitchFamily="34" charset="0"/>
                 <a:cs typeface="Segoe UI" panose="020B0502040204020203" pitchFamily="34" charset="0"/>
               </a:rPr>
-              <a:t>tecnológicas </a:t>
-            </a:r>
+              <a:t>Una combinación de protección tecnológica, políticas y procedimientos actualizados, y educación de los usuarios deberían contribuir a paliar los efectos que causan estas fugas</a:t>
+            </a:r>
+          </a:p>
+          <a:p>
+            <a:pPr>
+              <a:lnSpc>
+                <a:spcPct val="150000"/>
+              </a:lnSpc>
+            </a:pPr>
+            <a:endParaRPr lang="es-AR" dirty="0" smtClean="0">
+              <a:latin typeface="Segoe UI" panose="020B0502040204020203" pitchFamily="34" charset="0"/>
+              <a:cs typeface="Segoe UI" panose="020B0502040204020203" pitchFamily="34" charset="0"/>
+            </a:endParaRPr>
+          </a:p>
+          <a:p>
             <a:endParaRPr lang="es-AR" dirty="0">
               <a:latin typeface="Segoe UI" panose="020B0502040204020203" pitchFamily="34" charset="0"/>
               <a:cs typeface="Segoe UI" panose="020B0502040204020203" pitchFamily="34" charset="0"/>
@@ -14148,7 +14402,7 @@
     </p:spTree>
     <p:extLst>
       <p:ext uri="{BB962C8B-B14F-4D97-AF65-F5344CB8AC3E}">
-        <p14:creationId xmlns:p14="http://schemas.microsoft.com/office/powerpoint/2010/main" val="3816537714"/>
+        <p14:creationId xmlns:p14="http://schemas.microsoft.com/office/powerpoint/2010/main" val="3280227416"/>
       </p:ext>
     </p:extLst>
   </p:cSld>
@@ -14262,92 +14516,134 @@
         <p:spPr/>
         <p:txBody>
           <a:bodyPr>
-            <a:normAutofit/>
+            <a:normAutofit fontScale="77500" lnSpcReduction="20000"/>
           </a:bodyPr>
           <a:lstStyle/>
           <a:p>
-            <a:pPr marL="342900" indent="-342900"/>
+            <a:pPr marL="342900" indent="-342900">
+              <a:lnSpc>
+                <a:spcPct val="150000"/>
+              </a:lnSpc>
+            </a:pPr>
             <a:r>
               <a:rPr lang="es-AR" dirty="0">
                 <a:latin typeface="Segoe UI" panose="020B0502040204020203" pitchFamily="34" charset="0"/>
                 <a:cs typeface="Segoe UI" panose="020B0502040204020203" pitchFamily="34" charset="0"/>
               </a:rPr>
-              <a:t>A pesar de que los ataques maliciosos son una minoría, no deberían ser </a:t>
+              <a:t>Procedimiento básico para desarrollar una estrategia de protección: </a:t>
+            </a:r>
+          </a:p>
+          <a:p>
+            <a:pPr marL="800100" lvl="1" indent="-342900">
+              <a:lnSpc>
+                <a:spcPct val="150000"/>
+              </a:lnSpc>
+              <a:buFont typeface="Wingdings" panose="05000000000000000000" pitchFamily="2" charset="2"/>
+              <a:buChar char="ü"/>
+            </a:pPr>
+            <a:r>
+              <a:rPr lang="es-AR" sz="2400" dirty="0">
+                <a:latin typeface="Segoe UI" panose="020B0502040204020203" pitchFamily="34" charset="0"/>
+                <a:cs typeface="Segoe UI" panose="020B0502040204020203" pitchFamily="34" charset="0"/>
+              </a:rPr>
+              <a:t>Clasificar la información a proteger</a:t>
+            </a:r>
+          </a:p>
+          <a:p>
+            <a:pPr marL="800100" lvl="1" indent="-342900">
+              <a:lnSpc>
+                <a:spcPct val="150000"/>
+              </a:lnSpc>
+              <a:buFont typeface="Wingdings" panose="05000000000000000000" pitchFamily="2" charset="2"/>
+              <a:buChar char="ü"/>
+            </a:pPr>
+            <a:r>
+              <a:rPr lang="es-AR" sz="2400" dirty="0">
+                <a:latin typeface="Segoe UI" panose="020B0502040204020203" pitchFamily="34" charset="0"/>
+                <a:cs typeface="Segoe UI" panose="020B0502040204020203" pitchFamily="34" charset="0"/>
+              </a:rPr>
+              <a:t>Entender los datos que se manejan </a:t>
+            </a:r>
+          </a:p>
+          <a:p>
+            <a:pPr marL="800100" lvl="1" indent="-342900">
+              <a:lnSpc>
+                <a:spcPct val="150000"/>
+              </a:lnSpc>
+              <a:buFont typeface="Wingdings" panose="05000000000000000000" pitchFamily="2" charset="2"/>
+              <a:buChar char="ü"/>
+            </a:pPr>
+            <a:r>
+              <a:rPr lang="es-AR" sz="2400" dirty="0">
+                <a:latin typeface="Segoe UI" panose="020B0502040204020203" pitchFamily="34" charset="0"/>
+                <a:cs typeface="Segoe UI" panose="020B0502040204020203" pitchFamily="34" charset="0"/>
+              </a:rPr>
+              <a:t>Establecer políticas sobre el manejo de la información</a:t>
+            </a:r>
+          </a:p>
+          <a:p>
+            <a:pPr marL="800100" lvl="1" indent="-342900">
+              <a:lnSpc>
+                <a:spcPct val="150000"/>
+              </a:lnSpc>
+              <a:buFont typeface="Wingdings" panose="05000000000000000000" pitchFamily="2" charset="2"/>
+              <a:buChar char="ü"/>
+            </a:pPr>
+            <a:r>
+              <a:rPr lang="es-AR" sz="2400" dirty="0">
+                <a:latin typeface="Segoe UI" panose="020B0502040204020203" pitchFamily="34" charset="0"/>
+                <a:cs typeface="Segoe UI" panose="020B0502040204020203" pitchFamily="34" charset="0"/>
+              </a:rPr>
+              <a:t>Capacitar al personal en las herramientas </a:t>
+            </a:r>
+          </a:p>
+          <a:p>
+            <a:pPr marL="800100" lvl="1" indent="-342900">
+              <a:lnSpc>
+                <a:spcPct val="150000"/>
+              </a:lnSpc>
+              <a:buFont typeface="Wingdings" panose="05000000000000000000" pitchFamily="2" charset="2"/>
+              <a:buChar char="ü"/>
+            </a:pPr>
+            <a:r>
+              <a:rPr lang="es-AR" sz="2400" dirty="0">
+                <a:latin typeface="Segoe UI" panose="020B0502040204020203" pitchFamily="34" charset="0"/>
+                <a:cs typeface="Segoe UI" panose="020B0502040204020203" pitchFamily="34" charset="0"/>
+              </a:rPr>
+              <a:t>Implementar seguridad a nivel físico</a:t>
+            </a:r>
+          </a:p>
+          <a:p>
+            <a:pPr marL="342900" indent="-342900">
+              <a:lnSpc>
+                <a:spcPct val="150000"/>
+              </a:lnSpc>
+            </a:pPr>
+            <a:r>
+              <a:rPr lang="es-AR" dirty="0">
+                <a:latin typeface="Segoe UI" panose="020B0502040204020203" pitchFamily="34" charset="0"/>
+                <a:cs typeface="Segoe UI" panose="020B0502040204020203" pitchFamily="34" charset="0"/>
+              </a:rPr>
+              <a:t>No debe olvidarse de ejecutar revisiones periódicas, para mantener las políticas actualizadas y en conformidad con los requisitos y las tendencias </a:t>
             </a:r>
             <a:r>
               <a:rPr lang="es-AR" dirty="0" smtClean="0">
                 <a:latin typeface="Segoe UI" panose="020B0502040204020203" pitchFamily="34" charset="0"/>
                 <a:cs typeface="Segoe UI" panose="020B0502040204020203" pitchFamily="34" charset="0"/>
               </a:rPr>
-              <a:t>ignorados</a:t>
+              <a:t>tecnológicas </a:t>
             </a:r>
             <a:endParaRPr lang="es-AR" dirty="0">
               <a:latin typeface="Segoe UI" panose="020B0502040204020203" pitchFamily="34" charset="0"/>
               <a:cs typeface="Segoe UI" panose="020B0502040204020203" pitchFamily="34" charset="0"/>
             </a:endParaRPr>
           </a:p>
-          <a:p>
-            <a:pPr marL="342900" indent="-342900"/>
-            <a:r>
-              <a:rPr lang="es-AR" dirty="0" smtClean="0">
-                <a:latin typeface="Segoe UI" panose="020B0502040204020203" pitchFamily="34" charset="0"/>
-                <a:cs typeface="Segoe UI" panose="020B0502040204020203" pitchFamily="34" charset="0"/>
-              </a:rPr>
-              <a:t>Existen </a:t>
-            </a:r>
-            <a:r>
-              <a:rPr lang="es-AR" dirty="0">
-                <a:latin typeface="Segoe UI" panose="020B0502040204020203" pitchFamily="34" charset="0"/>
-                <a:cs typeface="Segoe UI" panose="020B0502040204020203" pitchFamily="34" charset="0"/>
-              </a:rPr>
-              <a:t>múltiples vías de escape de información que deben ser </a:t>
-            </a:r>
-            <a:r>
-              <a:rPr lang="es-AR" dirty="0" smtClean="0">
-                <a:latin typeface="Segoe UI" panose="020B0502040204020203" pitchFamily="34" charset="0"/>
-                <a:cs typeface="Segoe UI" panose="020B0502040204020203" pitchFamily="34" charset="0"/>
-              </a:rPr>
-              <a:t>monitoreadas</a:t>
-            </a:r>
-            <a:endParaRPr lang="es-AR" dirty="0">
-              <a:latin typeface="Segoe UI" panose="020B0502040204020203" pitchFamily="34" charset="0"/>
-              <a:cs typeface="Segoe UI" panose="020B0502040204020203" pitchFamily="34" charset="0"/>
-            </a:endParaRPr>
-          </a:p>
-          <a:p>
-            <a:pPr marL="342900" indent="-342900"/>
-            <a:r>
-              <a:rPr lang="es-AR" dirty="0" smtClean="0">
-                <a:latin typeface="Segoe UI" panose="020B0502040204020203" pitchFamily="34" charset="0"/>
-                <a:cs typeface="Segoe UI" panose="020B0502040204020203" pitchFamily="34" charset="0"/>
-              </a:rPr>
-              <a:t>No </a:t>
-            </a:r>
-            <a:r>
-              <a:rPr lang="es-AR" dirty="0">
-                <a:latin typeface="Segoe UI" panose="020B0502040204020203" pitchFamily="34" charset="0"/>
-                <a:cs typeface="Segoe UI" panose="020B0502040204020203" pitchFamily="34" charset="0"/>
-              </a:rPr>
-              <a:t>existen soluciones que protejan los activos intangibles de forma 100% segura, se puede minimizar la probabilidad de que ocurran pérdidas mediante la aplicación de varios métodos </a:t>
-            </a:r>
-            <a:r>
-              <a:rPr lang="es-AR" dirty="0" smtClean="0">
-                <a:latin typeface="Segoe UI" panose="020B0502040204020203" pitchFamily="34" charset="0"/>
-                <a:cs typeface="Segoe UI" panose="020B0502040204020203" pitchFamily="34" charset="0"/>
-              </a:rPr>
-              <a:t>complementarios</a:t>
-            </a:r>
-            <a:endParaRPr lang="es-AR" dirty="0">
-              <a:latin typeface="Segoe UI" panose="020B0502040204020203" pitchFamily="34" charset="0"/>
-              <a:cs typeface="Segoe UI" panose="020B0502040204020203" pitchFamily="34" charset="0"/>
-            </a:endParaRPr>
-          </a:p>
         </p:txBody>
       </p:sp>
     </p:spTree>
     <p:extLst>
       <p:ext uri="{BB962C8B-B14F-4D97-AF65-F5344CB8AC3E}">
-        <p14:creationId xmlns:p14="http://schemas.microsoft.com/office/powerpoint/2010/main" val="2896967631"/>
+        <p14:creationId xmlns:p14="http://schemas.microsoft.com/office/powerpoint/2010/main" val="3816537714"/>
       </p:ext>
     </p:extLst>
   </p:cSld>
@@ -14667,6 +14963,205 @@
 </file>
 
 <file path=ppt/slides/slide40.xml><?xml version="1.0" encoding="utf-8"?>
+<p:sld xmlns:a="http://schemas.openxmlformats.org/drawingml/2006/main" xmlns:r="http://schemas.openxmlformats.org/officeDocument/2006/relationships" xmlns:p="http://schemas.openxmlformats.org/presentationml/2006/main">
+  <p:cSld>
+    <p:spTree>
+      <p:nvGrpSpPr>
+        <p:cNvPr id="1" name=""/>
+        <p:cNvGrpSpPr/>
+        <p:nvPr/>
+      </p:nvGrpSpPr>
+      <p:grpSpPr>
+        <a:xfrm>
+          <a:off x="0" y="0"/>
+          <a:ext cx="0" cy="0"/>
+          <a:chOff x="0" y="0"/>
+          <a:chExt cx="0" cy="0"/>
+        </a:xfrm>
+      </p:grpSpPr>
+      <p:sp>
+        <p:nvSpPr>
+          <p:cNvPr id="2" name="Title 1"/>
+          <p:cNvSpPr>
+            <a:spLocks noGrp="1"/>
+          </p:cNvSpPr>
+          <p:nvPr>
+            <p:ph type="title"/>
+          </p:nvPr>
+        </p:nvSpPr>
+        <p:spPr/>
+        <p:txBody>
+          <a:bodyPr/>
+          <a:lstStyle/>
+          <a:p>
+            <a:r>
+              <a:rPr lang="es-AR" b="1" spc="0" dirty="0" smtClean="0">
+                <a:ln w="9525">
+                  <a:solidFill>
+                    <a:schemeClr val="bg1"/>
+                  </a:solidFill>
+                  <a:prstDash val="solid"/>
+                </a:ln>
+                <a:effectLst>
+                  <a:outerShdw blurRad="12700" dist="38100" dir="2700000" algn="tl" rotWithShape="0">
+                    <a:schemeClr val="bg1">
+                      <a:lumMod val="50000"/>
+                    </a:schemeClr>
+                  </a:outerShdw>
+                </a:effectLst>
+                <a:latin typeface="Segoe UI" panose="020B0502040204020203" pitchFamily="34" charset="0"/>
+                <a:cs typeface="Segoe UI" panose="020B0502040204020203" pitchFamily="34" charset="0"/>
+              </a:rPr>
+              <a:t>Conclusiones (cont.)</a:t>
+            </a:r>
+            <a:endParaRPr lang="es-AR" b="1" spc="0" dirty="0">
+              <a:ln w="9525">
+                <a:solidFill>
+                  <a:schemeClr val="bg1"/>
+                </a:solidFill>
+                <a:prstDash val="solid"/>
+              </a:ln>
+              <a:effectLst>
+                <a:outerShdw blurRad="12700" dist="38100" dir="2700000" algn="tl" rotWithShape="0">
+                  <a:schemeClr val="bg1">
+                    <a:lumMod val="50000"/>
+                  </a:schemeClr>
+                </a:outerShdw>
+              </a:effectLst>
+              <a:latin typeface="Segoe UI" panose="020B0502040204020203" pitchFamily="34" charset="0"/>
+              <a:cs typeface="Segoe UI" panose="020B0502040204020203" pitchFamily="34" charset="0"/>
+            </a:endParaRPr>
+          </a:p>
+        </p:txBody>
+      </p:sp>
+      <p:sp>
+        <p:nvSpPr>
+          <p:cNvPr id="3" name="Content Placeholder 2"/>
+          <p:cNvSpPr>
+            <a:spLocks noGrp="1"/>
+          </p:cNvSpPr>
+          <p:nvPr>
+            <p:ph idx="1"/>
+          </p:nvPr>
+        </p:nvSpPr>
+        <p:spPr/>
+        <p:txBody>
+          <a:bodyPr>
+            <a:normAutofit/>
+          </a:bodyPr>
+          <a:lstStyle/>
+          <a:p>
+            <a:pPr marL="342900" indent="-342900"/>
+            <a:r>
+              <a:rPr lang="es-AR" dirty="0">
+                <a:latin typeface="Segoe UI" panose="020B0502040204020203" pitchFamily="34" charset="0"/>
+                <a:cs typeface="Segoe UI" panose="020B0502040204020203" pitchFamily="34" charset="0"/>
+              </a:rPr>
+              <a:t>A pesar de que los ataques maliciosos son una minoría, no deberían ser </a:t>
+            </a:r>
+            <a:r>
+              <a:rPr lang="es-AR" dirty="0" smtClean="0">
+                <a:latin typeface="Segoe UI" panose="020B0502040204020203" pitchFamily="34" charset="0"/>
+                <a:cs typeface="Segoe UI" panose="020B0502040204020203" pitchFamily="34" charset="0"/>
+              </a:rPr>
+              <a:t>ignorados</a:t>
+            </a:r>
+            <a:endParaRPr lang="es-AR" dirty="0">
+              <a:latin typeface="Segoe UI" panose="020B0502040204020203" pitchFamily="34" charset="0"/>
+              <a:cs typeface="Segoe UI" panose="020B0502040204020203" pitchFamily="34" charset="0"/>
+            </a:endParaRPr>
+          </a:p>
+          <a:p>
+            <a:pPr marL="342900" indent="-342900"/>
+            <a:r>
+              <a:rPr lang="es-AR" dirty="0" smtClean="0">
+                <a:latin typeface="Segoe UI" panose="020B0502040204020203" pitchFamily="34" charset="0"/>
+                <a:cs typeface="Segoe UI" panose="020B0502040204020203" pitchFamily="34" charset="0"/>
+              </a:rPr>
+              <a:t>Existen </a:t>
+            </a:r>
+            <a:r>
+              <a:rPr lang="es-AR" dirty="0">
+                <a:latin typeface="Segoe UI" panose="020B0502040204020203" pitchFamily="34" charset="0"/>
+                <a:cs typeface="Segoe UI" panose="020B0502040204020203" pitchFamily="34" charset="0"/>
+              </a:rPr>
+              <a:t>múltiples vías de escape de información que deben ser </a:t>
+            </a:r>
+            <a:r>
+              <a:rPr lang="es-AR" dirty="0" smtClean="0">
+                <a:latin typeface="Segoe UI" panose="020B0502040204020203" pitchFamily="34" charset="0"/>
+                <a:cs typeface="Segoe UI" panose="020B0502040204020203" pitchFamily="34" charset="0"/>
+              </a:rPr>
+              <a:t>monitoreadas</a:t>
+            </a:r>
+            <a:endParaRPr lang="es-AR" dirty="0">
+              <a:latin typeface="Segoe UI" panose="020B0502040204020203" pitchFamily="34" charset="0"/>
+              <a:cs typeface="Segoe UI" panose="020B0502040204020203" pitchFamily="34" charset="0"/>
+            </a:endParaRPr>
+          </a:p>
+          <a:p>
+            <a:pPr marL="342900" indent="-342900"/>
+            <a:r>
+              <a:rPr lang="es-AR" dirty="0" smtClean="0">
+                <a:latin typeface="Segoe UI" panose="020B0502040204020203" pitchFamily="34" charset="0"/>
+                <a:cs typeface="Segoe UI" panose="020B0502040204020203" pitchFamily="34" charset="0"/>
+              </a:rPr>
+              <a:t>No </a:t>
+            </a:r>
+            <a:r>
+              <a:rPr lang="es-AR" dirty="0">
+                <a:latin typeface="Segoe UI" panose="020B0502040204020203" pitchFamily="34" charset="0"/>
+                <a:cs typeface="Segoe UI" panose="020B0502040204020203" pitchFamily="34" charset="0"/>
+              </a:rPr>
+              <a:t>existen soluciones que protejan los activos intangibles de forma 100% segura, se puede minimizar la probabilidad de que ocurran pérdidas mediante la aplicación de varios métodos </a:t>
+            </a:r>
+            <a:r>
+              <a:rPr lang="es-AR" dirty="0" smtClean="0">
+                <a:latin typeface="Segoe UI" panose="020B0502040204020203" pitchFamily="34" charset="0"/>
+                <a:cs typeface="Segoe UI" panose="020B0502040204020203" pitchFamily="34" charset="0"/>
+              </a:rPr>
+              <a:t>complementarios</a:t>
+            </a:r>
+            <a:endParaRPr lang="es-AR" dirty="0">
+              <a:latin typeface="Segoe UI" panose="020B0502040204020203" pitchFamily="34" charset="0"/>
+              <a:cs typeface="Segoe UI" panose="020B0502040204020203" pitchFamily="34" charset="0"/>
+            </a:endParaRPr>
+          </a:p>
+        </p:txBody>
+      </p:sp>
+    </p:spTree>
+    <p:extLst>
+      <p:ext uri="{BB962C8B-B14F-4D97-AF65-F5344CB8AC3E}">
+        <p14:creationId xmlns:p14="http://schemas.microsoft.com/office/powerpoint/2010/main" val="2896967631"/>
+      </p:ext>
+    </p:extLst>
+  </p:cSld>
+  <p:clrMapOvr>
+    <a:masterClrMapping/>
+  </p:clrMapOvr>
+  <mc:AlternateContent xmlns:mc="http://schemas.openxmlformats.org/markup-compatibility/2006" xmlns:p14="http://schemas.microsoft.com/office/powerpoint/2010/main">
+    <mc:Choice Requires="p14">
+      <p:transition spd="med" p14:dur="700">
+        <p:fade/>
+      </p:transition>
+    </mc:Choice>
+    <mc:Fallback xmlns="">
+      <p:transition spd="med">
+        <p:fade/>
+      </p:transition>
+    </mc:Fallback>
+  </mc:AlternateContent>
+  <p:timing>
+    <p:tnLst>
+      <p:par>
+        <p:cTn id="1" dur="indefinite" restart="never" nodeType="tmRoot"/>
+      </p:par>
+    </p:tnLst>
+  </p:timing>
+</p:sld>
+</file>
+
+<file path=ppt/slides/slide41.xml><?xml version="1.0" encoding="utf-8"?>
 <p:sld xmlns:a="http://schemas.openxmlformats.org/drawingml/2006/main" xmlns:r="http://schemas.openxmlformats.org/officeDocument/2006/relationships" xmlns:p="http://schemas.openxmlformats.org/presentationml/2006/main">
   <p:cSld>
     <p:spTree>

</xml_diff>

<commit_message>
presentacion: agregado diapositiva de 'gracias'. corregido cosas de formato.
</commit_message>
<xml_diff>
--- a/Presentacion/Fuga de Información.pptx
+++ b/Presentacion/Fuga de Información.pptx
@@ -5,10 +5,10 @@
     <p:sldMasterId id="2147483648" r:id="rId2"/>
   </p:sldMasterIdLst>
   <p:notesMasterIdLst>
-    <p:notesMasterId r:id="rId43"/>
+    <p:notesMasterId r:id="rId44"/>
   </p:notesMasterIdLst>
   <p:handoutMasterIdLst>
-    <p:handoutMasterId r:id="rId44"/>
+    <p:handoutMasterId r:id="rId45"/>
   </p:handoutMasterIdLst>
   <p:sldIdLst>
     <p:sldId id="265" r:id="rId3"/>
@@ -50,12 +50,13 @@
     <p:sldId id="351" r:id="rId39"/>
     <p:sldId id="352" r:id="rId40"/>
     <p:sldId id="353" r:id="rId41"/>
-    <p:sldId id="319" r:id="rId42"/>
+    <p:sldId id="369" r:id="rId42"/>
+    <p:sldId id="319" r:id="rId43"/>
   </p:sldIdLst>
   <p:sldSz cx="12188825" cy="6858000"/>
   <p:notesSz cx="6858000" cy="9144000"/>
   <p:custDataLst>
-    <p:tags r:id="rId45"/>
+    <p:tags r:id="rId46"/>
   </p:custDataLst>
   <p:defaultTextStyle>
     <a:defPPr>
@@ -154,7 +155,7 @@
   </p:defaultTextStyle>
   <p:extLst>
     <p:ext uri="{EFAFB233-063F-42B5-8137-9DF3F51BA10A}">
-      <p15:sldGuideLst xmlns:p15="http://schemas.microsoft.com/office/powerpoint/2012/main" xmlns="">
+      <p15:sldGuideLst xmlns="" xmlns:p15="http://schemas.microsoft.com/office/powerpoint/2012/main">
         <p15:guide id="1" pos="3839" userDrawn="1">
           <p15:clr>
             <a:srgbClr val="A4A3A4"/>
@@ -168,7 +169,7 @@
       </p15:sldGuideLst>
     </p:ext>
     <p:ext uri="{2D200454-40CA-4A62-9FC3-DE9A4176ACB9}">
-      <p15:notesGuideLst xmlns:p15="http://schemas.microsoft.com/office/powerpoint/2012/main" xmlns=""/>
+      <p15:notesGuideLst xmlns="" xmlns:p15="http://schemas.microsoft.com/office/powerpoint/2012/main"/>
     </p:ext>
   </p:extLst>
 </p:presentation>
@@ -333,7 +334,7 @@
     </p:spTree>
     <p:extLst>
       <p:ext uri="{BB962C8B-B14F-4D97-AF65-F5344CB8AC3E}">
-        <p14:creationId xmlns:p14="http://schemas.microsoft.com/office/powerpoint/2010/main" xmlns="" val="3932065745"/>
+        <p14:creationId xmlns="" xmlns:p14="http://schemas.microsoft.com/office/powerpoint/2010/main" val="3932065745"/>
       </p:ext>
     </p:extLst>
   </p:cSld>
@@ -592,7 +593,7 @@
     </p:spTree>
     <p:extLst>
       <p:ext uri="{BB962C8B-B14F-4D97-AF65-F5344CB8AC3E}">
-        <p14:creationId xmlns:p14="http://schemas.microsoft.com/office/powerpoint/2010/main" xmlns="" val="4276579820"/>
+        <p14:creationId xmlns="" xmlns:p14="http://schemas.microsoft.com/office/powerpoint/2010/main" val="4276579820"/>
       </p:ext>
     </p:extLst>
   </p:cSld>
@@ -1087,7 +1088,7 @@
     </p:spTree>
     <p:extLst>
       <p:ext uri="{BB962C8B-B14F-4D97-AF65-F5344CB8AC3E}">
-        <p14:creationId xmlns:p14="http://schemas.microsoft.com/office/powerpoint/2010/main" xmlns="" val="246766428"/>
+        <p14:creationId xmlns="" xmlns:p14="http://schemas.microsoft.com/office/powerpoint/2010/main" val="246766428"/>
       </p:ext>
     </p:extLst>
   </p:cSld>
@@ -1172,7 +1173,7 @@
     </p:spTree>
     <p:extLst>
       <p:ext uri="{BB962C8B-B14F-4D97-AF65-F5344CB8AC3E}">
-        <p14:creationId xmlns:p14="http://schemas.microsoft.com/office/powerpoint/2010/main" xmlns="" val="127681626"/>
+        <p14:creationId xmlns="" xmlns:p14="http://schemas.microsoft.com/office/powerpoint/2010/main" val="127681626"/>
       </p:ext>
     </p:extLst>
   </p:cSld>
@@ -1257,7 +1258,7 @@
     </p:spTree>
     <p:extLst>
       <p:ext uri="{BB962C8B-B14F-4D97-AF65-F5344CB8AC3E}">
-        <p14:creationId xmlns:p14="http://schemas.microsoft.com/office/powerpoint/2010/main" xmlns="" val="127681626"/>
+        <p14:creationId xmlns="" xmlns:p14="http://schemas.microsoft.com/office/powerpoint/2010/main" val="127681626"/>
       </p:ext>
     </p:extLst>
   </p:cSld>
@@ -1342,7 +1343,7 @@
     </p:spTree>
     <p:extLst>
       <p:ext uri="{BB962C8B-B14F-4D97-AF65-F5344CB8AC3E}">
-        <p14:creationId xmlns:p14="http://schemas.microsoft.com/office/powerpoint/2010/main" xmlns="" val="127681626"/>
+        <p14:creationId xmlns="" xmlns:p14="http://schemas.microsoft.com/office/powerpoint/2010/main" val="127681626"/>
       </p:ext>
     </p:extLst>
   </p:cSld>
@@ -1427,7 +1428,7 @@
     </p:spTree>
     <p:extLst>
       <p:ext uri="{BB962C8B-B14F-4D97-AF65-F5344CB8AC3E}">
-        <p14:creationId xmlns:p14="http://schemas.microsoft.com/office/powerpoint/2010/main" xmlns="" val="127681626"/>
+        <p14:creationId xmlns="" xmlns:p14="http://schemas.microsoft.com/office/powerpoint/2010/main" val="127681626"/>
       </p:ext>
     </p:extLst>
   </p:cSld>
@@ -1512,7 +1513,7 @@
     </p:spTree>
     <p:extLst>
       <p:ext uri="{BB962C8B-B14F-4D97-AF65-F5344CB8AC3E}">
-        <p14:creationId xmlns:p14="http://schemas.microsoft.com/office/powerpoint/2010/main" xmlns="" val="2586394931"/>
+        <p14:creationId xmlns="" xmlns:p14="http://schemas.microsoft.com/office/powerpoint/2010/main" val="2586394931"/>
       </p:ext>
     </p:extLst>
   </p:cSld>
@@ -1597,7 +1598,7 @@
     </p:spTree>
     <p:extLst>
       <p:ext uri="{BB962C8B-B14F-4D97-AF65-F5344CB8AC3E}">
-        <p14:creationId xmlns:p14="http://schemas.microsoft.com/office/powerpoint/2010/main" xmlns="" val="1362585539"/>
+        <p14:creationId xmlns="" xmlns:p14="http://schemas.microsoft.com/office/powerpoint/2010/main" val="1362585539"/>
       </p:ext>
     </p:extLst>
   </p:cSld>
@@ -1983,7 +1984,7 @@
     </p:spTree>
     <p:extLst>
       <p:ext uri="{BB962C8B-B14F-4D97-AF65-F5344CB8AC3E}">
-        <p14:creationId xmlns:p14="http://schemas.microsoft.com/office/powerpoint/2010/main" xmlns="" val="3805029774"/>
+        <p14:creationId xmlns="" xmlns:p14="http://schemas.microsoft.com/office/powerpoint/2010/main" val="3805029774"/>
       </p:ext>
     </p:extLst>
   </p:cSld>
@@ -2068,7 +2069,7 @@
     </p:spTree>
     <p:extLst>
       <p:ext uri="{BB962C8B-B14F-4D97-AF65-F5344CB8AC3E}">
-        <p14:creationId xmlns:p14="http://schemas.microsoft.com/office/powerpoint/2010/main" xmlns="" val="655676726"/>
+        <p14:creationId xmlns="" xmlns:p14="http://schemas.microsoft.com/office/powerpoint/2010/main" val="655676726"/>
       </p:ext>
     </p:extLst>
   </p:cSld>
@@ -2605,7 +2606,7 @@
     </p:spTree>
     <p:extLst>
       <p:ext uri="{BB962C8B-B14F-4D97-AF65-F5344CB8AC3E}">
-        <p14:creationId xmlns:p14="http://schemas.microsoft.com/office/powerpoint/2010/main" xmlns="" val="2488318766"/>
+        <p14:creationId xmlns="" xmlns:p14="http://schemas.microsoft.com/office/powerpoint/2010/main" val="2488318766"/>
       </p:ext>
     </p:extLst>
   </p:cSld>
@@ -3151,7 +3152,7 @@
     </p:spTree>
     <p:extLst>
       <p:ext uri="{BB962C8B-B14F-4D97-AF65-F5344CB8AC3E}">
-        <p14:creationId xmlns:p14="http://schemas.microsoft.com/office/powerpoint/2010/main" xmlns="" val="707643668"/>
+        <p14:creationId xmlns="" xmlns:p14="http://schemas.microsoft.com/office/powerpoint/2010/main" val="707643668"/>
       </p:ext>
     </p:extLst>
   </p:cSld>
@@ -3236,7 +3237,7 @@
     </p:spTree>
     <p:extLst>
       <p:ext uri="{BB962C8B-B14F-4D97-AF65-F5344CB8AC3E}">
-        <p14:creationId xmlns:p14="http://schemas.microsoft.com/office/powerpoint/2010/main" xmlns="" val="1014212789"/>
+        <p14:creationId xmlns="" xmlns:p14="http://schemas.microsoft.com/office/powerpoint/2010/main" val="1014212789"/>
       </p:ext>
     </p:extLst>
   </p:cSld>
@@ -3321,7 +3322,7 @@
     </p:spTree>
     <p:extLst>
       <p:ext uri="{BB962C8B-B14F-4D97-AF65-F5344CB8AC3E}">
-        <p14:creationId xmlns:p14="http://schemas.microsoft.com/office/powerpoint/2010/main" xmlns="" val="1014212789"/>
+        <p14:creationId xmlns="" xmlns:p14="http://schemas.microsoft.com/office/powerpoint/2010/main" val="1014212789"/>
       </p:ext>
     </p:extLst>
   </p:cSld>
@@ -3528,7 +3529,7 @@
     </p:spTree>
     <p:extLst>
       <p:ext uri="{BB962C8B-B14F-4D97-AF65-F5344CB8AC3E}">
-        <p14:creationId xmlns:p14="http://schemas.microsoft.com/office/powerpoint/2010/main" xmlns="" val="94999051"/>
+        <p14:creationId xmlns="" xmlns:p14="http://schemas.microsoft.com/office/powerpoint/2010/main" val="94999051"/>
       </p:ext>
     </p:extLst>
   </p:cSld>
@@ -3536,7 +3537,7 @@
     <a:masterClrMapping/>
   </p:clrMapOvr>
   <mc:AlternateContent xmlns:mc="http://schemas.openxmlformats.org/markup-compatibility/2006">
-    <mc:Choice xmlns:p14="http://schemas.microsoft.com/office/powerpoint/2010/main" xmlns="" Requires="p14">
+    <mc:Choice xmlns="" xmlns:p14="http://schemas.microsoft.com/office/powerpoint/2010/main" Requires="p14">
       <p:transition spd="med" p14:dur="700">
         <p:fade/>
       </p:transition>
@@ -3719,7 +3720,7 @@
     </p:spTree>
     <p:extLst>
       <p:ext uri="{BB962C8B-B14F-4D97-AF65-F5344CB8AC3E}">
-        <p14:creationId xmlns:p14="http://schemas.microsoft.com/office/powerpoint/2010/main" xmlns="" val="460095310"/>
+        <p14:creationId xmlns="" xmlns:p14="http://schemas.microsoft.com/office/powerpoint/2010/main" val="460095310"/>
       </p:ext>
     </p:extLst>
   </p:cSld>
@@ -3727,7 +3728,7 @@
     <a:masterClrMapping/>
   </p:clrMapOvr>
   <mc:AlternateContent xmlns:mc="http://schemas.openxmlformats.org/markup-compatibility/2006">
-    <mc:Choice xmlns:p14="http://schemas.microsoft.com/office/powerpoint/2010/main" xmlns="" Requires="p14">
+    <mc:Choice xmlns="" xmlns:p14="http://schemas.microsoft.com/office/powerpoint/2010/main" Requires="p14">
       <p:transition spd="med" p14:dur="700">
         <p:fade/>
       </p:transition>
@@ -3920,7 +3921,7 @@
     </p:spTree>
     <p:extLst>
       <p:ext uri="{BB962C8B-B14F-4D97-AF65-F5344CB8AC3E}">
-        <p14:creationId xmlns:p14="http://schemas.microsoft.com/office/powerpoint/2010/main" xmlns="" val="4079035419"/>
+        <p14:creationId xmlns="" xmlns:p14="http://schemas.microsoft.com/office/powerpoint/2010/main" val="4079035419"/>
       </p:ext>
     </p:extLst>
   </p:cSld>
@@ -3928,7 +3929,7 @@
     <a:masterClrMapping/>
   </p:clrMapOvr>
   <mc:AlternateContent xmlns:mc="http://schemas.openxmlformats.org/markup-compatibility/2006">
-    <mc:Choice xmlns:p14="http://schemas.microsoft.com/office/powerpoint/2010/main" xmlns="" Requires="p14">
+    <mc:Choice xmlns="" xmlns:p14="http://schemas.microsoft.com/office/powerpoint/2010/main" Requires="p14">
       <p:transition spd="med" p14:dur="700">
         <p:fade/>
       </p:transition>
@@ -4118,7 +4119,7 @@
     </p:spTree>
     <p:extLst>
       <p:ext uri="{BB962C8B-B14F-4D97-AF65-F5344CB8AC3E}">
-        <p14:creationId xmlns:p14="http://schemas.microsoft.com/office/powerpoint/2010/main" xmlns="" val="2738254095"/>
+        <p14:creationId xmlns="" xmlns:p14="http://schemas.microsoft.com/office/powerpoint/2010/main" val="2738254095"/>
       </p:ext>
     </p:extLst>
   </p:cSld>
@@ -4126,7 +4127,7 @@
     <a:masterClrMapping/>
   </p:clrMapOvr>
   <mc:AlternateContent xmlns:mc="http://schemas.openxmlformats.org/markup-compatibility/2006">
-    <mc:Choice xmlns:p14="http://schemas.microsoft.com/office/powerpoint/2010/main" xmlns="" Requires="p14">
+    <mc:Choice xmlns="" xmlns:p14="http://schemas.microsoft.com/office/powerpoint/2010/main" Requires="p14">
       <p:transition spd="med" p14:dur="700">
         <p:fade/>
       </p:transition>
@@ -4407,7 +4408,7 @@
     </p:spTree>
     <p:extLst>
       <p:ext uri="{BB962C8B-B14F-4D97-AF65-F5344CB8AC3E}">
-        <p14:creationId xmlns:p14="http://schemas.microsoft.com/office/powerpoint/2010/main" xmlns="" val="1761813311"/>
+        <p14:creationId xmlns="" xmlns:p14="http://schemas.microsoft.com/office/powerpoint/2010/main" val="1761813311"/>
       </p:ext>
     </p:extLst>
   </p:cSld>
@@ -4415,7 +4416,7 @@
     <a:masterClrMapping/>
   </p:clrMapOvr>
   <mc:AlternateContent xmlns:mc="http://schemas.openxmlformats.org/markup-compatibility/2006">
-    <mc:Choice xmlns:p14="http://schemas.microsoft.com/office/powerpoint/2010/main" xmlns="" Requires="p14">
+    <mc:Choice xmlns="" xmlns:p14="http://schemas.microsoft.com/office/powerpoint/2010/main" Requires="p14">
       <p:transition spd="med" p14:dur="700">
         <p:fade/>
       </p:transition>
@@ -4720,7 +4721,7 @@
     </p:spTree>
     <p:extLst>
       <p:ext uri="{BB962C8B-B14F-4D97-AF65-F5344CB8AC3E}">
-        <p14:creationId xmlns:p14="http://schemas.microsoft.com/office/powerpoint/2010/main" xmlns="" val="2825340762"/>
+        <p14:creationId xmlns="" xmlns:p14="http://schemas.microsoft.com/office/powerpoint/2010/main" val="2825340762"/>
       </p:ext>
     </p:extLst>
   </p:cSld>
@@ -4728,7 +4729,7 @@
     <a:masterClrMapping/>
   </p:clrMapOvr>
   <mc:AlternateContent xmlns:mc="http://schemas.openxmlformats.org/markup-compatibility/2006">
-    <mc:Choice xmlns:p14="http://schemas.microsoft.com/office/powerpoint/2010/main" xmlns="" Requires="p14">
+    <mc:Choice xmlns="" xmlns:p14="http://schemas.microsoft.com/office/powerpoint/2010/main" Requires="p14">
       <p:transition spd="med" p14:dur="700">
         <p:fade/>
       </p:transition>
@@ -5185,7 +5186,7 @@
     </p:spTree>
     <p:extLst>
       <p:ext uri="{BB962C8B-B14F-4D97-AF65-F5344CB8AC3E}">
-        <p14:creationId xmlns:p14="http://schemas.microsoft.com/office/powerpoint/2010/main" xmlns="" val="4208419506"/>
+        <p14:creationId xmlns="" xmlns:p14="http://schemas.microsoft.com/office/powerpoint/2010/main" val="4208419506"/>
       </p:ext>
     </p:extLst>
   </p:cSld>
@@ -5193,7 +5194,7 @@
     <a:masterClrMapping/>
   </p:clrMapOvr>
   <mc:AlternateContent xmlns:mc="http://schemas.openxmlformats.org/markup-compatibility/2006">
-    <mc:Choice xmlns:p14="http://schemas.microsoft.com/office/powerpoint/2010/main" xmlns="" Requires="p14">
+    <mc:Choice xmlns="" xmlns:p14="http://schemas.microsoft.com/office/powerpoint/2010/main" Requires="p14">
       <p:transition spd="med" p14:dur="700">
         <p:fade/>
       </p:transition>
@@ -5324,7 +5325,7 @@
     </p:spTree>
     <p:extLst>
       <p:ext uri="{BB962C8B-B14F-4D97-AF65-F5344CB8AC3E}">
-        <p14:creationId xmlns:p14="http://schemas.microsoft.com/office/powerpoint/2010/main" xmlns="" val="1626631400"/>
+        <p14:creationId xmlns="" xmlns:p14="http://schemas.microsoft.com/office/powerpoint/2010/main" val="1626631400"/>
       </p:ext>
     </p:extLst>
   </p:cSld>
@@ -5332,7 +5333,7 @@
     <a:masterClrMapping/>
   </p:clrMapOvr>
   <mc:AlternateContent xmlns:mc="http://schemas.openxmlformats.org/markup-compatibility/2006">
-    <mc:Choice xmlns:p14="http://schemas.microsoft.com/office/powerpoint/2010/main" xmlns="" Requires="p14">
+    <mc:Choice xmlns="" xmlns:p14="http://schemas.microsoft.com/office/powerpoint/2010/main" Requires="p14">
       <p:transition spd="med" p14:dur="700">
         <p:fade/>
       </p:transition>
@@ -5448,7 +5449,7 @@
     </p:spTree>
     <p:extLst>
       <p:ext uri="{BB962C8B-B14F-4D97-AF65-F5344CB8AC3E}">
-        <p14:creationId xmlns:p14="http://schemas.microsoft.com/office/powerpoint/2010/main" xmlns="" val="3607540120"/>
+        <p14:creationId xmlns="" xmlns:p14="http://schemas.microsoft.com/office/powerpoint/2010/main" val="3607540120"/>
       </p:ext>
     </p:extLst>
   </p:cSld>
@@ -5456,7 +5457,7 @@
     <a:masterClrMapping/>
   </p:clrMapOvr>
   <mc:AlternateContent xmlns:mc="http://schemas.openxmlformats.org/markup-compatibility/2006">
-    <mc:Choice xmlns:p14="http://schemas.microsoft.com/office/powerpoint/2010/main" xmlns="" Requires="p14">
+    <mc:Choice xmlns="" xmlns:p14="http://schemas.microsoft.com/office/powerpoint/2010/main" Requires="p14">
       <p:transition spd="med" p14:dur="700">
         <p:fade/>
       </p:transition>
@@ -5779,7 +5780,7 @@
     </p:spTree>
     <p:extLst>
       <p:ext uri="{BB962C8B-B14F-4D97-AF65-F5344CB8AC3E}">
-        <p14:creationId xmlns:p14="http://schemas.microsoft.com/office/powerpoint/2010/main" xmlns="" val="2544981540"/>
+        <p14:creationId xmlns="" xmlns:p14="http://schemas.microsoft.com/office/powerpoint/2010/main" val="2544981540"/>
       </p:ext>
     </p:extLst>
   </p:cSld>
@@ -5787,7 +5788,7 @@
     <a:masterClrMapping/>
   </p:clrMapOvr>
   <mc:AlternateContent xmlns:mc="http://schemas.openxmlformats.org/markup-compatibility/2006">
-    <mc:Choice xmlns:p14="http://schemas.microsoft.com/office/powerpoint/2010/main" xmlns="" Requires="p14">
+    <mc:Choice xmlns="" xmlns:p14="http://schemas.microsoft.com/office/powerpoint/2010/main" Requires="p14">
       <p:transition spd="med" p14:dur="700">
         <p:fade/>
       </p:transition>
@@ -6099,7 +6100,7 @@
     </p:spTree>
     <p:extLst>
       <p:ext uri="{BB962C8B-B14F-4D97-AF65-F5344CB8AC3E}">
-        <p14:creationId xmlns:p14="http://schemas.microsoft.com/office/powerpoint/2010/main" xmlns="" val="2249172152"/>
+        <p14:creationId xmlns="" xmlns:p14="http://schemas.microsoft.com/office/powerpoint/2010/main" val="2249172152"/>
       </p:ext>
     </p:extLst>
   </p:cSld>
@@ -6107,7 +6108,7 @@
     <a:masterClrMapping/>
   </p:clrMapOvr>
   <mc:AlternateContent xmlns:mc="http://schemas.openxmlformats.org/markup-compatibility/2006">
-    <mc:Choice xmlns:p14="http://schemas.microsoft.com/office/powerpoint/2010/main" xmlns="" Requires="p14">
+    <mc:Choice xmlns="" xmlns:p14="http://schemas.microsoft.com/office/powerpoint/2010/main" Requires="p14">
       <p:transition spd="med" p14:dur="700">
         <p:fade/>
       </p:transition>
@@ -6378,7 +6379,7 @@
     </p:spTree>
     <p:extLst>
       <p:ext uri="{BB962C8B-B14F-4D97-AF65-F5344CB8AC3E}">
-        <p14:creationId xmlns:p14="http://schemas.microsoft.com/office/powerpoint/2010/main" xmlns="" val="1403059996"/>
+        <p14:creationId xmlns="" xmlns:p14="http://schemas.microsoft.com/office/powerpoint/2010/main" val="1403059996"/>
       </p:ext>
     </p:extLst>
   </p:cSld>
@@ -6397,7 +6398,7 @@
     <p:sldLayoutId id="2147483659" r:id="rId11"/>
   </p:sldLayoutIdLst>
   <mc:AlternateContent xmlns:mc="http://schemas.openxmlformats.org/markup-compatibility/2006">
-    <mc:Choice xmlns:p14="http://schemas.microsoft.com/office/powerpoint/2010/main" xmlns="" Requires="p14">
+    <mc:Choice xmlns="" xmlns:p14="http://schemas.microsoft.com/office/powerpoint/2010/main" Requires="p14">
       <p:transition spd="med" p14:dur="700">
         <p:fade/>
       </p:transition>
@@ -6717,7 +6718,7 @@
   </p:txStyles>
   <p:extLst mod="1">
     <p:ext uri="{27BBF7A9-308A-43DC-89C8-2F10F3537804}">
-      <p15:sldGuideLst xmlns:p15="http://schemas.microsoft.com/office/powerpoint/2012/main" xmlns="">
+      <p15:sldGuideLst xmlns="" xmlns:p15="http://schemas.microsoft.com/office/powerpoint/2012/main">
         <p15:guide id="1" pos="3839" userDrawn="1">
           <p15:clr>
             <a:srgbClr val="F26B43"/>
@@ -6761,7 +6762,12 @@
             <p:ph type="ctrTitle"/>
           </p:nvPr>
         </p:nvSpPr>
-        <p:spPr/>
+        <p:spPr>
+          <a:xfrm>
+            <a:off x="1053852" y="2564904"/>
+            <a:ext cx="8229600" cy="1727448"/>
+          </a:xfrm>
+        </p:spPr>
         <p:txBody>
           <a:bodyPr>
             <a:normAutofit/>
@@ -6769,13 +6775,20 @@
           <a:lstStyle/>
           <a:p>
             <a:r>
-              <a:rPr lang="es-AR" sz="6000" smtClean="0">
-                <a:latin typeface="Segoe UI" panose="020B0502040204020203" pitchFamily="34" charset="0"/>
-                <a:cs typeface="Segoe UI" panose="020B0502040204020203" pitchFamily="34" charset="0"/>
-              </a:rPr>
-              <a:t>Fuga de Información en los Siglos XIX y XXI</a:t>
-            </a:r>
-            <a:endParaRPr lang="es-AR" sz="6000">
+              <a:rPr lang="es-AR" sz="6000" dirty="0" smtClean="0">
+                <a:latin typeface="Segoe UI" panose="020B0502040204020203" pitchFamily="34" charset="0"/>
+                <a:cs typeface="Segoe UI" panose="020B0502040204020203" pitchFamily="34" charset="0"/>
+              </a:rPr>
+              <a:t>Fuga de Información </a:t>
+            </a:r>
+            <a:r>
+              <a:rPr lang="es-AR" sz="5400" dirty="0" smtClean="0">
+                <a:latin typeface="Segoe UI" panose="020B0502040204020203" pitchFamily="34" charset="0"/>
+                <a:cs typeface="Segoe UI" panose="020B0502040204020203" pitchFamily="34" charset="0"/>
+              </a:rPr>
+              <a:t>en los Siglos XIX y XXI</a:t>
+            </a:r>
+            <a:endParaRPr lang="es-AR" sz="5400" dirty="0">
               <a:latin typeface="Segoe UI" panose="020B0502040204020203" pitchFamily="34" charset="0"/>
               <a:cs typeface="Segoe UI" panose="020B0502040204020203" pitchFamily="34" charset="0"/>
             </a:endParaRPr>
@@ -6792,28 +6805,48 @@
             <p:ph type="subTitle" idx="1"/>
           </p:nvPr>
         </p:nvSpPr>
-        <p:spPr/>
+        <p:spPr>
+          <a:xfrm>
+            <a:off x="1065212" y="4800600"/>
+            <a:ext cx="9925743" cy="1219200"/>
+          </a:xfrm>
+        </p:spPr>
         <p:txBody>
           <a:bodyPr/>
           <a:lstStyle/>
           <a:p>
             <a:r>
-              <a:rPr lang="es-AR" smtClean="0">
-                <a:latin typeface="Segoe UI" panose="020B0502040204020203" pitchFamily="34" charset="0"/>
-                <a:cs typeface="Segoe UI" panose="020B0502040204020203" pitchFamily="34" charset="0"/>
-              </a:rPr>
-              <a:t>Fiuba – implantación de sistemas</a:t>
-            </a:r>
-          </a:p>
-          <a:p>
-            <a:r>
-              <a:rPr lang="es-AR" smtClean="0">
-                <a:latin typeface="Segoe UI" panose="020B0502040204020203" pitchFamily="34" charset="0"/>
-                <a:cs typeface="Segoe UI" panose="020B0502040204020203" pitchFamily="34" charset="0"/>
-              </a:rPr>
-              <a:t>Noviembre de 2014</a:t>
-            </a:r>
-            <a:endParaRPr lang="es-AR">
+              <a:rPr lang="es-AR" b="1" dirty="0" smtClean="0">
+                <a:solidFill>
+                  <a:schemeClr val="accent1">
+                    <a:lumMod val="75000"/>
+                  </a:schemeClr>
+                </a:solidFill>
+                <a:latin typeface="Segoe UI" panose="020B0502040204020203" pitchFamily="34" charset="0"/>
+                <a:cs typeface="Segoe UI" panose="020B0502040204020203" pitchFamily="34" charset="0"/>
+              </a:rPr>
+              <a:t>75.17 - Implantación de Sistemas</a:t>
+            </a:r>
+          </a:p>
+          <a:p>
+            <a:r>
+              <a:rPr lang="es-AR" b="1" dirty="0" smtClean="0">
+                <a:solidFill>
+                  <a:schemeClr val="accent1">
+                    <a:lumMod val="75000"/>
+                  </a:schemeClr>
+                </a:solidFill>
+                <a:latin typeface="Segoe UI" panose="020B0502040204020203" pitchFamily="34" charset="0"/>
+                <a:cs typeface="Segoe UI" panose="020B0502040204020203" pitchFamily="34" charset="0"/>
+              </a:rPr>
+              <a:t>75.56 - Organización de la Implantación y el Mantenimiento</a:t>
+            </a:r>
+            <a:endParaRPr lang="es-AR" b="1" dirty="0">
+              <a:solidFill>
+                <a:schemeClr val="accent1">
+                  <a:lumMod val="75000"/>
+                </a:schemeClr>
+              </a:solidFill>
               <a:latin typeface="Segoe UI" panose="020B0502040204020203" pitchFamily="34" charset="0"/>
               <a:cs typeface="Segoe UI" panose="020B0502040204020203" pitchFamily="34" charset="0"/>
             </a:endParaRPr>
@@ -6832,7 +6865,7 @@
           <a:blip r:embed="rId2" cstate="print">
             <a:extLst>
               <a:ext uri="{28A0092B-C50C-407E-A947-70E740481C1C}">
-                <a14:useLocalDpi xmlns:a14="http://schemas.microsoft.com/office/drawing/2010/main" xmlns="" val="0"/>
+                <a14:useLocalDpi xmlns="" xmlns:a14="http://schemas.microsoft.com/office/drawing/2010/main" val="0"/>
               </a:ext>
             </a:extLst>
           </a:blip>
@@ -6852,7 +6885,7 @@
           <a:noFill/>
           <a:extLst>
             <a:ext uri="{909E8E84-426E-40DD-AFC4-6F175D3DCCD1}">
-              <a14:hiddenFill xmlns:a14="http://schemas.microsoft.com/office/drawing/2010/main" xmlns="">
+              <a14:hiddenFill xmlns="" xmlns:a14="http://schemas.microsoft.com/office/drawing/2010/main">
                 <a:solidFill>
                   <a:srgbClr val="FFFFFF"/>
                 </a:solidFill>
@@ -6864,7 +6897,7 @@
     </p:spTree>
     <p:extLst>
       <p:ext uri="{BB962C8B-B14F-4D97-AF65-F5344CB8AC3E}">
-        <p14:creationId xmlns:p14="http://schemas.microsoft.com/office/powerpoint/2010/main" xmlns="" val="2808920126"/>
+        <p14:creationId xmlns="" xmlns:p14="http://schemas.microsoft.com/office/powerpoint/2010/main" val="2808920126"/>
       </p:ext>
     </p:extLst>
   </p:cSld>
@@ -6872,7 +6905,7 @@
     <a:masterClrMapping/>
   </p:clrMapOvr>
   <mc:AlternateContent xmlns:mc="http://schemas.openxmlformats.org/markup-compatibility/2006">
-    <mc:Choice xmlns:p14="http://schemas.microsoft.com/office/powerpoint/2010/main" xmlns="" Requires="p14">
+    <mc:Choice xmlns="" xmlns:p14="http://schemas.microsoft.com/office/powerpoint/2010/main" Requires="p14">
       <p:transition spd="med" p14:dur="700">
         <p:fade/>
       </p:transition>
@@ -6934,20 +6967,30 @@
           <a:p>
             <a:pPr algn="ctr"/>
             <a:r>
-              <a:rPr lang="es-AR" dirty="0">
+              <a:rPr lang="es-AR">
+                <a:solidFill>
+                  <a:schemeClr val="accent1"/>
+                </a:solidFill>
                 <a:latin typeface="Segoe UI" panose="020B0502040204020203" pitchFamily="34" charset="0"/>
                 <a:cs typeface="Segoe UI" panose="020B0502040204020203" pitchFamily="34" charset="0"/>
               </a:rPr>
               <a:t>Tipos de controles para mitigar </a:t>
             </a:r>
             <a:r>
-              <a:rPr lang="es-AR" dirty="0" smtClean="0">
+              <a:rPr lang="es-AR" smtClean="0">
+                <a:solidFill>
+                  <a:schemeClr val="accent1"/>
+                </a:solidFill>
                 <a:latin typeface="Segoe UI" panose="020B0502040204020203" pitchFamily="34" charset="0"/>
                 <a:cs typeface="Segoe UI" panose="020B0502040204020203" pitchFamily="34" charset="0"/>
               </a:rPr>
               <a:t>riesgos</a:t>
             </a:r>
-            <a:endParaRPr lang="es-AR" b="1" dirty="0"/>
+            <a:endParaRPr lang="es-AR" b="1">
+              <a:solidFill>
+                <a:schemeClr val="accent1"/>
+              </a:solidFill>
+            </a:endParaRPr>
           </a:p>
         </p:txBody>
       </p:sp>
@@ -7115,7 +7158,7 @@
     </p:spTree>
     <p:extLst>
       <p:ext uri="{BB962C8B-B14F-4D97-AF65-F5344CB8AC3E}">
-        <p14:creationId xmlns:p14="http://schemas.microsoft.com/office/powerpoint/2010/main" xmlns="" val="4207303638"/>
+        <p14:creationId xmlns="" xmlns:p14="http://schemas.microsoft.com/office/powerpoint/2010/main" val="4207303638"/>
       </p:ext>
     </p:extLst>
   </p:cSld>
@@ -7123,7 +7166,7 @@
     <a:masterClrMapping/>
   </p:clrMapOvr>
   <mc:AlternateContent xmlns:mc="http://schemas.openxmlformats.org/markup-compatibility/2006">
-    <mc:Choice xmlns:p14="http://schemas.microsoft.com/office/powerpoint/2010/main" xmlns="" Requires="p14">
+    <mc:Choice xmlns="" xmlns:p14="http://schemas.microsoft.com/office/powerpoint/2010/main" Requires="p14">
       <p:transition spd="med" p14:dur="700">
         <p:fade/>
       </p:transition>
@@ -7177,11 +7220,40 @@
           <a:lstStyle/>
           <a:p>
             <a:r>
+              <a:rPr lang="es-AR" b="1" i="1" dirty="0" smtClean="0">
+                <a:latin typeface="Segoe UI" panose="020B0502040204020203" pitchFamily="34" charset="0"/>
+                <a:cs typeface="Segoe UI" panose="020B0502040204020203" pitchFamily="34" charset="0"/>
+              </a:rPr>
+              <a:t>Siglo XIX</a:t>
+            </a:r>
+            <a:endParaRPr lang="es-AR" b="1" i="1" dirty="0">
+              <a:latin typeface="Segoe UI" panose="020B0502040204020203" pitchFamily="34" charset="0"/>
+              <a:cs typeface="Segoe UI" panose="020B0502040204020203" pitchFamily="34" charset="0"/>
+            </a:endParaRPr>
+          </a:p>
+        </p:txBody>
+      </p:sp>
+      <p:sp>
+        <p:nvSpPr>
+          <p:cNvPr id="3" name="Text Placeholder 2"/>
+          <p:cNvSpPr>
+            <a:spLocks noGrp="1"/>
+          </p:cNvSpPr>
+          <p:nvPr>
+            <p:ph type="body" idx="1"/>
+          </p:nvPr>
+        </p:nvSpPr>
+        <p:spPr/>
+        <p:txBody>
+          <a:bodyPr/>
+          <a:lstStyle/>
+          <a:p>
+            <a:r>
               <a:rPr lang="es-AR" dirty="0" smtClean="0">
                 <a:latin typeface="Segoe UI" panose="020B0502040204020203" pitchFamily="34" charset="0"/>
                 <a:cs typeface="Segoe UI" panose="020B0502040204020203" pitchFamily="34" charset="0"/>
               </a:rPr>
-              <a:t>Siglo XIX</a:t>
+              <a:t>La información entre mosquetes y bayonetas</a:t>
             </a:r>
             <a:endParaRPr lang="es-AR" dirty="0">
               <a:latin typeface="Segoe UI" panose="020B0502040204020203" pitchFamily="34" charset="0"/>
@@ -7190,39 +7262,10 @@
           </a:p>
         </p:txBody>
       </p:sp>
-      <p:sp>
-        <p:nvSpPr>
-          <p:cNvPr id="3" name="Text Placeholder 2"/>
-          <p:cNvSpPr>
-            <a:spLocks noGrp="1"/>
-          </p:cNvSpPr>
-          <p:nvPr>
-            <p:ph type="body" idx="1"/>
-          </p:nvPr>
-        </p:nvSpPr>
-        <p:spPr/>
-        <p:txBody>
-          <a:bodyPr/>
-          <a:lstStyle/>
-          <a:p>
-            <a:r>
-              <a:rPr lang="es-AR" dirty="0" smtClean="0">
-                <a:latin typeface="Segoe UI" panose="020B0502040204020203" pitchFamily="34" charset="0"/>
-                <a:cs typeface="Segoe UI" panose="020B0502040204020203" pitchFamily="34" charset="0"/>
-              </a:rPr>
-              <a:t>La información entre mosquetes y bayonetas</a:t>
-            </a:r>
-            <a:endParaRPr lang="es-AR" dirty="0">
-              <a:latin typeface="Segoe UI" panose="020B0502040204020203" pitchFamily="34" charset="0"/>
-              <a:cs typeface="Segoe UI" panose="020B0502040204020203" pitchFamily="34" charset="0"/>
-            </a:endParaRPr>
-          </a:p>
-        </p:txBody>
-      </p:sp>
     </p:spTree>
     <p:extLst>
       <p:ext uri="{BB962C8B-B14F-4D97-AF65-F5344CB8AC3E}">
-        <p14:creationId xmlns:p14="http://schemas.microsoft.com/office/powerpoint/2010/main" xmlns="" val="3772183175"/>
+        <p14:creationId xmlns="" xmlns:p14="http://schemas.microsoft.com/office/powerpoint/2010/main" val="3772183175"/>
       </p:ext>
     </p:extLst>
   </p:cSld>
@@ -7230,7 +7273,7 @@
     <a:masterClrMapping/>
   </p:clrMapOvr>
   <mc:AlternateContent xmlns:mc="http://schemas.openxmlformats.org/markup-compatibility/2006">
-    <mc:Choice xmlns:p14="http://schemas.microsoft.com/office/powerpoint/2010/main" xmlns="" Requires="p14">
+    <mc:Choice xmlns="" xmlns:p14="http://schemas.microsoft.com/office/powerpoint/2010/main" Requires="p14">
       <p:transition spd="med" p14:dur="700">
         <p:fade/>
       </p:transition>
@@ -7443,7 +7486,7 @@
     </p:spTree>
     <p:extLst>
       <p:ext uri="{BB962C8B-B14F-4D97-AF65-F5344CB8AC3E}">
-        <p14:creationId xmlns:p14="http://schemas.microsoft.com/office/powerpoint/2010/main" xmlns="" val="911844652"/>
+        <p14:creationId xmlns="" xmlns:p14="http://schemas.microsoft.com/office/powerpoint/2010/main" val="911844652"/>
       </p:ext>
     </p:extLst>
   </p:cSld>
@@ -7451,7 +7494,7 @@
     <a:masterClrMapping/>
   </p:clrMapOvr>
   <mc:AlternateContent xmlns:mc="http://schemas.openxmlformats.org/markup-compatibility/2006">
-    <mc:Choice xmlns:p14="http://schemas.microsoft.com/office/powerpoint/2010/main" xmlns="" Requires="p14">
+    <mc:Choice xmlns="" xmlns:p14="http://schemas.microsoft.com/office/powerpoint/2010/main" Requires="p14">
       <p:transition spd="med" p14:dur="700">
         <p:fade/>
       </p:transition>
@@ -7626,7 +7669,7 @@
     </p:spTree>
     <p:extLst>
       <p:ext uri="{BB962C8B-B14F-4D97-AF65-F5344CB8AC3E}">
-        <p14:creationId xmlns:p14="http://schemas.microsoft.com/office/powerpoint/2010/main" xmlns="" val="3751154171"/>
+        <p14:creationId xmlns="" xmlns:p14="http://schemas.microsoft.com/office/powerpoint/2010/main" val="3751154171"/>
       </p:ext>
     </p:extLst>
   </p:cSld>
@@ -7634,7 +7677,7 @@
     <a:masterClrMapping/>
   </p:clrMapOvr>
   <mc:AlternateContent xmlns:mc="http://schemas.openxmlformats.org/markup-compatibility/2006">
-    <mc:Choice xmlns:p14="http://schemas.microsoft.com/office/powerpoint/2010/main" xmlns="" Requires="p14">
+    <mc:Choice xmlns="" xmlns:p14="http://schemas.microsoft.com/office/powerpoint/2010/main" Requires="p14">
       <p:transition spd="med" p14:dur="700">
         <p:fade/>
       </p:transition>
@@ -7811,7 +7854,7 @@
     </p:spTree>
     <p:extLst>
       <p:ext uri="{BB962C8B-B14F-4D97-AF65-F5344CB8AC3E}">
-        <p14:creationId xmlns:p14="http://schemas.microsoft.com/office/powerpoint/2010/main" xmlns="" val="2714171304"/>
+        <p14:creationId xmlns="" xmlns:p14="http://schemas.microsoft.com/office/powerpoint/2010/main" val="2714171304"/>
       </p:ext>
     </p:extLst>
   </p:cSld>
@@ -7819,7 +7862,7 @@
     <a:masterClrMapping/>
   </p:clrMapOvr>
   <mc:AlternateContent xmlns:mc="http://schemas.openxmlformats.org/markup-compatibility/2006">
-    <mc:Choice xmlns:p14="http://schemas.microsoft.com/office/powerpoint/2010/main" xmlns="" Requires="p14">
+    <mc:Choice xmlns="" xmlns:p14="http://schemas.microsoft.com/office/powerpoint/2010/main" Requires="p14">
       <p:transition spd="med" p14:dur="700">
         <p:fade/>
       </p:transition>
@@ -7997,7 +8040,7 @@
     </p:spTree>
     <p:extLst>
       <p:ext uri="{BB962C8B-B14F-4D97-AF65-F5344CB8AC3E}">
-        <p14:creationId xmlns:p14="http://schemas.microsoft.com/office/powerpoint/2010/main" xmlns="" val="2246987516"/>
+        <p14:creationId xmlns="" xmlns:p14="http://schemas.microsoft.com/office/powerpoint/2010/main" val="2246987516"/>
       </p:ext>
     </p:extLst>
   </p:cSld>
@@ -8005,7 +8048,7 @@
     <a:masterClrMapping/>
   </p:clrMapOvr>
   <mc:AlternateContent xmlns:mc="http://schemas.openxmlformats.org/markup-compatibility/2006">
-    <mc:Choice xmlns:p14="http://schemas.microsoft.com/office/powerpoint/2010/main" xmlns="" Requires="p14">
+    <mc:Choice xmlns="" xmlns:p14="http://schemas.microsoft.com/office/powerpoint/2010/main" Requires="p14">
       <p:transition spd="med" p14:dur="700">
         <p:fade/>
       </p:transition>
@@ -8162,7 +8205,7 @@
     </p:spTree>
     <p:extLst>
       <p:ext uri="{BB962C8B-B14F-4D97-AF65-F5344CB8AC3E}">
-        <p14:creationId xmlns:p14="http://schemas.microsoft.com/office/powerpoint/2010/main" xmlns="" val="3025649002"/>
+        <p14:creationId xmlns="" xmlns:p14="http://schemas.microsoft.com/office/powerpoint/2010/main" val="3025649002"/>
       </p:ext>
     </p:extLst>
   </p:cSld>
@@ -8170,7 +8213,7 @@
     <a:masterClrMapping/>
   </p:clrMapOvr>
   <mc:AlternateContent xmlns:mc="http://schemas.openxmlformats.org/markup-compatibility/2006">
-    <mc:Choice xmlns:p14="http://schemas.microsoft.com/office/powerpoint/2010/main" xmlns="" Requires="p14">
+    <mc:Choice xmlns="" xmlns:p14="http://schemas.microsoft.com/office/powerpoint/2010/main" Requires="p14">
       <p:transition spd="med" p14:dur="700">
         <p:fade/>
       </p:transition>
@@ -8224,13 +8267,19 @@
           <a:lstStyle/>
           <a:p>
             <a:r>
-              <a:rPr lang="es-AR" smtClean="0">
+              <a:rPr lang="es-AR" dirty="0" smtClean="0">
+                <a:solidFill>
+                  <a:schemeClr val="accent1"/>
+                </a:solidFill>
                 <a:latin typeface="Segoe UI" panose="020B0502040204020203" pitchFamily="34" charset="0"/>
                 <a:cs typeface="Segoe UI" panose="020B0502040204020203" pitchFamily="34" charset="0"/>
               </a:rPr>
               <a:t>Mecanismos de Protección</a:t>
             </a:r>
-            <a:endParaRPr lang="es-AR">
+            <a:endParaRPr lang="es-AR" dirty="0">
+              <a:solidFill>
+                <a:schemeClr val="accent1"/>
+              </a:solidFill>
               <a:latin typeface="Segoe UI" panose="020B0502040204020203" pitchFamily="34" charset="0"/>
               <a:cs typeface="Segoe UI" panose="020B0502040204020203" pitchFamily="34" charset="0"/>
             </a:endParaRPr>
@@ -8306,7 +8355,7 @@
     </p:spTree>
     <p:extLst>
       <p:ext uri="{BB962C8B-B14F-4D97-AF65-F5344CB8AC3E}">
-        <p14:creationId xmlns:p14="http://schemas.microsoft.com/office/powerpoint/2010/main" xmlns="" val="3410413250"/>
+        <p14:creationId xmlns="" xmlns:p14="http://schemas.microsoft.com/office/powerpoint/2010/main" val="3410413250"/>
       </p:ext>
     </p:extLst>
   </p:cSld>
@@ -8314,7 +8363,7 @@
     <a:masterClrMapping/>
   </p:clrMapOvr>
   <mc:AlternateContent xmlns:mc="http://schemas.openxmlformats.org/markup-compatibility/2006">
-    <mc:Choice xmlns:p14="http://schemas.microsoft.com/office/powerpoint/2010/main" xmlns="" Requires="p14">
+    <mc:Choice xmlns="" xmlns:p14="http://schemas.microsoft.com/office/powerpoint/2010/main" Requires="p14">
       <p:transition spd="med" p14:dur="700">
         <p:fade/>
       </p:transition>
@@ -8519,7 +8568,7 @@
     </p:spTree>
     <p:extLst>
       <p:ext uri="{BB962C8B-B14F-4D97-AF65-F5344CB8AC3E}">
-        <p14:creationId xmlns:p14="http://schemas.microsoft.com/office/powerpoint/2010/main" xmlns="" val="23673588"/>
+        <p14:creationId xmlns="" xmlns:p14="http://schemas.microsoft.com/office/powerpoint/2010/main" val="23673588"/>
       </p:ext>
     </p:extLst>
   </p:cSld>
@@ -8527,7 +8576,7 @@
     <a:masterClrMapping/>
   </p:clrMapOvr>
   <mc:AlternateContent xmlns:mc="http://schemas.openxmlformats.org/markup-compatibility/2006">
-    <mc:Choice xmlns:p14="http://schemas.microsoft.com/office/powerpoint/2010/main" xmlns="" Requires="p14">
+    <mc:Choice xmlns="" xmlns:p14="http://schemas.microsoft.com/office/powerpoint/2010/main" Requires="p14">
       <p:transition spd="med" p14:dur="700">
         <p:fade/>
       </p:transition>
@@ -8791,7 +8840,7 @@
     </p:spTree>
     <p:extLst>
       <p:ext uri="{BB962C8B-B14F-4D97-AF65-F5344CB8AC3E}">
-        <p14:creationId xmlns:p14="http://schemas.microsoft.com/office/powerpoint/2010/main" xmlns="" val="3632379430"/>
+        <p14:creationId xmlns="" xmlns:p14="http://schemas.microsoft.com/office/powerpoint/2010/main" val="3632379430"/>
       </p:ext>
     </p:extLst>
   </p:cSld>
@@ -8799,7 +8848,7 @@
     <a:masterClrMapping/>
   </p:clrMapOvr>
   <mc:AlternateContent xmlns:mc="http://schemas.openxmlformats.org/markup-compatibility/2006">
-    <mc:Choice xmlns:p14="http://schemas.microsoft.com/office/powerpoint/2010/main" xmlns="" Requires="p14">
+    <mc:Choice xmlns="" xmlns:p14="http://schemas.microsoft.com/office/powerpoint/2010/main" Requires="p14">
       <p:transition spd="med" p14:dur="700">
         <p:fade/>
       </p:transition>
@@ -8847,13 +8896,20 @@
             <p:ph type="title"/>
           </p:nvPr>
         </p:nvSpPr>
-        <p:spPr/>
-        <p:txBody>
-          <a:bodyPr/>
+        <p:spPr>
+          <a:xfrm>
+            <a:off x="1522413" y="381000"/>
+            <a:ext cx="9144001" cy="2111896"/>
+          </a:xfrm>
+        </p:spPr>
+        <p:txBody>
+          <a:bodyPr>
+            <a:normAutofit/>
+          </a:bodyPr>
           <a:lstStyle/>
           <a:p>
             <a:r>
-              <a:rPr lang="es-AR" spc="0" smtClean="0">
+              <a:rPr lang="es-AR" spc="0" dirty="0" smtClean="0">
                 <a:ln w="0"/>
                 <a:solidFill>
                   <a:schemeClr val="accent1"/>
@@ -8868,9 +8924,105 @@
                 <a:latin typeface="Segoe UI" panose="020B0502040204020203" pitchFamily="34" charset="0"/>
                 <a:cs typeface="Segoe UI" panose="020B0502040204020203" pitchFamily="34" charset="0"/>
               </a:rPr>
-              <a:t>Integrantes</a:t>
-            </a:r>
-            <a:endParaRPr lang="es-AR" spc="0">
+              <a:t>Grupo N°: </a:t>
+            </a:r>
+            <a:r>
+              <a:rPr lang="es-AR" spc="0" dirty="0" smtClean="0">
+                <a:ln w="0"/>
+                <a:latin typeface="Segoe UI" panose="020B0502040204020203" pitchFamily="34" charset="0"/>
+                <a:cs typeface="Segoe UI" panose="020B0502040204020203" pitchFamily="34" charset="0"/>
+              </a:rPr>
+              <a:t>2</a:t>
+            </a:r>
+            <a:r>
+              <a:rPr lang="es-AR" spc="0" dirty="0" smtClean="0">
+                <a:ln w="0"/>
+                <a:solidFill>
+                  <a:schemeClr val="accent1"/>
+                </a:solidFill>
+                <a:effectLst>
+                  <a:outerShdw blurRad="38100" dist="25400" dir="5400000" algn="ctr" rotWithShape="0">
+                    <a:srgbClr val="6E747A">
+                      <a:alpha val="43000"/>
+                    </a:srgbClr>
+                  </a:outerShdw>
+                </a:effectLst>
+                <a:latin typeface="Segoe UI" panose="020B0502040204020203" pitchFamily="34" charset="0"/>
+                <a:cs typeface="Segoe UI" panose="020B0502040204020203" pitchFamily="34" charset="0"/>
+              </a:rPr>
+              <a:t/>
+            </a:r>
+            <a:br>
+              <a:rPr lang="es-AR" spc="0" dirty="0" smtClean="0">
+                <a:ln w="0"/>
+                <a:solidFill>
+                  <a:schemeClr val="accent1"/>
+                </a:solidFill>
+                <a:effectLst>
+                  <a:outerShdw blurRad="38100" dist="25400" dir="5400000" algn="ctr" rotWithShape="0">
+                    <a:srgbClr val="6E747A">
+                      <a:alpha val="43000"/>
+                    </a:srgbClr>
+                  </a:outerShdw>
+                </a:effectLst>
+                <a:latin typeface="Segoe UI" panose="020B0502040204020203" pitchFamily="34" charset="0"/>
+                <a:cs typeface="Segoe UI" panose="020B0502040204020203" pitchFamily="34" charset="0"/>
+              </a:rPr>
+            </a:br>
+            <a:r>
+              <a:rPr lang="es-AR" spc="0" dirty="0" smtClean="0">
+                <a:ln w="0"/>
+                <a:solidFill>
+                  <a:schemeClr val="accent1"/>
+                </a:solidFill>
+                <a:effectLst>
+                  <a:outerShdw blurRad="38100" dist="25400" dir="5400000" algn="ctr" rotWithShape="0">
+                    <a:srgbClr val="6E747A">
+                      <a:alpha val="43000"/>
+                    </a:srgbClr>
+                  </a:outerShdw>
+                </a:effectLst>
+                <a:latin typeface="Segoe UI" panose="020B0502040204020203" pitchFamily="34" charset="0"/>
+                <a:cs typeface="Segoe UI" panose="020B0502040204020203" pitchFamily="34" charset="0"/>
+              </a:rPr>
+              <a:t/>
+            </a:r>
+            <a:br>
+              <a:rPr lang="es-AR" spc="0" dirty="0" smtClean="0">
+                <a:ln w="0"/>
+                <a:solidFill>
+                  <a:schemeClr val="accent1"/>
+                </a:solidFill>
+                <a:effectLst>
+                  <a:outerShdw blurRad="38100" dist="25400" dir="5400000" algn="ctr" rotWithShape="0">
+                    <a:srgbClr val="6E747A">
+                      <a:alpha val="43000"/>
+                    </a:srgbClr>
+                  </a:outerShdw>
+                </a:effectLst>
+                <a:latin typeface="Segoe UI" panose="020B0502040204020203" pitchFamily="34" charset="0"/>
+                <a:cs typeface="Segoe UI" panose="020B0502040204020203" pitchFamily="34" charset="0"/>
+              </a:rPr>
+            </a:br>
+            <a:r>
+              <a:rPr lang="es-AR" spc="0" dirty="0" smtClean="0">
+                <a:ln w="0"/>
+                <a:solidFill>
+                  <a:schemeClr val="accent1"/>
+                </a:solidFill>
+                <a:effectLst>
+                  <a:outerShdw blurRad="38100" dist="25400" dir="5400000" algn="ctr" rotWithShape="0">
+                    <a:srgbClr val="6E747A">
+                      <a:alpha val="43000"/>
+                    </a:srgbClr>
+                  </a:outerShdw>
+                </a:effectLst>
+                <a:latin typeface="Segoe UI" panose="020B0502040204020203" pitchFamily="34" charset="0"/>
+                <a:cs typeface="Segoe UI" panose="020B0502040204020203" pitchFamily="34" charset="0"/>
+              </a:rPr>
+              <a:t>Integrantes:</a:t>
+            </a:r>
+            <a:endParaRPr lang="es-AR" spc="0" dirty="0">
               <a:ln w="0"/>
               <a:solidFill>
                 <a:schemeClr val="accent1"/>
@@ -8898,108 +9050,109 @@
             <p:ph idx="1"/>
           </p:nvPr>
         </p:nvSpPr>
-        <p:spPr/>
+        <p:spPr>
+          <a:xfrm>
+            <a:off x="1522413" y="2708920"/>
+            <a:ext cx="9134391" cy="3310880"/>
+          </a:xfrm>
+        </p:spPr>
         <p:txBody>
           <a:bodyPr/>
           <a:lstStyle/>
           <a:p>
             <a:r>
-              <a:rPr lang="es-AR" smtClean="0">
-                <a:latin typeface="Segoe UI" panose="020B0502040204020203" pitchFamily="34" charset="0"/>
-                <a:cs typeface="Segoe UI" panose="020B0502040204020203" pitchFamily="34" charset="0"/>
-              </a:rPr>
-              <a:t>Stephanie Zurita</a:t>
-            </a:r>
-          </a:p>
-          <a:p>
-            <a:r>
-              <a:rPr lang="es-AR" smtClean="0">
+              <a:rPr lang="es-AR" dirty="0" err="1" smtClean="0">
+                <a:latin typeface="Segoe UI" panose="020B0502040204020203" pitchFamily="34" charset="0"/>
+                <a:cs typeface="Segoe UI" panose="020B0502040204020203" pitchFamily="34" charset="0"/>
+              </a:rPr>
+              <a:t>Stephanie</a:t>
+            </a:r>
+            <a:r>
+              <a:rPr lang="es-AR" dirty="0" smtClean="0">
+                <a:latin typeface="Segoe UI" panose="020B0502040204020203" pitchFamily="34" charset="0"/>
+                <a:cs typeface="Segoe UI" panose="020B0502040204020203" pitchFamily="34" charset="0"/>
+              </a:rPr>
+              <a:t> Zurita</a:t>
+            </a:r>
+          </a:p>
+          <a:p>
+            <a:r>
+              <a:rPr lang="es-AR" dirty="0" smtClean="0">
                 <a:latin typeface="Segoe UI" panose="020B0502040204020203" pitchFamily="34" charset="0"/>
                 <a:cs typeface="Segoe UI" panose="020B0502040204020203" pitchFamily="34" charset="0"/>
               </a:rPr>
               <a:t>Santiago </a:t>
             </a:r>
             <a:r>
-              <a:rPr lang="es-AR" smtClean="0">
+              <a:rPr lang="es-AR" dirty="0" err="1" smtClean="0">
                 <a:latin typeface="Segoe UI" panose="020B0502040204020203" pitchFamily="34" charset="0"/>
                 <a:cs typeface="Segoe UI" panose="020B0502040204020203" pitchFamily="34" charset="0"/>
               </a:rPr>
               <a:t>Maraggi</a:t>
             </a:r>
-            <a:endParaRPr lang="es-AR" smtClean="0">
+            <a:endParaRPr lang="es-AR" dirty="0" smtClean="0">
               <a:latin typeface="Segoe UI" panose="020B0502040204020203" pitchFamily="34" charset="0"/>
               <a:cs typeface="Segoe UI" panose="020B0502040204020203" pitchFamily="34" charset="0"/>
             </a:endParaRPr>
           </a:p>
           <a:p>
             <a:r>
-              <a:rPr lang="es-AR" smtClean="0">
-                <a:latin typeface="Segoe UI" panose="020B0502040204020203" pitchFamily="34" charset="0"/>
-                <a:cs typeface="Segoe UI" panose="020B0502040204020203" pitchFamily="34" charset="0"/>
-              </a:rPr>
-              <a:t>Yi Cheng </a:t>
-            </a:r>
-            <a:r>
-              <a:rPr lang="es-AR" smtClean="0">
-                <a:latin typeface="Segoe UI" panose="020B0502040204020203" pitchFamily="34" charset="0"/>
-                <a:cs typeface="Segoe UI" panose="020B0502040204020203" pitchFamily="34" charset="0"/>
-              </a:rPr>
-              <a:t>Zhang</a:t>
-            </a:r>
-            <a:endParaRPr lang="es-AR" smtClean="0">
+              <a:rPr lang="es-AR" dirty="0" smtClean="0">
+                <a:latin typeface="Segoe UI" panose="020B0502040204020203" pitchFamily="34" charset="0"/>
+                <a:cs typeface="Segoe UI" panose="020B0502040204020203" pitchFamily="34" charset="0"/>
+              </a:rPr>
+              <a:t>Yi Cheng Zhang</a:t>
+            </a:r>
+          </a:p>
+          <a:p>
+            <a:r>
+              <a:rPr lang="es-AR" dirty="0" smtClean="0">
+                <a:latin typeface="Segoe UI" panose="020B0502040204020203" pitchFamily="34" charset="0"/>
+                <a:cs typeface="Segoe UI" panose="020B0502040204020203" pitchFamily="34" charset="0"/>
+              </a:rPr>
+              <a:t>Miguel </a:t>
+            </a:r>
+            <a:r>
+              <a:rPr lang="es-AR" dirty="0" err="1" smtClean="0">
+                <a:latin typeface="Segoe UI" panose="020B0502040204020203" pitchFamily="34" charset="0"/>
+                <a:cs typeface="Segoe UI" panose="020B0502040204020203" pitchFamily="34" charset="0"/>
+              </a:rPr>
+              <a:t>Angel</a:t>
+            </a:r>
+            <a:r>
+              <a:rPr lang="es-AR" dirty="0" smtClean="0">
+                <a:latin typeface="Segoe UI" panose="020B0502040204020203" pitchFamily="34" charset="0"/>
+                <a:cs typeface="Segoe UI" panose="020B0502040204020203" pitchFamily="34" charset="0"/>
+              </a:rPr>
+              <a:t> Schmidt</a:t>
+            </a:r>
+          </a:p>
+          <a:p>
+            <a:r>
+              <a:rPr lang="es-AR" dirty="0" smtClean="0">
+                <a:latin typeface="Segoe UI" panose="020B0502040204020203" pitchFamily="34" charset="0"/>
+                <a:cs typeface="Segoe UI" panose="020B0502040204020203" pitchFamily="34" charset="0"/>
+              </a:rPr>
+              <a:t>María Inés </a:t>
+            </a:r>
+            <a:r>
+              <a:rPr lang="es-AR" dirty="0" err="1" smtClean="0">
+                <a:latin typeface="Segoe UI" panose="020B0502040204020203" pitchFamily="34" charset="0"/>
+                <a:cs typeface="Segoe UI" panose="020B0502040204020203" pitchFamily="34" charset="0"/>
+              </a:rPr>
+              <a:t>Parnisari</a:t>
+            </a:r>
+            <a:endParaRPr lang="es-AR" dirty="0" smtClean="0">
               <a:latin typeface="Segoe UI" panose="020B0502040204020203" pitchFamily="34" charset="0"/>
               <a:cs typeface="Segoe UI" panose="020B0502040204020203" pitchFamily="34" charset="0"/>
             </a:endParaRPr>
           </a:p>
-          <a:p>
-            <a:r>
-              <a:rPr lang="es-AR" smtClean="0">
-                <a:latin typeface="Segoe UI" panose="020B0502040204020203" pitchFamily="34" charset="0"/>
-                <a:cs typeface="Segoe UI" panose="020B0502040204020203" pitchFamily="34" charset="0"/>
-              </a:rPr>
-              <a:t>Miguel </a:t>
-            </a:r>
-            <a:r>
-              <a:rPr lang="es-AR" smtClean="0">
-                <a:latin typeface="Segoe UI" panose="020B0502040204020203" pitchFamily="34" charset="0"/>
-                <a:cs typeface="Segoe UI" panose="020B0502040204020203" pitchFamily="34" charset="0"/>
-              </a:rPr>
-              <a:t>Angel Schmidt</a:t>
-            </a:r>
-          </a:p>
-          <a:p>
-            <a:r>
-              <a:rPr lang="es-AR" smtClean="0">
-                <a:latin typeface="Segoe UI" panose="020B0502040204020203" pitchFamily="34" charset="0"/>
-                <a:cs typeface="Segoe UI" panose="020B0502040204020203" pitchFamily="34" charset="0"/>
-              </a:rPr>
-              <a:t>María </a:t>
-            </a:r>
-            <a:r>
-              <a:rPr lang="es-AR" smtClean="0">
-                <a:latin typeface="Segoe UI" panose="020B0502040204020203" pitchFamily="34" charset="0"/>
-                <a:cs typeface="Segoe UI" panose="020B0502040204020203" pitchFamily="34" charset="0"/>
-              </a:rPr>
-              <a:t>Inés </a:t>
-            </a:r>
-            <a:r>
-              <a:rPr lang="es-AR" smtClean="0">
-                <a:latin typeface="Segoe UI" panose="020B0502040204020203" pitchFamily="34" charset="0"/>
-                <a:cs typeface="Segoe UI" panose="020B0502040204020203" pitchFamily="34" charset="0"/>
-              </a:rPr>
-              <a:t>Parnisari</a:t>
-            </a:r>
-            <a:endParaRPr lang="es-AR" smtClean="0">
-              <a:latin typeface="Segoe UI" panose="020B0502040204020203" pitchFamily="34" charset="0"/>
-              <a:cs typeface="Segoe UI" panose="020B0502040204020203" pitchFamily="34" charset="0"/>
-            </a:endParaRPr>
-          </a:p>
         </p:txBody>
       </p:sp>
     </p:spTree>
     <p:extLst>
       <p:ext uri="{BB962C8B-B14F-4D97-AF65-F5344CB8AC3E}">
-        <p14:creationId xmlns:p14="http://schemas.microsoft.com/office/powerpoint/2010/main" xmlns="" val="2139132589"/>
+        <p14:creationId xmlns="" xmlns:p14="http://schemas.microsoft.com/office/powerpoint/2010/main" val="2139132589"/>
       </p:ext>
     </p:extLst>
   </p:cSld>
@@ -9007,7 +9160,7 @@
     <a:masterClrMapping/>
   </p:clrMapOvr>
   <mc:AlternateContent xmlns:mc="http://schemas.openxmlformats.org/markup-compatibility/2006">
-    <mc:Choice xmlns:p14="http://schemas.microsoft.com/office/powerpoint/2010/main" xmlns="" Requires="p14">
+    <mc:Choice xmlns="" xmlns:p14="http://schemas.microsoft.com/office/powerpoint/2010/main" Requires="p14">
       <p:transition spd="med" p14:dur="700">
         <p:fade/>
       </p:transition>
@@ -9240,7 +9393,7 @@
     </p:spTree>
     <p:extLst>
       <p:ext uri="{BB962C8B-B14F-4D97-AF65-F5344CB8AC3E}">
-        <p14:creationId xmlns:p14="http://schemas.microsoft.com/office/powerpoint/2010/main" xmlns="" val="3204325395"/>
+        <p14:creationId xmlns="" xmlns:p14="http://schemas.microsoft.com/office/powerpoint/2010/main" val="3204325395"/>
       </p:ext>
     </p:extLst>
   </p:cSld>
@@ -9248,7 +9401,7 @@
     <a:masterClrMapping/>
   </p:clrMapOvr>
   <mc:AlternateContent xmlns:mc="http://schemas.openxmlformats.org/markup-compatibility/2006">
-    <mc:Choice xmlns:p14="http://schemas.microsoft.com/office/powerpoint/2010/main" xmlns="" Requires="p14">
+    <mc:Choice xmlns="" xmlns:p14="http://schemas.microsoft.com/office/powerpoint/2010/main" Requires="p14">
       <p:transition spd="med" p14:dur="700">
         <p:fade/>
       </p:transition>
@@ -9439,7 +9592,7 @@
     </p:spTree>
     <p:extLst>
       <p:ext uri="{BB962C8B-B14F-4D97-AF65-F5344CB8AC3E}">
-        <p14:creationId xmlns:p14="http://schemas.microsoft.com/office/powerpoint/2010/main" xmlns="" val="1496383053"/>
+        <p14:creationId xmlns="" xmlns:p14="http://schemas.microsoft.com/office/powerpoint/2010/main" val="1496383053"/>
       </p:ext>
     </p:extLst>
   </p:cSld>
@@ -9447,7 +9600,7 @@
     <a:masterClrMapping/>
   </p:clrMapOvr>
   <mc:AlternateContent xmlns:mc="http://schemas.openxmlformats.org/markup-compatibility/2006">
-    <mc:Choice xmlns:p14="http://schemas.microsoft.com/office/powerpoint/2010/main" xmlns="" Requires="p14">
+    <mc:Choice xmlns="" xmlns:p14="http://schemas.microsoft.com/office/powerpoint/2010/main" Requires="p14">
       <p:transition spd="med" p14:dur="700">
         <p:fade/>
       </p:transition>
@@ -9516,43 +9669,7 @@
                 <a:latin typeface="Segoe UI" panose="020B0502040204020203" pitchFamily="34" charset="0"/>
                 <a:cs typeface="Segoe UI" panose="020B0502040204020203" pitchFamily="34" charset="0"/>
               </a:rPr>
-              <a:t>Siglo</a:t>
-            </a:r>
-            <a:r>
-              <a:rPr lang="es-AR" spc="0" smtClean="0">
-                <a:ln w="0"/>
-                <a:solidFill>
-                  <a:schemeClr val="accent1"/>
-                </a:solidFill>
-                <a:effectLst>
-                  <a:outerShdw blurRad="38100" dist="25400" dir="5400000" algn="ctr" rotWithShape="0">
-                    <a:srgbClr val="6E747A">
-                      <a:alpha val="43000"/>
-                    </a:srgbClr>
-                  </a:outerShdw>
-                </a:effectLst>
-                <a:latin typeface="Segoe UI" panose="020B0502040204020203" pitchFamily="34" charset="0"/>
-                <a:cs typeface="Segoe UI" panose="020B0502040204020203" pitchFamily="34" charset="0"/>
-              </a:rPr>
-              <a:t> XIX – </a:t>
-            </a:r>
-            <a:r>
-              <a:rPr lang="es-AR" spc="0" smtClean="0">
-                <a:ln w="0"/>
-                <a:solidFill>
-                  <a:schemeClr val="accent1"/>
-                </a:solidFill>
-                <a:effectLst>
-                  <a:outerShdw blurRad="38100" dist="25400" dir="5400000" algn="ctr" rotWithShape="0">
-                    <a:srgbClr val="6E747A">
-                      <a:alpha val="43000"/>
-                    </a:srgbClr>
-                  </a:outerShdw>
-                </a:effectLst>
-                <a:latin typeface="Segoe UI" panose="020B0502040204020203" pitchFamily="34" charset="0"/>
-                <a:cs typeface="Segoe UI" panose="020B0502040204020203" pitchFamily="34" charset="0"/>
-              </a:rPr>
-              <a:t>Riesgos</a:t>
+              <a:t>Siglo XIX – Riesgos</a:t>
             </a:r>
             <a:endParaRPr lang="es-AR" spc="0">
               <a:ln w="0"/>
@@ -9662,7 +9779,7 @@
     </p:spTree>
     <p:extLst>
       <p:ext uri="{BB962C8B-B14F-4D97-AF65-F5344CB8AC3E}">
-        <p14:creationId xmlns:p14="http://schemas.microsoft.com/office/powerpoint/2010/main" xmlns="" val="1679218424"/>
+        <p14:creationId xmlns="" xmlns:p14="http://schemas.microsoft.com/office/powerpoint/2010/main" val="1679218424"/>
       </p:ext>
     </p:extLst>
   </p:cSld>
@@ -9670,7 +9787,7 @@
     <a:masterClrMapping/>
   </p:clrMapOvr>
   <mc:AlternateContent xmlns:mc="http://schemas.openxmlformats.org/markup-compatibility/2006">
-    <mc:Choice xmlns:p14="http://schemas.microsoft.com/office/powerpoint/2010/main" xmlns="" Requires="p14">
+    <mc:Choice xmlns="" xmlns:p14="http://schemas.microsoft.com/office/powerpoint/2010/main" Requires="p14">
       <p:transition spd="med" p14:dur="700">
         <p:fade/>
       </p:transition>
@@ -9724,7 +9841,7 @@
           <a:lstStyle/>
           <a:p>
             <a:r>
-              <a:rPr lang="en-US" spc="0" dirty="0" err="1" smtClean="0">
+              <a:rPr lang="es-AR" spc="0" smtClean="0">
                 <a:ln w="0"/>
                 <a:solidFill>
                   <a:schemeClr val="accent1"/>
@@ -9742,7 +9859,7 @@
               <a:t>Siglo</a:t>
             </a:r>
             <a:r>
-              <a:rPr lang="en-US" spc="0" dirty="0" smtClean="0">
+              <a:rPr lang="es-AR" spc="0" smtClean="0">
                 <a:ln w="0"/>
                 <a:solidFill>
                   <a:schemeClr val="accent1"/>
@@ -9757,10 +9874,10 @@
                 <a:latin typeface="Segoe UI" panose="020B0502040204020203" pitchFamily="34" charset="0"/>
                 <a:cs typeface="Segoe UI" panose="020B0502040204020203" pitchFamily="34" charset="0"/>
               </a:rPr>
-              <a:t> XIX – </a:t>
-            </a:r>
-            <a:r>
-              <a:rPr lang="en-US" spc="0" dirty="0" err="1" smtClean="0">
+              <a:t> XIX – Casos </a:t>
+            </a:r>
+            <a:r>
+              <a:rPr lang="es-AR" spc="0" smtClean="0">
                 <a:ln w="0"/>
                 <a:solidFill>
                   <a:schemeClr val="accent1"/>
@@ -9775,45 +9892,9 @@
                 <a:latin typeface="Segoe UI" panose="020B0502040204020203" pitchFamily="34" charset="0"/>
                 <a:cs typeface="Segoe UI" panose="020B0502040204020203" pitchFamily="34" charset="0"/>
               </a:rPr>
-              <a:t>Casos</a:t>
-            </a:r>
-            <a:r>
-              <a:rPr lang="en-US" spc="0" dirty="0" smtClean="0">
-                <a:ln w="0"/>
-                <a:solidFill>
-                  <a:schemeClr val="accent1"/>
-                </a:solidFill>
-                <a:effectLst>
-                  <a:outerShdw blurRad="38100" dist="25400" dir="5400000" algn="ctr" rotWithShape="0">
-                    <a:srgbClr val="6E747A">
-                      <a:alpha val="43000"/>
-                    </a:srgbClr>
-                  </a:outerShdw>
-                </a:effectLst>
-                <a:latin typeface="Segoe UI" panose="020B0502040204020203" pitchFamily="34" charset="0"/>
-                <a:cs typeface="Segoe UI" panose="020B0502040204020203" pitchFamily="34" charset="0"/>
-              </a:rPr>
-              <a:t> </a:t>
-            </a:r>
-            <a:r>
-              <a:rPr lang="en-US" spc="0" dirty="0" err="1" smtClean="0">
-                <a:ln w="0"/>
-                <a:solidFill>
-                  <a:schemeClr val="accent1"/>
-                </a:solidFill>
-                <a:effectLst>
-                  <a:outerShdw blurRad="38100" dist="25400" dir="5400000" algn="ctr" rotWithShape="0">
-                    <a:srgbClr val="6E747A">
-                      <a:alpha val="43000"/>
-                    </a:srgbClr>
-                  </a:outerShdw>
-                </a:effectLst>
-                <a:latin typeface="Segoe UI" panose="020B0502040204020203" pitchFamily="34" charset="0"/>
-                <a:cs typeface="Segoe UI" panose="020B0502040204020203" pitchFamily="34" charset="0"/>
-              </a:rPr>
               <a:t>reales</a:t>
             </a:r>
-            <a:endParaRPr lang="es-AR" dirty="0"/>
+            <a:endParaRPr lang="es-AR"/>
           </a:p>
         </p:txBody>
       </p:sp>
@@ -9833,7 +9914,7 @@
           <a:lstStyle/>
           <a:p>
             <a:r>
-              <a:rPr lang="es-AR" dirty="0" smtClean="0">
+              <a:rPr lang="es-AR" smtClean="0">
                 <a:latin typeface="Segoe UI" pitchFamily="34" charset="0"/>
                 <a:ea typeface="Segoe UI" pitchFamily="34" charset="0"/>
                 <a:cs typeface="Segoe UI" pitchFamily="34" charset="0"/>
@@ -9844,7 +9925,7 @@
           <a:p>
             <a:pPr lvl="1"/>
             <a:r>
-              <a:rPr lang="es-AR" dirty="0" smtClean="0">
+              <a:rPr lang="es-AR" smtClean="0">
                 <a:latin typeface="Segoe UI" pitchFamily="34" charset="0"/>
                 <a:ea typeface="Segoe UI" pitchFamily="34" charset="0"/>
                 <a:cs typeface="Segoe UI" pitchFamily="34" charset="0"/>
@@ -9855,7 +9936,7 @@
           <a:p>
             <a:pPr lvl="1"/>
             <a:r>
-              <a:rPr lang="es-AR" dirty="0" smtClean="0">
+              <a:rPr lang="es-AR" smtClean="0">
                 <a:latin typeface="Segoe UI" pitchFamily="34" charset="0"/>
                 <a:ea typeface="Segoe UI" pitchFamily="34" charset="0"/>
                 <a:cs typeface="Segoe UI" pitchFamily="34" charset="0"/>
@@ -9865,7 +9946,7 @@
           </a:p>
           <a:p>
             <a:r>
-              <a:rPr lang="es-AR" dirty="0" smtClean="0">
+              <a:rPr lang="es-AR" smtClean="0">
                 <a:latin typeface="Segoe UI" pitchFamily="34" charset="0"/>
                 <a:ea typeface="Segoe UI" pitchFamily="34" charset="0"/>
                 <a:cs typeface="Segoe UI" pitchFamily="34" charset="0"/>
@@ -9875,7 +9956,7 @@
           </a:p>
           <a:p>
             <a:r>
-              <a:rPr lang="es-AR" dirty="0" smtClean="0">
+              <a:rPr lang="es-AR" smtClean="0">
                 <a:latin typeface="Segoe UI" pitchFamily="34" charset="0"/>
                 <a:ea typeface="Segoe UI" pitchFamily="34" charset="0"/>
                 <a:cs typeface="Segoe UI" pitchFamily="34" charset="0"/>
@@ -9885,7 +9966,7 @@
           </a:p>
           <a:p>
             <a:r>
-              <a:rPr lang="es-AR" dirty="0" smtClean="0">
+              <a:rPr lang="es-AR" smtClean="0">
                 <a:latin typeface="Segoe UI" pitchFamily="34" charset="0"/>
                 <a:ea typeface="Segoe UI" pitchFamily="34" charset="0"/>
                 <a:cs typeface="Segoe UI" pitchFamily="34" charset="0"/>
@@ -9895,7 +9976,7 @@
           </a:p>
           <a:p>
             <a:r>
-              <a:rPr lang="es-AR" dirty="0" smtClean="0">
+              <a:rPr lang="es-AR" smtClean="0">
                 <a:latin typeface="Segoe UI" pitchFamily="34" charset="0"/>
                 <a:ea typeface="Segoe UI" pitchFamily="34" charset="0"/>
                 <a:cs typeface="Segoe UI" pitchFamily="34" charset="0"/>
@@ -9904,7 +9985,7 @@
             </a:r>
           </a:p>
           <a:p>
-            <a:endParaRPr lang="es-AR" dirty="0"/>
+            <a:endParaRPr lang="es-AR"/>
           </a:p>
         </p:txBody>
       </p:sp>
@@ -9914,7 +9995,7 @@
     <a:masterClrMapping/>
   </p:clrMapOvr>
   <mc:AlternateContent xmlns:mc="http://schemas.openxmlformats.org/markup-compatibility/2006">
-    <mc:Choice xmlns:p14="http://schemas.microsoft.com/office/powerpoint/2010/main" xmlns="" Requires="p14">
+    <mc:Choice xmlns="" xmlns:p14="http://schemas.microsoft.com/office/powerpoint/2010/main" Requires="p14">
       <p:transition spd="med" p14:dur="700">
         <p:fade/>
       </p:transition>
@@ -10144,7 +10225,7 @@
     <a:masterClrMapping/>
   </p:clrMapOvr>
   <mc:AlternateContent xmlns:mc="http://schemas.openxmlformats.org/markup-compatibility/2006">
-    <mc:Choice xmlns:p14="http://schemas.microsoft.com/office/powerpoint/2010/main" xmlns="" Requires="p14">
+    <mc:Choice xmlns="" xmlns:p14="http://schemas.microsoft.com/office/powerpoint/2010/main" Requires="p14">
       <p:transition spd="med" p14:dur="700">
         <p:fade/>
       </p:transition>
@@ -10198,11 +10279,40 @@
           <a:lstStyle/>
           <a:p>
             <a:r>
+              <a:rPr lang="es-AR" b="1" i="1" dirty="0" smtClean="0">
+                <a:latin typeface="Segoe UI" panose="020B0502040204020203" pitchFamily="34" charset="0"/>
+                <a:cs typeface="Segoe UI" panose="020B0502040204020203" pitchFamily="34" charset="0"/>
+              </a:rPr>
+              <a:t>Siglo XXI</a:t>
+            </a:r>
+            <a:endParaRPr lang="es-AR" b="1" i="1" dirty="0">
+              <a:latin typeface="Segoe UI" panose="020B0502040204020203" pitchFamily="34" charset="0"/>
+              <a:cs typeface="Segoe UI" panose="020B0502040204020203" pitchFamily="34" charset="0"/>
+            </a:endParaRPr>
+          </a:p>
+        </p:txBody>
+      </p:sp>
+      <p:sp>
+        <p:nvSpPr>
+          <p:cNvPr id="3" name="Text Placeholder 2"/>
+          <p:cNvSpPr>
+            <a:spLocks noGrp="1"/>
+          </p:cNvSpPr>
+          <p:nvPr>
+            <p:ph type="body" idx="1"/>
+          </p:nvPr>
+        </p:nvSpPr>
+        <p:spPr/>
+        <p:txBody>
+          <a:bodyPr/>
+          <a:lstStyle/>
+          <a:p>
+            <a:r>
               <a:rPr lang="es-AR" dirty="0" smtClean="0">
                 <a:latin typeface="Segoe UI" panose="020B0502040204020203" pitchFamily="34" charset="0"/>
                 <a:cs typeface="Segoe UI" panose="020B0502040204020203" pitchFamily="34" charset="0"/>
               </a:rPr>
-              <a:t>Siglo XXI</a:t>
+              <a:t>La información como activo primordial</a:t>
             </a:r>
             <a:endParaRPr lang="es-AR" dirty="0">
               <a:latin typeface="Segoe UI" panose="020B0502040204020203" pitchFamily="34" charset="0"/>
@@ -10211,39 +10321,10 @@
           </a:p>
         </p:txBody>
       </p:sp>
-      <p:sp>
-        <p:nvSpPr>
-          <p:cNvPr id="3" name="Text Placeholder 2"/>
-          <p:cNvSpPr>
-            <a:spLocks noGrp="1"/>
-          </p:cNvSpPr>
-          <p:nvPr>
-            <p:ph type="body" idx="1"/>
-          </p:nvPr>
-        </p:nvSpPr>
-        <p:spPr/>
-        <p:txBody>
-          <a:bodyPr/>
-          <a:lstStyle/>
-          <a:p>
-            <a:r>
-              <a:rPr lang="es-AR" dirty="0" smtClean="0">
-                <a:latin typeface="Segoe UI" panose="020B0502040204020203" pitchFamily="34" charset="0"/>
-                <a:cs typeface="Segoe UI" panose="020B0502040204020203" pitchFamily="34" charset="0"/>
-              </a:rPr>
-              <a:t>La información como activo primordial</a:t>
-            </a:r>
-            <a:endParaRPr lang="es-AR" dirty="0">
-              <a:latin typeface="Segoe UI" panose="020B0502040204020203" pitchFamily="34" charset="0"/>
-              <a:cs typeface="Segoe UI" panose="020B0502040204020203" pitchFamily="34" charset="0"/>
-            </a:endParaRPr>
-          </a:p>
-        </p:txBody>
-      </p:sp>
     </p:spTree>
     <p:extLst>
       <p:ext uri="{BB962C8B-B14F-4D97-AF65-F5344CB8AC3E}">
-        <p14:creationId xmlns:p14="http://schemas.microsoft.com/office/powerpoint/2010/main" xmlns="" val="3439397754"/>
+        <p14:creationId xmlns="" xmlns:p14="http://schemas.microsoft.com/office/powerpoint/2010/main" val="3439397754"/>
       </p:ext>
     </p:extLst>
   </p:cSld>
@@ -10251,7 +10332,7 @@
     <a:masterClrMapping/>
   </p:clrMapOvr>
   <mc:AlternateContent xmlns:mc="http://schemas.openxmlformats.org/markup-compatibility/2006">
-    <mc:Choice xmlns:p14="http://schemas.microsoft.com/office/powerpoint/2010/main" xmlns="" Requires="p14">
+    <mc:Choice xmlns="" xmlns:p14="http://schemas.microsoft.com/office/powerpoint/2010/main" Requires="p14">
       <p:transition spd="med" p14:dur="700">
         <p:fade/>
       </p:transition>
@@ -10425,7 +10506,7 @@
     </p:spTree>
     <p:extLst>
       <p:ext uri="{BB962C8B-B14F-4D97-AF65-F5344CB8AC3E}">
-        <p14:creationId xmlns:p14="http://schemas.microsoft.com/office/powerpoint/2010/main" xmlns="" val="2675216716"/>
+        <p14:creationId xmlns="" xmlns:p14="http://schemas.microsoft.com/office/powerpoint/2010/main" val="2675216716"/>
       </p:ext>
     </p:extLst>
   </p:cSld>
@@ -10433,7 +10514,7 @@
     <a:masterClrMapping/>
   </p:clrMapOvr>
   <mc:AlternateContent xmlns:mc="http://schemas.openxmlformats.org/markup-compatibility/2006">
-    <mc:Choice xmlns:p14="http://schemas.microsoft.com/office/powerpoint/2010/main" xmlns="" Requires="p14">
+    <mc:Choice xmlns="" xmlns:p14="http://schemas.microsoft.com/office/powerpoint/2010/main" Requires="p14">
       <p:transition spd="med" p14:dur="700">
         <p:fade/>
       </p:transition>
@@ -10936,7 +11017,7 @@
           <a:blip r:embed="rId3" cstate="print">
             <a:extLst>
               <a:ext uri="{28A0092B-C50C-407E-A947-70E740481C1C}">
-                <a14:useLocalDpi xmlns:a14="http://schemas.microsoft.com/office/drawing/2010/main" xmlns="" val="0"/>
+                <a14:useLocalDpi xmlns="" xmlns:a14="http://schemas.microsoft.com/office/drawing/2010/main" val="0"/>
               </a:ext>
             </a:extLst>
           </a:blip>
@@ -10956,7 +11037,7 @@
           <a:noFill/>
           <a:extLst>
             <a:ext uri="{909E8E84-426E-40DD-AFC4-6F175D3DCCD1}">
-              <a14:hiddenFill xmlns:a14="http://schemas.microsoft.com/office/drawing/2010/main" xmlns="">
+              <a14:hiddenFill xmlns="" xmlns:a14="http://schemas.microsoft.com/office/drawing/2010/main">
                 <a:solidFill>
                   <a:srgbClr val="FFFFFF"/>
                 </a:solidFill>
@@ -10977,7 +11058,7 @@
           <a:blip r:embed="rId4" cstate="print">
             <a:extLst>
               <a:ext uri="{28A0092B-C50C-407E-A947-70E740481C1C}">
-                <a14:useLocalDpi xmlns:a14="http://schemas.microsoft.com/office/drawing/2010/main" xmlns="" val="0"/>
+                <a14:useLocalDpi xmlns="" xmlns:a14="http://schemas.microsoft.com/office/drawing/2010/main" val="0"/>
               </a:ext>
             </a:extLst>
           </a:blip>
@@ -10997,7 +11078,7 @@
           <a:noFill/>
           <a:extLst>
             <a:ext uri="{909E8E84-426E-40DD-AFC4-6F175D3DCCD1}">
-              <a14:hiddenFill xmlns:a14="http://schemas.microsoft.com/office/drawing/2010/main" xmlns="">
+              <a14:hiddenFill xmlns="" xmlns:a14="http://schemas.microsoft.com/office/drawing/2010/main">
                 <a:solidFill>
                   <a:srgbClr val="FFFFFF"/>
                 </a:solidFill>
@@ -11018,7 +11099,7 @@
           <a:blip r:embed="rId5" cstate="print">
             <a:extLst>
               <a:ext uri="{28A0092B-C50C-407E-A947-70E740481C1C}">
-                <a14:useLocalDpi xmlns:a14="http://schemas.microsoft.com/office/drawing/2010/main" xmlns="" val="0"/>
+                <a14:useLocalDpi xmlns="" xmlns:a14="http://schemas.microsoft.com/office/drawing/2010/main" val="0"/>
               </a:ext>
             </a:extLst>
           </a:blip>
@@ -11038,7 +11119,7 @@
           <a:noFill/>
           <a:extLst>
             <a:ext uri="{909E8E84-426E-40DD-AFC4-6F175D3DCCD1}">
-              <a14:hiddenFill xmlns:a14="http://schemas.microsoft.com/office/drawing/2010/main" xmlns="">
+              <a14:hiddenFill xmlns="" xmlns:a14="http://schemas.microsoft.com/office/drawing/2010/main">
                 <a:solidFill>
                   <a:srgbClr val="FFFFFF"/>
                 </a:solidFill>
@@ -11059,7 +11140,7 @@
           <a:blip r:embed="rId6" cstate="print">
             <a:extLst>
               <a:ext uri="{28A0092B-C50C-407E-A947-70E740481C1C}">
-                <a14:useLocalDpi xmlns:a14="http://schemas.microsoft.com/office/drawing/2010/main" xmlns="" val="0"/>
+                <a14:useLocalDpi xmlns="" xmlns:a14="http://schemas.microsoft.com/office/drawing/2010/main" val="0"/>
               </a:ext>
             </a:extLst>
           </a:blip>
@@ -11079,7 +11160,7 @@
           <a:noFill/>
           <a:extLst>
             <a:ext uri="{909E8E84-426E-40DD-AFC4-6F175D3DCCD1}">
-              <a14:hiddenFill xmlns:a14="http://schemas.microsoft.com/office/drawing/2010/main" xmlns="">
+              <a14:hiddenFill xmlns="" xmlns:a14="http://schemas.microsoft.com/office/drawing/2010/main">
                 <a:solidFill>
                   <a:srgbClr val="FFFFFF"/>
                 </a:solidFill>
@@ -11091,7 +11172,7 @@
     </p:spTree>
     <p:extLst>
       <p:ext uri="{BB962C8B-B14F-4D97-AF65-F5344CB8AC3E}">
-        <p14:creationId xmlns:p14="http://schemas.microsoft.com/office/powerpoint/2010/main" xmlns="" val="2564182459"/>
+        <p14:creationId xmlns="" xmlns:p14="http://schemas.microsoft.com/office/powerpoint/2010/main" val="2564182459"/>
       </p:ext>
     </p:extLst>
   </p:cSld>
@@ -11099,7 +11180,7 @@
     <a:masterClrMapping/>
   </p:clrMapOvr>
   <mc:AlternateContent xmlns:mc="http://schemas.openxmlformats.org/markup-compatibility/2006">
-    <mc:Choice xmlns:p14="http://schemas.microsoft.com/office/powerpoint/2010/main" xmlns="" Requires="p14">
+    <mc:Choice xmlns="" xmlns:p14="http://schemas.microsoft.com/office/powerpoint/2010/main" Requires="p14">
       <p:transition spd="med" p14:dur="700">
         <p:fade/>
       </p:transition>
@@ -11362,7 +11443,7 @@
           <a:blip r:embed="rId3" cstate="print">
             <a:extLst>
               <a:ext uri="{28A0092B-C50C-407E-A947-70E740481C1C}">
-                <a14:useLocalDpi xmlns:a14="http://schemas.microsoft.com/office/drawing/2010/main" xmlns="" val="0"/>
+                <a14:useLocalDpi xmlns="" xmlns:a14="http://schemas.microsoft.com/office/drawing/2010/main" val="0"/>
               </a:ext>
             </a:extLst>
           </a:blip>
@@ -11382,7 +11463,7 @@
           <a:noFill/>
           <a:extLst>
             <a:ext uri="{909E8E84-426E-40DD-AFC4-6F175D3DCCD1}">
-              <a14:hiddenFill xmlns:a14="http://schemas.microsoft.com/office/drawing/2010/main" xmlns="">
+              <a14:hiddenFill xmlns="" xmlns:a14="http://schemas.microsoft.com/office/drawing/2010/main">
                 <a:solidFill>
                   <a:srgbClr val="FFFFFF"/>
                 </a:solidFill>
@@ -11394,7 +11475,7 @@
     </p:spTree>
     <p:extLst>
       <p:ext uri="{BB962C8B-B14F-4D97-AF65-F5344CB8AC3E}">
-        <p14:creationId xmlns:p14="http://schemas.microsoft.com/office/powerpoint/2010/main" xmlns="" val="3356351472"/>
+        <p14:creationId xmlns="" xmlns:p14="http://schemas.microsoft.com/office/powerpoint/2010/main" val="3356351472"/>
       </p:ext>
     </p:extLst>
   </p:cSld>
@@ -11402,7 +11483,7 @@
     <a:masterClrMapping/>
   </p:clrMapOvr>
   <mc:AlternateContent xmlns:mc="http://schemas.openxmlformats.org/markup-compatibility/2006">
-    <mc:Choice xmlns:p14="http://schemas.microsoft.com/office/powerpoint/2010/main" xmlns="" Requires="p14">
+    <mc:Choice xmlns="" xmlns:p14="http://schemas.microsoft.com/office/powerpoint/2010/main" Requires="p14">
       <p:transition spd="med" p14:dur="700">
         <p:fade/>
       </p:transition>
@@ -11635,7 +11716,7 @@
           <a:blip r:embed="rId3" cstate="print">
             <a:extLst>
               <a:ext uri="{28A0092B-C50C-407E-A947-70E740481C1C}">
-                <a14:useLocalDpi xmlns:a14="http://schemas.microsoft.com/office/drawing/2010/main" xmlns="" val="0"/>
+                <a14:useLocalDpi xmlns="" xmlns:a14="http://schemas.microsoft.com/office/drawing/2010/main" val="0"/>
               </a:ext>
             </a:extLst>
           </a:blip>
@@ -11655,7 +11736,7 @@
           <a:noFill/>
           <a:extLst>
             <a:ext uri="{909E8E84-426E-40DD-AFC4-6F175D3DCCD1}">
-              <a14:hiddenFill xmlns:a14="http://schemas.microsoft.com/office/drawing/2010/main" xmlns="">
+              <a14:hiddenFill xmlns="" xmlns:a14="http://schemas.microsoft.com/office/drawing/2010/main">
                 <a:solidFill>
                   <a:srgbClr val="FFFFFF"/>
                 </a:solidFill>
@@ -11667,7 +11748,7 @@
     </p:spTree>
     <p:extLst>
       <p:ext uri="{BB962C8B-B14F-4D97-AF65-F5344CB8AC3E}">
-        <p14:creationId xmlns:p14="http://schemas.microsoft.com/office/powerpoint/2010/main" xmlns="" val="3374507202"/>
+        <p14:creationId xmlns="" xmlns:p14="http://schemas.microsoft.com/office/powerpoint/2010/main" val="3374507202"/>
       </p:ext>
     </p:extLst>
   </p:cSld>
@@ -11675,7 +11756,7 @@
     <a:masterClrMapping/>
   </p:clrMapOvr>
   <mc:AlternateContent xmlns:mc="http://schemas.openxmlformats.org/markup-compatibility/2006">
-    <mc:Choice xmlns:p14="http://schemas.microsoft.com/office/powerpoint/2010/main" xmlns="" Requires="p14">
+    <mc:Choice xmlns="" xmlns:p14="http://schemas.microsoft.com/office/powerpoint/2010/main" Requires="p14">
       <p:transition spd="med" p14:dur="700">
         <p:fade/>
       </p:transition>
@@ -11729,7 +11810,7 @@
           <a:lstStyle/>
           <a:p>
             <a:r>
-              <a:rPr lang="es-AR" spc="0" smtClean="0">
+              <a:rPr lang="es-AR" spc="0" dirty="0" smtClean="0">
                 <a:ln w="0"/>
                 <a:solidFill>
                   <a:schemeClr val="accent1"/>
@@ -11746,7 +11827,7 @@
               </a:rPr>
               <a:t>Introducción</a:t>
             </a:r>
-            <a:endParaRPr lang="es-AR" spc="0">
+            <a:endParaRPr lang="es-AR" spc="0" dirty="0">
               <a:ln w="0"/>
               <a:solidFill>
                 <a:schemeClr val="accent1"/>
@@ -11774,13 +11855,18 @@
             <p:ph idx="1"/>
           </p:nvPr>
         </p:nvSpPr>
-        <p:spPr/>
+        <p:spPr>
+          <a:xfrm>
+            <a:off x="1522413" y="2348880"/>
+            <a:ext cx="9134391" cy="3670920"/>
+          </a:xfrm>
+        </p:spPr>
         <p:txBody>
           <a:bodyPr/>
           <a:lstStyle/>
           <a:p>
             <a:r>
-              <a:rPr lang="es-AR" smtClean="0">
+              <a:rPr lang="es-AR" dirty="0" smtClean="0">
                 <a:latin typeface="Segoe UI" panose="020B0502040204020203" pitchFamily="34" charset="0"/>
                 <a:cs typeface="Segoe UI" panose="020B0502040204020203" pitchFamily="34" charset="0"/>
               </a:rPr>
@@ -11789,7 +11875,7 @@
           </a:p>
           <a:p>
             <a:r>
-              <a:rPr lang="es-AR" smtClean="0">
+              <a:rPr lang="es-AR" dirty="0" smtClean="0">
                 <a:latin typeface="Segoe UI" panose="020B0502040204020203" pitchFamily="34" charset="0"/>
                 <a:cs typeface="Segoe UI" panose="020B0502040204020203" pitchFamily="34" charset="0"/>
               </a:rPr>
@@ -11798,7 +11884,7 @@
           </a:p>
           <a:p>
             <a:r>
-              <a:rPr lang="es-AR">
+              <a:rPr lang="es-AR" dirty="0">
                 <a:latin typeface="Segoe UI" panose="020B0502040204020203" pitchFamily="34" charset="0"/>
                 <a:cs typeface="Segoe UI" panose="020B0502040204020203" pitchFamily="34" charset="0"/>
               </a:rPr>
@@ -11807,7 +11893,7 @@
           </a:p>
           <a:p>
             <a:r>
-              <a:rPr lang="es-AR" smtClean="0">
+              <a:rPr lang="es-AR" dirty="0" smtClean="0">
                 <a:latin typeface="Segoe UI" panose="020B0502040204020203" pitchFamily="34" charset="0"/>
                 <a:cs typeface="Segoe UI" panose="020B0502040204020203" pitchFamily="34" charset="0"/>
               </a:rPr>
@@ -11816,27 +11902,13 @@
           </a:p>
           <a:p>
             <a:r>
-              <a:rPr lang="es-AR" smtClean="0">
-                <a:latin typeface="Segoe UI" panose="020B0502040204020203" pitchFamily="34" charset="0"/>
-                <a:cs typeface="Segoe UI" panose="020B0502040204020203" pitchFamily="34" charset="0"/>
-              </a:rPr>
-              <a:t>Tipos </a:t>
-            </a:r>
-            <a:r>
-              <a:rPr lang="es-AR" smtClean="0">
-                <a:latin typeface="Segoe UI" panose="020B0502040204020203" pitchFamily="34" charset="0"/>
-                <a:cs typeface="Segoe UI" panose="020B0502040204020203" pitchFamily="34" charset="0"/>
-              </a:rPr>
-              <a:t>de </a:t>
-            </a:r>
-            <a:r>
-              <a:rPr lang="es-AR" smtClean="0">
-                <a:latin typeface="Segoe UI" panose="020B0502040204020203" pitchFamily="34" charset="0"/>
-                <a:cs typeface="Segoe UI" panose="020B0502040204020203" pitchFamily="34" charset="0"/>
-              </a:rPr>
-              <a:t>controles</a:t>
-            </a:r>
-            <a:endParaRPr lang="es-AR">
+              <a:rPr lang="es-AR" dirty="0" smtClean="0">
+                <a:latin typeface="Segoe UI" panose="020B0502040204020203" pitchFamily="34" charset="0"/>
+                <a:cs typeface="Segoe UI" panose="020B0502040204020203" pitchFamily="34" charset="0"/>
+              </a:rPr>
+              <a:t>Tipos de controles</a:t>
+            </a:r>
+            <a:endParaRPr lang="es-AR" dirty="0">
               <a:latin typeface="Segoe UI" panose="020B0502040204020203" pitchFamily="34" charset="0"/>
               <a:cs typeface="Segoe UI" panose="020B0502040204020203" pitchFamily="34" charset="0"/>
             </a:endParaRPr>
@@ -11846,7 +11918,7 @@
     </p:spTree>
     <p:extLst>
       <p:ext uri="{BB962C8B-B14F-4D97-AF65-F5344CB8AC3E}">
-        <p14:creationId xmlns:p14="http://schemas.microsoft.com/office/powerpoint/2010/main" xmlns="" val="3106206852"/>
+        <p14:creationId xmlns="" xmlns:p14="http://schemas.microsoft.com/office/powerpoint/2010/main" val="3106206852"/>
       </p:ext>
     </p:extLst>
   </p:cSld>
@@ -11854,7 +11926,7 @@
     <a:masterClrMapping/>
   </p:clrMapOvr>
   <mc:AlternateContent xmlns:mc="http://schemas.openxmlformats.org/markup-compatibility/2006">
-    <mc:Choice xmlns:p14="http://schemas.microsoft.com/office/powerpoint/2010/main" xmlns="" Requires="p14">
+    <mc:Choice xmlns="" xmlns:p14="http://schemas.microsoft.com/office/powerpoint/2010/main" Requires="p14">
       <p:transition spd="med" p14:dur="700">
         <p:fade/>
       </p:transition>
@@ -12039,7 +12111,7 @@
     </p:spTree>
     <p:extLst>
       <p:ext uri="{BB962C8B-B14F-4D97-AF65-F5344CB8AC3E}">
-        <p14:creationId xmlns:p14="http://schemas.microsoft.com/office/powerpoint/2010/main" xmlns="" val="2283345473"/>
+        <p14:creationId xmlns="" xmlns:p14="http://schemas.microsoft.com/office/powerpoint/2010/main" val="2283345473"/>
       </p:ext>
     </p:extLst>
   </p:cSld>
@@ -12047,7 +12119,7 @@
     <a:masterClrMapping/>
   </p:clrMapOvr>
   <mc:AlternateContent xmlns:mc="http://schemas.openxmlformats.org/markup-compatibility/2006">
-    <mc:Choice xmlns:p14="http://schemas.microsoft.com/office/powerpoint/2010/main" xmlns="" Requires="p14">
+    <mc:Choice xmlns="" xmlns:p14="http://schemas.microsoft.com/office/powerpoint/2010/main" Requires="p14">
       <p:transition spd="med" p14:dur="700">
         <p:fade/>
       </p:transition>
@@ -12236,7 +12308,7 @@
     </p:spTree>
     <p:extLst>
       <p:ext uri="{BB962C8B-B14F-4D97-AF65-F5344CB8AC3E}">
-        <p14:creationId xmlns:p14="http://schemas.microsoft.com/office/powerpoint/2010/main" xmlns="" val="2283345473"/>
+        <p14:creationId xmlns="" xmlns:p14="http://schemas.microsoft.com/office/powerpoint/2010/main" val="2283345473"/>
       </p:ext>
     </p:extLst>
   </p:cSld>
@@ -12244,7 +12316,7 @@
     <a:masterClrMapping/>
   </p:clrMapOvr>
   <mc:AlternateContent xmlns:mc="http://schemas.openxmlformats.org/markup-compatibility/2006">
-    <mc:Choice xmlns:p14="http://schemas.microsoft.com/office/powerpoint/2010/main" xmlns="" Requires="p14">
+    <mc:Choice xmlns="" xmlns:p14="http://schemas.microsoft.com/office/powerpoint/2010/main" Requires="p14">
       <p:transition spd="med" p14:dur="700">
         <p:fade/>
       </p:transition>
@@ -12383,7 +12455,7 @@
     </p:spTree>
     <p:extLst>
       <p:ext uri="{BB962C8B-B14F-4D97-AF65-F5344CB8AC3E}">
-        <p14:creationId xmlns:p14="http://schemas.microsoft.com/office/powerpoint/2010/main" xmlns="" val="659291744"/>
+        <p14:creationId xmlns="" xmlns:p14="http://schemas.microsoft.com/office/powerpoint/2010/main" val="659291744"/>
       </p:ext>
     </p:extLst>
   </p:cSld>
@@ -12391,7 +12463,7 @@
     <a:masterClrMapping/>
   </p:clrMapOvr>
   <mc:AlternateContent xmlns:mc="http://schemas.openxmlformats.org/markup-compatibility/2006">
-    <mc:Choice xmlns:p14="http://schemas.microsoft.com/office/powerpoint/2010/main" xmlns="" Requires="p14">
+    <mc:Choice xmlns="" xmlns:p14="http://schemas.microsoft.com/office/powerpoint/2010/main" Requires="p14">
       <p:transition spd="med" p14:dur="700">
         <p:fade/>
       </p:transition>
@@ -12628,7 +12700,7 @@
     </p:spTree>
     <p:extLst>
       <p:ext uri="{BB962C8B-B14F-4D97-AF65-F5344CB8AC3E}">
-        <p14:creationId xmlns:p14="http://schemas.microsoft.com/office/powerpoint/2010/main" xmlns="" val="659291744"/>
+        <p14:creationId xmlns="" xmlns:p14="http://schemas.microsoft.com/office/powerpoint/2010/main" val="659291744"/>
       </p:ext>
     </p:extLst>
   </p:cSld>
@@ -12636,7 +12708,7 @@
     <a:masterClrMapping/>
   </p:clrMapOvr>
   <mc:AlternateContent xmlns:mc="http://schemas.openxmlformats.org/markup-compatibility/2006">
-    <mc:Choice xmlns:p14="http://schemas.microsoft.com/office/powerpoint/2010/main" xmlns="" Requires="p14">
+    <mc:Choice xmlns="" xmlns:p14="http://schemas.microsoft.com/office/powerpoint/2010/main" Requires="p14">
       <p:transition spd="med" p14:dur="700">
         <p:fade/>
       </p:transition>
@@ -12795,7 +12867,7 @@
     </p:spTree>
     <p:extLst>
       <p:ext uri="{BB962C8B-B14F-4D97-AF65-F5344CB8AC3E}">
-        <p14:creationId xmlns:p14="http://schemas.microsoft.com/office/powerpoint/2010/main" xmlns="" val="659291744"/>
+        <p14:creationId xmlns="" xmlns:p14="http://schemas.microsoft.com/office/powerpoint/2010/main" val="659291744"/>
       </p:ext>
     </p:extLst>
   </p:cSld>
@@ -12803,7 +12875,7 @@
     <a:masterClrMapping/>
   </p:clrMapOvr>
   <mc:AlternateContent xmlns:mc="http://schemas.openxmlformats.org/markup-compatibility/2006">
-    <mc:Choice xmlns:p14="http://schemas.microsoft.com/office/powerpoint/2010/main" xmlns="" Requires="p14">
+    <mc:Choice xmlns="" xmlns:p14="http://schemas.microsoft.com/office/powerpoint/2010/main" Requires="p14">
       <p:transition spd="med" p14:dur="700">
         <p:fade/>
       </p:transition>
@@ -12989,7 +13061,7 @@
     </p:spTree>
     <p:extLst>
       <p:ext uri="{BB962C8B-B14F-4D97-AF65-F5344CB8AC3E}">
-        <p14:creationId xmlns:p14="http://schemas.microsoft.com/office/powerpoint/2010/main" xmlns="" val="659291744"/>
+        <p14:creationId xmlns="" xmlns:p14="http://schemas.microsoft.com/office/powerpoint/2010/main" val="659291744"/>
       </p:ext>
     </p:extLst>
   </p:cSld>
@@ -12997,7 +13069,7 @@
     <a:masterClrMapping/>
   </p:clrMapOvr>
   <mc:AlternateContent xmlns:mc="http://schemas.openxmlformats.org/markup-compatibility/2006">
-    <mc:Choice xmlns:p14="http://schemas.microsoft.com/office/powerpoint/2010/main" xmlns="" Requires="p14">
+    <mc:Choice xmlns="" xmlns:p14="http://schemas.microsoft.com/office/powerpoint/2010/main" Requires="p14">
       <p:transition spd="med" p14:dur="700">
         <p:fade/>
       </p:transition>
@@ -13067,7 +13139,7 @@
     </p:spTree>
     <p:extLst>
       <p:ext uri="{BB962C8B-B14F-4D97-AF65-F5344CB8AC3E}">
-        <p14:creationId xmlns:p14="http://schemas.microsoft.com/office/powerpoint/2010/main" xmlns="" val="1539601608"/>
+        <p14:creationId xmlns="" xmlns:p14="http://schemas.microsoft.com/office/powerpoint/2010/main" val="1539601608"/>
       </p:ext>
     </p:extLst>
   </p:cSld>
@@ -13075,7 +13147,7 @@
     <a:masterClrMapping/>
   </p:clrMapOvr>
   <mc:AlternateContent xmlns:mc="http://schemas.openxmlformats.org/markup-compatibility/2006">
-    <mc:Choice xmlns:p14="http://schemas.microsoft.com/office/powerpoint/2010/main" xmlns="" Requires="p14">
+    <mc:Choice xmlns="" xmlns:p14="http://schemas.microsoft.com/office/powerpoint/2010/main" Requires="p14">
       <p:transition spd="med" p14:dur="700">
         <p:fade/>
       </p:transition>
@@ -13136,6 +13208,9 @@
                   </a:solidFill>
                   <a:prstDash val="solid"/>
                 </a:ln>
+                <a:solidFill>
+                  <a:schemeClr val="accent1"/>
+                </a:solidFill>
                 <a:effectLst>
                   <a:outerShdw blurRad="12700" dist="38100" dir="2700000" algn="tl" rotWithShape="0">
                     <a:schemeClr val="bg1">
@@ -13155,6 +13230,9 @@
                 </a:solidFill>
                 <a:prstDash val="solid"/>
               </a:ln>
+              <a:solidFill>
+                <a:schemeClr val="accent1"/>
+              </a:solidFill>
               <a:effectLst>
                 <a:outerShdw blurRad="12700" dist="38100" dir="2700000" algn="tl" rotWithShape="0">
                   <a:schemeClr val="bg1">
@@ -13234,7 +13312,7 @@
     </p:spTree>
     <p:extLst>
       <p:ext uri="{BB962C8B-B14F-4D97-AF65-F5344CB8AC3E}">
-        <p14:creationId xmlns:p14="http://schemas.microsoft.com/office/powerpoint/2010/main" xmlns="" val="3280227416"/>
+        <p14:creationId xmlns="" xmlns:p14="http://schemas.microsoft.com/office/powerpoint/2010/main" val="3280227416"/>
       </p:ext>
     </p:extLst>
   </p:cSld>
@@ -13242,7 +13320,7 @@
     <a:masterClrMapping/>
   </p:clrMapOvr>
   <mc:AlternateContent xmlns:mc="http://schemas.openxmlformats.org/markup-compatibility/2006">
-    <mc:Choice xmlns:p14="http://schemas.microsoft.com/office/powerpoint/2010/main" xmlns="" Requires="p14">
+    <mc:Choice xmlns="" xmlns:p14="http://schemas.microsoft.com/office/powerpoint/2010/main" Requires="p14">
       <p:transition spd="med" p14:dur="700">
         <p:fade/>
       </p:transition>
@@ -13303,6 +13381,9 @@
                   </a:solidFill>
                   <a:prstDash val="solid"/>
                 </a:ln>
+                <a:solidFill>
+                  <a:schemeClr val="accent1"/>
+                </a:solidFill>
                 <a:effectLst>
                   <a:outerShdw blurRad="12700" dist="38100" dir="2700000" algn="tl" rotWithShape="0">
                     <a:schemeClr val="bg1">
@@ -13322,6 +13403,9 @@
                 </a:solidFill>
                 <a:prstDash val="solid"/>
               </a:ln>
+              <a:solidFill>
+                <a:schemeClr val="accent1"/>
+              </a:solidFill>
               <a:effectLst>
                 <a:outerShdw blurRad="12700" dist="38100" dir="2700000" algn="tl" rotWithShape="0">
                   <a:schemeClr val="bg1">
@@ -13475,7 +13559,7 @@
     </p:spTree>
     <p:extLst>
       <p:ext uri="{BB962C8B-B14F-4D97-AF65-F5344CB8AC3E}">
-        <p14:creationId xmlns:p14="http://schemas.microsoft.com/office/powerpoint/2010/main" xmlns="" val="3816537714"/>
+        <p14:creationId xmlns="" xmlns:p14="http://schemas.microsoft.com/office/powerpoint/2010/main" val="3816537714"/>
       </p:ext>
     </p:extLst>
   </p:cSld>
@@ -13483,7 +13567,7 @@
     <a:masterClrMapping/>
   </p:clrMapOvr>
   <mc:AlternateContent xmlns:mc="http://schemas.openxmlformats.org/markup-compatibility/2006">
-    <mc:Choice xmlns:p14="http://schemas.microsoft.com/office/powerpoint/2010/main" xmlns="" Requires="p14">
+    <mc:Choice xmlns="" xmlns:p14="http://schemas.microsoft.com/office/powerpoint/2010/main" Requires="p14">
       <p:transition spd="med" p14:dur="700">
         <p:fade/>
       </p:transition>
@@ -13544,6 +13628,9 @@
                   </a:solidFill>
                   <a:prstDash val="solid"/>
                 </a:ln>
+                <a:solidFill>
+                  <a:schemeClr val="accent1"/>
+                </a:solidFill>
                 <a:effectLst>
                   <a:outerShdw blurRad="12700" dist="38100" dir="2700000" algn="tl" rotWithShape="0">
                     <a:schemeClr val="bg1">
@@ -13563,6 +13650,9 @@
                 </a:solidFill>
                 <a:prstDash val="solid"/>
               </a:ln>
+              <a:solidFill>
+                <a:schemeClr val="accent1"/>
+              </a:solidFill>
               <a:effectLst>
                 <a:outerShdw blurRad="12700" dist="38100" dir="2700000" algn="tl" rotWithShape="0">
                   <a:schemeClr val="bg1">
@@ -13674,7 +13764,7 @@
     </p:spTree>
     <p:extLst>
       <p:ext uri="{BB962C8B-B14F-4D97-AF65-F5344CB8AC3E}">
-        <p14:creationId xmlns:p14="http://schemas.microsoft.com/office/powerpoint/2010/main" xmlns="" val="2896967631"/>
+        <p14:creationId xmlns="" xmlns:p14="http://schemas.microsoft.com/office/powerpoint/2010/main" val="2896967631"/>
       </p:ext>
     </p:extLst>
   </p:cSld>
@@ -13682,7 +13772,7 @@
     <a:masterClrMapping/>
   </p:clrMapOvr>
   <mc:AlternateContent xmlns:mc="http://schemas.openxmlformats.org/markup-compatibility/2006">
-    <mc:Choice xmlns:p14="http://schemas.microsoft.com/office/powerpoint/2010/main" xmlns="" Requires="p14">
+    <mc:Choice xmlns="" xmlns:p14="http://schemas.microsoft.com/office/powerpoint/2010/main" Requires="p14">
       <p:transition spd="med" p14:dur="700">
         <p:fade/>
       </p:transition>
@@ -13733,37 +13823,64 @@
         <p:spPr>
           <a:xfrm>
             <a:off x="1522413" y="381000"/>
-            <a:ext cx="9972599" cy="1371600"/>
+            <a:ext cx="9972599" cy="1175792"/>
           </a:xfrm>
         </p:spPr>
         <p:txBody>
           <a:bodyPr>
-            <a:normAutofit fontScale="90000"/>
+            <a:normAutofit/>
           </a:bodyPr>
           <a:lstStyle/>
           <a:p>
             <a:pPr algn="ctr"/>
             <a:r>
-              <a:rPr lang="es-AR" sz="4000" dirty="0">
-                <a:latin typeface="Segoe UI" panose="020B0502040204020203" pitchFamily="34" charset="0"/>
-                <a:cs typeface="Segoe UI" panose="020B0502040204020203" pitchFamily="34" charset="0"/>
-              </a:rPr>
-              <a:t>El activo más valioso de las organizaciones</a:t>
-            </a:r>
-            <a:r>
-              <a:rPr lang="es-AR" dirty="0">
-                <a:latin typeface="Segoe UI" panose="020B0502040204020203" pitchFamily="34" charset="0"/>
-                <a:cs typeface="Segoe UI" panose="020B0502040204020203" pitchFamily="34" charset="0"/>
-              </a:rPr>
-              <a:t/>
-            </a:r>
-            <a:br>
-              <a:rPr lang="es-AR" dirty="0">
-                <a:latin typeface="Segoe UI" panose="020B0502040204020203" pitchFamily="34" charset="0"/>
-                <a:cs typeface="Segoe UI" panose="020B0502040204020203" pitchFamily="34" charset="0"/>
-              </a:rPr>
-            </a:br>
-            <a:endParaRPr lang="es-AR" dirty="0">
+              <a:rPr lang="es-AR" spc="0" dirty="0">
+                <a:ln w="0"/>
+                <a:solidFill>
+                  <a:schemeClr val="accent1"/>
+                </a:solidFill>
+                <a:effectLst>
+                  <a:outerShdw blurRad="38100" dist="25400" dir="5400000" algn="ctr" rotWithShape="0">
+                    <a:srgbClr val="6E747A">
+                      <a:alpha val="43000"/>
+                    </a:srgbClr>
+                  </a:outerShdw>
+                </a:effectLst>
+                <a:latin typeface="Segoe UI" panose="020B0502040204020203" pitchFamily="34" charset="0"/>
+                <a:cs typeface="Segoe UI" panose="020B0502040204020203" pitchFamily="34" charset="0"/>
+              </a:rPr>
+              <a:t>El activo más valioso de las </a:t>
+            </a:r>
+            <a:r>
+              <a:rPr lang="es-AR" spc="0" dirty="0" smtClean="0">
+                <a:ln w="0"/>
+                <a:solidFill>
+                  <a:schemeClr val="accent1"/>
+                </a:solidFill>
+                <a:effectLst>
+                  <a:outerShdw blurRad="38100" dist="25400" dir="5400000" algn="ctr" rotWithShape="0">
+                    <a:srgbClr val="6E747A">
+                      <a:alpha val="43000"/>
+                    </a:srgbClr>
+                  </a:outerShdw>
+                </a:effectLst>
+                <a:latin typeface="Segoe UI" panose="020B0502040204020203" pitchFamily="34" charset="0"/>
+                <a:cs typeface="Segoe UI" panose="020B0502040204020203" pitchFamily="34" charset="0"/>
+              </a:rPr>
+              <a:t>organizaciones</a:t>
+            </a:r>
+            <a:endParaRPr lang="es-AR" spc="0" dirty="0">
+              <a:ln w="0"/>
+              <a:solidFill>
+                <a:schemeClr val="accent1"/>
+              </a:solidFill>
+              <a:effectLst>
+                <a:outerShdw blurRad="38100" dist="25400" dir="5400000" algn="ctr" rotWithShape="0">
+                  <a:srgbClr val="6E747A">
+                    <a:alpha val="43000"/>
+                  </a:srgbClr>
+                </a:outerShdw>
+              </a:effectLst>
               <a:latin typeface="Segoe UI" panose="020B0502040204020203" pitchFamily="34" charset="0"/>
               <a:cs typeface="Segoe UI" panose="020B0502040204020203" pitchFamily="34" charset="0"/>
             </a:endParaRPr>
@@ -13964,7 +14081,7 @@
     </p:spTree>
     <p:extLst>
       <p:ext uri="{BB962C8B-B14F-4D97-AF65-F5344CB8AC3E}">
-        <p14:creationId xmlns:p14="http://schemas.microsoft.com/office/powerpoint/2010/main" xmlns="" val="3323359930"/>
+        <p14:creationId xmlns="" xmlns:p14="http://schemas.microsoft.com/office/powerpoint/2010/main" val="3323359930"/>
       </p:ext>
     </p:extLst>
   </p:cSld>
@@ -13972,7 +14089,7 @@
     <a:masterClrMapping/>
   </p:clrMapOvr>
   <mc:AlternateContent xmlns:mc="http://schemas.openxmlformats.org/markup-compatibility/2006">
-    <mc:Choice xmlns:p14="http://schemas.microsoft.com/office/powerpoint/2010/main" xmlns="" Requires="p14">
+    <mc:Choice xmlns="" xmlns:p14="http://schemas.microsoft.com/office/powerpoint/2010/main" Requires="p14">
       <p:transition spd="med" p14:dur="700">
         <p:fade/>
       </p:transition>
@@ -14020,7 +14137,12 @@
             <p:ph type="title"/>
           </p:nvPr>
         </p:nvSpPr>
-        <p:spPr/>
+        <p:spPr>
+          <a:xfrm>
+            <a:off x="5302324" y="548680"/>
+            <a:ext cx="1582424" cy="1143000"/>
+          </a:xfrm>
+        </p:spPr>
         <p:txBody>
           <a:bodyPr>
             <a:normAutofit/>
@@ -14029,12 +14151,18 @@
           <a:p>
             <a:r>
               <a:rPr lang="es-AR" sz="6600" dirty="0" smtClean="0">
+                <a:solidFill>
+                  <a:schemeClr val="accent1"/>
+                </a:solidFill>
                 <a:latin typeface="Segoe UI" panose="020B0502040204020203" pitchFamily="34" charset="0"/>
                 <a:cs typeface="Segoe UI" panose="020B0502040204020203" pitchFamily="34" charset="0"/>
               </a:rPr>
               <a:t>Fin</a:t>
             </a:r>
             <a:endParaRPr lang="en-US" sz="6600" dirty="0">
+              <a:solidFill>
+                <a:schemeClr val="accent1"/>
+              </a:solidFill>
               <a:latin typeface="Segoe UI" panose="020B0502040204020203" pitchFamily="34" charset="0"/>
               <a:cs typeface="Segoe UI" panose="020B0502040204020203" pitchFamily="34" charset="0"/>
             </a:endParaRPr>
@@ -14051,7 +14179,12 @@
             <p:ph type="body" sz="half" idx="2"/>
           </p:nvPr>
         </p:nvSpPr>
-        <p:spPr/>
+        <p:spPr>
+          <a:xfrm>
+            <a:off x="2494012" y="2132856"/>
+            <a:ext cx="3581399" cy="1371600"/>
+          </a:xfrm>
+        </p:spPr>
         <p:txBody>
           <a:bodyPr>
             <a:normAutofit/>
@@ -14072,10 +14205,162 @@
           </a:p>
         </p:txBody>
       </p:sp>
+      <p:sp>
+        <p:nvSpPr>
+          <p:cNvPr id="5" name="Text Placeholder 3"/>
+          <p:cNvSpPr txBox="1">
+            <a:spLocks/>
+          </p:cNvSpPr>
+          <p:nvPr/>
+        </p:nvSpPr>
+        <p:spPr>
+          <a:xfrm>
+            <a:off x="7030516" y="3284984"/>
+            <a:ext cx="3581399" cy="1371600"/>
+          </a:xfrm>
+          <a:prstGeom prst="rect">
+            <a:avLst/>
+          </a:prstGeom>
+        </p:spPr>
+        <p:txBody>
+          <a:bodyPr vert="horz" lIns="91440" tIns="45720" rIns="91440" bIns="45720" rtlCol="0">
+            <a:normAutofit/>
+          </a:bodyPr>
+          <a:lstStyle/>
+          <a:p>
+            <a:pPr marL="0" marR="0" lvl="0" indent="0" algn="l" defTabSz="914400" rtl="0" eaLnBrk="1" fontAlgn="auto" latinLnBrk="0" hangingPunct="1">
+              <a:lnSpc>
+                <a:spcPct val="90000"/>
+              </a:lnSpc>
+              <a:spcBef>
+                <a:spcPts val="1200"/>
+              </a:spcBef>
+              <a:spcAft>
+                <a:spcPts val="0"/>
+              </a:spcAft>
+              <a:buClr>
+                <a:schemeClr val="accent1"/>
+              </a:buClr>
+              <a:buSzPct val="100000"/>
+              <a:buFont typeface="Arial" pitchFamily="34" charset="0"/>
+              <a:buNone/>
+              <a:tabLst/>
+              <a:defRPr/>
+            </a:pPr>
+            <a:r>
+              <a:rPr kumimoji="0" lang="es-AR" sz="3600" b="0" i="0" u="none" strike="noStrike" kern="1200" cap="none" spc="0" normalizeH="0" baseline="0" noProof="0" dirty="0" smtClean="0">
+                <a:ln>
+                  <a:noFill/>
+                </a:ln>
+                <a:solidFill>
+                  <a:schemeClr val="tx1"/>
+                </a:solidFill>
+                <a:effectLst/>
+                <a:uLnTx/>
+                <a:uFillTx/>
+                <a:latin typeface="Segoe UI" panose="020B0502040204020203" pitchFamily="34" charset="0"/>
+                <a:ea typeface="+mn-ea"/>
+                <a:cs typeface="Segoe UI" panose="020B0502040204020203" pitchFamily="34" charset="0"/>
+              </a:rPr>
+              <a:t>¿Consultas?</a:t>
+            </a:r>
+            <a:endParaRPr kumimoji="0" lang="en-US" sz="3600" b="0" i="0" u="none" strike="noStrike" kern="1200" cap="none" spc="0" normalizeH="0" baseline="0" noProof="0" dirty="0">
+              <a:ln>
+                <a:noFill/>
+              </a:ln>
+              <a:solidFill>
+                <a:schemeClr val="tx1"/>
+              </a:solidFill>
+              <a:effectLst/>
+              <a:uLnTx/>
+              <a:uFillTx/>
+              <a:latin typeface="Segoe UI" panose="020B0502040204020203" pitchFamily="34" charset="0"/>
+              <a:ea typeface="+mn-ea"/>
+              <a:cs typeface="Segoe UI" panose="020B0502040204020203" pitchFamily="34" charset="0"/>
+            </a:endParaRPr>
+          </a:p>
+        </p:txBody>
+      </p:sp>
+      <p:sp>
+        <p:nvSpPr>
+          <p:cNvPr id="6" name="Text Placeholder 3"/>
+          <p:cNvSpPr txBox="1">
+            <a:spLocks/>
+          </p:cNvSpPr>
+          <p:nvPr/>
+        </p:nvSpPr>
+        <p:spPr>
+          <a:xfrm>
+            <a:off x="2566020" y="4581128"/>
+            <a:ext cx="3581399" cy="1371600"/>
+          </a:xfrm>
+          <a:prstGeom prst="rect">
+            <a:avLst/>
+          </a:prstGeom>
+        </p:spPr>
+        <p:txBody>
+          <a:bodyPr vert="horz" lIns="91440" tIns="45720" rIns="91440" bIns="45720" rtlCol="0">
+            <a:normAutofit/>
+          </a:bodyPr>
+          <a:lstStyle/>
+          <a:p>
+            <a:pPr marL="0" marR="0" lvl="0" indent="0" algn="l" defTabSz="914400" rtl="0" eaLnBrk="1" fontAlgn="auto" latinLnBrk="0" hangingPunct="1">
+              <a:lnSpc>
+                <a:spcPct val="90000"/>
+              </a:lnSpc>
+              <a:spcBef>
+                <a:spcPts val="1200"/>
+              </a:spcBef>
+              <a:spcAft>
+                <a:spcPts val="0"/>
+              </a:spcAft>
+              <a:buClr>
+                <a:schemeClr val="accent1"/>
+              </a:buClr>
+              <a:buSzPct val="100000"/>
+              <a:buFont typeface="Arial" pitchFamily="34" charset="0"/>
+              <a:buNone/>
+              <a:tabLst/>
+              <a:defRPr/>
+            </a:pPr>
+            <a:r>
+              <a:rPr kumimoji="0" lang="es-AR" sz="3600" b="0" i="0" u="none" strike="noStrike" kern="1200" cap="none" spc="0" normalizeH="0" baseline="0" noProof="0" dirty="0" smtClean="0">
+                <a:ln>
+                  <a:noFill/>
+                </a:ln>
+                <a:solidFill>
+                  <a:schemeClr val="tx1"/>
+                </a:solidFill>
+                <a:effectLst/>
+                <a:uLnTx/>
+                <a:uFillTx/>
+                <a:latin typeface="Segoe UI" panose="020B0502040204020203" pitchFamily="34" charset="0"/>
+                <a:ea typeface="+mn-ea"/>
+                <a:cs typeface="Segoe UI" panose="020B0502040204020203" pitchFamily="34" charset="0"/>
+              </a:rPr>
+              <a:t>¿Dudas?</a:t>
+            </a:r>
+            <a:endParaRPr kumimoji="0" lang="en-US" sz="3600" b="0" i="0" u="none" strike="noStrike" kern="1200" cap="none" spc="0" normalizeH="0" baseline="0" noProof="0" dirty="0">
+              <a:ln>
+                <a:noFill/>
+              </a:ln>
+              <a:solidFill>
+                <a:schemeClr val="tx1"/>
+              </a:solidFill>
+              <a:effectLst/>
+              <a:uLnTx/>
+              <a:uFillTx/>
+              <a:latin typeface="Segoe UI" panose="020B0502040204020203" pitchFamily="34" charset="0"/>
+              <a:ea typeface="+mn-ea"/>
+              <a:cs typeface="Segoe UI" panose="020B0502040204020203" pitchFamily="34" charset="0"/>
+            </a:endParaRPr>
+          </a:p>
+        </p:txBody>
+      </p:sp>
     </p:spTree>
     <p:extLst>
       <p:ext uri="{BB962C8B-B14F-4D97-AF65-F5344CB8AC3E}">
-        <p14:creationId xmlns:p14="http://schemas.microsoft.com/office/powerpoint/2010/main" xmlns="" val="1108506989"/>
+        <p14:creationId xmlns="" xmlns:p14="http://schemas.microsoft.com/office/powerpoint/2010/main" val="1108506989"/>
       </p:ext>
     </p:extLst>
   </p:cSld>
@@ -14083,7 +14368,119 @@
     <a:masterClrMapping/>
   </p:clrMapOvr>
   <mc:AlternateContent xmlns:mc="http://schemas.openxmlformats.org/markup-compatibility/2006">
-    <mc:Choice xmlns:p14="http://schemas.microsoft.com/office/powerpoint/2010/main" xmlns="" Requires="p14">
+    <mc:Choice xmlns="" xmlns:p14="http://schemas.microsoft.com/office/powerpoint/2010/main" Requires="p14">
+      <p:transition spd="med" p14:dur="700">
+        <p:fade/>
+      </p:transition>
+    </mc:Choice>
+    <mc:Fallback>
+      <p:transition spd="med">
+        <p:fade/>
+      </p:transition>
+    </mc:Fallback>
+  </mc:AlternateContent>
+  <p:timing>
+    <p:tnLst>
+      <p:par>
+        <p:cTn id="1" dur="indefinite" restart="never" nodeType="tmRoot"/>
+      </p:par>
+    </p:tnLst>
+  </p:timing>
+</p:sld>
+</file>
+
+<file path=ppt/slides/slide41.xml><?xml version="1.0" encoding="utf-8"?>
+<p:sld xmlns:a="http://schemas.openxmlformats.org/drawingml/2006/main" xmlns:r="http://schemas.openxmlformats.org/officeDocument/2006/relationships" xmlns:p="http://schemas.openxmlformats.org/presentationml/2006/main">
+  <p:cSld>
+    <p:spTree>
+      <p:nvGrpSpPr>
+        <p:cNvPr id="1" name=""/>
+        <p:cNvGrpSpPr/>
+        <p:nvPr/>
+      </p:nvGrpSpPr>
+      <p:grpSpPr>
+        <a:xfrm>
+          <a:off x="0" y="0"/>
+          <a:ext cx="0" cy="0"/>
+          <a:chOff x="0" y="0"/>
+          <a:chExt cx="0" cy="0"/>
+        </a:xfrm>
+      </p:grpSpPr>
+      <p:sp>
+        <p:nvSpPr>
+          <p:cNvPr id="3" name="Title 2"/>
+          <p:cNvSpPr>
+            <a:spLocks noGrp="1"/>
+          </p:cNvSpPr>
+          <p:nvPr>
+            <p:ph type="title"/>
+          </p:nvPr>
+        </p:nvSpPr>
+        <p:spPr>
+          <a:xfrm>
+            <a:off x="1" y="0"/>
+            <a:ext cx="12188824" cy="6858000"/>
+          </a:xfrm>
+        </p:spPr>
+        <p:txBody>
+          <a:bodyPr anchor="ctr">
+            <a:normAutofit/>
+          </a:bodyPr>
+          <a:lstStyle/>
+          <a:p>
+            <a:pPr algn="ctr"/>
+            <a:r>
+              <a:rPr lang="es-AR" sz="8000" b="1" dirty="0" smtClean="0">
+                <a:solidFill>
+                  <a:schemeClr val="accent1">
+                    <a:lumMod val="40000"/>
+                    <a:lumOff val="60000"/>
+                  </a:schemeClr>
+                </a:solidFill>
+                <a:effectLst>
+                  <a:outerShdw blurRad="38100" dist="38100" dir="2700000" algn="tl">
+                    <a:srgbClr val="000000">
+                      <a:alpha val="43137"/>
+                    </a:srgbClr>
+                  </a:outerShdw>
+                </a:effectLst>
+                <a:latin typeface="Segoe UI" panose="020B0502040204020203" pitchFamily="34" charset="0"/>
+                <a:cs typeface="Segoe UI" panose="020B0502040204020203" pitchFamily="34" charset="0"/>
+              </a:rPr>
+              <a:t>Muchas gracias !!!</a:t>
+            </a:r>
+            <a:endParaRPr lang="en-US" sz="8000" b="1" dirty="0">
+              <a:solidFill>
+                <a:schemeClr val="accent1">
+                  <a:lumMod val="40000"/>
+                  <a:lumOff val="60000"/>
+                </a:schemeClr>
+              </a:solidFill>
+              <a:effectLst>
+                <a:outerShdw blurRad="38100" dist="38100" dir="2700000" algn="tl">
+                  <a:srgbClr val="000000">
+                    <a:alpha val="43137"/>
+                  </a:srgbClr>
+                </a:outerShdw>
+              </a:effectLst>
+              <a:latin typeface="Segoe UI" panose="020B0502040204020203" pitchFamily="34" charset="0"/>
+              <a:cs typeface="Segoe UI" panose="020B0502040204020203" pitchFamily="34" charset="0"/>
+            </a:endParaRPr>
+          </a:p>
+        </p:txBody>
+      </p:sp>
+    </p:spTree>
+    <p:extLst>
+      <p:ext uri="{BB962C8B-B14F-4D97-AF65-F5344CB8AC3E}">
+        <p14:creationId xmlns="" xmlns:p14="http://schemas.microsoft.com/office/powerpoint/2010/main" val="1108506989"/>
+      </p:ext>
+    </p:extLst>
+  </p:cSld>
+  <p:clrMapOvr>
+    <a:masterClrMapping/>
+  </p:clrMapOvr>
+  <mc:AlternateContent xmlns:mc="http://schemas.openxmlformats.org/markup-compatibility/2006">
+    <mc:Choice xmlns="" xmlns:p14="http://schemas.microsoft.com/office/powerpoint/2010/main" Requires="p14">
       <p:transition spd="med" p14:dur="700">
         <p:fade/>
       </p:transition>
@@ -14146,6 +14543,9 @@
             <a:pPr algn="ctr"/>
             <a:r>
               <a:rPr lang="es-AR" dirty="0" smtClean="0">
+                <a:solidFill>
+                  <a:schemeClr val="accent1"/>
+                </a:solidFill>
                 <a:latin typeface="Segoe UI" panose="020B0502040204020203" pitchFamily="34" charset="0"/>
                 <a:cs typeface="Segoe UI" panose="020B0502040204020203" pitchFamily="34" charset="0"/>
               </a:rPr>
@@ -14153,6 +14553,9 @@
             </a:r>
             <a:r>
               <a:rPr lang="es-AR" dirty="0">
+                <a:solidFill>
+                  <a:schemeClr val="accent1"/>
+                </a:solidFill>
                 <a:latin typeface="Segoe UI" panose="020B0502040204020203" pitchFamily="34" charset="0"/>
                 <a:cs typeface="Segoe UI" panose="020B0502040204020203" pitchFamily="34" charset="0"/>
               </a:rPr>
@@ -14160,12 +14563,28 @@
             </a:r>
             <a:r>
               <a:rPr lang="es-AR" dirty="0" smtClean="0">
-                <a:latin typeface="Segoe UI" panose="020B0502040204020203" pitchFamily="34" charset="0"/>
-                <a:cs typeface="Segoe UI" panose="020B0502040204020203" pitchFamily="34" charset="0"/>
-              </a:rPr>
-              <a:t>información I</a:t>
+                <a:solidFill>
+                  <a:schemeClr val="accent1"/>
+                </a:solidFill>
+                <a:latin typeface="Segoe UI" panose="020B0502040204020203" pitchFamily="34" charset="0"/>
+                <a:cs typeface="Segoe UI" panose="020B0502040204020203" pitchFamily="34" charset="0"/>
+              </a:rPr>
+              <a:t>información </a:t>
+            </a:r>
+            <a:r>
+              <a:rPr lang="es-AR" dirty="0" smtClean="0">
+                <a:solidFill>
+                  <a:schemeClr val="accent1"/>
+                </a:solidFill>
+                <a:latin typeface="Segoe UI" panose="020B0502040204020203" pitchFamily="34" charset="0"/>
+                <a:cs typeface="Segoe UI" panose="020B0502040204020203" pitchFamily="34" charset="0"/>
+              </a:rPr>
+              <a:t> (I)</a:t>
             </a:r>
             <a:endParaRPr lang="es-AR" dirty="0">
+              <a:solidFill>
+                <a:schemeClr val="accent1"/>
+              </a:solidFill>
               <a:latin typeface="Segoe UI" panose="020B0502040204020203" pitchFamily="34" charset="0"/>
               <a:cs typeface="Segoe UI" panose="020B0502040204020203" pitchFamily="34" charset="0"/>
             </a:endParaRPr>
@@ -14342,7 +14761,7 @@
           <a:blip r:embed="rId2" cstate="print">
             <a:extLst>
               <a:ext uri="{28A0092B-C50C-407E-A947-70E740481C1C}">
-                <a14:useLocalDpi xmlns:a14="http://schemas.microsoft.com/office/drawing/2010/main" xmlns="" val="0"/>
+                <a14:useLocalDpi xmlns="" xmlns:a14="http://schemas.microsoft.com/office/drawing/2010/main" val="0"/>
               </a:ext>
             </a:extLst>
           </a:blip>
@@ -14362,7 +14781,7 @@
           <a:noFill/>
           <a:extLst>
             <a:ext uri="{909E8E84-426E-40DD-AFC4-6F175D3DCCD1}">
-              <a14:hiddenFill xmlns:a14="http://schemas.microsoft.com/office/drawing/2010/main" xmlns="">
+              <a14:hiddenFill xmlns="" xmlns:a14="http://schemas.microsoft.com/office/drawing/2010/main">
                 <a:solidFill>
                   <a:srgbClr val="FFFFFF"/>
                 </a:solidFill>
@@ -14374,7 +14793,7 @@
     </p:spTree>
     <p:extLst>
       <p:ext uri="{BB962C8B-B14F-4D97-AF65-F5344CB8AC3E}">
-        <p14:creationId xmlns:p14="http://schemas.microsoft.com/office/powerpoint/2010/main" xmlns="" val="1350001534"/>
+        <p14:creationId xmlns="" xmlns:p14="http://schemas.microsoft.com/office/powerpoint/2010/main" val="1350001534"/>
       </p:ext>
     </p:extLst>
   </p:cSld>
@@ -14382,7 +14801,7 @@
     <a:masterClrMapping/>
   </p:clrMapOvr>
   <mc:AlternateContent xmlns:mc="http://schemas.openxmlformats.org/markup-compatibility/2006">
-    <mc:Choice xmlns:p14="http://schemas.microsoft.com/office/powerpoint/2010/main" xmlns="" Requires="p14">
+    <mc:Choice xmlns="" xmlns:p14="http://schemas.microsoft.com/office/powerpoint/2010/main" Requires="p14">
       <p:transition spd="med" p14:dur="700">
         <p:fade/>
       </p:transition>
@@ -14445,6 +14864,9 @@
             <a:pPr algn="ctr"/>
             <a:r>
               <a:rPr lang="es-AR" dirty="0" smtClean="0">
+                <a:solidFill>
+                  <a:schemeClr val="accent1"/>
+                </a:solidFill>
                 <a:latin typeface="Segoe UI" panose="020B0502040204020203" pitchFamily="34" charset="0"/>
                 <a:cs typeface="Segoe UI" panose="020B0502040204020203" pitchFamily="34" charset="0"/>
               </a:rPr>
@@ -14452,6 +14874,9 @@
             </a:r>
             <a:r>
               <a:rPr lang="es-AR" dirty="0">
+                <a:solidFill>
+                  <a:schemeClr val="accent1"/>
+                </a:solidFill>
                 <a:latin typeface="Segoe UI" panose="020B0502040204020203" pitchFamily="34" charset="0"/>
                 <a:cs typeface="Segoe UI" panose="020B0502040204020203" pitchFamily="34" charset="0"/>
               </a:rPr>
@@ -14459,12 +14884,28 @@
             </a:r>
             <a:r>
               <a:rPr lang="es-AR" dirty="0" smtClean="0">
-                <a:latin typeface="Segoe UI" panose="020B0502040204020203" pitchFamily="34" charset="0"/>
-                <a:cs typeface="Segoe UI" panose="020B0502040204020203" pitchFamily="34" charset="0"/>
-              </a:rPr>
-              <a:t>información II</a:t>
+                <a:solidFill>
+                  <a:schemeClr val="accent1"/>
+                </a:solidFill>
+                <a:latin typeface="Segoe UI" panose="020B0502040204020203" pitchFamily="34" charset="0"/>
+                <a:cs typeface="Segoe UI" panose="020B0502040204020203" pitchFamily="34" charset="0"/>
+              </a:rPr>
+              <a:t>información </a:t>
+            </a:r>
+            <a:r>
+              <a:rPr lang="es-AR" dirty="0" smtClean="0">
+                <a:solidFill>
+                  <a:schemeClr val="accent1"/>
+                </a:solidFill>
+                <a:latin typeface="Segoe UI" panose="020B0502040204020203" pitchFamily="34" charset="0"/>
+                <a:cs typeface="Segoe UI" panose="020B0502040204020203" pitchFamily="34" charset="0"/>
+              </a:rPr>
+              <a:t> (II)</a:t>
             </a:r>
             <a:endParaRPr lang="es-AR" dirty="0">
+              <a:solidFill>
+                <a:schemeClr val="accent1"/>
+              </a:solidFill>
               <a:latin typeface="Segoe UI" panose="020B0502040204020203" pitchFamily="34" charset="0"/>
               <a:cs typeface="Segoe UI" panose="020B0502040204020203" pitchFamily="34" charset="0"/>
             </a:endParaRPr>
@@ -14755,7 +15196,7 @@
     </p:spTree>
     <p:extLst>
       <p:ext uri="{BB962C8B-B14F-4D97-AF65-F5344CB8AC3E}">
-        <p14:creationId xmlns:p14="http://schemas.microsoft.com/office/powerpoint/2010/main" xmlns="" val="3438441757"/>
+        <p14:creationId xmlns="" xmlns:p14="http://schemas.microsoft.com/office/powerpoint/2010/main" val="3438441757"/>
       </p:ext>
     </p:extLst>
   </p:cSld>
@@ -14763,7 +15204,7 @@
     <a:masterClrMapping/>
   </p:clrMapOvr>
   <mc:AlternateContent xmlns:mc="http://schemas.openxmlformats.org/markup-compatibility/2006">
-    <mc:Choice xmlns:p14="http://schemas.microsoft.com/office/powerpoint/2010/main" xmlns="" Requires="p14">
+    <mc:Choice xmlns="" xmlns:p14="http://schemas.microsoft.com/office/powerpoint/2010/main" Requires="p14">
       <p:transition spd="med" p14:dur="700">
         <p:fade/>
       </p:transition>
@@ -14814,7 +15255,7 @@
         <p:spPr>
           <a:xfrm>
             <a:off x="1125860" y="332656"/>
-            <a:ext cx="10188623" cy="743744"/>
+            <a:ext cx="10513168" cy="743744"/>
           </a:xfrm>
         </p:spPr>
         <p:txBody>
@@ -14825,6 +15266,9 @@
           <a:p>
             <a:r>
               <a:rPr lang="es-AR" dirty="0">
+                <a:solidFill>
+                  <a:schemeClr val="accent1"/>
+                </a:solidFill>
                 <a:latin typeface="Segoe UI" panose="020B0502040204020203" pitchFamily="34" charset="0"/>
                 <a:cs typeface="Segoe UI" panose="020B0502040204020203" pitchFamily="34" charset="0"/>
               </a:rPr>
@@ -14832,12 +15276,19 @@
             </a:r>
             <a:r>
               <a:rPr lang="es-AR" dirty="0" smtClean="0">
-                <a:latin typeface="Segoe UI" panose="020B0502040204020203" pitchFamily="34" charset="0"/>
-                <a:cs typeface="Segoe UI" panose="020B0502040204020203" pitchFamily="34" charset="0"/>
-              </a:rPr>
-              <a:t>I</a:t>
-            </a:r>
-            <a:endParaRPr lang="es-AR" b="1" dirty="0"/>
+                <a:solidFill>
+                  <a:schemeClr val="accent1"/>
+                </a:solidFill>
+                <a:latin typeface="Segoe UI" panose="020B0502040204020203" pitchFamily="34" charset="0"/>
+                <a:cs typeface="Segoe UI" panose="020B0502040204020203" pitchFamily="34" charset="0"/>
+              </a:rPr>
+              <a:t> (I)</a:t>
+            </a:r>
+            <a:endParaRPr lang="es-AR" b="1" dirty="0">
+              <a:solidFill>
+                <a:schemeClr val="accent1"/>
+              </a:solidFill>
+            </a:endParaRPr>
           </a:p>
         </p:txBody>
       </p:sp>
@@ -15015,7 +15466,7 @@
     </p:spTree>
     <p:extLst>
       <p:ext uri="{BB962C8B-B14F-4D97-AF65-F5344CB8AC3E}">
-        <p14:creationId xmlns:p14="http://schemas.microsoft.com/office/powerpoint/2010/main" xmlns="" val="3833366108"/>
+        <p14:creationId xmlns="" xmlns:p14="http://schemas.microsoft.com/office/powerpoint/2010/main" val="3833366108"/>
       </p:ext>
     </p:extLst>
   </p:cSld>
@@ -15023,7 +15474,7 @@
     <a:masterClrMapping/>
   </p:clrMapOvr>
   <mc:AlternateContent xmlns:mc="http://schemas.openxmlformats.org/markup-compatibility/2006">
-    <mc:Choice xmlns:p14="http://schemas.microsoft.com/office/powerpoint/2010/main" xmlns="" Requires="p14">
+    <mc:Choice xmlns="" xmlns:p14="http://schemas.microsoft.com/office/powerpoint/2010/main" Requires="p14">
       <p:transition spd="med" p14:dur="700">
         <p:fade/>
       </p:transition>
@@ -15074,7 +15525,7 @@
         <p:spPr>
           <a:xfrm>
             <a:off x="981844" y="116632"/>
-            <a:ext cx="10260631" cy="743744"/>
+            <a:ext cx="10657184" cy="743744"/>
           </a:xfrm>
         </p:spPr>
         <p:txBody>
@@ -15085,6 +15536,9 @@
           <a:p>
             <a:r>
               <a:rPr lang="es-AR" dirty="0">
+                <a:solidFill>
+                  <a:schemeClr val="accent1"/>
+                </a:solidFill>
                 <a:latin typeface="Segoe UI" panose="020B0502040204020203" pitchFamily="34" charset="0"/>
                 <a:cs typeface="Segoe UI" panose="020B0502040204020203" pitchFamily="34" charset="0"/>
               </a:rPr>
@@ -15092,12 +15546,29 @@
             </a:r>
             <a:r>
               <a:rPr lang="es-AR" dirty="0" smtClean="0">
-                <a:latin typeface="Segoe UI" panose="020B0502040204020203" pitchFamily="34" charset="0"/>
-                <a:cs typeface="Segoe UI" panose="020B0502040204020203" pitchFamily="34" charset="0"/>
-              </a:rPr>
-              <a:t>información II </a:t>
-            </a:r>
-            <a:endParaRPr lang="es-AR" b="1" dirty="0"/>
+                <a:solidFill>
+                  <a:schemeClr val="accent1"/>
+                </a:solidFill>
+                <a:latin typeface="Segoe UI" panose="020B0502040204020203" pitchFamily="34" charset="0"/>
+                <a:cs typeface="Segoe UI" panose="020B0502040204020203" pitchFamily="34" charset="0"/>
+              </a:rPr>
+              <a:t>información </a:t>
+            </a:r>
+            <a:r>
+              <a:rPr lang="es-AR" dirty="0" smtClean="0">
+                <a:solidFill>
+                  <a:schemeClr val="accent1"/>
+                </a:solidFill>
+                <a:latin typeface="Segoe UI" panose="020B0502040204020203" pitchFamily="34" charset="0"/>
+                <a:cs typeface="Segoe UI" panose="020B0502040204020203" pitchFamily="34" charset="0"/>
+              </a:rPr>
+              <a:t> (II) </a:t>
+            </a:r>
+            <a:endParaRPr lang="es-AR" b="1" dirty="0">
+              <a:solidFill>
+                <a:schemeClr val="accent1"/>
+              </a:solidFill>
+            </a:endParaRPr>
           </a:p>
         </p:txBody>
       </p:sp>
@@ -15113,7 +15584,7 @@
           <a:blip r:embed="rId2" cstate="print">
             <a:extLst>
               <a:ext uri="{28A0092B-C50C-407E-A947-70E740481C1C}">
-                <a14:useLocalDpi xmlns:a14="http://schemas.microsoft.com/office/drawing/2010/main" xmlns="" val="0"/>
+                <a14:useLocalDpi xmlns="" xmlns:a14="http://schemas.microsoft.com/office/drawing/2010/main" val="0"/>
               </a:ext>
             </a:extLst>
           </a:blip>
@@ -15136,14 +15607,14 @@
           </a:ln>
           <a:extLst>
             <a:ext uri="{909E8E84-426E-40DD-AFC4-6F175D3DCCD1}">
-              <a14:hiddenFill xmlns:a14="http://schemas.microsoft.com/office/drawing/2010/main" xmlns="">
+              <a14:hiddenFill xmlns="" xmlns:a14="http://schemas.microsoft.com/office/drawing/2010/main">
                 <a:solidFill>
                   <a:schemeClr val="accent1"/>
                 </a:solidFill>
               </a14:hiddenFill>
             </a:ext>
             <a:ext uri="{91240B29-F687-4F45-9708-019B960494DF}">
-              <a14:hiddenLine xmlns:a14="http://schemas.microsoft.com/office/drawing/2010/main" xmlns="" w="9525">
+              <a14:hiddenLine xmlns="" xmlns:a14="http://schemas.microsoft.com/office/drawing/2010/main" w="9525">
                 <a:solidFill>
                   <a:schemeClr val="tx1"/>
                 </a:solidFill>
@@ -15158,7 +15629,7 @@
     </p:spTree>
     <p:extLst>
       <p:ext uri="{BB962C8B-B14F-4D97-AF65-F5344CB8AC3E}">
-        <p14:creationId xmlns:p14="http://schemas.microsoft.com/office/powerpoint/2010/main" xmlns="" val="2112418618"/>
+        <p14:creationId xmlns="" xmlns:p14="http://schemas.microsoft.com/office/powerpoint/2010/main" val="2112418618"/>
       </p:ext>
     </p:extLst>
   </p:cSld>
@@ -15166,7 +15637,7 @@
     <a:masterClrMapping/>
   </p:clrMapOvr>
   <mc:AlternateContent xmlns:mc="http://schemas.openxmlformats.org/markup-compatibility/2006">
-    <mc:Choice xmlns:p14="http://schemas.microsoft.com/office/powerpoint/2010/main" xmlns="" Requires="p14">
+    <mc:Choice xmlns="" xmlns:p14="http://schemas.microsoft.com/office/powerpoint/2010/main" Requires="p14">
       <p:transition spd="med" p14:dur="700">
         <p:fade/>
       </p:transition>
@@ -15229,6 +15700,9 @@
             <a:pPr algn="ctr"/>
             <a:r>
               <a:rPr lang="es-AR" dirty="0">
+                <a:solidFill>
+                  <a:schemeClr val="accent1"/>
+                </a:solidFill>
                 <a:latin typeface="Segoe UI" panose="020B0502040204020203" pitchFamily="34" charset="0"/>
                 <a:cs typeface="Segoe UI" panose="020B0502040204020203" pitchFamily="34" charset="0"/>
               </a:rPr>
@@ -15236,12 +15710,19 @@
             </a:r>
             <a:r>
               <a:rPr lang="es-AR" dirty="0" smtClean="0">
+                <a:solidFill>
+                  <a:schemeClr val="accent1"/>
+                </a:solidFill>
                 <a:latin typeface="Segoe UI" panose="020B0502040204020203" pitchFamily="34" charset="0"/>
                 <a:cs typeface="Segoe UI" panose="020B0502040204020203" pitchFamily="34" charset="0"/>
               </a:rPr>
               <a:t>existentes</a:t>
             </a:r>
-            <a:endParaRPr lang="es-AR" b="1" dirty="0"/>
+            <a:endParaRPr lang="es-AR" b="1" dirty="0">
+              <a:solidFill>
+                <a:schemeClr val="accent1"/>
+              </a:solidFill>
+            </a:endParaRPr>
           </a:p>
         </p:txBody>
       </p:sp>
@@ -15447,7 +15928,7 @@
           <a:blip r:embed="rId2" cstate="print">
             <a:extLst>
               <a:ext uri="{28A0092B-C50C-407E-A947-70E740481C1C}">
-                <a14:useLocalDpi xmlns:a14="http://schemas.microsoft.com/office/drawing/2010/main" xmlns="" val="0"/>
+                <a14:useLocalDpi xmlns="" xmlns:a14="http://schemas.microsoft.com/office/drawing/2010/main" val="0"/>
               </a:ext>
             </a:extLst>
           </a:blip>
@@ -15470,14 +15951,14 @@
           </a:ln>
           <a:extLst>
             <a:ext uri="{909E8E84-426E-40DD-AFC4-6F175D3DCCD1}">
-              <a14:hiddenFill xmlns:a14="http://schemas.microsoft.com/office/drawing/2010/main" xmlns="">
+              <a14:hiddenFill xmlns="" xmlns:a14="http://schemas.microsoft.com/office/drawing/2010/main">
                 <a:solidFill>
                   <a:schemeClr val="accent1"/>
                 </a:solidFill>
               </a14:hiddenFill>
             </a:ext>
             <a:ext uri="{91240B29-F687-4F45-9708-019B960494DF}">
-              <a14:hiddenLine xmlns:a14="http://schemas.microsoft.com/office/drawing/2010/main" xmlns="" w="9525">
+              <a14:hiddenLine xmlns="" xmlns:a14="http://schemas.microsoft.com/office/drawing/2010/main" w="9525">
                 <a:solidFill>
                   <a:schemeClr val="tx1"/>
                 </a:solidFill>
@@ -15492,7 +15973,7 @@
     </p:spTree>
     <p:extLst>
       <p:ext uri="{BB962C8B-B14F-4D97-AF65-F5344CB8AC3E}">
-        <p14:creationId xmlns:p14="http://schemas.microsoft.com/office/powerpoint/2010/main" xmlns="" val="1393713661"/>
+        <p14:creationId xmlns="" xmlns:p14="http://schemas.microsoft.com/office/powerpoint/2010/main" val="1393713661"/>
       </p:ext>
     </p:extLst>
   </p:cSld>
@@ -15500,7 +15981,7 @@
     <a:masterClrMapping/>
   </p:clrMapOvr>
   <mc:AlternateContent xmlns:mc="http://schemas.openxmlformats.org/markup-compatibility/2006">
-    <mc:Choice xmlns:p14="http://schemas.microsoft.com/office/powerpoint/2010/main" xmlns="" Requires="p14">
+    <mc:Choice xmlns="" xmlns:p14="http://schemas.microsoft.com/office/powerpoint/2010/main" Requires="p14">
       <p:transition spd="med" p14:dur="700">
         <p:fade/>
       </p:transition>

</xml_diff>

<commit_message>
presentacion: agregado de diapositiva de 'gracias'. corregido cosas de formato.
</commit_message>
<xml_diff>
--- a/Presentacion/Fuga de Información.pptx
+++ b/Presentacion/Fuga de Información.pptx
@@ -5,10 +5,10 @@
     <p:sldMasterId id="2147483648" r:id="rId2"/>
   </p:sldMasterIdLst>
   <p:notesMasterIdLst>
-    <p:notesMasterId r:id="rId44"/>
+    <p:notesMasterId r:id="rId45"/>
   </p:notesMasterIdLst>
   <p:handoutMasterIdLst>
-    <p:handoutMasterId r:id="rId45"/>
+    <p:handoutMasterId r:id="rId46"/>
   </p:handoutMasterIdLst>
   <p:sldIdLst>
     <p:sldId id="265" r:id="rId3"/>
@@ -51,12 +51,13 @@
     <p:sldId id="351" r:id="rId40"/>
     <p:sldId id="352" r:id="rId41"/>
     <p:sldId id="353" r:id="rId42"/>
-    <p:sldId id="319" r:id="rId43"/>
+    <p:sldId id="370" r:id="rId43"/>
+    <p:sldId id="371" r:id="rId44"/>
   </p:sldIdLst>
   <p:sldSz cx="12188825" cy="6858000"/>
   <p:notesSz cx="6858000" cy="9144000"/>
   <p:custDataLst>
-    <p:tags r:id="rId46"/>
+    <p:tags r:id="rId47"/>
   </p:custDataLst>
   <p:defaultTextStyle>
     <a:defPPr>
@@ -155,7 +156,7 @@
   </p:defaultTextStyle>
   <p:extLst>
     <p:ext uri="{EFAFB233-063F-42B5-8137-9DF3F51BA10A}">
-      <p15:sldGuideLst xmlns:p15="http://schemas.microsoft.com/office/powerpoint/2012/main">
+      <p15:sldGuideLst xmlns:p15="http://schemas.microsoft.com/office/powerpoint/2012/main" xmlns="">
         <p15:guide id="1" pos="3839" userDrawn="1">
           <p15:clr>
             <a:srgbClr val="A4A3A4"/>
@@ -169,7 +170,7 @@
       </p15:sldGuideLst>
     </p:ext>
     <p:ext uri="{2D200454-40CA-4A62-9FC3-DE9A4176ACB9}">
-      <p15:notesGuideLst xmlns:p15="http://schemas.microsoft.com/office/powerpoint/2012/main"/>
+      <p15:notesGuideLst xmlns:p15="http://schemas.microsoft.com/office/powerpoint/2012/main" xmlns=""/>
     </p:ext>
   </p:extLst>
 </p:presentation>
@@ -334,7 +335,7 @@
     </p:spTree>
     <p:extLst>
       <p:ext uri="{BB962C8B-B14F-4D97-AF65-F5344CB8AC3E}">
-        <p14:creationId xmlns:p14="http://schemas.microsoft.com/office/powerpoint/2010/main" val="3932065745"/>
+        <p14:creationId xmlns:p14="http://schemas.microsoft.com/office/powerpoint/2010/main" xmlns="" val="3932065745"/>
       </p:ext>
     </p:extLst>
   </p:cSld>
@@ -593,7 +594,7 @@
     </p:spTree>
     <p:extLst>
       <p:ext uri="{BB962C8B-B14F-4D97-AF65-F5344CB8AC3E}">
-        <p14:creationId xmlns:p14="http://schemas.microsoft.com/office/powerpoint/2010/main" val="4276579820"/>
+        <p14:creationId xmlns:p14="http://schemas.microsoft.com/office/powerpoint/2010/main" xmlns="" val="4276579820"/>
       </p:ext>
     </p:extLst>
   </p:cSld>
@@ -1088,7 +1089,7 @@
     </p:spTree>
     <p:extLst>
       <p:ext uri="{BB962C8B-B14F-4D97-AF65-F5344CB8AC3E}">
-        <p14:creationId xmlns:p14="http://schemas.microsoft.com/office/powerpoint/2010/main" val="246766428"/>
+        <p14:creationId xmlns:p14="http://schemas.microsoft.com/office/powerpoint/2010/main" xmlns="" val="246766428"/>
       </p:ext>
     </p:extLst>
   </p:cSld>
@@ -1173,7 +1174,7 @@
     </p:spTree>
     <p:extLst>
       <p:ext uri="{BB962C8B-B14F-4D97-AF65-F5344CB8AC3E}">
-        <p14:creationId xmlns:p14="http://schemas.microsoft.com/office/powerpoint/2010/main" val="2425724269"/>
+        <p14:creationId xmlns:p14="http://schemas.microsoft.com/office/powerpoint/2010/main" xmlns="" val="2425724269"/>
       </p:ext>
     </p:extLst>
   </p:cSld>
@@ -1258,7 +1259,7 @@
     </p:spTree>
     <p:extLst>
       <p:ext uri="{BB962C8B-B14F-4D97-AF65-F5344CB8AC3E}">
-        <p14:creationId xmlns:p14="http://schemas.microsoft.com/office/powerpoint/2010/main" val="913013488"/>
+        <p14:creationId xmlns:p14="http://schemas.microsoft.com/office/powerpoint/2010/main" xmlns="" val="913013488"/>
       </p:ext>
     </p:extLst>
   </p:cSld>
@@ -1343,7 +1344,7 @@
     </p:spTree>
     <p:extLst>
       <p:ext uri="{BB962C8B-B14F-4D97-AF65-F5344CB8AC3E}">
-        <p14:creationId xmlns:p14="http://schemas.microsoft.com/office/powerpoint/2010/main" val="3326557915"/>
+        <p14:creationId xmlns:p14="http://schemas.microsoft.com/office/powerpoint/2010/main" xmlns="" val="3326557915"/>
       </p:ext>
     </p:extLst>
   </p:cSld>
@@ -1428,7 +1429,7 @@
     </p:spTree>
     <p:extLst>
       <p:ext uri="{BB962C8B-B14F-4D97-AF65-F5344CB8AC3E}">
-        <p14:creationId xmlns:p14="http://schemas.microsoft.com/office/powerpoint/2010/main" val="3460376957"/>
+        <p14:creationId xmlns:p14="http://schemas.microsoft.com/office/powerpoint/2010/main" xmlns="" val="3460376957"/>
       </p:ext>
     </p:extLst>
   </p:cSld>
@@ -1513,7 +1514,7 @@
     </p:spTree>
     <p:extLst>
       <p:ext uri="{BB962C8B-B14F-4D97-AF65-F5344CB8AC3E}">
-        <p14:creationId xmlns:p14="http://schemas.microsoft.com/office/powerpoint/2010/main" val="4202137938"/>
+        <p14:creationId xmlns:p14="http://schemas.microsoft.com/office/powerpoint/2010/main" xmlns="" val="4202137938"/>
       </p:ext>
     </p:extLst>
   </p:cSld>
@@ -1598,7 +1599,7 @@
     </p:spTree>
     <p:extLst>
       <p:ext uri="{BB962C8B-B14F-4D97-AF65-F5344CB8AC3E}">
-        <p14:creationId xmlns:p14="http://schemas.microsoft.com/office/powerpoint/2010/main" val="2586394931"/>
+        <p14:creationId xmlns:p14="http://schemas.microsoft.com/office/powerpoint/2010/main" xmlns="" val="2586394931"/>
       </p:ext>
     </p:extLst>
   </p:cSld>
@@ -1683,7 +1684,7 @@
     </p:spTree>
     <p:extLst>
       <p:ext uri="{BB962C8B-B14F-4D97-AF65-F5344CB8AC3E}">
-        <p14:creationId xmlns:p14="http://schemas.microsoft.com/office/powerpoint/2010/main" val="1362585539"/>
+        <p14:creationId xmlns:p14="http://schemas.microsoft.com/office/powerpoint/2010/main" xmlns="" val="1362585539"/>
       </p:ext>
     </p:extLst>
   </p:cSld>
@@ -2060,7 +2061,7 @@
     </p:spTree>
     <p:extLst>
       <p:ext uri="{BB962C8B-B14F-4D97-AF65-F5344CB8AC3E}">
-        <p14:creationId xmlns:p14="http://schemas.microsoft.com/office/powerpoint/2010/main" val="3805029774"/>
+        <p14:creationId xmlns:p14="http://schemas.microsoft.com/office/powerpoint/2010/main" xmlns="" val="3805029774"/>
       </p:ext>
     </p:extLst>
   </p:cSld>
@@ -2256,7 +2257,7 @@
                 <a:latin typeface="+mn-lt"/>
                 <a:ea typeface="+mn-ea"/>
                 <a:cs typeface="+mn-cs"/>
-                <a:hlinkClick r:id="rId6"/>
+                <a:hlinkClick r:id="rId5"/>
               </a:rPr>
               <a:t>[4]</a:t>
             </a:r>
@@ -2295,7 +2296,7 @@
                 <a:latin typeface="+mn-lt"/>
                 <a:ea typeface="+mn-ea"/>
                 <a:cs typeface="+mn-cs"/>
-                <a:hlinkClick r:id="rId7" tooltip="Prosecutor"/>
+                <a:hlinkClick r:id="rId6" tooltip="Prosecutor"/>
               </a:rPr>
               <a:t>prosecutors</a:t>
             </a:r>
@@ -2320,7 +2321,7 @@
                 <a:latin typeface="+mn-lt"/>
                 <a:ea typeface="+mn-ea"/>
                 <a:cs typeface="+mn-cs"/>
-                <a:hlinkClick r:id="rId8" tooltip="Criminal charge"/>
+                <a:hlinkClick r:id="rId7" tooltip="Criminal charge"/>
               </a:rPr>
               <a:t>charged</a:t>
             </a:r>
@@ -2345,7 +2346,7 @@
                 <a:latin typeface="+mn-lt"/>
                 <a:ea typeface="+mn-ea"/>
                 <a:cs typeface="+mn-cs"/>
-                <a:hlinkClick r:id="rId9" tooltip="Espionage Act of 1917"/>
+                <a:hlinkClick r:id="rId8" tooltip="Espionage Act of 1917"/>
               </a:rPr>
               <a:t>espionage</a:t>
             </a:r>
@@ -2370,7 +2371,7 @@
                 <a:latin typeface="+mn-lt"/>
                 <a:ea typeface="+mn-ea"/>
                 <a:cs typeface="+mn-cs"/>
-                <a:hlinkClick r:id="rId10" tooltip="Theft of property"/>
+                <a:hlinkClick r:id="rId9" tooltip="Theft of property"/>
               </a:rPr>
               <a:t>theft of government property</a:t>
             </a:r>
@@ -2395,7 +2396,7 @@
                 <a:latin typeface="+mn-lt"/>
                 <a:ea typeface="+mn-ea"/>
                 <a:cs typeface="+mn-cs"/>
-                <a:hlinkClick r:id="rId11"/>
+                <a:hlinkClick r:id="rId5"/>
               </a:rPr>
               <a:t>[16]</a:t>
             </a:r>
@@ -2420,7 +2421,7 @@
                 <a:latin typeface="+mn-lt"/>
                 <a:ea typeface="+mn-ea"/>
                 <a:cs typeface="+mn-cs"/>
-                <a:hlinkClick r:id="rId12" tooltip="Right of asylum"/>
+                <a:hlinkClick r:id="rId10" tooltip="Right of asylum"/>
               </a:rPr>
               <a:t>asylum</a:t>
             </a:r>
@@ -2445,7 +2446,7 @@
                 <a:latin typeface="+mn-lt"/>
                 <a:ea typeface="+mn-ea"/>
                 <a:cs typeface="+mn-cs"/>
-                <a:hlinkClick r:id="rId13"/>
+                <a:hlinkClick r:id="rId5"/>
               </a:rPr>
               <a:t>[17]</a:t>
             </a:r>
@@ -2470,7 +2471,7 @@
                 <a:latin typeface="+mn-lt"/>
                 <a:ea typeface="+mn-ea"/>
                 <a:cs typeface="+mn-cs"/>
-                <a:hlinkClick r:id="rId14" tooltip="Russia–United States relations"/>
+                <a:hlinkClick r:id="rId11" tooltip="Russia–United States relations"/>
               </a:rPr>
               <a:t>Russia–United States relations</a:t>
             </a:r>
@@ -2532,7 +2533,7 @@
                 <a:latin typeface="+mn-lt"/>
                 <a:ea typeface="+mn-ea"/>
                 <a:cs typeface="+mn-cs"/>
-                <a:hlinkClick r:id="rId15" tooltip="Phishing"/>
+                <a:hlinkClick r:id="rId12" tooltip="Phishing"/>
               </a:rPr>
               <a:t>phishing</a:t>
             </a:r>
@@ -2557,7 +2558,7 @@
                 <a:latin typeface="+mn-lt"/>
                 <a:ea typeface="+mn-ea"/>
                 <a:cs typeface="+mn-cs"/>
-                <a:hlinkClick r:id="rId16" tooltip="Brute force method"/>
+                <a:hlinkClick r:id="rId13" tooltip="Brute force method"/>
               </a:rPr>
               <a:t>brute-force</a:t>
             </a:r>
@@ -2582,7 +2583,7 @@
                 <a:latin typeface="+mn-lt"/>
                 <a:ea typeface="+mn-ea"/>
                 <a:cs typeface="+mn-cs"/>
-                <a:hlinkClick r:id="rId17"/>
+                <a:hlinkClick r:id="rId14"/>
               </a:rPr>
               <a:t>[</a:t>
             </a:r>
@@ -2641,7 +2642,7 @@
                 <a:latin typeface="+mn-lt"/>
                 <a:ea typeface="+mn-ea"/>
                 <a:cs typeface="+mn-cs"/>
-                <a:hlinkClick r:id="rId18" tooltip="Agujero de seguridad"/>
+                <a:hlinkClick r:id="rId15" tooltip="Agujero de seguridad"/>
               </a:rPr>
               <a:t>agujero de seguridad</a:t>
             </a:r>
@@ -2690,7 +2691,7 @@
                 <a:latin typeface="+mn-lt"/>
                 <a:ea typeface="+mn-ea"/>
                 <a:cs typeface="+mn-cs"/>
-                <a:hlinkClick r:id="rId19" tooltip="Biblioteca (programación)"/>
+                <a:hlinkClick r:id="rId16" tooltip="Biblioteca (programación)"/>
               </a:rPr>
               <a:t>biblioteca</a:t>
             </a:r>
@@ -2715,7 +2716,7 @@
                 <a:latin typeface="+mn-lt"/>
                 <a:ea typeface="+mn-ea"/>
                 <a:cs typeface="+mn-cs"/>
-                <a:hlinkClick r:id="rId20" tooltip="OpenSSL"/>
+                <a:hlinkClick r:id="rId17" tooltip="OpenSSL"/>
               </a:rPr>
               <a:t>OpenSSL</a:t>
             </a:r>
@@ -2740,7 +2741,7 @@
                 <a:latin typeface="+mn-lt"/>
                 <a:ea typeface="+mn-ea"/>
                 <a:cs typeface="+mn-cs"/>
-                <a:hlinkClick r:id="rId21" tooltip="Memoria (informática)"/>
+                <a:hlinkClick r:id="rId18" tooltip="Memoria (informática)"/>
               </a:rPr>
               <a:t>memoria</a:t>
             </a:r>
@@ -2765,7 +2766,7 @@
                 <a:latin typeface="+mn-lt"/>
                 <a:ea typeface="+mn-ea"/>
                 <a:cs typeface="+mn-cs"/>
-                <a:hlinkClick r:id="rId22" tooltip="Criptografía asimétrica"/>
+                <a:hlinkClick r:id="rId19" tooltip="Criptografía asimétrica"/>
               </a:rPr>
               <a:t>claves privadas</a:t>
             </a:r>
@@ -2836,7 +2837,7 @@
     </p:spTree>
     <p:extLst>
       <p:ext uri="{BB962C8B-B14F-4D97-AF65-F5344CB8AC3E}">
-        <p14:creationId xmlns:p14="http://schemas.microsoft.com/office/powerpoint/2010/main" val="655676726"/>
+        <p14:creationId xmlns:p14="http://schemas.microsoft.com/office/powerpoint/2010/main" xmlns="" val="655676726"/>
       </p:ext>
     </p:extLst>
   </p:cSld>
@@ -3170,7 +3171,7 @@
     </p:spTree>
     <p:extLst>
       <p:ext uri="{BB962C8B-B14F-4D97-AF65-F5344CB8AC3E}">
-        <p14:creationId xmlns:p14="http://schemas.microsoft.com/office/powerpoint/2010/main" val="1629614161"/>
+        <p14:creationId xmlns:p14="http://schemas.microsoft.com/office/powerpoint/2010/main" xmlns="" val="1629614161"/>
       </p:ext>
     </p:extLst>
   </p:cSld>
@@ -3669,19 +3670,7 @@
                 <a:ea typeface="+mn-ea"/>
                 <a:cs typeface="+mn-cs"/>
               </a:rPr>
-              <a:t>Políticas de recuperación ante </a:t>
-            </a:r>
-            <a:r>
-              <a:rPr lang="es-AR" sz="1200" u="none" strike="noStrike" kern="1200" dirty="0" smtClean="0">
-                <a:solidFill>
-                  <a:schemeClr val="tx1"/>
-                </a:solidFill>
-                <a:effectLst/>
-                <a:latin typeface="+mn-lt"/>
-                <a:ea typeface="+mn-ea"/>
-                <a:cs typeface="+mn-cs"/>
-              </a:rPr>
-              <a:t>catástrofes</a:t>
+              <a:t>Políticas de recuperación ante catástrofes</a:t>
             </a:r>
             <a:endParaRPr lang="en-US" u="none" strike="noStrike" dirty="0" smtClean="0">
               <a:effectLst/>
@@ -3716,7 +3705,7 @@
     </p:spTree>
     <p:extLst>
       <p:ext uri="{BB962C8B-B14F-4D97-AF65-F5344CB8AC3E}">
-        <p14:creationId xmlns:p14="http://schemas.microsoft.com/office/powerpoint/2010/main" val="2488318766"/>
+        <p14:creationId xmlns:p14="http://schemas.microsoft.com/office/powerpoint/2010/main" xmlns="" val="2488318766"/>
       </p:ext>
     </p:extLst>
   </p:cSld>
@@ -4262,7 +4251,7 @@
     </p:spTree>
     <p:extLst>
       <p:ext uri="{BB962C8B-B14F-4D97-AF65-F5344CB8AC3E}">
-        <p14:creationId xmlns:p14="http://schemas.microsoft.com/office/powerpoint/2010/main" val="707643668"/>
+        <p14:creationId xmlns:p14="http://schemas.microsoft.com/office/powerpoint/2010/main" xmlns="" val="707643668"/>
       </p:ext>
     </p:extLst>
   </p:cSld>
@@ -4347,7 +4336,7 @@
     </p:spTree>
     <p:extLst>
       <p:ext uri="{BB962C8B-B14F-4D97-AF65-F5344CB8AC3E}">
-        <p14:creationId xmlns:p14="http://schemas.microsoft.com/office/powerpoint/2010/main" val="1554195"/>
+        <p14:creationId xmlns:p14="http://schemas.microsoft.com/office/powerpoint/2010/main" xmlns="" val="1554195"/>
       </p:ext>
     </p:extLst>
   </p:cSld>
@@ -4554,20 +4543,20 @@
     </p:spTree>
     <p:extLst>
       <p:ext uri="{BB962C8B-B14F-4D97-AF65-F5344CB8AC3E}">
-        <p14:creationId xmlns:p14="http://schemas.microsoft.com/office/powerpoint/2010/main" val="94999051"/>
+        <p14:creationId xmlns:p14="http://schemas.microsoft.com/office/powerpoint/2010/main" xmlns="" val="94999051"/>
       </p:ext>
     </p:extLst>
   </p:cSld>
   <p:clrMapOvr>
     <a:masterClrMapping/>
   </p:clrMapOvr>
-  <mc:AlternateContent xmlns:mc="http://schemas.openxmlformats.org/markup-compatibility/2006" xmlns:p14="http://schemas.microsoft.com/office/powerpoint/2010/main">
-    <mc:Choice Requires="p14">
+  <mc:AlternateContent xmlns:mc="http://schemas.openxmlformats.org/markup-compatibility/2006">
+    <mc:Choice xmlns:p14="http://schemas.microsoft.com/office/powerpoint/2010/main" xmlns="" Requires="p14">
       <p:transition spd="med" p14:dur="700">
         <p:fade/>
       </p:transition>
     </mc:Choice>
-    <mc:Fallback xmlns="">
+    <mc:Fallback>
       <p:transition spd="med">
         <p:fade/>
       </p:transition>
@@ -4745,20 +4734,20 @@
     </p:spTree>
     <p:extLst>
       <p:ext uri="{BB962C8B-B14F-4D97-AF65-F5344CB8AC3E}">
-        <p14:creationId xmlns:p14="http://schemas.microsoft.com/office/powerpoint/2010/main" val="460095310"/>
+        <p14:creationId xmlns:p14="http://schemas.microsoft.com/office/powerpoint/2010/main" xmlns="" val="460095310"/>
       </p:ext>
     </p:extLst>
   </p:cSld>
   <p:clrMapOvr>
     <a:masterClrMapping/>
   </p:clrMapOvr>
-  <mc:AlternateContent xmlns:mc="http://schemas.openxmlformats.org/markup-compatibility/2006" xmlns:p14="http://schemas.microsoft.com/office/powerpoint/2010/main">
-    <mc:Choice Requires="p14">
+  <mc:AlternateContent xmlns:mc="http://schemas.openxmlformats.org/markup-compatibility/2006">
+    <mc:Choice xmlns:p14="http://schemas.microsoft.com/office/powerpoint/2010/main" xmlns="" Requires="p14">
       <p:transition spd="med" p14:dur="700">
         <p:fade/>
       </p:transition>
     </mc:Choice>
-    <mc:Fallback xmlns="">
+    <mc:Fallback>
       <p:transition spd="med">
         <p:fade/>
       </p:transition>
@@ -4946,20 +4935,20 @@
     </p:spTree>
     <p:extLst>
       <p:ext uri="{BB962C8B-B14F-4D97-AF65-F5344CB8AC3E}">
-        <p14:creationId xmlns:p14="http://schemas.microsoft.com/office/powerpoint/2010/main" val="4079035419"/>
+        <p14:creationId xmlns:p14="http://schemas.microsoft.com/office/powerpoint/2010/main" xmlns="" val="4079035419"/>
       </p:ext>
     </p:extLst>
   </p:cSld>
   <p:clrMapOvr>
     <a:masterClrMapping/>
   </p:clrMapOvr>
-  <mc:AlternateContent xmlns:mc="http://schemas.openxmlformats.org/markup-compatibility/2006" xmlns:p14="http://schemas.microsoft.com/office/powerpoint/2010/main">
-    <mc:Choice Requires="p14">
+  <mc:AlternateContent xmlns:mc="http://schemas.openxmlformats.org/markup-compatibility/2006">
+    <mc:Choice xmlns:p14="http://schemas.microsoft.com/office/powerpoint/2010/main" xmlns="" Requires="p14">
       <p:transition spd="med" p14:dur="700">
         <p:fade/>
       </p:transition>
     </mc:Choice>
-    <mc:Fallback xmlns="">
+    <mc:Fallback>
       <p:transition spd="med">
         <p:fade/>
       </p:transition>
@@ -5144,20 +5133,20 @@
     </p:spTree>
     <p:extLst>
       <p:ext uri="{BB962C8B-B14F-4D97-AF65-F5344CB8AC3E}">
-        <p14:creationId xmlns:p14="http://schemas.microsoft.com/office/powerpoint/2010/main" val="2738254095"/>
+        <p14:creationId xmlns:p14="http://schemas.microsoft.com/office/powerpoint/2010/main" xmlns="" val="2738254095"/>
       </p:ext>
     </p:extLst>
   </p:cSld>
   <p:clrMapOvr>
     <a:masterClrMapping/>
   </p:clrMapOvr>
-  <mc:AlternateContent xmlns:mc="http://schemas.openxmlformats.org/markup-compatibility/2006" xmlns:p14="http://schemas.microsoft.com/office/powerpoint/2010/main">
-    <mc:Choice Requires="p14">
+  <mc:AlternateContent xmlns:mc="http://schemas.openxmlformats.org/markup-compatibility/2006">
+    <mc:Choice xmlns:p14="http://schemas.microsoft.com/office/powerpoint/2010/main" xmlns="" Requires="p14">
       <p:transition spd="med" p14:dur="700">
         <p:fade/>
       </p:transition>
     </mc:Choice>
-    <mc:Fallback xmlns="">
+    <mc:Fallback>
       <p:transition spd="med">
         <p:fade/>
       </p:transition>
@@ -5433,20 +5422,20 @@
     </p:spTree>
     <p:extLst>
       <p:ext uri="{BB962C8B-B14F-4D97-AF65-F5344CB8AC3E}">
-        <p14:creationId xmlns:p14="http://schemas.microsoft.com/office/powerpoint/2010/main" val="1761813311"/>
+        <p14:creationId xmlns:p14="http://schemas.microsoft.com/office/powerpoint/2010/main" xmlns="" val="1761813311"/>
       </p:ext>
     </p:extLst>
   </p:cSld>
   <p:clrMapOvr>
     <a:masterClrMapping/>
   </p:clrMapOvr>
-  <mc:AlternateContent xmlns:mc="http://schemas.openxmlformats.org/markup-compatibility/2006" xmlns:p14="http://schemas.microsoft.com/office/powerpoint/2010/main">
-    <mc:Choice Requires="p14">
+  <mc:AlternateContent xmlns:mc="http://schemas.openxmlformats.org/markup-compatibility/2006">
+    <mc:Choice xmlns:p14="http://schemas.microsoft.com/office/powerpoint/2010/main" xmlns="" Requires="p14">
       <p:transition spd="med" p14:dur="700">
         <p:fade/>
       </p:transition>
     </mc:Choice>
-    <mc:Fallback xmlns="">
+    <mc:Fallback>
       <p:transition spd="med">
         <p:fade/>
       </p:transition>
@@ -5746,20 +5735,20 @@
     </p:spTree>
     <p:extLst>
       <p:ext uri="{BB962C8B-B14F-4D97-AF65-F5344CB8AC3E}">
-        <p14:creationId xmlns:p14="http://schemas.microsoft.com/office/powerpoint/2010/main" val="2825340762"/>
+        <p14:creationId xmlns:p14="http://schemas.microsoft.com/office/powerpoint/2010/main" xmlns="" val="2825340762"/>
       </p:ext>
     </p:extLst>
   </p:cSld>
   <p:clrMapOvr>
     <a:masterClrMapping/>
   </p:clrMapOvr>
-  <mc:AlternateContent xmlns:mc="http://schemas.openxmlformats.org/markup-compatibility/2006" xmlns:p14="http://schemas.microsoft.com/office/powerpoint/2010/main">
-    <mc:Choice Requires="p14">
+  <mc:AlternateContent xmlns:mc="http://schemas.openxmlformats.org/markup-compatibility/2006">
+    <mc:Choice xmlns:p14="http://schemas.microsoft.com/office/powerpoint/2010/main" xmlns="" Requires="p14">
       <p:transition spd="med" p14:dur="700">
         <p:fade/>
       </p:transition>
     </mc:Choice>
-    <mc:Fallback xmlns="">
+    <mc:Fallback>
       <p:transition spd="med">
         <p:fade/>
       </p:transition>
@@ -6211,20 +6200,20 @@
     </p:spTree>
     <p:extLst>
       <p:ext uri="{BB962C8B-B14F-4D97-AF65-F5344CB8AC3E}">
-        <p14:creationId xmlns:p14="http://schemas.microsoft.com/office/powerpoint/2010/main" val="4208419506"/>
+        <p14:creationId xmlns:p14="http://schemas.microsoft.com/office/powerpoint/2010/main" xmlns="" val="4208419506"/>
       </p:ext>
     </p:extLst>
   </p:cSld>
   <p:clrMapOvr>
     <a:masterClrMapping/>
   </p:clrMapOvr>
-  <mc:AlternateContent xmlns:mc="http://schemas.openxmlformats.org/markup-compatibility/2006" xmlns:p14="http://schemas.microsoft.com/office/powerpoint/2010/main">
-    <mc:Choice Requires="p14">
+  <mc:AlternateContent xmlns:mc="http://schemas.openxmlformats.org/markup-compatibility/2006">
+    <mc:Choice xmlns:p14="http://schemas.microsoft.com/office/powerpoint/2010/main" xmlns="" Requires="p14">
       <p:transition spd="med" p14:dur="700">
         <p:fade/>
       </p:transition>
     </mc:Choice>
-    <mc:Fallback xmlns="">
+    <mc:Fallback>
       <p:transition spd="med">
         <p:fade/>
       </p:transition>
@@ -6350,20 +6339,20 @@
     </p:spTree>
     <p:extLst>
       <p:ext uri="{BB962C8B-B14F-4D97-AF65-F5344CB8AC3E}">
-        <p14:creationId xmlns:p14="http://schemas.microsoft.com/office/powerpoint/2010/main" val="1626631400"/>
+        <p14:creationId xmlns:p14="http://schemas.microsoft.com/office/powerpoint/2010/main" xmlns="" val="1626631400"/>
       </p:ext>
     </p:extLst>
   </p:cSld>
   <p:clrMapOvr>
     <a:masterClrMapping/>
   </p:clrMapOvr>
-  <mc:AlternateContent xmlns:mc="http://schemas.openxmlformats.org/markup-compatibility/2006" xmlns:p14="http://schemas.microsoft.com/office/powerpoint/2010/main">
-    <mc:Choice Requires="p14">
+  <mc:AlternateContent xmlns:mc="http://schemas.openxmlformats.org/markup-compatibility/2006">
+    <mc:Choice xmlns:p14="http://schemas.microsoft.com/office/powerpoint/2010/main" xmlns="" Requires="p14">
       <p:transition spd="med" p14:dur="700">
         <p:fade/>
       </p:transition>
     </mc:Choice>
-    <mc:Fallback xmlns="">
+    <mc:Fallback>
       <p:transition spd="med">
         <p:fade/>
       </p:transition>
@@ -6474,20 +6463,20 @@
     </p:spTree>
     <p:extLst>
       <p:ext uri="{BB962C8B-B14F-4D97-AF65-F5344CB8AC3E}">
-        <p14:creationId xmlns:p14="http://schemas.microsoft.com/office/powerpoint/2010/main" val="3607540120"/>
+        <p14:creationId xmlns:p14="http://schemas.microsoft.com/office/powerpoint/2010/main" xmlns="" val="3607540120"/>
       </p:ext>
     </p:extLst>
   </p:cSld>
   <p:clrMapOvr>
     <a:masterClrMapping/>
   </p:clrMapOvr>
-  <mc:AlternateContent xmlns:mc="http://schemas.openxmlformats.org/markup-compatibility/2006" xmlns:p14="http://schemas.microsoft.com/office/powerpoint/2010/main">
-    <mc:Choice Requires="p14">
+  <mc:AlternateContent xmlns:mc="http://schemas.openxmlformats.org/markup-compatibility/2006">
+    <mc:Choice xmlns:p14="http://schemas.microsoft.com/office/powerpoint/2010/main" xmlns="" Requires="p14">
       <p:transition spd="med" p14:dur="700">
         <p:fade/>
       </p:transition>
     </mc:Choice>
-    <mc:Fallback xmlns="">
+    <mc:Fallback>
       <p:transition spd="med">
         <p:fade/>
       </p:transition>
@@ -6805,20 +6794,20 @@
     </p:spTree>
     <p:extLst>
       <p:ext uri="{BB962C8B-B14F-4D97-AF65-F5344CB8AC3E}">
-        <p14:creationId xmlns:p14="http://schemas.microsoft.com/office/powerpoint/2010/main" val="2544981540"/>
+        <p14:creationId xmlns:p14="http://schemas.microsoft.com/office/powerpoint/2010/main" xmlns="" val="2544981540"/>
       </p:ext>
     </p:extLst>
   </p:cSld>
   <p:clrMapOvr>
     <a:masterClrMapping/>
   </p:clrMapOvr>
-  <mc:AlternateContent xmlns:mc="http://schemas.openxmlformats.org/markup-compatibility/2006" xmlns:p14="http://schemas.microsoft.com/office/powerpoint/2010/main">
-    <mc:Choice Requires="p14">
+  <mc:AlternateContent xmlns:mc="http://schemas.openxmlformats.org/markup-compatibility/2006">
+    <mc:Choice xmlns:p14="http://schemas.microsoft.com/office/powerpoint/2010/main" xmlns="" Requires="p14">
       <p:transition spd="med" p14:dur="700">
         <p:fade/>
       </p:transition>
     </mc:Choice>
-    <mc:Fallback xmlns="">
+    <mc:Fallback>
       <p:transition spd="med">
         <p:fade/>
       </p:transition>
@@ -7125,20 +7114,20 @@
     </p:spTree>
     <p:extLst>
       <p:ext uri="{BB962C8B-B14F-4D97-AF65-F5344CB8AC3E}">
-        <p14:creationId xmlns:p14="http://schemas.microsoft.com/office/powerpoint/2010/main" val="2249172152"/>
+        <p14:creationId xmlns:p14="http://schemas.microsoft.com/office/powerpoint/2010/main" xmlns="" val="2249172152"/>
       </p:ext>
     </p:extLst>
   </p:cSld>
   <p:clrMapOvr>
     <a:masterClrMapping/>
   </p:clrMapOvr>
-  <mc:AlternateContent xmlns:mc="http://schemas.openxmlformats.org/markup-compatibility/2006" xmlns:p14="http://schemas.microsoft.com/office/powerpoint/2010/main">
-    <mc:Choice Requires="p14">
+  <mc:AlternateContent xmlns:mc="http://schemas.openxmlformats.org/markup-compatibility/2006">
+    <mc:Choice xmlns:p14="http://schemas.microsoft.com/office/powerpoint/2010/main" xmlns="" Requires="p14">
       <p:transition spd="med" p14:dur="700">
         <p:fade/>
       </p:transition>
     </mc:Choice>
-    <mc:Fallback xmlns="">
+    <mc:Fallback>
       <p:transition spd="med">
         <p:fade/>
       </p:transition>
@@ -7404,7 +7393,7 @@
     </p:spTree>
     <p:extLst>
       <p:ext uri="{BB962C8B-B14F-4D97-AF65-F5344CB8AC3E}">
-        <p14:creationId xmlns:p14="http://schemas.microsoft.com/office/powerpoint/2010/main" val="1403059996"/>
+        <p14:creationId xmlns:p14="http://schemas.microsoft.com/office/powerpoint/2010/main" xmlns="" val="1403059996"/>
       </p:ext>
     </p:extLst>
   </p:cSld>
@@ -7422,13 +7411,13 @@
     <p:sldLayoutId id="2147483658" r:id="rId10"/>
     <p:sldLayoutId id="2147483659" r:id="rId11"/>
   </p:sldLayoutIdLst>
-  <mc:AlternateContent xmlns:mc="http://schemas.openxmlformats.org/markup-compatibility/2006" xmlns:p14="http://schemas.microsoft.com/office/powerpoint/2010/main">
-    <mc:Choice Requires="p14">
+  <mc:AlternateContent xmlns:mc="http://schemas.openxmlformats.org/markup-compatibility/2006">
+    <mc:Choice xmlns:p14="http://schemas.microsoft.com/office/powerpoint/2010/main" xmlns="" Requires="p14">
       <p:transition spd="med" p14:dur="700">
         <p:fade/>
       </p:transition>
     </mc:Choice>
-    <mc:Fallback xmlns="">
+    <mc:Fallback>
       <p:transition spd="med">
         <p:fade/>
       </p:transition>
@@ -7743,7 +7732,7 @@
   </p:txStyles>
   <p:extLst mod="1">
     <p:ext uri="{27BBF7A9-308A-43DC-89C8-2F10F3537804}">
-      <p15:sldGuideLst xmlns:p15="http://schemas.microsoft.com/office/powerpoint/2012/main">
+      <p15:sldGuideLst xmlns:p15="http://schemas.microsoft.com/office/powerpoint/2012/main" xmlns="">
         <p15:guide id="1" pos="3839" userDrawn="1">
           <p15:clr>
             <a:srgbClr val="F26B43"/>
@@ -7865,7 +7854,7 @@
           <a:blip r:embed="rId2" cstate="print">
             <a:extLst>
               <a:ext uri="{28A0092B-C50C-407E-A947-70E740481C1C}">
-                <a14:useLocalDpi xmlns:a14="http://schemas.microsoft.com/office/drawing/2010/main" val="0"/>
+                <a14:useLocalDpi xmlns:a14="http://schemas.microsoft.com/office/drawing/2010/main" xmlns="" val="0"/>
               </a:ext>
             </a:extLst>
           </a:blip>
@@ -7885,7 +7874,7 @@
           <a:noFill/>
           <a:extLst>
             <a:ext uri="{909E8E84-426E-40DD-AFC4-6F175D3DCCD1}">
-              <a14:hiddenFill xmlns:a14="http://schemas.microsoft.com/office/drawing/2010/main">
+              <a14:hiddenFill xmlns:a14="http://schemas.microsoft.com/office/drawing/2010/main" xmlns="">
                 <a:solidFill>
                   <a:srgbClr val="FFFFFF"/>
                 </a:solidFill>
@@ -7897,20 +7886,20 @@
     </p:spTree>
     <p:extLst>
       <p:ext uri="{BB962C8B-B14F-4D97-AF65-F5344CB8AC3E}">
-        <p14:creationId xmlns:p14="http://schemas.microsoft.com/office/powerpoint/2010/main" val="2808920126"/>
+        <p14:creationId xmlns:p14="http://schemas.microsoft.com/office/powerpoint/2010/main" xmlns="" val="2808920126"/>
       </p:ext>
     </p:extLst>
   </p:cSld>
   <p:clrMapOvr>
     <a:masterClrMapping/>
   </p:clrMapOvr>
-  <mc:AlternateContent xmlns:mc="http://schemas.openxmlformats.org/markup-compatibility/2006" xmlns:p14="http://schemas.microsoft.com/office/powerpoint/2010/main">
-    <mc:Choice Requires="p14">
+  <mc:AlternateContent xmlns:mc="http://schemas.openxmlformats.org/markup-compatibility/2006">
+    <mc:Choice xmlns:p14="http://schemas.microsoft.com/office/powerpoint/2010/main" xmlns="" Requires="p14">
       <p:transition spd="med" p14:dur="700">
         <p:fade/>
       </p:transition>
     </mc:Choice>
-    <mc:Fallback xmlns="">
+    <mc:Fallback>
       <p:transition spd="med">
         <p:fade/>
       </p:transition>
@@ -8148,20 +8137,20 @@
     </p:spTree>
     <p:extLst>
       <p:ext uri="{BB962C8B-B14F-4D97-AF65-F5344CB8AC3E}">
-        <p14:creationId xmlns:p14="http://schemas.microsoft.com/office/powerpoint/2010/main" val="4207303638"/>
+        <p14:creationId xmlns:p14="http://schemas.microsoft.com/office/powerpoint/2010/main" xmlns="" val="4207303638"/>
       </p:ext>
     </p:extLst>
   </p:cSld>
   <p:clrMapOvr>
     <a:masterClrMapping/>
   </p:clrMapOvr>
-  <mc:AlternateContent xmlns:mc="http://schemas.openxmlformats.org/markup-compatibility/2006" xmlns:p14="http://schemas.microsoft.com/office/powerpoint/2010/main">
-    <mc:Choice Requires="p14">
+  <mc:AlternateContent xmlns:mc="http://schemas.openxmlformats.org/markup-compatibility/2006">
+    <mc:Choice xmlns:p14="http://schemas.microsoft.com/office/powerpoint/2010/main" xmlns="" Requires="p14">
       <p:transition spd="med" p14:dur="700">
         <p:fade/>
       </p:transition>
     </mc:Choice>
-    <mc:Fallback xmlns="">
+    <mc:Fallback>
       <p:transition spd="med">
         <p:fade/>
       </p:transition>
@@ -8255,20 +8244,20 @@
     </p:spTree>
     <p:extLst>
       <p:ext uri="{BB962C8B-B14F-4D97-AF65-F5344CB8AC3E}">
-        <p14:creationId xmlns:p14="http://schemas.microsoft.com/office/powerpoint/2010/main" val="3772183175"/>
+        <p14:creationId xmlns:p14="http://schemas.microsoft.com/office/powerpoint/2010/main" xmlns="" val="3772183175"/>
       </p:ext>
     </p:extLst>
   </p:cSld>
   <p:clrMapOvr>
     <a:masterClrMapping/>
   </p:clrMapOvr>
-  <mc:AlternateContent xmlns:mc="http://schemas.openxmlformats.org/markup-compatibility/2006" xmlns:p14="http://schemas.microsoft.com/office/powerpoint/2010/main">
-    <mc:Choice Requires="p14">
+  <mc:AlternateContent xmlns:mc="http://schemas.openxmlformats.org/markup-compatibility/2006">
+    <mc:Choice xmlns:p14="http://schemas.microsoft.com/office/powerpoint/2010/main" xmlns="" Requires="p14">
       <p:transition spd="med" p14:dur="700">
         <p:fade/>
       </p:transition>
     </mc:Choice>
-    <mc:Fallback xmlns="">
+    <mc:Fallback>
       <p:transition spd="med">
         <p:fade/>
       </p:transition>
@@ -8476,20 +8465,20 @@
     </p:spTree>
     <p:extLst>
       <p:ext uri="{BB962C8B-B14F-4D97-AF65-F5344CB8AC3E}">
-        <p14:creationId xmlns:p14="http://schemas.microsoft.com/office/powerpoint/2010/main" val="911844652"/>
+        <p14:creationId xmlns:p14="http://schemas.microsoft.com/office/powerpoint/2010/main" xmlns="" val="911844652"/>
       </p:ext>
     </p:extLst>
   </p:cSld>
   <p:clrMapOvr>
     <a:masterClrMapping/>
   </p:clrMapOvr>
-  <mc:AlternateContent xmlns:mc="http://schemas.openxmlformats.org/markup-compatibility/2006" xmlns:p14="http://schemas.microsoft.com/office/powerpoint/2010/main">
-    <mc:Choice Requires="p14">
+  <mc:AlternateContent xmlns:mc="http://schemas.openxmlformats.org/markup-compatibility/2006">
+    <mc:Choice xmlns:p14="http://schemas.microsoft.com/office/powerpoint/2010/main" xmlns="" Requires="p14">
       <p:transition spd="med" p14:dur="700">
         <p:fade/>
       </p:transition>
     </mc:Choice>
-    <mc:Fallback xmlns="">
+    <mc:Fallback>
       <p:transition spd="med">
         <p:fade/>
       </p:transition>
@@ -8659,20 +8648,20 @@
     </p:spTree>
     <p:extLst>
       <p:ext uri="{BB962C8B-B14F-4D97-AF65-F5344CB8AC3E}">
-        <p14:creationId xmlns:p14="http://schemas.microsoft.com/office/powerpoint/2010/main" val="3751154171"/>
+        <p14:creationId xmlns:p14="http://schemas.microsoft.com/office/powerpoint/2010/main" xmlns="" val="3751154171"/>
       </p:ext>
     </p:extLst>
   </p:cSld>
   <p:clrMapOvr>
     <a:masterClrMapping/>
   </p:clrMapOvr>
-  <mc:AlternateContent xmlns:mc="http://schemas.openxmlformats.org/markup-compatibility/2006" xmlns:p14="http://schemas.microsoft.com/office/powerpoint/2010/main">
-    <mc:Choice Requires="p14">
+  <mc:AlternateContent xmlns:mc="http://schemas.openxmlformats.org/markup-compatibility/2006">
+    <mc:Choice xmlns:p14="http://schemas.microsoft.com/office/powerpoint/2010/main" xmlns="" Requires="p14">
       <p:transition spd="med" p14:dur="700">
         <p:fade/>
       </p:transition>
     </mc:Choice>
-    <mc:Fallback xmlns="">
+    <mc:Fallback>
       <p:transition spd="med">
         <p:fade/>
       </p:transition>
@@ -8844,20 +8833,20 @@
     </p:spTree>
     <p:extLst>
       <p:ext uri="{BB962C8B-B14F-4D97-AF65-F5344CB8AC3E}">
-        <p14:creationId xmlns:p14="http://schemas.microsoft.com/office/powerpoint/2010/main" val="2714171304"/>
+        <p14:creationId xmlns:p14="http://schemas.microsoft.com/office/powerpoint/2010/main" xmlns="" val="2714171304"/>
       </p:ext>
     </p:extLst>
   </p:cSld>
   <p:clrMapOvr>
     <a:masterClrMapping/>
   </p:clrMapOvr>
-  <mc:AlternateContent xmlns:mc="http://schemas.openxmlformats.org/markup-compatibility/2006" xmlns:p14="http://schemas.microsoft.com/office/powerpoint/2010/main">
-    <mc:Choice Requires="p14">
+  <mc:AlternateContent xmlns:mc="http://schemas.openxmlformats.org/markup-compatibility/2006">
+    <mc:Choice xmlns:p14="http://schemas.microsoft.com/office/powerpoint/2010/main" xmlns="" Requires="p14">
       <p:transition spd="med" p14:dur="700">
         <p:fade/>
       </p:transition>
     </mc:Choice>
-    <mc:Fallback xmlns="">
+    <mc:Fallback>
       <p:transition spd="med">
         <p:fade/>
       </p:transition>
@@ -9030,20 +9019,20 @@
     </p:spTree>
     <p:extLst>
       <p:ext uri="{BB962C8B-B14F-4D97-AF65-F5344CB8AC3E}">
-        <p14:creationId xmlns:p14="http://schemas.microsoft.com/office/powerpoint/2010/main" val="2246987516"/>
+        <p14:creationId xmlns:p14="http://schemas.microsoft.com/office/powerpoint/2010/main" xmlns="" val="2246987516"/>
       </p:ext>
     </p:extLst>
   </p:cSld>
   <p:clrMapOvr>
     <a:masterClrMapping/>
   </p:clrMapOvr>
-  <mc:AlternateContent xmlns:mc="http://schemas.openxmlformats.org/markup-compatibility/2006" xmlns:p14="http://schemas.microsoft.com/office/powerpoint/2010/main">
-    <mc:Choice Requires="p14">
+  <mc:AlternateContent xmlns:mc="http://schemas.openxmlformats.org/markup-compatibility/2006">
+    <mc:Choice xmlns:p14="http://schemas.microsoft.com/office/powerpoint/2010/main" xmlns="" Requires="p14">
       <p:transition spd="med" p14:dur="700">
         <p:fade/>
       </p:transition>
     </mc:Choice>
-    <mc:Fallback xmlns="">
+    <mc:Fallback>
       <p:transition spd="med">
         <p:fade/>
       </p:transition>
@@ -9195,20 +9184,20 @@
     </p:spTree>
     <p:extLst>
       <p:ext uri="{BB962C8B-B14F-4D97-AF65-F5344CB8AC3E}">
-        <p14:creationId xmlns:p14="http://schemas.microsoft.com/office/powerpoint/2010/main" val="3025649002"/>
+        <p14:creationId xmlns:p14="http://schemas.microsoft.com/office/powerpoint/2010/main" xmlns="" val="3025649002"/>
       </p:ext>
     </p:extLst>
   </p:cSld>
   <p:clrMapOvr>
     <a:masterClrMapping/>
   </p:clrMapOvr>
-  <mc:AlternateContent xmlns:mc="http://schemas.openxmlformats.org/markup-compatibility/2006" xmlns:p14="http://schemas.microsoft.com/office/powerpoint/2010/main">
-    <mc:Choice Requires="p14">
+  <mc:AlternateContent xmlns:mc="http://schemas.openxmlformats.org/markup-compatibility/2006">
+    <mc:Choice xmlns:p14="http://schemas.microsoft.com/office/powerpoint/2010/main" xmlns="" Requires="p14">
       <p:transition spd="med" p14:dur="700">
         <p:fade/>
       </p:transition>
     </mc:Choice>
-    <mc:Fallback xmlns="">
+    <mc:Fallback>
       <p:transition spd="med">
         <p:fade/>
       </p:transition>
@@ -9339,20 +9328,20 @@
     </p:spTree>
     <p:extLst>
       <p:ext uri="{BB962C8B-B14F-4D97-AF65-F5344CB8AC3E}">
-        <p14:creationId xmlns:p14="http://schemas.microsoft.com/office/powerpoint/2010/main" val="3410413250"/>
+        <p14:creationId xmlns:p14="http://schemas.microsoft.com/office/powerpoint/2010/main" xmlns="" val="3410413250"/>
       </p:ext>
     </p:extLst>
   </p:cSld>
   <p:clrMapOvr>
     <a:masterClrMapping/>
   </p:clrMapOvr>
-  <mc:AlternateContent xmlns:mc="http://schemas.openxmlformats.org/markup-compatibility/2006" xmlns:p14="http://schemas.microsoft.com/office/powerpoint/2010/main">
-    <mc:Choice Requires="p14">
+  <mc:AlternateContent xmlns:mc="http://schemas.openxmlformats.org/markup-compatibility/2006">
+    <mc:Choice xmlns:p14="http://schemas.microsoft.com/office/powerpoint/2010/main" xmlns="" Requires="p14">
       <p:transition spd="med" p14:dur="700">
         <p:fade/>
       </p:transition>
     </mc:Choice>
-    <mc:Fallback xmlns="">
+    <mc:Fallback>
       <p:transition spd="med">
         <p:fade/>
       </p:transition>
@@ -9552,20 +9541,20 @@
     </p:spTree>
     <p:extLst>
       <p:ext uri="{BB962C8B-B14F-4D97-AF65-F5344CB8AC3E}">
-        <p14:creationId xmlns:p14="http://schemas.microsoft.com/office/powerpoint/2010/main" val="23673588"/>
+        <p14:creationId xmlns:p14="http://schemas.microsoft.com/office/powerpoint/2010/main" xmlns="" val="23673588"/>
       </p:ext>
     </p:extLst>
   </p:cSld>
   <p:clrMapOvr>
     <a:masterClrMapping/>
   </p:clrMapOvr>
-  <mc:AlternateContent xmlns:mc="http://schemas.openxmlformats.org/markup-compatibility/2006" xmlns:p14="http://schemas.microsoft.com/office/powerpoint/2010/main">
-    <mc:Choice Requires="p14">
+  <mc:AlternateContent xmlns:mc="http://schemas.openxmlformats.org/markup-compatibility/2006">
+    <mc:Choice xmlns:p14="http://schemas.microsoft.com/office/powerpoint/2010/main" xmlns="" Requires="p14">
       <p:transition spd="med" p14:dur="700">
         <p:fade/>
       </p:transition>
     </mc:Choice>
-    <mc:Fallback xmlns="">
+    <mc:Fallback>
       <p:transition spd="med">
         <p:fade/>
       </p:transition>
@@ -9824,20 +9813,20 @@
     </p:spTree>
     <p:extLst>
       <p:ext uri="{BB962C8B-B14F-4D97-AF65-F5344CB8AC3E}">
-        <p14:creationId xmlns:p14="http://schemas.microsoft.com/office/powerpoint/2010/main" val="3632379430"/>
+        <p14:creationId xmlns:p14="http://schemas.microsoft.com/office/powerpoint/2010/main" xmlns="" val="3632379430"/>
       </p:ext>
     </p:extLst>
   </p:cSld>
   <p:clrMapOvr>
     <a:masterClrMapping/>
   </p:clrMapOvr>
-  <mc:AlternateContent xmlns:mc="http://schemas.openxmlformats.org/markup-compatibility/2006" xmlns:p14="http://schemas.microsoft.com/office/powerpoint/2010/main">
-    <mc:Choice Requires="p14">
+  <mc:AlternateContent xmlns:mc="http://schemas.openxmlformats.org/markup-compatibility/2006">
+    <mc:Choice xmlns:p14="http://schemas.microsoft.com/office/powerpoint/2010/main" xmlns="" Requires="p14">
       <p:transition spd="med" p14:dur="700">
         <p:fade/>
       </p:transition>
     </mc:Choice>
-    <mc:Fallback xmlns="">
+    <mc:Fallback>
       <p:transition spd="med">
         <p:fade/>
       </p:transition>
@@ -9989,20 +9978,20 @@
     </p:spTree>
     <p:extLst>
       <p:ext uri="{BB962C8B-B14F-4D97-AF65-F5344CB8AC3E}">
-        <p14:creationId xmlns:p14="http://schemas.microsoft.com/office/powerpoint/2010/main" val="2139132589"/>
+        <p14:creationId xmlns:p14="http://schemas.microsoft.com/office/powerpoint/2010/main" xmlns="" val="2139132589"/>
       </p:ext>
     </p:extLst>
   </p:cSld>
   <p:clrMapOvr>
     <a:masterClrMapping/>
   </p:clrMapOvr>
-  <mc:AlternateContent xmlns:mc="http://schemas.openxmlformats.org/markup-compatibility/2006" xmlns:p14="http://schemas.microsoft.com/office/powerpoint/2010/main">
-    <mc:Choice Requires="p14">
+  <mc:AlternateContent xmlns:mc="http://schemas.openxmlformats.org/markup-compatibility/2006">
+    <mc:Choice xmlns:p14="http://schemas.microsoft.com/office/powerpoint/2010/main" xmlns="" Requires="p14">
       <p:transition spd="med" p14:dur="700">
         <p:fade/>
       </p:transition>
     </mc:Choice>
-    <mc:Fallback xmlns="">
+    <mc:Fallback>
       <p:transition spd="med">
         <p:fade/>
       </p:transition>
@@ -10230,20 +10219,20 @@
     </p:spTree>
     <p:extLst>
       <p:ext uri="{BB962C8B-B14F-4D97-AF65-F5344CB8AC3E}">
-        <p14:creationId xmlns:p14="http://schemas.microsoft.com/office/powerpoint/2010/main" val="3204325395"/>
+        <p14:creationId xmlns:p14="http://schemas.microsoft.com/office/powerpoint/2010/main" xmlns="" val="3204325395"/>
       </p:ext>
     </p:extLst>
   </p:cSld>
   <p:clrMapOvr>
     <a:masterClrMapping/>
   </p:clrMapOvr>
-  <mc:AlternateContent xmlns:mc="http://schemas.openxmlformats.org/markup-compatibility/2006" xmlns:p14="http://schemas.microsoft.com/office/powerpoint/2010/main">
-    <mc:Choice Requires="p14">
+  <mc:AlternateContent xmlns:mc="http://schemas.openxmlformats.org/markup-compatibility/2006">
+    <mc:Choice xmlns:p14="http://schemas.microsoft.com/office/powerpoint/2010/main" xmlns="" Requires="p14">
       <p:transition spd="med" p14:dur="700">
         <p:fade/>
       </p:transition>
     </mc:Choice>
-    <mc:Fallback xmlns="">
+    <mc:Fallback>
       <p:transition spd="med">
         <p:fade/>
       </p:transition>
@@ -10429,20 +10418,20 @@
     </p:spTree>
     <p:extLst>
       <p:ext uri="{BB962C8B-B14F-4D97-AF65-F5344CB8AC3E}">
-        <p14:creationId xmlns:p14="http://schemas.microsoft.com/office/powerpoint/2010/main" val="1496383053"/>
+        <p14:creationId xmlns:p14="http://schemas.microsoft.com/office/powerpoint/2010/main" xmlns="" val="1496383053"/>
       </p:ext>
     </p:extLst>
   </p:cSld>
   <p:clrMapOvr>
     <a:masterClrMapping/>
   </p:clrMapOvr>
-  <mc:AlternateContent xmlns:mc="http://schemas.openxmlformats.org/markup-compatibility/2006" xmlns:p14="http://schemas.microsoft.com/office/powerpoint/2010/main">
-    <mc:Choice Requires="p14">
+  <mc:AlternateContent xmlns:mc="http://schemas.openxmlformats.org/markup-compatibility/2006">
+    <mc:Choice xmlns:p14="http://schemas.microsoft.com/office/powerpoint/2010/main" xmlns="" Requires="p14">
       <p:transition spd="med" p14:dur="700">
         <p:fade/>
       </p:transition>
     </mc:Choice>
-    <mc:Fallback xmlns="">
+    <mc:Fallback>
       <p:transition spd="med">
         <p:fade/>
       </p:transition>
@@ -10652,20 +10641,20 @@
     </p:spTree>
     <p:extLst>
       <p:ext uri="{BB962C8B-B14F-4D97-AF65-F5344CB8AC3E}">
-        <p14:creationId xmlns:p14="http://schemas.microsoft.com/office/powerpoint/2010/main" val="1679218424"/>
+        <p14:creationId xmlns:p14="http://schemas.microsoft.com/office/powerpoint/2010/main" xmlns="" val="1679218424"/>
       </p:ext>
     </p:extLst>
   </p:cSld>
   <p:clrMapOvr>
     <a:masterClrMapping/>
   </p:clrMapOvr>
-  <mc:AlternateContent xmlns:mc="http://schemas.openxmlformats.org/markup-compatibility/2006" xmlns:p14="http://schemas.microsoft.com/office/powerpoint/2010/main">
-    <mc:Choice Requires="p14">
+  <mc:AlternateContent xmlns:mc="http://schemas.openxmlformats.org/markup-compatibility/2006">
+    <mc:Choice xmlns:p14="http://schemas.microsoft.com/office/powerpoint/2010/main" xmlns="" Requires="p14">
       <p:transition spd="med" p14:dur="700">
         <p:fade/>
       </p:transition>
     </mc:Choice>
-    <mc:Fallback xmlns="">
+    <mc:Fallback>
       <p:transition spd="med">
         <p:fade/>
       </p:transition>
@@ -10903,13 +10892,13 @@
   <p:clrMapOvr>
     <a:masterClrMapping/>
   </p:clrMapOvr>
-  <mc:AlternateContent xmlns:mc="http://schemas.openxmlformats.org/markup-compatibility/2006" xmlns:p14="http://schemas.microsoft.com/office/powerpoint/2010/main">
-    <mc:Choice Requires="p14">
+  <mc:AlternateContent xmlns:mc="http://schemas.openxmlformats.org/markup-compatibility/2006">
+    <mc:Choice xmlns:p14="http://schemas.microsoft.com/office/powerpoint/2010/main" xmlns="" Requires="p14">
       <p:transition spd="med" p14:dur="700">
         <p:fade/>
       </p:transition>
     </mc:Choice>
-    <mc:Fallback xmlns="">
+    <mc:Fallback>
       <p:transition spd="med">
         <p:fade/>
       </p:transition>
@@ -11133,13 +11122,13 @@
   <p:clrMapOvr>
     <a:masterClrMapping/>
   </p:clrMapOvr>
-  <mc:AlternateContent xmlns:mc="http://schemas.openxmlformats.org/markup-compatibility/2006" xmlns:p14="http://schemas.microsoft.com/office/powerpoint/2010/main">
-    <mc:Choice Requires="p14">
+  <mc:AlternateContent xmlns:mc="http://schemas.openxmlformats.org/markup-compatibility/2006">
+    <mc:Choice xmlns:p14="http://schemas.microsoft.com/office/powerpoint/2010/main" xmlns="" Requires="p14">
       <p:transition spd="med" p14:dur="700">
         <p:fade/>
       </p:transition>
     </mc:Choice>
-    <mc:Fallback xmlns="">
+    <mc:Fallback>
       <p:transition spd="med">
         <p:fade/>
       </p:transition>
@@ -11233,20 +11222,20 @@
     </p:spTree>
     <p:extLst>
       <p:ext uri="{BB962C8B-B14F-4D97-AF65-F5344CB8AC3E}">
-        <p14:creationId xmlns:p14="http://schemas.microsoft.com/office/powerpoint/2010/main" val="3439397754"/>
+        <p14:creationId xmlns:p14="http://schemas.microsoft.com/office/powerpoint/2010/main" xmlns="" val="3439397754"/>
       </p:ext>
     </p:extLst>
   </p:cSld>
   <p:clrMapOvr>
     <a:masterClrMapping/>
   </p:clrMapOvr>
-  <mc:AlternateContent xmlns:mc="http://schemas.openxmlformats.org/markup-compatibility/2006" xmlns:p14="http://schemas.microsoft.com/office/powerpoint/2010/main">
-    <mc:Choice Requires="p14">
+  <mc:AlternateContent xmlns:mc="http://schemas.openxmlformats.org/markup-compatibility/2006">
+    <mc:Choice xmlns:p14="http://schemas.microsoft.com/office/powerpoint/2010/main" xmlns="" Requires="p14">
       <p:transition spd="med" p14:dur="700">
         <p:fade/>
       </p:transition>
     </mc:Choice>
-    <mc:Fallback xmlns="">
+    <mc:Fallback>
       <p:transition spd="med">
         <p:fade/>
       </p:transition>
@@ -11415,20 +11404,20 @@
     </p:spTree>
     <p:extLst>
       <p:ext uri="{BB962C8B-B14F-4D97-AF65-F5344CB8AC3E}">
-        <p14:creationId xmlns:p14="http://schemas.microsoft.com/office/powerpoint/2010/main" val="2675216716"/>
+        <p14:creationId xmlns:p14="http://schemas.microsoft.com/office/powerpoint/2010/main" xmlns="" val="2675216716"/>
       </p:ext>
     </p:extLst>
   </p:cSld>
   <p:clrMapOvr>
     <a:masterClrMapping/>
   </p:clrMapOvr>
-  <mc:AlternateContent xmlns:mc="http://schemas.openxmlformats.org/markup-compatibility/2006" xmlns:p14="http://schemas.microsoft.com/office/powerpoint/2010/main">
-    <mc:Choice Requires="p14">
+  <mc:AlternateContent xmlns:mc="http://schemas.openxmlformats.org/markup-compatibility/2006">
+    <mc:Choice xmlns:p14="http://schemas.microsoft.com/office/powerpoint/2010/main" xmlns="" Requires="p14">
       <p:transition spd="med" p14:dur="700">
         <p:fade/>
       </p:transition>
     </mc:Choice>
-    <mc:Fallback xmlns="">
+    <mc:Fallback>
       <p:transition spd="med">
         <p:fade/>
       </p:transition>
@@ -11890,7 +11879,7 @@
           <a:blip r:embed="rId3" cstate="print">
             <a:extLst>
               <a:ext uri="{28A0092B-C50C-407E-A947-70E740481C1C}">
-                <a14:useLocalDpi xmlns:a14="http://schemas.microsoft.com/office/drawing/2010/main" val="0"/>
+                <a14:useLocalDpi xmlns:a14="http://schemas.microsoft.com/office/drawing/2010/main" xmlns="" val="0"/>
               </a:ext>
             </a:extLst>
           </a:blip>
@@ -11910,7 +11899,7 @@
           <a:noFill/>
           <a:extLst>
             <a:ext uri="{909E8E84-426E-40DD-AFC4-6F175D3DCCD1}">
-              <a14:hiddenFill xmlns:a14="http://schemas.microsoft.com/office/drawing/2010/main">
+              <a14:hiddenFill xmlns:a14="http://schemas.microsoft.com/office/drawing/2010/main" xmlns="">
                 <a:solidFill>
                   <a:srgbClr val="FFFFFF"/>
                 </a:solidFill>
@@ -11931,7 +11920,7 @@
           <a:blip r:embed="rId4" cstate="print">
             <a:extLst>
               <a:ext uri="{28A0092B-C50C-407E-A947-70E740481C1C}">
-                <a14:useLocalDpi xmlns:a14="http://schemas.microsoft.com/office/drawing/2010/main" val="0"/>
+                <a14:useLocalDpi xmlns:a14="http://schemas.microsoft.com/office/drawing/2010/main" xmlns="" val="0"/>
               </a:ext>
             </a:extLst>
           </a:blip>
@@ -11951,7 +11940,7 @@
           <a:noFill/>
           <a:extLst>
             <a:ext uri="{909E8E84-426E-40DD-AFC4-6F175D3DCCD1}">
-              <a14:hiddenFill xmlns:a14="http://schemas.microsoft.com/office/drawing/2010/main">
+              <a14:hiddenFill xmlns:a14="http://schemas.microsoft.com/office/drawing/2010/main" xmlns="">
                 <a:solidFill>
                   <a:srgbClr val="FFFFFF"/>
                 </a:solidFill>
@@ -11972,7 +11961,7 @@
           <a:blip r:embed="rId5" cstate="print">
             <a:extLst>
               <a:ext uri="{28A0092B-C50C-407E-A947-70E740481C1C}">
-                <a14:useLocalDpi xmlns:a14="http://schemas.microsoft.com/office/drawing/2010/main" val="0"/>
+                <a14:useLocalDpi xmlns:a14="http://schemas.microsoft.com/office/drawing/2010/main" xmlns="" val="0"/>
               </a:ext>
             </a:extLst>
           </a:blip>
@@ -11992,7 +11981,7 @@
           <a:noFill/>
           <a:extLst>
             <a:ext uri="{909E8E84-426E-40DD-AFC4-6F175D3DCCD1}">
-              <a14:hiddenFill xmlns:a14="http://schemas.microsoft.com/office/drawing/2010/main">
+              <a14:hiddenFill xmlns:a14="http://schemas.microsoft.com/office/drawing/2010/main" xmlns="">
                 <a:solidFill>
                   <a:srgbClr val="FFFFFF"/>
                 </a:solidFill>
@@ -12013,7 +12002,7 @@
           <a:blip r:embed="rId6" cstate="print">
             <a:extLst>
               <a:ext uri="{28A0092B-C50C-407E-A947-70E740481C1C}">
-                <a14:useLocalDpi xmlns:a14="http://schemas.microsoft.com/office/drawing/2010/main" val="0"/>
+                <a14:useLocalDpi xmlns:a14="http://schemas.microsoft.com/office/drawing/2010/main" xmlns="" val="0"/>
               </a:ext>
             </a:extLst>
           </a:blip>
@@ -12033,7 +12022,7 @@
           <a:noFill/>
           <a:extLst>
             <a:ext uri="{909E8E84-426E-40DD-AFC4-6F175D3DCCD1}">
-              <a14:hiddenFill xmlns:a14="http://schemas.microsoft.com/office/drawing/2010/main">
+              <a14:hiddenFill xmlns:a14="http://schemas.microsoft.com/office/drawing/2010/main" xmlns="">
                 <a:solidFill>
                   <a:srgbClr val="FFFFFF"/>
                 </a:solidFill>
@@ -12054,7 +12043,7 @@
           <a:blip r:embed="rId7" cstate="print">
             <a:extLst>
               <a:ext uri="{28A0092B-C50C-407E-A947-70E740481C1C}">
-                <a14:useLocalDpi xmlns:a14="http://schemas.microsoft.com/office/drawing/2010/main" val="0"/>
+                <a14:useLocalDpi xmlns:a14="http://schemas.microsoft.com/office/drawing/2010/main" xmlns="" val="0"/>
               </a:ext>
             </a:extLst>
           </a:blip>
@@ -12074,7 +12063,7 @@
           <a:noFill/>
           <a:extLst>
             <a:ext uri="{909E8E84-426E-40DD-AFC4-6F175D3DCCD1}">
-              <a14:hiddenFill xmlns:a14="http://schemas.microsoft.com/office/drawing/2010/main">
+              <a14:hiddenFill xmlns:a14="http://schemas.microsoft.com/office/drawing/2010/main" xmlns="">
                 <a:solidFill>
                   <a:srgbClr val="FFFFFF"/>
                 </a:solidFill>
@@ -12086,20 +12075,20 @@
     </p:spTree>
     <p:extLst>
       <p:ext uri="{BB962C8B-B14F-4D97-AF65-F5344CB8AC3E}">
-        <p14:creationId xmlns:p14="http://schemas.microsoft.com/office/powerpoint/2010/main" val="2564182459"/>
+        <p14:creationId xmlns:p14="http://schemas.microsoft.com/office/powerpoint/2010/main" xmlns="" val="2564182459"/>
       </p:ext>
     </p:extLst>
   </p:cSld>
   <p:clrMapOvr>
     <a:masterClrMapping/>
   </p:clrMapOvr>
-  <mc:AlternateContent xmlns:mc="http://schemas.openxmlformats.org/markup-compatibility/2006" xmlns:p14="http://schemas.microsoft.com/office/powerpoint/2010/main">
-    <mc:Choice Requires="p14">
+  <mc:AlternateContent xmlns:mc="http://schemas.openxmlformats.org/markup-compatibility/2006">
+    <mc:Choice xmlns:p14="http://schemas.microsoft.com/office/powerpoint/2010/main" xmlns="" Requires="p14">
       <p:transition spd="med" p14:dur="700">
         <p:fade/>
       </p:transition>
     </mc:Choice>
-    <mc:Fallback xmlns="">
+    <mc:Fallback>
       <p:transition spd="med">
         <p:fade/>
       </p:transition>
@@ -12252,30 +12241,26 @@
               </a:rPr>
               <a:t>Robo de información</a:t>
             </a:r>
-            <a:endParaRPr lang="es-AR" dirty="0" smtClean="0">
-              <a:latin typeface="Segoe UI" panose="020B0502040204020203" pitchFamily="34" charset="0"/>
-              <a:cs typeface="Segoe UI" panose="020B0502040204020203" pitchFamily="34" charset="0"/>
-            </a:endParaRPr>
           </a:p>
         </p:txBody>
       </p:sp>
     </p:spTree>
     <p:extLst>
       <p:ext uri="{BB962C8B-B14F-4D97-AF65-F5344CB8AC3E}">
-        <p14:creationId xmlns:p14="http://schemas.microsoft.com/office/powerpoint/2010/main" val="965594786"/>
+        <p14:creationId xmlns:p14="http://schemas.microsoft.com/office/powerpoint/2010/main" xmlns="" val="965594786"/>
       </p:ext>
     </p:extLst>
   </p:cSld>
   <p:clrMapOvr>
     <a:masterClrMapping/>
   </p:clrMapOvr>
-  <mc:AlternateContent xmlns:mc="http://schemas.openxmlformats.org/markup-compatibility/2006" xmlns:p14="http://schemas.microsoft.com/office/powerpoint/2010/main">
-    <mc:Choice Requires="p14">
+  <mc:AlternateContent xmlns:mc="http://schemas.openxmlformats.org/markup-compatibility/2006">
+    <mc:Choice xmlns:p14="http://schemas.microsoft.com/office/powerpoint/2010/main" xmlns="" Requires="p14">
       <p:transition spd="med" p14:dur="700">
         <p:fade/>
       </p:transition>
     </mc:Choice>
-    <mc:Fallback xmlns="">
+    <mc:Fallback>
       <p:transition spd="med">
         <p:fade/>
       </p:transition>
@@ -12533,7 +12518,7 @@
           <a:blip r:embed="rId3" cstate="print">
             <a:extLst>
               <a:ext uri="{28A0092B-C50C-407E-A947-70E740481C1C}">
-                <a14:useLocalDpi xmlns:a14="http://schemas.microsoft.com/office/drawing/2010/main" val="0"/>
+                <a14:useLocalDpi xmlns:a14="http://schemas.microsoft.com/office/drawing/2010/main" xmlns="" val="0"/>
               </a:ext>
             </a:extLst>
           </a:blip>
@@ -12553,7 +12538,7 @@
           <a:noFill/>
           <a:extLst>
             <a:ext uri="{909E8E84-426E-40DD-AFC4-6F175D3DCCD1}">
-              <a14:hiddenFill xmlns:a14="http://schemas.microsoft.com/office/drawing/2010/main">
+              <a14:hiddenFill xmlns:a14="http://schemas.microsoft.com/office/drawing/2010/main" xmlns="">
                 <a:solidFill>
                   <a:srgbClr val="FFFFFF"/>
                 </a:solidFill>
@@ -12565,20 +12550,20 @@
     </p:spTree>
     <p:extLst>
       <p:ext uri="{BB962C8B-B14F-4D97-AF65-F5344CB8AC3E}">
-        <p14:creationId xmlns:p14="http://schemas.microsoft.com/office/powerpoint/2010/main" val="3356351472"/>
+        <p14:creationId xmlns:p14="http://schemas.microsoft.com/office/powerpoint/2010/main" xmlns="" val="3356351472"/>
       </p:ext>
     </p:extLst>
   </p:cSld>
   <p:clrMapOvr>
     <a:masterClrMapping/>
   </p:clrMapOvr>
-  <mc:AlternateContent xmlns:mc="http://schemas.openxmlformats.org/markup-compatibility/2006" xmlns:p14="http://schemas.microsoft.com/office/powerpoint/2010/main">
-    <mc:Choice Requires="p14">
+  <mc:AlternateContent xmlns:mc="http://schemas.openxmlformats.org/markup-compatibility/2006">
+    <mc:Choice xmlns:p14="http://schemas.microsoft.com/office/powerpoint/2010/main" xmlns="" Requires="p14">
       <p:transition spd="med" p14:dur="700">
         <p:fade/>
       </p:transition>
     </mc:Choice>
-    <mc:Fallback xmlns="">
+    <mc:Fallback>
       <p:transition spd="med">
         <p:fade/>
       </p:transition>
@@ -12730,20 +12715,20 @@
     </p:spTree>
     <p:extLst>
       <p:ext uri="{BB962C8B-B14F-4D97-AF65-F5344CB8AC3E}">
-        <p14:creationId xmlns:p14="http://schemas.microsoft.com/office/powerpoint/2010/main" val="3106206852"/>
+        <p14:creationId xmlns:p14="http://schemas.microsoft.com/office/powerpoint/2010/main" xmlns="" val="3106206852"/>
       </p:ext>
     </p:extLst>
   </p:cSld>
   <p:clrMapOvr>
     <a:masterClrMapping/>
   </p:clrMapOvr>
-  <mc:AlternateContent xmlns:mc="http://schemas.openxmlformats.org/markup-compatibility/2006" xmlns:p14="http://schemas.microsoft.com/office/powerpoint/2010/main">
-    <mc:Choice Requires="p14">
+  <mc:AlternateContent xmlns:mc="http://schemas.openxmlformats.org/markup-compatibility/2006">
+    <mc:Choice xmlns:p14="http://schemas.microsoft.com/office/powerpoint/2010/main" xmlns="" Requires="p14">
       <p:transition spd="med" p14:dur="700">
         <p:fade/>
       </p:transition>
     </mc:Choice>
-    <mc:Fallback xmlns="">
+    <mc:Fallback>
       <p:transition spd="med">
         <p:fade/>
       </p:transition>
@@ -12954,19 +12939,8 @@
                 <a:latin typeface="Segoe UI" panose="020B0502040204020203" pitchFamily="34" charset="0"/>
                 <a:cs typeface="Segoe UI" panose="020B0502040204020203" pitchFamily="34" charset="0"/>
               </a:rPr>
-              <a:t>Uso de nombres en clave para los </a:t>
-            </a:r>
-            <a:r>
-              <a:rPr lang="es-AR" sz="2200" dirty="0" smtClean="0">
-                <a:latin typeface="Segoe UI" panose="020B0502040204020203" pitchFamily="34" charset="0"/>
-                <a:cs typeface="Segoe UI" panose="020B0502040204020203" pitchFamily="34" charset="0"/>
-              </a:rPr>
-              <a:t>proyectos</a:t>
-            </a:r>
-            <a:endParaRPr lang="es-AR" sz="2200" dirty="0" smtClean="0">
-              <a:latin typeface="Segoe UI" panose="020B0502040204020203" pitchFamily="34" charset="0"/>
-              <a:cs typeface="Segoe UI" panose="020B0502040204020203" pitchFamily="34" charset="0"/>
-            </a:endParaRPr>
+              <a:t>Uso de nombres en clave para los proyectos</a:t>
+            </a:r>
           </a:p>
         </p:txBody>
       </p:sp>
@@ -12982,7 +12956,7 @@
           <a:blip r:embed="rId3" cstate="print">
             <a:extLst>
               <a:ext uri="{28A0092B-C50C-407E-A947-70E740481C1C}">
-                <a14:useLocalDpi xmlns:a14="http://schemas.microsoft.com/office/drawing/2010/main" val="0"/>
+                <a14:useLocalDpi xmlns:a14="http://schemas.microsoft.com/office/drawing/2010/main" xmlns="" val="0"/>
               </a:ext>
             </a:extLst>
           </a:blip>
@@ -13002,7 +12976,7 @@
           <a:noFill/>
           <a:extLst>
             <a:ext uri="{909E8E84-426E-40DD-AFC4-6F175D3DCCD1}">
-              <a14:hiddenFill xmlns:a14="http://schemas.microsoft.com/office/drawing/2010/main">
+              <a14:hiddenFill xmlns:a14="http://schemas.microsoft.com/office/drawing/2010/main" xmlns="">
                 <a:solidFill>
                   <a:srgbClr val="FFFFFF"/>
                 </a:solidFill>
@@ -13014,20 +12988,20 @@
     </p:spTree>
     <p:extLst>
       <p:ext uri="{BB962C8B-B14F-4D97-AF65-F5344CB8AC3E}">
-        <p14:creationId xmlns:p14="http://schemas.microsoft.com/office/powerpoint/2010/main" val="3374507202"/>
+        <p14:creationId xmlns:p14="http://schemas.microsoft.com/office/powerpoint/2010/main" xmlns="" val="3374507202"/>
       </p:ext>
     </p:extLst>
   </p:cSld>
   <p:clrMapOvr>
     <a:masterClrMapping/>
   </p:clrMapOvr>
-  <mc:AlternateContent xmlns:mc="http://schemas.openxmlformats.org/markup-compatibility/2006" xmlns:p14="http://schemas.microsoft.com/office/powerpoint/2010/main">
-    <mc:Choice Requires="p14">
+  <mc:AlternateContent xmlns:mc="http://schemas.openxmlformats.org/markup-compatibility/2006">
+    <mc:Choice xmlns:p14="http://schemas.microsoft.com/office/powerpoint/2010/main" xmlns="" Requires="p14">
       <p:transition spd="med" p14:dur="700">
         <p:fade/>
       </p:transition>
     </mc:Choice>
-    <mc:Fallback xmlns="">
+    <mc:Fallback>
       <p:transition spd="med">
         <p:fade/>
       </p:transition>
@@ -13207,20 +13181,20 @@
     </p:spTree>
     <p:extLst>
       <p:ext uri="{BB962C8B-B14F-4D97-AF65-F5344CB8AC3E}">
-        <p14:creationId xmlns:p14="http://schemas.microsoft.com/office/powerpoint/2010/main" val="2238024562"/>
+        <p14:creationId xmlns:p14="http://schemas.microsoft.com/office/powerpoint/2010/main" xmlns="" val="2238024562"/>
       </p:ext>
     </p:extLst>
   </p:cSld>
   <p:clrMapOvr>
     <a:masterClrMapping/>
   </p:clrMapOvr>
-  <mc:AlternateContent xmlns:mc="http://schemas.openxmlformats.org/markup-compatibility/2006" xmlns:p14="http://schemas.microsoft.com/office/powerpoint/2010/main">
-    <mc:Choice Requires="p14">
+  <mc:AlternateContent xmlns:mc="http://schemas.openxmlformats.org/markup-compatibility/2006">
+    <mc:Choice xmlns:p14="http://schemas.microsoft.com/office/powerpoint/2010/main" xmlns="" Requires="p14">
       <p:transition spd="med" p14:dur="700">
         <p:fade/>
       </p:transition>
     </mc:Choice>
-    <mc:Fallback xmlns="">
+    <mc:Fallback>
       <p:transition spd="med">
         <p:fade/>
       </p:transition>
@@ -13404,20 +13378,20 @@
     </p:spTree>
     <p:extLst>
       <p:ext uri="{BB962C8B-B14F-4D97-AF65-F5344CB8AC3E}">
-        <p14:creationId xmlns:p14="http://schemas.microsoft.com/office/powerpoint/2010/main" val="3874537101"/>
+        <p14:creationId xmlns:p14="http://schemas.microsoft.com/office/powerpoint/2010/main" xmlns="" val="3874537101"/>
       </p:ext>
     </p:extLst>
   </p:cSld>
   <p:clrMapOvr>
     <a:masterClrMapping/>
   </p:clrMapOvr>
-  <mc:AlternateContent xmlns:mc="http://schemas.openxmlformats.org/markup-compatibility/2006" xmlns:p14="http://schemas.microsoft.com/office/powerpoint/2010/main">
-    <mc:Choice Requires="p14">
+  <mc:AlternateContent xmlns:mc="http://schemas.openxmlformats.org/markup-compatibility/2006">
+    <mc:Choice xmlns:p14="http://schemas.microsoft.com/office/powerpoint/2010/main" xmlns="" Requires="p14">
       <p:transition spd="med" p14:dur="700">
         <p:fade/>
       </p:transition>
     </mc:Choice>
-    <mc:Fallback xmlns="">
+    <mc:Fallback>
       <p:transition spd="med">
         <p:fade/>
       </p:transition>
@@ -13551,20 +13525,20 @@
     </p:spTree>
     <p:extLst>
       <p:ext uri="{BB962C8B-B14F-4D97-AF65-F5344CB8AC3E}">
-        <p14:creationId xmlns:p14="http://schemas.microsoft.com/office/powerpoint/2010/main" val="1202384585"/>
+        <p14:creationId xmlns:p14="http://schemas.microsoft.com/office/powerpoint/2010/main" xmlns="" val="1202384585"/>
       </p:ext>
     </p:extLst>
   </p:cSld>
   <p:clrMapOvr>
     <a:masterClrMapping/>
   </p:clrMapOvr>
-  <mc:AlternateContent xmlns:mc="http://schemas.openxmlformats.org/markup-compatibility/2006" xmlns:p14="http://schemas.microsoft.com/office/powerpoint/2010/main">
-    <mc:Choice Requires="p14">
+  <mc:AlternateContent xmlns:mc="http://schemas.openxmlformats.org/markup-compatibility/2006">
+    <mc:Choice xmlns:p14="http://schemas.microsoft.com/office/powerpoint/2010/main" xmlns="" Requires="p14">
       <p:transition spd="med" p14:dur="700">
         <p:fade/>
       </p:transition>
     </mc:Choice>
-    <mc:Fallback xmlns="">
+    <mc:Fallback>
       <p:transition spd="med">
         <p:fade/>
       </p:transition>
@@ -13796,20 +13770,20 @@
     </p:spTree>
     <p:extLst>
       <p:ext uri="{BB962C8B-B14F-4D97-AF65-F5344CB8AC3E}">
-        <p14:creationId xmlns:p14="http://schemas.microsoft.com/office/powerpoint/2010/main" val="701687324"/>
+        <p14:creationId xmlns:p14="http://schemas.microsoft.com/office/powerpoint/2010/main" xmlns="" val="701687324"/>
       </p:ext>
     </p:extLst>
   </p:cSld>
   <p:clrMapOvr>
     <a:masterClrMapping/>
   </p:clrMapOvr>
-  <mc:AlternateContent xmlns:mc="http://schemas.openxmlformats.org/markup-compatibility/2006" xmlns:p14="http://schemas.microsoft.com/office/powerpoint/2010/main">
-    <mc:Choice Requires="p14">
+  <mc:AlternateContent xmlns:mc="http://schemas.openxmlformats.org/markup-compatibility/2006">
+    <mc:Choice xmlns:p14="http://schemas.microsoft.com/office/powerpoint/2010/main" xmlns="" Requires="p14">
       <p:transition spd="med" p14:dur="700">
         <p:fade/>
       </p:transition>
     </mc:Choice>
-    <mc:Fallback xmlns="">
+    <mc:Fallback>
       <p:transition spd="med">
         <p:fade/>
       </p:transition>
@@ -13963,20 +13937,20 @@
     </p:spTree>
     <p:extLst>
       <p:ext uri="{BB962C8B-B14F-4D97-AF65-F5344CB8AC3E}">
-        <p14:creationId xmlns:p14="http://schemas.microsoft.com/office/powerpoint/2010/main" val="1445017764"/>
+        <p14:creationId xmlns:p14="http://schemas.microsoft.com/office/powerpoint/2010/main" xmlns="" val="1445017764"/>
       </p:ext>
     </p:extLst>
   </p:cSld>
   <p:clrMapOvr>
     <a:masterClrMapping/>
   </p:clrMapOvr>
-  <mc:AlternateContent xmlns:mc="http://schemas.openxmlformats.org/markup-compatibility/2006" xmlns:p14="http://schemas.microsoft.com/office/powerpoint/2010/main">
-    <mc:Choice Requires="p14">
+  <mc:AlternateContent xmlns:mc="http://schemas.openxmlformats.org/markup-compatibility/2006">
+    <mc:Choice xmlns:p14="http://schemas.microsoft.com/office/powerpoint/2010/main" xmlns="" Requires="p14">
       <p:transition spd="med" p14:dur="700">
         <p:fade/>
       </p:transition>
     </mc:Choice>
-    <mc:Fallback xmlns="">
+    <mc:Fallback>
       <p:transition spd="med">
         <p:fade/>
       </p:transition>
@@ -14157,20 +14131,20 @@
     </p:spTree>
     <p:extLst>
       <p:ext uri="{BB962C8B-B14F-4D97-AF65-F5344CB8AC3E}">
-        <p14:creationId xmlns:p14="http://schemas.microsoft.com/office/powerpoint/2010/main" val="3810472897"/>
+        <p14:creationId xmlns:p14="http://schemas.microsoft.com/office/powerpoint/2010/main" xmlns="" val="3810472897"/>
       </p:ext>
     </p:extLst>
   </p:cSld>
   <p:clrMapOvr>
     <a:masterClrMapping/>
   </p:clrMapOvr>
-  <mc:AlternateContent xmlns:mc="http://schemas.openxmlformats.org/markup-compatibility/2006" xmlns:p14="http://schemas.microsoft.com/office/powerpoint/2010/main">
-    <mc:Choice Requires="p14">
+  <mc:AlternateContent xmlns:mc="http://schemas.openxmlformats.org/markup-compatibility/2006">
+    <mc:Choice xmlns:p14="http://schemas.microsoft.com/office/powerpoint/2010/main" xmlns="" Requires="p14">
       <p:transition spd="med" p14:dur="700">
         <p:fade/>
       </p:transition>
     </mc:Choice>
-    <mc:Fallback xmlns="">
+    <mc:Fallback>
       <p:transition spd="med">
         <p:fade/>
       </p:transition>
@@ -14235,20 +14209,20 @@
     </p:spTree>
     <p:extLst>
       <p:ext uri="{BB962C8B-B14F-4D97-AF65-F5344CB8AC3E}">
-        <p14:creationId xmlns:p14="http://schemas.microsoft.com/office/powerpoint/2010/main" val="1539601608"/>
+        <p14:creationId xmlns:p14="http://schemas.microsoft.com/office/powerpoint/2010/main" xmlns="" val="1539601608"/>
       </p:ext>
     </p:extLst>
   </p:cSld>
   <p:clrMapOvr>
     <a:masterClrMapping/>
   </p:clrMapOvr>
-  <mc:AlternateContent xmlns:mc="http://schemas.openxmlformats.org/markup-compatibility/2006" xmlns:p14="http://schemas.microsoft.com/office/powerpoint/2010/main">
-    <mc:Choice Requires="p14">
+  <mc:AlternateContent xmlns:mc="http://schemas.openxmlformats.org/markup-compatibility/2006">
+    <mc:Choice xmlns:p14="http://schemas.microsoft.com/office/powerpoint/2010/main" xmlns="" Requires="p14">
       <p:transition spd="med" p14:dur="700">
         <p:fade/>
       </p:transition>
     </mc:Choice>
-    <mc:Fallback xmlns="">
+    <mc:Fallback>
       <p:transition spd="med">
         <p:fade/>
       </p:transition>
@@ -14304,13 +14278,9 @@
                   </a:solidFill>
                   <a:prstDash val="solid"/>
                 </a:ln>
-                <a:effectLst>
-                  <a:outerShdw blurRad="12700" dist="38100" dir="2700000" algn="tl" rotWithShape="0">
-                    <a:schemeClr val="bg1">
-                      <a:lumMod val="50000"/>
-                    </a:schemeClr>
-                  </a:outerShdw>
-                </a:effectLst>
+                <a:solidFill>
+                  <a:schemeClr val="accent1"/>
+                </a:solidFill>
                 <a:latin typeface="Segoe UI" panose="020B0502040204020203" pitchFamily="34" charset="0"/>
                 <a:cs typeface="Segoe UI" panose="020B0502040204020203" pitchFamily="34" charset="0"/>
               </a:rPr>
@@ -14323,13 +14293,9 @@
                 </a:solidFill>
                 <a:prstDash val="solid"/>
               </a:ln>
-              <a:effectLst>
-                <a:outerShdw blurRad="12700" dist="38100" dir="2700000" algn="tl" rotWithShape="0">
-                  <a:schemeClr val="bg1">
-                    <a:lumMod val="50000"/>
-                  </a:schemeClr>
-                </a:outerShdw>
-              </a:effectLst>
+              <a:solidFill>
+                <a:schemeClr val="accent1"/>
+              </a:solidFill>
               <a:latin typeface="Segoe UI" panose="020B0502040204020203" pitchFamily="34" charset="0"/>
               <a:cs typeface="Segoe UI" panose="020B0502040204020203" pitchFamily="34" charset="0"/>
             </a:endParaRPr>
@@ -14402,20 +14368,20 @@
     </p:spTree>
     <p:extLst>
       <p:ext uri="{BB962C8B-B14F-4D97-AF65-F5344CB8AC3E}">
-        <p14:creationId xmlns:p14="http://schemas.microsoft.com/office/powerpoint/2010/main" val="3280227416"/>
+        <p14:creationId xmlns:p14="http://schemas.microsoft.com/office/powerpoint/2010/main" xmlns="" val="3280227416"/>
       </p:ext>
     </p:extLst>
   </p:cSld>
   <p:clrMapOvr>
     <a:masterClrMapping/>
   </p:clrMapOvr>
-  <mc:AlternateContent xmlns:mc="http://schemas.openxmlformats.org/markup-compatibility/2006" xmlns:p14="http://schemas.microsoft.com/office/powerpoint/2010/main">
-    <mc:Choice Requires="p14">
+  <mc:AlternateContent xmlns:mc="http://schemas.openxmlformats.org/markup-compatibility/2006">
+    <mc:Choice xmlns:p14="http://schemas.microsoft.com/office/powerpoint/2010/main" xmlns="" Requires="p14">
       <p:transition spd="med" p14:dur="700">
         <p:fade/>
       </p:transition>
     </mc:Choice>
-    <mc:Fallback xmlns="">
+    <mc:Fallback>
       <p:transition spd="med">
         <p:fade/>
       </p:transition>
@@ -14471,13 +14437,9 @@
                   </a:solidFill>
                   <a:prstDash val="solid"/>
                 </a:ln>
-                <a:effectLst>
-                  <a:outerShdw blurRad="12700" dist="38100" dir="2700000" algn="tl" rotWithShape="0">
-                    <a:schemeClr val="bg1">
-                      <a:lumMod val="50000"/>
-                    </a:schemeClr>
-                  </a:outerShdw>
-                </a:effectLst>
+                <a:solidFill>
+                  <a:schemeClr val="accent1"/>
+                </a:solidFill>
                 <a:latin typeface="Segoe UI" panose="020B0502040204020203" pitchFamily="34" charset="0"/>
                 <a:cs typeface="Segoe UI" panose="020B0502040204020203" pitchFamily="34" charset="0"/>
               </a:rPr>
@@ -14490,13 +14452,9 @@
                 </a:solidFill>
                 <a:prstDash val="solid"/>
               </a:ln>
-              <a:effectLst>
-                <a:outerShdw blurRad="12700" dist="38100" dir="2700000" algn="tl" rotWithShape="0">
-                  <a:schemeClr val="bg1">
-                    <a:lumMod val="50000"/>
-                  </a:schemeClr>
-                </a:outerShdw>
-              </a:effectLst>
+              <a:solidFill>
+                <a:schemeClr val="accent1"/>
+              </a:solidFill>
               <a:latin typeface="Segoe UI" panose="020B0502040204020203" pitchFamily="34" charset="0"/>
               <a:cs typeface="Segoe UI" panose="020B0502040204020203" pitchFamily="34" charset="0"/>
             </a:endParaRPr>
@@ -14643,20 +14601,20 @@
     </p:spTree>
     <p:extLst>
       <p:ext uri="{BB962C8B-B14F-4D97-AF65-F5344CB8AC3E}">
-        <p14:creationId xmlns:p14="http://schemas.microsoft.com/office/powerpoint/2010/main" val="3816537714"/>
+        <p14:creationId xmlns:p14="http://schemas.microsoft.com/office/powerpoint/2010/main" xmlns="" val="3816537714"/>
       </p:ext>
     </p:extLst>
   </p:cSld>
   <p:clrMapOvr>
     <a:masterClrMapping/>
   </p:clrMapOvr>
-  <mc:AlternateContent xmlns:mc="http://schemas.openxmlformats.org/markup-compatibility/2006" xmlns:p14="http://schemas.microsoft.com/office/powerpoint/2010/main">
-    <mc:Choice Requires="p14">
+  <mc:AlternateContent xmlns:mc="http://schemas.openxmlformats.org/markup-compatibility/2006">
+    <mc:Choice xmlns:p14="http://schemas.microsoft.com/office/powerpoint/2010/main" xmlns="" Requires="p14">
       <p:transition spd="med" p14:dur="700">
         <p:fade/>
       </p:transition>
     </mc:Choice>
-    <mc:Fallback xmlns="">
+    <mc:Fallback>
       <p:transition spd="med">
         <p:fade/>
       </p:transition>
@@ -14933,20 +14891,20 @@
     </p:spTree>
     <p:extLst>
       <p:ext uri="{BB962C8B-B14F-4D97-AF65-F5344CB8AC3E}">
-        <p14:creationId xmlns:p14="http://schemas.microsoft.com/office/powerpoint/2010/main" val="3323359930"/>
+        <p14:creationId xmlns:p14="http://schemas.microsoft.com/office/powerpoint/2010/main" xmlns="" val="3323359930"/>
       </p:ext>
     </p:extLst>
   </p:cSld>
   <p:clrMapOvr>
     <a:masterClrMapping/>
   </p:clrMapOvr>
-  <mc:AlternateContent xmlns:mc="http://schemas.openxmlformats.org/markup-compatibility/2006" xmlns:p14="http://schemas.microsoft.com/office/powerpoint/2010/main">
-    <mc:Choice Requires="p14">
+  <mc:AlternateContent xmlns:mc="http://schemas.openxmlformats.org/markup-compatibility/2006">
+    <mc:Choice xmlns:p14="http://schemas.microsoft.com/office/powerpoint/2010/main" xmlns="" Requires="p14">
       <p:transition spd="med" p14:dur="700">
         <p:fade/>
       </p:transition>
     </mc:Choice>
-    <mc:Fallback xmlns="">
+    <mc:Fallback>
       <p:transition spd="med">
         <p:fade/>
       </p:transition>
@@ -15002,13 +14960,9 @@
                   </a:solidFill>
                   <a:prstDash val="solid"/>
                 </a:ln>
-                <a:effectLst>
-                  <a:outerShdw blurRad="12700" dist="38100" dir="2700000" algn="tl" rotWithShape="0">
-                    <a:schemeClr val="bg1">
-                      <a:lumMod val="50000"/>
-                    </a:schemeClr>
-                  </a:outerShdw>
-                </a:effectLst>
+                <a:solidFill>
+                  <a:schemeClr val="accent1"/>
+                </a:solidFill>
                 <a:latin typeface="Segoe UI" panose="020B0502040204020203" pitchFamily="34" charset="0"/>
                 <a:cs typeface="Segoe UI" panose="020B0502040204020203" pitchFamily="34" charset="0"/>
               </a:rPr>
@@ -15021,13 +14975,9 @@
                 </a:solidFill>
                 <a:prstDash val="solid"/>
               </a:ln>
-              <a:effectLst>
-                <a:outerShdw blurRad="12700" dist="38100" dir="2700000" algn="tl" rotWithShape="0">
-                  <a:schemeClr val="bg1">
-                    <a:lumMod val="50000"/>
-                  </a:schemeClr>
-                </a:outerShdw>
-              </a:effectLst>
+              <a:solidFill>
+                <a:schemeClr val="accent1"/>
+              </a:solidFill>
               <a:latin typeface="Segoe UI" panose="020B0502040204020203" pitchFamily="34" charset="0"/>
               <a:cs typeface="Segoe UI" panose="020B0502040204020203" pitchFamily="34" charset="0"/>
             </a:endParaRPr>
@@ -15132,20 +15082,20 @@
     </p:spTree>
     <p:extLst>
       <p:ext uri="{BB962C8B-B14F-4D97-AF65-F5344CB8AC3E}">
-        <p14:creationId xmlns:p14="http://schemas.microsoft.com/office/powerpoint/2010/main" val="2896967631"/>
+        <p14:creationId xmlns:p14="http://schemas.microsoft.com/office/powerpoint/2010/main" xmlns="" val="2896967631"/>
       </p:ext>
     </p:extLst>
   </p:cSld>
   <p:clrMapOvr>
     <a:masterClrMapping/>
   </p:clrMapOvr>
-  <mc:AlternateContent xmlns:mc="http://schemas.openxmlformats.org/markup-compatibility/2006" xmlns:p14="http://schemas.microsoft.com/office/powerpoint/2010/main">
-    <mc:Choice Requires="p14">
+  <mc:AlternateContent xmlns:mc="http://schemas.openxmlformats.org/markup-compatibility/2006">
+    <mc:Choice xmlns:p14="http://schemas.microsoft.com/office/powerpoint/2010/main" xmlns="" Requires="p14">
       <p:transition spd="med" p14:dur="700">
         <p:fade/>
       </p:transition>
     </mc:Choice>
-    <mc:Fallback xmlns="">
+    <mc:Fallback>
       <p:transition spd="med">
         <p:fade/>
       </p:transition>
@@ -15188,7 +15138,12 @@
             <p:ph type="title"/>
           </p:nvPr>
         </p:nvSpPr>
-        <p:spPr/>
+        <p:spPr>
+          <a:xfrm>
+            <a:off x="5302324" y="548680"/>
+            <a:ext cx="1582424" cy="1143000"/>
+          </a:xfrm>
+        </p:spPr>
         <p:txBody>
           <a:bodyPr>
             <a:normAutofit/>
@@ -15197,12 +15152,18 @@
           <a:p>
             <a:r>
               <a:rPr lang="es-AR" sz="6600" dirty="0" smtClean="0">
+                <a:solidFill>
+                  <a:schemeClr val="accent1"/>
+                </a:solidFill>
                 <a:latin typeface="Segoe UI" panose="020B0502040204020203" pitchFamily="34" charset="0"/>
                 <a:cs typeface="Segoe UI" panose="020B0502040204020203" pitchFamily="34" charset="0"/>
               </a:rPr>
               <a:t>Fin</a:t>
             </a:r>
             <a:endParaRPr lang="en-US" sz="6600" dirty="0">
+              <a:solidFill>
+                <a:schemeClr val="accent1"/>
+              </a:solidFill>
               <a:latin typeface="Segoe UI" panose="020B0502040204020203" pitchFamily="34" charset="0"/>
               <a:cs typeface="Segoe UI" panose="020B0502040204020203" pitchFamily="34" charset="0"/>
             </a:endParaRPr>
@@ -15219,7 +15180,12 @@
             <p:ph type="body" sz="half" idx="2"/>
           </p:nvPr>
         </p:nvSpPr>
-        <p:spPr/>
+        <p:spPr>
+          <a:xfrm>
+            <a:off x="2494012" y="2132856"/>
+            <a:ext cx="3581399" cy="1371600"/>
+          </a:xfrm>
+        </p:spPr>
         <p:txBody>
           <a:bodyPr>
             <a:normAutofit/>
@@ -15240,23 +15206,287 @@
           </a:p>
         </p:txBody>
       </p:sp>
+      <p:sp>
+        <p:nvSpPr>
+          <p:cNvPr id="5" name="Text Placeholder 3"/>
+          <p:cNvSpPr txBox="1">
+            <a:spLocks/>
+          </p:cNvSpPr>
+          <p:nvPr/>
+        </p:nvSpPr>
+        <p:spPr>
+          <a:xfrm>
+            <a:off x="7030516" y="3284984"/>
+            <a:ext cx="3581399" cy="1371600"/>
+          </a:xfrm>
+          <a:prstGeom prst="rect">
+            <a:avLst/>
+          </a:prstGeom>
+        </p:spPr>
+        <p:txBody>
+          <a:bodyPr vert="horz" lIns="91440" tIns="45720" rIns="91440" bIns="45720" rtlCol="0">
+            <a:normAutofit/>
+          </a:bodyPr>
+          <a:lstStyle/>
+          <a:p>
+            <a:pPr marL="0" marR="0" lvl="0" indent="0" algn="l" defTabSz="914400" rtl="0" eaLnBrk="1" fontAlgn="auto" latinLnBrk="0" hangingPunct="1">
+              <a:lnSpc>
+                <a:spcPct val="90000"/>
+              </a:lnSpc>
+              <a:spcBef>
+                <a:spcPts val="1200"/>
+              </a:spcBef>
+              <a:spcAft>
+                <a:spcPts val="0"/>
+              </a:spcAft>
+              <a:buClr>
+                <a:schemeClr val="accent1"/>
+              </a:buClr>
+              <a:buSzPct val="100000"/>
+              <a:buFont typeface="Arial" pitchFamily="34" charset="0"/>
+              <a:buNone/>
+              <a:tabLst/>
+              <a:defRPr/>
+            </a:pPr>
+            <a:r>
+              <a:rPr kumimoji="0" lang="es-AR" sz="3600" b="0" i="0" u="none" strike="noStrike" kern="1200" cap="none" spc="0" normalizeH="0" baseline="0" noProof="0" dirty="0" smtClean="0">
+                <a:ln>
+                  <a:noFill/>
+                </a:ln>
+                <a:solidFill>
+                  <a:schemeClr val="tx1"/>
+                </a:solidFill>
+                <a:effectLst/>
+                <a:uLnTx/>
+                <a:uFillTx/>
+                <a:latin typeface="Segoe UI" panose="020B0502040204020203" pitchFamily="34" charset="0"/>
+                <a:ea typeface="+mn-ea"/>
+                <a:cs typeface="Segoe UI" panose="020B0502040204020203" pitchFamily="34" charset="0"/>
+              </a:rPr>
+              <a:t>¿Consultas?</a:t>
+            </a:r>
+            <a:endParaRPr kumimoji="0" lang="en-US" sz="3600" b="0" i="0" u="none" strike="noStrike" kern="1200" cap="none" spc="0" normalizeH="0" baseline="0" noProof="0" dirty="0">
+              <a:ln>
+                <a:noFill/>
+              </a:ln>
+              <a:solidFill>
+                <a:schemeClr val="tx1"/>
+              </a:solidFill>
+              <a:effectLst/>
+              <a:uLnTx/>
+              <a:uFillTx/>
+              <a:latin typeface="Segoe UI" panose="020B0502040204020203" pitchFamily="34" charset="0"/>
+              <a:ea typeface="+mn-ea"/>
+              <a:cs typeface="Segoe UI" panose="020B0502040204020203" pitchFamily="34" charset="0"/>
+            </a:endParaRPr>
+          </a:p>
+        </p:txBody>
+      </p:sp>
+      <p:sp>
+        <p:nvSpPr>
+          <p:cNvPr id="6" name="Text Placeholder 3"/>
+          <p:cNvSpPr txBox="1">
+            <a:spLocks/>
+          </p:cNvSpPr>
+          <p:nvPr/>
+        </p:nvSpPr>
+        <p:spPr>
+          <a:xfrm>
+            <a:off x="2566020" y="4581128"/>
+            <a:ext cx="3581399" cy="1371600"/>
+          </a:xfrm>
+          <a:prstGeom prst="rect">
+            <a:avLst/>
+          </a:prstGeom>
+        </p:spPr>
+        <p:txBody>
+          <a:bodyPr vert="horz" lIns="91440" tIns="45720" rIns="91440" bIns="45720" rtlCol="0">
+            <a:normAutofit/>
+          </a:bodyPr>
+          <a:lstStyle/>
+          <a:p>
+            <a:pPr marL="0" marR="0" lvl="0" indent="0" algn="l" defTabSz="914400" rtl="0" eaLnBrk="1" fontAlgn="auto" latinLnBrk="0" hangingPunct="1">
+              <a:lnSpc>
+                <a:spcPct val="90000"/>
+              </a:lnSpc>
+              <a:spcBef>
+                <a:spcPts val="1200"/>
+              </a:spcBef>
+              <a:spcAft>
+                <a:spcPts val="0"/>
+              </a:spcAft>
+              <a:buClr>
+                <a:schemeClr val="accent1"/>
+              </a:buClr>
+              <a:buSzPct val="100000"/>
+              <a:buFont typeface="Arial" pitchFamily="34" charset="0"/>
+              <a:buNone/>
+              <a:tabLst/>
+              <a:defRPr/>
+            </a:pPr>
+            <a:r>
+              <a:rPr kumimoji="0" lang="es-AR" sz="3600" b="0" i="0" u="none" strike="noStrike" kern="1200" cap="none" spc="0" normalizeH="0" baseline="0" noProof="0" dirty="0" smtClean="0">
+                <a:ln>
+                  <a:noFill/>
+                </a:ln>
+                <a:solidFill>
+                  <a:schemeClr val="tx1"/>
+                </a:solidFill>
+                <a:effectLst/>
+                <a:uLnTx/>
+                <a:uFillTx/>
+                <a:latin typeface="Segoe UI" panose="020B0502040204020203" pitchFamily="34" charset="0"/>
+                <a:ea typeface="+mn-ea"/>
+                <a:cs typeface="Segoe UI" panose="020B0502040204020203" pitchFamily="34" charset="0"/>
+              </a:rPr>
+              <a:t>¿Dudas?</a:t>
+            </a:r>
+            <a:endParaRPr kumimoji="0" lang="en-US" sz="3600" b="0" i="0" u="none" strike="noStrike" kern="1200" cap="none" spc="0" normalizeH="0" baseline="0" noProof="0" dirty="0">
+              <a:ln>
+                <a:noFill/>
+              </a:ln>
+              <a:solidFill>
+                <a:schemeClr val="tx1"/>
+              </a:solidFill>
+              <a:effectLst/>
+              <a:uLnTx/>
+              <a:uFillTx/>
+              <a:latin typeface="Segoe UI" panose="020B0502040204020203" pitchFamily="34" charset="0"/>
+              <a:ea typeface="+mn-ea"/>
+              <a:cs typeface="Segoe UI" panose="020B0502040204020203" pitchFamily="34" charset="0"/>
+            </a:endParaRPr>
+          </a:p>
+        </p:txBody>
+      </p:sp>
     </p:spTree>
     <p:extLst>
       <p:ext uri="{BB962C8B-B14F-4D97-AF65-F5344CB8AC3E}">
-        <p14:creationId xmlns:p14="http://schemas.microsoft.com/office/powerpoint/2010/main" val="1108506989"/>
+        <p14:creationId xmlns:p14="http://schemas.microsoft.com/office/powerpoint/2010/main" xmlns="" val="1108506989"/>
       </p:ext>
     </p:extLst>
   </p:cSld>
   <p:clrMapOvr>
     <a:masterClrMapping/>
   </p:clrMapOvr>
-  <mc:AlternateContent xmlns:mc="http://schemas.openxmlformats.org/markup-compatibility/2006" xmlns:p14="http://schemas.microsoft.com/office/powerpoint/2010/main">
-    <mc:Choice Requires="p14">
+  <mc:AlternateContent xmlns:mc="http://schemas.openxmlformats.org/markup-compatibility/2006">
+    <mc:Choice xmlns:p14="http://schemas.microsoft.com/office/powerpoint/2010/main" xmlns="" Requires="p14">
       <p:transition spd="med" p14:dur="700">
         <p:fade/>
       </p:transition>
     </mc:Choice>
-    <mc:Fallback xmlns="">
+    <mc:Fallback>
+      <p:transition spd="med">
+        <p:fade/>
+      </p:transition>
+    </mc:Fallback>
+  </mc:AlternateContent>
+  <p:timing>
+    <p:tnLst>
+      <p:par>
+        <p:cTn id="1" dur="indefinite" restart="never" nodeType="tmRoot"/>
+      </p:par>
+    </p:tnLst>
+  </p:timing>
+</p:sld>
+</file>
+
+<file path=ppt/slides/slide42.xml><?xml version="1.0" encoding="utf-8"?>
+<p:sld xmlns:a="http://schemas.openxmlformats.org/drawingml/2006/main" xmlns:r="http://schemas.openxmlformats.org/officeDocument/2006/relationships" xmlns:p="http://schemas.openxmlformats.org/presentationml/2006/main">
+  <p:cSld>
+    <p:spTree>
+      <p:nvGrpSpPr>
+        <p:cNvPr id="1" name=""/>
+        <p:cNvGrpSpPr/>
+        <p:nvPr/>
+      </p:nvGrpSpPr>
+      <p:grpSpPr>
+        <a:xfrm>
+          <a:off x="0" y="0"/>
+          <a:ext cx="0" cy="0"/>
+          <a:chOff x="0" y="0"/>
+          <a:chExt cx="0" cy="0"/>
+        </a:xfrm>
+      </p:grpSpPr>
+      <p:sp>
+        <p:nvSpPr>
+          <p:cNvPr id="3" name="Title 2"/>
+          <p:cNvSpPr>
+            <a:spLocks noGrp="1"/>
+          </p:cNvSpPr>
+          <p:nvPr>
+            <p:ph type="title"/>
+          </p:nvPr>
+        </p:nvSpPr>
+        <p:spPr>
+          <a:xfrm>
+            <a:off x="1" y="0"/>
+            <a:ext cx="12188824" cy="6858000"/>
+          </a:xfrm>
+        </p:spPr>
+        <p:txBody>
+          <a:bodyPr anchor="ctr">
+            <a:normAutofit/>
+          </a:bodyPr>
+          <a:lstStyle/>
+          <a:p>
+            <a:pPr algn="ctr"/>
+            <a:r>
+              <a:rPr lang="es-AR" sz="8000" b="1" dirty="0" smtClean="0">
+                <a:solidFill>
+                  <a:schemeClr val="accent1">
+                    <a:lumMod val="40000"/>
+                    <a:lumOff val="60000"/>
+                  </a:schemeClr>
+                </a:solidFill>
+                <a:effectLst>
+                  <a:outerShdw blurRad="38100" dist="38100" dir="2700000" algn="tl">
+                    <a:srgbClr val="000000">
+                      <a:alpha val="43137"/>
+                    </a:srgbClr>
+                  </a:outerShdw>
+                </a:effectLst>
+                <a:latin typeface="Segoe UI" panose="020B0502040204020203" pitchFamily="34" charset="0"/>
+                <a:cs typeface="Segoe UI" panose="020B0502040204020203" pitchFamily="34" charset="0"/>
+              </a:rPr>
+              <a:t>Muchas gracias !!!</a:t>
+            </a:r>
+            <a:endParaRPr lang="en-US" sz="8000" b="1" dirty="0">
+              <a:solidFill>
+                <a:schemeClr val="accent1">
+                  <a:lumMod val="40000"/>
+                  <a:lumOff val="60000"/>
+                </a:schemeClr>
+              </a:solidFill>
+              <a:effectLst>
+                <a:outerShdw blurRad="38100" dist="38100" dir="2700000" algn="tl">
+                  <a:srgbClr val="000000">
+                    <a:alpha val="43137"/>
+                  </a:srgbClr>
+                </a:outerShdw>
+              </a:effectLst>
+              <a:latin typeface="Segoe UI" panose="020B0502040204020203" pitchFamily="34" charset="0"/>
+              <a:cs typeface="Segoe UI" panose="020B0502040204020203" pitchFamily="34" charset="0"/>
+            </a:endParaRPr>
+          </a:p>
+        </p:txBody>
+      </p:sp>
+    </p:spTree>
+    <p:extLst>
+      <p:ext uri="{BB962C8B-B14F-4D97-AF65-F5344CB8AC3E}">
+        <p14:creationId xmlns:p14="http://schemas.microsoft.com/office/powerpoint/2010/main" xmlns="" val="1108506989"/>
+      </p:ext>
+    </p:extLst>
+  </p:cSld>
+  <p:clrMapOvr>
+    <a:masterClrMapping/>
+  </p:clrMapOvr>
+  <mc:AlternateContent xmlns:mc="http://schemas.openxmlformats.org/markup-compatibility/2006">
+    <mc:Choice xmlns:p14="http://schemas.microsoft.com/office/powerpoint/2010/main" xmlns="" Requires="p14">
+      <p:transition spd="med" p14:dur="700">
+        <p:fade/>
+      </p:transition>
+    </mc:Choice>
+    <mc:Fallback>
       <p:transition spd="med">
         <p:fade/>
       </p:transition>
@@ -15507,10 +15737,10 @@
           <p:nvPr/>
         </p:nvPicPr>
         <p:blipFill>
-          <a:blip r:embed="rId2">
+          <a:blip r:embed="rId2" cstate="print">
             <a:extLst>
               <a:ext uri="{28A0092B-C50C-407E-A947-70E740481C1C}">
-                <a14:useLocalDpi xmlns:a14="http://schemas.microsoft.com/office/drawing/2010/main" val="0"/>
+                <a14:useLocalDpi xmlns:a14="http://schemas.microsoft.com/office/drawing/2010/main" xmlns="" val="0"/>
               </a:ext>
             </a:extLst>
           </a:blip>
@@ -15530,7 +15760,7 @@
           <a:noFill/>
           <a:extLst>
             <a:ext uri="{909E8E84-426E-40DD-AFC4-6F175D3DCCD1}">
-              <a14:hiddenFill xmlns:a14="http://schemas.microsoft.com/office/drawing/2010/main">
+              <a14:hiddenFill xmlns:a14="http://schemas.microsoft.com/office/drawing/2010/main" xmlns="">
                 <a:solidFill>
                   <a:srgbClr val="FFFFFF"/>
                 </a:solidFill>
@@ -15542,20 +15772,20 @@
     </p:spTree>
     <p:extLst>
       <p:ext uri="{BB962C8B-B14F-4D97-AF65-F5344CB8AC3E}">
-        <p14:creationId xmlns:p14="http://schemas.microsoft.com/office/powerpoint/2010/main" val="1350001534"/>
+        <p14:creationId xmlns:p14="http://schemas.microsoft.com/office/powerpoint/2010/main" xmlns="" val="1350001534"/>
       </p:ext>
     </p:extLst>
   </p:cSld>
   <p:clrMapOvr>
     <a:masterClrMapping/>
   </p:clrMapOvr>
-  <mc:AlternateContent xmlns:mc="http://schemas.openxmlformats.org/markup-compatibility/2006" xmlns:p14="http://schemas.microsoft.com/office/powerpoint/2010/main">
-    <mc:Choice Requires="p14">
+  <mc:AlternateContent xmlns:mc="http://schemas.openxmlformats.org/markup-compatibility/2006">
+    <mc:Choice xmlns:p14="http://schemas.microsoft.com/office/powerpoint/2010/main" xmlns="" Requires="p14">
       <p:transition spd="med" p14:dur="700">
         <p:fade/>
       </p:transition>
     </mc:Choice>
-    <mc:Fallback xmlns="">
+    <mc:Fallback>
       <p:transition spd="med">
         <p:fade/>
       </p:transition>
@@ -15923,20 +16153,20 @@
     </p:spTree>
     <p:extLst>
       <p:ext uri="{BB962C8B-B14F-4D97-AF65-F5344CB8AC3E}">
-        <p14:creationId xmlns:p14="http://schemas.microsoft.com/office/powerpoint/2010/main" val="3438441757"/>
+        <p14:creationId xmlns:p14="http://schemas.microsoft.com/office/powerpoint/2010/main" xmlns="" val="3438441757"/>
       </p:ext>
     </p:extLst>
   </p:cSld>
   <p:clrMapOvr>
     <a:masterClrMapping/>
   </p:clrMapOvr>
-  <mc:AlternateContent xmlns:mc="http://schemas.openxmlformats.org/markup-compatibility/2006" xmlns:p14="http://schemas.microsoft.com/office/powerpoint/2010/main">
-    <mc:Choice Requires="p14">
+  <mc:AlternateContent xmlns:mc="http://schemas.openxmlformats.org/markup-compatibility/2006">
+    <mc:Choice xmlns:p14="http://schemas.microsoft.com/office/powerpoint/2010/main" xmlns="" Requires="p14">
       <p:transition spd="med" p14:dur="700">
         <p:fade/>
       </p:transition>
     </mc:Choice>
-    <mc:Fallback xmlns="">
+    <mc:Fallback>
       <p:transition spd="med">
         <p:fade/>
       </p:transition>
@@ -16183,20 +16413,20 @@
     </p:spTree>
     <p:extLst>
       <p:ext uri="{BB962C8B-B14F-4D97-AF65-F5344CB8AC3E}">
-        <p14:creationId xmlns:p14="http://schemas.microsoft.com/office/powerpoint/2010/main" val="3833366108"/>
+        <p14:creationId xmlns:p14="http://schemas.microsoft.com/office/powerpoint/2010/main" xmlns="" val="3833366108"/>
       </p:ext>
     </p:extLst>
   </p:cSld>
   <p:clrMapOvr>
     <a:masterClrMapping/>
   </p:clrMapOvr>
-  <mc:AlternateContent xmlns:mc="http://schemas.openxmlformats.org/markup-compatibility/2006" xmlns:p14="http://schemas.microsoft.com/office/powerpoint/2010/main">
-    <mc:Choice Requires="p14">
+  <mc:AlternateContent xmlns:mc="http://schemas.openxmlformats.org/markup-compatibility/2006">
+    <mc:Choice xmlns:p14="http://schemas.microsoft.com/office/powerpoint/2010/main" xmlns="" Requires="p14">
       <p:transition spd="med" p14:dur="700">
         <p:fade/>
       </p:transition>
     </mc:Choice>
-    <mc:Fallback xmlns="">
+    <mc:Fallback>
       <p:transition spd="med">
         <p:fade/>
       </p:transition>
@@ -16278,10 +16508,10 @@
           <p:nvPr/>
         </p:nvPicPr>
         <p:blipFill>
-          <a:blip r:embed="rId2">
+          <a:blip r:embed="rId2" cstate="print">
             <a:extLst>
               <a:ext uri="{28A0092B-C50C-407E-A947-70E740481C1C}">
-                <a14:useLocalDpi xmlns:a14="http://schemas.microsoft.com/office/drawing/2010/main" val="0"/>
+                <a14:useLocalDpi xmlns:a14="http://schemas.microsoft.com/office/drawing/2010/main" xmlns="" val="0"/>
               </a:ext>
             </a:extLst>
           </a:blip>
@@ -16304,14 +16534,14 @@
           </a:ln>
           <a:extLst>
             <a:ext uri="{909E8E84-426E-40DD-AFC4-6F175D3DCCD1}">
-              <a14:hiddenFill xmlns:a14="http://schemas.microsoft.com/office/drawing/2010/main">
+              <a14:hiddenFill xmlns:a14="http://schemas.microsoft.com/office/drawing/2010/main" xmlns="">
                 <a:solidFill>
                   <a:schemeClr val="accent1"/>
                 </a:solidFill>
               </a14:hiddenFill>
             </a:ext>
             <a:ext uri="{91240B29-F687-4F45-9708-019B960494DF}">
-              <a14:hiddenLine xmlns:a14="http://schemas.microsoft.com/office/drawing/2010/main" w="9525">
+              <a14:hiddenLine xmlns:a14="http://schemas.microsoft.com/office/drawing/2010/main" xmlns="" w="9525">
                 <a:solidFill>
                   <a:schemeClr val="tx1"/>
                 </a:solidFill>
@@ -16326,20 +16556,20 @@
     </p:spTree>
     <p:extLst>
       <p:ext uri="{BB962C8B-B14F-4D97-AF65-F5344CB8AC3E}">
-        <p14:creationId xmlns:p14="http://schemas.microsoft.com/office/powerpoint/2010/main" val="2112418618"/>
+        <p14:creationId xmlns:p14="http://schemas.microsoft.com/office/powerpoint/2010/main" xmlns="" val="2112418618"/>
       </p:ext>
     </p:extLst>
   </p:cSld>
   <p:clrMapOvr>
     <a:masterClrMapping/>
   </p:clrMapOvr>
-  <mc:AlternateContent xmlns:mc="http://schemas.openxmlformats.org/markup-compatibility/2006" xmlns:p14="http://schemas.microsoft.com/office/powerpoint/2010/main">
-    <mc:Choice Requires="p14">
+  <mc:AlternateContent xmlns:mc="http://schemas.openxmlformats.org/markup-compatibility/2006">
+    <mc:Choice xmlns:p14="http://schemas.microsoft.com/office/powerpoint/2010/main" xmlns="" Requires="p14">
       <p:transition spd="med" p14:dur="700">
         <p:fade/>
       </p:transition>
     </mc:Choice>
-    <mc:Fallback xmlns="">
+    <mc:Fallback>
       <p:transition spd="med">
         <p:fade/>
       </p:transition>
@@ -16612,10 +16842,10 @@
           <p:nvPr/>
         </p:nvPicPr>
         <p:blipFill>
-          <a:blip r:embed="rId2">
+          <a:blip r:embed="rId2" cstate="print">
             <a:extLst>
               <a:ext uri="{28A0092B-C50C-407E-A947-70E740481C1C}">
-                <a14:useLocalDpi xmlns:a14="http://schemas.microsoft.com/office/drawing/2010/main" val="0"/>
+                <a14:useLocalDpi xmlns:a14="http://schemas.microsoft.com/office/drawing/2010/main" xmlns="" val="0"/>
               </a:ext>
             </a:extLst>
           </a:blip>
@@ -16638,14 +16868,14 @@
           </a:ln>
           <a:extLst>
             <a:ext uri="{909E8E84-426E-40DD-AFC4-6F175D3DCCD1}">
-              <a14:hiddenFill xmlns:a14="http://schemas.microsoft.com/office/drawing/2010/main">
+              <a14:hiddenFill xmlns:a14="http://schemas.microsoft.com/office/drawing/2010/main" xmlns="">
                 <a:solidFill>
                   <a:schemeClr val="accent1"/>
                 </a:solidFill>
               </a14:hiddenFill>
             </a:ext>
             <a:ext uri="{91240B29-F687-4F45-9708-019B960494DF}">
-              <a14:hiddenLine xmlns:a14="http://schemas.microsoft.com/office/drawing/2010/main" w="9525">
+              <a14:hiddenLine xmlns:a14="http://schemas.microsoft.com/office/drawing/2010/main" xmlns="" w="9525">
                 <a:solidFill>
                   <a:schemeClr val="tx1"/>
                 </a:solidFill>
@@ -16660,20 +16890,20 @@
     </p:spTree>
     <p:extLst>
       <p:ext uri="{BB962C8B-B14F-4D97-AF65-F5344CB8AC3E}">
-        <p14:creationId xmlns:p14="http://schemas.microsoft.com/office/powerpoint/2010/main" val="1393713661"/>
+        <p14:creationId xmlns:p14="http://schemas.microsoft.com/office/powerpoint/2010/main" xmlns="" val="1393713661"/>
       </p:ext>
     </p:extLst>
   </p:cSld>
   <p:clrMapOvr>
     <a:masterClrMapping/>
   </p:clrMapOvr>
-  <mc:AlternateContent xmlns:mc="http://schemas.openxmlformats.org/markup-compatibility/2006" xmlns:p14="http://schemas.microsoft.com/office/powerpoint/2010/main">
-    <mc:Choice Requires="p14">
+  <mc:AlternateContent xmlns:mc="http://schemas.openxmlformats.org/markup-compatibility/2006">
+    <mc:Choice xmlns:p14="http://schemas.microsoft.com/office/powerpoint/2010/main" xmlns="" Requires="p14">
       <p:transition spd="med" p14:dur="700">
         <p:fade/>
       </p:transition>
     </mc:Choice>
-    <mc:Fallback xmlns="">
+    <mc:Fallback>
       <p:transition spd="med">
         <p:fade/>
       </p:transition>

</xml_diff>

<commit_message>
presentacion: mas cosas de formato
</commit_message>
<xml_diff>
--- a/Presentacion/Fuga de Información.pptx
+++ b/Presentacion/Fuga de Información.pptx
@@ -11,8 +11,8 @@
     <p:handoutMasterId r:id="rId46"/>
   </p:handoutMasterIdLst>
   <p:sldIdLst>
-    <p:sldId id="265" r:id="rId3"/>
-    <p:sldId id="310" r:id="rId4"/>
+    <p:sldId id="372" r:id="rId3"/>
+    <p:sldId id="373" r:id="rId4"/>
     <p:sldId id="311" r:id="rId5"/>
     <p:sldId id="355" r:id="rId6"/>
     <p:sldId id="356" r:id="rId7"/>
@@ -156,7 +156,7 @@
   </p:defaultTextStyle>
   <p:extLst>
     <p:ext uri="{EFAFB233-063F-42B5-8137-9DF3F51BA10A}">
-      <p15:sldGuideLst xmlns:p15="http://schemas.microsoft.com/office/powerpoint/2012/main" xmlns="">
+      <p15:sldGuideLst xmlns="" xmlns:p15="http://schemas.microsoft.com/office/powerpoint/2012/main">
         <p15:guide id="1" pos="3839" userDrawn="1">
           <p15:clr>
             <a:srgbClr val="A4A3A4"/>
@@ -170,7 +170,7 @@
       </p15:sldGuideLst>
     </p:ext>
     <p:ext uri="{2D200454-40CA-4A62-9FC3-DE9A4176ACB9}">
-      <p15:notesGuideLst xmlns:p15="http://schemas.microsoft.com/office/powerpoint/2012/main" xmlns=""/>
+      <p15:notesGuideLst xmlns="" xmlns:p15="http://schemas.microsoft.com/office/powerpoint/2012/main"/>
     </p:ext>
   </p:extLst>
 </p:presentation>
@@ -335,7 +335,7 @@
     </p:spTree>
     <p:extLst>
       <p:ext uri="{BB962C8B-B14F-4D97-AF65-F5344CB8AC3E}">
-        <p14:creationId xmlns:p14="http://schemas.microsoft.com/office/powerpoint/2010/main" xmlns="" val="3932065745"/>
+        <p14:creationId xmlns="" xmlns:p14="http://schemas.microsoft.com/office/powerpoint/2010/main" val="3932065745"/>
       </p:ext>
     </p:extLst>
   </p:cSld>
@@ -594,7 +594,7 @@
     </p:spTree>
     <p:extLst>
       <p:ext uri="{BB962C8B-B14F-4D97-AF65-F5344CB8AC3E}">
-        <p14:creationId xmlns:p14="http://schemas.microsoft.com/office/powerpoint/2010/main" xmlns="" val="4276579820"/>
+        <p14:creationId xmlns="" xmlns:p14="http://schemas.microsoft.com/office/powerpoint/2010/main" val="4276579820"/>
       </p:ext>
     </p:extLst>
   </p:cSld>
@@ -1174,7 +1174,7 @@
     </p:spTree>
     <p:extLst>
       <p:ext uri="{BB962C8B-B14F-4D97-AF65-F5344CB8AC3E}">
-        <p14:creationId xmlns:p14="http://schemas.microsoft.com/office/powerpoint/2010/main" xmlns="" val="2425724269"/>
+        <p14:creationId xmlns="" xmlns:p14="http://schemas.microsoft.com/office/powerpoint/2010/main" val="2425724269"/>
       </p:ext>
     </p:extLst>
   </p:cSld>
@@ -1259,7 +1259,7 @@
     </p:spTree>
     <p:extLst>
       <p:ext uri="{BB962C8B-B14F-4D97-AF65-F5344CB8AC3E}">
-        <p14:creationId xmlns:p14="http://schemas.microsoft.com/office/powerpoint/2010/main" xmlns="" val="913013488"/>
+        <p14:creationId xmlns="" xmlns:p14="http://schemas.microsoft.com/office/powerpoint/2010/main" val="913013488"/>
       </p:ext>
     </p:extLst>
   </p:cSld>
@@ -1344,7 +1344,7 @@
     </p:spTree>
     <p:extLst>
       <p:ext uri="{BB962C8B-B14F-4D97-AF65-F5344CB8AC3E}">
-        <p14:creationId xmlns:p14="http://schemas.microsoft.com/office/powerpoint/2010/main" xmlns="" val="3326557915"/>
+        <p14:creationId xmlns="" xmlns:p14="http://schemas.microsoft.com/office/powerpoint/2010/main" val="3326557915"/>
       </p:ext>
     </p:extLst>
   </p:cSld>
@@ -1429,7 +1429,7 @@
     </p:spTree>
     <p:extLst>
       <p:ext uri="{BB962C8B-B14F-4D97-AF65-F5344CB8AC3E}">
-        <p14:creationId xmlns:p14="http://schemas.microsoft.com/office/powerpoint/2010/main" xmlns="" val="3460376957"/>
+        <p14:creationId xmlns="" xmlns:p14="http://schemas.microsoft.com/office/powerpoint/2010/main" val="3460376957"/>
       </p:ext>
     </p:extLst>
   </p:cSld>
@@ -1514,7 +1514,7 @@
     </p:spTree>
     <p:extLst>
       <p:ext uri="{BB962C8B-B14F-4D97-AF65-F5344CB8AC3E}">
-        <p14:creationId xmlns:p14="http://schemas.microsoft.com/office/powerpoint/2010/main" xmlns="" val="4202137938"/>
+        <p14:creationId xmlns="" xmlns:p14="http://schemas.microsoft.com/office/powerpoint/2010/main" val="4202137938"/>
       </p:ext>
     </p:extLst>
   </p:cSld>
@@ -1599,7 +1599,7 @@
     </p:spTree>
     <p:extLst>
       <p:ext uri="{BB962C8B-B14F-4D97-AF65-F5344CB8AC3E}">
-        <p14:creationId xmlns:p14="http://schemas.microsoft.com/office/powerpoint/2010/main" xmlns="" val="2586394931"/>
+        <p14:creationId xmlns="" xmlns:p14="http://schemas.microsoft.com/office/powerpoint/2010/main" val="2586394931"/>
       </p:ext>
     </p:extLst>
   </p:cSld>
@@ -1684,7 +1684,7 @@
     </p:spTree>
     <p:extLst>
       <p:ext uri="{BB962C8B-B14F-4D97-AF65-F5344CB8AC3E}">
-        <p14:creationId xmlns:p14="http://schemas.microsoft.com/office/powerpoint/2010/main" xmlns="" val="1362585539"/>
+        <p14:creationId xmlns="" xmlns:p14="http://schemas.microsoft.com/office/powerpoint/2010/main" val="1362585539"/>
       </p:ext>
     </p:extLst>
   </p:cSld>
@@ -2061,7 +2061,7 @@
     </p:spTree>
     <p:extLst>
       <p:ext uri="{BB962C8B-B14F-4D97-AF65-F5344CB8AC3E}">
-        <p14:creationId xmlns:p14="http://schemas.microsoft.com/office/powerpoint/2010/main" xmlns="" val="3805029774"/>
+        <p14:creationId xmlns="" xmlns:p14="http://schemas.microsoft.com/office/powerpoint/2010/main" val="3805029774"/>
       </p:ext>
     </p:extLst>
   </p:cSld>
@@ -2837,7 +2837,7 @@
     </p:spTree>
     <p:extLst>
       <p:ext uri="{BB962C8B-B14F-4D97-AF65-F5344CB8AC3E}">
-        <p14:creationId xmlns:p14="http://schemas.microsoft.com/office/powerpoint/2010/main" xmlns="" val="655676726"/>
+        <p14:creationId xmlns="" xmlns:p14="http://schemas.microsoft.com/office/powerpoint/2010/main" val="655676726"/>
       </p:ext>
     </p:extLst>
   </p:cSld>
@@ -3171,7 +3171,7 @@
     </p:spTree>
     <p:extLst>
       <p:ext uri="{BB962C8B-B14F-4D97-AF65-F5344CB8AC3E}">
-        <p14:creationId xmlns:p14="http://schemas.microsoft.com/office/powerpoint/2010/main" xmlns="" val="1629614161"/>
+        <p14:creationId xmlns="" xmlns:p14="http://schemas.microsoft.com/office/powerpoint/2010/main" val="1629614161"/>
       </p:ext>
     </p:extLst>
   </p:cSld>
@@ -3705,7 +3705,7 @@
     </p:spTree>
     <p:extLst>
       <p:ext uri="{BB962C8B-B14F-4D97-AF65-F5344CB8AC3E}">
-        <p14:creationId xmlns:p14="http://schemas.microsoft.com/office/powerpoint/2010/main" xmlns="" val="2488318766"/>
+        <p14:creationId xmlns="" xmlns:p14="http://schemas.microsoft.com/office/powerpoint/2010/main" val="2488318766"/>
       </p:ext>
     </p:extLst>
   </p:cSld>
@@ -4251,7 +4251,7 @@
     </p:spTree>
     <p:extLst>
       <p:ext uri="{BB962C8B-B14F-4D97-AF65-F5344CB8AC3E}">
-        <p14:creationId xmlns:p14="http://schemas.microsoft.com/office/powerpoint/2010/main" xmlns="" val="707643668"/>
+        <p14:creationId xmlns="" xmlns:p14="http://schemas.microsoft.com/office/powerpoint/2010/main" val="707643668"/>
       </p:ext>
     </p:extLst>
   </p:cSld>
@@ -4336,7 +4336,7 @@
     </p:spTree>
     <p:extLst>
       <p:ext uri="{BB962C8B-B14F-4D97-AF65-F5344CB8AC3E}">
-        <p14:creationId xmlns:p14="http://schemas.microsoft.com/office/powerpoint/2010/main" xmlns="" val="1554195"/>
+        <p14:creationId xmlns="" xmlns:p14="http://schemas.microsoft.com/office/powerpoint/2010/main" val="1554195"/>
       </p:ext>
     </p:extLst>
   </p:cSld>
@@ -4543,7 +4543,7 @@
     </p:spTree>
     <p:extLst>
       <p:ext uri="{BB962C8B-B14F-4D97-AF65-F5344CB8AC3E}">
-        <p14:creationId xmlns:p14="http://schemas.microsoft.com/office/powerpoint/2010/main" xmlns="" val="94999051"/>
+        <p14:creationId xmlns="" xmlns:p14="http://schemas.microsoft.com/office/powerpoint/2010/main" val="94999051"/>
       </p:ext>
     </p:extLst>
   </p:cSld>
@@ -4551,7 +4551,7 @@
     <a:masterClrMapping/>
   </p:clrMapOvr>
   <mc:AlternateContent xmlns:mc="http://schemas.openxmlformats.org/markup-compatibility/2006">
-    <mc:Choice xmlns:p14="http://schemas.microsoft.com/office/powerpoint/2010/main" xmlns="" Requires="p14">
+    <mc:Choice xmlns="" xmlns:p14="http://schemas.microsoft.com/office/powerpoint/2010/main" Requires="p14">
       <p:transition spd="med" p14:dur="700">
         <p:fade/>
       </p:transition>
@@ -4734,7 +4734,7 @@
     </p:spTree>
     <p:extLst>
       <p:ext uri="{BB962C8B-B14F-4D97-AF65-F5344CB8AC3E}">
-        <p14:creationId xmlns:p14="http://schemas.microsoft.com/office/powerpoint/2010/main" xmlns="" val="460095310"/>
+        <p14:creationId xmlns="" xmlns:p14="http://schemas.microsoft.com/office/powerpoint/2010/main" val="460095310"/>
       </p:ext>
     </p:extLst>
   </p:cSld>
@@ -4742,7 +4742,7 @@
     <a:masterClrMapping/>
   </p:clrMapOvr>
   <mc:AlternateContent xmlns:mc="http://schemas.openxmlformats.org/markup-compatibility/2006">
-    <mc:Choice xmlns:p14="http://schemas.microsoft.com/office/powerpoint/2010/main" xmlns="" Requires="p14">
+    <mc:Choice xmlns="" xmlns:p14="http://schemas.microsoft.com/office/powerpoint/2010/main" Requires="p14">
       <p:transition spd="med" p14:dur="700">
         <p:fade/>
       </p:transition>
@@ -4935,7 +4935,7 @@
     </p:spTree>
     <p:extLst>
       <p:ext uri="{BB962C8B-B14F-4D97-AF65-F5344CB8AC3E}">
-        <p14:creationId xmlns:p14="http://schemas.microsoft.com/office/powerpoint/2010/main" xmlns="" val="4079035419"/>
+        <p14:creationId xmlns="" xmlns:p14="http://schemas.microsoft.com/office/powerpoint/2010/main" val="4079035419"/>
       </p:ext>
     </p:extLst>
   </p:cSld>
@@ -4943,7 +4943,7 @@
     <a:masterClrMapping/>
   </p:clrMapOvr>
   <mc:AlternateContent xmlns:mc="http://schemas.openxmlformats.org/markup-compatibility/2006">
-    <mc:Choice xmlns:p14="http://schemas.microsoft.com/office/powerpoint/2010/main" xmlns="" Requires="p14">
+    <mc:Choice xmlns="" xmlns:p14="http://schemas.microsoft.com/office/powerpoint/2010/main" Requires="p14">
       <p:transition spd="med" p14:dur="700">
         <p:fade/>
       </p:transition>
@@ -5133,7 +5133,7 @@
     </p:spTree>
     <p:extLst>
       <p:ext uri="{BB962C8B-B14F-4D97-AF65-F5344CB8AC3E}">
-        <p14:creationId xmlns:p14="http://schemas.microsoft.com/office/powerpoint/2010/main" xmlns="" val="2738254095"/>
+        <p14:creationId xmlns="" xmlns:p14="http://schemas.microsoft.com/office/powerpoint/2010/main" val="2738254095"/>
       </p:ext>
     </p:extLst>
   </p:cSld>
@@ -5141,7 +5141,7 @@
     <a:masterClrMapping/>
   </p:clrMapOvr>
   <mc:AlternateContent xmlns:mc="http://schemas.openxmlformats.org/markup-compatibility/2006">
-    <mc:Choice xmlns:p14="http://schemas.microsoft.com/office/powerpoint/2010/main" xmlns="" Requires="p14">
+    <mc:Choice xmlns="" xmlns:p14="http://schemas.microsoft.com/office/powerpoint/2010/main" Requires="p14">
       <p:transition spd="med" p14:dur="700">
         <p:fade/>
       </p:transition>
@@ -5422,7 +5422,7 @@
     </p:spTree>
     <p:extLst>
       <p:ext uri="{BB962C8B-B14F-4D97-AF65-F5344CB8AC3E}">
-        <p14:creationId xmlns:p14="http://schemas.microsoft.com/office/powerpoint/2010/main" xmlns="" val="1761813311"/>
+        <p14:creationId xmlns="" xmlns:p14="http://schemas.microsoft.com/office/powerpoint/2010/main" val="1761813311"/>
       </p:ext>
     </p:extLst>
   </p:cSld>
@@ -5430,7 +5430,7 @@
     <a:masterClrMapping/>
   </p:clrMapOvr>
   <mc:AlternateContent xmlns:mc="http://schemas.openxmlformats.org/markup-compatibility/2006">
-    <mc:Choice xmlns:p14="http://schemas.microsoft.com/office/powerpoint/2010/main" xmlns="" Requires="p14">
+    <mc:Choice xmlns="" xmlns:p14="http://schemas.microsoft.com/office/powerpoint/2010/main" Requires="p14">
       <p:transition spd="med" p14:dur="700">
         <p:fade/>
       </p:transition>
@@ -5735,7 +5735,7 @@
     </p:spTree>
     <p:extLst>
       <p:ext uri="{BB962C8B-B14F-4D97-AF65-F5344CB8AC3E}">
-        <p14:creationId xmlns:p14="http://schemas.microsoft.com/office/powerpoint/2010/main" xmlns="" val="2825340762"/>
+        <p14:creationId xmlns="" xmlns:p14="http://schemas.microsoft.com/office/powerpoint/2010/main" val="2825340762"/>
       </p:ext>
     </p:extLst>
   </p:cSld>
@@ -5743,7 +5743,7 @@
     <a:masterClrMapping/>
   </p:clrMapOvr>
   <mc:AlternateContent xmlns:mc="http://schemas.openxmlformats.org/markup-compatibility/2006">
-    <mc:Choice xmlns:p14="http://schemas.microsoft.com/office/powerpoint/2010/main" xmlns="" Requires="p14">
+    <mc:Choice xmlns="" xmlns:p14="http://schemas.microsoft.com/office/powerpoint/2010/main" Requires="p14">
       <p:transition spd="med" p14:dur="700">
         <p:fade/>
       </p:transition>
@@ -6200,7 +6200,7 @@
     </p:spTree>
     <p:extLst>
       <p:ext uri="{BB962C8B-B14F-4D97-AF65-F5344CB8AC3E}">
-        <p14:creationId xmlns:p14="http://schemas.microsoft.com/office/powerpoint/2010/main" xmlns="" val="4208419506"/>
+        <p14:creationId xmlns="" xmlns:p14="http://schemas.microsoft.com/office/powerpoint/2010/main" val="4208419506"/>
       </p:ext>
     </p:extLst>
   </p:cSld>
@@ -6208,7 +6208,7 @@
     <a:masterClrMapping/>
   </p:clrMapOvr>
   <mc:AlternateContent xmlns:mc="http://schemas.openxmlformats.org/markup-compatibility/2006">
-    <mc:Choice xmlns:p14="http://schemas.microsoft.com/office/powerpoint/2010/main" xmlns="" Requires="p14">
+    <mc:Choice xmlns="" xmlns:p14="http://schemas.microsoft.com/office/powerpoint/2010/main" Requires="p14">
       <p:transition spd="med" p14:dur="700">
         <p:fade/>
       </p:transition>
@@ -6339,7 +6339,7 @@
     </p:spTree>
     <p:extLst>
       <p:ext uri="{BB962C8B-B14F-4D97-AF65-F5344CB8AC3E}">
-        <p14:creationId xmlns:p14="http://schemas.microsoft.com/office/powerpoint/2010/main" xmlns="" val="1626631400"/>
+        <p14:creationId xmlns="" xmlns:p14="http://schemas.microsoft.com/office/powerpoint/2010/main" val="1626631400"/>
       </p:ext>
     </p:extLst>
   </p:cSld>
@@ -6347,7 +6347,7 @@
     <a:masterClrMapping/>
   </p:clrMapOvr>
   <mc:AlternateContent xmlns:mc="http://schemas.openxmlformats.org/markup-compatibility/2006">
-    <mc:Choice xmlns:p14="http://schemas.microsoft.com/office/powerpoint/2010/main" xmlns="" Requires="p14">
+    <mc:Choice xmlns="" xmlns:p14="http://schemas.microsoft.com/office/powerpoint/2010/main" Requires="p14">
       <p:transition spd="med" p14:dur="700">
         <p:fade/>
       </p:transition>
@@ -6463,7 +6463,7 @@
     </p:spTree>
     <p:extLst>
       <p:ext uri="{BB962C8B-B14F-4D97-AF65-F5344CB8AC3E}">
-        <p14:creationId xmlns:p14="http://schemas.microsoft.com/office/powerpoint/2010/main" xmlns="" val="3607540120"/>
+        <p14:creationId xmlns="" xmlns:p14="http://schemas.microsoft.com/office/powerpoint/2010/main" val="3607540120"/>
       </p:ext>
     </p:extLst>
   </p:cSld>
@@ -6471,7 +6471,7 @@
     <a:masterClrMapping/>
   </p:clrMapOvr>
   <mc:AlternateContent xmlns:mc="http://schemas.openxmlformats.org/markup-compatibility/2006">
-    <mc:Choice xmlns:p14="http://schemas.microsoft.com/office/powerpoint/2010/main" xmlns="" Requires="p14">
+    <mc:Choice xmlns="" xmlns:p14="http://schemas.microsoft.com/office/powerpoint/2010/main" Requires="p14">
       <p:transition spd="med" p14:dur="700">
         <p:fade/>
       </p:transition>
@@ -6794,7 +6794,7 @@
     </p:spTree>
     <p:extLst>
       <p:ext uri="{BB962C8B-B14F-4D97-AF65-F5344CB8AC3E}">
-        <p14:creationId xmlns:p14="http://schemas.microsoft.com/office/powerpoint/2010/main" xmlns="" val="2544981540"/>
+        <p14:creationId xmlns="" xmlns:p14="http://schemas.microsoft.com/office/powerpoint/2010/main" val="2544981540"/>
       </p:ext>
     </p:extLst>
   </p:cSld>
@@ -6802,7 +6802,7 @@
     <a:masterClrMapping/>
   </p:clrMapOvr>
   <mc:AlternateContent xmlns:mc="http://schemas.openxmlformats.org/markup-compatibility/2006">
-    <mc:Choice xmlns:p14="http://schemas.microsoft.com/office/powerpoint/2010/main" xmlns="" Requires="p14">
+    <mc:Choice xmlns="" xmlns:p14="http://schemas.microsoft.com/office/powerpoint/2010/main" Requires="p14">
       <p:transition spd="med" p14:dur="700">
         <p:fade/>
       </p:transition>
@@ -7114,7 +7114,7 @@
     </p:spTree>
     <p:extLst>
       <p:ext uri="{BB962C8B-B14F-4D97-AF65-F5344CB8AC3E}">
-        <p14:creationId xmlns:p14="http://schemas.microsoft.com/office/powerpoint/2010/main" xmlns="" val="2249172152"/>
+        <p14:creationId xmlns="" xmlns:p14="http://schemas.microsoft.com/office/powerpoint/2010/main" val="2249172152"/>
       </p:ext>
     </p:extLst>
   </p:cSld>
@@ -7122,7 +7122,7 @@
     <a:masterClrMapping/>
   </p:clrMapOvr>
   <mc:AlternateContent xmlns:mc="http://schemas.openxmlformats.org/markup-compatibility/2006">
-    <mc:Choice xmlns:p14="http://schemas.microsoft.com/office/powerpoint/2010/main" xmlns="" Requires="p14">
+    <mc:Choice xmlns="" xmlns:p14="http://schemas.microsoft.com/office/powerpoint/2010/main" Requires="p14">
       <p:transition spd="med" p14:dur="700">
         <p:fade/>
       </p:transition>
@@ -7393,7 +7393,7 @@
     </p:spTree>
     <p:extLst>
       <p:ext uri="{BB962C8B-B14F-4D97-AF65-F5344CB8AC3E}">
-        <p14:creationId xmlns:p14="http://schemas.microsoft.com/office/powerpoint/2010/main" xmlns="" val="1403059996"/>
+        <p14:creationId xmlns="" xmlns:p14="http://schemas.microsoft.com/office/powerpoint/2010/main" val="1403059996"/>
       </p:ext>
     </p:extLst>
   </p:cSld>
@@ -7412,7 +7412,7 @@
     <p:sldLayoutId id="2147483659" r:id="rId11"/>
   </p:sldLayoutIdLst>
   <mc:AlternateContent xmlns:mc="http://schemas.openxmlformats.org/markup-compatibility/2006">
-    <mc:Choice xmlns:p14="http://schemas.microsoft.com/office/powerpoint/2010/main" xmlns="" Requires="p14">
+    <mc:Choice xmlns="" xmlns:p14="http://schemas.microsoft.com/office/powerpoint/2010/main" Requires="p14">
       <p:transition spd="med" p14:dur="700">
         <p:fade/>
       </p:transition>
@@ -7732,7 +7732,7 @@
   </p:txStyles>
   <p:extLst mod="1">
     <p:ext uri="{27BBF7A9-308A-43DC-89C8-2F10F3537804}">
-      <p15:sldGuideLst xmlns:p15="http://schemas.microsoft.com/office/powerpoint/2012/main" xmlns="">
+      <p15:sldGuideLst xmlns="" xmlns:p15="http://schemas.microsoft.com/office/powerpoint/2012/main">
         <p15:guide id="1" pos="3839" userDrawn="1">
           <p15:clr>
             <a:srgbClr val="F26B43"/>
@@ -7776,7 +7776,12 @@
             <p:ph type="ctrTitle"/>
           </p:nvPr>
         </p:nvSpPr>
-        <p:spPr/>
+        <p:spPr>
+          <a:xfrm>
+            <a:off x="1053852" y="2564904"/>
+            <a:ext cx="8229600" cy="1727448"/>
+          </a:xfrm>
+        </p:spPr>
         <p:txBody>
           <a:bodyPr>
             <a:normAutofit/>
@@ -7788,9 +7793,16 @@
                 <a:latin typeface="Segoe UI" panose="020B0502040204020203" pitchFamily="34" charset="0"/>
                 <a:cs typeface="Segoe UI" panose="020B0502040204020203" pitchFamily="34" charset="0"/>
               </a:rPr>
-              <a:t>Fuga de Información en los Siglos XIX y XXI</a:t>
-            </a:r>
-            <a:endParaRPr lang="es-AR" sz="6000" dirty="0">
+              <a:t>Fuga de Información </a:t>
+            </a:r>
+            <a:r>
+              <a:rPr lang="es-AR" sz="5400" dirty="0" smtClean="0">
+                <a:latin typeface="Segoe UI" panose="020B0502040204020203" pitchFamily="34" charset="0"/>
+                <a:cs typeface="Segoe UI" panose="020B0502040204020203" pitchFamily="34" charset="0"/>
+              </a:rPr>
+              <a:t>en los Siglos XIX y XXI</a:t>
+            </a:r>
+            <a:endParaRPr lang="es-AR" sz="5400" dirty="0">
               <a:latin typeface="Segoe UI" panose="020B0502040204020203" pitchFamily="34" charset="0"/>
               <a:cs typeface="Segoe UI" panose="020B0502040204020203" pitchFamily="34" charset="0"/>
             </a:endParaRPr>
@@ -7807,35 +7819,48 @@
             <p:ph type="subTitle" idx="1"/>
           </p:nvPr>
         </p:nvSpPr>
-        <p:spPr/>
+        <p:spPr>
+          <a:xfrm>
+            <a:off x="1065212" y="4800600"/>
+            <a:ext cx="9925743" cy="1219200"/>
+          </a:xfrm>
+        </p:spPr>
         <p:txBody>
           <a:bodyPr/>
           <a:lstStyle/>
           <a:p>
             <a:r>
-              <a:rPr lang="es-AR" dirty="0" err="1" smtClean="0">
-                <a:latin typeface="Segoe UI" panose="020B0502040204020203" pitchFamily="34" charset="0"/>
-                <a:cs typeface="Segoe UI" panose="020B0502040204020203" pitchFamily="34" charset="0"/>
-              </a:rPr>
-              <a:t>Fiuba</a:t>
-            </a:r>
-            <a:r>
-              <a:rPr lang="es-AR" dirty="0" smtClean="0">
-                <a:latin typeface="Segoe UI" panose="020B0502040204020203" pitchFamily="34" charset="0"/>
-                <a:cs typeface="Segoe UI" panose="020B0502040204020203" pitchFamily="34" charset="0"/>
-              </a:rPr>
-              <a:t> – implantación de sistemas</a:t>
-            </a:r>
-          </a:p>
-          <a:p>
-            <a:r>
-              <a:rPr lang="es-AR" dirty="0" smtClean="0">
-                <a:latin typeface="Segoe UI" panose="020B0502040204020203" pitchFamily="34" charset="0"/>
-                <a:cs typeface="Segoe UI" panose="020B0502040204020203" pitchFamily="34" charset="0"/>
-              </a:rPr>
-              <a:t>Noviembre de 2014</a:t>
-            </a:r>
-            <a:endParaRPr lang="es-AR" dirty="0">
+              <a:rPr lang="es-AR" b="1" dirty="0" smtClean="0">
+                <a:solidFill>
+                  <a:schemeClr val="accent1">
+                    <a:lumMod val="75000"/>
+                  </a:schemeClr>
+                </a:solidFill>
+                <a:latin typeface="Segoe UI" panose="020B0502040204020203" pitchFamily="34" charset="0"/>
+                <a:cs typeface="Segoe UI" panose="020B0502040204020203" pitchFamily="34" charset="0"/>
+              </a:rPr>
+              <a:t>75.17 - Implantación de Sistemas</a:t>
+            </a:r>
+          </a:p>
+          <a:p>
+            <a:r>
+              <a:rPr lang="es-AR" b="1" dirty="0" smtClean="0">
+                <a:solidFill>
+                  <a:schemeClr val="accent1">
+                    <a:lumMod val="75000"/>
+                  </a:schemeClr>
+                </a:solidFill>
+                <a:latin typeface="Segoe UI" panose="020B0502040204020203" pitchFamily="34" charset="0"/>
+                <a:cs typeface="Segoe UI" panose="020B0502040204020203" pitchFamily="34" charset="0"/>
+              </a:rPr>
+              <a:t>75.56 - Organización de la Implantación y el Mantenimiento</a:t>
+            </a:r>
+            <a:endParaRPr lang="es-AR" b="1" dirty="0">
+              <a:solidFill>
+                <a:schemeClr val="accent1">
+                  <a:lumMod val="75000"/>
+                </a:schemeClr>
+              </a:solidFill>
               <a:latin typeface="Segoe UI" panose="020B0502040204020203" pitchFamily="34" charset="0"/>
               <a:cs typeface="Segoe UI" panose="020B0502040204020203" pitchFamily="34" charset="0"/>
             </a:endParaRPr>
@@ -7957,6 +7982,9 @@
             <a:pPr algn="ctr"/>
             <a:r>
               <a:rPr lang="es-AR" dirty="0">
+                <a:solidFill>
+                  <a:schemeClr val="accent1"/>
+                </a:solidFill>
                 <a:latin typeface="Segoe UI" panose="020B0502040204020203" pitchFamily="34" charset="0"/>
                 <a:cs typeface="Segoe UI" panose="020B0502040204020203" pitchFamily="34" charset="0"/>
               </a:rPr>
@@ -7964,12 +7992,19 @@
             </a:r>
             <a:r>
               <a:rPr lang="es-AR" dirty="0" smtClean="0">
+                <a:solidFill>
+                  <a:schemeClr val="accent1"/>
+                </a:solidFill>
                 <a:latin typeface="Segoe UI" panose="020B0502040204020203" pitchFamily="34" charset="0"/>
                 <a:cs typeface="Segoe UI" panose="020B0502040204020203" pitchFamily="34" charset="0"/>
               </a:rPr>
               <a:t>riesgos</a:t>
             </a:r>
-            <a:endParaRPr lang="es-AR" b="1" dirty="0"/>
+            <a:endParaRPr lang="es-AR" b="1" dirty="0">
+              <a:solidFill>
+                <a:schemeClr val="accent1"/>
+              </a:solidFill>
+            </a:endParaRPr>
           </a:p>
         </p:txBody>
       </p:sp>
@@ -8137,7 +8172,7 @@
     </p:spTree>
     <p:extLst>
       <p:ext uri="{BB962C8B-B14F-4D97-AF65-F5344CB8AC3E}">
-        <p14:creationId xmlns:p14="http://schemas.microsoft.com/office/powerpoint/2010/main" xmlns="" val="4207303638"/>
+        <p14:creationId xmlns="" xmlns:p14="http://schemas.microsoft.com/office/powerpoint/2010/main" val="4207303638"/>
       </p:ext>
     </p:extLst>
   </p:cSld>
@@ -8145,7 +8180,7 @@
     <a:masterClrMapping/>
   </p:clrMapOvr>
   <mc:AlternateContent xmlns:mc="http://schemas.openxmlformats.org/markup-compatibility/2006">
-    <mc:Choice xmlns:p14="http://schemas.microsoft.com/office/powerpoint/2010/main" xmlns="" Requires="p14">
+    <mc:Choice xmlns="" xmlns:p14="http://schemas.microsoft.com/office/powerpoint/2010/main" Requires="p14">
       <p:transition spd="med" p14:dur="700">
         <p:fade/>
       </p:transition>
@@ -8199,11 +8234,40 @@
           <a:lstStyle/>
           <a:p>
             <a:r>
+              <a:rPr lang="es-AR" b="1" i="1" dirty="0" smtClean="0">
+                <a:latin typeface="Segoe UI" panose="020B0502040204020203" pitchFamily="34" charset="0"/>
+                <a:cs typeface="Segoe UI" panose="020B0502040204020203" pitchFamily="34" charset="0"/>
+              </a:rPr>
+              <a:t>Siglo XIX</a:t>
+            </a:r>
+            <a:endParaRPr lang="es-AR" b="1" i="1" dirty="0">
+              <a:latin typeface="Segoe UI" panose="020B0502040204020203" pitchFamily="34" charset="0"/>
+              <a:cs typeface="Segoe UI" panose="020B0502040204020203" pitchFamily="34" charset="0"/>
+            </a:endParaRPr>
+          </a:p>
+        </p:txBody>
+      </p:sp>
+      <p:sp>
+        <p:nvSpPr>
+          <p:cNvPr id="3" name="Text Placeholder 2"/>
+          <p:cNvSpPr>
+            <a:spLocks noGrp="1"/>
+          </p:cNvSpPr>
+          <p:nvPr>
+            <p:ph type="body" idx="1"/>
+          </p:nvPr>
+        </p:nvSpPr>
+        <p:spPr/>
+        <p:txBody>
+          <a:bodyPr/>
+          <a:lstStyle/>
+          <a:p>
+            <a:r>
               <a:rPr lang="es-AR" dirty="0" smtClean="0">
                 <a:latin typeface="Segoe UI" panose="020B0502040204020203" pitchFamily="34" charset="0"/>
                 <a:cs typeface="Segoe UI" panose="020B0502040204020203" pitchFamily="34" charset="0"/>
               </a:rPr>
-              <a:t>Siglo XIX</a:t>
+              <a:t>La información entre mosquetes y bayonetas</a:t>
             </a:r>
             <a:endParaRPr lang="es-AR" dirty="0">
               <a:latin typeface="Segoe UI" panose="020B0502040204020203" pitchFamily="34" charset="0"/>
@@ -8212,39 +8276,10 @@
           </a:p>
         </p:txBody>
       </p:sp>
-      <p:sp>
-        <p:nvSpPr>
-          <p:cNvPr id="3" name="Text Placeholder 2"/>
-          <p:cNvSpPr>
-            <a:spLocks noGrp="1"/>
-          </p:cNvSpPr>
-          <p:nvPr>
-            <p:ph type="body" idx="1"/>
-          </p:nvPr>
-        </p:nvSpPr>
-        <p:spPr/>
-        <p:txBody>
-          <a:bodyPr/>
-          <a:lstStyle/>
-          <a:p>
-            <a:r>
-              <a:rPr lang="es-AR" dirty="0" smtClean="0">
-                <a:latin typeface="Segoe UI" panose="020B0502040204020203" pitchFamily="34" charset="0"/>
-                <a:cs typeface="Segoe UI" panose="020B0502040204020203" pitchFamily="34" charset="0"/>
-              </a:rPr>
-              <a:t>La información entre mosquetes y bayonetas</a:t>
-            </a:r>
-            <a:endParaRPr lang="es-AR" dirty="0">
-              <a:latin typeface="Segoe UI" panose="020B0502040204020203" pitchFamily="34" charset="0"/>
-              <a:cs typeface="Segoe UI" panose="020B0502040204020203" pitchFamily="34" charset="0"/>
-            </a:endParaRPr>
-          </a:p>
-        </p:txBody>
-      </p:sp>
     </p:spTree>
     <p:extLst>
       <p:ext uri="{BB962C8B-B14F-4D97-AF65-F5344CB8AC3E}">
-        <p14:creationId xmlns:p14="http://schemas.microsoft.com/office/powerpoint/2010/main" xmlns="" val="3772183175"/>
+        <p14:creationId xmlns="" xmlns:p14="http://schemas.microsoft.com/office/powerpoint/2010/main" val="3772183175"/>
       </p:ext>
     </p:extLst>
   </p:cSld>
@@ -8252,7 +8287,7 @@
     <a:masterClrMapping/>
   </p:clrMapOvr>
   <mc:AlternateContent xmlns:mc="http://schemas.openxmlformats.org/markup-compatibility/2006">
-    <mc:Choice xmlns:p14="http://schemas.microsoft.com/office/powerpoint/2010/main" xmlns="" Requires="p14">
+    <mc:Choice xmlns="" xmlns:p14="http://schemas.microsoft.com/office/powerpoint/2010/main" Requires="p14">
       <p:transition spd="med" p14:dur="700">
         <p:fade/>
       </p:transition>
@@ -8465,7 +8500,7 @@
     </p:spTree>
     <p:extLst>
       <p:ext uri="{BB962C8B-B14F-4D97-AF65-F5344CB8AC3E}">
-        <p14:creationId xmlns:p14="http://schemas.microsoft.com/office/powerpoint/2010/main" xmlns="" val="911844652"/>
+        <p14:creationId xmlns="" xmlns:p14="http://schemas.microsoft.com/office/powerpoint/2010/main" val="911844652"/>
       </p:ext>
     </p:extLst>
   </p:cSld>
@@ -8473,7 +8508,7 @@
     <a:masterClrMapping/>
   </p:clrMapOvr>
   <mc:AlternateContent xmlns:mc="http://schemas.openxmlformats.org/markup-compatibility/2006">
-    <mc:Choice xmlns:p14="http://schemas.microsoft.com/office/powerpoint/2010/main" xmlns="" Requires="p14">
+    <mc:Choice xmlns="" xmlns:p14="http://schemas.microsoft.com/office/powerpoint/2010/main" Requires="p14">
       <p:transition spd="med" p14:dur="700">
         <p:fade/>
       </p:transition>
@@ -8528,11 +8563,93 @@
           <a:p>
             <a:r>
               <a:rPr lang="es-AR" dirty="0" smtClean="0">
+                <a:solidFill>
+                  <a:schemeClr val="accent1"/>
+                </a:solidFill>
                 <a:latin typeface="Segoe UI" panose="020B0502040204020203" pitchFamily="34" charset="0"/>
                 <a:cs typeface="Segoe UI" panose="020B0502040204020203" pitchFamily="34" charset="0"/>
               </a:rPr>
               <a:t>Revolución Industrial</a:t>
             </a:r>
+            <a:endParaRPr lang="es-AR" dirty="0">
+              <a:solidFill>
+                <a:schemeClr val="accent1"/>
+              </a:solidFill>
+              <a:latin typeface="Segoe UI" panose="020B0502040204020203" pitchFamily="34" charset="0"/>
+              <a:cs typeface="Segoe UI" panose="020B0502040204020203" pitchFamily="34" charset="0"/>
+            </a:endParaRPr>
+          </a:p>
+        </p:txBody>
+      </p:sp>
+      <p:sp>
+        <p:nvSpPr>
+          <p:cNvPr id="3" name="Content Placeholder 2"/>
+          <p:cNvSpPr>
+            <a:spLocks noGrp="1"/>
+          </p:cNvSpPr>
+          <p:nvPr>
+            <p:ph idx="1"/>
+          </p:nvPr>
+        </p:nvSpPr>
+        <p:spPr/>
+        <p:txBody>
+          <a:bodyPr/>
+          <a:lstStyle/>
+          <a:p>
+            <a:r>
+              <a:rPr lang="es-AR" dirty="0" smtClean="0">
+                <a:latin typeface="Segoe UI" panose="020B0502040204020203" pitchFamily="34" charset="0"/>
+                <a:cs typeface="Segoe UI" panose="020B0502040204020203" pitchFamily="34" charset="0"/>
+              </a:rPr>
+              <a:t>Importancia de la técnica productiva</a:t>
+            </a:r>
+          </a:p>
+          <a:p>
+            <a:r>
+              <a:rPr lang="es-AR" dirty="0" smtClean="0">
+                <a:latin typeface="Segoe UI" panose="020B0502040204020203" pitchFamily="34" charset="0"/>
+                <a:cs typeface="Segoe UI" panose="020B0502040204020203" pitchFamily="34" charset="0"/>
+              </a:rPr>
+              <a:t>Centralización poblacional</a:t>
+            </a:r>
+          </a:p>
+          <a:p>
+            <a:r>
+              <a:rPr lang="es-AR" dirty="0" smtClean="0">
+                <a:latin typeface="Segoe UI" panose="020B0502040204020203" pitchFamily="34" charset="0"/>
+                <a:cs typeface="Segoe UI" panose="020B0502040204020203" pitchFamily="34" charset="0"/>
+              </a:rPr>
+              <a:t>Burguesía Industrial</a:t>
+            </a:r>
+          </a:p>
+          <a:p>
+            <a:r>
+              <a:rPr lang="es-AR" dirty="0" smtClean="0">
+                <a:latin typeface="Segoe UI" panose="020B0502040204020203" pitchFamily="34" charset="0"/>
+                <a:cs typeface="Segoe UI" panose="020B0502040204020203" pitchFamily="34" charset="0"/>
+              </a:rPr>
+              <a:t>Ordenamiento social</a:t>
+            </a:r>
+          </a:p>
+          <a:p>
+            <a:r>
+              <a:rPr lang="es-AR" dirty="0" smtClean="0">
+                <a:latin typeface="Segoe UI" panose="020B0502040204020203" pitchFamily="34" charset="0"/>
+                <a:cs typeface="Segoe UI" panose="020B0502040204020203" pitchFamily="34" charset="0"/>
+              </a:rPr>
+              <a:t>Liberalismo</a:t>
+            </a:r>
+          </a:p>
+          <a:p>
+            <a:r>
+              <a:rPr lang="es-AR" dirty="0" smtClean="0">
+                <a:latin typeface="Segoe UI" panose="020B0502040204020203" pitchFamily="34" charset="0"/>
+                <a:cs typeface="Segoe UI" panose="020B0502040204020203" pitchFamily="34" charset="0"/>
+              </a:rPr>
+              <a:t>Iluminismo y doctrinas gnósticas</a:t>
+            </a:r>
+          </a:p>
+          <a:p>
             <a:endParaRPr lang="es-AR" dirty="0">
               <a:latin typeface="Segoe UI" panose="020B0502040204020203" pitchFamily="34" charset="0"/>
               <a:cs typeface="Segoe UI" panose="020B0502040204020203" pitchFamily="34" charset="0"/>
@@ -8542,12 +8659,12 @@
       </p:sp>
       <p:sp>
         <p:nvSpPr>
-          <p:cNvPr id="3" name="Content Placeholder 2"/>
+          <p:cNvPr id="4" name="Text Placeholder 3"/>
           <p:cNvSpPr>
             <a:spLocks noGrp="1"/>
           </p:cNvSpPr>
           <p:nvPr>
-            <p:ph idx="1"/>
+            <p:ph type="body" sz="half" idx="2"/>
           </p:nvPr>
         </p:nvSpPr>
         <p:spPr/>
@@ -8560,55 +8677,8 @@
                 <a:latin typeface="Segoe UI" panose="020B0502040204020203" pitchFamily="34" charset="0"/>
                 <a:cs typeface="Segoe UI" panose="020B0502040204020203" pitchFamily="34" charset="0"/>
               </a:rPr>
-              <a:t>Importancia de la técnica productiva</a:t>
-            </a:r>
-          </a:p>
-          <a:p>
-            <a:r>
-              <a:rPr lang="es-AR" dirty="0" smtClean="0">
-                <a:latin typeface="Segoe UI" panose="020B0502040204020203" pitchFamily="34" charset="0"/>
-                <a:cs typeface="Segoe UI" panose="020B0502040204020203" pitchFamily="34" charset="0"/>
-              </a:rPr>
-              <a:t>Centralización poblacional</a:t>
-            </a:r>
-          </a:p>
-          <a:p>
-            <a:r>
-              <a:rPr lang="es-AR" dirty="0" smtClean="0">
-                <a:latin typeface="Segoe UI" panose="020B0502040204020203" pitchFamily="34" charset="0"/>
-                <a:cs typeface="Segoe UI" panose="020B0502040204020203" pitchFamily="34" charset="0"/>
-              </a:rPr>
-              <a:t>Burguesía Industrial</a:t>
-            </a:r>
-          </a:p>
-          <a:p>
-            <a:r>
-              <a:rPr lang="es-AR" dirty="0" smtClean="0">
-                <a:latin typeface="Segoe UI" panose="020B0502040204020203" pitchFamily="34" charset="0"/>
-                <a:cs typeface="Segoe UI" panose="020B0502040204020203" pitchFamily="34" charset="0"/>
-              </a:rPr>
-              <a:t>Ordenamiento social</a:t>
-            </a:r>
-          </a:p>
-          <a:p>
-            <a:r>
-              <a:rPr lang="es-AR" dirty="0" smtClean="0">
-                <a:latin typeface="Segoe UI" panose="020B0502040204020203" pitchFamily="34" charset="0"/>
-                <a:cs typeface="Segoe UI" panose="020B0502040204020203" pitchFamily="34" charset="0"/>
-              </a:rPr>
-              <a:t>Liberalismo</a:t>
-            </a:r>
-          </a:p>
-          <a:p>
-            <a:r>
-              <a:rPr lang="es-AR" dirty="0" smtClean="0">
-                <a:latin typeface="Segoe UI" panose="020B0502040204020203" pitchFamily="34" charset="0"/>
-                <a:cs typeface="Segoe UI" panose="020B0502040204020203" pitchFamily="34" charset="0"/>
-              </a:rPr>
-              <a:t>Iluminismo y doctrinas gnósticas</a:t>
-            </a:r>
-          </a:p>
-          <a:p>
+              <a:t>Iniciada a mediados del Siglo XVIII</a:t>
+            </a:r>
             <a:endParaRPr lang="es-AR" dirty="0">
               <a:latin typeface="Segoe UI" panose="020B0502040204020203" pitchFamily="34" charset="0"/>
               <a:cs typeface="Segoe UI" panose="020B0502040204020203" pitchFamily="34" charset="0"/>
@@ -8616,39 +8686,10 @@
           </a:p>
         </p:txBody>
       </p:sp>
-      <p:sp>
-        <p:nvSpPr>
-          <p:cNvPr id="4" name="Text Placeholder 3"/>
-          <p:cNvSpPr>
-            <a:spLocks noGrp="1"/>
-          </p:cNvSpPr>
-          <p:nvPr>
-            <p:ph type="body" sz="half" idx="2"/>
-          </p:nvPr>
-        </p:nvSpPr>
-        <p:spPr/>
-        <p:txBody>
-          <a:bodyPr/>
-          <a:lstStyle/>
-          <a:p>
-            <a:r>
-              <a:rPr lang="es-AR" dirty="0" smtClean="0">
-                <a:latin typeface="Segoe UI" panose="020B0502040204020203" pitchFamily="34" charset="0"/>
-                <a:cs typeface="Segoe UI" panose="020B0502040204020203" pitchFamily="34" charset="0"/>
-              </a:rPr>
-              <a:t>Iniciada a mediados del Siglo XVIII</a:t>
-            </a:r>
-            <a:endParaRPr lang="es-AR" dirty="0">
-              <a:latin typeface="Segoe UI" panose="020B0502040204020203" pitchFamily="34" charset="0"/>
-              <a:cs typeface="Segoe UI" panose="020B0502040204020203" pitchFamily="34" charset="0"/>
-            </a:endParaRPr>
-          </a:p>
-        </p:txBody>
-      </p:sp>
     </p:spTree>
     <p:extLst>
       <p:ext uri="{BB962C8B-B14F-4D97-AF65-F5344CB8AC3E}">
-        <p14:creationId xmlns:p14="http://schemas.microsoft.com/office/powerpoint/2010/main" xmlns="" val="3751154171"/>
+        <p14:creationId xmlns="" xmlns:p14="http://schemas.microsoft.com/office/powerpoint/2010/main" val="3751154171"/>
       </p:ext>
     </p:extLst>
   </p:cSld>
@@ -8656,7 +8697,7 @@
     <a:masterClrMapping/>
   </p:clrMapOvr>
   <mc:AlternateContent xmlns:mc="http://schemas.openxmlformats.org/markup-compatibility/2006">
-    <mc:Choice xmlns:p14="http://schemas.microsoft.com/office/powerpoint/2010/main" xmlns="" Requires="p14">
+    <mc:Choice xmlns="" xmlns:p14="http://schemas.microsoft.com/office/powerpoint/2010/main" Requires="p14">
       <p:transition spd="med" p14:dur="700">
         <p:fade/>
       </p:transition>
@@ -8711,6 +8752,9 @@
           <a:p>
             <a:r>
               <a:rPr lang="es-AR" dirty="0" smtClean="0">
+                <a:solidFill>
+                  <a:schemeClr val="accent1"/>
+                </a:solidFill>
                 <a:latin typeface="Segoe UI" panose="020B0502040204020203" pitchFamily="34" charset="0"/>
                 <a:cs typeface="Segoe UI" panose="020B0502040204020203" pitchFamily="34" charset="0"/>
               </a:rPr>
@@ -8718,16 +8762,90 @@
             </a:r>
             <a:br>
               <a:rPr lang="es-AR" dirty="0" smtClean="0">
+                <a:solidFill>
+                  <a:schemeClr val="accent1"/>
+                </a:solidFill>
                 <a:latin typeface="Segoe UI" panose="020B0502040204020203" pitchFamily="34" charset="0"/>
                 <a:cs typeface="Segoe UI" panose="020B0502040204020203" pitchFamily="34" charset="0"/>
               </a:rPr>
             </a:br>
             <a:r>
               <a:rPr lang="es-AR" dirty="0" smtClean="0">
+                <a:solidFill>
+                  <a:schemeClr val="accent1"/>
+                </a:solidFill>
                 <a:latin typeface="Segoe UI" panose="020B0502040204020203" pitchFamily="34" charset="0"/>
                 <a:cs typeface="Segoe UI" panose="020B0502040204020203" pitchFamily="34" charset="0"/>
               </a:rPr>
               <a:t>El Inventor</a:t>
+            </a:r>
+            <a:endParaRPr lang="es-AR" dirty="0">
+              <a:solidFill>
+                <a:schemeClr val="accent1"/>
+              </a:solidFill>
+              <a:latin typeface="Segoe UI" panose="020B0502040204020203" pitchFamily="34" charset="0"/>
+              <a:cs typeface="Segoe UI" panose="020B0502040204020203" pitchFamily="34" charset="0"/>
+            </a:endParaRPr>
+          </a:p>
+        </p:txBody>
+      </p:sp>
+      <p:sp>
+        <p:nvSpPr>
+          <p:cNvPr id="3" name="Content Placeholder 2"/>
+          <p:cNvSpPr>
+            <a:spLocks noGrp="1"/>
+          </p:cNvSpPr>
+          <p:nvPr>
+            <p:ph idx="1"/>
+          </p:nvPr>
+        </p:nvSpPr>
+        <p:spPr/>
+        <p:txBody>
+          <a:bodyPr/>
+          <a:lstStyle/>
+          <a:p>
+            <a:r>
+              <a:rPr lang="es-AR" dirty="0" smtClean="0">
+                <a:latin typeface="Segoe UI" panose="020B0502040204020203" pitchFamily="34" charset="0"/>
+                <a:cs typeface="Segoe UI" panose="020B0502040204020203" pitchFamily="34" charset="0"/>
+              </a:rPr>
+              <a:t>Búsqueda de mayor productividad en la producción de bienes industriales</a:t>
+            </a:r>
+          </a:p>
+          <a:p>
+            <a:r>
+              <a:rPr lang="es-AR" dirty="0" smtClean="0">
+                <a:latin typeface="Segoe UI" panose="020B0502040204020203" pitchFamily="34" charset="0"/>
+                <a:cs typeface="Segoe UI" panose="020B0502040204020203" pitchFamily="34" charset="0"/>
+              </a:rPr>
+              <a:t>Revalorización del conocimiento técnico</a:t>
+            </a:r>
+          </a:p>
+          <a:p>
+            <a:r>
+              <a:rPr lang="es-AR" dirty="0" smtClean="0">
+                <a:latin typeface="Segoe UI" panose="020B0502040204020203" pitchFamily="34" charset="0"/>
+                <a:cs typeface="Segoe UI" panose="020B0502040204020203" pitchFamily="34" charset="0"/>
+              </a:rPr>
+              <a:t>Creciente demanda por un mayor incentivo a la actividad de la invención</a:t>
+            </a:r>
+          </a:p>
+          <a:p>
+            <a:r>
+              <a:rPr lang="es-AR" dirty="0" smtClean="0">
+                <a:latin typeface="Segoe UI" panose="020B0502040204020203" pitchFamily="34" charset="0"/>
+                <a:cs typeface="Segoe UI" panose="020B0502040204020203" pitchFamily="34" charset="0"/>
+              </a:rPr>
+              <a:t>Sofisticación y formalización del conocimiento técnico</a:t>
+            </a:r>
+          </a:p>
+          <a:p>
+            <a:r>
+              <a:rPr lang="es-AR" dirty="0" smtClean="0">
+                <a:latin typeface="Segoe UI" panose="020B0502040204020203" pitchFamily="34" charset="0"/>
+                <a:cs typeface="Segoe UI" panose="020B0502040204020203" pitchFamily="34" charset="0"/>
+              </a:rPr>
+              <a:t>Rédito del inventor</a:t>
             </a:r>
             <a:endParaRPr lang="es-AR" dirty="0">
               <a:latin typeface="Segoe UI" panose="020B0502040204020203" pitchFamily="34" charset="0"/>
@@ -8738,12 +8856,12 @@
       </p:sp>
       <p:sp>
         <p:nvSpPr>
-          <p:cNvPr id="3" name="Content Placeholder 2"/>
+          <p:cNvPr id="4" name="Text Placeholder 3"/>
           <p:cNvSpPr>
             <a:spLocks noGrp="1"/>
           </p:cNvSpPr>
           <p:nvPr>
-            <p:ph idx="1"/>
+            <p:ph type="body" sz="half" idx="2"/>
           </p:nvPr>
         </p:nvSpPr>
         <p:spPr/>
@@ -8756,43 +8874,7 @@
                 <a:latin typeface="Segoe UI" panose="020B0502040204020203" pitchFamily="34" charset="0"/>
                 <a:cs typeface="Segoe UI" panose="020B0502040204020203" pitchFamily="34" charset="0"/>
               </a:rPr>
-              <a:t>Búsqueda de mayor productividad en la producción de bienes industriales</a:t>
-            </a:r>
-          </a:p>
-          <a:p>
-            <a:r>
-              <a:rPr lang="es-AR" dirty="0" smtClean="0">
-                <a:latin typeface="Segoe UI" panose="020B0502040204020203" pitchFamily="34" charset="0"/>
-                <a:cs typeface="Segoe UI" panose="020B0502040204020203" pitchFamily="34" charset="0"/>
-              </a:rPr>
-              <a:t>Revalorización del conocimiento técnico</a:t>
-            </a:r>
-          </a:p>
-          <a:p>
-            <a:r>
-              <a:rPr lang="es-AR" dirty="0" smtClean="0">
-                <a:latin typeface="Segoe UI" panose="020B0502040204020203" pitchFamily="34" charset="0"/>
-                <a:cs typeface="Segoe UI" panose="020B0502040204020203" pitchFamily="34" charset="0"/>
-              </a:rPr>
-              <a:t>Creciente demanda por un mayor incentivo a la actividad de la invención</a:t>
-            </a:r>
-          </a:p>
-          <a:p>
-            <a:r>
-              <a:rPr lang="es-AR" dirty="0" smtClean="0">
-                <a:latin typeface="Segoe UI" panose="020B0502040204020203" pitchFamily="34" charset="0"/>
-                <a:cs typeface="Segoe UI" panose="020B0502040204020203" pitchFamily="34" charset="0"/>
-              </a:rPr>
-              <a:t>Sofisticación y formalización del conocimiento técnico</a:t>
-            </a:r>
-          </a:p>
-          <a:p>
-            <a:r>
-              <a:rPr lang="es-AR" dirty="0" smtClean="0">
-                <a:latin typeface="Segoe UI" panose="020B0502040204020203" pitchFamily="34" charset="0"/>
-                <a:cs typeface="Segoe UI" panose="020B0502040204020203" pitchFamily="34" charset="0"/>
-              </a:rPr>
-              <a:t>Rédito del inventor</a:t>
+              <a:t>De la sabiduría a la invención</a:t>
             </a:r>
             <a:endParaRPr lang="es-AR" dirty="0">
               <a:latin typeface="Segoe UI" panose="020B0502040204020203" pitchFamily="34" charset="0"/>
@@ -8801,39 +8883,10 @@
           </a:p>
         </p:txBody>
       </p:sp>
-      <p:sp>
-        <p:nvSpPr>
-          <p:cNvPr id="4" name="Text Placeholder 3"/>
-          <p:cNvSpPr>
-            <a:spLocks noGrp="1"/>
-          </p:cNvSpPr>
-          <p:nvPr>
-            <p:ph type="body" sz="half" idx="2"/>
-          </p:nvPr>
-        </p:nvSpPr>
-        <p:spPr/>
-        <p:txBody>
-          <a:bodyPr/>
-          <a:lstStyle/>
-          <a:p>
-            <a:r>
-              <a:rPr lang="es-AR" dirty="0" smtClean="0">
-                <a:latin typeface="Segoe UI" panose="020B0502040204020203" pitchFamily="34" charset="0"/>
-                <a:cs typeface="Segoe UI" panose="020B0502040204020203" pitchFamily="34" charset="0"/>
-              </a:rPr>
-              <a:t>De la sabiduría a la invención</a:t>
-            </a:r>
-            <a:endParaRPr lang="es-AR" dirty="0">
-              <a:latin typeface="Segoe UI" panose="020B0502040204020203" pitchFamily="34" charset="0"/>
-              <a:cs typeface="Segoe UI" panose="020B0502040204020203" pitchFamily="34" charset="0"/>
-            </a:endParaRPr>
-          </a:p>
-        </p:txBody>
-      </p:sp>
     </p:spTree>
     <p:extLst>
       <p:ext uri="{BB962C8B-B14F-4D97-AF65-F5344CB8AC3E}">
-        <p14:creationId xmlns:p14="http://schemas.microsoft.com/office/powerpoint/2010/main" xmlns="" val="2714171304"/>
+        <p14:creationId xmlns="" xmlns:p14="http://schemas.microsoft.com/office/powerpoint/2010/main" val="2714171304"/>
       </p:ext>
     </p:extLst>
   </p:cSld>
@@ -8841,7 +8894,7 @@
     <a:masterClrMapping/>
   </p:clrMapOvr>
   <mc:AlternateContent xmlns:mc="http://schemas.openxmlformats.org/markup-compatibility/2006">
-    <mc:Choice xmlns:p14="http://schemas.microsoft.com/office/powerpoint/2010/main" xmlns="" Requires="p14">
+    <mc:Choice xmlns="" xmlns:p14="http://schemas.microsoft.com/office/powerpoint/2010/main" Requires="p14">
       <p:transition spd="med" p14:dur="700">
         <p:fade/>
       </p:transition>
@@ -8896,10 +8949,124 @@
           <a:p>
             <a:r>
               <a:rPr lang="es-AR" dirty="0" smtClean="0">
+                <a:solidFill>
+                  <a:schemeClr val="accent1"/>
+                </a:solidFill>
                 <a:latin typeface="Segoe UI" panose="020B0502040204020203" pitchFamily="34" charset="0"/>
                 <a:cs typeface="Segoe UI" panose="020B0502040204020203" pitchFamily="34" charset="0"/>
               </a:rPr>
               <a:t>Política</a:t>
+            </a:r>
+            <a:endParaRPr lang="es-AR" dirty="0">
+              <a:solidFill>
+                <a:schemeClr val="accent1"/>
+              </a:solidFill>
+              <a:latin typeface="Segoe UI" panose="020B0502040204020203" pitchFamily="34" charset="0"/>
+              <a:cs typeface="Segoe UI" panose="020B0502040204020203" pitchFamily="34" charset="0"/>
+            </a:endParaRPr>
+          </a:p>
+        </p:txBody>
+      </p:sp>
+      <p:sp>
+        <p:nvSpPr>
+          <p:cNvPr id="3" name="Content Placeholder 2"/>
+          <p:cNvSpPr>
+            <a:spLocks noGrp="1"/>
+          </p:cNvSpPr>
+          <p:nvPr>
+            <p:ph idx="1"/>
+          </p:nvPr>
+        </p:nvSpPr>
+        <p:spPr/>
+        <p:txBody>
+          <a:bodyPr/>
+          <a:lstStyle/>
+          <a:p>
+            <a:r>
+              <a:rPr lang="es-AR" dirty="0" smtClean="0">
+                <a:latin typeface="Segoe UI" panose="020B0502040204020203" pitchFamily="34" charset="0"/>
+                <a:cs typeface="Segoe UI" panose="020B0502040204020203" pitchFamily="34" charset="0"/>
+              </a:rPr>
+              <a:t>Propagación de estructuras e ideas de la Revolución Francesa</a:t>
+            </a:r>
+          </a:p>
+          <a:p>
+            <a:r>
+              <a:rPr lang="es-AR" dirty="0" smtClean="0">
+                <a:latin typeface="Segoe UI" panose="020B0502040204020203" pitchFamily="34" charset="0"/>
+                <a:cs typeface="Segoe UI" panose="020B0502040204020203" pitchFamily="34" charset="0"/>
+              </a:rPr>
+              <a:t>Instauraciones de Repúblicas como Estados Nacionales</a:t>
+            </a:r>
+          </a:p>
+          <a:p>
+            <a:r>
+              <a:rPr lang="es-AR" dirty="0" smtClean="0">
+                <a:latin typeface="Segoe UI" panose="020B0502040204020203" pitchFamily="34" charset="0"/>
+                <a:cs typeface="Segoe UI" panose="020B0502040204020203" pitchFamily="34" charset="0"/>
+              </a:rPr>
+              <a:t>Desintegración del Reino de Indias e independencia de regiones administrativas divididas en provincias</a:t>
+            </a:r>
+          </a:p>
+          <a:p>
+            <a:r>
+              <a:rPr lang="es-AR" dirty="0" smtClean="0">
+                <a:latin typeface="Segoe UI" panose="020B0502040204020203" pitchFamily="34" charset="0"/>
+                <a:cs typeface="Segoe UI" panose="020B0502040204020203" pitchFamily="34" charset="0"/>
+              </a:rPr>
+              <a:t>Colonización de África. Expediciones científicas europeas y repartición de territorios continentales (Conferencia de Berlín)</a:t>
+            </a:r>
+          </a:p>
+          <a:p>
+            <a:r>
+              <a:rPr lang="es-AR" dirty="0" smtClean="0">
+                <a:latin typeface="Segoe UI" panose="020B0502040204020203" pitchFamily="34" charset="0"/>
+                <a:cs typeface="Segoe UI" panose="020B0502040204020203" pitchFamily="34" charset="0"/>
+              </a:rPr>
+              <a:t>Doctrinas materialistas: liberalismo y socialismo</a:t>
+            </a:r>
+          </a:p>
+          <a:p>
+            <a:endParaRPr lang="es-AR" dirty="0" smtClean="0">
+              <a:latin typeface="Segoe UI" panose="020B0502040204020203" pitchFamily="34" charset="0"/>
+              <a:cs typeface="Segoe UI" panose="020B0502040204020203" pitchFamily="34" charset="0"/>
+            </a:endParaRPr>
+          </a:p>
+          <a:p>
+            <a:endParaRPr lang="es-AR" dirty="0" smtClean="0">
+              <a:latin typeface="Segoe UI" panose="020B0502040204020203" pitchFamily="34" charset="0"/>
+              <a:cs typeface="Segoe UI" panose="020B0502040204020203" pitchFamily="34" charset="0"/>
+            </a:endParaRPr>
+          </a:p>
+          <a:p>
+            <a:endParaRPr lang="es-AR" dirty="0" smtClean="0">
+              <a:latin typeface="Segoe UI" panose="020B0502040204020203" pitchFamily="34" charset="0"/>
+              <a:cs typeface="Segoe UI" panose="020B0502040204020203" pitchFamily="34" charset="0"/>
+            </a:endParaRPr>
+          </a:p>
+        </p:txBody>
+      </p:sp>
+      <p:sp>
+        <p:nvSpPr>
+          <p:cNvPr id="4" name="Text Placeholder 3"/>
+          <p:cNvSpPr>
+            <a:spLocks noGrp="1"/>
+          </p:cNvSpPr>
+          <p:nvPr>
+            <p:ph type="body" sz="half" idx="2"/>
+          </p:nvPr>
+        </p:nvSpPr>
+        <p:spPr/>
+        <p:txBody>
+          <a:bodyPr/>
+          <a:lstStyle/>
+          <a:p>
+            <a:r>
+              <a:rPr lang="es-AR" dirty="0" smtClean="0">
+                <a:latin typeface="Segoe UI" panose="020B0502040204020203" pitchFamily="34" charset="0"/>
+                <a:cs typeface="Segoe UI" panose="020B0502040204020203" pitchFamily="34" charset="0"/>
+              </a:rPr>
+              <a:t>“Lo relativo al ordenamiento de la ciudad”.</a:t>
             </a:r>
             <a:endParaRPr lang="es-AR" dirty="0">
               <a:latin typeface="Segoe UI" panose="020B0502040204020203" pitchFamily="34" charset="0"/>
@@ -8908,118 +9075,10 @@
           </a:p>
         </p:txBody>
       </p:sp>
-      <p:sp>
-        <p:nvSpPr>
-          <p:cNvPr id="3" name="Content Placeholder 2"/>
-          <p:cNvSpPr>
-            <a:spLocks noGrp="1"/>
-          </p:cNvSpPr>
-          <p:nvPr>
-            <p:ph idx="1"/>
-          </p:nvPr>
-        </p:nvSpPr>
-        <p:spPr/>
-        <p:txBody>
-          <a:bodyPr/>
-          <a:lstStyle/>
-          <a:p>
-            <a:r>
-              <a:rPr lang="es-AR" dirty="0" smtClean="0">
-                <a:latin typeface="Segoe UI" panose="020B0502040204020203" pitchFamily="34" charset="0"/>
-                <a:cs typeface="Segoe UI" panose="020B0502040204020203" pitchFamily="34" charset="0"/>
-              </a:rPr>
-              <a:t>Propagación de estructuras e ideas de la Revolución Francesa</a:t>
-            </a:r>
-          </a:p>
-          <a:p>
-            <a:r>
-              <a:rPr lang="es-AR" dirty="0" smtClean="0">
-                <a:latin typeface="Segoe UI" panose="020B0502040204020203" pitchFamily="34" charset="0"/>
-                <a:cs typeface="Segoe UI" panose="020B0502040204020203" pitchFamily="34" charset="0"/>
-              </a:rPr>
-              <a:t>Instauraciones de Repúblicas como Estados Nacionales</a:t>
-            </a:r>
-          </a:p>
-          <a:p>
-            <a:r>
-              <a:rPr lang="es-AR" dirty="0" smtClean="0">
-                <a:latin typeface="Segoe UI" panose="020B0502040204020203" pitchFamily="34" charset="0"/>
-                <a:cs typeface="Segoe UI" panose="020B0502040204020203" pitchFamily="34" charset="0"/>
-              </a:rPr>
-              <a:t>Desintegración del Reino de Indias e independencia de regiones administrativas divididas en provincias</a:t>
-            </a:r>
-          </a:p>
-          <a:p>
-            <a:r>
-              <a:rPr lang="es-AR" dirty="0" smtClean="0">
-                <a:latin typeface="Segoe UI" panose="020B0502040204020203" pitchFamily="34" charset="0"/>
-                <a:cs typeface="Segoe UI" panose="020B0502040204020203" pitchFamily="34" charset="0"/>
-              </a:rPr>
-              <a:t>Colonización de África. Expediciones científicas europeas y repartición de territorios continentales (Conferencia de Berlín)</a:t>
-            </a:r>
-          </a:p>
-          <a:p>
-            <a:r>
-              <a:rPr lang="es-AR" dirty="0" smtClean="0">
-                <a:latin typeface="Segoe UI" panose="020B0502040204020203" pitchFamily="34" charset="0"/>
-                <a:cs typeface="Segoe UI" panose="020B0502040204020203" pitchFamily="34" charset="0"/>
-              </a:rPr>
-              <a:t>Doctrinas materialistas: liberalismo y socialismo</a:t>
-            </a:r>
-          </a:p>
-          <a:p>
-            <a:endParaRPr lang="es-AR" dirty="0" smtClean="0">
-              <a:latin typeface="Segoe UI" panose="020B0502040204020203" pitchFamily="34" charset="0"/>
-              <a:cs typeface="Segoe UI" panose="020B0502040204020203" pitchFamily="34" charset="0"/>
-            </a:endParaRPr>
-          </a:p>
-          <a:p>
-            <a:endParaRPr lang="es-AR" dirty="0" smtClean="0">
-              <a:latin typeface="Segoe UI" panose="020B0502040204020203" pitchFamily="34" charset="0"/>
-              <a:cs typeface="Segoe UI" panose="020B0502040204020203" pitchFamily="34" charset="0"/>
-            </a:endParaRPr>
-          </a:p>
-          <a:p>
-            <a:endParaRPr lang="es-AR" dirty="0" smtClean="0">
-              <a:latin typeface="Segoe UI" panose="020B0502040204020203" pitchFamily="34" charset="0"/>
-              <a:cs typeface="Segoe UI" panose="020B0502040204020203" pitchFamily="34" charset="0"/>
-            </a:endParaRPr>
-          </a:p>
-        </p:txBody>
-      </p:sp>
-      <p:sp>
-        <p:nvSpPr>
-          <p:cNvPr id="4" name="Text Placeholder 3"/>
-          <p:cNvSpPr>
-            <a:spLocks noGrp="1"/>
-          </p:cNvSpPr>
-          <p:nvPr>
-            <p:ph type="body" sz="half" idx="2"/>
-          </p:nvPr>
-        </p:nvSpPr>
-        <p:spPr/>
-        <p:txBody>
-          <a:bodyPr/>
-          <a:lstStyle/>
-          <a:p>
-            <a:r>
-              <a:rPr lang="es-AR" dirty="0" smtClean="0">
-                <a:latin typeface="Segoe UI" panose="020B0502040204020203" pitchFamily="34" charset="0"/>
-                <a:cs typeface="Segoe UI" panose="020B0502040204020203" pitchFamily="34" charset="0"/>
-              </a:rPr>
-              <a:t>“Lo relativo al ordenamiento de la ciudad”.</a:t>
-            </a:r>
-            <a:endParaRPr lang="es-AR" dirty="0">
-              <a:latin typeface="Segoe UI" panose="020B0502040204020203" pitchFamily="34" charset="0"/>
-              <a:cs typeface="Segoe UI" panose="020B0502040204020203" pitchFamily="34" charset="0"/>
-            </a:endParaRPr>
-          </a:p>
-        </p:txBody>
-      </p:sp>
     </p:spTree>
     <p:extLst>
       <p:ext uri="{BB962C8B-B14F-4D97-AF65-F5344CB8AC3E}">
-        <p14:creationId xmlns:p14="http://schemas.microsoft.com/office/powerpoint/2010/main" xmlns="" val="2246987516"/>
+        <p14:creationId xmlns="" xmlns:p14="http://schemas.microsoft.com/office/powerpoint/2010/main" val="2246987516"/>
       </p:ext>
     </p:extLst>
   </p:cSld>
@@ -9027,7 +9086,7 @@
     <a:masterClrMapping/>
   </p:clrMapOvr>
   <mc:AlternateContent xmlns:mc="http://schemas.openxmlformats.org/markup-compatibility/2006">
-    <mc:Choice xmlns:p14="http://schemas.microsoft.com/office/powerpoint/2010/main" xmlns="" Requires="p14">
+    <mc:Choice xmlns="" xmlns:p14="http://schemas.microsoft.com/office/powerpoint/2010/main" Requires="p14">
       <p:transition spd="med" p14:dur="700">
         <p:fade/>
       </p:transition>
@@ -9081,12 +9140,116 @@
           <a:lstStyle/>
           <a:p>
             <a:r>
+              <a:rPr lang="en-US" dirty="0" err="1" smtClean="0">
+                <a:solidFill>
+                  <a:schemeClr val="accent1"/>
+                </a:solidFill>
+                <a:latin typeface="Segoe UI" panose="020B0502040204020203" pitchFamily="34" charset="0"/>
+                <a:cs typeface="Segoe UI" panose="020B0502040204020203" pitchFamily="34" charset="0"/>
+              </a:rPr>
+              <a:t>Administración</a:t>
+            </a:r>
+            <a:r>
+              <a:rPr lang="en-US" dirty="0" smtClean="0">
+                <a:solidFill>
+                  <a:schemeClr val="accent1"/>
+                </a:solidFill>
+                <a:latin typeface="Segoe UI" panose="020B0502040204020203" pitchFamily="34" charset="0"/>
+                <a:cs typeface="Segoe UI" panose="020B0502040204020203" pitchFamily="34" charset="0"/>
+              </a:rPr>
+              <a:t> de la </a:t>
+            </a:r>
+            <a:r>
+              <a:rPr lang="en-US" dirty="0" err="1" smtClean="0">
+                <a:solidFill>
+                  <a:schemeClr val="accent1"/>
+                </a:solidFill>
+                <a:latin typeface="Segoe UI" panose="020B0502040204020203" pitchFamily="34" charset="0"/>
+                <a:cs typeface="Segoe UI" panose="020B0502040204020203" pitchFamily="34" charset="0"/>
+              </a:rPr>
+              <a:t>Propiedad</a:t>
+            </a:r>
+            <a:r>
+              <a:rPr lang="en-US" dirty="0" smtClean="0">
+                <a:solidFill>
+                  <a:schemeClr val="accent1"/>
+                </a:solidFill>
+                <a:latin typeface="Segoe UI" panose="020B0502040204020203" pitchFamily="34" charset="0"/>
+                <a:cs typeface="Segoe UI" panose="020B0502040204020203" pitchFamily="34" charset="0"/>
+              </a:rPr>
+              <a:t> </a:t>
+            </a:r>
+            <a:r>
+              <a:rPr lang="en-US" dirty="0" err="1" smtClean="0">
+                <a:solidFill>
+                  <a:schemeClr val="accent1"/>
+                </a:solidFill>
+                <a:latin typeface="Segoe UI" panose="020B0502040204020203" pitchFamily="34" charset="0"/>
+                <a:cs typeface="Segoe UI" panose="020B0502040204020203" pitchFamily="34" charset="0"/>
+              </a:rPr>
+              <a:t>Intelectual</a:t>
+            </a:r>
+            <a:endParaRPr lang="en-US" dirty="0">
+              <a:solidFill>
+                <a:schemeClr val="accent1"/>
+              </a:solidFill>
+              <a:latin typeface="Segoe UI" panose="020B0502040204020203" pitchFamily="34" charset="0"/>
+              <a:cs typeface="Segoe UI" panose="020B0502040204020203" pitchFamily="34" charset="0"/>
+            </a:endParaRPr>
+          </a:p>
+        </p:txBody>
+      </p:sp>
+      <p:sp>
+        <p:nvSpPr>
+          <p:cNvPr id="3" name="Content Placeholder 2"/>
+          <p:cNvSpPr>
+            <a:spLocks noGrp="1"/>
+          </p:cNvSpPr>
+          <p:nvPr>
+            <p:ph idx="1"/>
+          </p:nvPr>
+        </p:nvSpPr>
+        <p:spPr/>
+        <p:txBody>
+          <a:bodyPr/>
+          <a:lstStyle/>
+          <a:p>
+            <a:r>
               <a:rPr lang="en-US" smtClean="0">
                 <a:latin typeface="Segoe UI" panose="020B0502040204020203" pitchFamily="34" charset="0"/>
                 <a:cs typeface="Segoe UI" panose="020B0502040204020203" pitchFamily="34" charset="0"/>
               </a:rPr>
-              <a:t>Administración de la Propiedad Intelectual</a:t>
-            </a:r>
+              <a:t>Cédulas Reales de Privilegio de Invención</a:t>
+            </a:r>
+          </a:p>
+          <a:p>
+            <a:r>
+              <a:rPr lang="en-US" smtClean="0">
+                <a:latin typeface="Segoe UI" panose="020B0502040204020203" pitchFamily="34" charset="0"/>
+                <a:cs typeface="Segoe UI" panose="020B0502040204020203" pitchFamily="34" charset="0"/>
+              </a:rPr>
+              <a:t>Patente de Invención (principios S. XIX)</a:t>
+            </a:r>
+          </a:p>
+          <a:p>
+            <a:r>
+              <a:rPr lang="en-US" smtClean="0">
+                <a:latin typeface="Segoe UI" panose="020B0502040204020203" pitchFamily="34" charset="0"/>
+                <a:cs typeface="Segoe UI" panose="020B0502040204020203" pitchFamily="34" charset="0"/>
+              </a:rPr>
+              <a:t>Convenio de París (1883). Protección internacional de la Propiedad Industrial.</a:t>
+            </a:r>
+          </a:p>
+          <a:p>
+            <a:r>
+              <a:rPr lang="en-US" smtClean="0">
+                <a:latin typeface="Segoe UI" panose="020B0502040204020203" pitchFamily="34" charset="0"/>
+                <a:cs typeface="Segoe UI" panose="020B0502040204020203" pitchFamily="34" charset="0"/>
+              </a:rPr>
+              <a:t>Convenio de Berna (1886). Protección de los Derechos de Autor de obras literarias y artísticas (Dumas).</a:t>
+            </a:r>
+          </a:p>
+          <a:p>
             <a:endParaRPr lang="en-US">
               <a:latin typeface="Segoe UI" panose="020B0502040204020203" pitchFamily="34" charset="0"/>
               <a:cs typeface="Segoe UI" panose="020B0502040204020203" pitchFamily="34" charset="0"/>
@@ -9096,12 +9259,12 @@
       </p:sp>
       <p:sp>
         <p:nvSpPr>
-          <p:cNvPr id="3" name="Content Placeholder 2"/>
+          <p:cNvPr id="4" name="Text Placeholder 3"/>
           <p:cNvSpPr>
             <a:spLocks noGrp="1"/>
           </p:cNvSpPr>
           <p:nvPr>
-            <p:ph idx="1"/>
+            <p:ph type="body" sz="half" idx="2"/>
           </p:nvPr>
         </p:nvSpPr>
         <p:spPr/>
@@ -9114,37 +9277,8 @@
                 <a:latin typeface="Segoe UI" panose="020B0502040204020203" pitchFamily="34" charset="0"/>
                 <a:cs typeface="Segoe UI" panose="020B0502040204020203" pitchFamily="34" charset="0"/>
               </a:rPr>
-              <a:t>Cédulas Reales de Privilegio de Invención</a:t>
-            </a:r>
-          </a:p>
-          <a:p>
-            <a:r>
-              <a:rPr lang="en-US" smtClean="0">
-                <a:latin typeface="Segoe UI" panose="020B0502040204020203" pitchFamily="34" charset="0"/>
-                <a:cs typeface="Segoe UI" panose="020B0502040204020203" pitchFamily="34" charset="0"/>
-              </a:rPr>
-              <a:t>Patente de Invención (principios S. XIX)</a:t>
-            </a:r>
-          </a:p>
-          <a:p>
-            <a:r>
-              <a:rPr lang="en-US" smtClean="0">
-                <a:latin typeface="Segoe UI" panose="020B0502040204020203" pitchFamily="34" charset="0"/>
-                <a:cs typeface="Segoe UI" panose="020B0502040204020203" pitchFamily="34" charset="0"/>
-              </a:rPr>
-              <a:t>Convenio de París (1883). Protección internacional de la Propiedad Industrial.</a:t>
-            </a:r>
-          </a:p>
-          <a:p>
-            <a:r>
-              <a:rPr lang="en-US" smtClean="0">
-                <a:latin typeface="Segoe UI" panose="020B0502040204020203" pitchFamily="34" charset="0"/>
-                <a:cs typeface="Segoe UI" panose="020B0502040204020203" pitchFamily="34" charset="0"/>
-              </a:rPr>
-              <a:t>Convenio de Berna (1886). Protección de los Derechos de Autor de obras literarias y artísticas (Dumas).</a:t>
-            </a:r>
-          </a:p>
-          <a:p>
+              <a:t>Entre la libertad y la privacidad</a:t>
+            </a:r>
             <a:endParaRPr lang="en-US">
               <a:latin typeface="Segoe UI" panose="020B0502040204020203" pitchFamily="34" charset="0"/>
               <a:cs typeface="Segoe UI" panose="020B0502040204020203" pitchFamily="34" charset="0"/>
@@ -9152,39 +9286,10 @@
           </a:p>
         </p:txBody>
       </p:sp>
-      <p:sp>
-        <p:nvSpPr>
-          <p:cNvPr id="4" name="Text Placeholder 3"/>
-          <p:cNvSpPr>
-            <a:spLocks noGrp="1"/>
-          </p:cNvSpPr>
-          <p:nvPr>
-            <p:ph type="body" sz="half" idx="2"/>
-          </p:nvPr>
-        </p:nvSpPr>
-        <p:spPr/>
-        <p:txBody>
-          <a:bodyPr/>
-          <a:lstStyle/>
-          <a:p>
-            <a:r>
-              <a:rPr lang="en-US" smtClean="0">
-                <a:latin typeface="Segoe UI" panose="020B0502040204020203" pitchFamily="34" charset="0"/>
-                <a:cs typeface="Segoe UI" panose="020B0502040204020203" pitchFamily="34" charset="0"/>
-              </a:rPr>
-              <a:t>Entre la libertad y la privacidad</a:t>
-            </a:r>
-            <a:endParaRPr lang="en-US">
-              <a:latin typeface="Segoe UI" panose="020B0502040204020203" pitchFamily="34" charset="0"/>
-              <a:cs typeface="Segoe UI" panose="020B0502040204020203" pitchFamily="34" charset="0"/>
-            </a:endParaRPr>
-          </a:p>
-        </p:txBody>
-      </p:sp>
     </p:spTree>
     <p:extLst>
       <p:ext uri="{BB962C8B-B14F-4D97-AF65-F5344CB8AC3E}">
-        <p14:creationId xmlns:p14="http://schemas.microsoft.com/office/powerpoint/2010/main" xmlns="" val="3025649002"/>
+        <p14:creationId xmlns="" xmlns:p14="http://schemas.microsoft.com/office/powerpoint/2010/main" val="3025649002"/>
       </p:ext>
     </p:extLst>
   </p:cSld>
@@ -9192,7 +9297,7 @@
     <a:masterClrMapping/>
   </p:clrMapOvr>
   <mc:AlternateContent xmlns:mc="http://schemas.openxmlformats.org/markup-compatibility/2006">
-    <mc:Choice xmlns:p14="http://schemas.microsoft.com/office/powerpoint/2010/main" xmlns="" Requires="p14">
+    <mc:Choice xmlns="" xmlns:p14="http://schemas.microsoft.com/office/powerpoint/2010/main" Requires="p14">
       <p:transition spd="med" p14:dur="700">
         <p:fade/>
       </p:transition>
@@ -9246,13 +9351,19 @@
           <a:lstStyle/>
           <a:p>
             <a:r>
-              <a:rPr lang="es-AR" smtClean="0">
+              <a:rPr lang="es-AR" dirty="0" smtClean="0">
+                <a:solidFill>
+                  <a:schemeClr val="accent1"/>
+                </a:solidFill>
                 <a:latin typeface="Segoe UI" panose="020B0502040204020203" pitchFamily="34" charset="0"/>
                 <a:cs typeface="Segoe UI" panose="020B0502040204020203" pitchFamily="34" charset="0"/>
               </a:rPr>
               <a:t>Mecanismos de Protección</a:t>
             </a:r>
-            <a:endParaRPr lang="es-AR">
+            <a:endParaRPr lang="es-AR" dirty="0">
+              <a:solidFill>
+                <a:schemeClr val="accent1"/>
+              </a:solidFill>
               <a:latin typeface="Segoe UI" panose="020B0502040204020203" pitchFamily="34" charset="0"/>
               <a:cs typeface="Segoe UI" panose="020B0502040204020203" pitchFamily="34" charset="0"/>
             </a:endParaRPr>
@@ -9328,7 +9439,7 @@
     </p:spTree>
     <p:extLst>
       <p:ext uri="{BB962C8B-B14F-4D97-AF65-F5344CB8AC3E}">
-        <p14:creationId xmlns:p14="http://schemas.microsoft.com/office/powerpoint/2010/main" xmlns="" val="3410413250"/>
+        <p14:creationId xmlns="" xmlns:p14="http://schemas.microsoft.com/office/powerpoint/2010/main" val="3410413250"/>
       </p:ext>
     </p:extLst>
   </p:cSld>
@@ -9336,7 +9447,7 @@
     <a:masterClrMapping/>
   </p:clrMapOvr>
   <mc:AlternateContent xmlns:mc="http://schemas.openxmlformats.org/markup-compatibility/2006">
-    <mc:Choice xmlns:p14="http://schemas.microsoft.com/office/powerpoint/2010/main" xmlns="" Requires="p14">
+    <mc:Choice xmlns="" xmlns:p14="http://schemas.microsoft.com/office/powerpoint/2010/main" Requires="p14">
       <p:transition spd="med" p14:dur="700">
         <p:fade/>
       </p:transition>
@@ -9541,7 +9652,7 @@
     </p:spTree>
     <p:extLst>
       <p:ext uri="{BB962C8B-B14F-4D97-AF65-F5344CB8AC3E}">
-        <p14:creationId xmlns:p14="http://schemas.microsoft.com/office/powerpoint/2010/main" xmlns="" val="23673588"/>
+        <p14:creationId xmlns="" xmlns:p14="http://schemas.microsoft.com/office/powerpoint/2010/main" val="23673588"/>
       </p:ext>
     </p:extLst>
   </p:cSld>
@@ -9549,7 +9660,7 @@
     <a:masterClrMapping/>
   </p:clrMapOvr>
   <mc:AlternateContent xmlns:mc="http://schemas.openxmlformats.org/markup-compatibility/2006">
-    <mc:Choice xmlns:p14="http://schemas.microsoft.com/office/powerpoint/2010/main" xmlns="" Requires="p14">
+    <mc:Choice xmlns="" xmlns:p14="http://schemas.microsoft.com/office/powerpoint/2010/main" Requires="p14">
       <p:transition spd="med" p14:dur="700">
         <p:fade/>
       </p:transition>
@@ -9813,7 +9924,7 @@
     </p:spTree>
     <p:extLst>
       <p:ext uri="{BB962C8B-B14F-4D97-AF65-F5344CB8AC3E}">
-        <p14:creationId xmlns:p14="http://schemas.microsoft.com/office/powerpoint/2010/main" xmlns="" val="3632379430"/>
+        <p14:creationId xmlns="" xmlns:p14="http://schemas.microsoft.com/office/powerpoint/2010/main" val="3632379430"/>
       </p:ext>
     </p:extLst>
   </p:cSld>
@@ -9821,7 +9932,7 @@
     <a:masterClrMapping/>
   </p:clrMapOvr>
   <mc:AlternateContent xmlns:mc="http://schemas.openxmlformats.org/markup-compatibility/2006">
-    <mc:Choice xmlns:p14="http://schemas.microsoft.com/office/powerpoint/2010/main" xmlns="" Requires="p14">
+    <mc:Choice xmlns="" xmlns:p14="http://schemas.microsoft.com/office/powerpoint/2010/main" Requires="p14">
       <p:transition spd="med" p14:dur="700">
         <p:fade/>
       </p:transition>
@@ -9869,13 +9980,39 @@
             <p:ph type="title"/>
           </p:nvPr>
         </p:nvSpPr>
-        <p:spPr/>
-        <p:txBody>
-          <a:bodyPr/>
+        <p:spPr>
+          <a:xfrm>
+            <a:off x="1557908" y="260648"/>
+            <a:ext cx="9144001" cy="1800200"/>
+          </a:xfrm>
+        </p:spPr>
+        <p:txBody>
+          <a:bodyPr>
+            <a:normAutofit/>
+          </a:bodyPr>
           <a:lstStyle/>
           <a:p>
             <a:r>
-              <a:rPr lang="en-US" spc="0" dirty="0" err="1" smtClean="0">
+              <a:rPr lang="es-AR" spc="0" dirty="0" smtClean="0">
+                <a:ln w="0"/>
+                <a:solidFill>
+                  <a:schemeClr val="accent1"/>
+                </a:solidFill>
+                <a:latin typeface="Segoe UI" panose="020B0502040204020203" pitchFamily="34" charset="0"/>
+                <a:cs typeface="Segoe UI" panose="020B0502040204020203" pitchFamily="34" charset="0"/>
+              </a:rPr>
+              <a:t>Grupo N°: </a:t>
+            </a:r>
+            <a:r>
+              <a:rPr lang="es-AR" spc="0" dirty="0" smtClean="0">
+                <a:ln w="0"/>
+                <a:latin typeface="Segoe UI" panose="020B0502040204020203" pitchFamily="34" charset="0"/>
+                <a:cs typeface="Segoe UI" panose="020B0502040204020203" pitchFamily="34" charset="0"/>
+              </a:rPr>
+              <a:t>2</a:t>
+            </a:r>
+            <a:r>
+              <a:rPr lang="es-AR" spc="0" dirty="0" smtClean="0">
                 <a:ln w="0"/>
                 <a:solidFill>
                   <a:schemeClr val="accent1"/>
@@ -9890,20 +10027,76 @@
                 <a:latin typeface="Segoe UI" panose="020B0502040204020203" pitchFamily="34" charset="0"/>
                 <a:cs typeface="Segoe UI" panose="020B0502040204020203" pitchFamily="34" charset="0"/>
               </a:rPr>
-              <a:t>Integrantes</a:t>
-            </a:r>
-            <a:endParaRPr lang="en-US" spc="0" dirty="0">
+              <a:t/>
+            </a:r>
+            <a:br>
+              <a:rPr lang="es-AR" spc="0" dirty="0" smtClean="0">
+                <a:ln w="0"/>
+                <a:solidFill>
+                  <a:schemeClr val="accent1"/>
+                </a:solidFill>
+                <a:effectLst>
+                  <a:outerShdw blurRad="38100" dist="25400" dir="5400000" algn="ctr" rotWithShape="0">
+                    <a:srgbClr val="6E747A">
+                      <a:alpha val="43000"/>
+                    </a:srgbClr>
+                  </a:outerShdw>
+                </a:effectLst>
+                <a:latin typeface="Segoe UI" panose="020B0502040204020203" pitchFamily="34" charset="0"/>
+                <a:cs typeface="Segoe UI" panose="020B0502040204020203" pitchFamily="34" charset="0"/>
+              </a:rPr>
+            </a:br>
+            <a:r>
+              <a:rPr lang="es-AR" spc="0" dirty="0" smtClean="0">
+                <a:ln w="0"/>
+                <a:solidFill>
+                  <a:schemeClr val="accent1"/>
+                </a:solidFill>
+                <a:effectLst>
+                  <a:outerShdw blurRad="38100" dist="25400" dir="5400000" algn="ctr" rotWithShape="0">
+                    <a:srgbClr val="6E747A">
+                      <a:alpha val="43000"/>
+                    </a:srgbClr>
+                  </a:outerShdw>
+                </a:effectLst>
+                <a:latin typeface="Segoe UI" panose="020B0502040204020203" pitchFamily="34" charset="0"/>
+                <a:cs typeface="Segoe UI" panose="020B0502040204020203" pitchFamily="34" charset="0"/>
+              </a:rPr>
+              <a:t/>
+            </a:r>
+            <a:br>
+              <a:rPr lang="es-AR" spc="0" dirty="0" smtClean="0">
+                <a:ln w="0"/>
+                <a:solidFill>
+                  <a:schemeClr val="accent1"/>
+                </a:solidFill>
+                <a:effectLst>
+                  <a:outerShdw blurRad="38100" dist="25400" dir="5400000" algn="ctr" rotWithShape="0">
+                    <a:srgbClr val="6E747A">
+                      <a:alpha val="43000"/>
+                    </a:srgbClr>
+                  </a:outerShdw>
+                </a:effectLst>
+                <a:latin typeface="Segoe UI" panose="020B0502040204020203" pitchFamily="34" charset="0"/>
+                <a:cs typeface="Segoe UI" panose="020B0502040204020203" pitchFamily="34" charset="0"/>
+              </a:rPr>
+            </a:br>
+            <a:r>
+              <a:rPr lang="es-AR" spc="0" dirty="0" smtClean="0">
+                <a:ln w="0"/>
+                <a:solidFill>
+                  <a:schemeClr val="accent1"/>
+                </a:solidFill>
+                <a:latin typeface="Segoe UI" panose="020B0502040204020203" pitchFamily="34" charset="0"/>
+                <a:cs typeface="Segoe UI" panose="020B0502040204020203" pitchFamily="34" charset="0"/>
+              </a:rPr>
+              <a:t>Integrantes:</a:t>
+            </a:r>
+            <a:endParaRPr lang="es-AR" spc="0" dirty="0">
               <a:ln w="0"/>
               <a:solidFill>
                 <a:schemeClr val="accent1"/>
               </a:solidFill>
-              <a:effectLst>
-                <a:outerShdw blurRad="38100" dist="25400" dir="5400000" algn="ctr" rotWithShape="0">
-                  <a:srgbClr val="6E747A">
-                    <a:alpha val="43000"/>
-                  </a:srgbClr>
-                </a:outerShdw>
-              </a:effectLst>
               <a:latin typeface="Segoe UI" panose="020B0502040204020203" pitchFamily="34" charset="0"/>
               <a:cs typeface="Segoe UI" panose="020B0502040204020203" pitchFamily="34" charset="0"/>
             </a:endParaRPr>
@@ -9920,31 +10113,54 @@
             <p:ph idx="1"/>
           </p:nvPr>
         </p:nvSpPr>
-        <p:spPr/>
+        <p:spPr>
+          <a:xfrm>
+            <a:off x="1557908" y="2204864"/>
+            <a:ext cx="9134391" cy="3310880"/>
+          </a:xfrm>
+        </p:spPr>
         <p:txBody>
           <a:bodyPr/>
           <a:lstStyle/>
           <a:p>
             <a:r>
-              <a:rPr lang="en-US" dirty="0" smtClean="0">
-                <a:latin typeface="Segoe UI" panose="020B0502040204020203" pitchFamily="34" charset="0"/>
-                <a:cs typeface="Segoe UI" panose="020B0502040204020203" pitchFamily="34" charset="0"/>
-              </a:rPr>
-              <a:t>Stephanie Zurita</a:t>
-            </a:r>
-          </a:p>
-          <a:p>
-            <a:r>
-              <a:rPr lang="en-US" dirty="0" smtClean="0">
-                <a:latin typeface="Segoe UI" panose="020B0502040204020203" pitchFamily="34" charset="0"/>
-                <a:cs typeface="Segoe UI" panose="020B0502040204020203" pitchFamily="34" charset="0"/>
-              </a:rPr>
-              <a:t>Santiago Maraggi</a:t>
-            </a:r>
-          </a:p>
-          <a:p>
-            <a:r>
-              <a:rPr lang="en-US" dirty="0" smtClean="0">
+              <a:rPr lang="es-AR" dirty="0" err="1" smtClean="0">
+                <a:latin typeface="Segoe UI" panose="020B0502040204020203" pitchFamily="34" charset="0"/>
+                <a:cs typeface="Segoe UI" panose="020B0502040204020203" pitchFamily="34" charset="0"/>
+              </a:rPr>
+              <a:t>Stephanie</a:t>
+            </a:r>
+            <a:r>
+              <a:rPr lang="es-AR" dirty="0" smtClean="0">
+                <a:latin typeface="Segoe UI" panose="020B0502040204020203" pitchFamily="34" charset="0"/>
+                <a:cs typeface="Segoe UI" panose="020B0502040204020203" pitchFamily="34" charset="0"/>
+              </a:rPr>
+              <a:t> Zurita</a:t>
+            </a:r>
+          </a:p>
+          <a:p>
+            <a:r>
+              <a:rPr lang="es-AR" dirty="0" smtClean="0">
+                <a:latin typeface="Segoe UI" panose="020B0502040204020203" pitchFamily="34" charset="0"/>
+                <a:cs typeface="Segoe UI" panose="020B0502040204020203" pitchFamily="34" charset="0"/>
+              </a:rPr>
+              <a:t>Santiago </a:t>
+            </a:r>
+            <a:r>
+              <a:rPr lang="es-AR" dirty="0" err="1" smtClean="0">
+                <a:latin typeface="Segoe UI" panose="020B0502040204020203" pitchFamily="34" charset="0"/>
+                <a:cs typeface="Segoe UI" panose="020B0502040204020203" pitchFamily="34" charset="0"/>
+              </a:rPr>
+              <a:t>Maraggi</a:t>
+            </a:r>
+            <a:endParaRPr lang="es-AR" dirty="0" smtClean="0">
+              <a:latin typeface="Segoe UI" panose="020B0502040204020203" pitchFamily="34" charset="0"/>
+              <a:cs typeface="Segoe UI" panose="020B0502040204020203" pitchFamily="34" charset="0"/>
+            </a:endParaRPr>
+          </a:p>
+          <a:p>
+            <a:r>
+              <a:rPr lang="es-AR" dirty="0" smtClean="0">
                 <a:latin typeface="Segoe UI" panose="020B0502040204020203" pitchFamily="34" charset="0"/>
                 <a:cs typeface="Segoe UI" panose="020B0502040204020203" pitchFamily="34" charset="0"/>
               </a:rPr>
@@ -9957,19 +10173,122 @@
                 <a:latin typeface="Segoe UI" panose="020B0502040204020203" pitchFamily="34" charset="0"/>
                 <a:cs typeface="Segoe UI" panose="020B0502040204020203" pitchFamily="34" charset="0"/>
               </a:rPr>
-              <a:t>Miguel Angel Schmidt</a:t>
-            </a:r>
-          </a:p>
-          <a:p>
+              <a:t>Miguel </a:t>
+            </a:r>
+            <a:r>
+              <a:rPr lang="es-AR" dirty="0" err="1" smtClean="0">
+                <a:latin typeface="Segoe UI" panose="020B0502040204020203" pitchFamily="34" charset="0"/>
+                <a:cs typeface="Segoe UI" panose="020B0502040204020203" pitchFamily="34" charset="0"/>
+              </a:rPr>
+              <a:t>Angel</a:t>
+            </a:r>
             <a:r>
               <a:rPr lang="es-AR" dirty="0" smtClean="0">
                 <a:latin typeface="Segoe UI" panose="020B0502040204020203" pitchFamily="34" charset="0"/>
                 <a:cs typeface="Segoe UI" panose="020B0502040204020203" pitchFamily="34" charset="0"/>
               </a:rPr>
-              <a:t>María Inés Parnisari</a:t>
-            </a:r>
-            <a:endParaRPr lang="en-US" dirty="0" smtClean="0">
+              <a:t> Schmidt</a:t>
+            </a:r>
+          </a:p>
+          <a:p>
+            <a:r>
+              <a:rPr lang="es-AR" dirty="0" smtClean="0">
+                <a:latin typeface="Segoe UI" panose="020B0502040204020203" pitchFamily="34" charset="0"/>
+                <a:cs typeface="Segoe UI" panose="020B0502040204020203" pitchFamily="34" charset="0"/>
+              </a:rPr>
+              <a:t>María Inés </a:t>
+            </a:r>
+            <a:r>
+              <a:rPr lang="es-AR" dirty="0" err="1" smtClean="0">
+                <a:latin typeface="Segoe UI" panose="020B0502040204020203" pitchFamily="34" charset="0"/>
+                <a:cs typeface="Segoe UI" panose="020B0502040204020203" pitchFamily="34" charset="0"/>
+              </a:rPr>
+              <a:t>Parnisari</a:t>
+            </a:r>
+            <a:endParaRPr lang="es-AR" dirty="0" smtClean="0">
               <a:latin typeface="Segoe UI" panose="020B0502040204020203" pitchFamily="34" charset="0"/>
+              <a:cs typeface="Segoe UI" panose="020B0502040204020203" pitchFamily="34" charset="0"/>
+            </a:endParaRPr>
+          </a:p>
+        </p:txBody>
+      </p:sp>
+      <p:sp>
+        <p:nvSpPr>
+          <p:cNvPr id="4" name="Title 12"/>
+          <p:cNvSpPr txBox="1">
+            <a:spLocks/>
+          </p:cNvSpPr>
+          <p:nvPr/>
+        </p:nvSpPr>
+        <p:spPr>
+          <a:xfrm>
+            <a:off x="1557908" y="4941168"/>
+            <a:ext cx="9144001" cy="999728"/>
+          </a:xfrm>
+          <a:prstGeom prst="rect">
+            <a:avLst/>
+          </a:prstGeom>
+        </p:spPr>
+        <p:txBody>
+          <a:bodyPr vert="horz" lIns="91440" tIns="45720" rIns="91440" bIns="45720" rtlCol="0" anchor="b">
+            <a:normAutofit/>
+          </a:bodyPr>
+          <a:lstStyle/>
+          <a:p>
+            <a:pPr marL="0" marR="0" lvl="0" indent="0" algn="l" defTabSz="914400" rtl="0" eaLnBrk="1" fontAlgn="auto" latinLnBrk="0" hangingPunct="1">
+              <a:lnSpc>
+                <a:spcPct val="90000"/>
+              </a:lnSpc>
+              <a:spcBef>
+                <a:spcPct val="0"/>
+              </a:spcBef>
+              <a:spcAft>
+                <a:spcPts val="0"/>
+              </a:spcAft>
+              <a:buClrTx/>
+              <a:buSzTx/>
+              <a:buFontTx/>
+              <a:buNone/>
+              <a:tabLst/>
+              <a:defRPr/>
+            </a:pPr>
+            <a:r>
+              <a:rPr kumimoji="0" lang="es-AR" sz="3600" b="0" i="0" u="none" strike="noStrike" kern="1200" cap="none" spc="0" normalizeH="0" baseline="0" noProof="0" dirty="0" smtClean="0">
+                <a:ln w="0"/>
+                <a:solidFill>
+                  <a:schemeClr val="accent1"/>
+                </a:solidFill>
+                <a:uLnTx/>
+                <a:uFillTx/>
+                <a:latin typeface="Segoe UI" panose="020B0502040204020203" pitchFamily="34" charset="0"/>
+                <a:ea typeface="+mj-ea"/>
+                <a:cs typeface="Segoe UI" panose="020B0502040204020203" pitchFamily="34" charset="0"/>
+              </a:rPr>
+              <a:t>Año y cuatrimestre: </a:t>
+            </a:r>
+            <a:r>
+              <a:rPr kumimoji="0" lang="es-AR" sz="3600" b="0" i="0" u="none" strike="noStrike" kern="1200" cap="none" spc="0" normalizeH="0" baseline="0" noProof="0" dirty="0" smtClean="0">
+                <a:ln w="0"/>
+                <a:solidFill>
+                  <a:schemeClr val="tx1"/>
+                </a:solidFill>
+                <a:uLnTx/>
+                <a:uFillTx/>
+                <a:latin typeface="Segoe UI" panose="020B0502040204020203" pitchFamily="34" charset="0"/>
+                <a:ea typeface="+mj-ea"/>
+                <a:cs typeface="Segoe UI" panose="020B0502040204020203" pitchFamily="34" charset="0"/>
+              </a:rPr>
+              <a:t>2014  2°C</a:t>
+            </a:r>
+            <a:endParaRPr kumimoji="0" lang="es-AR" sz="3600" b="0" i="0" u="none" strike="noStrike" kern="1200" cap="none" spc="0" normalizeH="0" baseline="0" noProof="0" dirty="0">
+              <a:ln w="0"/>
+              <a:solidFill>
+                <a:schemeClr val="accent1"/>
+              </a:solidFill>
+              <a:uLnTx/>
+              <a:uFillTx/>
+              <a:latin typeface="Segoe UI" panose="020B0502040204020203" pitchFamily="34" charset="0"/>
+              <a:ea typeface="+mj-ea"/>
               <a:cs typeface="Segoe UI" panose="020B0502040204020203" pitchFamily="34" charset="0"/>
             </a:endParaRPr>
           </a:p>
@@ -10219,7 +10538,7 @@
     </p:spTree>
     <p:extLst>
       <p:ext uri="{BB962C8B-B14F-4D97-AF65-F5344CB8AC3E}">
-        <p14:creationId xmlns:p14="http://schemas.microsoft.com/office/powerpoint/2010/main" xmlns="" val="3204325395"/>
+        <p14:creationId xmlns="" xmlns:p14="http://schemas.microsoft.com/office/powerpoint/2010/main" val="3204325395"/>
       </p:ext>
     </p:extLst>
   </p:cSld>
@@ -10227,7 +10546,7 @@
     <a:masterClrMapping/>
   </p:clrMapOvr>
   <mc:AlternateContent xmlns:mc="http://schemas.openxmlformats.org/markup-compatibility/2006">
-    <mc:Choice xmlns:p14="http://schemas.microsoft.com/office/powerpoint/2010/main" xmlns="" Requires="p14">
+    <mc:Choice xmlns="" xmlns:p14="http://schemas.microsoft.com/office/powerpoint/2010/main" Requires="p14">
       <p:transition spd="med" p14:dur="700">
         <p:fade/>
       </p:transition>
@@ -10418,7 +10737,7 @@
     </p:spTree>
     <p:extLst>
       <p:ext uri="{BB962C8B-B14F-4D97-AF65-F5344CB8AC3E}">
-        <p14:creationId xmlns:p14="http://schemas.microsoft.com/office/powerpoint/2010/main" xmlns="" val="1496383053"/>
+        <p14:creationId xmlns="" xmlns:p14="http://schemas.microsoft.com/office/powerpoint/2010/main" val="1496383053"/>
       </p:ext>
     </p:extLst>
   </p:cSld>
@@ -10426,7 +10745,7 @@
     <a:masterClrMapping/>
   </p:clrMapOvr>
   <mc:AlternateContent xmlns:mc="http://schemas.openxmlformats.org/markup-compatibility/2006">
-    <mc:Choice xmlns:p14="http://schemas.microsoft.com/office/powerpoint/2010/main" xmlns="" Requires="p14">
+    <mc:Choice xmlns="" xmlns:p14="http://schemas.microsoft.com/office/powerpoint/2010/main" Requires="p14">
       <p:transition spd="med" p14:dur="700">
         <p:fade/>
       </p:transition>
@@ -10641,7 +10960,7 @@
     </p:spTree>
     <p:extLst>
       <p:ext uri="{BB962C8B-B14F-4D97-AF65-F5344CB8AC3E}">
-        <p14:creationId xmlns:p14="http://schemas.microsoft.com/office/powerpoint/2010/main" xmlns="" val="1679218424"/>
+        <p14:creationId xmlns="" xmlns:p14="http://schemas.microsoft.com/office/powerpoint/2010/main" val="1679218424"/>
       </p:ext>
     </p:extLst>
   </p:cSld>
@@ -10649,7 +10968,7 @@
     <a:masterClrMapping/>
   </p:clrMapOvr>
   <mc:AlternateContent xmlns:mc="http://schemas.openxmlformats.org/markup-compatibility/2006">
-    <mc:Choice xmlns:p14="http://schemas.microsoft.com/office/powerpoint/2010/main" xmlns="" Requires="p14">
+    <mc:Choice xmlns="" xmlns:p14="http://schemas.microsoft.com/office/powerpoint/2010/main" Requires="p14">
       <p:transition spd="med" p14:dur="700">
         <p:fade/>
       </p:transition>
@@ -10893,7 +11212,7 @@
     <a:masterClrMapping/>
   </p:clrMapOvr>
   <mc:AlternateContent xmlns:mc="http://schemas.openxmlformats.org/markup-compatibility/2006">
-    <mc:Choice xmlns:p14="http://schemas.microsoft.com/office/powerpoint/2010/main" xmlns="" Requires="p14">
+    <mc:Choice xmlns="" xmlns:p14="http://schemas.microsoft.com/office/powerpoint/2010/main" Requires="p14">
       <p:transition spd="med" p14:dur="700">
         <p:fade/>
       </p:transition>
@@ -11123,7 +11442,7 @@
     <a:masterClrMapping/>
   </p:clrMapOvr>
   <mc:AlternateContent xmlns:mc="http://schemas.openxmlformats.org/markup-compatibility/2006">
-    <mc:Choice xmlns:p14="http://schemas.microsoft.com/office/powerpoint/2010/main" xmlns="" Requires="p14">
+    <mc:Choice xmlns="" xmlns:p14="http://schemas.microsoft.com/office/powerpoint/2010/main" Requires="p14">
       <p:transition spd="med" p14:dur="700">
         <p:fade/>
       </p:transition>
@@ -11177,11 +11496,40 @@
           <a:lstStyle/>
           <a:p>
             <a:r>
+              <a:rPr lang="es-AR" b="1" i="1" dirty="0" smtClean="0">
+                <a:latin typeface="Segoe UI" panose="020B0502040204020203" pitchFamily="34" charset="0"/>
+                <a:cs typeface="Segoe UI" panose="020B0502040204020203" pitchFamily="34" charset="0"/>
+              </a:rPr>
+              <a:t>Siglo XXI</a:t>
+            </a:r>
+            <a:endParaRPr lang="es-AR" b="1" i="1" dirty="0">
+              <a:latin typeface="Segoe UI" panose="020B0502040204020203" pitchFamily="34" charset="0"/>
+              <a:cs typeface="Segoe UI" panose="020B0502040204020203" pitchFamily="34" charset="0"/>
+            </a:endParaRPr>
+          </a:p>
+        </p:txBody>
+      </p:sp>
+      <p:sp>
+        <p:nvSpPr>
+          <p:cNvPr id="3" name="Text Placeholder 2"/>
+          <p:cNvSpPr>
+            <a:spLocks noGrp="1"/>
+          </p:cNvSpPr>
+          <p:nvPr>
+            <p:ph type="body" idx="1"/>
+          </p:nvPr>
+        </p:nvSpPr>
+        <p:spPr/>
+        <p:txBody>
+          <a:bodyPr/>
+          <a:lstStyle/>
+          <a:p>
+            <a:r>
               <a:rPr lang="es-AR" dirty="0" smtClean="0">
                 <a:latin typeface="Segoe UI" panose="020B0502040204020203" pitchFamily="34" charset="0"/>
                 <a:cs typeface="Segoe UI" panose="020B0502040204020203" pitchFamily="34" charset="0"/>
               </a:rPr>
-              <a:t>Siglo XXI</a:t>
+              <a:t>La información como activo primordial</a:t>
             </a:r>
             <a:endParaRPr lang="es-AR" dirty="0">
               <a:latin typeface="Segoe UI" panose="020B0502040204020203" pitchFamily="34" charset="0"/>
@@ -11190,39 +11538,10 @@
           </a:p>
         </p:txBody>
       </p:sp>
-      <p:sp>
-        <p:nvSpPr>
-          <p:cNvPr id="3" name="Text Placeholder 2"/>
-          <p:cNvSpPr>
-            <a:spLocks noGrp="1"/>
-          </p:cNvSpPr>
-          <p:nvPr>
-            <p:ph type="body" idx="1"/>
-          </p:nvPr>
-        </p:nvSpPr>
-        <p:spPr/>
-        <p:txBody>
-          <a:bodyPr/>
-          <a:lstStyle/>
-          <a:p>
-            <a:r>
-              <a:rPr lang="es-AR" dirty="0" smtClean="0">
-                <a:latin typeface="Segoe UI" panose="020B0502040204020203" pitchFamily="34" charset="0"/>
-                <a:cs typeface="Segoe UI" panose="020B0502040204020203" pitchFamily="34" charset="0"/>
-              </a:rPr>
-              <a:t>La información como activo primordial</a:t>
-            </a:r>
-            <a:endParaRPr lang="es-AR" dirty="0">
-              <a:latin typeface="Segoe UI" panose="020B0502040204020203" pitchFamily="34" charset="0"/>
-              <a:cs typeface="Segoe UI" panose="020B0502040204020203" pitchFamily="34" charset="0"/>
-            </a:endParaRPr>
-          </a:p>
-        </p:txBody>
-      </p:sp>
     </p:spTree>
     <p:extLst>
       <p:ext uri="{BB962C8B-B14F-4D97-AF65-F5344CB8AC3E}">
-        <p14:creationId xmlns:p14="http://schemas.microsoft.com/office/powerpoint/2010/main" xmlns="" val="3439397754"/>
+        <p14:creationId xmlns="" xmlns:p14="http://schemas.microsoft.com/office/powerpoint/2010/main" val="3439397754"/>
       </p:ext>
     </p:extLst>
   </p:cSld>
@@ -11230,7 +11549,7 @@
     <a:masterClrMapping/>
   </p:clrMapOvr>
   <mc:AlternateContent xmlns:mc="http://schemas.openxmlformats.org/markup-compatibility/2006">
-    <mc:Choice xmlns:p14="http://schemas.microsoft.com/office/powerpoint/2010/main" xmlns="" Requires="p14">
+    <mc:Choice xmlns="" xmlns:p14="http://schemas.microsoft.com/office/powerpoint/2010/main" Requires="p14">
       <p:transition spd="med" p14:dur="700">
         <p:fade/>
       </p:transition>
@@ -11404,7 +11723,7 @@
     </p:spTree>
     <p:extLst>
       <p:ext uri="{BB962C8B-B14F-4D97-AF65-F5344CB8AC3E}">
-        <p14:creationId xmlns:p14="http://schemas.microsoft.com/office/powerpoint/2010/main" xmlns="" val="2675216716"/>
+        <p14:creationId xmlns="" xmlns:p14="http://schemas.microsoft.com/office/powerpoint/2010/main" val="2675216716"/>
       </p:ext>
     </p:extLst>
   </p:cSld>
@@ -11412,7 +11731,7 @@
     <a:masterClrMapping/>
   </p:clrMapOvr>
   <mc:AlternateContent xmlns:mc="http://schemas.openxmlformats.org/markup-compatibility/2006">
-    <mc:Choice xmlns:p14="http://schemas.microsoft.com/office/powerpoint/2010/main" xmlns="" Requires="p14">
+    <mc:Choice xmlns="" xmlns:p14="http://schemas.microsoft.com/office/powerpoint/2010/main" Requires="p14">
       <p:transition spd="med" p14:dur="700">
         <p:fade/>
       </p:transition>
@@ -11879,7 +12198,7 @@
           <a:blip r:embed="rId3" cstate="print">
             <a:extLst>
               <a:ext uri="{28A0092B-C50C-407E-A947-70E740481C1C}">
-                <a14:useLocalDpi xmlns:a14="http://schemas.microsoft.com/office/drawing/2010/main" xmlns="" val="0"/>
+                <a14:useLocalDpi xmlns="" xmlns:a14="http://schemas.microsoft.com/office/drawing/2010/main" val="0"/>
               </a:ext>
             </a:extLst>
           </a:blip>
@@ -11899,7 +12218,7 @@
           <a:noFill/>
           <a:extLst>
             <a:ext uri="{909E8E84-426E-40DD-AFC4-6F175D3DCCD1}">
-              <a14:hiddenFill xmlns:a14="http://schemas.microsoft.com/office/drawing/2010/main" xmlns="">
+              <a14:hiddenFill xmlns="" xmlns:a14="http://schemas.microsoft.com/office/drawing/2010/main">
                 <a:solidFill>
                   <a:srgbClr val="FFFFFF"/>
                 </a:solidFill>
@@ -11920,7 +12239,7 @@
           <a:blip r:embed="rId4" cstate="print">
             <a:extLst>
               <a:ext uri="{28A0092B-C50C-407E-A947-70E740481C1C}">
-                <a14:useLocalDpi xmlns:a14="http://schemas.microsoft.com/office/drawing/2010/main" xmlns="" val="0"/>
+                <a14:useLocalDpi xmlns="" xmlns:a14="http://schemas.microsoft.com/office/drawing/2010/main" val="0"/>
               </a:ext>
             </a:extLst>
           </a:blip>
@@ -11940,7 +12259,7 @@
           <a:noFill/>
           <a:extLst>
             <a:ext uri="{909E8E84-426E-40DD-AFC4-6F175D3DCCD1}">
-              <a14:hiddenFill xmlns:a14="http://schemas.microsoft.com/office/drawing/2010/main" xmlns="">
+              <a14:hiddenFill xmlns="" xmlns:a14="http://schemas.microsoft.com/office/drawing/2010/main">
                 <a:solidFill>
                   <a:srgbClr val="FFFFFF"/>
                 </a:solidFill>
@@ -11961,7 +12280,7 @@
           <a:blip r:embed="rId5" cstate="print">
             <a:extLst>
               <a:ext uri="{28A0092B-C50C-407E-A947-70E740481C1C}">
-                <a14:useLocalDpi xmlns:a14="http://schemas.microsoft.com/office/drawing/2010/main" xmlns="" val="0"/>
+                <a14:useLocalDpi xmlns="" xmlns:a14="http://schemas.microsoft.com/office/drawing/2010/main" val="0"/>
               </a:ext>
             </a:extLst>
           </a:blip>
@@ -11981,7 +12300,7 @@
           <a:noFill/>
           <a:extLst>
             <a:ext uri="{909E8E84-426E-40DD-AFC4-6F175D3DCCD1}">
-              <a14:hiddenFill xmlns:a14="http://schemas.microsoft.com/office/drawing/2010/main" xmlns="">
+              <a14:hiddenFill xmlns="" xmlns:a14="http://schemas.microsoft.com/office/drawing/2010/main">
                 <a:solidFill>
                   <a:srgbClr val="FFFFFF"/>
                 </a:solidFill>
@@ -12002,7 +12321,7 @@
           <a:blip r:embed="rId6" cstate="print">
             <a:extLst>
               <a:ext uri="{28A0092B-C50C-407E-A947-70E740481C1C}">
-                <a14:useLocalDpi xmlns:a14="http://schemas.microsoft.com/office/drawing/2010/main" xmlns="" val="0"/>
+                <a14:useLocalDpi xmlns="" xmlns:a14="http://schemas.microsoft.com/office/drawing/2010/main" val="0"/>
               </a:ext>
             </a:extLst>
           </a:blip>
@@ -12022,7 +12341,7 @@
           <a:noFill/>
           <a:extLst>
             <a:ext uri="{909E8E84-426E-40DD-AFC4-6F175D3DCCD1}">
-              <a14:hiddenFill xmlns:a14="http://schemas.microsoft.com/office/drawing/2010/main" xmlns="">
+              <a14:hiddenFill xmlns="" xmlns:a14="http://schemas.microsoft.com/office/drawing/2010/main">
                 <a:solidFill>
                   <a:srgbClr val="FFFFFF"/>
                 </a:solidFill>
@@ -12043,7 +12362,7 @@
           <a:blip r:embed="rId7" cstate="print">
             <a:extLst>
               <a:ext uri="{28A0092B-C50C-407E-A947-70E740481C1C}">
-                <a14:useLocalDpi xmlns:a14="http://schemas.microsoft.com/office/drawing/2010/main" xmlns="" val="0"/>
+                <a14:useLocalDpi xmlns="" xmlns:a14="http://schemas.microsoft.com/office/drawing/2010/main" val="0"/>
               </a:ext>
             </a:extLst>
           </a:blip>
@@ -12063,7 +12382,7 @@
           <a:noFill/>
           <a:extLst>
             <a:ext uri="{909E8E84-426E-40DD-AFC4-6F175D3DCCD1}">
-              <a14:hiddenFill xmlns:a14="http://schemas.microsoft.com/office/drawing/2010/main" xmlns="">
+              <a14:hiddenFill xmlns="" xmlns:a14="http://schemas.microsoft.com/office/drawing/2010/main">
                 <a:solidFill>
                   <a:srgbClr val="FFFFFF"/>
                 </a:solidFill>
@@ -12075,7 +12394,7 @@
     </p:spTree>
     <p:extLst>
       <p:ext uri="{BB962C8B-B14F-4D97-AF65-F5344CB8AC3E}">
-        <p14:creationId xmlns:p14="http://schemas.microsoft.com/office/powerpoint/2010/main" xmlns="" val="2564182459"/>
+        <p14:creationId xmlns="" xmlns:p14="http://schemas.microsoft.com/office/powerpoint/2010/main" val="2564182459"/>
       </p:ext>
     </p:extLst>
   </p:cSld>
@@ -12083,7 +12402,7 @@
     <a:masterClrMapping/>
   </p:clrMapOvr>
   <mc:AlternateContent xmlns:mc="http://schemas.openxmlformats.org/markup-compatibility/2006">
-    <mc:Choice xmlns:p14="http://schemas.microsoft.com/office/powerpoint/2010/main" xmlns="" Requires="p14">
+    <mc:Choice xmlns="" xmlns:p14="http://schemas.microsoft.com/office/powerpoint/2010/main" Requires="p14">
       <p:transition spd="med" p14:dur="700">
         <p:fade/>
       </p:transition>
@@ -12247,7 +12566,7 @@
     </p:spTree>
     <p:extLst>
       <p:ext uri="{BB962C8B-B14F-4D97-AF65-F5344CB8AC3E}">
-        <p14:creationId xmlns:p14="http://schemas.microsoft.com/office/powerpoint/2010/main" xmlns="" val="965594786"/>
+        <p14:creationId xmlns="" xmlns:p14="http://schemas.microsoft.com/office/powerpoint/2010/main" val="965594786"/>
       </p:ext>
     </p:extLst>
   </p:cSld>
@@ -12255,7 +12574,7 @@
     <a:masterClrMapping/>
   </p:clrMapOvr>
   <mc:AlternateContent xmlns:mc="http://schemas.openxmlformats.org/markup-compatibility/2006">
-    <mc:Choice xmlns:p14="http://schemas.microsoft.com/office/powerpoint/2010/main" xmlns="" Requires="p14">
+    <mc:Choice xmlns="" xmlns:p14="http://schemas.microsoft.com/office/powerpoint/2010/main" Requires="p14">
       <p:transition spd="med" p14:dur="700">
         <p:fade/>
       </p:transition>
@@ -12518,7 +12837,7 @@
           <a:blip r:embed="rId3" cstate="print">
             <a:extLst>
               <a:ext uri="{28A0092B-C50C-407E-A947-70E740481C1C}">
-                <a14:useLocalDpi xmlns:a14="http://schemas.microsoft.com/office/drawing/2010/main" xmlns="" val="0"/>
+                <a14:useLocalDpi xmlns="" xmlns:a14="http://schemas.microsoft.com/office/drawing/2010/main" val="0"/>
               </a:ext>
             </a:extLst>
           </a:blip>
@@ -12538,7 +12857,7 @@
           <a:noFill/>
           <a:extLst>
             <a:ext uri="{909E8E84-426E-40DD-AFC4-6F175D3DCCD1}">
-              <a14:hiddenFill xmlns:a14="http://schemas.microsoft.com/office/drawing/2010/main" xmlns="">
+              <a14:hiddenFill xmlns="" xmlns:a14="http://schemas.microsoft.com/office/drawing/2010/main">
                 <a:solidFill>
                   <a:srgbClr val="FFFFFF"/>
                 </a:solidFill>
@@ -12550,7 +12869,7 @@
     </p:spTree>
     <p:extLst>
       <p:ext uri="{BB962C8B-B14F-4D97-AF65-F5344CB8AC3E}">
-        <p14:creationId xmlns:p14="http://schemas.microsoft.com/office/powerpoint/2010/main" xmlns="" val="3356351472"/>
+        <p14:creationId xmlns="" xmlns:p14="http://schemas.microsoft.com/office/powerpoint/2010/main" val="3356351472"/>
       </p:ext>
     </p:extLst>
   </p:cSld>
@@ -12558,7 +12877,7 @@
     <a:masterClrMapping/>
   </p:clrMapOvr>
   <mc:AlternateContent xmlns:mc="http://schemas.openxmlformats.org/markup-compatibility/2006">
-    <mc:Choice xmlns:p14="http://schemas.microsoft.com/office/powerpoint/2010/main" xmlns="" Requires="p14">
+    <mc:Choice xmlns="" xmlns:p14="http://schemas.microsoft.com/office/powerpoint/2010/main" Requires="p14">
       <p:transition spd="med" p14:dur="700">
         <p:fade/>
       </p:transition>
@@ -12612,7 +12931,7 @@
           <a:lstStyle/>
           <a:p>
             <a:r>
-              <a:rPr lang="en-US" spc="0" dirty="0" err="1" smtClean="0">
+              <a:rPr lang="es-AR" spc="0" smtClean="0">
                 <a:ln w="0"/>
                 <a:solidFill>
                   <a:schemeClr val="accent1"/>
@@ -12629,7 +12948,7 @@
               </a:rPr>
               <a:t>Introducción</a:t>
             </a:r>
-            <a:endParaRPr lang="en-US" spc="0" dirty="0">
+            <a:endParaRPr lang="es-AR" spc="0">
               <a:ln w="0"/>
               <a:solidFill>
                 <a:schemeClr val="accent1"/>
@@ -12663,7 +12982,7 @@
           <a:lstStyle/>
           <a:p>
             <a:r>
-              <a:rPr lang="es-AR" dirty="0" smtClean="0">
+              <a:rPr lang="es-AR" smtClean="0">
                 <a:latin typeface="Segoe UI" panose="020B0502040204020203" pitchFamily="34" charset="0"/>
                 <a:cs typeface="Segoe UI" panose="020B0502040204020203" pitchFamily="34" charset="0"/>
               </a:rPr>
@@ -12672,7 +12991,7 @@
           </a:p>
           <a:p>
             <a:r>
-              <a:rPr lang="es-AR" dirty="0" smtClean="0">
+              <a:rPr lang="es-AR" smtClean="0">
                 <a:latin typeface="Segoe UI" panose="020B0502040204020203" pitchFamily="34" charset="0"/>
                 <a:cs typeface="Segoe UI" panose="020B0502040204020203" pitchFamily="34" charset="0"/>
               </a:rPr>
@@ -12681,7 +13000,7 @@
           </a:p>
           <a:p>
             <a:r>
-              <a:rPr lang="es-AR" dirty="0">
+              <a:rPr lang="es-AR">
                 <a:latin typeface="Segoe UI" panose="020B0502040204020203" pitchFamily="34" charset="0"/>
                 <a:cs typeface="Segoe UI" panose="020B0502040204020203" pitchFamily="34" charset="0"/>
               </a:rPr>
@@ -12690,7 +13009,7 @@
           </a:p>
           <a:p>
             <a:r>
-              <a:rPr lang="es-AR" dirty="0" smtClean="0">
+              <a:rPr lang="es-AR" smtClean="0">
                 <a:latin typeface="Segoe UI" panose="020B0502040204020203" pitchFamily="34" charset="0"/>
                 <a:cs typeface="Segoe UI" panose="020B0502040204020203" pitchFamily="34" charset="0"/>
               </a:rPr>
@@ -12699,13 +13018,27 @@
           </a:p>
           <a:p>
             <a:r>
-              <a:rPr lang="es-AR" dirty="0" smtClean="0">
-                <a:latin typeface="Segoe UI" panose="020B0502040204020203" pitchFamily="34" charset="0"/>
-                <a:cs typeface="Segoe UI" panose="020B0502040204020203" pitchFamily="34" charset="0"/>
-              </a:rPr>
-              <a:t>Tipos de controles</a:t>
-            </a:r>
-            <a:endParaRPr lang="en-US" dirty="0">
+              <a:rPr lang="es-AR" smtClean="0">
+                <a:latin typeface="Segoe UI" panose="020B0502040204020203" pitchFamily="34" charset="0"/>
+                <a:cs typeface="Segoe UI" panose="020B0502040204020203" pitchFamily="34" charset="0"/>
+              </a:rPr>
+              <a:t>Tipos </a:t>
+            </a:r>
+            <a:r>
+              <a:rPr lang="es-AR" smtClean="0">
+                <a:latin typeface="Segoe UI" panose="020B0502040204020203" pitchFamily="34" charset="0"/>
+                <a:cs typeface="Segoe UI" panose="020B0502040204020203" pitchFamily="34" charset="0"/>
+              </a:rPr>
+              <a:t>de </a:t>
+            </a:r>
+            <a:r>
+              <a:rPr lang="es-AR" smtClean="0">
+                <a:latin typeface="Segoe UI" panose="020B0502040204020203" pitchFamily="34" charset="0"/>
+                <a:cs typeface="Segoe UI" panose="020B0502040204020203" pitchFamily="34" charset="0"/>
+              </a:rPr>
+              <a:t>controles</a:t>
+            </a:r>
+            <a:endParaRPr lang="es-AR">
               <a:latin typeface="Segoe UI" panose="020B0502040204020203" pitchFamily="34" charset="0"/>
               <a:cs typeface="Segoe UI" panose="020B0502040204020203" pitchFamily="34" charset="0"/>
             </a:endParaRPr>
@@ -12715,7 +13048,7 @@
     </p:spTree>
     <p:extLst>
       <p:ext uri="{BB962C8B-B14F-4D97-AF65-F5344CB8AC3E}">
-        <p14:creationId xmlns:p14="http://schemas.microsoft.com/office/powerpoint/2010/main" xmlns="" val="3106206852"/>
+        <p14:creationId xmlns="" xmlns:p14="http://schemas.microsoft.com/office/powerpoint/2010/main" val="3106206852"/>
       </p:ext>
     </p:extLst>
   </p:cSld>
@@ -12723,7 +13056,7 @@
     <a:masterClrMapping/>
   </p:clrMapOvr>
   <mc:AlternateContent xmlns:mc="http://schemas.openxmlformats.org/markup-compatibility/2006">
-    <mc:Choice xmlns:p14="http://schemas.microsoft.com/office/powerpoint/2010/main" xmlns="" Requires="p14">
+    <mc:Choice xmlns="" xmlns:p14="http://schemas.microsoft.com/office/powerpoint/2010/main" Requires="p14">
       <p:transition spd="med" p14:dur="700">
         <p:fade/>
       </p:transition>
@@ -12956,7 +13289,7 @@
           <a:blip r:embed="rId3" cstate="print">
             <a:extLst>
               <a:ext uri="{28A0092B-C50C-407E-A947-70E740481C1C}">
-                <a14:useLocalDpi xmlns:a14="http://schemas.microsoft.com/office/drawing/2010/main" xmlns="" val="0"/>
+                <a14:useLocalDpi xmlns="" xmlns:a14="http://schemas.microsoft.com/office/drawing/2010/main" val="0"/>
               </a:ext>
             </a:extLst>
           </a:blip>
@@ -12976,7 +13309,7 @@
           <a:noFill/>
           <a:extLst>
             <a:ext uri="{909E8E84-426E-40DD-AFC4-6F175D3DCCD1}">
-              <a14:hiddenFill xmlns:a14="http://schemas.microsoft.com/office/drawing/2010/main" xmlns="">
+              <a14:hiddenFill xmlns="" xmlns:a14="http://schemas.microsoft.com/office/drawing/2010/main">
                 <a:solidFill>
                   <a:srgbClr val="FFFFFF"/>
                 </a:solidFill>
@@ -12988,7 +13321,7 @@
     </p:spTree>
     <p:extLst>
       <p:ext uri="{BB962C8B-B14F-4D97-AF65-F5344CB8AC3E}">
-        <p14:creationId xmlns:p14="http://schemas.microsoft.com/office/powerpoint/2010/main" xmlns="" val="3374507202"/>
+        <p14:creationId xmlns="" xmlns:p14="http://schemas.microsoft.com/office/powerpoint/2010/main" val="3374507202"/>
       </p:ext>
     </p:extLst>
   </p:cSld>
@@ -12996,7 +13329,7 @@
     <a:masterClrMapping/>
   </p:clrMapOvr>
   <mc:AlternateContent xmlns:mc="http://schemas.openxmlformats.org/markup-compatibility/2006">
-    <mc:Choice xmlns:p14="http://schemas.microsoft.com/office/powerpoint/2010/main" xmlns="" Requires="p14">
+    <mc:Choice xmlns="" xmlns:p14="http://schemas.microsoft.com/office/powerpoint/2010/main" Requires="p14">
       <p:transition spd="med" p14:dur="700">
         <p:fade/>
       </p:transition>
@@ -13181,7 +13514,7 @@
     </p:spTree>
     <p:extLst>
       <p:ext uri="{BB962C8B-B14F-4D97-AF65-F5344CB8AC3E}">
-        <p14:creationId xmlns:p14="http://schemas.microsoft.com/office/powerpoint/2010/main" xmlns="" val="2238024562"/>
+        <p14:creationId xmlns="" xmlns:p14="http://schemas.microsoft.com/office/powerpoint/2010/main" val="2238024562"/>
       </p:ext>
     </p:extLst>
   </p:cSld>
@@ -13189,7 +13522,7 @@
     <a:masterClrMapping/>
   </p:clrMapOvr>
   <mc:AlternateContent xmlns:mc="http://schemas.openxmlformats.org/markup-compatibility/2006">
-    <mc:Choice xmlns:p14="http://schemas.microsoft.com/office/powerpoint/2010/main" xmlns="" Requires="p14">
+    <mc:Choice xmlns="" xmlns:p14="http://schemas.microsoft.com/office/powerpoint/2010/main" Requires="p14">
       <p:transition spd="med" p14:dur="700">
         <p:fade/>
       </p:transition>
@@ -13378,7 +13711,7 @@
     </p:spTree>
     <p:extLst>
       <p:ext uri="{BB962C8B-B14F-4D97-AF65-F5344CB8AC3E}">
-        <p14:creationId xmlns:p14="http://schemas.microsoft.com/office/powerpoint/2010/main" xmlns="" val="3874537101"/>
+        <p14:creationId xmlns="" xmlns:p14="http://schemas.microsoft.com/office/powerpoint/2010/main" val="3874537101"/>
       </p:ext>
     </p:extLst>
   </p:cSld>
@@ -13386,7 +13719,7 @@
     <a:masterClrMapping/>
   </p:clrMapOvr>
   <mc:AlternateContent xmlns:mc="http://schemas.openxmlformats.org/markup-compatibility/2006">
-    <mc:Choice xmlns:p14="http://schemas.microsoft.com/office/powerpoint/2010/main" xmlns="" Requires="p14">
+    <mc:Choice xmlns="" xmlns:p14="http://schemas.microsoft.com/office/powerpoint/2010/main" Requires="p14">
       <p:transition spd="med" p14:dur="700">
         <p:fade/>
       </p:transition>
@@ -13525,7 +13858,7 @@
     </p:spTree>
     <p:extLst>
       <p:ext uri="{BB962C8B-B14F-4D97-AF65-F5344CB8AC3E}">
-        <p14:creationId xmlns:p14="http://schemas.microsoft.com/office/powerpoint/2010/main" xmlns="" val="1202384585"/>
+        <p14:creationId xmlns="" xmlns:p14="http://schemas.microsoft.com/office/powerpoint/2010/main" val="1202384585"/>
       </p:ext>
     </p:extLst>
   </p:cSld>
@@ -13533,7 +13866,7 @@
     <a:masterClrMapping/>
   </p:clrMapOvr>
   <mc:AlternateContent xmlns:mc="http://schemas.openxmlformats.org/markup-compatibility/2006">
-    <mc:Choice xmlns:p14="http://schemas.microsoft.com/office/powerpoint/2010/main" xmlns="" Requires="p14">
+    <mc:Choice xmlns="" xmlns:p14="http://schemas.microsoft.com/office/powerpoint/2010/main" Requires="p14">
       <p:transition spd="med" p14:dur="700">
         <p:fade/>
       </p:transition>
@@ -13770,7 +14103,7 @@
     </p:spTree>
     <p:extLst>
       <p:ext uri="{BB962C8B-B14F-4D97-AF65-F5344CB8AC3E}">
-        <p14:creationId xmlns:p14="http://schemas.microsoft.com/office/powerpoint/2010/main" xmlns="" val="701687324"/>
+        <p14:creationId xmlns="" xmlns:p14="http://schemas.microsoft.com/office/powerpoint/2010/main" val="701687324"/>
       </p:ext>
     </p:extLst>
   </p:cSld>
@@ -13778,7 +14111,7 @@
     <a:masterClrMapping/>
   </p:clrMapOvr>
   <mc:AlternateContent xmlns:mc="http://schemas.openxmlformats.org/markup-compatibility/2006">
-    <mc:Choice xmlns:p14="http://schemas.microsoft.com/office/powerpoint/2010/main" xmlns="" Requires="p14">
+    <mc:Choice xmlns="" xmlns:p14="http://schemas.microsoft.com/office/powerpoint/2010/main" Requires="p14">
       <p:transition spd="med" p14:dur="700">
         <p:fade/>
       </p:transition>
@@ -13937,7 +14270,7 @@
     </p:spTree>
     <p:extLst>
       <p:ext uri="{BB962C8B-B14F-4D97-AF65-F5344CB8AC3E}">
-        <p14:creationId xmlns:p14="http://schemas.microsoft.com/office/powerpoint/2010/main" xmlns="" val="1445017764"/>
+        <p14:creationId xmlns="" xmlns:p14="http://schemas.microsoft.com/office/powerpoint/2010/main" val="1445017764"/>
       </p:ext>
     </p:extLst>
   </p:cSld>
@@ -13945,7 +14278,7 @@
     <a:masterClrMapping/>
   </p:clrMapOvr>
   <mc:AlternateContent xmlns:mc="http://schemas.openxmlformats.org/markup-compatibility/2006">
-    <mc:Choice xmlns:p14="http://schemas.microsoft.com/office/powerpoint/2010/main" xmlns="" Requires="p14">
+    <mc:Choice xmlns="" xmlns:p14="http://schemas.microsoft.com/office/powerpoint/2010/main" Requires="p14">
       <p:transition spd="med" p14:dur="700">
         <p:fade/>
       </p:transition>
@@ -14131,7 +14464,7 @@
     </p:spTree>
     <p:extLst>
       <p:ext uri="{BB962C8B-B14F-4D97-AF65-F5344CB8AC3E}">
-        <p14:creationId xmlns:p14="http://schemas.microsoft.com/office/powerpoint/2010/main" xmlns="" val="3810472897"/>
+        <p14:creationId xmlns="" xmlns:p14="http://schemas.microsoft.com/office/powerpoint/2010/main" val="3810472897"/>
       </p:ext>
     </p:extLst>
   </p:cSld>
@@ -14139,7 +14472,7 @@
     <a:masterClrMapping/>
   </p:clrMapOvr>
   <mc:AlternateContent xmlns:mc="http://schemas.openxmlformats.org/markup-compatibility/2006">
-    <mc:Choice xmlns:p14="http://schemas.microsoft.com/office/powerpoint/2010/main" xmlns="" Requires="p14">
+    <mc:Choice xmlns="" xmlns:p14="http://schemas.microsoft.com/office/powerpoint/2010/main" Requires="p14">
       <p:transition spd="med" p14:dur="700">
         <p:fade/>
       </p:transition>
@@ -14209,7 +14542,7 @@
     </p:spTree>
     <p:extLst>
       <p:ext uri="{BB962C8B-B14F-4D97-AF65-F5344CB8AC3E}">
-        <p14:creationId xmlns:p14="http://schemas.microsoft.com/office/powerpoint/2010/main" xmlns="" val="1539601608"/>
+        <p14:creationId xmlns="" xmlns:p14="http://schemas.microsoft.com/office/powerpoint/2010/main" val="1539601608"/>
       </p:ext>
     </p:extLst>
   </p:cSld>
@@ -14217,7 +14550,7 @@
     <a:masterClrMapping/>
   </p:clrMapOvr>
   <mc:AlternateContent xmlns:mc="http://schemas.openxmlformats.org/markup-compatibility/2006">
-    <mc:Choice xmlns:p14="http://schemas.microsoft.com/office/powerpoint/2010/main" xmlns="" Requires="p14">
+    <mc:Choice xmlns="" xmlns:p14="http://schemas.microsoft.com/office/powerpoint/2010/main" Requires="p14">
       <p:transition spd="med" p14:dur="700">
         <p:fade/>
       </p:transition>
@@ -14368,7 +14701,7 @@
     </p:spTree>
     <p:extLst>
       <p:ext uri="{BB962C8B-B14F-4D97-AF65-F5344CB8AC3E}">
-        <p14:creationId xmlns:p14="http://schemas.microsoft.com/office/powerpoint/2010/main" xmlns="" val="3280227416"/>
+        <p14:creationId xmlns="" xmlns:p14="http://schemas.microsoft.com/office/powerpoint/2010/main" val="3280227416"/>
       </p:ext>
     </p:extLst>
   </p:cSld>
@@ -14376,7 +14709,7 @@
     <a:masterClrMapping/>
   </p:clrMapOvr>
   <mc:AlternateContent xmlns:mc="http://schemas.openxmlformats.org/markup-compatibility/2006">
-    <mc:Choice xmlns:p14="http://schemas.microsoft.com/office/powerpoint/2010/main" xmlns="" Requires="p14">
+    <mc:Choice xmlns="" xmlns:p14="http://schemas.microsoft.com/office/powerpoint/2010/main" Requires="p14">
       <p:transition spd="med" p14:dur="700">
         <p:fade/>
       </p:transition>
@@ -14601,7 +14934,7 @@
     </p:spTree>
     <p:extLst>
       <p:ext uri="{BB962C8B-B14F-4D97-AF65-F5344CB8AC3E}">
-        <p14:creationId xmlns:p14="http://schemas.microsoft.com/office/powerpoint/2010/main" xmlns="" val="3816537714"/>
+        <p14:creationId xmlns="" xmlns:p14="http://schemas.microsoft.com/office/powerpoint/2010/main" val="3816537714"/>
       </p:ext>
     </p:extLst>
   </p:cSld>
@@ -14609,7 +14942,7 @@
     <a:masterClrMapping/>
   </p:clrMapOvr>
   <mc:AlternateContent xmlns:mc="http://schemas.openxmlformats.org/markup-compatibility/2006">
-    <mc:Choice xmlns:p14="http://schemas.microsoft.com/office/powerpoint/2010/main" xmlns="" Requires="p14">
+    <mc:Choice xmlns="" xmlns:p14="http://schemas.microsoft.com/office/powerpoint/2010/main" Requires="p14">
       <p:transition spd="med" p14:dur="700">
         <p:fade/>
       </p:transition>
@@ -14659,38 +14992,41 @@
         </p:nvSpPr>
         <p:spPr>
           <a:xfrm>
-            <a:off x="1522413" y="381000"/>
-            <a:ext cx="9972599" cy="1371600"/>
+            <a:off x="1485900" y="260648"/>
+            <a:ext cx="10404647" cy="1371600"/>
           </a:xfrm>
         </p:spPr>
         <p:txBody>
           <a:bodyPr>
-            <a:normAutofit fontScale="90000"/>
+            <a:normAutofit/>
           </a:bodyPr>
           <a:lstStyle/>
           <a:p>
             <a:pPr algn="ctr"/>
             <a:r>
               <a:rPr lang="es-AR" sz="4000" dirty="0">
-                <a:latin typeface="Segoe UI" panose="020B0502040204020203" pitchFamily="34" charset="0"/>
-                <a:cs typeface="Segoe UI" panose="020B0502040204020203" pitchFamily="34" charset="0"/>
-              </a:rPr>
-              <a:t>El activo más valioso de las organizaciones</a:t>
-            </a:r>
-            <a:r>
-              <a:rPr lang="es-AR" dirty="0">
-                <a:latin typeface="Segoe UI" panose="020B0502040204020203" pitchFamily="34" charset="0"/>
-                <a:cs typeface="Segoe UI" panose="020B0502040204020203" pitchFamily="34" charset="0"/>
-              </a:rPr>
-              <a:t/>
-            </a:r>
-            <a:br>
-              <a:rPr lang="es-AR" dirty="0">
-                <a:latin typeface="Segoe UI" panose="020B0502040204020203" pitchFamily="34" charset="0"/>
-                <a:cs typeface="Segoe UI" panose="020B0502040204020203" pitchFamily="34" charset="0"/>
-              </a:rPr>
-            </a:br>
+                <a:solidFill>
+                  <a:schemeClr val="accent1"/>
+                </a:solidFill>
+                <a:latin typeface="Segoe UI" panose="020B0502040204020203" pitchFamily="34" charset="0"/>
+                <a:cs typeface="Segoe UI" panose="020B0502040204020203" pitchFamily="34" charset="0"/>
+              </a:rPr>
+              <a:t>El activo más valioso de las </a:t>
+            </a:r>
+            <a:r>
+              <a:rPr lang="es-AR" sz="4000" dirty="0" smtClean="0">
+                <a:solidFill>
+                  <a:schemeClr val="accent1"/>
+                </a:solidFill>
+                <a:latin typeface="Segoe UI" panose="020B0502040204020203" pitchFamily="34" charset="0"/>
+                <a:cs typeface="Segoe UI" panose="020B0502040204020203" pitchFamily="34" charset="0"/>
+              </a:rPr>
+              <a:t>organizaciones</a:t>
+            </a:r>
             <a:endParaRPr lang="es-AR" dirty="0">
+              <a:solidFill>
+                <a:schemeClr val="accent1"/>
+              </a:solidFill>
               <a:latin typeface="Segoe UI" panose="020B0502040204020203" pitchFamily="34" charset="0"/>
               <a:cs typeface="Segoe UI" panose="020B0502040204020203" pitchFamily="34" charset="0"/>
             </a:endParaRPr>
@@ -14891,7 +15227,7 @@
     </p:spTree>
     <p:extLst>
       <p:ext uri="{BB962C8B-B14F-4D97-AF65-F5344CB8AC3E}">
-        <p14:creationId xmlns:p14="http://schemas.microsoft.com/office/powerpoint/2010/main" xmlns="" val="3323359930"/>
+        <p14:creationId xmlns="" xmlns:p14="http://schemas.microsoft.com/office/powerpoint/2010/main" val="3323359930"/>
       </p:ext>
     </p:extLst>
   </p:cSld>
@@ -14899,7 +15235,7 @@
     <a:masterClrMapping/>
   </p:clrMapOvr>
   <mc:AlternateContent xmlns:mc="http://schemas.openxmlformats.org/markup-compatibility/2006">
-    <mc:Choice xmlns:p14="http://schemas.microsoft.com/office/powerpoint/2010/main" xmlns="" Requires="p14">
+    <mc:Choice xmlns="" xmlns:p14="http://schemas.microsoft.com/office/powerpoint/2010/main" Requires="p14">
       <p:transition spd="med" p14:dur="700">
         <p:fade/>
       </p:transition>
@@ -15082,7 +15418,7 @@
     </p:spTree>
     <p:extLst>
       <p:ext uri="{BB962C8B-B14F-4D97-AF65-F5344CB8AC3E}">
-        <p14:creationId xmlns:p14="http://schemas.microsoft.com/office/powerpoint/2010/main" xmlns="" val="2896967631"/>
+        <p14:creationId xmlns="" xmlns:p14="http://schemas.microsoft.com/office/powerpoint/2010/main" val="2896967631"/>
       </p:ext>
     </p:extLst>
   </p:cSld>
@@ -15090,7 +15426,7 @@
     <a:masterClrMapping/>
   </p:clrMapOvr>
   <mc:AlternateContent xmlns:mc="http://schemas.openxmlformats.org/markup-compatibility/2006">
-    <mc:Choice xmlns:p14="http://schemas.microsoft.com/office/powerpoint/2010/main" xmlns="" Requires="p14">
+    <mc:Choice xmlns="" xmlns:p14="http://schemas.microsoft.com/office/powerpoint/2010/main" Requires="p14">
       <p:transition spd="med" p14:dur="700">
         <p:fade/>
       </p:transition>
@@ -15361,7 +15697,7 @@
     </p:spTree>
     <p:extLst>
       <p:ext uri="{BB962C8B-B14F-4D97-AF65-F5344CB8AC3E}">
-        <p14:creationId xmlns:p14="http://schemas.microsoft.com/office/powerpoint/2010/main" xmlns="" val="1108506989"/>
+        <p14:creationId xmlns="" xmlns:p14="http://schemas.microsoft.com/office/powerpoint/2010/main" val="1108506989"/>
       </p:ext>
     </p:extLst>
   </p:cSld>
@@ -15369,7 +15705,7 @@
     <a:masterClrMapping/>
   </p:clrMapOvr>
   <mc:AlternateContent xmlns:mc="http://schemas.openxmlformats.org/markup-compatibility/2006">
-    <mc:Choice xmlns:p14="http://schemas.microsoft.com/office/powerpoint/2010/main" xmlns="" Requires="p14">
+    <mc:Choice xmlns="" xmlns:p14="http://schemas.microsoft.com/office/powerpoint/2010/main" Requires="p14">
       <p:transition spd="med" p14:dur="700">
         <p:fade/>
       </p:transition>
@@ -15473,7 +15809,7 @@
     </p:spTree>
     <p:extLst>
       <p:ext uri="{BB962C8B-B14F-4D97-AF65-F5344CB8AC3E}">
-        <p14:creationId xmlns:p14="http://schemas.microsoft.com/office/powerpoint/2010/main" xmlns="" val="1108506989"/>
+        <p14:creationId xmlns="" xmlns:p14="http://schemas.microsoft.com/office/powerpoint/2010/main" val="1108506989"/>
       </p:ext>
     </p:extLst>
   </p:cSld>
@@ -15481,7 +15817,7 @@
     <a:masterClrMapping/>
   </p:clrMapOvr>
   <mc:AlternateContent xmlns:mc="http://schemas.openxmlformats.org/markup-compatibility/2006">
-    <mc:Choice xmlns:p14="http://schemas.microsoft.com/office/powerpoint/2010/main" xmlns="" Requires="p14">
+    <mc:Choice xmlns="" xmlns:p14="http://schemas.microsoft.com/office/powerpoint/2010/main" Requires="p14">
       <p:transition spd="med" p14:dur="700">
         <p:fade/>
       </p:transition>
@@ -15544,6 +15880,9 @@
             <a:pPr algn="ctr"/>
             <a:r>
               <a:rPr lang="es-AR" dirty="0" smtClean="0">
+                <a:solidFill>
+                  <a:schemeClr val="accent1"/>
+                </a:solidFill>
                 <a:latin typeface="Segoe UI" panose="020B0502040204020203" pitchFamily="34" charset="0"/>
                 <a:cs typeface="Segoe UI" panose="020B0502040204020203" pitchFamily="34" charset="0"/>
               </a:rPr>
@@ -15551,6 +15890,9 @@
             </a:r>
             <a:r>
               <a:rPr lang="es-AR" dirty="0">
+                <a:solidFill>
+                  <a:schemeClr val="accent1"/>
+                </a:solidFill>
                 <a:latin typeface="Segoe UI" panose="020B0502040204020203" pitchFamily="34" charset="0"/>
                 <a:cs typeface="Segoe UI" panose="020B0502040204020203" pitchFamily="34" charset="0"/>
               </a:rPr>
@@ -15558,12 +15900,18 @@
             </a:r>
             <a:r>
               <a:rPr lang="es-AR" dirty="0" smtClean="0">
-                <a:latin typeface="Segoe UI" panose="020B0502040204020203" pitchFamily="34" charset="0"/>
-                <a:cs typeface="Segoe UI" panose="020B0502040204020203" pitchFamily="34" charset="0"/>
-              </a:rPr>
-              <a:t>información I</a:t>
+                <a:solidFill>
+                  <a:schemeClr val="accent1"/>
+                </a:solidFill>
+                <a:latin typeface="Segoe UI" panose="020B0502040204020203" pitchFamily="34" charset="0"/>
+                <a:cs typeface="Segoe UI" panose="020B0502040204020203" pitchFamily="34" charset="0"/>
+              </a:rPr>
+              <a:t>información  (I)</a:t>
             </a:r>
             <a:endParaRPr lang="es-AR" dirty="0">
+              <a:solidFill>
+                <a:schemeClr val="accent1"/>
+              </a:solidFill>
               <a:latin typeface="Segoe UI" panose="020B0502040204020203" pitchFamily="34" charset="0"/>
               <a:cs typeface="Segoe UI" panose="020B0502040204020203" pitchFamily="34" charset="0"/>
             </a:endParaRPr>
@@ -15740,7 +16088,7 @@
           <a:blip r:embed="rId2" cstate="print">
             <a:extLst>
               <a:ext uri="{28A0092B-C50C-407E-A947-70E740481C1C}">
-                <a14:useLocalDpi xmlns:a14="http://schemas.microsoft.com/office/drawing/2010/main" xmlns="" val="0"/>
+                <a14:useLocalDpi xmlns="" xmlns:a14="http://schemas.microsoft.com/office/drawing/2010/main" val="0"/>
               </a:ext>
             </a:extLst>
           </a:blip>
@@ -15760,7 +16108,7 @@
           <a:noFill/>
           <a:extLst>
             <a:ext uri="{909E8E84-426E-40DD-AFC4-6F175D3DCCD1}">
-              <a14:hiddenFill xmlns:a14="http://schemas.microsoft.com/office/drawing/2010/main" xmlns="">
+              <a14:hiddenFill xmlns="" xmlns:a14="http://schemas.microsoft.com/office/drawing/2010/main">
                 <a:solidFill>
                   <a:srgbClr val="FFFFFF"/>
                 </a:solidFill>
@@ -15772,7 +16120,7 @@
     </p:spTree>
     <p:extLst>
       <p:ext uri="{BB962C8B-B14F-4D97-AF65-F5344CB8AC3E}">
-        <p14:creationId xmlns:p14="http://schemas.microsoft.com/office/powerpoint/2010/main" xmlns="" val="1350001534"/>
+        <p14:creationId xmlns="" xmlns:p14="http://schemas.microsoft.com/office/powerpoint/2010/main" val="1350001534"/>
       </p:ext>
     </p:extLst>
   </p:cSld>
@@ -15780,7 +16128,7 @@
     <a:masterClrMapping/>
   </p:clrMapOvr>
   <mc:AlternateContent xmlns:mc="http://schemas.openxmlformats.org/markup-compatibility/2006">
-    <mc:Choice xmlns:p14="http://schemas.microsoft.com/office/powerpoint/2010/main" xmlns="" Requires="p14">
+    <mc:Choice xmlns="" xmlns:p14="http://schemas.microsoft.com/office/powerpoint/2010/main" Requires="p14">
       <p:transition spd="med" p14:dur="700">
         <p:fade/>
       </p:transition>
@@ -15843,6 +16191,9 @@
             <a:pPr algn="ctr"/>
             <a:r>
               <a:rPr lang="es-AR" dirty="0" smtClean="0">
+                <a:solidFill>
+                  <a:schemeClr val="accent1"/>
+                </a:solidFill>
                 <a:latin typeface="Segoe UI" panose="020B0502040204020203" pitchFamily="34" charset="0"/>
                 <a:cs typeface="Segoe UI" panose="020B0502040204020203" pitchFamily="34" charset="0"/>
               </a:rPr>
@@ -15850,6 +16201,9 @@
             </a:r>
             <a:r>
               <a:rPr lang="es-AR" dirty="0">
+                <a:solidFill>
+                  <a:schemeClr val="accent1"/>
+                </a:solidFill>
                 <a:latin typeface="Segoe UI" panose="020B0502040204020203" pitchFamily="34" charset="0"/>
                 <a:cs typeface="Segoe UI" panose="020B0502040204020203" pitchFamily="34" charset="0"/>
               </a:rPr>
@@ -15857,12 +16211,28 @@
             </a:r>
             <a:r>
               <a:rPr lang="es-AR" dirty="0" smtClean="0">
-                <a:latin typeface="Segoe UI" panose="020B0502040204020203" pitchFamily="34" charset="0"/>
-                <a:cs typeface="Segoe UI" panose="020B0502040204020203" pitchFamily="34" charset="0"/>
-              </a:rPr>
-              <a:t>información II</a:t>
+                <a:solidFill>
+                  <a:schemeClr val="accent1"/>
+                </a:solidFill>
+                <a:latin typeface="Segoe UI" panose="020B0502040204020203" pitchFamily="34" charset="0"/>
+                <a:cs typeface="Segoe UI" panose="020B0502040204020203" pitchFamily="34" charset="0"/>
+              </a:rPr>
+              <a:t>información </a:t>
+            </a:r>
+            <a:r>
+              <a:rPr lang="es-AR" dirty="0" smtClean="0">
+                <a:solidFill>
+                  <a:schemeClr val="accent1"/>
+                </a:solidFill>
+                <a:latin typeface="Segoe UI" panose="020B0502040204020203" pitchFamily="34" charset="0"/>
+                <a:cs typeface="Segoe UI" panose="020B0502040204020203" pitchFamily="34" charset="0"/>
+              </a:rPr>
+              <a:t> (II)</a:t>
             </a:r>
             <a:endParaRPr lang="es-AR" dirty="0">
+              <a:solidFill>
+                <a:schemeClr val="accent1"/>
+              </a:solidFill>
               <a:latin typeface="Segoe UI" panose="020B0502040204020203" pitchFamily="34" charset="0"/>
               <a:cs typeface="Segoe UI" panose="020B0502040204020203" pitchFamily="34" charset="0"/>
             </a:endParaRPr>
@@ -16153,7 +16523,7 @@
     </p:spTree>
     <p:extLst>
       <p:ext uri="{BB962C8B-B14F-4D97-AF65-F5344CB8AC3E}">
-        <p14:creationId xmlns:p14="http://schemas.microsoft.com/office/powerpoint/2010/main" xmlns="" val="3438441757"/>
+        <p14:creationId xmlns="" xmlns:p14="http://schemas.microsoft.com/office/powerpoint/2010/main" val="3438441757"/>
       </p:ext>
     </p:extLst>
   </p:cSld>
@@ -16161,7 +16531,7 @@
     <a:masterClrMapping/>
   </p:clrMapOvr>
   <mc:AlternateContent xmlns:mc="http://schemas.openxmlformats.org/markup-compatibility/2006">
-    <mc:Choice xmlns:p14="http://schemas.microsoft.com/office/powerpoint/2010/main" xmlns="" Requires="p14">
+    <mc:Choice xmlns="" xmlns:p14="http://schemas.microsoft.com/office/powerpoint/2010/main" Requires="p14">
       <p:transition spd="med" p14:dur="700">
         <p:fade/>
       </p:transition>
@@ -16212,7 +16582,7 @@
         <p:spPr>
           <a:xfrm>
             <a:off x="1125860" y="332656"/>
-            <a:ext cx="10188623" cy="743744"/>
+            <a:ext cx="11062965" cy="743744"/>
           </a:xfrm>
         </p:spPr>
         <p:txBody>
@@ -16223,6 +16593,9 @@
           <a:p>
             <a:r>
               <a:rPr lang="es-AR" dirty="0">
+                <a:solidFill>
+                  <a:schemeClr val="accent1"/>
+                </a:solidFill>
                 <a:latin typeface="Segoe UI" panose="020B0502040204020203" pitchFamily="34" charset="0"/>
                 <a:cs typeface="Segoe UI" panose="020B0502040204020203" pitchFamily="34" charset="0"/>
               </a:rPr>
@@ -16230,12 +16603,19 @@
             </a:r>
             <a:r>
               <a:rPr lang="es-AR" dirty="0" smtClean="0">
-                <a:latin typeface="Segoe UI" panose="020B0502040204020203" pitchFamily="34" charset="0"/>
-                <a:cs typeface="Segoe UI" panose="020B0502040204020203" pitchFamily="34" charset="0"/>
-              </a:rPr>
-              <a:t>I</a:t>
-            </a:r>
-            <a:endParaRPr lang="es-AR" b="1" dirty="0"/>
+                <a:solidFill>
+                  <a:schemeClr val="accent1"/>
+                </a:solidFill>
+                <a:latin typeface="Segoe UI" panose="020B0502040204020203" pitchFamily="34" charset="0"/>
+                <a:cs typeface="Segoe UI" panose="020B0502040204020203" pitchFamily="34" charset="0"/>
+              </a:rPr>
+              <a:t> (I)</a:t>
+            </a:r>
+            <a:endParaRPr lang="es-AR" b="1" dirty="0">
+              <a:solidFill>
+                <a:schemeClr val="accent1"/>
+              </a:solidFill>
+            </a:endParaRPr>
           </a:p>
         </p:txBody>
       </p:sp>
@@ -16413,7 +16793,7 @@
     </p:spTree>
     <p:extLst>
       <p:ext uri="{BB962C8B-B14F-4D97-AF65-F5344CB8AC3E}">
-        <p14:creationId xmlns:p14="http://schemas.microsoft.com/office/powerpoint/2010/main" xmlns="" val="3833366108"/>
+        <p14:creationId xmlns="" xmlns:p14="http://schemas.microsoft.com/office/powerpoint/2010/main" val="3833366108"/>
       </p:ext>
     </p:extLst>
   </p:cSld>
@@ -16421,7 +16801,7 @@
     <a:masterClrMapping/>
   </p:clrMapOvr>
   <mc:AlternateContent xmlns:mc="http://schemas.openxmlformats.org/markup-compatibility/2006">
-    <mc:Choice xmlns:p14="http://schemas.microsoft.com/office/powerpoint/2010/main" xmlns="" Requires="p14">
+    <mc:Choice xmlns="" xmlns:p14="http://schemas.microsoft.com/office/powerpoint/2010/main" Requires="p14">
       <p:transition spd="med" p14:dur="700">
         <p:fade/>
       </p:transition>
@@ -16472,7 +16852,7 @@
         <p:spPr>
           <a:xfrm>
             <a:off x="981844" y="116632"/>
-            <a:ext cx="10260631" cy="743744"/>
+            <a:ext cx="11206981" cy="743744"/>
           </a:xfrm>
         </p:spPr>
         <p:txBody>
@@ -16483,6 +16863,9 @@
           <a:p>
             <a:r>
               <a:rPr lang="es-AR" dirty="0">
+                <a:solidFill>
+                  <a:schemeClr val="accent1"/>
+                </a:solidFill>
                 <a:latin typeface="Segoe UI" panose="020B0502040204020203" pitchFamily="34" charset="0"/>
                 <a:cs typeface="Segoe UI" panose="020B0502040204020203" pitchFamily="34" charset="0"/>
               </a:rPr>
@@ -16490,12 +16873,29 @@
             </a:r>
             <a:r>
               <a:rPr lang="es-AR" dirty="0" smtClean="0">
-                <a:latin typeface="Segoe UI" panose="020B0502040204020203" pitchFamily="34" charset="0"/>
-                <a:cs typeface="Segoe UI" panose="020B0502040204020203" pitchFamily="34" charset="0"/>
-              </a:rPr>
-              <a:t>información II </a:t>
-            </a:r>
-            <a:endParaRPr lang="es-AR" b="1" dirty="0"/>
+                <a:solidFill>
+                  <a:schemeClr val="accent1"/>
+                </a:solidFill>
+                <a:latin typeface="Segoe UI" panose="020B0502040204020203" pitchFamily="34" charset="0"/>
+                <a:cs typeface="Segoe UI" panose="020B0502040204020203" pitchFamily="34" charset="0"/>
+              </a:rPr>
+              <a:t>información </a:t>
+            </a:r>
+            <a:r>
+              <a:rPr lang="es-AR" dirty="0" smtClean="0">
+                <a:solidFill>
+                  <a:schemeClr val="accent1"/>
+                </a:solidFill>
+                <a:latin typeface="Segoe UI" panose="020B0502040204020203" pitchFamily="34" charset="0"/>
+                <a:cs typeface="Segoe UI" panose="020B0502040204020203" pitchFamily="34" charset="0"/>
+              </a:rPr>
+              <a:t> (II) </a:t>
+            </a:r>
+            <a:endParaRPr lang="es-AR" b="1" dirty="0">
+              <a:solidFill>
+                <a:schemeClr val="accent1"/>
+              </a:solidFill>
+            </a:endParaRPr>
           </a:p>
         </p:txBody>
       </p:sp>
@@ -16511,7 +16911,7 @@
           <a:blip r:embed="rId2" cstate="print">
             <a:extLst>
               <a:ext uri="{28A0092B-C50C-407E-A947-70E740481C1C}">
-                <a14:useLocalDpi xmlns:a14="http://schemas.microsoft.com/office/drawing/2010/main" xmlns="" val="0"/>
+                <a14:useLocalDpi xmlns="" xmlns:a14="http://schemas.microsoft.com/office/drawing/2010/main" val="0"/>
               </a:ext>
             </a:extLst>
           </a:blip>
@@ -16534,14 +16934,14 @@
           </a:ln>
           <a:extLst>
             <a:ext uri="{909E8E84-426E-40DD-AFC4-6F175D3DCCD1}">
-              <a14:hiddenFill xmlns:a14="http://schemas.microsoft.com/office/drawing/2010/main" xmlns="">
+              <a14:hiddenFill xmlns="" xmlns:a14="http://schemas.microsoft.com/office/drawing/2010/main">
                 <a:solidFill>
                   <a:schemeClr val="accent1"/>
                 </a:solidFill>
               </a14:hiddenFill>
             </a:ext>
             <a:ext uri="{91240B29-F687-4F45-9708-019B960494DF}">
-              <a14:hiddenLine xmlns:a14="http://schemas.microsoft.com/office/drawing/2010/main" xmlns="" w="9525">
+              <a14:hiddenLine xmlns="" xmlns:a14="http://schemas.microsoft.com/office/drawing/2010/main" w="9525">
                 <a:solidFill>
                   <a:schemeClr val="tx1"/>
                 </a:solidFill>
@@ -16556,7 +16956,7 @@
     </p:spTree>
     <p:extLst>
       <p:ext uri="{BB962C8B-B14F-4D97-AF65-F5344CB8AC3E}">
-        <p14:creationId xmlns:p14="http://schemas.microsoft.com/office/powerpoint/2010/main" xmlns="" val="2112418618"/>
+        <p14:creationId xmlns="" xmlns:p14="http://schemas.microsoft.com/office/powerpoint/2010/main" val="2112418618"/>
       </p:ext>
     </p:extLst>
   </p:cSld>
@@ -16564,7 +16964,7 @@
     <a:masterClrMapping/>
   </p:clrMapOvr>
   <mc:AlternateContent xmlns:mc="http://schemas.openxmlformats.org/markup-compatibility/2006">
-    <mc:Choice xmlns:p14="http://schemas.microsoft.com/office/powerpoint/2010/main" xmlns="" Requires="p14">
+    <mc:Choice xmlns="" xmlns:p14="http://schemas.microsoft.com/office/powerpoint/2010/main" Requires="p14">
       <p:transition spd="med" p14:dur="700">
         <p:fade/>
       </p:transition>
@@ -16627,6 +17027,9 @@
             <a:pPr algn="ctr"/>
             <a:r>
               <a:rPr lang="es-AR" dirty="0">
+                <a:solidFill>
+                  <a:schemeClr val="accent1"/>
+                </a:solidFill>
                 <a:latin typeface="Segoe UI" panose="020B0502040204020203" pitchFamily="34" charset="0"/>
                 <a:cs typeface="Segoe UI" panose="020B0502040204020203" pitchFamily="34" charset="0"/>
               </a:rPr>
@@ -16634,12 +17037,19 @@
             </a:r>
             <a:r>
               <a:rPr lang="es-AR" dirty="0" smtClean="0">
+                <a:solidFill>
+                  <a:schemeClr val="accent1"/>
+                </a:solidFill>
                 <a:latin typeface="Segoe UI" panose="020B0502040204020203" pitchFamily="34" charset="0"/>
                 <a:cs typeface="Segoe UI" panose="020B0502040204020203" pitchFamily="34" charset="0"/>
               </a:rPr>
               <a:t>existentes</a:t>
             </a:r>
-            <a:endParaRPr lang="es-AR" b="1" dirty="0"/>
+            <a:endParaRPr lang="es-AR" b="1" dirty="0">
+              <a:solidFill>
+                <a:schemeClr val="accent1"/>
+              </a:solidFill>
+            </a:endParaRPr>
           </a:p>
         </p:txBody>
       </p:sp>
@@ -16845,7 +17255,7 @@
           <a:blip r:embed="rId2" cstate="print">
             <a:extLst>
               <a:ext uri="{28A0092B-C50C-407E-A947-70E740481C1C}">
-                <a14:useLocalDpi xmlns:a14="http://schemas.microsoft.com/office/drawing/2010/main" xmlns="" val="0"/>
+                <a14:useLocalDpi xmlns="" xmlns:a14="http://schemas.microsoft.com/office/drawing/2010/main" val="0"/>
               </a:ext>
             </a:extLst>
           </a:blip>
@@ -16868,14 +17278,14 @@
           </a:ln>
           <a:extLst>
             <a:ext uri="{909E8E84-426E-40DD-AFC4-6F175D3DCCD1}">
-              <a14:hiddenFill xmlns:a14="http://schemas.microsoft.com/office/drawing/2010/main" xmlns="">
+              <a14:hiddenFill xmlns="" xmlns:a14="http://schemas.microsoft.com/office/drawing/2010/main">
                 <a:solidFill>
                   <a:schemeClr val="accent1"/>
                 </a:solidFill>
               </a14:hiddenFill>
             </a:ext>
             <a:ext uri="{91240B29-F687-4F45-9708-019B960494DF}">
-              <a14:hiddenLine xmlns:a14="http://schemas.microsoft.com/office/drawing/2010/main" xmlns="" w="9525">
+              <a14:hiddenLine xmlns="" xmlns:a14="http://schemas.microsoft.com/office/drawing/2010/main" w="9525">
                 <a:solidFill>
                   <a:schemeClr val="tx1"/>
                 </a:solidFill>
@@ -16890,7 +17300,7 @@
     </p:spTree>
     <p:extLst>
       <p:ext uri="{BB962C8B-B14F-4D97-AF65-F5344CB8AC3E}">
-        <p14:creationId xmlns:p14="http://schemas.microsoft.com/office/powerpoint/2010/main" xmlns="" val="1393713661"/>
+        <p14:creationId xmlns="" xmlns:p14="http://schemas.microsoft.com/office/powerpoint/2010/main" val="1393713661"/>
       </p:ext>
     </p:extLst>
   </p:cSld>
@@ -16898,7 +17308,7 @@
     <a:masterClrMapping/>
   </p:clrMapOvr>
   <mc:AlternateContent xmlns:mc="http://schemas.openxmlformats.org/markup-compatibility/2006">
-    <mc:Choice xmlns:p14="http://schemas.microsoft.com/office/powerpoint/2010/main" xmlns="" Requires="p14">
+    <mc:Choice xmlns="" xmlns:p14="http://schemas.microsoft.com/office/powerpoint/2010/main" Requires="p14">
       <p:transition spd="med" p14:dur="700">
         <p:fade/>
       </p:transition>

</xml_diff>

<commit_message>
Cambio línea mía. Santi.
</commit_message>
<xml_diff>
--- a/Presentacion/Fuga de Información.pptx
+++ b/Presentacion/Fuga de Información.pptx
@@ -1765,10 +1765,10 @@
                 <a:ea typeface="+mn-ea"/>
                 <a:cs typeface="+mn-cs"/>
               </a:rPr>
-              <a:t>Cambio </a:t>
-            </a:r>
-            <a:r>
-              <a:rPr lang="es-AR" sz="1200" kern="1200" dirty="0" smtClean="0">
+              <a:t>Cambio de la economía tradicional traída en la revolución industrial hacia una </a:t>
+            </a:r>
+            <a:r>
+              <a:rPr lang="es-AR" sz="1200" b="1" kern="1200" dirty="0" smtClean="0">
                 <a:solidFill>
                   <a:schemeClr val="tx1"/>
                 </a:solidFill>
@@ -1777,10 +1777,10 @@
                 <a:ea typeface="+mn-ea"/>
                 <a:cs typeface="+mn-cs"/>
               </a:rPr>
-              <a:t>de la economía tradicional traída en la revolución industrial hacia una </a:t>
-            </a:r>
-            <a:r>
-              <a:rPr lang="es-AR" sz="1200" b="1" kern="1200" dirty="0" smtClean="0">
+              <a:t>economía basada en la información.</a:t>
+            </a:r>
+            <a:r>
+              <a:rPr lang="es-AR" sz="1200" kern="1200" dirty="0" smtClean="0">
                 <a:solidFill>
                   <a:schemeClr val="tx1"/>
                 </a:solidFill>
@@ -1789,29 +1789,8 @@
                 <a:ea typeface="+mn-ea"/>
                 <a:cs typeface="+mn-cs"/>
               </a:rPr>
-              <a:t>economía basada en la información.</a:t>
-            </a:r>
-            <a:r>
-              <a:rPr lang="es-AR" sz="1200" kern="1200" dirty="0" smtClean="0">
-                <a:solidFill>
-                  <a:schemeClr val="tx1"/>
-                </a:solidFill>
-                <a:effectLst/>
-                <a:latin typeface="+mn-lt"/>
-                <a:ea typeface="+mn-ea"/>
-                <a:cs typeface="+mn-cs"/>
-              </a:rPr>
               <a:t> </a:t>
             </a:r>
-            <a:endParaRPr lang="es-AR" sz="1200" kern="1200" dirty="0" smtClean="0">
-              <a:solidFill>
-                <a:schemeClr val="tx1"/>
-              </a:solidFill>
-              <a:effectLst/>
-              <a:latin typeface="+mn-lt"/>
-              <a:ea typeface="+mn-ea"/>
-              <a:cs typeface="+mn-cs"/>
-            </a:endParaRPr>
           </a:p>
           <a:p>
             <a:pPr marL="171450" marR="0" indent="-171450" algn="l" defTabSz="914400" rtl="0" eaLnBrk="1" fontAlgn="auto" latinLnBrk="0" hangingPunct="1">
@@ -1841,29 +1820,8 @@
                 <a:ea typeface="+mn-ea"/>
                 <a:cs typeface="+mn-cs"/>
               </a:rPr>
-              <a:t>La industria </a:t>
-            </a:r>
-            <a:r>
-              <a:rPr lang="es-AR" sz="1200" kern="1200" dirty="0" smtClean="0">
-                <a:solidFill>
-                  <a:schemeClr val="tx1"/>
-                </a:solidFill>
-                <a:effectLst/>
-                <a:latin typeface="+mn-lt"/>
-                <a:ea typeface="+mn-ea"/>
-                <a:cs typeface="+mn-cs"/>
-              </a:rPr>
-              <a:t>es capaz de explorar las necesidades personales de los consumidores, </a:t>
-            </a:r>
-            <a:endParaRPr lang="es-AR" sz="1200" kern="1200" dirty="0" smtClean="0">
-              <a:solidFill>
-                <a:schemeClr val="tx1"/>
-              </a:solidFill>
-              <a:effectLst/>
-              <a:latin typeface="+mn-lt"/>
-              <a:ea typeface="+mn-ea"/>
-              <a:cs typeface="+mn-cs"/>
-            </a:endParaRPr>
+              <a:t>La industria es capaz de explorar las necesidades personales de los consumidores, </a:t>
+            </a:r>
           </a:p>
           <a:p>
             <a:pPr marL="171450" marR="0" indent="-171450" algn="l" defTabSz="914400" rtl="0" eaLnBrk="1" fontAlgn="auto" latinLnBrk="0" hangingPunct="1">
@@ -1893,8 +1851,14 @@
                 <a:ea typeface="+mn-ea"/>
                 <a:cs typeface="+mn-cs"/>
               </a:rPr>
-              <a:t>reducción </a:t>
-            </a:r>
+              <a:t>reducción de costos tanto para los consumidores como para las empresas.</a:t>
+            </a:r>
+          </a:p>
+          <a:p>
+            <a:pPr marL="171450" indent="-171450">
+              <a:buFont typeface="Arial" panose="020B0604020202020204" pitchFamily="34" charset="0"/>
+              <a:buChar char="•"/>
+            </a:pPr>
             <a:r>
               <a:rPr lang="es-AR" sz="1200" kern="1200" dirty="0" smtClean="0">
                 <a:solidFill>
@@ -1905,16 +1869,10 @@
                 <a:ea typeface="+mn-ea"/>
                 <a:cs typeface="+mn-cs"/>
               </a:rPr>
-              <a:t>de costos tanto para los consumidores como para las empresas.</a:t>
-            </a:r>
-          </a:p>
-          <a:p>
-            <a:pPr marL="171450" indent="-171450">
-              <a:buFont typeface="Arial" panose="020B0604020202020204" pitchFamily="34" charset="0"/>
-              <a:buChar char="•"/>
-            </a:pPr>
-            <a:r>
-              <a:rPr lang="es-AR" sz="1200" kern="1200" dirty="0" smtClean="0">
+              <a:t>El </a:t>
+            </a:r>
+            <a:r>
+              <a:rPr lang="es-AR" sz="1200" b="0" kern="1200" dirty="0" smtClean="0">
                 <a:solidFill>
                   <a:schemeClr val="tx1"/>
                 </a:solidFill>
@@ -1923,10 +1881,10 @@
                 <a:ea typeface="+mn-ea"/>
                 <a:cs typeface="+mn-cs"/>
               </a:rPr>
-              <a:t>El </a:t>
-            </a:r>
-            <a:r>
-              <a:rPr lang="es-AR" sz="1200" b="0" kern="1200" dirty="0" smtClean="0">
+              <a:t>principal capital de las empresas tecnológicas lo </a:t>
+            </a:r>
+            <a:r>
+              <a:rPr lang="es-AR" sz="1200" kern="1200" dirty="0" smtClean="0">
                 <a:solidFill>
                   <a:schemeClr val="tx1"/>
                 </a:solidFill>
@@ -1935,10 +1893,10 @@
                 <a:ea typeface="+mn-ea"/>
                 <a:cs typeface="+mn-cs"/>
               </a:rPr>
-              <a:t>principal capital de las empresas tecnológicas lo </a:t>
-            </a:r>
-            <a:r>
-              <a:rPr lang="es-AR" sz="1200" kern="1200" dirty="0" smtClean="0">
+              <a:t>conforman los bienes o activos intangibles: </a:t>
+            </a:r>
+            <a:r>
+              <a:rPr lang="es-AR" sz="1200" b="1" kern="1200" dirty="0" smtClean="0">
                 <a:solidFill>
                   <a:schemeClr val="tx1"/>
                 </a:solidFill>
@@ -1947,10 +1905,10 @@
                 <a:ea typeface="+mn-ea"/>
                 <a:cs typeface="+mn-cs"/>
               </a:rPr>
-              <a:t>conforman los bienes o activos intangibles: </a:t>
-            </a:r>
-            <a:r>
-              <a:rPr lang="es-AR" sz="1200" b="1" kern="1200" dirty="0" smtClean="0">
+              <a:t>información, algoritmos, fórmulas, invenciones, procesos</a:t>
+            </a:r>
+            <a:r>
+              <a:rPr lang="es-AR" sz="1200" kern="1200" dirty="0" smtClean="0">
                 <a:solidFill>
                   <a:schemeClr val="tx1"/>
                 </a:solidFill>
@@ -1959,7 +1917,7 @@
                 <a:ea typeface="+mn-ea"/>
                 <a:cs typeface="+mn-cs"/>
               </a:rPr>
-              <a:t>información</a:t>
+              <a:t>, estrategia comercial y </a:t>
             </a:r>
             <a:r>
               <a:rPr lang="es-AR" sz="1200" b="1" kern="1200" dirty="0" smtClean="0">
@@ -1971,55 +1929,7 @@
                 <a:ea typeface="+mn-ea"/>
                 <a:cs typeface="+mn-cs"/>
               </a:rPr>
-              <a:t>, </a:t>
-            </a:r>
-            <a:r>
-              <a:rPr lang="es-AR" sz="1200" b="1" kern="1200" dirty="0" smtClean="0">
-                <a:solidFill>
-                  <a:schemeClr val="tx1"/>
-                </a:solidFill>
-                <a:effectLst/>
-                <a:latin typeface="+mn-lt"/>
-                <a:ea typeface="+mn-ea"/>
-                <a:cs typeface="+mn-cs"/>
-              </a:rPr>
-              <a:t>algoritmos, fórmulas, invenciones, procesos</a:t>
-            </a:r>
-            <a:r>
-              <a:rPr lang="es-AR" sz="1200" kern="1200" dirty="0" smtClean="0">
-                <a:solidFill>
-                  <a:schemeClr val="tx1"/>
-                </a:solidFill>
-                <a:effectLst/>
-                <a:latin typeface="+mn-lt"/>
-                <a:ea typeface="+mn-ea"/>
-                <a:cs typeface="+mn-cs"/>
-              </a:rPr>
-              <a:t>, estrategia comercial y </a:t>
-            </a:r>
-            <a:r>
-              <a:rPr lang="es-AR" sz="1200" b="1" kern="1200" dirty="0" smtClean="0">
-                <a:solidFill>
-                  <a:schemeClr val="tx1"/>
-                </a:solidFill>
-                <a:effectLst/>
-                <a:latin typeface="+mn-lt"/>
-                <a:ea typeface="+mn-ea"/>
-                <a:cs typeface="+mn-cs"/>
-              </a:rPr>
-              <a:t>bases de </a:t>
-            </a:r>
-            <a:r>
-              <a:rPr lang="es-AR" sz="1200" b="1" kern="1200" dirty="0" smtClean="0">
-                <a:solidFill>
-                  <a:schemeClr val="tx1"/>
-                </a:solidFill>
-                <a:effectLst/>
-                <a:latin typeface="+mn-lt"/>
-                <a:ea typeface="+mn-ea"/>
-                <a:cs typeface="+mn-cs"/>
-              </a:rPr>
-              <a:t>datos</a:t>
+              <a:t>bases de datos</a:t>
             </a:r>
             <a:endParaRPr lang="es-AR" sz="1200" b="0" kern="1200" dirty="0" smtClean="0">
               <a:solidFill>
@@ -2061,19 +1971,7 @@
                 <a:ea typeface="+mn-ea"/>
                 <a:cs typeface="+mn-cs"/>
               </a:rPr>
-              <a:t>Las </a:t>
-            </a:r>
-            <a:r>
-              <a:rPr lang="es-AR" sz="1200" kern="1200" dirty="0" smtClean="0">
-                <a:solidFill>
-                  <a:schemeClr val="tx1"/>
-                </a:solidFill>
-                <a:effectLst/>
-                <a:latin typeface="+mn-lt"/>
-                <a:ea typeface="+mn-ea"/>
-                <a:cs typeface="+mn-cs"/>
-              </a:rPr>
-              <a:t>organizaciones del siglo XXI deben estar preparadas para los siguientes </a:t>
+              <a:t>Las organizaciones del siglo XXI deben estar preparadas para los siguientes </a:t>
             </a:r>
             <a:r>
               <a:rPr lang="es-AR" sz="1200" b="1" kern="1200" dirty="0" smtClean="0">
@@ -2247,10 +2145,10 @@
                 <a:ea typeface="+mn-ea"/>
                 <a:cs typeface="+mn-cs"/>
               </a:rPr>
-              <a:t>proliferación </a:t>
-            </a:r>
-            <a:r>
-              <a:rPr lang="es-AR" sz="1200" b="1" kern="1200" dirty="0" smtClean="0">
+              <a:t>proliferación de internet </a:t>
+            </a:r>
+            <a:r>
+              <a:rPr lang="es-AR" sz="1200" kern="1200" dirty="0" smtClean="0">
                 <a:solidFill>
                   <a:schemeClr val="tx1"/>
                 </a:solidFill>
@@ -2259,8 +2157,14 @@
                 <a:ea typeface="+mn-ea"/>
                 <a:cs typeface="+mn-cs"/>
               </a:rPr>
-              <a:t>de internet </a:t>
-            </a:r>
+              <a:t>desde el año 1990,</a:t>
+            </a:r>
+          </a:p>
+          <a:p>
+            <a:pPr marL="171450" indent="-171450">
+              <a:buFont typeface="Arial" panose="020B0604020202020204" pitchFamily="34" charset="0"/>
+              <a:buChar char="•"/>
+            </a:pPr>
             <a:r>
               <a:rPr lang="es-AR" sz="1200" kern="1200" dirty="0" smtClean="0">
                 <a:solidFill>
@@ -2271,8 +2175,14 @@
                 <a:ea typeface="+mn-ea"/>
                 <a:cs typeface="+mn-cs"/>
               </a:rPr>
-              <a:t>desde el año 1990</a:t>
-            </a:r>
+              <a:t>la fuga de información se ve incrementada gracias a la rápida expansión de los medios de comunicación. </a:t>
+            </a:r>
+          </a:p>
+          <a:p>
+            <a:pPr marL="171450" indent="-171450">
+              <a:buFont typeface="Arial" panose="020B0604020202020204" pitchFamily="34" charset="0"/>
+              <a:buChar char="•"/>
+            </a:pPr>
             <a:r>
               <a:rPr lang="es-AR" sz="1200" kern="1200" dirty="0" smtClean="0">
                 <a:solidFill>
@@ -2283,88 +2193,7 @@
                 <a:ea typeface="+mn-ea"/>
                 <a:cs typeface="+mn-cs"/>
               </a:rPr>
-              <a:t>,</a:t>
-            </a:r>
-          </a:p>
-          <a:p>
-            <a:pPr marL="171450" indent="-171450">
-              <a:buFont typeface="Arial" panose="020B0604020202020204" pitchFamily="34" charset="0"/>
-              <a:buChar char="•"/>
-            </a:pPr>
-            <a:r>
-              <a:rPr lang="es-AR" sz="1200" kern="1200" dirty="0" smtClean="0">
-                <a:solidFill>
-                  <a:schemeClr val="tx1"/>
-                </a:solidFill>
-                <a:effectLst/>
-                <a:latin typeface="+mn-lt"/>
-                <a:ea typeface="+mn-ea"/>
-                <a:cs typeface="+mn-cs"/>
-              </a:rPr>
-              <a:t>la </a:t>
-            </a:r>
-            <a:r>
-              <a:rPr lang="es-AR" sz="1200" kern="1200" dirty="0" smtClean="0">
-                <a:solidFill>
-                  <a:schemeClr val="tx1"/>
-                </a:solidFill>
-                <a:effectLst/>
-                <a:latin typeface="+mn-lt"/>
-                <a:ea typeface="+mn-ea"/>
-                <a:cs typeface="+mn-cs"/>
-              </a:rPr>
-              <a:t>fuga de información se ve incrementada gracias a la rápida expansión de los medios de comunicación. </a:t>
-            </a:r>
-            <a:endParaRPr lang="es-AR" sz="1200" kern="1200" dirty="0" smtClean="0">
-              <a:solidFill>
-                <a:schemeClr val="tx1"/>
-              </a:solidFill>
-              <a:effectLst/>
-              <a:latin typeface="+mn-lt"/>
-              <a:ea typeface="+mn-ea"/>
-              <a:cs typeface="+mn-cs"/>
-            </a:endParaRPr>
-          </a:p>
-          <a:p>
-            <a:pPr marL="171450" indent="-171450">
-              <a:buFont typeface="Arial" panose="020B0604020202020204" pitchFamily="34" charset="0"/>
-              <a:buChar char="•"/>
-            </a:pPr>
-            <a:r>
-              <a:rPr lang="es-AR" sz="1200" kern="1200" dirty="0" smtClean="0">
-                <a:solidFill>
-                  <a:schemeClr val="tx1"/>
-                </a:solidFill>
-                <a:effectLst/>
-                <a:latin typeface="+mn-lt"/>
-                <a:ea typeface="+mn-ea"/>
-                <a:cs typeface="+mn-cs"/>
-              </a:rPr>
-              <a:t>han </a:t>
-            </a:r>
-            <a:r>
-              <a:rPr lang="es-AR" sz="1200" kern="1200" dirty="0" smtClean="0">
-                <a:solidFill>
-                  <a:schemeClr val="tx1"/>
-                </a:solidFill>
-                <a:effectLst/>
-                <a:latin typeface="+mn-lt"/>
-                <a:ea typeface="+mn-ea"/>
-                <a:cs typeface="+mn-cs"/>
-              </a:rPr>
-              <a:t>emergido nuevas formas de fuga de </a:t>
-            </a:r>
-            <a:r>
-              <a:rPr lang="es-AR" sz="1200" kern="1200" dirty="0" smtClean="0">
-                <a:solidFill>
-                  <a:schemeClr val="tx1"/>
-                </a:solidFill>
-                <a:effectLst/>
-                <a:latin typeface="+mn-lt"/>
-                <a:ea typeface="+mn-ea"/>
-                <a:cs typeface="+mn-cs"/>
-              </a:rPr>
-              <a:t>información</a:t>
+              <a:t>han emergido nuevas formas de fuga de información</a:t>
             </a:r>
           </a:p>
           <a:p>
@@ -2397,19 +2226,7 @@
                 <a:ea typeface="+mn-ea"/>
                 <a:cs typeface="+mn-cs"/>
               </a:rPr>
-              <a:t>En </a:t>
-            </a:r>
-            <a:r>
-              <a:rPr lang="es-AR" sz="1200" kern="1200" dirty="0" smtClean="0">
-                <a:solidFill>
-                  <a:schemeClr val="tx1"/>
-                </a:solidFill>
-                <a:effectLst/>
-                <a:latin typeface="+mn-lt"/>
-                <a:ea typeface="+mn-ea"/>
-                <a:cs typeface="+mn-cs"/>
-              </a:rPr>
-              <a:t>el campo de la </a:t>
+              <a:t>En el campo de la </a:t>
             </a:r>
             <a:r>
               <a:rPr lang="es-AR" sz="1200" b="1" kern="1200" dirty="0" smtClean="0">
@@ -2808,19 +2625,7 @@
                 <a:ea typeface="+mn-ea"/>
                 <a:cs typeface="+mn-cs"/>
               </a:rPr>
-              <a:t>Origen </a:t>
-            </a:r>
-            <a:r>
-              <a:rPr lang="es-AR" sz="1200" kern="1200" dirty="0" smtClean="0">
-                <a:solidFill>
-                  <a:schemeClr val="tx1"/>
-                </a:solidFill>
-                <a:effectLst/>
-                <a:latin typeface="+mn-lt"/>
-                <a:ea typeface="+mn-ea"/>
-                <a:cs typeface="+mn-cs"/>
-              </a:rPr>
-              <a:t>interno como externo.</a:t>
+              <a:t>Origen interno como externo.</a:t>
             </a:r>
             <a:endParaRPr lang="en-US" sz="1200" kern="1200" dirty="0" smtClean="0">
               <a:solidFill>
@@ -2850,29 +2655,20 @@
               <a:rPr lang="es-AR" u="none" strike="noStrike" dirty="0" smtClean="0">
                 <a:effectLst/>
               </a:rPr>
-              <a:t>Usuarios</a:t>
+              <a:t>Usuarios: los usuarios pueden ser intencional o </a:t>
+            </a:r>
+            <a:r>
+              <a:rPr lang="es-AR" u="none" strike="noStrike" dirty="0" err="1" smtClean="0">
+                <a:effectLst/>
+              </a:rPr>
+              <a:t>inintencionalmente</a:t>
             </a:r>
             <a:r>
               <a:rPr lang="es-AR" u="none" strike="noStrike" dirty="0" smtClean="0">
                 <a:effectLst/>
               </a:rPr>
-              <a:t>: los usuarios pueden ser intencional o </a:t>
-            </a:r>
-            <a:r>
-              <a:rPr lang="es-AR" u="none" strike="noStrike" dirty="0" err="1" smtClean="0">
-                <a:effectLst/>
-              </a:rPr>
-              <a:t>inintencionalmente</a:t>
-            </a:r>
-            <a:r>
-              <a:rPr lang="es-AR" u="none" strike="noStrike" dirty="0" smtClean="0">
-                <a:effectLst/>
-              </a:rPr>
               <a:t> responsables de fugas de información. </a:t>
             </a:r>
-            <a:endParaRPr lang="es-AR" u="none" strike="noStrike" dirty="0" smtClean="0">
-              <a:effectLst/>
-            </a:endParaRPr>
           </a:p>
           <a:p>
             <a:pPr marL="171450" lvl="0" indent="-171450">
@@ -2883,13 +2679,7 @@
               <a:rPr lang="es-AR" u="none" strike="noStrike" dirty="0" smtClean="0">
                 <a:effectLst/>
               </a:rPr>
-              <a:t>No </a:t>
-            </a:r>
-            <a:r>
-              <a:rPr lang="es-AR" u="none" strike="noStrike" dirty="0" smtClean="0">
-                <a:effectLst/>
-              </a:rPr>
-              <a:t>se definieron bien sus perfiles de acceso.</a:t>
+              <a:t>No se definieron bien sus perfiles de acceso.</a:t>
             </a:r>
             <a:endParaRPr lang="en-US" u="none" strike="noStrike" dirty="0" smtClean="0">
               <a:effectLst/>
@@ -2921,9 +2711,6 @@
               </a:rPr>
               <a:t>Errores de programación: errores o fallas en programación que pueden dar libre acceso a crackers. </a:t>
             </a:r>
-            <a:endParaRPr lang="es-AR" u="none" strike="noStrike" dirty="0" smtClean="0">
-              <a:effectLst/>
-            </a:endParaRPr>
           </a:p>
           <a:p>
             <a:pPr marL="171450" lvl="0" indent="-171450">
@@ -2934,17 +2721,8 @@
               <a:rPr lang="es-AR" u="none" strike="noStrike" dirty="0" smtClean="0">
                 <a:effectLst/>
               </a:rPr>
-              <a:t>Accesos </a:t>
-            </a:r>
-            <a:r>
-              <a:rPr lang="es-AR" u="none" strike="noStrike" dirty="0" smtClean="0">
-                <a:effectLst/>
-              </a:rPr>
-              <a:t>no autorizados/intrusos: un tercero no autorizado que accede a la información dentro de una computadora. </a:t>
-            </a:r>
-            <a:endParaRPr lang="es-AR" u="none" strike="noStrike" dirty="0" smtClean="0">
-              <a:effectLst/>
-            </a:endParaRPr>
+              <a:t>Accesos no autorizados/intrusos: un tercero no autorizado que accede a la información dentro de una computadora. </a:t>
+            </a:r>
           </a:p>
           <a:p>
             <a:pPr marL="171450" lvl="0" indent="-171450">
@@ -2955,13 +2733,7 @@
               <a:rPr lang="es-AR" u="none" strike="noStrike" dirty="0" smtClean="0">
                 <a:effectLst/>
               </a:rPr>
-              <a:t>Robos </a:t>
-            </a:r>
-            <a:r>
-              <a:rPr lang="es-AR" u="none" strike="noStrike" dirty="0" smtClean="0">
-                <a:effectLst/>
-              </a:rPr>
-              <a:t>de componentes de hardware (discos o memoria) que contienen información</a:t>
+              <a:t>Robos de componentes de hardware (discos o memoria) que contienen información</a:t>
             </a:r>
             <a:endParaRPr lang="en-US" u="none" strike="noStrike" dirty="0" smtClean="0">
               <a:effectLst/>
@@ -2976,13 +2748,7 @@
               <a:rPr lang="es-AR" u="none" strike="noStrike" dirty="0" smtClean="0">
                 <a:effectLst/>
               </a:rPr>
-              <a:t>Desastres no </a:t>
-            </a:r>
-            <a:r>
-              <a:rPr lang="es-AR" u="none" strike="noStrike" dirty="0" smtClean="0">
-                <a:effectLst/>
-              </a:rPr>
-              <a:t>previstos &amp;</a:t>
+              <a:t>Desastres no previstos &amp;</a:t>
             </a:r>
             <a:r>
               <a:rPr lang="es-AR" u="none" strike="noStrike" baseline="0" dirty="0" smtClean="0">
@@ -3007,13 +2773,7 @@
               <a:rPr lang="es-AR" u="none" strike="noStrike" dirty="0" smtClean="0">
                 <a:effectLst/>
               </a:rPr>
-              <a:t>pérdida </a:t>
-            </a:r>
-            <a:r>
-              <a:rPr lang="es-AR" u="none" strike="noStrike" dirty="0" smtClean="0">
-                <a:effectLst/>
-              </a:rPr>
-              <a:t>de información irrecuperable.</a:t>
+              <a:t>pérdida de información irrecuperable.</a:t>
             </a:r>
             <a:endParaRPr lang="en-US" u="none" strike="noStrike" dirty="0" smtClean="0">
               <a:effectLst/>
@@ -3028,19 +2788,7 @@
               <a:rPr lang="es-AR" u="none" strike="noStrike" dirty="0" smtClean="0">
                 <a:effectLst/>
               </a:rPr>
-              <a:t>Personal interno de la </a:t>
-            </a:r>
-            <a:r>
-              <a:rPr lang="es-AR" u="none" strike="noStrike" dirty="0" smtClean="0">
-                <a:effectLst/>
-              </a:rPr>
-              <a:t>roba </a:t>
-            </a:r>
-            <a:r>
-              <a:rPr lang="es-AR" u="none" strike="noStrike" dirty="0" smtClean="0">
-                <a:effectLst/>
-              </a:rPr>
-              <a:t>información para venderla a la competencia.</a:t>
+              <a:t>Personal interno de la roba información para venderla a la competencia.</a:t>
             </a:r>
             <a:endParaRPr lang="en-US" u="none" strike="noStrike" dirty="0" smtClean="0">
               <a:effectLst/>
@@ -3170,8 +2918,14 @@
                 <a:ea typeface="+mn-ea"/>
                 <a:cs typeface="+mn-cs"/>
               </a:rPr>
-              <a:t> es un conjunto de derechos que se le otorgan a un inventor por un período limitado de tiempo (20 años</a:t>
-            </a:r>
+              <a:t> es un conjunto de derechos que se le otorgan a un inventor por un período limitado de tiempo (20 años),</a:t>
+            </a:r>
+          </a:p>
+          <a:p>
+            <a:pPr marL="171450" indent="-171450">
+              <a:buFont typeface="Arial" panose="020B0604020202020204" pitchFamily="34" charset="0"/>
+              <a:buChar char="•"/>
+            </a:pPr>
             <a:r>
               <a:rPr lang="es-AR" sz="1200" kern="1200" dirty="0" smtClean="0">
                 <a:solidFill>
@@ -3182,7 +2936,7 @@
                 <a:ea typeface="+mn-ea"/>
                 <a:cs typeface="+mn-cs"/>
               </a:rPr>
-              <a:t>),</a:t>
+              <a:t>a cambio de la divulgación de los detalles del mismo. </a:t>
             </a:r>
           </a:p>
           <a:p>
@@ -3200,10 +2954,10 @@
                 <a:ea typeface="+mn-ea"/>
                 <a:cs typeface="+mn-cs"/>
               </a:rPr>
-              <a:t>a </a:t>
-            </a:r>
-            <a:r>
-              <a:rPr lang="es-AR" sz="1200" kern="1200" dirty="0" smtClean="0">
+              <a:t>son una forma de </a:t>
+            </a:r>
+            <a:r>
+              <a:rPr lang="es-AR" sz="1200" b="1" kern="1200" dirty="0" smtClean="0">
                 <a:solidFill>
                   <a:schemeClr val="tx1"/>
                 </a:solidFill>
@@ -3212,17 +2966,20 @@
                 <a:ea typeface="+mn-ea"/>
                 <a:cs typeface="+mn-cs"/>
               </a:rPr>
-              <a:t>cambio de la divulgación de los detalles del mismo. </a:t>
-            </a:r>
-            <a:endParaRPr lang="es-AR" sz="1200" kern="1200" dirty="0" smtClean="0">
-              <a:solidFill>
-                <a:schemeClr val="tx1"/>
-              </a:solidFill>
-              <a:effectLst/>
-              <a:latin typeface="+mn-lt"/>
-              <a:ea typeface="+mn-ea"/>
-              <a:cs typeface="+mn-cs"/>
-            </a:endParaRPr>
+              <a:t>propiedad intelectual</a:t>
+            </a:r>
+            <a:r>
+              <a:rPr lang="es-AR" sz="1200" kern="1200" dirty="0" smtClean="0">
+                <a:solidFill>
+                  <a:schemeClr val="tx1"/>
+                </a:solidFill>
+                <a:effectLst/>
+                <a:latin typeface="+mn-lt"/>
+                <a:ea typeface="+mn-ea"/>
+                <a:cs typeface="+mn-cs"/>
+              </a:rPr>
+              <a:t>,</a:t>
+            </a:r>
           </a:p>
           <a:p>
             <a:pPr marL="171450" indent="-171450">
@@ -3239,73 +2996,7 @@
                 <a:ea typeface="+mn-ea"/>
                 <a:cs typeface="+mn-cs"/>
               </a:rPr>
-              <a:t>son </a:t>
-            </a:r>
-            <a:r>
-              <a:rPr lang="es-AR" sz="1200" kern="1200" dirty="0" smtClean="0">
-                <a:solidFill>
-                  <a:schemeClr val="tx1"/>
-                </a:solidFill>
-                <a:effectLst/>
-                <a:latin typeface="+mn-lt"/>
-                <a:ea typeface="+mn-ea"/>
-                <a:cs typeface="+mn-cs"/>
-              </a:rPr>
-              <a:t>una forma de </a:t>
-            </a:r>
-            <a:r>
-              <a:rPr lang="es-AR" sz="1200" b="1" kern="1200" dirty="0" smtClean="0">
-                <a:solidFill>
-                  <a:schemeClr val="tx1"/>
-                </a:solidFill>
-                <a:effectLst/>
-                <a:latin typeface="+mn-lt"/>
-                <a:ea typeface="+mn-ea"/>
-                <a:cs typeface="+mn-cs"/>
-              </a:rPr>
-              <a:t>propiedad intelectual</a:t>
-            </a:r>
-            <a:r>
-              <a:rPr lang="es-AR" sz="1200" kern="1200" dirty="0" smtClean="0">
-                <a:solidFill>
-                  <a:schemeClr val="tx1"/>
-                </a:solidFill>
-                <a:effectLst/>
-                <a:latin typeface="+mn-lt"/>
-                <a:ea typeface="+mn-ea"/>
-                <a:cs typeface="+mn-cs"/>
-              </a:rPr>
-              <a:t>,</a:t>
-            </a:r>
-          </a:p>
-          <a:p>
-            <a:pPr marL="171450" indent="-171450">
-              <a:buFont typeface="Arial" panose="020B0604020202020204" pitchFamily="34" charset="0"/>
-              <a:buChar char="•"/>
-            </a:pPr>
-            <a:r>
-              <a:rPr lang="es-AR" sz="1200" kern="1200" dirty="0" smtClean="0">
-                <a:solidFill>
-                  <a:schemeClr val="tx1"/>
-                </a:solidFill>
-                <a:effectLst/>
-                <a:latin typeface="+mn-lt"/>
-                <a:ea typeface="+mn-ea"/>
-                <a:cs typeface="+mn-cs"/>
-              </a:rPr>
-              <a:t>le </a:t>
-            </a:r>
-            <a:r>
-              <a:rPr lang="es-AR" sz="1200" kern="1200" dirty="0" smtClean="0">
-                <a:solidFill>
-                  <a:schemeClr val="tx1"/>
-                </a:solidFill>
-                <a:effectLst/>
-                <a:latin typeface="+mn-lt"/>
-                <a:ea typeface="+mn-ea"/>
-                <a:cs typeface="+mn-cs"/>
-              </a:rPr>
-              <a:t>proporcionan dueño la garantía de que otras empresas no podrán producir, utilizar o vender el producto patentado sin permiso.</a:t>
+              <a:t>le proporcionan dueño la garantía de que otras empresas no podrán producir, utilizar o vender el producto patentado sin permiso.</a:t>
             </a:r>
             <a:endParaRPr lang="en-US" sz="1200" kern="1200" dirty="0" smtClean="0">
               <a:solidFill>
@@ -3371,15 +3062,6 @@
               </a:rPr>
               <a:t>, pero fue durante la revolución francesa que se creó el sistema moderno. </a:t>
             </a:r>
-            <a:endParaRPr lang="es-AR" sz="1200" kern="1200" dirty="0" smtClean="0">
-              <a:solidFill>
-                <a:schemeClr val="tx1"/>
-              </a:solidFill>
-              <a:effectLst/>
-              <a:latin typeface="+mn-lt"/>
-              <a:ea typeface="+mn-ea"/>
-              <a:cs typeface="+mn-cs"/>
-            </a:endParaRPr>
           </a:p>
           <a:p>
             <a:pPr marL="171450" marR="0" indent="-171450" algn="l" defTabSz="914400" rtl="0" eaLnBrk="1" fontAlgn="auto" latinLnBrk="0" hangingPunct="1">
@@ -3409,10 +3091,10 @@
                 <a:ea typeface="+mn-ea"/>
                 <a:cs typeface="+mn-cs"/>
               </a:rPr>
-              <a:t>altos </a:t>
-            </a:r>
-            <a:r>
-              <a:rPr lang="es-AR" sz="1200" b="1" kern="1200" dirty="0" smtClean="0">
+              <a:t>altos costos </a:t>
+            </a:r>
+            <a:r>
+              <a:rPr lang="es-AR" sz="1200" kern="1200" dirty="0" smtClean="0">
                 <a:solidFill>
                   <a:schemeClr val="tx1"/>
                 </a:solidFill>
@@ -3421,29 +3103,8 @@
                 <a:ea typeface="+mn-ea"/>
                 <a:cs typeface="+mn-cs"/>
               </a:rPr>
-              <a:t>costos </a:t>
-            </a:r>
-            <a:r>
-              <a:rPr lang="es-AR" sz="1200" kern="1200" dirty="0" smtClean="0">
-                <a:solidFill>
-                  <a:schemeClr val="tx1"/>
-                </a:solidFill>
-                <a:effectLst/>
-                <a:latin typeface="+mn-lt"/>
-                <a:ea typeface="+mn-ea"/>
-                <a:cs typeface="+mn-cs"/>
-              </a:rPr>
               <a:t>asociados al mantenimiento de patentes (por ejemplo, en Estados Unidos el mismo puede alcanzar los 30 mil dólares por patente), </a:t>
             </a:r>
-            <a:endParaRPr lang="es-AR" sz="1200" kern="1200" dirty="0" smtClean="0">
-              <a:solidFill>
-                <a:schemeClr val="tx1"/>
-              </a:solidFill>
-              <a:effectLst/>
-              <a:latin typeface="+mn-lt"/>
-              <a:ea typeface="+mn-ea"/>
-              <a:cs typeface="+mn-cs"/>
-            </a:endParaRPr>
           </a:p>
           <a:p>
             <a:pPr marL="0" marR="0" indent="0" algn="l" defTabSz="914400" rtl="0" eaLnBrk="1" fontAlgn="auto" latinLnBrk="0" hangingPunct="1">
@@ -3508,8 +3169,10 @@
                 <a:ea typeface="+mn-ea"/>
                 <a:cs typeface="+mn-cs"/>
               </a:rPr>
-              <a:t>, </a:t>
-            </a:r>
+              <a:t>, donde</a:t>
+            </a:r>
+          </a:p>
+          <a:p>
             <a:r>
               <a:rPr lang="es-AR" sz="1200" kern="1200" dirty="0" smtClean="0">
                 <a:solidFill>
@@ -3520,45 +3183,7 @@
                 <a:ea typeface="+mn-ea"/>
                 <a:cs typeface="+mn-cs"/>
               </a:rPr>
-              <a:t>donde</a:t>
-            </a:r>
-          </a:p>
-          <a:p>
-            <a:r>
-              <a:rPr lang="es-AR" sz="1200" kern="1200" dirty="0" smtClean="0">
-                <a:solidFill>
-                  <a:schemeClr val="tx1"/>
-                </a:solidFill>
-                <a:effectLst/>
-                <a:latin typeface="+mn-lt"/>
-                <a:ea typeface="+mn-ea"/>
-                <a:cs typeface="+mn-cs"/>
-              </a:rPr>
-              <a:t>uno </a:t>
-            </a:r>
-            <a:r>
-              <a:rPr lang="es-AR" sz="1200" kern="1200" dirty="0" smtClean="0">
-                <a:solidFill>
-                  <a:schemeClr val="tx1"/>
-                </a:solidFill>
-                <a:effectLst/>
-                <a:latin typeface="+mn-lt"/>
-                <a:ea typeface="+mn-ea"/>
-                <a:cs typeface="+mn-cs"/>
-              </a:rPr>
-              <a:t>sólo de ellos no es suficiente para garantizar el éxito, ya que es necesario </a:t>
-            </a:r>
-            <a:r>
-              <a:rPr lang="es-AR" sz="1200" kern="1200" dirty="0" smtClean="0">
-                <a:solidFill>
-                  <a:schemeClr val="tx1"/>
-                </a:solidFill>
-                <a:effectLst/>
-                <a:latin typeface="+mn-lt"/>
-                <a:ea typeface="+mn-ea"/>
-                <a:cs typeface="+mn-cs"/>
-              </a:rPr>
-              <a:t>complementarlos</a:t>
+              <a:t>uno sólo de ellos no es suficiente para garantizar el éxito, ya que es necesario complementarlos</a:t>
             </a:r>
             <a:endParaRPr lang="en-US" sz="1200" kern="1200" dirty="0" smtClean="0">
               <a:solidFill>
@@ -3692,8 +3317,17 @@
                 <a:ea typeface="+mn-ea"/>
                 <a:cs typeface="+mn-cs"/>
               </a:rPr>
-              <a:t>Encriptado </a:t>
-            </a:r>
+              <a:t>Encriptado de las copias de seguridad</a:t>
+            </a:r>
+            <a:endParaRPr lang="en-US" u="none" strike="noStrike" dirty="0" smtClean="0">
+              <a:effectLst/>
+            </a:endParaRPr>
+          </a:p>
+          <a:p>
+            <a:pPr marL="171450" lvl="0" indent="-171450">
+              <a:buFont typeface="Arial" panose="020B0604020202020204" pitchFamily="34" charset="0"/>
+              <a:buChar char="•"/>
+            </a:pPr>
             <a:r>
               <a:rPr lang="es-AR" sz="1200" u="none" strike="noStrike" kern="1200" dirty="0" smtClean="0">
                 <a:solidFill>
@@ -3704,7 +3338,7 @@
                 <a:ea typeface="+mn-ea"/>
                 <a:cs typeface="+mn-cs"/>
               </a:rPr>
-              <a:t>de las copias de seguridad</a:t>
+              <a:t>Distinción de niveles de acceso según autorización formal en perfiles de usuarios</a:t>
             </a:r>
             <a:endParaRPr lang="en-US" u="none" strike="noStrike" dirty="0" smtClean="0">
               <a:effectLst/>
@@ -3725,7 +3359,7 @@
                 <a:ea typeface="+mn-ea"/>
                 <a:cs typeface="+mn-cs"/>
               </a:rPr>
-              <a:t>Distinción de niveles de acceso según autorización formal en perfiles de usuarios</a:t>
+              <a:t>Localización múltiple y distante de estructuras de datos redundantes</a:t>
             </a:r>
             <a:endParaRPr lang="en-US" u="none" strike="noStrike" dirty="0" smtClean="0">
               <a:effectLst/>
@@ -3746,52 +3380,7 @@
                 <a:ea typeface="+mn-ea"/>
                 <a:cs typeface="+mn-cs"/>
               </a:rPr>
-              <a:t>Localización </a:t>
-            </a:r>
-            <a:r>
-              <a:rPr lang="es-AR" sz="1200" u="none" strike="noStrike" kern="1200" dirty="0" smtClean="0">
-                <a:solidFill>
-                  <a:schemeClr val="tx1"/>
-                </a:solidFill>
-                <a:effectLst/>
-                <a:latin typeface="+mn-lt"/>
-                <a:ea typeface="+mn-ea"/>
-                <a:cs typeface="+mn-cs"/>
-              </a:rPr>
-              <a:t>múltiple y distante de estructuras de datos redundantes</a:t>
-            </a:r>
-            <a:endParaRPr lang="en-US" u="none" strike="noStrike" dirty="0" smtClean="0">
-              <a:effectLst/>
-            </a:endParaRPr>
-          </a:p>
-          <a:p>
-            <a:pPr marL="171450" lvl="0" indent="-171450">
-              <a:buFont typeface="Arial" panose="020B0604020202020204" pitchFamily="34" charset="0"/>
-              <a:buChar char="•"/>
-            </a:pPr>
-            <a:r>
-              <a:rPr lang="es-AR" sz="1200" u="none" strike="noStrike" kern="1200" dirty="0" smtClean="0">
-                <a:solidFill>
-                  <a:schemeClr val="tx1"/>
-                </a:solidFill>
-                <a:effectLst/>
-                <a:latin typeface="+mn-lt"/>
-                <a:ea typeface="+mn-ea"/>
-                <a:cs typeface="+mn-cs"/>
-              </a:rPr>
-              <a:t>Políticas de recuperación ante </a:t>
-            </a:r>
-            <a:r>
-              <a:rPr lang="es-AR" sz="1200" u="none" strike="noStrike" kern="1200" dirty="0" smtClean="0">
-                <a:solidFill>
-                  <a:schemeClr val="tx1"/>
-                </a:solidFill>
-                <a:effectLst/>
-                <a:latin typeface="+mn-lt"/>
-                <a:ea typeface="+mn-ea"/>
-                <a:cs typeface="+mn-cs"/>
-              </a:rPr>
-              <a:t>catástrofes</a:t>
+              <a:t>Políticas de recuperación ante catástrofes</a:t>
             </a:r>
             <a:endParaRPr lang="en-US" u="none" strike="noStrike" dirty="0" smtClean="0">
               <a:effectLst/>
@@ -3940,8 +3529,14 @@
                 <a:ea typeface="+mn-ea"/>
                 <a:cs typeface="+mn-cs"/>
               </a:rPr>
-              <a:t>facilitar </a:t>
-            </a:r>
+              <a:t>facilitar la trazabilidad de las acciones de los usuarios</a:t>
+            </a:r>
+          </a:p>
+          <a:p>
+            <a:pPr marL="171450" indent="-171450">
+              <a:buFont typeface="Arial" panose="020B0604020202020204" pitchFamily="34" charset="0"/>
+              <a:buChar char="•"/>
+            </a:pPr>
             <a:r>
               <a:rPr lang="es-AR" sz="1200" kern="1200" dirty="0" smtClean="0">
                 <a:solidFill>
@@ -3952,10 +3547,10 @@
                 <a:ea typeface="+mn-ea"/>
                 <a:cs typeface="+mn-cs"/>
               </a:rPr>
-              <a:t>la trazabilidad de las acciones de los </a:t>
-            </a:r>
-            <a:r>
-              <a:rPr lang="es-AR" sz="1200" kern="1200" dirty="0" smtClean="0">
+              <a:t>generar </a:t>
+            </a:r>
+            <a:r>
+              <a:rPr lang="es-AR" sz="1200" b="1" kern="1200" dirty="0" smtClean="0">
                 <a:solidFill>
                   <a:schemeClr val="tx1"/>
                 </a:solidFill>
@@ -3964,7 +3559,43 @@
                 <a:ea typeface="+mn-ea"/>
                 <a:cs typeface="+mn-cs"/>
               </a:rPr>
-              <a:t>usuarios</a:t>
+              <a:t>registros (</a:t>
+            </a:r>
+            <a:r>
+              <a:rPr lang="es-AR" sz="1200" b="1" i="1" kern="1200" dirty="0" err="1" smtClean="0">
+                <a:solidFill>
+                  <a:schemeClr val="tx1"/>
+                </a:solidFill>
+                <a:effectLst/>
+                <a:latin typeface="+mn-lt"/>
+                <a:ea typeface="+mn-ea"/>
+                <a:cs typeface="+mn-cs"/>
+              </a:rPr>
+              <a:t>logs</a:t>
+            </a:r>
+            <a:r>
+              <a:rPr lang="es-AR" sz="1200" b="1" kern="1200" dirty="0" smtClean="0">
+                <a:solidFill>
+                  <a:schemeClr val="tx1"/>
+                </a:solidFill>
+                <a:effectLst/>
+                <a:latin typeface="+mn-lt"/>
+                <a:ea typeface="+mn-ea"/>
+                <a:cs typeface="+mn-cs"/>
+              </a:rPr>
+              <a:t>) de las acciones importantes</a:t>
+            </a:r>
+            <a:r>
+              <a:rPr lang="es-AR" sz="1200" kern="1200" dirty="0" smtClean="0">
+                <a:solidFill>
+                  <a:schemeClr val="tx1"/>
+                </a:solidFill>
+                <a:effectLst/>
+                <a:latin typeface="+mn-lt"/>
+                <a:ea typeface="+mn-ea"/>
+                <a:cs typeface="+mn-cs"/>
+              </a:rPr>
+              <a:t> que se hayan definido, </a:t>
             </a:r>
           </a:p>
           <a:p>
@@ -3982,10 +3613,16 @@
                 <a:ea typeface="+mn-ea"/>
                 <a:cs typeface="+mn-cs"/>
               </a:rPr>
-              <a:t>generar </a:t>
-            </a:r>
-            <a:r>
-              <a:rPr lang="es-AR" sz="1200" b="1" kern="1200" dirty="0" smtClean="0">
+              <a:t>vinculación entre las personas y sus accesos </a:t>
+            </a:r>
+          </a:p>
+          <a:p>
+            <a:pPr marL="171450" indent="-171450">
+              <a:buFont typeface="Arial" panose="020B0604020202020204" pitchFamily="34" charset="0"/>
+              <a:buChar char="•"/>
+            </a:pPr>
+            <a:r>
+              <a:rPr lang="es-AR" sz="1200" kern="1200" dirty="0" smtClean="0">
                 <a:solidFill>
                   <a:schemeClr val="tx1"/>
                 </a:solidFill>
@@ -3994,157 +3631,7 @@
                 <a:ea typeface="+mn-ea"/>
                 <a:cs typeface="+mn-cs"/>
               </a:rPr>
-              <a:t>registros (</a:t>
-            </a:r>
-            <a:r>
-              <a:rPr lang="es-AR" sz="1200" b="1" i="1" kern="1200" dirty="0" err="1" smtClean="0">
-                <a:solidFill>
-                  <a:schemeClr val="tx1"/>
-                </a:solidFill>
-                <a:effectLst/>
-                <a:latin typeface="+mn-lt"/>
-                <a:ea typeface="+mn-ea"/>
-                <a:cs typeface="+mn-cs"/>
-              </a:rPr>
-              <a:t>logs</a:t>
-            </a:r>
-            <a:r>
-              <a:rPr lang="es-AR" sz="1200" b="1" kern="1200" dirty="0" smtClean="0">
-                <a:solidFill>
-                  <a:schemeClr val="tx1"/>
-                </a:solidFill>
-                <a:effectLst/>
-                <a:latin typeface="+mn-lt"/>
-                <a:ea typeface="+mn-ea"/>
-                <a:cs typeface="+mn-cs"/>
-              </a:rPr>
-              <a:t>) de las acciones importantes</a:t>
-            </a:r>
-            <a:r>
-              <a:rPr lang="es-AR" sz="1200" kern="1200" dirty="0" smtClean="0">
-                <a:solidFill>
-                  <a:schemeClr val="tx1"/>
-                </a:solidFill>
-                <a:effectLst/>
-                <a:latin typeface="+mn-lt"/>
-                <a:ea typeface="+mn-ea"/>
-                <a:cs typeface="+mn-cs"/>
-              </a:rPr>
-              <a:t> que se hayan definido, </a:t>
-            </a:r>
-            <a:endParaRPr lang="es-AR" sz="1200" kern="1200" dirty="0" smtClean="0">
-              <a:solidFill>
-                <a:schemeClr val="tx1"/>
-              </a:solidFill>
-              <a:effectLst/>
-              <a:latin typeface="+mn-lt"/>
-              <a:ea typeface="+mn-ea"/>
-              <a:cs typeface="+mn-cs"/>
-            </a:endParaRPr>
-          </a:p>
-          <a:p>
-            <a:pPr marL="171450" indent="-171450">
-              <a:buFont typeface="Arial" panose="020B0604020202020204" pitchFamily="34" charset="0"/>
-              <a:buChar char="•"/>
-            </a:pPr>
-            <a:r>
-              <a:rPr lang="es-AR" sz="1200" kern="1200" dirty="0" smtClean="0">
-                <a:solidFill>
-                  <a:schemeClr val="tx1"/>
-                </a:solidFill>
-                <a:effectLst/>
-                <a:latin typeface="+mn-lt"/>
-                <a:ea typeface="+mn-ea"/>
-                <a:cs typeface="+mn-cs"/>
-              </a:rPr>
-              <a:t>vinculación </a:t>
-            </a:r>
-            <a:r>
-              <a:rPr lang="es-AR" sz="1200" kern="1200" dirty="0" smtClean="0">
-                <a:solidFill>
-                  <a:schemeClr val="tx1"/>
-                </a:solidFill>
-                <a:effectLst/>
-                <a:latin typeface="+mn-lt"/>
-                <a:ea typeface="+mn-ea"/>
-                <a:cs typeface="+mn-cs"/>
-              </a:rPr>
-              <a:t>entre las personas y sus accesos </a:t>
-            </a:r>
-            <a:endParaRPr lang="es-AR" sz="1200" kern="1200" dirty="0" smtClean="0">
-              <a:solidFill>
-                <a:schemeClr val="tx1"/>
-              </a:solidFill>
-              <a:effectLst/>
-              <a:latin typeface="+mn-lt"/>
-              <a:ea typeface="+mn-ea"/>
-              <a:cs typeface="+mn-cs"/>
-            </a:endParaRPr>
-          </a:p>
-          <a:p>
-            <a:pPr marL="171450" indent="-171450">
-              <a:buFont typeface="Arial" panose="020B0604020202020204" pitchFamily="34" charset="0"/>
-              <a:buChar char="•"/>
-            </a:pPr>
-            <a:r>
-              <a:rPr lang="es-AR" sz="1200" kern="1200" dirty="0" smtClean="0">
-                <a:solidFill>
-                  <a:schemeClr val="tx1"/>
-                </a:solidFill>
-                <a:effectLst/>
-                <a:latin typeface="+mn-lt"/>
-                <a:ea typeface="+mn-ea"/>
-                <a:cs typeface="+mn-cs"/>
-              </a:rPr>
-              <a:t>puede </a:t>
-            </a:r>
-            <a:r>
-              <a:rPr lang="es-AR" sz="1200" kern="1200" dirty="0" smtClean="0">
-                <a:solidFill>
-                  <a:schemeClr val="tx1"/>
-                </a:solidFill>
-                <a:effectLst/>
-                <a:latin typeface="+mn-lt"/>
-                <a:ea typeface="+mn-ea"/>
-                <a:cs typeface="+mn-cs"/>
-              </a:rPr>
-              <a:t>evitar </a:t>
-            </a:r>
-            <a:r>
-              <a:rPr lang="es-AR" sz="1200" kern="1200" dirty="0" smtClean="0">
-                <a:solidFill>
-                  <a:schemeClr val="tx1"/>
-                </a:solidFill>
-                <a:effectLst/>
-                <a:latin typeface="+mn-lt"/>
-                <a:ea typeface="+mn-ea"/>
-                <a:cs typeface="+mn-cs"/>
-              </a:rPr>
-              <a:t>la fuga de información, ya que en caso de filtrarse hacia el exterior, se podría señalar de manera directa a todos aquellos que tuvieron acceso y se podría analizar su </a:t>
-            </a:r>
-            <a:r>
-              <a:rPr lang="es-AR" sz="1200" kern="1200" dirty="0" smtClean="0">
-                <a:solidFill>
-                  <a:schemeClr val="tx1"/>
-                </a:solidFill>
-                <a:effectLst/>
-                <a:latin typeface="+mn-lt"/>
-                <a:ea typeface="+mn-ea"/>
-                <a:cs typeface="+mn-cs"/>
-              </a:rPr>
-              <a:t>uso previo al incidente, obteniendo posibles conclusiones y </a:t>
-            </a:r>
-            <a:r>
-              <a:rPr lang="es-AR" sz="1200" kern="1200" dirty="0" smtClean="0">
-                <a:solidFill>
-                  <a:schemeClr val="tx1"/>
-                </a:solidFill>
-                <a:effectLst/>
-                <a:latin typeface="+mn-lt"/>
-                <a:ea typeface="+mn-ea"/>
-                <a:cs typeface="+mn-cs"/>
-              </a:rPr>
-              <a:t>responsables</a:t>
+              <a:t>puede evitar la fuga de información, ya que en caso de filtrarse hacia el exterior, se podría señalar de manera directa a todos aquellos que tuvieron acceso y se podría analizar su uso previo al incidente, obteniendo posibles conclusiones y responsables</a:t>
             </a:r>
           </a:p>
           <a:p>
@@ -4200,8 +3687,14 @@
                 <a:ea typeface="+mn-ea"/>
                 <a:cs typeface="+mn-cs"/>
               </a:rPr>
-              <a:t>de </a:t>
-            </a:r>
+              <a:t>de alcance internacional, y normativas vinculadas a lo que se quiera organizar. </a:t>
+            </a:r>
+          </a:p>
+          <a:p>
+            <a:pPr marL="171450" indent="-171450">
+              <a:buFont typeface="Arial" panose="020B0604020202020204" pitchFamily="34" charset="0"/>
+              <a:buChar char="•"/>
+            </a:pPr>
             <a:r>
               <a:rPr lang="es-AR" sz="1200" kern="1200" dirty="0" smtClean="0">
                 <a:solidFill>
@@ -4212,17 +3705,8 @@
                 <a:ea typeface="+mn-ea"/>
                 <a:cs typeface="+mn-cs"/>
               </a:rPr>
-              <a:t>alcance internacional, y normativas vinculadas a lo que se quiera organizar. </a:t>
-            </a:r>
-            <a:endParaRPr lang="es-AR" sz="1200" kern="1200" dirty="0" smtClean="0">
-              <a:solidFill>
-                <a:schemeClr val="tx1"/>
-              </a:solidFill>
-              <a:effectLst/>
-              <a:latin typeface="+mn-lt"/>
-              <a:ea typeface="+mn-ea"/>
-              <a:cs typeface="+mn-cs"/>
-            </a:endParaRPr>
+              <a:t>La fuga de información está contemplada dentro de la gestión de la seguridad, y como tal se describen contramedidas y técnicas en distintos estándares. </a:t>
+            </a:r>
           </a:p>
           <a:p>
             <a:pPr marL="171450" indent="-171450">
@@ -4239,8 +3723,14 @@
                 <a:ea typeface="+mn-ea"/>
                 <a:cs typeface="+mn-cs"/>
               </a:rPr>
-              <a:t>La </a:t>
-            </a:r>
+              <a:t>normas ISO 27000, que está especialmente dedicada a seguridad de la información</a:t>
+            </a:r>
+          </a:p>
+          <a:p>
+            <a:pPr marL="628650" lvl="1" indent="-171450">
+              <a:buFont typeface="Arial" panose="020B0604020202020204" pitchFamily="34" charset="0"/>
+              <a:buChar char="•"/>
+            </a:pPr>
             <a:r>
               <a:rPr lang="es-AR" sz="1200" kern="1200" dirty="0" smtClean="0">
                 <a:solidFill>
@@ -4251,20 +3741,11 @@
                 <a:ea typeface="+mn-ea"/>
                 <a:cs typeface="+mn-cs"/>
               </a:rPr>
-              <a:t>fuga de información está contemplada dentro de la gestión de la seguridad, y como tal se describen contramedidas y técnicas en distintos estándares. </a:t>
-            </a:r>
-            <a:endParaRPr lang="es-AR" sz="1200" kern="1200" dirty="0" smtClean="0">
-              <a:solidFill>
-                <a:schemeClr val="tx1"/>
-              </a:solidFill>
-              <a:effectLst/>
-              <a:latin typeface="+mn-lt"/>
-              <a:ea typeface="+mn-ea"/>
-              <a:cs typeface="+mn-cs"/>
-            </a:endParaRPr>
-          </a:p>
-          <a:p>
-            <a:pPr marL="171450" indent="-171450">
+              <a:t>27001, requisitos para implementar un sistema de gestión de seguridad,</a:t>
+            </a:r>
+          </a:p>
+          <a:p>
+            <a:pPr marL="628650" lvl="1" indent="-171450">
               <a:buFont typeface="Arial" panose="020B0604020202020204" pitchFamily="34" charset="0"/>
               <a:buChar char="•"/>
             </a:pPr>
@@ -4278,8 +3759,14 @@
                 <a:ea typeface="+mn-ea"/>
                 <a:cs typeface="+mn-cs"/>
               </a:rPr>
-              <a:t>normas </a:t>
-            </a:r>
+              <a:t>27002 define las mejores prácticas</a:t>
+            </a:r>
+          </a:p>
+          <a:p>
+            <a:pPr marL="628650" lvl="1" indent="-171450">
+              <a:buFont typeface="Arial" panose="020B0604020202020204" pitchFamily="34" charset="0"/>
+              <a:buChar char="•"/>
+            </a:pPr>
             <a:r>
               <a:rPr lang="es-AR" sz="1200" kern="1200" dirty="0" smtClean="0">
                 <a:solidFill>
@@ -4290,8 +3777,14 @@
                 <a:ea typeface="+mn-ea"/>
                 <a:cs typeface="+mn-cs"/>
               </a:rPr>
-              <a:t>ISO 27000, que está especialmente dedicada a seguridad de la </a:t>
-            </a:r>
+              <a:t>27004 métricas</a:t>
+            </a:r>
+          </a:p>
+          <a:p>
+            <a:pPr marL="628650" lvl="1" indent="-171450">
+              <a:buFont typeface="Arial" panose="020B0604020202020204" pitchFamily="34" charset="0"/>
+              <a:buChar char="•"/>
+            </a:pPr>
             <a:r>
               <a:rPr lang="es-AR" sz="1200" kern="1200" dirty="0" smtClean="0">
                 <a:solidFill>
@@ -4302,175 +3795,7 @@
                 <a:ea typeface="+mn-ea"/>
                 <a:cs typeface="+mn-cs"/>
               </a:rPr>
-              <a:t>información</a:t>
-            </a:r>
-          </a:p>
-          <a:p>
-            <a:pPr marL="628650" lvl="1" indent="-171450">
-              <a:buFont typeface="Arial" panose="020B0604020202020204" pitchFamily="34" charset="0"/>
-              <a:buChar char="•"/>
-            </a:pPr>
-            <a:r>
-              <a:rPr lang="es-AR" sz="1200" kern="1200" dirty="0" smtClean="0">
-                <a:solidFill>
-                  <a:schemeClr val="tx1"/>
-                </a:solidFill>
-                <a:effectLst/>
-                <a:latin typeface="+mn-lt"/>
-                <a:ea typeface="+mn-ea"/>
-                <a:cs typeface="+mn-cs"/>
-              </a:rPr>
-              <a:t>27001</a:t>
-            </a:r>
-            <a:r>
-              <a:rPr lang="es-AR" sz="1200" kern="1200" dirty="0" smtClean="0">
-                <a:solidFill>
-                  <a:schemeClr val="tx1"/>
-                </a:solidFill>
-                <a:effectLst/>
-                <a:latin typeface="+mn-lt"/>
-                <a:ea typeface="+mn-ea"/>
-                <a:cs typeface="+mn-cs"/>
-              </a:rPr>
-              <a:t>, </a:t>
-            </a:r>
-            <a:r>
-              <a:rPr lang="es-AR" sz="1200" kern="1200" dirty="0" smtClean="0">
-                <a:solidFill>
-                  <a:schemeClr val="tx1"/>
-                </a:solidFill>
-                <a:effectLst/>
-                <a:latin typeface="+mn-lt"/>
-                <a:ea typeface="+mn-ea"/>
-                <a:cs typeface="+mn-cs"/>
-              </a:rPr>
-              <a:t>requisitos </a:t>
-            </a:r>
-            <a:r>
-              <a:rPr lang="es-AR" sz="1200" kern="1200" dirty="0" smtClean="0">
-                <a:solidFill>
-                  <a:schemeClr val="tx1"/>
-                </a:solidFill>
-                <a:effectLst/>
-                <a:latin typeface="+mn-lt"/>
-                <a:ea typeface="+mn-ea"/>
-                <a:cs typeface="+mn-cs"/>
-              </a:rPr>
-              <a:t>para implementar un sistema de gestión de seguridad</a:t>
-            </a:r>
-            <a:r>
-              <a:rPr lang="es-AR" sz="1200" kern="1200" dirty="0" smtClean="0">
-                <a:solidFill>
-                  <a:schemeClr val="tx1"/>
-                </a:solidFill>
-                <a:effectLst/>
-                <a:latin typeface="+mn-lt"/>
-                <a:ea typeface="+mn-ea"/>
-                <a:cs typeface="+mn-cs"/>
-              </a:rPr>
-              <a:t>,</a:t>
-            </a:r>
-          </a:p>
-          <a:p>
-            <a:pPr marL="628650" lvl="1" indent="-171450">
-              <a:buFont typeface="Arial" panose="020B0604020202020204" pitchFamily="34" charset="0"/>
-              <a:buChar char="•"/>
-            </a:pPr>
-            <a:r>
-              <a:rPr lang="es-AR" sz="1200" kern="1200" dirty="0" smtClean="0">
-                <a:solidFill>
-                  <a:schemeClr val="tx1"/>
-                </a:solidFill>
-                <a:effectLst/>
-                <a:latin typeface="+mn-lt"/>
-                <a:ea typeface="+mn-ea"/>
-                <a:cs typeface="+mn-cs"/>
-              </a:rPr>
-              <a:t>27002 define </a:t>
-            </a:r>
-            <a:r>
-              <a:rPr lang="es-AR" sz="1200" kern="1200" dirty="0" smtClean="0">
-                <a:solidFill>
-                  <a:schemeClr val="tx1"/>
-                </a:solidFill>
-                <a:effectLst/>
-                <a:latin typeface="+mn-lt"/>
-                <a:ea typeface="+mn-ea"/>
-                <a:cs typeface="+mn-cs"/>
-              </a:rPr>
-              <a:t>las mejores </a:t>
-            </a:r>
-            <a:r>
-              <a:rPr lang="es-AR" sz="1200" kern="1200" dirty="0" smtClean="0">
-                <a:solidFill>
-                  <a:schemeClr val="tx1"/>
-                </a:solidFill>
-                <a:effectLst/>
-                <a:latin typeface="+mn-lt"/>
-                <a:ea typeface="+mn-ea"/>
-                <a:cs typeface="+mn-cs"/>
-              </a:rPr>
-              <a:t>prácticas</a:t>
-            </a:r>
-          </a:p>
-          <a:p>
-            <a:pPr marL="628650" lvl="1" indent="-171450">
-              <a:buFont typeface="Arial" panose="020B0604020202020204" pitchFamily="34" charset="0"/>
-              <a:buChar char="•"/>
-            </a:pPr>
-            <a:r>
-              <a:rPr lang="es-AR" sz="1200" kern="1200" dirty="0" smtClean="0">
-                <a:solidFill>
-                  <a:schemeClr val="tx1"/>
-                </a:solidFill>
-                <a:effectLst/>
-                <a:latin typeface="+mn-lt"/>
-                <a:ea typeface="+mn-ea"/>
-                <a:cs typeface="+mn-cs"/>
-              </a:rPr>
-              <a:t>27004 métricas</a:t>
-            </a:r>
-          </a:p>
-          <a:p>
-            <a:pPr marL="628650" lvl="1" indent="-171450">
-              <a:buFont typeface="Arial" panose="020B0604020202020204" pitchFamily="34" charset="0"/>
-              <a:buChar char="•"/>
-            </a:pPr>
-            <a:r>
-              <a:rPr lang="es-AR" sz="1200" kern="1200" dirty="0" smtClean="0">
-                <a:solidFill>
-                  <a:schemeClr val="tx1"/>
-                </a:solidFill>
-                <a:effectLst/>
-                <a:latin typeface="+mn-lt"/>
-                <a:ea typeface="+mn-ea"/>
-                <a:cs typeface="+mn-cs"/>
-              </a:rPr>
-              <a:t>27005 gestión </a:t>
-            </a:r>
-            <a:r>
-              <a:rPr lang="es-AR" sz="1200" kern="1200" dirty="0" smtClean="0">
-                <a:solidFill>
-                  <a:schemeClr val="tx1"/>
-                </a:solidFill>
-                <a:effectLst/>
-                <a:latin typeface="+mn-lt"/>
-                <a:ea typeface="+mn-ea"/>
-                <a:cs typeface="+mn-cs"/>
-              </a:rPr>
-              <a:t>de riesgos, entre </a:t>
-            </a:r>
-            <a:r>
-              <a:rPr lang="es-AR" sz="1200" kern="1200" dirty="0" smtClean="0">
-                <a:solidFill>
-                  <a:schemeClr val="tx1"/>
-                </a:solidFill>
-                <a:effectLst/>
-                <a:latin typeface="+mn-lt"/>
-                <a:ea typeface="+mn-ea"/>
-                <a:cs typeface="+mn-cs"/>
-              </a:rPr>
-              <a:t>otras</a:t>
+              <a:t>27005 gestión de riesgos, entre otras</a:t>
             </a:r>
             <a:endParaRPr lang="en-US" sz="1200" kern="1200" dirty="0" smtClean="0">
               <a:solidFill>
@@ -4626,8 +3951,14 @@
                 <a:ea typeface="+mn-ea"/>
                 <a:cs typeface="+mn-cs"/>
               </a:rPr>
-              <a:t>se </a:t>
-            </a:r>
+              <a:t>se aplica a empresas comerciales, particularmente tecnológicas. </a:t>
+            </a:r>
+          </a:p>
+          <a:p>
+            <a:pPr marL="171450" indent="-171450">
+              <a:buFont typeface="Arial" panose="020B0604020202020204" pitchFamily="34" charset="0"/>
+              <a:buChar char="•"/>
+            </a:pPr>
             <a:r>
               <a:rPr lang="es-AR" sz="1200" kern="1200" dirty="0" smtClean="0">
                 <a:solidFill>
@@ -4638,46 +3969,7 @@
                 <a:ea typeface="+mn-ea"/>
                 <a:cs typeface="+mn-cs"/>
               </a:rPr>
-              <a:t>aplica a empresas comerciales, particularmente tecnológicas. </a:t>
-            </a:r>
-            <a:endParaRPr lang="es-AR" sz="1200" kern="1200" dirty="0" smtClean="0">
-              <a:solidFill>
-                <a:schemeClr val="tx1"/>
-              </a:solidFill>
-              <a:effectLst/>
-              <a:latin typeface="+mn-lt"/>
-              <a:ea typeface="+mn-ea"/>
-              <a:cs typeface="+mn-cs"/>
-            </a:endParaRPr>
-          </a:p>
-          <a:p>
-            <a:pPr marL="171450" indent="-171450">
-              <a:buFont typeface="Arial" panose="020B0604020202020204" pitchFamily="34" charset="0"/>
-              <a:buChar char="•"/>
-            </a:pPr>
-            <a:r>
-              <a:rPr lang="es-AR" sz="1200" kern="1200" dirty="0" smtClean="0">
-                <a:solidFill>
-                  <a:schemeClr val="tx1"/>
-                </a:solidFill>
-                <a:effectLst/>
-                <a:latin typeface="+mn-lt"/>
-                <a:ea typeface="+mn-ea"/>
-                <a:cs typeface="+mn-cs"/>
-              </a:rPr>
-              <a:t>nombres </a:t>
-            </a:r>
-            <a:r>
-              <a:rPr lang="es-AR" sz="1200" kern="1200" dirty="0" smtClean="0">
-                <a:solidFill>
-                  <a:schemeClr val="tx1"/>
-                </a:solidFill>
-                <a:effectLst/>
-                <a:latin typeface="+mn-lt"/>
-                <a:ea typeface="+mn-ea"/>
-                <a:cs typeface="+mn-cs"/>
-              </a:rPr>
-              <a:t>clave para los productos que están en fase de desarrollo y aún no se han lanzado al mercado. </a:t>
+              <a:t>nombres clave para los productos que están en fase de desarrollo y aún no se han lanzado al mercado. </a:t>
             </a:r>
             <a:endParaRPr lang="en-US" sz="1200" kern="1200" dirty="0" smtClean="0">
               <a:solidFill>
@@ -4704,8 +3996,14 @@
                 <a:ea typeface="+mn-ea"/>
                 <a:cs typeface="+mn-cs"/>
               </a:rPr>
-              <a:t>Permiten </a:t>
-            </a:r>
+              <a:t>Permiten a los trabajadores de dichos productos hablar sobre los mismos sin revelar de qué se trata a terceros. </a:t>
+            </a:r>
+          </a:p>
+          <a:p>
+            <a:pPr marL="171450" indent="-171450">
+              <a:buFont typeface="Arial" panose="020B0604020202020204" pitchFamily="34" charset="0"/>
+              <a:buChar char="•"/>
+            </a:pPr>
             <a:r>
               <a:rPr lang="es-AR" sz="1200" u="none" strike="noStrike" kern="1200" dirty="0" smtClean="0">
                 <a:solidFill>
@@ -4716,46 +4014,7 @@
                 <a:ea typeface="+mn-ea"/>
                 <a:cs typeface="+mn-cs"/>
               </a:rPr>
-              <a:t>a los trabajadores de dichos productos hablar sobre los mismos sin revelar de qué se trata a terceros. </a:t>
-            </a:r>
-            <a:endParaRPr lang="es-AR" sz="1200" u="none" strike="noStrike" kern="1200" dirty="0" smtClean="0">
-              <a:solidFill>
-                <a:schemeClr val="tx1"/>
-              </a:solidFill>
-              <a:effectLst/>
-              <a:latin typeface="+mn-lt"/>
-              <a:ea typeface="+mn-ea"/>
-              <a:cs typeface="+mn-cs"/>
-            </a:endParaRPr>
-          </a:p>
-          <a:p>
-            <a:pPr marL="171450" indent="-171450">
-              <a:buFont typeface="Arial" panose="020B0604020202020204" pitchFamily="34" charset="0"/>
-              <a:buChar char="•"/>
-            </a:pPr>
-            <a:r>
-              <a:rPr lang="es-AR" sz="1200" u="none" strike="noStrike" kern="1200" dirty="0" smtClean="0">
-                <a:solidFill>
-                  <a:schemeClr val="tx1"/>
-                </a:solidFill>
-                <a:effectLst/>
-                <a:latin typeface="+mn-lt"/>
-                <a:ea typeface="+mn-ea"/>
-                <a:cs typeface="+mn-cs"/>
-              </a:rPr>
-              <a:t>se </a:t>
-            </a:r>
-            <a:r>
-              <a:rPr lang="es-AR" sz="1200" u="none" strike="noStrike" kern="1200" dirty="0" smtClean="0">
-                <a:solidFill>
-                  <a:schemeClr val="tx1"/>
-                </a:solidFill>
-                <a:effectLst/>
-                <a:latin typeface="+mn-lt"/>
-                <a:ea typeface="+mn-ea"/>
-                <a:cs typeface="+mn-cs"/>
-              </a:rPr>
-              <a:t>obliga a enfocarse en el producto y prevenir la generación de asociaciones basándose en el nombre.</a:t>
+              <a:t>se obliga a enfocarse en el producto y prevenir la generación de asociaciones basándose en el nombre.</a:t>
             </a:r>
             <a:endParaRPr lang="en-US" u="none" strike="noStrike" dirty="0" smtClean="0">
               <a:effectLst/>
@@ -9220,14 +8479,12 @@
           </a:p>
           <a:p>
             <a:r>
-              <a:rPr lang="es-AR" dirty="0" smtClean="0">
-                <a:latin typeface="Segoe UI" panose="020B0502040204020203" pitchFamily="34" charset="0"/>
-                <a:cs typeface="Segoe UI" panose="020B0502040204020203" pitchFamily="34" charset="0"/>
-              </a:rPr>
-              <a:t>Iluminismo y doctrinas gnósticas</a:t>
-            </a:r>
-          </a:p>
-          <a:p>
+              <a:rPr lang="es-AR" smtClean="0">
+                <a:latin typeface="Segoe UI" panose="020B0502040204020203" pitchFamily="34" charset="0"/>
+                <a:cs typeface="Segoe UI" panose="020B0502040204020203" pitchFamily="34" charset="0"/>
+              </a:rPr>
+              <a:t>Iluminismo</a:t>
+            </a:r>
             <a:endParaRPr lang="es-AR" dirty="0">
               <a:latin typeface="Segoe UI" panose="020B0502040204020203" pitchFamily="34" charset="0"/>
               <a:cs typeface="Segoe UI" panose="020B0502040204020203" pitchFamily="34" charset="0"/>
@@ -13813,21 +13070,7 @@
                 <a:latin typeface="Segoe UI" panose="020B0502040204020203" pitchFamily="34" charset="0"/>
                 <a:cs typeface="Segoe UI" panose="020B0502040204020203" pitchFamily="34" charset="0"/>
               </a:rPr>
-              <a:t>Normas ISO </a:t>
-            </a:r>
-            <a:r>
-              <a:rPr lang="es-AR" sz="1800" dirty="0" smtClean="0">
-                <a:latin typeface="Segoe UI" panose="020B0502040204020203" pitchFamily="34" charset="0"/>
-                <a:cs typeface="Segoe UI" panose="020B0502040204020203" pitchFamily="34" charset="0"/>
-              </a:rPr>
-              <a:t>27000</a:t>
-            </a:r>
-            <a:r>
-              <a:rPr lang="es-AR" sz="1800" dirty="0" smtClean="0">
-                <a:latin typeface="Segoe UI" panose="020B0502040204020203" pitchFamily="34" charset="0"/>
-                <a:cs typeface="Segoe UI" panose="020B0502040204020203" pitchFamily="34" charset="0"/>
-              </a:rPr>
-              <a:t>, especialmente </a:t>
+              <a:t>Normas ISO 27000, especialmente </a:t>
             </a:r>
             <a:r>
               <a:rPr lang="es-AR" sz="1800" dirty="0">

</xml_diff>

<commit_message>
Agrego correcciones vilma, cambio un slide de la ppt, cambios menores al informe
</commit_message>
<xml_diff>
--- a/Presentacion/Fuga de Información.pptx
+++ b/Presentacion/Fuga de Información.pptx
@@ -158,7 +158,7 @@
   </p:defaultTextStyle>
   <p:extLst>
     <p:ext uri="{EFAFB233-063F-42B5-8137-9DF3F51BA10A}">
-      <p15:sldGuideLst xmlns:p15="http://schemas.microsoft.com/office/powerpoint/2012/main" xmlns="">
+      <p15:sldGuideLst xmlns:p15="http://schemas.microsoft.com/office/powerpoint/2012/main">
         <p15:guide id="1" pos="3839" userDrawn="1">
           <p15:clr>
             <a:srgbClr val="A4A3A4"/>
@@ -172,7 +172,7 @@
       </p15:sldGuideLst>
     </p:ext>
     <p:ext uri="{2D200454-40CA-4A62-9FC3-DE9A4176ACB9}">
-      <p15:notesGuideLst xmlns:p15="http://schemas.microsoft.com/office/powerpoint/2012/main" xmlns=""/>
+      <p15:notesGuideLst xmlns:p15="http://schemas.microsoft.com/office/powerpoint/2012/main"/>
     </p:ext>
   </p:extLst>
 </p:presentation>
@@ -261,7 +261,7 @@
             <a:fld id="{59088EAF-6ECA-4616-85EF-35AA19C641F3}" type="datetimeFigureOut">
               <a:rPr lang="en-US"/>
               <a:pPr/>
-              <a:t>11/10/2014</a:t>
+              <a:t>11/16/2014</a:t>
             </a:fld>
             <a:endParaRPr/>
           </a:p>
@@ -328,7 +328,7 @@
             <a:fld id="{D9F912AB-2776-42F2-A957-313FC7EFEDB9}" type="slidenum">
               <a:rPr/>
               <a:pPr/>
-              <a:t>‹Nº›</a:t>
+              <a:t>‹#›</a:t>
             </a:fld>
             <a:endParaRPr/>
           </a:p>
@@ -337,7 +337,7 @@
     </p:spTree>
     <p:extLst>
       <p:ext uri="{BB962C8B-B14F-4D97-AF65-F5344CB8AC3E}">
-        <p14:creationId xmlns:p14="http://schemas.microsoft.com/office/powerpoint/2010/main" xmlns="" val="3932065745"/>
+        <p14:creationId xmlns:p14="http://schemas.microsoft.com/office/powerpoint/2010/main" val="3932065745"/>
       </p:ext>
     </p:extLst>
   </p:cSld>
@@ -428,7 +428,7 @@
             <a:fld id="{3ABD2D7A-D230-4F91-BD59-0A39C2703BA8}" type="datetimeFigureOut">
               <a:rPr lang="en-US"/>
               <a:pPr/>
-              <a:t>11/10/2014</a:t>
+              <a:t>11/16/2014</a:t>
             </a:fld>
             <a:endParaRPr/>
           </a:p>
@@ -587,7 +587,7 @@
             <a:fld id="{F93199CD-3E1B-4AE6-990F-76F925F5EA9F}" type="slidenum">
               <a:rPr/>
               <a:pPr/>
-              <a:t>‹Nº›</a:t>
+              <a:t>‹#›</a:t>
             </a:fld>
             <a:endParaRPr/>
           </a:p>
@@ -596,7 +596,7 @@
     </p:spTree>
     <p:extLst>
       <p:ext uri="{BB962C8B-B14F-4D97-AF65-F5344CB8AC3E}">
-        <p14:creationId xmlns:p14="http://schemas.microsoft.com/office/powerpoint/2010/main" xmlns="" val="4276579820"/>
+        <p14:creationId xmlns:p14="http://schemas.microsoft.com/office/powerpoint/2010/main" val="4276579820"/>
       </p:ext>
     </p:extLst>
   </p:cSld>
@@ -1091,7 +1091,7 @@
     </p:spTree>
     <p:extLst>
       <p:ext uri="{BB962C8B-B14F-4D97-AF65-F5344CB8AC3E}">
-        <p14:creationId xmlns:p14="http://schemas.microsoft.com/office/powerpoint/2010/main" xmlns="" val="246766428"/>
+        <p14:creationId xmlns:p14="http://schemas.microsoft.com/office/powerpoint/2010/main" val="246766428"/>
       </p:ext>
     </p:extLst>
   </p:cSld>
@@ -1176,7 +1176,7 @@
     </p:spTree>
     <p:extLst>
       <p:ext uri="{BB962C8B-B14F-4D97-AF65-F5344CB8AC3E}">
-        <p14:creationId xmlns:p14="http://schemas.microsoft.com/office/powerpoint/2010/main" xmlns="" val="1554195"/>
+        <p14:creationId xmlns:p14="http://schemas.microsoft.com/office/powerpoint/2010/main" val="1554195"/>
       </p:ext>
     </p:extLst>
   </p:cSld>
@@ -1261,7 +1261,7 @@
     </p:spTree>
     <p:extLst>
       <p:ext uri="{BB962C8B-B14F-4D97-AF65-F5344CB8AC3E}">
-        <p14:creationId xmlns:p14="http://schemas.microsoft.com/office/powerpoint/2010/main" xmlns="" val="2425724269"/>
+        <p14:creationId xmlns:p14="http://schemas.microsoft.com/office/powerpoint/2010/main" val="2425724269"/>
       </p:ext>
     </p:extLst>
   </p:cSld>
@@ -1346,7 +1346,7 @@
     </p:spTree>
     <p:extLst>
       <p:ext uri="{BB962C8B-B14F-4D97-AF65-F5344CB8AC3E}">
-        <p14:creationId xmlns:p14="http://schemas.microsoft.com/office/powerpoint/2010/main" xmlns="" val="913013488"/>
+        <p14:creationId xmlns:p14="http://schemas.microsoft.com/office/powerpoint/2010/main" val="913013488"/>
       </p:ext>
     </p:extLst>
   </p:cSld>
@@ -1431,7 +1431,7 @@
     </p:spTree>
     <p:extLst>
       <p:ext uri="{BB962C8B-B14F-4D97-AF65-F5344CB8AC3E}">
-        <p14:creationId xmlns:p14="http://schemas.microsoft.com/office/powerpoint/2010/main" xmlns="" val="3326557915"/>
+        <p14:creationId xmlns:p14="http://schemas.microsoft.com/office/powerpoint/2010/main" val="3326557915"/>
       </p:ext>
     </p:extLst>
   </p:cSld>
@@ -1516,7 +1516,7 @@
     </p:spTree>
     <p:extLst>
       <p:ext uri="{BB962C8B-B14F-4D97-AF65-F5344CB8AC3E}">
-        <p14:creationId xmlns:p14="http://schemas.microsoft.com/office/powerpoint/2010/main" xmlns="" val="3460376957"/>
+        <p14:creationId xmlns:p14="http://schemas.microsoft.com/office/powerpoint/2010/main" val="3460376957"/>
       </p:ext>
     </p:extLst>
   </p:cSld>
@@ -1601,7 +1601,7 @@
     </p:spTree>
     <p:extLst>
       <p:ext uri="{BB962C8B-B14F-4D97-AF65-F5344CB8AC3E}">
-        <p14:creationId xmlns:p14="http://schemas.microsoft.com/office/powerpoint/2010/main" xmlns="" val="4202137938"/>
+        <p14:creationId xmlns:p14="http://schemas.microsoft.com/office/powerpoint/2010/main" val="4202137938"/>
       </p:ext>
     </p:extLst>
   </p:cSld>
@@ -1686,7 +1686,7 @@
     </p:spTree>
     <p:extLst>
       <p:ext uri="{BB962C8B-B14F-4D97-AF65-F5344CB8AC3E}">
-        <p14:creationId xmlns:p14="http://schemas.microsoft.com/office/powerpoint/2010/main" xmlns="" val="2586394931"/>
+        <p14:creationId xmlns:p14="http://schemas.microsoft.com/office/powerpoint/2010/main" val="2586394931"/>
       </p:ext>
     </p:extLst>
   </p:cSld>
@@ -1771,7 +1771,7 @@
     </p:spTree>
     <p:extLst>
       <p:ext uri="{BB962C8B-B14F-4D97-AF65-F5344CB8AC3E}">
-        <p14:creationId xmlns:p14="http://schemas.microsoft.com/office/powerpoint/2010/main" xmlns="" val="1362585539"/>
+        <p14:creationId xmlns:p14="http://schemas.microsoft.com/office/powerpoint/2010/main" val="1362585539"/>
       </p:ext>
     </p:extLst>
   </p:cSld>
@@ -1856,7 +1856,7 @@
     </p:spTree>
     <p:extLst>
       <p:ext uri="{BB962C8B-B14F-4D97-AF65-F5344CB8AC3E}">
-        <p14:creationId xmlns:p14="http://schemas.microsoft.com/office/powerpoint/2010/main" xmlns="" val="1362585539"/>
+        <p14:creationId xmlns:p14="http://schemas.microsoft.com/office/powerpoint/2010/main" val="1362585539"/>
       </p:ext>
     </p:extLst>
   </p:cSld>
@@ -2466,7 +2466,7 @@
     </p:spTree>
     <p:extLst>
       <p:ext uri="{BB962C8B-B14F-4D97-AF65-F5344CB8AC3E}">
-        <p14:creationId xmlns:p14="http://schemas.microsoft.com/office/powerpoint/2010/main" xmlns="" val="3805029774"/>
+        <p14:creationId xmlns:p14="http://schemas.microsoft.com/office/powerpoint/2010/main" val="3805029774"/>
       </p:ext>
     </p:extLst>
   </p:cSld>
@@ -2729,7 +2729,7 @@
     </p:spTree>
     <p:extLst>
       <p:ext uri="{BB962C8B-B14F-4D97-AF65-F5344CB8AC3E}">
-        <p14:creationId xmlns:p14="http://schemas.microsoft.com/office/powerpoint/2010/main" xmlns="" val="655676726"/>
+        <p14:creationId xmlns:p14="http://schemas.microsoft.com/office/powerpoint/2010/main" val="655676726"/>
       </p:ext>
     </p:extLst>
   </p:cSld>
@@ -2998,7 +2998,7 @@
     </p:spTree>
     <p:extLst>
       <p:ext uri="{BB962C8B-B14F-4D97-AF65-F5344CB8AC3E}">
-        <p14:creationId xmlns:p14="http://schemas.microsoft.com/office/powerpoint/2010/main" xmlns="" val="1629614161"/>
+        <p14:creationId xmlns:p14="http://schemas.microsoft.com/office/powerpoint/2010/main" val="1629614161"/>
       </p:ext>
     </p:extLst>
   </p:cSld>
@@ -3587,7 +3587,7 @@
     </p:spTree>
     <p:extLst>
       <p:ext uri="{BB962C8B-B14F-4D97-AF65-F5344CB8AC3E}">
-        <p14:creationId xmlns:p14="http://schemas.microsoft.com/office/powerpoint/2010/main" xmlns="" val="2488318766"/>
+        <p14:creationId xmlns:p14="http://schemas.microsoft.com/office/powerpoint/2010/main" val="2488318766"/>
       </p:ext>
     </p:extLst>
   </p:cSld>
@@ -4260,7 +4260,7 @@
     </p:spTree>
     <p:extLst>
       <p:ext uri="{BB962C8B-B14F-4D97-AF65-F5344CB8AC3E}">
-        <p14:creationId xmlns:p14="http://schemas.microsoft.com/office/powerpoint/2010/main" xmlns="" val="707643668"/>
+        <p14:creationId xmlns:p14="http://schemas.microsoft.com/office/powerpoint/2010/main" val="707643668"/>
       </p:ext>
     </p:extLst>
   </p:cSld>
@@ -4467,20 +4467,20 @@
     </p:spTree>
     <p:extLst>
       <p:ext uri="{BB962C8B-B14F-4D97-AF65-F5344CB8AC3E}">
-        <p14:creationId xmlns:p14="http://schemas.microsoft.com/office/powerpoint/2010/main" xmlns="" val="94999051"/>
+        <p14:creationId xmlns:p14="http://schemas.microsoft.com/office/powerpoint/2010/main" val="94999051"/>
       </p:ext>
     </p:extLst>
   </p:cSld>
   <p:clrMapOvr>
     <a:masterClrMapping/>
   </p:clrMapOvr>
-  <mc:AlternateContent xmlns:mc="http://schemas.openxmlformats.org/markup-compatibility/2006">
-    <mc:Choice xmlns:p14="http://schemas.microsoft.com/office/powerpoint/2010/main" xmlns="" Requires="p14">
+  <mc:AlternateContent xmlns:mc="http://schemas.openxmlformats.org/markup-compatibility/2006" xmlns:p14="http://schemas.microsoft.com/office/powerpoint/2010/main">
+    <mc:Choice Requires="p14">
       <p:transition spd="med" p14:dur="700">
         <p:fade/>
       </p:transition>
     </mc:Choice>
-    <mc:Fallback>
+    <mc:Fallback xmlns="">
       <p:transition spd="med">
         <p:fade/>
       </p:transition>
@@ -4606,7 +4606,7 @@
             <a:fld id="{03F41C87-7AD9-4845-A077-840E4A0F3F06}" type="datetimeFigureOut">
               <a:rPr lang="en-US"/>
               <a:pPr/>
-              <a:t>11/10/2014</a:t>
+              <a:t>11/16/2014</a:t>
             </a:fld>
             <a:endParaRPr/>
           </a:p>
@@ -4649,7 +4649,7 @@
             <a:fld id="{2A013F82-EE5E-44EE-A61D-E31C6657F26F}" type="slidenum">
               <a:rPr/>
               <a:pPr/>
-              <a:t>‹Nº›</a:t>
+              <a:t>‹#›</a:t>
             </a:fld>
             <a:endParaRPr/>
           </a:p>
@@ -4658,20 +4658,20 @@
     </p:spTree>
     <p:extLst>
       <p:ext uri="{BB962C8B-B14F-4D97-AF65-F5344CB8AC3E}">
-        <p14:creationId xmlns:p14="http://schemas.microsoft.com/office/powerpoint/2010/main" xmlns="" val="460095310"/>
+        <p14:creationId xmlns:p14="http://schemas.microsoft.com/office/powerpoint/2010/main" val="460095310"/>
       </p:ext>
     </p:extLst>
   </p:cSld>
   <p:clrMapOvr>
     <a:masterClrMapping/>
   </p:clrMapOvr>
-  <mc:AlternateContent xmlns:mc="http://schemas.openxmlformats.org/markup-compatibility/2006">
-    <mc:Choice xmlns:p14="http://schemas.microsoft.com/office/powerpoint/2010/main" xmlns="" Requires="p14">
+  <mc:AlternateContent xmlns:mc="http://schemas.openxmlformats.org/markup-compatibility/2006" xmlns:p14="http://schemas.microsoft.com/office/powerpoint/2010/main">
+    <mc:Choice Requires="p14">
       <p:transition spd="med" p14:dur="700">
         <p:fade/>
       </p:transition>
     </mc:Choice>
-    <mc:Fallback>
+    <mc:Fallback xmlns="">
       <p:transition spd="med">
         <p:fade/>
       </p:transition>
@@ -4807,7 +4807,7 @@
             <a:fld id="{03F41C87-7AD9-4845-A077-840E4A0F3F06}" type="datetimeFigureOut">
               <a:rPr lang="en-US"/>
               <a:pPr/>
-              <a:t>11/10/2014</a:t>
+              <a:t>11/16/2014</a:t>
             </a:fld>
             <a:endParaRPr/>
           </a:p>
@@ -4850,7 +4850,7 @@
             <a:fld id="{2A013F82-EE5E-44EE-A61D-E31C6657F26F}" type="slidenum">
               <a:rPr/>
               <a:pPr/>
-              <a:t>‹Nº›</a:t>
+              <a:t>‹#›</a:t>
             </a:fld>
             <a:endParaRPr/>
           </a:p>
@@ -4859,20 +4859,20 @@
     </p:spTree>
     <p:extLst>
       <p:ext uri="{BB962C8B-B14F-4D97-AF65-F5344CB8AC3E}">
-        <p14:creationId xmlns:p14="http://schemas.microsoft.com/office/powerpoint/2010/main" xmlns="" val="4079035419"/>
+        <p14:creationId xmlns:p14="http://schemas.microsoft.com/office/powerpoint/2010/main" val="4079035419"/>
       </p:ext>
     </p:extLst>
   </p:cSld>
   <p:clrMapOvr>
     <a:masterClrMapping/>
   </p:clrMapOvr>
-  <mc:AlternateContent xmlns:mc="http://schemas.openxmlformats.org/markup-compatibility/2006">
-    <mc:Choice xmlns:p14="http://schemas.microsoft.com/office/powerpoint/2010/main" xmlns="" Requires="p14">
+  <mc:AlternateContent xmlns:mc="http://schemas.openxmlformats.org/markup-compatibility/2006" xmlns:p14="http://schemas.microsoft.com/office/powerpoint/2010/main">
+    <mc:Choice Requires="p14">
       <p:transition spd="med" p14:dur="700">
         <p:fade/>
       </p:transition>
     </mc:Choice>
-    <mc:Fallback>
+    <mc:Fallback xmlns="">
       <p:transition spd="med">
         <p:fade/>
       </p:transition>
@@ -5005,7 +5005,7 @@
             <a:fld id="{03F41C87-7AD9-4845-A077-840E4A0F3F06}" type="datetimeFigureOut">
               <a:rPr lang="en-US"/>
               <a:pPr/>
-              <a:t>11/10/2014</a:t>
+              <a:t>11/16/2014</a:t>
             </a:fld>
             <a:endParaRPr/>
           </a:p>
@@ -5048,7 +5048,7 @@
             <a:fld id="{2A013F82-EE5E-44EE-A61D-E31C6657F26F}" type="slidenum">
               <a:rPr/>
               <a:pPr/>
-              <a:t>‹Nº›</a:t>
+              <a:t>‹#›</a:t>
             </a:fld>
             <a:endParaRPr/>
           </a:p>
@@ -5057,20 +5057,20 @@
     </p:spTree>
     <p:extLst>
       <p:ext uri="{BB962C8B-B14F-4D97-AF65-F5344CB8AC3E}">
-        <p14:creationId xmlns:p14="http://schemas.microsoft.com/office/powerpoint/2010/main" xmlns="" val="2738254095"/>
+        <p14:creationId xmlns:p14="http://schemas.microsoft.com/office/powerpoint/2010/main" val="2738254095"/>
       </p:ext>
     </p:extLst>
   </p:cSld>
   <p:clrMapOvr>
     <a:masterClrMapping/>
   </p:clrMapOvr>
-  <mc:AlternateContent xmlns:mc="http://schemas.openxmlformats.org/markup-compatibility/2006">
-    <mc:Choice xmlns:p14="http://schemas.microsoft.com/office/powerpoint/2010/main" xmlns="" Requires="p14">
+  <mc:AlternateContent xmlns:mc="http://schemas.openxmlformats.org/markup-compatibility/2006" xmlns:p14="http://schemas.microsoft.com/office/powerpoint/2010/main">
+    <mc:Choice Requires="p14">
       <p:transition spd="med" p14:dur="700">
         <p:fade/>
       </p:transition>
     </mc:Choice>
-    <mc:Fallback>
+    <mc:Fallback xmlns="">
       <p:transition spd="med">
         <p:fade/>
       </p:transition>
@@ -5294,7 +5294,7 @@
             <a:fld id="{03F41C87-7AD9-4845-A077-840E4A0F3F06}" type="datetimeFigureOut">
               <a:rPr lang="en-US"/>
               <a:pPr/>
-              <a:t>11/10/2014</a:t>
+              <a:t>11/16/2014</a:t>
             </a:fld>
             <a:endParaRPr/>
           </a:p>
@@ -5337,7 +5337,7 @@
             <a:fld id="{2A013F82-EE5E-44EE-A61D-E31C6657F26F}" type="slidenum">
               <a:rPr/>
               <a:pPr/>
-              <a:t>‹Nº›</a:t>
+              <a:t>‹#›</a:t>
             </a:fld>
             <a:endParaRPr/>
           </a:p>
@@ -5346,20 +5346,20 @@
     </p:spTree>
     <p:extLst>
       <p:ext uri="{BB962C8B-B14F-4D97-AF65-F5344CB8AC3E}">
-        <p14:creationId xmlns:p14="http://schemas.microsoft.com/office/powerpoint/2010/main" xmlns="" val="1761813311"/>
+        <p14:creationId xmlns:p14="http://schemas.microsoft.com/office/powerpoint/2010/main" val="1761813311"/>
       </p:ext>
     </p:extLst>
   </p:cSld>
   <p:clrMapOvr>
     <a:masterClrMapping/>
   </p:clrMapOvr>
-  <mc:AlternateContent xmlns:mc="http://schemas.openxmlformats.org/markup-compatibility/2006">
-    <mc:Choice xmlns:p14="http://schemas.microsoft.com/office/powerpoint/2010/main" xmlns="" Requires="p14">
+  <mc:AlternateContent xmlns:mc="http://schemas.openxmlformats.org/markup-compatibility/2006" xmlns:p14="http://schemas.microsoft.com/office/powerpoint/2010/main">
+    <mc:Choice Requires="p14">
       <p:transition spd="med" p14:dur="700">
         <p:fade/>
       </p:transition>
     </mc:Choice>
-    <mc:Fallback>
+    <mc:Fallback xmlns="">
       <p:transition spd="med">
         <p:fade/>
       </p:transition>
@@ -5607,7 +5607,7 @@
             <a:fld id="{03F41C87-7AD9-4845-A077-840E4A0F3F06}" type="datetimeFigureOut">
               <a:rPr lang="en-US"/>
               <a:pPr/>
-              <a:t>11/10/2014</a:t>
+              <a:t>11/16/2014</a:t>
             </a:fld>
             <a:endParaRPr/>
           </a:p>
@@ -5650,7 +5650,7 @@
             <a:fld id="{2A013F82-EE5E-44EE-A61D-E31C6657F26F}" type="slidenum">
               <a:rPr/>
               <a:pPr/>
-              <a:t>‹Nº›</a:t>
+              <a:t>‹#›</a:t>
             </a:fld>
             <a:endParaRPr/>
           </a:p>
@@ -5659,20 +5659,20 @@
     </p:spTree>
     <p:extLst>
       <p:ext uri="{BB962C8B-B14F-4D97-AF65-F5344CB8AC3E}">
-        <p14:creationId xmlns:p14="http://schemas.microsoft.com/office/powerpoint/2010/main" xmlns="" val="2825340762"/>
+        <p14:creationId xmlns:p14="http://schemas.microsoft.com/office/powerpoint/2010/main" val="2825340762"/>
       </p:ext>
     </p:extLst>
   </p:cSld>
   <p:clrMapOvr>
     <a:masterClrMapping/>
   </p:clrMapOvr>
-  <mc:AlternateContent xmlns:mc="http://schemas.openxmlformats.org/markup-compatibility/2006">
-    <mc:Choice xmlns:p14="http://schemas.microsoft.com/office/powerpoint/2010/main" xmlns="" Requires="p14">
+  <mc:AlternateContent xmlns:mc="http://schemas.openxmlformats.org/markup-compatibility/2006" xmlns:p14="http://schemas.microsoft.com/office/powerpoint/2010/main">
+    <mc:Choice Requires="p14">
       <p:transition spd="med" p14:dur="700">
         <p:fade/>
       </p:transition>
     </mc:Choice>
-    <mc:Fallback>
+    <mc:Fallback xmlns="">
       <p:transition spd="med">
         <p:fade/>
       </p:transition>
@@ -6072,7 +6072,7 @@
             <a:fld id="{03F41C87-7AD9-4845-A077-840E4A0F3F06}" type="datetimeFigureOut">
               <a:rPr lang="en-US"/>
               <a:pPr/>
-              <a:t>11/10/2014</a:t>
+              <a:t>11/16/2014</a:t>
             </a:fld>
             <a:endParaRPr/>
           </a:p>
@@ -6115,7 +6115,7 @@
             <a:fld id="{2A013F82-EE5E-44EE-A61D-E31C6657F26F}" type="slidenum">
               <a:rPr/>
               <a:pPr/>
-              <a:t>‹Nº›</a:t>
+              <a:t>‹#›</a:t>
             </a:fld>
             <a:endParaRPr/>
           </a:p>
@@ -6124,20 +6124,20 @@
     </p:spTree>
     <p:extLst>
       <p:ext uri="{BB962C8B-B14F-4D97-AF65-F5344CB8AC3E}">
-        <p14:creationId xmlns:p14="http://schemas.microsoft.com/office/powerpoint/2010/main" xmlns="" val="4208419506"/>
+        <p14:creationId xmlns:p14="http://schemas.microsoft.com/office/powerpoint/2010/main" val="4208419506"/>
       </p:ext>
     </p:extLst>
   </p:cSld>
   <p:clrMapOvr>
     <a:masterClrMapping/>
   </p:clrMapOvr>
-  <mc:AlternateContent xmlns:mc="http://schemas.openxmlformats.org/markup-compatibility/2006">
-    <mc:Choice xmlns:p14="http://schemas.microsoft.com/office/powerpoint/2010/main" xmlns="" Requires="p14">
+  <mc:AlternateContent xmlns:mc="http://schemas.openxmlformats.org/markup-compatibility/2006" xmlns:p14="http://schemas.microsoft.com/office/powerpoint/2010/main">
+    <mc:Choice Requires="p14">
       <p:transition spd="med" p14:dur="700">
         <p:fade/>
       </p:transition>
     </mc:Choice>
-    <mc:Fallback>
+    <mc:Fallback xmlns="">
       <p:transition spd="med">
         <p:fade/>
       </p:transition>
@@ -6211,7 +6211,7 @@
             <a:fld id="{03F41C87-7AD9-4845-A077-840E4A0F3F06}" type="datetimeFigureOut">
               <a:rPr lang="en-US"/>
               <a:pPr/>
-              <a:t>11/10/2014</a:t>
+              <a:t>11/16/2014</a:t>
             </a:fld>
             <a:endParaRPr/>
           </a:p>
@@ -6254,7 +6254,7 @@
             <a:fld id="{2A013F82-EE5E-44EE-A61D-E31C6657F26F}" type="slidenum">
               <a:rPr/>
               <a:pPr/>
-              <a:t>‹Nº›</a:t>
+              <a:t>‹#›</a:t>
             </a:fld>
             <a:endParaRPr/>
           </a:p>
@@ -6263,20 +6263,20 @@
     </p:spTree>
     <p:extLst>
       <p:ext uri="{BB962C8B-B14F-4D97-AF65-F5344CB8AC3E}">
-        <p14:creationId xmlns:p14="http://schemas.microsoft.com/office/powerpoint/2010/main" xmlns="" val="1626631400"/>
+        <p14:creationId xmlns:p14="http://schemas.microsoft.com/office/powerpoint/2010/main" val="1626631400"/>
       </p:ext>
     </p:extLst>
   </p:cSld>
   <p:clrMapOvr>
     <a:masterClrMapping/>
   </p:clrMapOvr>
-  <mc:AlternateContent xmlns:mc="http://schemas.openxmlformats.org/markup-compatibility/2006">
-    <mc:Choice xmlns:p14="http://schemas.microsoft.com/office/powerpoint/2010/main" xmlns="" Requires="p14">
+  <mc:AlternateContent xmlns:mc="http://schemas.openxmlformats.org/markup-compatibility/2006" xmlns:p14="http://schemas.microsoft.com/office/powerpoint/2010/main">
+    <mc:Choice Requires="p14">
       <p:transition spd="med" p14:dur="700">
         <p:fade/>
       </p:transition>
     </mc:Choice>
-    <mc:Fallback>
+    <mc:Fallback xmlns="">
       <p:transition spd="med">
         <p:fade/>
       </p:transition>
@@ -6335,7 +6335,7 @@
             <a:fld id="{03F41C87-7AD9-4845-A077-840E4A0F3F06}" type="datetimeFigureOut">
               <a:rPr lang="en-US"/>
               <a:pPr/>
-              <a:t>11/10/2014</a:t>
+              <a:t>11/16/2014</a:t>
             </a:fld>
             <a:endParaRPr/>
           </a:p>
@@ -6378,7 +6378,7 @@
             <a:fld id="{2A013F82-EE5E-44EE-A61D-E31C6657F26F}" type="slidenum">
               <a:rPr/>
               <a:pPr/>
-              <a:t>‹Nº›</a:t>
+              <a:t>‹#›</a:t>
             </a:fld>
             <a:endParaRPr/>
           </a:p>
@@ -6387,20 +6387,20 @@
     </p:spTree>
     <p:extLst>
       <p:ext uri="{BB962C8B-B14F-4D97-AF65-F5344CB8AC3E}">
-        <p14:creationId xmlns:p14="http://schemas.microsoft.com/office/powerpoint/2010/main" xmlns="" val="3607540120"/>
+        <p14:creationId xmlns:p14="http://schemas.microsoft.com/office/powerpoint/2010/main" val="3607540120"/>
       </p:ext>
     </p:extLst>
   </p:cSld>
   <p:clrMapOvr>
     <a:masterClrMapping/>
   </p:clrMapOvr>
-  <mc:AlternateContent xmlns:mc="http://schemas.openxmlformats.org/markup-compatibility/2006">
-    <mc:Choice xmlns:p14="http://schemas.microsoft.com/office/powerpoint/2010/main" xmlns="" Requires="p14">
+  <mc:AlternateContent xmlns:mc="http://schemas.openxmlformats.org/markup-compatibility/2006" xmlns:p14="http://schemas.microsoft.com/office/powerpoint/2010/main">
+    <mc:Choice Requires="p14">
       <p:transition spd="med" p14:dur="700">
         <p:fade/>
       </p:transition>
     </mc:Choice>
-    <mc:Fallback>
+    <mc:Fallback xmlns="">
       <p:transition spd="med">
         <p:fade/>
       </p:transition>
@@ -6666,7 +6666,7 @@
             <a:fld id="{03F41C87-7AD9-4845-A077-840E4A0F3F06}" type="datetimeFigureOut">
               <a:rPr lang="en-US"/>
               <a:pPr/>
-              <a:t>11/10/2014</a:t>
+              <a:t>11/16/2014</a:t>
             </a:fld>
             <a:endParaRPr/>
           </a:p>
@@ -6709,7 +6709,7 @@
             <a:fld id="{2A013F82-EE5E-44EE-A61D-E31C6657F26F}" type="slidenum">
               <a:rPr/>
               <a:pPr/>
-              <a:t>‹Nº›</a:t>
+              <a:t>‹#›</a:t>
             </a:fld>
             <a:endParaRPr/>
           </a:p>
@@ -6718,20 +6718,20 @@
     </p:spTree>
     <p:extLst>
       <p:ext uri="{BB962C8B-B14F-4D97-AF65-F5344CB8AC3E}">
-        <p14:creationId xmlns:p14="http://schemas.microsoft.com/office/powerpoint/2010/main" xmlns="" val="2544981540"/>
+        <p14:creationId xmlns:p14="http://schemas.microsoft.com/office/powerpoint/2010/main" val="2544981540"/>
       </p:ext>
     </p:extLst>
   </p:cSld>
   <p:clrMapOvr>
     <a:masterClrMapping/>
   </p:clrMapOvr>
-  <mc:AlternateContent xmlns:mc="http://schemas.openxmlformats.org/markup-compatibility/2006">
-    <mc:Choice xmlns:p14="http://schemas.microsoft.com/office/powerpoint/2010/main" xmlns="" Requires="p14">
+  <mc:AlternateContent xmlns:mc="http://schemas.openxmlformats.org/markup-compatibility/2006" xmlns:p14="http://schemas.microsoft.com/office/powerpoint/2010/main">
+    <mc:Choice Requires="p14">
       <p:transition spd="med" p14:dur="700">
         <p:fade/>
       </p:transition>
     </mc:Choice>
-    <mc:Fallback>
+    <mc:Fallback xmlns="">
       <p:transition spd="med">
         <p:fade/>
       </p:transition>
@@ -6986,7 +6986,7 @@
             <a:fld id="{03F41C87-7AD9-4845-A077-840E4A0F3F06}" type="datetimeFigureOut">
               <a:rPr lang="en-US"/>
               <a:pPr/>
-              <a:t>11/10/2014</a:t>
+              <a:t>11/16/2014</a:t>
             </a:fld>
             <a:endParaRPr/>
           </a:p>
@@ -7029,7 +7029,7 @@
             <a:fld id="{2A013F82-EE5E-44EE-A61D-E31C6657F26F}" type="slidenum">
               <a:rPr/>
               <a:pPr/>
-              <a:t>‹Nº›</a:t>
+              <a:t>‹#›</a:t>
             </a:fld>
             <a:endParaRPr/>
           </a:p>
@@ -7038,20 +7038,20 @@
     </p:spTree>
     <p:extLst>
       <p:ext uri="{BB962C8B-B14F-4D97-AF65-F5344CB8AC3E}">
-        <p14:creationId xmlns:p14="http://schemas.microsoft.com/office/powerpoint/2010/main" xmlns="" val="2249172152"/>
+        <p14:creationId xmlns:p14="http://schemas.microsoft.com/office/powerpoint/2010/main" val="2249172152"/>
       </p:ext>
     </p:extLst>
   </p:cSld>
   <p:clrMapOvr>
     <a:masterClrMapping/>
   </p:clrMapOvr>
-  <mc:AlternateContent xmlns:mc="http://schemas.openxmlformats.org/markup-compatibility/2006">
-    <mc:Choice xmlns:p14="http://schemas.microsoft.com/office/powerpoint/2010/main" xmlns="" Requires="p14">
+  <mc:AlternateContent xmlns:mc="http://schemas.openxmlformats.org/markup-compatibility/2006" xmlns:p14="http://schemas.microsoft.com/office/powerpoint/2010/main">
+    <mc:Choice Requires="p14">
       <p:transition spd="med" p14:dur="700">
         <p:fade/>
       </p:transition>
     </mc:Choice>
-    <mc:Fallback>
+    <mc:Fallback xmlns="">
       <p:transition spd="med">
         <p:fade/>
       </p:transition>
@@ -7229,7 +7229,7 @@
             <a:fld id="{03F41C87-7AD9-4845-A077-840E4A0F3F06}" type="datetimeFigureOut">
               <a:rPr lang="en-US"/>
               <a:pPr/>
-              <a:t>11/10/2014</a:t>
+              <a:t>11/16/2014</a:t>
             </a:fld>
             <a:endParaRPr/>
           </a:p>
@@ -7308,7 +7308,7 @@
             <a:fld id="{2A013F82-EE5E-44EE-A61D-E31C6657F26F}" type="slidenum">
               <a:rPr/>
               <a:pPr/>
-              <a:t>‹Nº›</a:t>
+              <a:t>‹#›</a:t>
             </a:fld>
             <a:endParaRPr/>
           </a:p>
@@ -7317,7 +7317,7 @@
     </p:spTree>
     <p:extLst>
       <p:ext uri="{BB962C8B-B14F-4D97-AF65-F5344CB8AC3E}">
-        <p14:creationId xmlns:p14="http://schemas.microsoft.com/office/powerpoint/2010/main" xmlns="" val="1403059996"/>
+        <p14:creationId xmlns:p14="http://schemas.microsoft.com/office/powerpoint/2010/main" val="1403059996"/>
       </p:ext>
     </p:extLst>
   </p:cSld>
@@ -7335,13 +7335,13 @@
     <p:sldLayoutId id="2147483658" r:id="rId10"/>
     <p:sldLayoutId id="2147483659" r:id="rId11"/>
   </p:sldLayoutIdLst>
-  <mc:AlternateContent xmlns:mc="http://schemas.openxmlformats.org/markup-compatibility/2006">
-    <mc:Choice xmlns:p14="http://schemas.microsoft.com/office/powerpoint/2010/main" xmlns="" Requires="p14">
+  <mc:AlternateContent xmlns:mc="http://schemas.openxmlformats.org/markup-compatibility/2006" xmlns:p14="http://schemas.microsoft.com/office/powerpoint/2010/main">
+    <mc:Choice Requires="p14">
       <p:transition spd="med" p14:dur="700">
         <p:fade/>
       </p:transition>
     </mc:Choice>
-    <mc:Fallback>
+    <mc:Fallback xmlns="">
       <p:transition spd="med">
         <p:fade/>
       </p:transition>
@@ -7656,7 +7656,7 @@
   </p:txStyles>
   <p:extLst mod="1">
     <p:ext uri="{27BBF7A9-308A-43DC-89C8-2F10F3537804}">
-      <p15:sldGuideLst xmlns:p15="http://schemas.microsoft.com/office/powerpoint/2012/main" xmlns="">
+      <p15:sldGuideLst xmlns:p15="http://schemas.microsoft.com/office/powerpoint/2012/main">
         <p15:guide id="1" pos="3839" userDrawn="1">
           <p15:clr>
             <a:srgbClr val="F26B43"/>
@@ -7803,7 +7803,7 @@
           <a:blip r:embed="rId2" cstate="print">
             <a:extLst>
               <a:ext uri="{28A0092B-C50C-407E-A947-70E740481C1C}">
-                <a14:useLocalDpi xmlns:a14="http://schemas.microsoft.com/office/drawing/2010/main" xmlns="" val="0"/>
+                <a14:useLocalDpi xmlns:a14="http://schemas.microsoft.com/office/drawing/2010/main" val="0"/>
               </a:ext>
             </a:extLst>
           </a:blip>
@@ -7823,7 +7823,7 @@
           <a:noFill/>
           <a:extLst>
             <a:ext uri="{909E8E84-426E-40DD-AFC4-6F175D3DCCD1}">
-              <a14:hiddenFill xmlns:a14="http://schemas.microsoft.com/office/drawing/2010/main" xmlns="">
+              <a14:hiddenFill xmlns:a14="http://schemas.microsoft.com/office/drawing/2010/main">
                 <a:solidFill>
                   <a:srgbClr val="FFFFFF"/>
                 </a:solidFill>
@@ -7835,20 +7835,20 @@
     </p:spTree>
     <p:extLst>
       <p:ext uri="{BB962C8B-B14F-4D97-AF65-F5344CB8AC3E}">
-        <p14:creationId xmlns:p14="http://schemas.microsoft.com/office/powerpoint/2010/main" xmlns="" val="2808920126"/>
+        <p14:creationId xmlns:p14="http://schemas.microsoft.com/office/powerpoint/2010/main" val="2808920126"/>
       </p:ext>
     </p:extLst>
   </p:cSld>
   <p:clrMapOvr>
     <a:masterClrMapping/>
   </p:clrMapOvr>
-  <mc:AlternateContent xmlns:mc="http://schemas.openxmlformats.org/markup-compatibility/2006">
-    <mc:Choice xmlns:p14="http://schemas.microsoft.com/office/powerpoint/2010/main" xmlns="" Requires="p14">
+  <mc:AlternateContent xmlns:mc="http://schemas.openxmlformats.org/markup-compatibility/2006" xmlns:p14="http://schemas.microsoft.com/office/powerpoint/2010/main">
+    <mc:Choice Requires="p14">
       <p:transition spd="med" p14:dur="700">
         <p:fade/>
       </p:transition>
     </mc:Choice>
-    <mc:Fallback>
+    <mc:Fallback xmlns="">
       <p:transition spd="med">
         <p:fade/>
       </p:transition>
@@ -8096,20 +8096,20 @@
     </p:spTree>
     <p:extLst>
       <p:ext uri="{BB962C8B-B14F-4D97-AF65-F5344CB8AC3E}">
-        <p14:creationId xmlns:p14="http://schemas.microsoft.com/office/powerpoint/2010/main" xmlns="" val="4207303638"/>
+        <p14:creationId xmlns:p14="http://schemas.microsoft.com/office/powerpoint/2010/main" val="4207303638"/>
       </p:ext>
     </p:extLst>
   </p:cSld>
   <p:clrMapOvr>
     <a:masterClrMapping/>
   </p:clrMapOvr>
-  <mc:AlternateContent xmlns:mc="http://schemas.openxmlformats.org/markup-compatibility/2006">
-    <mc:Choice xmlns:p14="http://schemas.microsoft.com/office/powerpoint/2010/main" xmlns="" Requires="p14">
+  <mc:AlternateContent xmlns:mc="http://schemas.openxmlformats.org/markup-compatibility/2006" xmlns:p14="http://schemas.microsoft.com/office/powerpoint/2010/main">
+    <mc:Choice Requires="p14">
       <p:transition spd="med" p14:dur="700">
         <p:fade/>
       </p:transition>
     </mc:Choice>
-    <mc:Fallback>
+    <mc:Fallback xmlns="">
       <p:transition spd="med">
         <p:fade/>
       </p:transition>
@@ -8203,20 +8203,20 @@
     </p:spTree>
     <p:extLst>
       <p:ext uri="{BB962C8B-B14F-4D97-AF65-F5344CB8AC3E}">
-        <p14:creationId xmlns:p14="http://schemas.microsoft.com/office/powerpoint/2010/main" xmlns="" val="3772183175"/>
+        <p14:creationId xmlns:p14="http://schemas.microsoft.com/office/powerpoint/2010/main" val="3772183175"/>
       </p:ext>
     </p:extLst>
   </p:cSld>
   <p:clrMapOvr>
     <a:masterClrMapping/>
   </p:clrMapOvr>
-  <mc:AlternateContent xmlns:mc="http://schemas.openxmlformats.org/markup-compatibility/2006">
-    <mc:Choice xmlns:p14="http://schemas.microsoft.com/office/powerpoint/2010/main" xmlns="" Requires="p14">
+  <mc:AlternateContent xmlns:mc="http://schemas.openxmlformats.org/markup-compatibility/2006" xmlns:p14="http://schemas.microsoft.com/office/powerpoint/2010/main">
+    <mc:Choice Requires="p14">
       <p:transition spd="med" p14:dur="700">
         <p:fade/>
       </p:transition>
     </mc:Choice>
-    <mc:Fallback>
+    <mc:Fallback xmlns="">
       <p:transition spd="med">
         <p:fade/>
       </p:transition>
@@ -8424,20 +8424,20 @@
     </p:spTree>
     <p:extLst>
       <p:ext uri="{BB962C8B-B14F-4D97-AF65-F5344CB8AC3E}">
-        <p14:creationId xmlns:p14="http://schemas.microsoft.com/office/powerpoint/2010/main" xmlns="" val="911844652"/>
+        <p14:creationId xmlns:p14="http://schemas.microsoft.com/office/powerpoint/2010/main" val="911844652"/>
       </p:ext>
     </p:extLst>
   </p:cSld>
   <p:clrMapOvr>
     <a:masterClrMapping/>
   </p:clrMapOvr>
-  <mc:AlternateContent xmlns:mc="http://schemas.openxmlformats.org/markup-compatibility/2006">
-    <mc:Choice xmlns:p14="http://schemas.microsoft.com/office/powerpoint/2010/main" xmlns="" Requires="p14">
+  <mc:AlternateContent xmlns:mc="http://schemas.openxmlformats.org/markup-compatibility/2006" xmlns:p14="http://schemas.microsoft.com/office/powerpoint/2010/main">
+    <mc:Choice Requires="p14">
       <p:transition spd="med" p14:dur="700">
         <p:fade/>
       </p:transition>
     </mc:Choice>
-    <mc:Fallback>
+    <mc:Fallback xmlns="">
       <p:transition spd="med">
         <p:fade/>
       </p:transition>
@@ -8611,20 +8611,20 @@
     </p:spTree>
     <p:extLst>
       <p:ext uri="{BB962C8B-B14F-4D97-AF65-F5344CB8AC3E}">
-        <p14:creationId xmlns:p14="http://schemas.microsoft.com/office/powerpoint/2010/main" xmlns="" val="3751154171"/>
+        <p14:creationId xmlns:p14="http://schemas.microsoft.com/office/powerpoint/2010/main" val="3751154171"/>
       </p:ext>
     </p:extLst>
   </p:cSld>
   <p:clrMapOvr>
     <a:masterClrMapping/>
   </p:clrMapOvr>
-  <mc:AlternateContent xmlns:mc="http://schemas.openxmlformats.org/markup-compatibility/2006">
-    <mc:Choice xmlns:p14="http://schemas.microsoft.com/office/powerpoint/2010/main" xmlns="" Requires="p14">
+  <mc:AlternateContent xmlns:mc="http://schemas.openxmlformats.org/markup-compatibility/2006" xmlns:p14="http://schemas.microsoft.com/office/powerpoint/2010/main">
+    <mc:Choice Requires="p14">
       <p:transition spd="med" p14:dur="700">
         <p:fade/>
       </p:transition>
     </mc:Choice>
-    <mc:Fallback>
+    <mc:Fallback xmlns="">
       <p:transition spd="med">
         <p:fade/>
       </p:transition>
@@ -8808,20 +8808,20 @@
     </p:spTree>
     <p:extLst>
       <p:ext uri="{BB962C8B-B14F-4D97-AF65-F5344CB8AC3E}">
-        <p14:creationId xmlns:p14="http://schemas.microsoft.com/office/powerpoint/2010/main" xmlns="" val="2714171304"/>
+        <p14:creationId xmlns:p14="http://schemas.microsoft.com/office/powerpoint/2010/main" val="2714171304"/>
       </p:ext>
     </p:extLst>
   </p:cSld>
   <p:clrMapOvr>
     <a:masterClrMapping/>
   </p:clrMapOvr>
-  <mc:AlternateContent xmlns:mc="http://schemas.openxmlformats.org/markup-compatibility/2006">
-    <mc:Choice xmlns:p14="http://schemas.microsoft.com/office/powerpoint/2010/main" xmlns="" Requires="p14">
+  <mc:AlternateContent xmlns:mc="http://schemas.openxmlformats.org/markup-compatibility/2006" xmlns:p14="http://schemas.microsoft.com/office/powerpoint/2010/main">
+    <mc:Choice Requires="p14">
       <p:transition spd="med" p14:dur="700">
         <p:fade/>
       </p:transition>
     </mc:Choice>
-    <mc:Fallback>
+    <mc:Fallback xmlns="">
       <p:transition spd="med">
         <p:fade/>
       </p:transition>
@@ -9000,20 +9000,20 @@
     </p:spTree>
     <p:extLst>
       <p:ext uri="{BB962C8B-B14F-4D97-AF65-F5344CB8AC3E}">
-        <p14:creationId xmlns:p14="http://schemas.microsoft.com/office/powerpoint/2010/main" xmlns="" val="2246987516"/>
+        <p14:creationId xmlns:p14="http://schemas.microsoft.com/office/powerpoint/2010/main" val="2246987516"/>
       </p:ext>
     </p:extLst>
   </p:cSld>
   <p:clrMapOvr>
     <a:masterClrMapping/>
   </p:clrMapOvr>
-  <mc:AlternateContent xmlns:mc="http://schemas.openxmlformats.org/markup-compatibility/2006">
-    <mc:Choice xmlns:p14="http://schemas.microsoft.com/office/powerpoint/2010/main" xmlns="" Requires="p14">
+  <mc:AlternateContent xmlns:mc="http://schemas.openxmlformats.org/markup-compatibility/2006" xmlns:p14="http://schemas.microsoft.com/office/powerpoint/2010/main">
+    <mc:Choice Requires="p14">
       <p:transition spd="med" p14:dur="700">
         <p:fade/>
       </p:transition>
     </mc:Choice>
-    <mc:Fallback>
+    <mc:Fallback xmlns="">
       <p:transition spd="med">
         <p:fade/>
       </p:transition>
@@ -9211,20 +9211,20 @@
     </p:spTree>
     <p:extLst>
       <p:ext uri="{BB962C8B-B14F-4D97-AF65-F5344CB8AC3E}">
-        <p14:creationId xmlns:p14="http://schemas.microsoft.com/office/powerpoint/2010/main" xmlns="" val="3025649002"/>
+        <p14:creationId xmlns:p14="http://schemas.microsoft.com/office/powerpoint/2010/main" val="3025649002"/>
       </p:ext>
     </p:extLst>
   </p:cSld>
   <p:clrMapOvr>
     <a:masterClrMapping/>
   </p:clrMapOvr>
-  <mc:AlternateContent xmlns:mc="http://schemas.openxmlformats.org/markup-compatibility/2006">
-    <mc:Choice xmlns:p14="http://schemas.microsoft.com/office/powerpoint/2010/main" xmlns="" Requires="p14">
+  <mc:AlternateContent xmlns:mc="http://schemas.openxmlformats.org/markup-compatibility/2006" xmlns:p14="http://schemas.microsoft.com/office/powerpoint/2010/main">
+    <mc:Choice Requires="p14">
       <p:transition spd="med" p14:dur="700">
         <p:fade/>
       </p:transition>
     </mc:Choice>
-    <mc:Fallback>
+    <mc:Fallback xmlns="">
       <p:transition spd="med">
         <p:fade/>
       </p:transition>
@@ -9361,20 +9361,20 @@
     </p:spTree>
     <p:extLst>
       <p:ext uri="{BB962C8B-B14F-4D97-AF65-F5344CB8AC3E}">
-        <p14:creationId xmlns:p14="http://schemas.microsoft.com/office/powerpoint/2010/main" xmlns="" val="3410413250"/>
+        <p14:creationId xmlns:p14="http://schemas.microsoft.com/office/powerpoint/2010/main" val="3410413250"/>
       </p:ext>
     </p:extLst>
   </p:cSld>
   <p:clrMapOvr>
     <a:masterClrMapping/>
   </p:clrMapOvr>
-  <mc:AlternateContent xmlns:mc="http://schemas.openxmlformats.org/markup-compatibility/2006">
-    <mc:Choice xmlns:p14="http://schemas.microsoft.com/office/powerpoint/2010/main" xmlns="" Requires="p14">
+  <mc:AlternateContent xmlns:mc="http://schemas.openxmlformats.org/markup-compatibility/2006" xmlns:p14="http://schemas.microsoft.com/office/powerpoint/2010/main">
+    <mc:Choice Requires="p14">
       <p:transition spd="med" p14:dur="700">
         <p:fade/>
       </p:transition>
     </mc:Choice>
-    <mc:Fallback>
+    <mc:Fallback xmlns="">
       <p:transition spd="med">
         <p:fade/>
       </p:transition>
@@ -9574,20 +9574,20 @@
     </p:spTree>
     <p:extLst>
       <p:ext uri="{BB962C8B-B14F-4D97-AF65-F5344CB8AC3E}">
-        <p14:creationId xmlns:p14="http://schemas.microsoft.com/office/powerpoint/2010/main" xmlns="" val="23673588"/>
+        <p14:creationId xmlns:p14="http://schemas.microsoft.com/office/powerpoint/2010/main" val="23673588"/>
       </p:ext>
     </p:extLst>
   </p:cSld>
   <p:clrMapOvr>
     <a:masterClrMapping/>
   </p:clrMapOvr>
-  <mc:AlternateContent xmlns:mc="http://schemas.openxmlformats.org/markup-compatibility/2006">
-    <mc:Choice xmlns:p14="http://schemas.microsoft.com/office/powerpoint/2010/main" xmlns="" Requires="p14">
+  <mc:AlternateContent xmlns:mc="http://schemas.openxmlformats.org/markup-compatibility/2006" xmlns:p14="http://schemas.microsoft.com/office/powerpoint/2010/main">
+    <mc:Choice Requires="p14">
       <p:transition spd="med" p14:dur="700">
         <p:fade/>
       </p:transition>
     </mc:Choice>
-    <mc:Fallback>
+    <mc:Fallback xmlns="">
       <p:transition spd="med">
         <p:fade/>
       </p:transition>
@@ -9846,20 +9846,20 @@
     </p:spTree>
     <p:extLst>
       <p:ext uri="{BB962C8B-B14F-4D97-AF65-F5344CB8AC3E}">
-        <p14:creationId xmlns:p14="http://schemas.microsoft.com/office/powerpoint/2010/main" xmlns="" val="3632379430"/>
+        <p14:creationId xmlns:p14="http://schemas.microsoft.com/office/powerpoint/2010/main" val="3632379430"/>
       </p:ext>
     </p:extLst>
   </p:cSld>
   <p:clrMapOvr>
     <a:masterClrMapping/>
   </p:clrMapOvr>
-  <mc:AlternateContent xmlns:mc="http://schemas.openxmlformats.org/markup-compatibility/2006">
-    <mc:Choice xmlns:p14="http://schemas.microsoft.com/office/powerpoint/2010/main" xmlns="" Requires="p14">
+  <mc:AlternateContent xmlns:mc="http://schemas.openxmlformats.org/markup-compatibility/2006" xmlns:p14="http://schemas.microsoft.com/office/powerpoint/2010/main">
+    <mc:Choice Requires="p14">
       <p:transition spd="med" p14:dur="700">
         <p:fade/>
       </p:transition>
     </mc:Choice>
-    <mc:Fallback>
+    <mc:Fallback xmlns="">
       <p:transition spd="med">
         <p:fade/>
       </p:transition>
@@ -10219,20 +10219,20 @@
     </p:spTree>
     <p:extLst>
       <p:ext uri="{BB962C8B-B14F-4D97-AF65-F5344CB8AC3E}">
-        <p14:creationId xmlns:p14="http://schemas.microsoft.com/office/powerpoint/2010/main" xmlns="" val="2139132589"/>
+        <p14:creationId xmlns:p14="http://schemas.microsoft.com/office/powerpoint/2010/main" val="2139132589"/>
       </p:ext>
     </p:extLst>
   </p:cSld>
   <p:clrMapOvr>
     <a:masterClrMapping/>
   </p:clrMapOvr>
-  <mc:AlternateContent xmlns:mc="http://schemas.openxmlformats.org/markup-compatibility/2006">
-    <mc:Choice xmlns:p14="http://schemas.microsoft.com/office/powerpoint/2010/main" xmlns="" Requires="p14">
+  <mc:AlternateContent xmlns:mc="http://schemas.openxmlformats.org/markup-compatibility/2006" xmlns:p14="http://schemas.microsoft.com/office/powerpoint/2010/main">
+    <mc:Choice Requires="p14">
       <p:transition spd="med" p14:dur="700">
         <p:fade/>
       </p:transition>
     </mc:Choice>
-    <mc:Fallback>
+    <mc:Fallback xmlns="">
       <p:transition spd="med">
         <p:fade/>
       </p:transition>
@@ -10460,20 +10460,20 @@
     </p:spTree>
     <p:extLst>
       <p:ext uri="{BB962C8B-B14F-4D97-AF65-F5344CB8AC3E}">
-        <p14:creationId xmlns:p14="http://schemas.microsoft.com/office/powerpoint/2010/main" xmlns="" val="3204325395"/>
+        <p14:creationId xmlns:p14="http://schemas.microsoft.com/office/powerpoint/2010/main" val="3204325395"/>
       </p:ext>
     </p:extLst>
   </p:cSld>
   <p:clrMapOvr>
     <a:masterClrMapping/>
   </p:clrMapOvr>
-  <mc:AlternateContent xmlns:mc="http://schemas.openxmlformats.org/markup-compatibility/2006">
-    <mc:Choice xmlns:p14="http://schemas.microsoft.com/office/powerpoint/2010/main" xmlns="" Requires="p14">
+  <mc:AlternateContent xmlns:mc="http://schemas.openxmlformats.org/markup-compatibility/2006" xmlns:p14="http://schemas.microsoft.com/office/powerpoint/2010/main">
+    <mc:Choice Requires="p14">
       <p:transition spd="med" p14:dur="700">
         <p:fade/>
       </p:transition>
     </mc:Choice>
-    <mc:Fallback>
+    <mc:Fallback xmlns="">
       <p:transition spd="med">
         <p:fade/>
       </p:transition>
@@ -10659,20 +10659,20 @@
     </p:spTree>
     <p:extLst>
       <p:ext uri="{BB962C8B-B14F-4D97-AF65-F5344CB8AC3E}">
-        <p14:creationId xmlns:p14="http://schemas.microsoft.com/office/powerpoint/2010/main" xmlns="" val="1496383053"/>
+        <p14:creationId xmlns:p14="http://schemas.microsoft.com/office/powerpoint/2010/main" val="1496383053"/>
       </p:ext>
     </p:extLst>
   </p:cSld>
   <p:clrMapOvr>
     <a:masterClrMapping/>
   </p:clrMapOvr>
-  <mc:AlternateContent xmlns:mc="http://schemas.openxmlformats.org/markup-compatibility/2006">
-    <mc:Choice xmlns:p14="http://schemas.microsoft.com/office/powerpoint/2010/main" xmlns="" Requires="p14">
+  <mc:AlternateContent xmlns:mc="http://schemas.openxmlformats.org/markup-compatibility/2006" xmlns:p14="http://schemas.microsoft.com/office/powerpoint/2010/main">
+    <mc:Choice Requires="p14">
       <p:transition spd="med" p14:dur="700">
         <p:fade/>
       </p:transition>
     </mc:Choice>
-    <mc:Fallback>
+    <mc:Fallback xmlns="">
       <p:transition spd="med">
         <p:fade/>
       </p:transition>
@@ -10883,41 +10883,28 @@
                 <a:ea typeface="Segoe UI" pitchFamily="34" charset="0"/>
                 <a:cs typeface="Segoe UI" pitchFamily="34" charset="0"/>
               </a:rPr>
-              <a:t>Robo de </a:t>
-            </a:r>
-            <a:r>
-              <a:rPr lang="es-AR" dirty="0" smtClean="0">
-                <a:latin typeface="Segoe UI" pitchFamily="34" charset="0"/>
-                <a:ea typeface="Segoe UI" pitchFamily="34" charset="0"/>
-                <a:cs typeface="Segoe UI" pitchFamily="34" charset="0"/>
-              </a:rPr>
-              <a:t>documentación</a:t>
-            </a:r>
-            <a:endParaRPr lang="es-AR" dirty="0" smtClean="0">
-              <a:latin typeface="Segoe UI" pitchFamily="34" charset="0"/>
-              <a:ea typeface="Segoe UI" pitchFamily="34" charset="0"/>
-              <a:cs typeface="Segoe UI" pitchFamily="34" charset="0"/>
-            </a:endParaRPr>
+              <a:t>Robo de documentación</a:t>
+            </a:r>
           </a:p>
         </p:txBody>
       </p:sp>
     </p:spTree>
     <p:extLst>
       <p:ext uri="{BB962C8B-B14F-4D97-AF65-F5344CB8AC3E}">
-        <p14:creationId xmlns:p14="http://schemas.microsoft.com/office/powerpoint/2010/main" xmlns="" val="1679218424"/>
+        <p14:creationId xmlns:p14="http://schemas.microsoft.com/office/powerpoint/2010/main" val="1679218424"/>
       </p:ext>
     </p:extLst>
   </p:cSld>
   <p:clrMapOvr>
     <a:masterClrMapping/>
   </p:clrMapOvr>
-  <mc:AlternateContent xmlns:mc="http://schemas.openxmlformats.org/markup-compatibility/2006">
-    <mc:Choice xmlns:p14="http://schemas.microsoft.com/office/powerpoint/2010/main" xmlns="" Requires="p14">
+  <mc:AlternateContent xmlns:mc="http://schemas.openxmlformats.org/markup-compatibility/2006" xmlns:p14="http://schemas.microsoft.com/office/powerpoint/2010/main">
+    <mc:Choice Requires="p14">
       <p:transition spd="med" p14:dur="700">
         <p:fade/>
       </p:transition>
     </mc:Choice>
-    <mc:Fallback>
+    <mc:Fallback xmlns="">
       <p:transition spd="med">
         <p:fade/>
       </p:transition>
@@ -11121,20 +11108,20 @@
     </p:spTree>
     <p:extLst>
       <p:ext uri="{BB962C8B-B14F-4D97-AF65-F5344CB8AC3E}">
-        <p14:creationId xmlns:p14="http://schemas.microsoft.com/office/powerpoint/2010/main" xmlns="" val="1679218424"/>
+        <p14:creationId xmlns:p14="http://schemas.microsoft.com/office/powerpoint/2010/main" val="1679218424"/>
       </p:ext>
     </p:extLst>
   </p:cSld>
   <p:clrMapOvr>
     <a:masterClrMapping/>
   </p:clrMapOvr>
-  <mc:AlternateContent xmlns:mc="http://schemas.openxmlformats.org/markup-compatibility/2006">
-    <mc:Choice xmlns:p14="http://schemas.microsoft.com/office/powerpoint/2010/main" xmlns="" Requires="p14">
+  <mc:AlternateContent xmlns:mc="http://schemas.openxmlformats.org/markup-compatibility/2006" xmlns:p14="http://schemas.microsoft.com/office/powerpoint/2010/main">
+    <mc:Choice Requires="p14">
       <p:transition spd="med" p14:dur="700">
         <p:fade/>
       </p:transition>
     </mc:Choice>
-    <mc:Fallback>
+    <mc:Fallback xmlns="">
       <p:transition spd="med">
         <p:fade/>
       </p:transition>
@@ -11322,15 +11309,7 @@
                 <a:ea typeface="Segoe UI" pitchFamily="34" charset="0"/>
                 <a:cs typeface="Segoe UI" pitchFamily="34" charset="0"/>
               </a:rPr>
-              <a:t>Guerra Civil </a:t>
-            </a:r>
-            <a:r>
-              <a:rPr lang="es-AR" dirty="0" smtClean="0">
-                <a:latin typeface="Segoe UI" pitchFamily="34" charset="0"/>
-                <a:ea typeface="Segoe UI" pitchFamily="34" charset="0"/>
-                <a:cs typeface="Segoe UI" pitchFamily="34" charset="0"/>
-              </a:rPr>
-              <a:t>Americana</a:t>
+              <a:t>Guerra Civil Americana</a:t>
             </a:r>
           </a:p>
           <a:p>
@@ -11360,15 +11339,7 @@
                 <a:ea typeface="Segoe UI" pitchFamily="34" charset="0"/>
                 <a:cs typeface="Segoe UI" pitchFamily="34" charset="0"/>
               </a:rPr>
-              <a:t>Confederados </a:t>
-            </a:r>
-            <a:r>
-              <a:rPr lang="es-AR" sz="2200" dirty="0" smtClean="0">
-                <a:latin typeface="Segoe UI" pitchFamily="34" charset="0"/>
-                <a:ea typeface="Segoe UI" pitchFamily="34" charset="0"/>
-                <a:cs typeface="Segoe UI" pitchFamily="34" charset="0"/>
-              </a:rPr>
-              <a:t>- Vigenère </a:t>
+              <a:t>Confederados - Vigenère </a:t>
             </a:r>
           </a:p>
           <a:p>
@@ -11398,29 +11369,8 @@
                 <a:ea typeface="Segoe UI" pitchFamily="34" charset="0"/>
                 <a:cs typeface="Segoe UI" pitchFamily="34" charset="0"/>
               </a:rPr>
-              <a:t>2 únicos directivos tienen acceso a la </a:t>
-            </a:r>
-            <a:r>
-              <a:rPr lang="es-AR" sz="2000" dirty="0" smtClean="0">
-                <a:latin typeface="Segoe UI" pitchFamily="34" charset="0"/>
-                <a:ea typeface="Segoe UI" pitchFamily="34" charset="0"/>
-                <a:cs typeface="Segoe UI" pitchFamily="34" charset="0"/>
-              </a:rPr>
-              <a:t>f</a:t>
-            </a:r>
-            <a:r>
-              <a:rPr lang="es-AR" sz="2000" dirty="0" smtClean="0">
-                <a:latin typeface="Segoe UI" pitchFamily="34" charset="0"/>
-                <a:ea typeface="Segoe UI" pitchFamily="34" charset="0"/>
-                <a:cs typeface="Segoe UI" pitchFamily="34" charset="0"/>
-              </a:rPr>
-              <a:t>órmula </a:t>
-            </a:r>
-            <a:endParaRPr lang="es-AR" sz="2000" dirty="0" smtClean="0">
-              <a:latin typeface="Segoe UI" pitchFamily="34" charset="0"/>
-              <a:ea typeface="Segoe UI" pitchFamily="34" charset="0"/>
-              <a:cs typeface="Segoe UI" pitchFamily="34" charset="0"/>
-            </a:endParaRPr>
+              <a:t>2 únicos directivos tienen acceso a la fórmula </a:t>
+            </a:r>
           </a:p>
           <a:p>
             <a:endParaRPr lang="es-AR" dirty="0"/>
@@ -11432,13 +11382,13 @@
   <p:clrMapOvr>
     <a:masterClrMapping/>
   </p:clrMapOvr>
-  <mc:AlternateContent xmlns:mc="http://schemas.openxmlformats.org/markup-compatibility/2006">
-    <mc:Choice xmlns:p14="http://schemas.microsoft.com/office/powerpoint/2010/main" xmlns="" Requires="p14">
+  <mc:AlternateContent xmlns:mc="http://schemas.openxmlformats.org/markup-compatibility/2006" xmlns:p14="http://schemas.microsoft.com/office/powerpoint/2010/main">
+    <mc:Choice Requires="p14">
       <p:transition spd="med" p14:dur="700">
         <p:fade/>
       </p:transition>
     </mc:Choice>
-    <mc:Fallback>
+    <mc:Fallback xmlns="">
       <p:transition spd="med">
         <p:fade/>
       </p:transition>
@@ -11592,25 +11542,7 @@
                 <a:latin typeface="Segoe UI" panose="020B0502040204020203" pitchFamily="34" charset="0"/>
                 <a:cs typeface="Segoe UI" panose="020B0502040204020203" pitchFamily="34" charset="0"/>
               </a:rPr>
-              <a:t> </a:t>
-            </a:r>
-            <a:r>
-              <a:rPr lang="en-US" spc="0" dirty="0" smtClean="0">
-                <a:ln w="0"/>
-                <a:solidFill>
-                  <a:schemeClr val="accent1"/>
-                </a:solidFill>
-                <a:effectLst>
-                  <a:outerShdw blurRad="38100" dist="25400" dir="5400000" algn="ctr" rotWithShape="0">
-                    <a:srgbClr val="6E747A">
-                      <a:alpha val="43000"/>
-                    </a:srgbClr>
-                  </a:outerShdw>
-                </a:effectLst>
-                <a:latin typeface="Segoe UI" panose="020B0502040204020203" pitchFamily="34" charset="0"/>
-                <a:cs typeface="Segoe UI" panose="020B0502040204020203" pitchFamily="34" charset="0"/>
-              </a:rPr>
-              <a:t>(II)</a:t>
+              <a:t> (II)</a:t>
             </a:r>
             <a:endParaRPr lang="es-AR" dirty="0"/>
           </a:p>
@@ -11661,11 +11593,6 @@
               </a:rPr>
               <a:t>Auto moderno – 1885 – Henry Ford o Karl Benz?</a:t>
             </a:r>
-            <a:endParaRPr lang="es-AR" sz="2000" dirty="0" smtClean="0">
-              <a:latin typeface="Segoe UI" pitchFamily="34" charset="0"/>
-              <a:ea typeface="Segoe UI" pitchFamily="34" charset="0"/>
-              <a:cs typeface="Segoe UI" pitchFamily="34" charset="0"/>
-            </a:endParaRPr>
           </a:p>
           <a:p>
             <a:pPr>
@@ -11681,11 +11608,6 @@
               </a:rPr>
               <a:t>Radiografía</a:t>
             </a:r>
-            <a:endParaRPr lang="es-AR" dirty="0" smtClean="0">
-              <a:latin typeface="Segoe UI" pitchFamily="34" charset="0"/>
-              <a:ea typeface="Segoe UI" pitchFamily="34" charset="0"/>
-              <a:cs typeface="Segoe UI" pitchFamily="34" charset="0"/>
-            </a:endParaRPr>
           </a:p>
           <a:p>
             <a:pPr>
@@ -11699,15 +11621,7 @@
                 <a:ea typeface="Segoe UI" pitchFamily="34" charset="0"/>
                 <a:cs typeface="Segoe UI" pitchFamily="34" charset="0"/>
               </a:rPr>
-              <a:t>Filmaciones o Imágenes en </a:t>
-            </a:r>
-            <a:r>
-              <a:rPr lang="es-AR" dirty="0" smtClean="0">
-                <a:latin typeface="Segoe UI" pitchFamily="34" charset="0"/>
-                <a:ea typeface="Segoe UI" pitchFamily="34" charset="0"/>
-                <a:cs typeface="Segoe UI" pitchFamily="34" charset="0"/>
-              </a:rPr>
-              <a:t>Movimiento</a:t>
+              <a:t>Filmaciones o Imágenes en Movimiento</a:t>
             </a:r>
           </a:p>
           <a:p>
@@ -11757,13 +11671,13 @@
   <p:clrMapOvr>
     <a:masterClrMapping/>
   </p:clrMapOvr>
-  <mc:AlternateContent xmlns:mc="http://schemas.openxmlformats.org/markup-compatibility/2006">
-    <mc:Choice xmlns:p14="http://schemas.microsoft.com/office/powerpoint/2010/main" xmlns="" Requires="p14">
+  <mc:AlternateContent xmlns:mc="http://schemas.openxmlformats.org/markup-compatibility/2006" xmlns:p14="http://schemas.microsoft.com/office/powerpoint/2010/main">
+    <mc:Choice Requires="p14">
       <p:transition spd="med" p14:dur="700">
         <p:fade/>
       </p:transition>
     </mc:Choice>
-    <mc:Fallback>
+    <mc:Fallback xmlns="">
       <p:transition spd="med">
         <p:fade/>
       </p:transition>
@@ -11917,61 +11831,7 @@
                 <a:latin typeface="Segoe UI" panose="020B0502040204020203" pitchFamily="34" charset="0"/>
                 <a:cs typeface="Segoe UI" panose="020B0502040204020203" pitchFamily="34" charset="0"/>
               </a:rPr>
-              <a:t> </a:t>
-            </a:r>
-            <a:r>
-              <a:rPr lang="en-US" spc="0" dirty="0" smtClean="0">
-                <a:ln w="0"/>
-                <a:solidFill>
-                  <a:schemeClr val="accent1"/>
-                </a:solidFill>
-                <a:effectLst>
-                  <a:outerShdw blurRad="38100" dist="25400" dir="5400000" algn="ctr" rotWithShape="0">
-                    <a:srgbClr val="6E747A">
-                      <a:alpha val="43000"/>
-                    </a:srgbClr>
-                  </a:outerShdw>
-                </a:effectLst>
-                <a:latin typeface="Segoe UI" panose="020B0502040204020203" pitchFamily="34" charset="0"/>
-                <a:cs typeface="Segoe UI" panose="020B0502040204020203" pitchFamily="34" charset="0"/>
-              </a:rPr>
-              <a:t>(</a:t>
-            </a:r>
-            <a:r>
-              <a:rPr lang="en-US" spc="0" dirty="0" smtClean="0">
-                <a:ln w="0"/>
-                <a:solidFill>
-                  <a:schemeClr val="accent1"/>
-                </a:solidFill>
-                <a:effectLst>
-                  <a:outerShdw blurRad="38100" dist="25400" dir="5400000" algn="ctr" rotWithShape="0">
-                    <a:srgbClr val="6E747A">
-                      <a:alpha val="43000"/>
-                    </a:srgbClr>
-                  </a:outerShdw>
-                </a:effectLst>
-                <a:latin typeface="Segoe UI" panose="020B0502040204020203" pitchFamily="34" charset="0"/>
-                <a:cs typeface="Segoe UI" panose="020B0502040204020203" pitchFamily="34" charset="0"/>
-              </a:rPr>
-              <a:t>III</a:t>
-            </a:r>
-            <a:r>
-              <a:rPr lang="en-US" spc="0" dirty="0" smtClean="0">
-                <a:ln w="0"/>
-                <a:solidFill>
-                  <a:schemeClr val="accent1"/>
-                </a:solidFill>
-                <a:effectLst>
-                  <a:outerShdw blurRad="38100" dist="25400" dir="5400000" algn="ctr" rotWithShape="0">
-                    <a:srgbClr val="6E747A">
-                      <a:alpha val="43000"/>
-                    </a:srgbClr>
-                  </a:outerShdw>
-                </a:effectLst>
-                <a:latin typeface="Segoe UI" panose="020B0502040204020203" pitchFamily="34" charset="0"/>
-                <a:cs typeface="Segoe UI" panose="020B0502040204020203" pitchFamily="34" charset="0"/>
-              </a:rPr>
-              <a:t>)</a:t>
+              <a:t> (III)</a:t>
             </a:r>
             <a:endParaRPr lang="es-AR" dirty="0"/>
           </a:p>
@@ -12045,13 +11905,13 @@
   <p:clrMapOvr>
     <a:masterClrMapping/>
   </p:clrMapOvr>
-  <mc:AlternateContent xmlns:mc="http://schemas.openxmlformats.org/markup-compatibility/2006">
-    <mc:Choice xmlns:p14="http://schemas.microsoft.com/office/powerpoint/2010/main" xmlns="" Requires="p14">
+  <mc:AlternateContent xmlns:mc="http://schemas.openxmlformats.org/markup-compatibility/2006" xmlns:p14="http://schemas.microsoft.com/office/powerpoint/2010/main">
+    <mc:Choice Requires="p14">
       <p:transition spd="med" p14:dur="700">
         <p:fade/>
       </p:transition>
     </mc:Choice>
-    <mc:Fallback>
+    <mc:Fallback xmlns="">
       <p:transition spd="med">
         <p:fade/>
       </p:transition>
@@ -12145,20 +12005,20 @@
     </p:spTree>
     <p:extLst>
       <p:ext uri="{BB962C8B-B14F-4D97-AF65-F5344CB8AC3E}">
-        <p14:creationId xmlns:p14="http://schemas.microsoft.com/office/powerpoint/2010/main" xmlns="" val="3439397754"/>
+        <p14:creationId xmlns:p14="http://schemas.microsoft.com/office/powerpoint/2010/main" val="3439397754"/>
       </p:ext>
     </p:extLst>
   </p:cSld>
   <p:clrMapOvr>
     <a:masterClrMapping/>
   </p:clrMapOvr>
-  <mc:AlternateContent xmlns:mc="http://schemas.openxmlformats.org/markup-compatibility/2006">
-    <mc:Choice xmlns:p14="http://schemas.microsoft.com/office/powerpoint/2010/main" xmlns="" Requires="p14">
+  <mc:AlternateContent xmlns:mc="http://schemas.openxmlformats.org/markup-compatibility/2006" xmlns:p14="http://schemas.microsoft.com/office/powerpoint/2010/main">
+    <mc:Choice Requires="p14">
       <p:transition spd="med" p14:dur="700">
         <p:fade/>
       </p:transition>
     </mc:Choice>
-    <mc:Fallback>
+    <mc:Fallback xmlns="">
       <p:transition spd="med">
         <p:fade/>
       </p:transition>
@@ -12327,20 +12187,20 @@
     </p:spTree>
     <p:extLst>
       <p:ext uri="{BB962C8B-B14F-4D97-AF65-F5344CB8AC3E}">
-        <p14:creationId xmlns:p14="http://schemas.microsoft.com/office/powerpoint/2010/main" xmlns="" val="2675216716"/>
+        <p14:creationId xmlns:p14="http://schemas.microsoft.com/office/powerpoint/2010/main" val="2675216716"/>
       </p:ext>
     </p:extLst>
   </p:cSld>
   <p:clrMapOvr>
     <a:masterClrMapping/>
   </p:clrMapOvr>
-  <mc:AlternateContent xmlns:mc="http://schemas.openxmlformats.org/markup-compatibility/2006">
-    <mc:Choice xmlns:p14="http://schemas.microsoft.com/office/powerpoint/2010/main" xmlns="" Requires="p14">
+  <mc:AlternateContent xmlns:mc="http://schemas.openxmlformats.org/markup-compatibility/2006" xmlns:p14="http://schemas.microsoft.com/office/powerpoint/2010/main">
+    <mc:Choice Requires="p14">
       <p:transition spd="med" p14:dur="700">
         <p:fade/>
       </p:transition>
     </mc:Choice>
-    <mc:Fallback>
+    <mc:Fallback xmlns="">
       <p:transition spd="med">
         <p:fade/>
       </p:transition>
@@ -12802,7 +12662,7 @@
           <a:blip r:embed="rId3" cstate="print">
             <a:extLst>
               <a:ext uri="{28A0092B-C50C-407E-A947-70E740481C1C}">
-                <a14:useLocalDpi xmlns:a14="http://schemas.microsoft.com/office/drawing/2010/main" xmlns="" val="0"/>
+                <a14:useLocalDpi xmlns:a14="http://schemas.microsoft.com/office/drawing/2010/main" val="0"/>
               </a:ext>
             </a:extLst>
           </a:blip>
@@ -12822,7 +12682,7 @@
           <a:noFill/>
           <a:extLst>
             <a:ext uri="{909E8E84-426E-40DD-AFC4-6F175D3DCCD1}">
-              <a14:hiddenFill xmlns:a14="http://schemas.microsoft.com/office/drawing/2010/main" xmlns="">
+              <a14:hiddenFill xmlns:a14="http://schemas.microsoft.com/office/drawing/2010/main">
                 <a:solidFill>
                   <a:srgbClr val="FFFFFF"/>
                 </a:solidFill>
@@ -12843,7 +12703,7 @@
           <a:blip r:embed="rId4" cstate="print">
             <a:extLst>
               <a:ext uri="{28A0092B-C50C-407E-A947-70E740481C1C}">
-                <a14:useLocalDpi xmlns:a14="http://schemas.microsoft.com/office/drawing/2010/main" xmlns="" val="0"/>
+                <a14:useLocalDpi xmlns:a14="http://schemas.microsoft.com/office/drawing/2010/main" val="0"/>
               </a:ext>
             </a:extLst>
           </a:blip>
@@ -12863,7 +12723,7 @@
           <a:noFill/>
           <a:extLst>
             <a:ext uri="{909E8E84-426E-40DD-AFC4-6F175D3DCCD1}">
-              <a14:hiddenFill xmlns:a14="http://schemas.microsoft.com/office/drawing/2010/main" xmlns="">
+              <a14:hiddenFill xmlns:a14="http://schemas.microsoft.com/office/drawing/2010/main">
                 <a:solidFill>
                   <a:srgbClr val="FFFFFF"/>
                 </a:solidFill>
@@ -12884,7 +12744,7 @@
           <a:blip r:embed="rId5" cstate="print">
             <a:extLst>
               <a:ext uri="{28A0092B-C50C-407E-A947-70E740481C1C}">
-                <a14:useLocalDpi xmlns:a14="http://schemas.microsoft.com/office/drawing/2010/main" xmlns="" val="0"/>
+                <a14:useLocalDpi xmlns:a14="http://schemas.microsoft.com/office/drawing/2010/main" val="0"/>
               </a:ext>
             </a:extLst>
           </a:blip>
@@ -12904,7 +12764,7 @@
           <a:noFill/>
           <a:extLst>
             <a:ext uri="{909E8E84-426E-40DD-AFC4-6F175D3DCCD1}">
-              <a14:hiddenFill xmlns:a14="http://schemas.microsoft.com/office/drawing/2010/main" xmlns="">
+              <a14:hiddenFill xmlns:a14="http://schemas.microsoft.com/office/drawing/2010/main">
                 <a:solidFill>
                   <a:srgbClr val="FFFFFF"/>
                 </a:solidFill>
@@ -12925,7 +12785,7 @@
           <a:blip r:embed="rId6" cstate="print">
             <a:extLst>
               <a:ext uri="{28A0092B-C50C-407E-A947-70E740481C1C}">
-                <a14:useLocalDpi xmlns:a14="http://schemas.microsoft.com/office/drawing/2010/main" xmlns="" val="0"/>
+                <a14:useLocalDpi xmlns:a14="http://schemas.microsoft.com/office/drawing/2010/main" val="0"/>
               </a:ext>
             </a:extLst>
           </a:blip>
@@ -12945,7 +12805,7 @@
           <a:noFill/>
           <a:extLst>
             <a:ext uri="{909E8E84-426E-40DD-AFC4-6F175D3DCCD1}">
-              <a14:hiddenFill xmlns:a14="http://schemas.microsoft.com/office/drawing/2010/main" xmlns="">
+              <a14:hiddenFill xmlns:a14="http://schemas.microsoft.com/office/drawing/2010/main">
                 <a:solidFill>
                   <a:srgbClr val="FFFFFF"/>
                 </a:solidFill>
@@ -12966,7 +12826,7 @@
           <a:blip r:embed="rId7" cstate="print">
             <a:extLst>
               <a:ext uri="{28A0092B-C50C-407E-A947-70E740481C1C}">
-                <a14:useLocalDpi xmlns:a14="http://schemas.microsoft.com/office/drawing/2010/main" xmlns="" val="0"/>
+                <a14:useLocalDpi xmlns:a14="http://schemas.microsoft.com/office/drawing/2010/main" val="0"/>
               </a:ext>
             </a:extLst>
           </a:blip>
@@ -12986,7 +12846,7 @@
           <a:noFill/>
           <a:extLst>
             <a:ext uri="{909E8E84-426E-40DD-AFC4-6F175D3DCCD1}">
-              <a14:hiddenFill xmlns:a14="http://schemas.microsoft.com/office/drawing/2010/main" xmlns="">
+              <a14:hiddenFill xmlns:a14="http://schemas.microsoft.com/office/drawing/2010/main">
                 <a:solidFill>
                   <a:srgbClr val="FFFFFF"/>
                 </a:solidFill>
@@ -12998,20 +12858,20 @@
     </p:spTree>
     <p:extLst>
       <p:ext uri="{BB962C8B-B14F-4D97-AF65-F5344CB8AC3E}">
-        <p14:creationId xmlns:p14="http://schemas.microsoft.com/office/powerpoint/2010/main" xmlns="" val="2564182459"/>
+        <p14:creationId xmlns:p14="http://schemas.microsoft.com/office/powerpoint/2010/main" val="2564182459"/>
       </p:ext>
     </p:extLst>
   </p:cSld>
   <p:clrMapOvr>
     <a:masterClrMapping/>
   </p:clrMapOvr>
-  <mc:AlternateContent xmlns:mc="http://schemas.openxmlformats.org/markup-compatibility/2006">
-    <mc:Choice xmlns:p14="http://schemas.microsoft.com/office/powerpoint/2010/main" xmlns="" Requires="p14">
+  <mc:AlternateContent xmlns:mc="http://schemas.openxmlformats.org/markup-compatibility/2006" xmlns:p14="http://schemas.microsoft.com/office/powerpoint/2010/main">
+    <mc:Choice Requires="p14">
       <p:transition spd="med" p14:dur="700">
         <p:fade/>
       </p:transition>
     </mc:Choice>
-    <mc:Fallback>
+    <mc:Fallback xmlns="">
       <p:transition spd="med">
         <p:fade/>
       </p:transition>
@@ -13163,20 +13023,20 @@
     </p:spTree>
     <p:extLst>
       <p:ext uri="{BB962C8B-B14F-4D97-AF65-F5344CB8AC3E}">
-        <p14:creationId xmlns:p14="http://schemas.microsoft.com/office/powerpoint/2010/main" xmlns="" val="3106206852"/>
+        <p14:creationId xmlns:p14="http://schemas.microsoft.com/office/powerpoint/2010/main" val="3106206852"/>
       </p:ext>
     </p:extLst>
   </p:cSld>
   <p:clrMapOvr>
     <a:masterClrMapping/>
   </p:clrMapOvr>
-  <mc:AlternateContent xmlns:mc="http://schemas.openxmlformats.org/markup-compatibility/2006">
-    <mc:Choice xmlns:p14="http://schemas.microsoft.com/office/powerpoint/2010/main" xmlns="" Requires="p14">
+  <mc:AlternateContent xmlns:mc="http://schemas.openxmlformats.org/markup-compatibility/2006" xmlns:p14="http://schemas.microsoft.com/office/powerpoint/2010/main">
+    <mc:Choice Requires="p14">
       <p:transition spd="med" p14:dur="700">
         <p:fade/>
       </p:transition>
     </mc:Choice>
-    <mc:Fallback>
+    <mc:Fallback xmlns="">
       <p:transition spd="med">
         <p:fade/>
       </p:transition>
@@ -13335,20 +13195,20 @@
     </p:spTree>
     <p:extLst>
       <p:ext uri="{BB962C8B-B14F-4D97-AF65-F5344CB8AC3E}">
-        <p14:creationId xmlns:p14="http://schemas.microsoft.com/office/powerpoint/2010/main" xmlns="" val="965594786"/>
+        <p14:creationId xmlns:p14="http://schemas.microsoft.com/office/powerpoint/2010/main" val="965594786"/>
       </p:ext>
     </p:extLst>
   </p:cSld>
   <p:clrMapOvr>
     <a:masterClrMapping/>
   </p:clrMapOvr>
-  <mc:AlternateContent xmlns:mc="http://schemas.openxmlformats.org/markup-compatibility/2006">
-    <mc:Choice xmlns:p14="http://schemas.microsoft.com/office/powerpoint/2010/main" xmlns="" Requires="p14">
+  <mc:AlternateContent xmlns:mc="http://schemas.openxmlformats.org/markup-compatibility/2006" xmlns:p14="http://schemas.microsoft.com/office/powerpoint/2010/main">
+    <mc:Choice Requires="p14">
       <p:transition spd="med" p14:dur="700">
         <p:fade/>
       </p:transition>
     </mc:Choice>
-    <mc:Fallback>
+    <mc:Fallback xmlns="">
       <p:transition spd="med">
         <p:fade/>
       </p:transition>
@@ -13606,7 +13466,7 @@
           <a:blip r:embed="rId3" cstate="print">
             <a:extLst>
               <a:ext uri="{28A0092B-C50C-407E-A947-70E740481C1C}">
-                <a14:useLocalDpi xmlns:a14="http://schemas.microsoft.com/office/drawing/2010/main" xmlns="" val="0"/>
+                <a14:useLocalDpi xmlns:a14="http://schemas.microsoft.com/office/drawing/2010/main" val="0"/>
               </a:ext>
             </a:extLst>
           </a:blip>
@@ -13626,7 +13486,7 @@
           <a:noFill/>
           <a:extLst>
             <a:ext uri="{909E8E84-426E-40DD-AFC4-6F175D3DCCD1}">
-              <a14:hiddenFill xmlns:a14="http://schemas.microsoft.com/office/drawing/2010/main" xmlns="">
+              <a14:hiddenFill xmlns:a14="http://schemas.microsoft.com/office/drawing/2010/main">
                 <a:solidFill>
                   <a:srgbClr val="FFFFFF"/>
                 </a:solidFill>
@@ -13638,20 +13498,20 @@
     </p:spTree>
     <p:extLst>
       <p:ext uri="{BB962C8B-B14F-4D97-AF65-F5344CB8AC3E}">
-        <p14:creationId xmlns:p14="http://schemas.microsoft.com/office/powerpoint/2010/main" xmlns="" val="3356351472"/>
+        <p14:creationId xmlns:p14="http://schemas.microsoft.com/office/powerpoint/2010/main" val="3356351472"/>
       </p:ext>
     </p:extLst>
   </p:cSld>
   <p:clrMapOvr>
     <a:masterClrMapping/>
   </p:clrMapOvr>
-  <mc:AlternateContent xmlns:mc="http://schemas.openxmlformats.org/markup-compatibility/2006">
-    <mc:Choice xmlns:p14="http://schemas.microsoft.com/office/powerpoint/2010/main" xmlns="" Requires="p14">
+  <mc:AlternateContent xmlns:mc="http://schemas.openxmlformats.org/markup-compatibility/2006" xmlns:p14="http://schemas.microsoft.com/office/powerpoint/2010/main">
+    <mc:Choice Requires="p14">
       <p:transition spd="med" p14:dur="700">
         <p:fade/>
       </p:transition>
     </mc:Choice>
-    <mc:Fallback>
+    <mc:Fallback xmlns="">
       <p:transition spd="med">
         <p:fade/>
       </p:transition>
@@ -13879,7 +13739,7 @@
           <a:blip r:embed="rId3" cstate="print">
             <a:extLst>
               <a:ext uri="{28A0092B-C50C-407E-A947-70E740481C1C}">
-                <a14:useLocalDpi xmlns:a14="http://schemas.microsoft.com/office/drawing/2010/main" xmlns="" val="0"/>
+                <a14:useLocalDpi xmlns:a14="http://schemas.microsoft.com/office/drawing/2010/main" val="0"/>
               </a:ext>
             </a:extLst>
           </a:blip>
@@ -13899,7 +13759,7 @@
           <a:noFill/>
           <a:extLst>
             <a:ext uri="{909E8E84-426E-40DD-AFC4-6F175D3DCCD1}">
-              <a14:hiddenFill xmlns:a14="http://schemas.microsoft.com/office/drawing/2010/main" xmlns="">
+              <a14:hiddenFill xmlns:a14="http://schemas.microsoft.com/office/drawing/2010/main">
                 <a:solidFill>
                   <a:srgbClr val="FFFFFF"/>
                 </a:solidFill>
@@ -13911,20 +13771,20 @@
     </p:spTree>
     <p:extLst>
       <p:ext uri="{BB962C8B-B14F-4D97-AF65-F5344CB8AC3E}">
-        <p14:creationId xmlns:p14="http://schemas.microsoft.com/office/powerpoint/2010/main" xmlns="" val="3374507202"/>
+        <p14:creationId xmlns:p14="http://schemas.microsoft.com/office/powerpoint/2010/main" val="3374507202"/>
       </p:ext>
     </p:extLst>
   </p:cSld>
   <p:clrMapOvr>
     <a:masterClrMapping/>
   </p:clrMapOvr>
-  <mc:AlternateContent xmlns:mc="http://schemas.openxmlformats.org/markup-compatibility/2006">
-    <mc:Choice xmlns:p14="http://schemas.microsoft.com/office/powerpoint/2010/main" xmlns="" Requires="p14">
+  <mc:AlternateContent xmlns:mc="http://schemas.openxmlformats.org/markup-compatibility/2006" xmlns:p14="http://schemas.microsoft.com/office/powerpoint/2010/main">
+    <mc:Choice Requires="p14">
       <p:transition spd="med" p14:dur="700">
         <p:fade/>
       </p:transition>
     </mc:Choice>
-    <mc:Fallback>
+    <mc:Fallback xmlns="">
       <p:transition spd="med">
         <p:fade/>
       </p:transition>
@@ -14026,7 +13886,7 @@
         </p:spPr>
         <p:txBody>
           <a:bodyPr>
-            <a:normAutofit lnSpcReduction="10000"/>
+            <a:normAutofit/>
           </a:bodyPr>
           <a:lstStyle/>
           <a:p>
@@ -14040,8 +13900,19 @@
                 <a:latin typeface="Segoe UI" panose="020B0502040204020203" pitchFamily="34" charset="0"/>
                 <a:cs typeface="Segoe UI" panose="020B0502040204020203" pitchFamily="34" charset="0"/>
               </a:rPr>
-              <a:t>Personal deshonesto</a:t>
-            </a:r>
+              <a:t>Personal </a:t>
+            </a:r>
+            <a:r>
+              <a:rPr lang="es-AR" dirty="0" smtClean="0">
+                <a:latin typeface="Segoe UI" panose="020B0502040204020203" pitchFamily="34" charset="0"/>
+                <a:cs typeface="Segoe UI" panose="020B0502040204020203" pitchFamily="34" charset="0"/>
+              </a:rPr>
+              <a:t>deshonesto con autorizaciones de acceso sensibles</a:t>
+            </a:r>
+            <a:endParaRPr lang="es-AR" dirty="0" smtClean="0">
+              <a:latin typeface="Segoe UI" panose="020B0502040204020203" pitchFamily="34" charset="0"/>
+              <a:cs typeface="Segoe UI" panose="020B0502040204020203" pitchFamily="34" charset="0"/>
+            </a:endParaRPr>
           </a:p>
           <a:p>
             <a:pPr>
@@ -14082,42 +13953,39 @@
                 <a:latin typeface="Segoe UI" panose="020B0502040204020203" pitchFamily="34" charset="0"/>
                 <a:cs typeface="Segoe UI" panose="020B0502040204020203" pitchFamily="34" charset="0"/>
               </a:rPr>
-              <a:t>Dependencia de los sistemas informáticos</a:t>
-            </a:r>
-          </a:p>
-          <a:p>
-            <a:pPr>
-              <a:lnSpc>
-                <a:spcPct val="150000"/>
-              </a:lnSpc>
-            </a:pPr>
+              <a:t>Dependencia de los sistemas </a:t>
+            </a:r>
             <a:r>
               <a:rPr lang="es-AR" dirty="0" smtClean="0">
                 <a:latin typeface="Segoe UI" panose="020B0502040204020203" pitchFamily="34" charset="0"/>
                 <a:cs typeface="Segoe UI" panose="020B0502040204020203" pitchFamily="34" charset="0"/>
               </a:rPr>
-              <a:t>Necesidad de capacitación de operarios</a:t>
-            </a:r>
+              <a:t>informáticos</a:t>
+            </a:r>
+            <a:endParaRPr lang="es-AR" dirty="0" smtClean="0">
+              <a:latin typeface="Segoe UI" panose="020B0502040204020203" pitchFamily="34" charset="0"/>
+              <a:cs typeface="Segoe UI" panose="020B0502040204020203" pitchFamily="34" charset="0"/>
+            </a:endParaRPr>
           </a:p>
         </p:txBody>
       </p:sp>
     </p:spTree>
     <p:extLst>
       <p:ext uri="{BB962C8B-B14F-4D97-AF65-F5344CB8AC3E}">
-        <p14:creationId xmlns:p14="http://schemas.microsoft.com/office/powerpoint/2010/main" xmlns="" val="2238024562"/>
+        <p14:creationId xmlns:p14="http://schemas.microsoft.com/office/powerpoint/2010/main" val="2238024562"/>
       </p:ext>
     </p:extLst>
   </p:cSld>
   <p:clrMapOvr>
     <a:masterClrMapping/>
   </p:clrMapOvr>
-  <mc:AlternateContent xmlns:mc="http://schemas.openxmlformats.org/markup-compatibility/2006">
-    <mc:Choice xmlns:p14="http://schemas.microsoft.com/office/powerpoint/2010/main" xmlns="" Requires="p14">
+  <mc:AlternateContent xmlns:mc="http://schemas.openxmlformats.org/markup-compatibility/2006" xmlns:p14="http://schemas.microsoft.com/office/powerpoint/2010/main">
+    <mc:Choice Requires="p14">
       <p:transition spd="med" p14:dur="700">
         <p:fade/>
       </p:transition>
     </mc:Choice>
-    <mc:Fallback>
+    <mc:Fallback xmlns="">
       <p:transition spd="med">
         <p:fade/>
       </p:transition>
@@ -14247,7 +14115,14 @@
                 <a:latin typeface="Segoe UI" panose="020B0502040204020203" pitchFamily="34" charset="0"/>
                 <a:cs typeface="Segoe UI" panose="020B0502040204020203" pitchFamily="34" charset="0"/>
               </a:rPr>
-              <a:t>Dependencia de empleados claves</a:t>
+              <a:t>Dependencia de empleados </a:t>
+            </a:r>
+            <a:r>
+              <a:rPr lang="es-AR" dirty="0" smtClean="0">
+                <a:latin typeface="Segoe UI" panose="020B0502040204020203" pitchFamily="34" charset="0"/>
+                <a:cs typeface="Segoe UI" panose="020B0502040204020203" pitchFamily="34" charset="0"/>
+              </a:rPr>
+              <a:t>claves</a:t>
             </a:r>
           </a:p>
           <a:p>
@@ -14261,7 +14136,14 @@
                 <a:latin typeface="Segoe UI" panose="020B0502040204020203" pitchFamily="34" charset="0"/>
                 <a:cs typeface="Segoe UI" panose="020B0502040204020203" pitchFamily="34" charset="0"/>
               </a:rPr>
-              <a:t>Comodidad y confianza excesiva de sistemas</a:t>
+              <a:t>Generación </a:t>
+            </a:r>
+            <a:r>
+              <a:rPr lang="es-AR" dirty="0" smtClean="0">
+                <a:latin typeface="Segoe UI" panose="020B0502040204020203" pitchFamily="34" charset="0"/>
+                <a:cs typeface="Segoe UI" panose="020B0502040204020203" pitchFamily="34" charset="0"/>
+              </a:rPr>
+              <a:t>de información residual</a:t>
             </a:r>
           </a:p>
           <a:p>
@@ -14275,20 +14157,6 @@
                 <a:latin typeface="Segoe UI" panose="020B0502040204020203" pitchFamily="34" charset="0"/>
                 <a:cs typeface="Segoe UI" panose="020B0502040204020203" pitchFamily="34" charset="0"/>
               </a:rPr>
-              <a:t>Generación de información residual</a:t>
-            </a:r>
-          </a:p>
-          <a:p>
-            <a:pPr>
-              <a:lnSpc>
-                <a:spcPct val="150000"/>
-              </a:lnSpc>
-            </a:pPr>
-            <a:r>
-              <a:rPr lang="es-AR" dirty="0" smtClean="0">
-                <a:latin typeface="Segoe UI" panose="020B0502040204020203" pitchFamily="34" charset="0"/>
-                <a:cs typeface="Segoe UI" panose="020B0502040204020203" pitchFamily="34" charset="0"/>
-              </a:rPr>
               <a:t>Siniestro del soporte físico de la información</a:t>
             </a:r>
             <a:endParaRPr lang="es-AR" dirty="0">
@@ -14301,20 +14169,20 @@
     </p:spTree>
     <p:extLst>
       <p:ext uri="{BB962C8B-B14F-4D97-AF65-F5344CB8AC3E}">
-        <p14:creationId xmlns:p14="http://schemas.microsoft.com/office/powerpoint/2010/main" xmlns="" val="3874537101"/>
+        <p14:creationId xmlns:p14="http://schemas.microsoft.com/office/powerpoint/2010/main" val="3874537101"/>
       </p:ext>
     </p:extLst>
   </p:cSld>
   <p:clrMapOvr>
     <a:masterClrMapping/>
   </p:clrMapOvr>
-  <mc:AlternateContent xmlns:mc="http://schemas.openxmlformats.org/markup-compatibility/2006">
-    <mc:Choice xmlns:p14="http://schemas.microsoft.com/office/powerpoint/2010/main" xmlns="" Requires="p14">
+  <mc:AlternateContent xmlns:mc="http://schemas.openxmlformats.org/markup-compatibility/2006" xmlns:p14="http://schemas.microsoft.com/office/powerpoint/2010/main">
+    <mc:Choice Requires="p14">
       <p:transition spd="med" p14:dur="700">
         <p:fade/>
       </p:transition>
     </mc:Choice>
-    <mc:Fallback>
+    <mc:Fallback xmlns="">
       <p:transition spd="med">
         <p:fade/>
       </p:transition>
@@ -14448,20 +14316,20 @@
     </p:spTree>
     <p:extLst>
       <p:ext uri="{BB962C8B-B14F-4D97-AF65-F5344CB8AC3E}">
-        <p14:creationId xmlns:p14="http://schemas.microsoft.com/office/powerpoint/2010/main" xmlns="" val="1202384585"/>
+        <p14:creationId xmlns:p14="http://schemas.microsoft.com/office/powerpoint/2010/main" val="1202384585"/>
       </p:ext>
     </p:extLst>
   </p:cSld>
   <p:clrMapOvr>
     <a:masterClrMapping/>
   </p:clrMapOvr>
-  <mc:AlternateContent xmlns:mc="http://schemas.openxmlformats.org/markup-compatibility/2006">
-    <mc:Choice xmlns:p14="http://schemas.microsoft.com/office/powerpoint/2010/main" xmlns="" Requires="p14">
+  <mc:AlternateContent xmlns:mc="http://schemas.openxmlformats.org/markup-compatibility/2006" xmlns:p14="http://schemas.microsoft.com/office/powerpoint/2010/main">
+    <mc:Choice Requires="p14">
       <p:transition spd="med" p14:dur="700">
         <p:fade/>
       </p:transition>
     </mc:Choice>
-    <mc:Fallback>
+    <mc:Fallback xmlns="">
       <p:transition spd="med">
         <p:fade/>
       </p:transition>
@@ -14693,20 +14561,20 @@
     </p:spTree>
     <p:extLst>
       <p:ext uri="{BB962C8B-B14F-4D97-AF65-F5344CB8AC3E}">
-        <p14:creationId xmlns:p14="http://schemas.microsoft.com/office/powerpoint/2010/main" xmlns="" val="701687324"/>
+        <p14:creationId xmlns:p14="http://schemas.microsoft.com/office/powerpoint/2010/main" val="701687324"/>
       </p:ext>
     </p:extLst>
   </p:cSld>
   <p:clrMapOvr>
     <a:masterClrMapping/>
   </p:clrMapOvr>
-  <mc:AlternateContent xmlns:mc="http://schemas.openxmlformats.org/markup-compatibility/2006">
-    <mc:Choice xmlns:p14="http://schemas.microsoft.com/office/powerpoint/2010/main" xmlns="" Requires="p14">
+  <mc:AlternateContent xmlns:mc="http://schemas.openxmlformats.org/markup-compatibility/2006" xmlns:p14="http://schemas.microsoft.com/office/powerpoint/2010/main">
+    <mc:Choice Requires="p14">
       <p:transition spd="med" p14:dur="700">
         <p:fade/>
       </p:transition>
     </mc:Choice>
-    <mc:Fallback>
+    <mc:Fallback xmlns="">
       <p:transition spd="med">
         <p:fade/>
       </p:transition>
@@ -14860,20 +14728,20 @@
     </p:spTree>
     <p:extLst>
       <p:ext uri="{BB962C8B-B14F-4D97-AF65-F5344CB8AC3E}">
-        <p14:creationId xmlns:p14="http://schemas.microsoft.com/office/powerpoint/2010/main" xmlns="" val="1445017764"/>
+        <p14:creationId xmlns:p14="http://schemas.microsoft.com/office/powerpoint/2010/main" val="1445017764"/>
       </p:ext>
     </p:extLst>
   </p:cSld>
   <p:clrMapOvr>
     <a:masterClrMapping/>
   </p:clrMapOvr>
-  <mc:AlternateContent xmlns:mc="http://schemas.openxmlformats.org/markup-compatibility/2006">
-    <mc:Choice xmlns:p14="http://schemas.microsoft.com/office/powerpoint/2010/main" xmlns="" Requires="p14">
+  <mc:AlternateContent xmlns:mc="http://schemas.openxmlformats.org/markup-compatibility/2006" xmlns:p14="http://schemas.microsoft.com/office/powerpoint/2010/main">
+    <mc:Choice Requires="p14">
       <p:transition spd="med" p14:dur="700">
         <p:fade/>
       </p:transition>
     </mc:Choice>
-    <mc:Fallback>
+    <mc:Fallback xmlns="">
       <p:transition spd="med">
         <p:fade/>
       </p:transition>
@@ -15054,20 +14922,20 @@
     </p:spTree>
     <p:extLst>
       <p:ext uri="{BB962C8B-B14F-4D97-AF65-F5344CB8AC3E}">
-        <p14:creationId xmlns:p14="http://schemas.microsoft.com/office/powerpoint/2010/main" xmlns="" val="3810472897"/>
+        <p14:creationId xmlns:p14="http://schemas.microsoft.com/office/powerpoint/2010/main" val="3810472897"/>
       </p:ext>
     </p:extLst>
   </p:cSld>
   <p:clrMapOvr>
     <a:masterClrMapping/>
   </p:clrMapOvr>
-  <mc:AlternateContent xmlns:mc="http://schemas.openxmlformats.org/markup-compatibility/2006">
-    <mc:Choice xmlns:p14="http://schemas.microsoft.com/office/powerpoint/2010/main" xmlns="" Requires="p14">
+  <mc:AlternateContent xmlns:mc="http://schemas.openxmlformats.org/markup-compatibility/2006" xmlns:p14="http://schemas.microsoft.com/office/powerpoint/2010/main">
+    <mc:Choice Requires="p14">
       <p:transition spd="med" p14:dur="700">
         <p:fade/>
       </p:transition>
     </mc:Choice>
-    <mc:Fallback>
+    <mc:Fallback xmlns="">
       <p:transition spd="med">
         <p:fade/>
       </p:transition>
@@ -15132,20 +15000,20 @@
     </p:spTree>
     <p:extLst>
       <p:ext uri="{BB962C8B-B14F-4D97-AF65-F5344CB8AC3E}">
-        <p14:creationId xmlns:p14="http://schemas.microsoft.com/office/powerpoint/2010/main" xmlns="" val="1539601608"/>
+        <p14:creationId xmlns:p14="http://schemas.microsoft.com/office/powerpoint/2010/main" val="1539601608"/>
       </p:ext>
     </p:extLst>
   </p:cSld>
   <p:clrMapOvr>
     <a:masterClrMapping/>
   </p:clrMapOvr>
-  <mc:AlternateContent xmlns:mc="http://schemas.openxmlformats.org/markup-compatibility/2006">
-    <mc:Choice xmlns:p14="http://schemas.microsoft.com/office/powerpoint/2010/main" xmlns="" Requires="p14">
+  <mc:AlternateContent xmlns:mc="http://schemas.openxmlformats.org/markup-compatibility/2006" xmlns:p14="http://schemas.microsoft.com/office/powerpoint/2010/main">
+    <mc:Choice Requires="p14">
       <p:transition spd="med" p14:dur="700">
         <p:fade/>
       </p:transition>
     </mc:Choice>
-    <mc:Fallback>
+    <mc:Fallback xmlns="">
       <p:transition spd="med">
         <p:fade/>
       </p:transition>
@@ -15425,20 +15293,20 @@
     </p:spTree>
     <p:extLst>
       <p:ext uri="{BB962C8B-B14F-4D97-AF65-F5344CB8AC3E}">
-        <p14:creationId xmlns:p14="http://schemas.microsoft.com/office/powerpoint/2010/main" xmlns="" val="3323359930"/>
+        <p14:creationId xmlns:p14="http://schemas.microsoft.com/office/powerpoint/2010/main" val="3323359930"/>
       </p:ext>
     </p:extLst>
   </p:cSld>
   <p:clrMapOvr>
     <a:masterClrMapping/>
   </p:clrMapOvr>
-  <mc:AlternateContent xmlns:mc="http://schemas.openxmlformats.org/markup-compatibility/2006">
-    <mc:Choice xmlns:p14="http://schemas.microsoft.com/office/powerpoint/2010/main" xmlns="" Requires="p14">
+  <mc:AlternateContent xmlns:mc="http://schemas.openxmlformats.org/markup-compatibility/2006" xmlns:p14="http://schemas.microsoft.com/office/powerpoint/2010/main">
+    <mc:Choice Requires="p14">
       <p:transition spd="med" p14:dur="700">
         <p:fade/>
       </p:transition>
     </mc:Choice>
-    <mc:Fallback>
+    <mc:Fallback xmlns="">
       <p:transition spd="med">
         <p:fade/>
       </p:transition>
@@ -15584,20 +15452,20 @@
     </p:spTree>
     <p:extLst>
       <p:ext uri="{BB962C8B-B14F-4D97-AF65-F5344CB8AC3E}">
-        <p14:creationId xmlns:p14="http://schemas.microsoft.com/office/powerpoint/2010/main" xmlns="" val="3280227416"/>
+        <p14:creationId xmlns:p14="http://schemas.microsoft.com/office/powerpoint/2010/main" val="3280227416"/>
       </p:ext>
     </p:extLst>
   </p:cSld>
   <p:clrMapOvr>
     <a:masterClrMapping/>
   </p:clrMapOvr>
-  <mc:AlternateContent xmlns:mc="http://schemas.openxmlformats.org/markup-compatibility/2006">
-    <mc:Choice xmlns:p14="http://schemas.microsoft.com/office/powerpoint/2010/main" xmlns="" Requires="p14">
+  <mc:AlternateContent xmlns:mc="http://schemas.openxmlformats.org/markup-compatibility/2006" xmlns:p14="http://schemas.microsoft.com/office/powerpoint/2010/main">
+    <mc:Choice Requires="p14">
       <p:transition spd="med" p14:dur="700">
         <p:fade/>
       </p:transition>
     </mc:Choice>
-    <mc:Fallback>
+    <mc:Fallback xmlns="">
       <p:transition spd="med">
         <p:fade/>
       </p:transition>
@@ -15817,20 +15685,20 @@
     </p:spTree>
     <p:extLst>
       <p:ext uri="{BB962C8B-B14F-4D97-AF65-F5344CB8AC3E}">
-        <p14:creationId xmlns:p14="http://schemas.microsoft.com/office/powerpoint/2010/main" xmlns="" val="3816537714"/>
+        <p14:creationId xmlns:p14="http://schemas.microsoft.com/office/powerpoint/2010/main" val="3816537714"/>
       </p:ext>
     </p:extLst>
   </p:cSld>
   <p:clrMapOvr>
     <a:masterClrMapping/>
   </p:clrMapOvr>
-  <mc:AlternateContent xmlns:mc="http://schemas.openxmlformats.org/markup-compatibility/2006">
-    <mc:Choice xmlns:p14="http://schemas.microsoft.com/office/powerpoint/2010/main" xmlns="" Requires="p14">
+  <mc:AlternateContent xmlns:mc="http://schemas.openxmlformats.org/markup-compatibility/2006" xmlns:p14="http://schemas.microsoft.com/office/powerpoint/2010/main">
+    <mc:Choice Requires="p14">
       <p:transition spd="med" p14:dur="700">
         <p:fade/>
       </p:transition>
     </mc:Choice>
-    <mc:Fallback>
+    <mc:Fallback xmlns="">
       <p:transition spd="med">
         <p:fade/>
       </p:transition>
@@ -16008,20 +15876,20 @@
     </p:spTree>
     <p:extLst>
       <p:ext uri="{BB962C8B-B14F-4D97-AF65-F5344CB8AC3E}">
-        <p14:creationId xmlns:p14="http://schemas.microsoft.com/office/powerpoint/2010/main" xmlns="" val="2896967631"/>
+        <p14:creationId xmlns:p14="http://schemas.microsoft.com/office/powerpoint/2010/main" val="2896967631"/>
       </p:ext>
     </p:extLst>
   </p:cSld>
   <p:clrMapOvr>
     <a:masterClrMapping/>
   </p:clrMapOvr>
-  <mc:AlternateContent xmlns:mc="http://schemas.openxmlformats.org/markup-compatibility/2006">
-    <mc:Choice xmlns:p14="http://schemas.microsoft.com/office/powerpoint/2010/main" xmlns="" Requires="p14">
+  <mc:AlternateContent xmlns:mc="http://schemas.openxmlformats.org/markup-compatibility/2006" xmlns:p14="http://schemas.microsoft.com/office/powerpoint/2010/main">
+    <mc:Choice Requires="p14">
       <p:transition spd="med" p14:dur="700">
         <p:fade/>
       </p:transition>
     </mc:Choice>
-    <mc:Fallback>
+    <mc:Fallback xmlns="">
       <p:transition spd="med">
         <p:fade/>
       </p:transition>
@@ -16287,20 +16155,20 @@
     </p:spTree>
     <p:extLst>
       <p:ext uri="{BB962C8B-B14F-4D97-AF65-F5344CB8AC3E}">
-        <p14:creationId xmlns:p14="http://schemas.microsoft.com/office/powerpoint/2010/main" xmlns="" val="1108506989"/>
+        <p14:creationId xmlns:p14="http://schemas.microsoft.com/office/powerpoint/2010/main" val="1108506989"/>
       </p:ext>
     </p:extLst>
   </p:cSld>
   <p:clrMapOvr>
     <a:masterClrMapping/>
   </p:clrMapOvr>
-  <mc:AlternateContent xmlns:mc="http://schemas.openxmlformats.org/markup-compatibility/2006">
-    <mc:Choice xmlns:p14="http://schemas.microsoft.com/office/powerpoint/2010/main" xmlns="" Requires="p14">
+  <mc:AlternateContent xmlns:mc="http://schemas.openxmlformats.org/markup-compatibility/2006" xmlns:p14="http://schemas.microsoft.com/office/powerpoint/2010/main">
+    <mc:Choice Requires="p14">
       <p:transition spd="med" p14:dur="700">
         <p:fade/>
       </p:transition>
     </mc:Choice>
-    <mc:Fallback>
+    <mc:Fallback xmlns="">
       <p:transition spd="med">
         <p:fade/>
       </p:transition>
@@ -16399,20 +16267,20 @@
     </p:spTree>
     <p:extLst>
       <p:ext uri="{BB962C8B-B14F-4D97-AF65-F5344CB8AC3E}">
-        <p14:creationId xmlns:p14="http://schemas.microsoft.com/office/powerpoint/2010/main" xmlns="" val="1108506989"/>
+        <p14:creationId xmlns:p14="http://schemas.microsoft.com/office/powerpoint/2010/main" val="1108506989"/>
       </p:ext>
     </p:extLst>
   </p:cSld>
   <p:clrMapOvr>
     <a:masterClrMapping/>
   </p:clrMapOvr>
-  <mc:AlternateContent xmlns:mc="http://schemas.openxmlformats.org/markup-compatibility/2006">
-    <mc:Choice xmlns:p14="http://schemas.microsoft.com/office/powerpoint/2010/main" xmlns="" Requires="p14">
+  <mc:AlternateContent xmlns:mc="http://schemas.openxmlformats.org/markup-compatibility/2006" xmlns:p14="http://schemas.microsoft.com/office/powerpoint/2010/main">
+    <mc:Choice Requires="p14">
       <p:transition spd="med" p14:dur="700">
         <p:fade/>
       </p:transition>
     </mc:Choice>
-    <mc:Fallback>
+    <mc:Fallback xmlns="">
       <p:transition spd="med">
         <p:fade/>
       </p:transition>
@@ -16678,7 +16546,7 @@
           <a:blip r:embed="rId2" cstate="print">
             <a:extLst>
               <a:ext uri="{28A0092B-C50C-407E-A947-70E740481C1C}">
-                <a14:useLocalDpi xmlns:a14="http://schemas.microsoft.com/office/drawing/2010/main" xmlns="" val="0"/>
+                <a14:useLocalDpi xmlns:a14="http://schemas.microsoft.com/office/drawing/2010/main" val="0"/>
               </a:ext>
             </a:extLst>
           </a:blip>
@@ -16698,7 +16566,7 @@
           <a:noFill/>
           <a:extLst>
             <a:ext uri="{909E8E84-426E-40DD-AFC4-6F175D3DCCD1}">
-              <a14:hiddenFill xmlns:a14="http://schemas.microsoft.com/office/drawing/2010/main" xmlns="">
+              <a14:hiddenFill xmlns:a14="http://schemas.microsoft.com/office/drawing/2010/main">
                 <a:solidFill>
                   <a:srgbClr val="FFFFFF"/>
                 </a:solidFill>
@@ -16710,20 +16578,20 @@
     </p:spTree>
     <p:extLst>
       <p:ext uri="{BB962C8B-B14F-4D97-AF65-F5344CB8AC3E}">
-        <p14:creationId xmlns:p14="http://schemas.microsoft.com/office/powerpoint/2010/main" xmlns="" val="1350001534"/>
+        <p14:creationId xmlns:p14="http://schemas.microsoft.com/office/powerpoint/2010/main" val="1350001534"/>
       </p:ext>
     </p:extLst>
   </p:cSld>
   <p:clrMapOvr>
     <a:masterClrMapping/>
   </p:clrMapOvr>
-  <mc:AlternateContent xmlns:mc="http://schemas.openxmlformats.org/markup-compatibility/2006">
-    <mc:Choice xmlns:p14="http://schemas.microsoft.com/office/powerpoint/2010/main" xmlns="" Requires="p14">
+  <mc:AlternateContent xmlns:mc="http://schemas.openxmlformats.org/markup-compatibility/2006" xmlns:p14="http://schemas.microsoft.com/office/powerpoint/2010/main">
+    <mc:Choice Requires="p14">
       <p:transition spd="med" p14:dur="700">
         <p:fade/>
       </p:transition>
     </mc:Choice>
-    <mc:Fallback>
+    <mc:Fallback xmlns="">
       <p:transition spd="med">
         <p:fade/>
       </p:transition>
@@ -17103,20 +16971,20 @@
     </p:spTree>
     <p:extLst>
       <p:ext uri="{BB962C8B-B14F-4D97-AF65-F5344CB8AC3E}">
-        <p14:creationId xmlns:p14="http://schemas.microsoft.com/office/powerpoint/2010/main" xmlns="" val="3438441757"/>
+        <p14:creationId xmlns:p14="http://schemas.microsoft.com/office/powerpoint/2010/main" val="3438441757"/>
       </p:ext>
     </p:extLst>
   </p:cSld>
   <p:clrMapOvr>
     <a:masterClrMapping/>
   </p:clrMapOvr>
-  <mc:AlternateContent xmlns:mc="http://schemas.openxmlformats.org/markup-compatibility/2006">
-    <mc:Choice xmlns:p14="http://schemas.microsoft.com/office/powerpoint/2010/main" xmlns="" Requires="p14">
+  <mc:AlternateContent xmlns:mc="http://schemas.openxmlformats.org/markup-compatibility/2006" xmlns:p14="http://schemas.microsoft.com/office/powerpoint/2010/main">
+    <mc:Choice Requires="p14">
       <p:transition spd="med" p14:dur="700">
         <p:fade/>
       </p:transition>
     </mc:Choice>
-    <mc:Fallback>
+    <mc:Fallback xmlns="">
       <p:transition spd="med">
         <p:fade/>
       </p:transition>
@@ -17373,20 +17241,20 @@
     </p:spTree>
     <p:extLst>
       <p:ext uri="{BB962C8B-B14F-4D97-AF65-F5344CB8AC3E}">
-        <p14:creationId xmlns:p14="http://schemas.microsoft.com/office/powerpoint/2010/main" xmlns="" val="3833366108"/>
+        <p14:creationId xmlns:p14="http://schemas.microsoft.com/office/powerpoint/2010/main" val="3833366108"/>
       </p:ext>
     </p:extLst>
   </p:cSld>
   <p:clrMapOvr>
     <a:masterClrMapping/>
   </p:clrMapOvr>
-  <mc:AlternateContent xmlns:mc="http://schemas.openxmlformats.org/markup-compatibility/2006">
-    <mc:Choice xmlns:p14="http://schemas.microsoft.com/office/powerpoint/2010/main" xmlns="" Requires="p14">
+  <mc:AlternateContent xmlns:mc="http://schemas.openxmlformats.org/markup-compatibility/2006" xmlns:p14="http://schemas.microsoft.com/office/powerpoint/2010/main">
+    <mc:Choice Requires="p14">
       <p:transition spd="med" p14:dur="700">
         <p:fade/>
       </p:transition>
     </mc:Choice>
-    <mc:Fallback>
+    <mc:Fallback xmlns="">
       <p:transition spd="med">
         <p:fade/>
       </p:transition>
@@ -17481,7 +17349,7 @@
           <a:blip r:embed="rId2" cstate="print">
             <a:extLst>
               <a:ext uri="{28A0092B-C50C-407E-A947-70E740481C1C}">
-                <a14:useLocalDpi xmlns:a14="http://schemas.microsoft.com/office/drawing/2010/main" xmlns="" val="0"/>
+                <a14:useLocalDpi xmlns:a14="http://schemas.microsoft.com/office/drawing/2010/main" val="0"/>
               </a:ext>
             </a:extLst>
           </a:blip>
@@ -17504,14 +17372,14 @@
           </a:ln>
           <a:extLst>
             <a:ext uri="{909E8E84-426E-40DD-AFC4-6F175D3DCCD1}">
-              <a14:hiddenFill xmlns:a14="http://schemas.microsoft.com/office/drawing/2010/main" xmlns="">
+              <a14:hiddenFill xmlns:a14="http://schemas.microsoft.com/office/drawing/2010/main">
                 <a:solidFill>
                   <a:schemeClr val="accent1"/>
                 </a:solidFill>
               </a14:hiddenFill>
             </a:ext>
             <a:ext uri="{91240B29-F687-4F45-9708-019B960494DF}">
-              <a14:hiddenLine xmlns:a14="http://schemas.microsoft.com/office/drawing/2010/main" xmlns="" w="9525">
+              <a14:hiddenLine xmlns:a14="http://schemas.microsoft.com/office/drawing/2010/main" w="9525">
                 <a:solidFill>
                   <a:schemeClr val="tx1"/>
                 </a:solidFill>
@@ -17526,20 +17394,20 @@
     </p:spTree>
     <p:extLst>
       <p:ext uri="{BB962C8B-B14F-4D97-AF65-F5344CB8AC3E}">
-        <p14:creationId xmlns:p14="http://schemas.microsoft.com/office/powerpoint/2010/main" xmlns="" val="2112418618"/>
+        <p14:creationId xmlns:p14="http://schemas.microsoft.com/office/powerpoint/2010/main" val="2112418618"/>
       </p:ext>
     </p:extLst>
   </p:cSld>
   <p:clrMapOvr>
     <a:masterClrMapping/>
   </p:clrMapOvr>
-  <mc:AlternateContent xmlns:mc="http://schemas.openxmlformats.org/markup-compatibility/2006">
-    <mc:Choice xmlns:p14="http://schemas.microsoft.com/office/powerpoint/2010/main" xmlns="" Requires="p14">
+  <mc:AlternateContent xmlns:mc="http://schemas.openxmlformats.org/markup-compatibility/2006" xmlns:p14="http://schemas.microsoft.com/office/powerpoint/2010/main">
+    <mc:Choice Requires="p14">
       <p:transition spd="med" p14:dur="700">
         <p:fade/>
       </p:transition>
     </mc:Choice>
-    <mc:Fallback>
+    <mc:Fallback xmlns="">
       <p:transition spd="med">
         <p:fade/>
       </p:transition>
@@ -17825,7 +17693,7 @@
           <a:blip r:embed="rId2" cstate="print">
             <a:extLst>
               <a:ext uri="{28A0092B-C50C-407E-A947-70E740481C1C}">
-                <a14:useLocalDpi xmlns:a14="http://schemas.microsoft.com/office/drawing/2010/main" xmlns="" val="0"/>
+                <a14:useLocalDpi xmlns:a14="http://schemas.microsoft.com/office/drawing/2010/main" val="0"/>
               </a:ext>
             </a:extLst>
           </a:blip>
@@ -17848,14 +17716,14 @@
           </a:ln>
           <a:extLst>
             <a:ext uri="{909E8E84-426E-40DD-AFC4-6F175D3DCCD1}">
-              <a14:hiddenFill xmlns:a14="http://schemas.microsoft.com/office/drawing/2010/main" xmlns="">
+              <a14:hiddenFill xmlns:a14="http://schemas.microsoft.com/office/drawing/2010/main">
                 <a:solidFill>
                   <a:schemeClr val="accent1"/>
                 </a:solidFill>
               </a14:hiddenFill>
             </a:ext>
             <a:ext uri="{91240B29-F687-4F45-9708-019B960494DF}">
-              <a14:hiddenLine xmlns:a14="http://schemas.microsoft.com/office/drawing/2010/main" xmlns="" w="9525">
+              <a14:hiddenLine xmlns:a14="http://schemas.microsoft.com/office/drawing/2010/main" w="9525">
                 <a:solidFill>
                   <a:schemeClr val="tx1"/>
                 </a:solidFill>
@@ -17870,20 +17738,20 @@
     </p:spTree>
     <p:extLst>
       <p:ext uri="{BB962C8B-B14F-4D97-AF65-F5344CB8AC3E}">
-        <p14:creationId xmlns:p14="http://schemas.microsoft.com/office/powerpoint/2010/main" xmlns="" val="1393713661"/>
+        <p14:creationId xmlns:p14="http://schemas.microsoft.com/office/powerpoint/2010/main" val="1393713661"/>
       </p:ext>
     </p:extLst>
   </p:cSld>
   <p:clrMapOvr>
     <a:masterClrMapping/>
   </p:clrMapOvr>
-  <mc:AlternateContent xmlns:mc="http://schemas.openxmlformats.org/markup-compatibility/2006">
-    <mc:Choice xmlns:p14="http://schemas.microsoft.com/office/powerpoint/2010/main" xmlns="" Requires="p14">
+  <mc:AlternateContent xmlns:mc="http://schemas.openxmlformats.org/markup-compatibility/2006" xmlns:p14="http://schemas.microsoft.com/office/powerpoint/2010/main">
+    <mc:Choice Requires="p14">
       <p:transition spd="med" p14:dur="700">
         <p:fade/>
       </p:transition>
     </mc:Choice>
-    <mc:Fallback>
+    <mc:Fallback xmlns="">
       <p:transition spd="med">
         <p:fade/>
       </p:transition>

</xml_diff>

<commit_message>
agrego gráfico de crecimiento de la informacion desprotegida desde el 2010
</commit_message>
<xml_diff>
--- a/Presentacion/Fuga de Información.pptx
+++ b/Presentacion/Fuga de Información.pptx
@@ -5,10 +5,10 @@
     <p:sldMasterId id="2147483648" r:id="rId2"/>
   </p:sldMasterIdLst>
   <p:notesMasterIdLst>
-    <p:notesMasterId r:id="rId48"/>
+    <p:notesMasterId r:id="rId49"/>
   </p:notesMasterIdLst>
   <p:handoutMasterIdLst>
-    <p:handoutMasterId r:id="rId49"/>
+    <p:handoutMasterId r:id="rId50"/>
   </p:handoutMasterIdLst>
   <p:sldIdLst>
     <p:sldId id="372" r:id="rId3"/>
@@ -50,17 +50,18 @@
     <p:sldId id="366" r:id="rId39"/>
     <p:sldId id="367" r:id="rId40"/>
     <p:sldId id="368" r:id="rId41"/>
-    <p:sldId id="362" r:id="rId42"/>
-    <p:sldId id="351" r:id="rId43"/>
-    <p:sldId id="352" r:id="rId44"/>
-    <p:sldId id="353" r:id="rId45"/>
-    <p:sldId id="370" r:id="rId46"/>
-    <p:sldId id="371" r:id="rId47"/>
+    <p:sldId id="377" r:id="rId42"/>
+    <p:sldId id="362" r:id="rId43"/>
+    <p:sldId id="351" r:id="rId44"/>
+    <p:sldId id="352" r:id="rId45"/>
+    <p:sldId id="353" r:id="rId46"/>
+    <p:sldId id="370" r:id="rId47"/>
+    <p:sldId id="371" r:id="rId48"/>
   </p:sldIdLst>
   <p:sldSz cx="12188825" cy="6858000"/>
   <p:notesSz cx="6858000" cy="9144000"/>
   <p:custDataLst>
-    <p:tags r:id="rId50"/>
+    <p:tags r:id="rId51"/>
   </p:custDataLst>
   <p:defaultTextStyle>
     <a:defPPr>
@@ -159,7 +160,7 @@
   </p:defaultTextStyle>
   <p:extLst>
     <p:ext uri="{EFAFB233-063F-42B5-8137-9DF3F51BA10A}">
-      <p15:sldGuideLst xmlns:p15="http://schemas.microsoft.com/office/powerpoint/2012/main">
+      <p15:sldGuideLst xmlns:p15="http://schemas.microsoft.com/office/powerpoint/2012/main" xmlns="">
         <p15:guide id="1" pos="3839" userDrawn="1">
           <p15:clr>
             <a:srgbClr val="A4A3A4"/>
@@ -173,7 +174,7 @@
       </p15:sldGuideLst>
     </p:ext>
     <p:ext uri="{2D200454-40CA-4A62-9FC3-DE9A4176ACB9}">
-      <p15:notesGuideLst xmlns:p15="http://schemas.microsoft.com/office/powerpoint/2012/main"/>
+      <p15:notesGuideLst xmlns:p15="http://schemas.microsoft.com/office/powerpoint/2012/main" xmlns=""/>
     </p:ext>
   </p:extLst>
 </p:presentation>
@@ -262,7 +263,7 @@
             <a:fld id="{59088EAF-6ECA-4616-85EF-35AA19C641F3}" type="datetimeFigureOut">
               <a:rPr lang="en-US"/>
               <a:pPr/>
-              <a:t>11/16/2014</a:t>
+              <a:t>11/17/2014</a:t>
             </a:fld>
             <a:endParaRPr/>
           </a:p>
@@ -329,7 +330,7 @@
             <a:fld id="{D9F912AB-2776-42F2-A957-313FC7EFEDB9}" type="slidenum">
               <a:rPr/>
               <a:pPr/>
-              <a:t>‹#›</a:t>
+              <a:t>‹Nº›</a:t>
             </a:fld>
             <a:endParaRPr/>
           </a:p>
@@ -338,7 +339,7 @@
     </p:spTree>
     <p:extLst>
       <p:ext uri="{BB962C8B-B14F-4D97-AF65-F5344CB8AC3E}">
-        <p14:creationId xmlns:p14="http://schemas.microsoft.com/office/powerpoint/2010/main" val="3932065745"/>
+        <p14:creationId xmlns:p14="http://schemas.microsoft.com/office/powerpoint/2010/main" xmlns="" val="3932065745"/>
       </p:ext>
     </p:extLst>
   </p:cSld>
@@ -429,7 +430,7 @@
             <a:fld id="{3ABD2D7A-D230-4F91-BD59-0A39C2703BA8}" type="datetimeFigureOut">
               <a:rPr lang="en-US"/>
               <a:pPr/>
-              <a:t>11/16/2014</a:t>
+              <a:t>11/17/2014</a:t>
             </a:fld>
             <a:endParaRPr/>
           </a:p>
@@ -588,7 +589,7 @@
             <a:fld id="{F93199CD-3E1B-4AE6-990F-76F925F5EA9F}" type="slidenum">
               <a:rPr/>
               <a:pPr/>
-              <a:t>‹#›</a:t>
+              <a:t>‹Nº›</a:t>
             </a:fld>
             <a:endParaRPr/>
           </a:p>
@@ -597,7 +598,7 @@
     </p:spTree>
     <p:extLst>
       <p:ext uri="{BB962C8B-B14F-4D97-AF65-F5344CB8AC3E}">
-        <p14:creationId xmlns:p14="http://schemas.microsoft.com/office/powerpoint/2010/main" val="4276579820"/>
+        <p14:creationId xmlns:p14="http://schemas.microsoft.com/office/powerpoint/2010/main" xmlns="" val="4276579820"/>
       </p:ext>
     </p:extLst>
   </p:cSld>
@@ -1092,7 +1093,7 @@
     </p:spTree>
     <p:extLst>
       <p:ext uri="{BB962C8B-B14F-4D97-AF65-F5344CB8AC3E}">
-        <p14:creationId xmlns:p14="http://schemas.microsoft.com/office/powerpoint/2010/main" val="246766428"/>
+        <p14:creationId xmlns:p14="http://schemas.microsoft.com/office/powerpoint/2010/main" xmlns="" val="246766428"/>
       </p:ext>
     </p:extLst>
   </p:cSld>
@@ -1177,7 +1178,7 @@
     </p:spTree>
     <p:extLst>
       <p:ext uri="{BB962C8B-B14F-4D97-AF65-F5344CB8AC3E}">
-        <p14:creationId xmlns:p14="http://schemas.microsoft.com/office/powerpoint/2010/main" val="1554195"/>
+        <p14:creationId xmlns:p14="http://schemas.microsoft.com/office/powerpoint/2010/main" xmlns="" val="1554195"/>
       </p:ext>
     </p:extLst>
   </p:cSld>
@@ -1262,7 +1263,7 @@
     </p:spTree>
     <p:extLst>
       <p:ext uri="{BB962C8B-B14F-4D97-AF65-F5344CB8AC3E}">
-        <p14:creationId xmlns:p14="http://schemas.microsoft.com/office/powerpoint/2010/main" val="2425724269"/>
+        <p14:creationId xmlns:p14="http://schemas.microsoft.com/office/powerpoint/2010/main" xmlns="" val="2425724269"/>
       </p:ext>
     </p:extLst>
   </p:cSld>
@@ -1347,7 +1348,7 @@
     </p:spTree>
     <p:extLst>
       <p:ext uri="{BB962C8B-B14F-4D97-AF65-F5344CB8AC3E}">
-        <p14:creationId xmlns:p14="http://schemas.microsoft.com/office/powerpoint/2010/main" val="913013488"/>
+        <p14:creationId xmlns:p14="http://schemas.microsoft.com/office/powerpoint/2010/main" xmlns="" val="913013488"/>
       </p:ext>
     </p:extLst>
   </p:cSld>
@@ -1432,7 +1433,7 @@
     </p:spTree>
     <p:extLst>
       <p:ext uri="{BB962C8B-B14F-4D97-AF65-F5344CB8AC3E}">
-        <p14:creationId xmlns:p14="http://schemas.microsoft.com/office/powerpoint/2010/main" val="3326557915"/>
+        <p14:creationId xmlns:p14="http://schemas.microsoft.com/office/powerpoint/2010/main" xmlns="" val="3326557915"/>
       </p:ext>
     </p:extLst>
   </p:cSld>
@@ -1517,7 +1518,7 @@
     </p:spTree>
     <p:extLst>
       <p:ext uri="{BB962C8B-B14F-4D97-AF65-F5344CB8AC3E}">
-        <p14:creationId xmlns:p14="http://schemas.microsoft.com/office/powerpoint/2010/main" val="3460376957"/>
+        <p14:creationId xmlns:p14="http://schemas.microsoft.com/office/powerpoint/2010/main" xmlns="" val="3460376957"/>
       </p:ext>
     </p:extLst>
   </p:cSld>
@@ -1602,7 +1603,92 @@
     </p:spTree>
     <p:extLst>
       <p:ext uri="{BB962C8B-B14F-4D97-AF65-F5344CB8AC3E}">
-        <p14:creationId xmlns:p14="http://schemas.microsoft.com/office/powerpoint/2010/main" val="4202137938"/>
+        <p14:creationId xmlns:p14="http://schemas.microsoft.com/office/powerpoint/2010/main" xmlns="" val="4202137938"/>
+      </p:ext>
+    </p:extLst>
+  </p:cSld>
+  <p:clrMapOvr>
+    <a:masterClrMapping/>
+  </p:clrMapOvr>
+</p:notes>
+</file>
+
+<file path=ppt/notesSlides/notesSlide16.xml><?xml version="1.0" encoding="utf-8"?>
+<p:notes xmlns:a="http://schemas.openxmlformats.org/drawingml/2006/main" xmlns:r="http://schemas.openxmlformats.org/officeDocument/2006/relationships" xmlns:p="http://schemas.openxmlformats.org/presentationml/2006/main">
+  <p:cSld>
+    <p:spTree>
+      <p:nvGrpSpPr>
+        <p:cNvPr id="1" name=""/>
+        <p:cNvGrpSpPr/>
+        <p:nvPr/>
+      </p:nvGrpSpPr>
+      <p:grpSpPr>
+        <a:xfrm>
+          <a:off x="0" y="0"/>
+          <a:ext cx="0" cy="0"/>
+          <a:chOff x="0" y="0"/>
+          <a:chExt cx="0" cy="0"/>
+        </a:xfrm>
+      </p:grpSpPr>
+      <p:sp>
+        <p:nvSpPr>
+          <p:cNvPr id="2" name="Slide Image Placeholder 1"/>
+          <p:cNvSpPr>
+            <a:spLocks noGrp="1" noRot="1" noChangeAspect="1"/>
+          </p:cNvSpPr>
+          <p:nvPr>
+            <p:ph type="sldImg"/>
+          </p:nvPr>
+        </p:nvSpPr>
+        <p:spPr/>
+      </p:sp>
+      <p:sp>
+        <p:nvSpPr>
+          <p:cNvPr id="3" name="Notes Placeholder 2"/>
+          <p:cNvSpPr>
+            <a:spLocks noGrp="1"/>
+          </p:cNvSpPr>
+          <p:nvPr>
+            <p:ph type="body" idx="1"/>
+          </p:nvPr>
+        </p:nvSpPr>
+        <p:spPr/>
+        <p:txBody>
+          <a:bodyPr/>
+          <a:lstStyle/>
+          <a:p>
+            <a:endParaRPr lang="en-US"/>
+          </a:p>
+        </p:txBody>
+      </p:sp>
+      <p:sp>
+        <p:nvSpPr>
+          <p:cNvPr id="4" name="Slide Number Placeholder 3"/>
+          <p:cNvSpPr>
+            <a:spLocks noGrp="1"/>
+          </p:cNvSpPr>
+          <p:nvPr>
+            <p:ph type="sldNum" sz="quarter" idx="10"/>
+          </p:nvPr>
+        </p:nvSpPr>
+        <p:spPr/>
+        <p:txBody>
+          <a:bodyPr/>
+          <a:lstStyle/>
+          <a:p>
+            <a:fld id="{F93199CD-3E1B-4AE6-990F-76F925F5EA9F}" type="slidenum">
+              <a:rPr lang="en-US" smtClean="0"/>
+              <a:pPr/>
+              <a:t>40</a:t>
+            </a:fld>
+            <a:endParaRPr lang="en-US"/>
+          </a:p>
+        </p:txBody>
+      </p:sp>
+    </p:spTree>
+    <p:extLst>
+      <p:ext uri="{BB962C8B-B14F-4D97-AF65-F5344CB8AC3E}">
+        <p14:creationId xmlns:p14="http://schemas.microsoft.com/office/powerpoint/2010/main" xmlns="" val="4202137938"/>
       </p:ext>
     </p:extLst>
   </p:cSld>
@@ -1687,7 +1773,7 @@
     </p:spTree>
     <p:extLst>
       <p:ext uri="{BB962C8B-B14F-4D97-AF65-F5344CB8AC3E}">
-        <p14:creationId xmlns:p14="http://schemas.microsoft.com/office/powerpoint/2010/main" val="2586394931"/>
+        <p14:creationId xmlns:p14="http://schemas.microsoft.com/office/powerpoint/2010/main" xmlns="" val="2586394931"/>
       </p:ext>
     </p:extLst>
   </p:cSld>
@@ -1772,7 +1858,7 @@
     </p:spTree>
     <p:extLst>
       <p:ext uri="{BB962C8B-B14F-4D97-AF65-F5344CB8AC3E}">
-        <p14:creationId xmlns:p14="http://schemas.microsoft.com/office/powerpoint/2010/main" val="1362585539"/>
+        <p14:creationId xmlns:p14="http://schemas.microsoft.com/office/powerpoint/2010/main" xmlns="" val="1362585539"/>
       </p:ext>
     </p:extLst>
   </p:cSld>
@@ -1857,7 +1943,7 @@
     </p:spTree>
     <p:extLst>
       <p:ext uri="{BB962C8B-B14F-4D97-AF65-F5344CB8AC3E}">
-        <p14:creationId xmlns:p14="http://schemas.microsoft.com/office/powerpoint/2010/main" val="1362585539"/>
+        <p14:creationId xmlns:p14="http://schemas.microsoft.com/office/powerpoint/2010/main" xmlns="" val="1362585539"/>
       </p:ext>
     </p:extLst>
   </p:cSld>
@@ -2467,7 +2553,7 @@
     </p:spTree>
     <p:extLst>
       <p:ext uri="{BB962C8B-B14F-4D97-AF65-F5344CB8AC3E}">
-        <p14:creationId xmlns:p14="http://schemas.microsoft.com/office/powerpoint/2010/main" val="3805029774"/>
+        <p14:creationId xmlns:p14="http://schemas.microsoft.com/office/powerpoint/2010/main" xmlns="" val="3805029774"/>
       </p:ext>
     </p:extLst>
   </p:cSld>
@@ -2730,7 +2816,7 @@
     </p:spTree>
     <p:extLst>
       <p:ext uri="{BB962C8B-B14F-4D97-AF65-F5344CB8AC3E}">
-        <p14:creationId xmlns:p14="http://schemas.microsoft.com/office/powerpoint/2010/main" val="655676726"/>
+        <p14:creationId xmlns:p14="http://schemas.microsoft.com/office/powerpoint/2010/main" xmlns="" val="655676726"/>
       </p:ext>
     </p:extLst>
   </p:cSld>
@@ -2999,7 +3085,7 @@
     </p:spTree>
     <p:extLst>
       <p:ext uri="{BB962C8B-B14F-4D97-AF65-F5344CB8AC3E}">
-        <p14:creationId xmlns:p14="http://schemas.microsoft.com/office/powerpoint/2010/main" val="1629614161"/>
+        <p14:creationId xmlns:p14="http://schemas.microsoft.com/office/powerpoint/2010/main" xmlns="" val="1629614161"/>
       </p:ext>
     </p:extLst>
   </p:cSld>
@@ -3588,7 +3674,7 @@
     </p:spTree>
     <p:extLst>
       <p:ext uri="{BB962C8B-B14F-4D97-AF65-F5344CB8AC3E}">
-        <p14:creationId xmlns:p14="http://schemas.microsoft.com/office/powerpoint/2010/main" val="2488318766"/>
+        <p14:creationId xmlns:p14="http://schemas.microsoft.com/office/powerpoint/2010/main" xmlns="" val="2488318766"/>
       </p:ext>
     </p:extLst>
   </p:cSld>
@@ -4261,7 +4347,7 @@
     </p:spTree>
     <p:extLst>
       <p:ext uri="{BB962C8B-B14F-4D97-AF65-F5344CB8AC3E}">
-        <p14:creationId xmlns:p14="http://schemas.microsoft.com/office/powerpoint/2010/main" val="707643668"/>
+        <p14:creationId xmlns:p14="http://schemas.microsoft.com/office/powerpoint/2010/main" xmlns="" val="707643668"/>
       </p:ext>
     </p:extLst>
   </p:cSld>
@@ -4468,20 +4554,20 @@
     </p:spTree>
     <p:extLst>
       <p:ext uri="{BB962C8B-B14F-4D97-AF65-F5344CB8AC3E}">
-        <p14:creationId xmlns:p14="http://schemas.microsoft.com/office/powerpoint/2010/main" val="94999051"/>
+        <p14:creationId xmlns:p14="http://schemas.microsoft.com/office/powerpoint/2010/main" xmlns="" val="94999051"/>
       </p:ext>
     </p:extLst>
   </p:cSld>
   <p:clrMapOvr>
     <a:masterClrMapping/>
   </p:clrMapOvr>
-  <mc:AlternateContent xmlns:mc="http://schemas.openxmlformats.org/markup-compatibility/2006" xmlns:p14="http://schemas.microsoft.com/office/powerpoint/2010/main">
-    <mc:Choice Requires="p14">
+  <mc:AlternateContent xmlns:mc="http://schemas.openxmlformats.org/markup-compatibility/2006">
+    <mc:Choice xmlns:p14="http://schemas.microsoft.com/office/powerpoint/2010/main" xmlns="" Requires="p14">
       <p:transition spd="med" p14:dur="700">
         <p:fade/>
       </p:transition>
     </mc:Choice>
-    <mc:Fallback xmlns="">
+    <mc:Fallback>
       <p:transition spd="med">
         <p:fade/>
       </p:transition>
@@ -4607,7 +4693,7 @@
             <a:fld id="{03F41C87-7AD9-4845-A077-840E4A0F3F06}" type="datetimeFigureOut">
               <a:rPr lang="en-US"/>
               <a:pPr/>
-              <a:t>11/16/2014</a:t>
+              <a:t>11/17/2014</a:t>
             </a:fld>
             <a:endParaRPr/>
           </a:p>
@@ -4650,7 +4736,7 @@
             <a:fld id="{2A013F82-EE5E-44EE-A61D-E31C6657F26F}" type="slidenum">
               <a:rPr/>
               <a:pPr/>
-              <a:t>‹#›</a:t>
+              <a:t>‹Nº›</a:t>
             </a:fld>
             <a:endParaRPr/>
           </a:p>
@@ -4659,20 +4745,20 @@
     </p:spTree>
     <p:extLst>
       <p:ext uri="{BB962C8B-B14F-4D97-AF65-F5344CB8AC3E}">
-        <p14:creationId xmlns:p14="http://schemas.microsoft.com/office/powerpoint/2010/main" val="460095310"/>
+        <p14:creationId xmlns:p14="http://schemas.microsoft.com/office/powerpoint/2010/main" xmlns="" val="460095310"/>
       </p:ext>
     </p:extLst>
   </p:cSld>
   <p:clrMapOvr>
     <a:masterClrMapping/>
   </p:clrMapOvr>
-  <mc:AlternateContent xmlns:mc="http://schemas.openxmlformats.org/markup-compatibility/2006" xmlns:p14="http://schemas.microsoft.com/office/powerpoint/2010/main">
-    <mc:Choice Requires="p14">
+  <mc:AlternateContent xmlns:mc="http://schemas.openxmlformats.org/markup-compatibility/2006">
+    <mc:Choice xmlns:p14="http://schemas.microsoft.com/office/powerpoint/2010/main" xmlns="" Requires="p14">
       <p:transition spd="med" p14:dur="700">
         <p:fade/>
       </p:transition>
     </mc:Choice>
-    <mc:Fallback xmlns="">
+    <mc:Fallback>
       <p:transition spd="med">
         <p:fade/>
       </p:transition>
@@ -4808,7 +4894,7 @@
             <a:fld id="{03F41C87-7AD9-4845-A077-840E4A0F3F06}" type="datetimeFigureOut">
               <a:rPr lang="en-US"/>
               <a:pPr/>
-              <a:t>11/16/2014</a:t>
+              <a:t>11/17/2014</a:t>
             </a:fld>
             <a:endParaRPr/>
           </a:p>
@@ -4851,7 +4937,7 @@
             <a:fld id="{2A013F82-EE5E-44EE-A61D-E31C6657F26F}" type="slidenum">
               <a:rPr/>
               <a:pPr/>
-              <a:t>‹#›</a:t>
+              <a:t>‹Nº›</a:t>
             </a:fld>
             <a:endParaRPr/>
           </a:p>
@@ -4860,20 +4946,20 @@
     </p:spTree>
     <p:extLst>
       <p:ext uri="{BB962C8B-B14F-4D97-AF65-F5344CB8AC3E}">
-        <p14:creationId xmlns:p14="http://schemas.microsoft.com/office/powerpoint/2010/main" val="4079035419"/>
+        <p14:creationId xmlns:p14="http://schemas.microsoft.com/office/powerpoint/2010/main" xmlns="" val="4079035419"/>
       </p:ext>
     </p:extLst>
   </p:cSld>
   <p:clrMapOvr>
     <a:masterClrMapping/>
   </p:clrMapOvr>
-  <mc:AlternateContent xmlns:mc="http://schemas.openxmlformats.org/markup-compatibility/2006" xmlns:p14="http://schemas.microsoft.com/office/powerpoint/2010/main">
-    <mc:Choice Requires="p14">
+  <mc:AlternateContent xmlns:mc="http://schemas.openxmlformats.org/markup-compatibility/2006">
+    <mc:Choice xmlns:p14="http://schemas.microsoft.com/office/powerpoint/2010/main" xmlns="" Requires="p14">
       <p:transition spd="med" p14:dur="700">
         <p:fade/>
       </p:transition>
     </mc:Choice>
-    <mc:Fallback xmlns="">
+    <mc:Fallback>
       <p:transition spd="med">
         <p:fade/>
       </p:transition>
@@ -5006,7 +5092,7 @@
             <a:fld id="{03F41C87-7AD9-4845-A077-840E4A0F3F06}" type="datetimeFigureOut">
               <a:rPr lang="en-US"/>
               <a:pPr/>
-              <a:t>11/16/2014</a:t>
+              <a:t>11/17/2014</a:t>
             </a:fld>
             <a:endParaRPr/>
           </a:p>
@@ -5049,7 +5135,7 @@
             <a:fld id="{2A013F82-EE5E-44EE-A61D-E31C6657F26F}" type="slidenum">
               <a:rPr/>
               <a:pPr/>
-              <a:t>‹#›</a:t>
+              <a:t>‹Nº›</a:t>
             </a:fld>
             <a:endParaRPr/>
           </a:p>
@@ -5058,20 +5144,20 @@
     </p:spTree>
     <p:extLst>
       <p:ext uri="{BB962C8B-B14F-4D97-AF65-F5344CB8AC3E}">
-        <p14:creationId xmlns:p14="http://schemas.microsoft.com/office/powerpoint/2010/main" val="2738254095"/>
+        <p14:creationId xmlns:p14="http://schemas.microsoft.com/office/powerpoint/2010/main" xmlns="" val="2738254095"/>
       </p:ext>
     </p:extLst>
   </p:cSld>
   <p:clrMapOvr>
     <a:masterClrMapping/>
   </p:clrMapOvr>
-  <mc:AlternateContent xmlns:mc="http://schemas.openxmlformats.org/markup-compatibility/2006" xmlns:p14="http://schemas.microsoft.com/office/powerpoint/2010/main">
-    <mc:Choice Requires="p14">
+  <mc:AlternateContent xmlns:mc="http://schemas.openxmlformats.org/markup-compatibility/2006">
+    <mc:Choice xmlns:p14="http://schemas.microsoft.com/office/powerpoint/2010/main" xmlns="" Requires="p14">
       <p:transition spd="med" p14:dur="700">
         <p:fade/>
       </p:transition>
     </mc:Choice>
-    <mc:Fallback xmlns="">
+    <mc:Fallback>
       <p:transition spd="med">
         <p:fade/>
       </p:transition>
@@ -5295,7 +5381,7 @@
             <a:fld id="{03F41C87-7AD9-4845-A077-840E4A0F3F06}" type="datetimeFigureOut">
               <a:rPr lang="en-US"/>
               <a:pPr/>
-              <a:t>11/16/2014</a:t>
+              <a:t>11/17/2014</a:t>
             </a:fld>
             <a:endParaRPr/>
           </a:p>
@@ -5338,7 +5424,7 @@
             <a:fld id="{2A013F82-EE5E-44EE-A61D-E31C6657F26F}" type="slidenum">
               <a:rPr/>
               <a:pPr/>
-              <a:t>‹#›</a:t>
+              <a:t>‹Nº›</a:t>
             </a:fld>
             <a:endParaRPr/>
           </a:p>
@@ -5347,20 +5433,20 @@
     </p:spTree>
     <p:extLst>
       <p:ext uri="{BB962C8B-B14F-4D97-AF65-F5344CB8AC3E}">
-        <p14:creationId xmlns:p14="http://schemas.microsoft.com/office/powerpoint/2010/main" val="1761813311"/>
+        <p14:creationId xmlns:p14="http://schemas.microsoft.com/office/powerpoint/2010/main" xmlns="" val="1761813311"/>
       </p:ext>
     </p:extLst>
   </p:cSld>
   <p:clrMapOvr>
     <a:masterClrMapping/>
   </p:clrMapOvr>
-  <mc:AlternateContent xmlns:mc="http://schemas.openxmlformats.org/markup-compatibility/2006" xmlns:p14="http://schemas.microsoft.com/office/powerpoint/2010/main">
-    <mc:Choice Requires="p14">
+  <mc:AlternateContent xmlns:mc="http://schemas.openxmlformats.org/markup-compatibility/2006">
+    <mc:Choice xmlns:p14="http://schemas.microsoft.com/office/powerpoint/2010/main" xmlns="" Requires="p14">
       <p:transition spd="med" p14:dur="700">
         <p:fade/>
       </p:transition>
     </mc:Choice>
-    <mc:Fallback xmlns="">
+    <mc:Fallback>
       <p:transition spd="med">
         <p:fade/>
       </p:transition>
@@ -5608,7 +5694,7 @@
             <a:fld id="{03F41C87-7AD9-4845-A077-840E4A0F3F06}" type="datetimeFigureOut">
               <a:rPr lang="en-US"/>
               <a:pPr/>
-              <a:t>11/16/2014</a:t>
+              <a:t>11/17/2014</a:t>
             </a:fld>
             <a:endParaRPr/>
           </a:p>
@@ -5651,7 +5737,7 @@
             <a:fld id="{2A013F82-EE5E-44EE-A61D-E31C6657F26F}" type="slidenum">
               <a:rPr/>
               <a:pPr/>
-              <a:t>‹#›</a:t>
+              <a:t>‹Nº›</a:t>
             </a:fld>
             <a:endParaRPr/>
           </a:p>
@@ -5660,20 +5746,20 @@
     </p:spTree>
     <p:extLst>
       <p:ext uri="{BB962C8B-B14F-4D97-AF65-F5344CB8AC3E}">
-        <p14:creationId xmlns:p14="http://schemas.microsoft.com/office/powerpoint/2010/main" val="2825340762"/>
+        <p14:creationId xmlns:p14="http://schemas.microsoft.com/office/powerpoint/2010/main" xmlns="" val="2825340762"/>
       </p:ext>
     </p:extLst>
   </p:cSld>
   <p:clrMapOvr>
     <a:masterClrMapping/>
   </p:clrMapOvr>
-  <mc:AlternateContent xmlns:mc="http://schemas.openxmlformats.org/markup-compatibility/2006" xmlns:p14="http://schemas.microsoft.com/office/powerpoint/2010/main">
-    <mc:Choice Requires="p14">
+  <mc:AlternateContent xmlns:mc="http://schemas.openxmlformats.org/markup-compatibility/2006">
+    <mc:Choice xmlns:p14="http://schemas.microsoft.com/office/powerpoint/2010/main" xmlns="" Requires="p14">
       <p:transition spd="med" p14:dur="700">
         <p:fade/>
       </p:transition>
     </mc:Choice>
-    <mc:Fallback xmlns="">
+    <mc:Fallback>
       <p:transition spd="med">
         <p:fade/>
       </p:transition>
@@ -6073,7 +6159,7 @@
             <a:fld id="{03F41C87-7AD9-4845-A077-840E4A0F3F06}" type="datetimeFigureOut">
               <a:rPr lang="en-US"/>
               <a:pPr/>
-              <a:t>11/16/2014</a:t>
+              <a:t>11/17/2014</a:t>
             </a:fld>
             <a:endParaRPr/>
           </a:p>
@@ -6116,7 +6202,7 @@
             <a:fld id="{2A013F82-EE5E-44EE-A61D-E31C6657F26F}" type="slidenum">
               <a:rPr/>
               <a:pPr/>
-              <a:t>‹#›</a:t>
+              <a:t>‹Nº›</a:t>
             </a:fld>
             <a:endParaRPr/>
           </a:p>
@@ -6125,20 +6211,20 @@
     </p:spTree>
     <p:extLst>
       <p:ext uri="{BB962C8B-B14F-4D97-AF65-F5344CB8AC3E}">
-        <p14:creationId xmlns:p14="http://schemas.microsoft.com/office/powerpoint/2010/main" val="4208419506"/>
+        <p14:creationId xmlns:p14="http://schemas.microsoft.com/office/powerpoint/2010/main" xmlns="" val="4208419506"/>
       </p:ext>
     </p:extLst>
   </p:cSld>
   <p:clrMapOvr>
     <a:masterClrMapping/>
   </p:clrMapOvr>
-  <mc:AlternateContent xmlns:mc="http://schemas.openxmlformats.org/markup-compatibility/2006" xmlns:p14="http://schemas.microsoft.com/office/powerpoint/2010/main">
-    <mc:Choice Requires="p14">
+  <mc:AlternateContent xmlns:mc="http://schemas.openxmlformats.org/markup-compatibility/2006">
+    <mc:Choice xmlns:p14="http://schemas.microsoft.com/office/powerpoint/2010/main" xmlns="" Requires="p14">
       <p:transition spd="med" p14:dur="700">
         <p:fade/>
       </p:transition>
     </mc:Choice>
-    <mc:Fallback xmlns="">
+    <mc:Fallback>
       <p:transition spd="med">
         <p:fade/>
       </p:transition>
@@ -6212,7 +6298,7 @@
             <a:fld id="{03F41C87-7AD9-4845-A077-840E4A0F3F06}" type="datetimeFigureOut">
               <a:rPr lang="en-US"/>
               <a:pPr/>
-              <a:t>11/16/2014</a:t>
+              <a:t>11/17/2014</a:t>
             </a:fld>
             <a:endParaRPr/>
           </a:p>
@@ -6255,7 +6341,7 @@
             <a:fld id="{2A013F82-EE5E-44EE-A61D-E31C6657F26F}" type="slidenum">
               <a:rPr/>
               <a:pPr/>
-              <a:t>‹#›</a:t>
+              <a:t>‹Nº›</a:t>
             </a:fld>
             <a:endParaRPr/>
           </a:p>
@@ -6264,20 +6350,20 @@
     </p:spTree>
     <p:extLst>
       <p:ext uri="{BB962C8B-B14F-4D97-AF65-F5344CB8AC3E}">
-        <p14:creationId xmlns:p14="http://schemas.microsoft.com/office/powerpoint/2010/main" val="1626631400"/>
+        <p14:creationId xmlns:p14="http://schemas.microsoft.com/office/powerpoint/2010/main" xmlns="" val="1626631400"/>
       </p:ext>
     </p:extLst>
   </p:cSld>
   <p:clrMapOvr>
     <a:masterClrMapping/>
   </p:clrMapOvr>
-  <mc:AlternateContent xmlns:mc="http://schemas.openxmlformats.org/markup-compatibility/2006" xmlns:p14="http://schemas.microsoft.com/office/powerpoint/2010/main">
-    <mc:Choice Requires="p14">
+  <mc:AlternateContent xmlns:mc="http://schemas.openxmlformats.org/markup-compatibility/2006">
+    <mc:Choice xmlns:p14="http://schemas.microsoft.com/office/powerpoint/2010/main" xmlns="" Requires="p14">
       <p:transition spd="med" p14:dur="700">
         <p:fade/>
       </p:transition>
     </mc:Choice>
-    <mc:Fallback xmlns="">
+    <mc:Fallback>
       <p:transition spd="med">
         <p:fade/>
       </p:transition>
@@ -6336,7 +6422,7 @@
             <a:fld id="{03F41C87-7AD9-4845-A077-840E4A0F3F06}" type="datetimeFigureOut">
               <a:rPr lang="en-US"/>
               <a:pPr/>
-              <a:t>11/16/2014</a:t>
+              <a:t>11/17/2014</a:t>
             </a:fld>
             <a:endParaRPr/>
           </a:p>
@@ -6379,7 +6465,7 @@
             <a:fld id="{2A013F82-EE5E-44EE-A61D-E31C6657F26F}" type="slidenum">
               <a:rPr/>
               <a:pPr/>
-              <a:t>‹#›</a:t>
+              <a:t>‹Nº›</a:t>
             </a:fld>
             <a:endParaRPr/>
           </a:p>
@@ -6388,20 +6474,20 @@
     </p:spTree>
     <p:extLst>
       <p:ext uri="{BB962C8B-B14F-4D97-AF65-F5344CB8AC3E}">
-        <p14:creationId xmlns:p14="http://schemas.microsoft.com/office/powerpoint/2010/main" val="3607540120"/>
+        <p14:creationId xmlns:p14="http://schemas.microsoft.com/office/powerpoint/2010/main" xmlns="" val="3607540120"/>
       </p:ext>
     </p:extLst>
   </p:cSld>
   <p:clrMapOvr>
     <a:masterClrMapping/>
   </p:clrMapOvr>
-  <mc:AlternateContent xmlns:mc="http://schemas.openxmlformats.org/markup-compatibility/2006" xmlns:p14="http://schemas.microsoft.com/office/powerpoint/2010/main">
-    <mc:Choice Requires="p14">
+  <mc:AlternateContent xmlns:mc="http://schemas.openxmlformats.org/markup-compatibility/2006">
+    <mc:Choice xmlns:p14="http://schemas.microsoft.com/office/powerpoint/2010/main" xmlns="" Requires="p14">
       <p:transition spd="med" p14:dur="700">
         <p:fade/>
       </p:transition>
     </mc:Choice>
-    <mc:Fallback xmlns="">
+    <mc:Fallback>
       <p:transition spd="med">
         <p:fade/>
       </p:transition>
@@ -6667,7 +6753,7 @@
             <a:fld id="{03F41C87-7AD9-4845-A077-840E4A0F3F06}" type="datetimeFigureOut">
               <a:rPr lang="en-US"/>
               <a:pPr/>
-              <a:t>11/16/2014</a:t>
+              <a:t>11/17/2014</a:t>
             </a:fld>
             <a:endParaRPr/>
           </a:p>
@@ -6710,7 +6796,7 @@
             <a:fld id="{2A013F82-EE5E-44EE-A61D-E31C6657F26F}" type="slidenum">
               <a:rPr/>
               <a:pPr/>
-              <a:t>‹#›</a:t>
+              <a:t>‹Nº›</a:t>
             </a:fld>
             <a:endParaRPr/>
           </a:p>
@@ -6719,20 +6805,20 @@
     </p:spTree>
     <p:extLst>
       <p:ext uri="{BB962C8B-B14F-4D97-AF65-F5344CB8AC3E}">
-        <p14:creationId xmlns:p14="http://schemas.microsoft.com/office/powerpoint/2010/main" val="2544981540"/>
+        <p14:creationId xmlns:p14="http://schemas.microsoft.com/office/powerpoint/2010/main" xmlns="" val="2544981540"/>
       </p:ext>
     </p:extLst>
   </p:cSld>
   <p:clrMapOvr>
     <a:masterClrMapping/>
   </p:clrMapOvr>
-  <mc:AlternateContent xmlns:mc="http://schemas.openxmlformats.org/markup-compatibility/2006" xmlns:p14="http://schemas.microsoft.com/office/powerpoint/2010/main">
-    <mc:Choice Requires="p14">
+  <mc:AlternateContent xmlns:mc="http://schemas.openxmlformats.org/markup-compatibility/2006">
+    <mc:Choice xmlns:p14="http://schemas.microsoft.com/office/powerpoint/2010/main" xmlns="" Requires="p14">
       <p:transition spd="med" p14:dur="700">
         <p:fade/>
       </p:transition>
     </mc:Choice>
-    <mc:Fallback xmlns="">
+    <mc:Fallback>
       <p:transition spd="med">
         <p:fade/>
       </p:transition>
@@ -6987,7 +7073,7 @@
             <a:fld id="{03F41C87-7AD9-4845-A077-840E4A0F3F06}" type="datetimeFigureOut">
               <a:rPr lang="en-US"/>
               <a:pPr/>
-              <a:t>11/16/2014</a:t>
+              <a:t>11/17/2014</a:t>
             </a:fld>
             <a:endParaRPr/>
           </a:p>
@@ -7030,7 +7116,7 @@
             <a:fld id="{2A013F82-EE5E-44EE-A61D-E31C6657F26F}" type="slidenum">
               <a:rPr/>
               <a:pPr/>
-              <a:t>‹#›</a:t>
+              <a:t>‹Nº›</a:t>
             </a:fld>
             <a:endParaRPr/>
           </a:p>
@@ -7039,20 +7125,20 @@
     </p:spTree>
     <p:extLst>
       <p:ext uri="{BB962C8B-B14F-4D97-AF65-F5344CB8AC3E}">
-        <p14:creationId xmlns:p14="http://schemas.microsoft.com/office/powerpoint/2010/main" val="2249172152"/>
+        <p14:creationId xmlns:p14="http://schemas.microsoft.com/office/powerpoint/2010/main" xmlns="" val="2249172152"/>
       </p:ext>
     </p:extLst>
   </p:cSld>
   <p:clrMapOvr>
     <a:masterClrMapping/>
   </p:clrMapOvr>
-  <mc:AlternateContent xmlns:mc="http://schemas.openxmlformats.org/markup-compatibility/2006" xmlns:p14="http://schemas.microsoft.com/office/powerpoint/2010/main">
-    <mc:Choice Requires="p14">
+  <mc:AlternateContent xmlns:mc="http://schemas.openxmlformats.org/markup-compatibility/2006">
+    <mc:Choice xmlns:p14="http://schemas.microsoft.com/office/powerpoint/2010/main" xmlns="" Requires="p14">
       <p:transition spd="med" p14:dur="700">
         <p:fade/>
       </p:transition>
     </mc:Choice>
-    <mc:Fallback xmlns="">
+    <mc:Fallback>
       <p:transition spd="med">
         <p:fade/>
       </p:transition>
@@ -7230,7 +7316,7 @@
             <a:fld id="{03F41C87-7AD9-4845-A077-840E4A0F3F06}" type="datetimeFigureOut">
               <a:rPr lang="en-US"/>
               <a:pPr/>
-              <a:t>11/16/2014</a:t>
+              <a:t>11/17/2014</a:t>
             </a:fld>
             <a:endParaRPr/>
           </a:p>
@@ -7309,7 +7395,7 @@
             <a:fld id="{2A013F82-EE5E-44EE-A61D-E31C6657F26F}" type="slidenum">
               <a:rPr/>
               <a:pPr/>
-              <a:t>‹#›</a:t>
+              <a:t>‹Nº›</a:t>
             </a:fld>
             <a:endParaRPr/>
           </a:p>
@@ -7318,7 +7404,7 @@
     </p:spTree>
     <p:extLst>
       <p:ext uri="{BB962C8B-B14F-4D97-AF65-F5344CB8AC3E}">
-        <p14:creationId xmlns:p14="http://schemas.microsoft.com/office/powerpoint/2010/main" val="1403059996"/>
+        <p14:creationId xmlns:p14="http://schemas.microsoft.com/office/powerpoint/2010/main" xmlns="" val="1403059996"/>
       </p:ext>
     </p:extLst>
   </p:cSld>
@@ -7336,13 +7422,13 @@
     <p:sldLayoutId id="2147483658" r:id="rId10"/>
     <p:sldLayoutId id="2147483659" r:id="rId11"/>
   </p:sldLayoutIdLst>
-  <mc:AlternateContent xmlns:mc="http://schemas.openxmlformats.org/markup-compatibility/2006" xmlns:p14="http://schemas.microsoft.com/office/powerpoint/2010/main">
-    <mc:Choice Requires="p14">
+  <mc:AlternateContent xmlns:mc="http://schemas.openxmlformats.org/markup-compatibility/2006">
+    <mc:Choice xmlns:p14="http://schemas.microsoft.com/office/powerpoint/2010/main" xmlns="" Requires="p14">
       <p:transition spd="med" p14:dur="700">
         <p:fade/>
       </p:transition>
     </mc:Choice>
-    <mc:Fallback xmlns="">
+    <mc:Fallback>
       <p:transition spd="med">
         <p:fade/>
       </p:transition>
@@ -7657,7 +7743,7 @@
   </p:txStyles>
   <p:extLst mod="1">
     <p:ext uri="{27BBF7A9-308A-43DC-89C8-2F10F3537804}">
-      <p15:sldGuideLst xmlns:p15="http://schemas.microsoft.com/office/powerpoint/2012/main">
+      <p15:sldGuideLst xmlns:p15="http://schemas.microsoft.com/office/powerpoint/2012/main" xmlns="">
         <p15:guide id="1" pos="3839" userDrawn="1">
           <p15:clr>
             <a:srgbClr val="F26B43"/>
@@ -7804,7 +7890,7 @@
           <a:blip r:embed="rId2" cstate="print">
             <a:extLst>
               <a:ext uri="{28A0092B-C50C-407E-A947-70E740481C1C}">
-                <a14:useLocalDpi xmlns:a14="http://schemas.microsoft.com/office/drawing/2010/main" val="0"/>
+                <a14:useLocalDpi xmlns:a14="http://schemas.microsoft.com/office/drawing/2010/main" xmlns="" val="0"/>
               </a:ext>
             </a:extLst>
           </a:blip>
@@ -7824,7 +7910,7 @@
           <a:noFill/>
           <a:extLst>
             <a:ext uri="{909E8E84-426E-40DD-AFC4-6F175D3DCCD1}">
-              <a14:hiddenFill xmlns:a14="http://schemas.microsoft.com/office/drawing/2010/main">
+              <a14:hiddenFill xmlns:a14="http://schemas.microsoft.com/office/drawing/2010/main" xmlns="">
                 <a:solidFill>
                   <a:srgbClr val="FFFFFF"/>
                 </a:solidFill>
@@ -7836,20 +7922,20 @@
     </p:spTree>
     <p:extLst>
       <p:ext uri="{BB962C8B-B14F-4D97-AF65-F5344CB8AC3E}">
-        <p14:creationId xmlns:p14="http://schemas.microsoft.com/office/powerpoint/2010/main" val="2808920126"/>
+        <p14:creationId xmlns:p14="http://schemas.microsoft.com/office/powerpoint/2010/main" xmlns="" val="2808920126"/>
       </p:ext>
     </p:extLst>
   </p:cSld>
   <p:clrMapOvr>
     <a:masterClrMapping/>
   </p:clrMapOvr>
-  <mc:AlternateContent xmlns:mc="http://schemas.openxmlformats.org/markup-compatibility/2006" xmlns:p14="http://schemas.microsoft.com/office/powerpoint/2010/main">
-    <mc:Choice Requires="p14">
+  <mc:AlternateContent xmlns:mc="http://schemas.openxmlformats.org/markup-compatibility/2006">
+    <mc:Choice xmlns:p14="http://schemas.microsoft.com/office/powerpoint/2010/main" xmlns="" Requires="p14">
       <p:transition spd="med" p14:dur="700">
         <p:fade/>
       </p:transition>
     </mc:Choice>
-    <mc:Fallback xmlns="">
+    <mc:Fallback>
       <p:transition spd="med">
         <p:fade/>
       </p:transition>
@@ -8135,7 +8221,7 @@
           <a:blip r:embed="rId2" cstate="print">
             <a:extLst>
               <a:ext uri="{28A0092B-C50C-407E-A947-70E740481C1C}">
-                <a14:useLocalDpi xmlns:a14="http://schemas.microsoft.com/office/drawing/2010/main" val="0"/>
+                <a14:useLocalDpi xmlns:a14="http://schemas.microsoft.com/office/drawing/2010/main" xmlns="" val="0"/>
               </a:ext>
             </a:extLst>
           </a:blip>
@@ -8158,14 +8244,14 @@
           </a:ln>
           <a:extLst>
             <a:ext uri="{909E8E84-426E-40DD-AFC4-6F175D3DCCD1}">
-              <a14:hiddenFill xmlns:a14="http://schemas.microsoft.com/office/drawing/2010/main">
+              <a14:hiddenFill xmlns:a14="http://schemas.microsoft.com/office/drawing/2010/main" xmlns="">
                 <a:solidFill>
                   <a:schemeClr val="accent1"/>
                 </a:solidFill>
               </a14:hiddenFill>
             </a:ext>
             <a:ext uri="{91240B29-F687-4F45-9708-019B960494DF}">
-              <a14:hiddenLine xmlns:a14="http://schemas.microsoft.com/office/drawing/2010/main" w="9525">
+              <a14:hiddenLine xmlns:a14="http://schemas.microsoft.com/office/drawing/2010/main" xmlns="" w="9525">
                 <a:solidFill>
                   <a:schemeClr val="tx1"/>
                 </a:solidFill>
@@ -8180,20 +8266,20 @@
     </p:spTree>
     <p:extLst>
       <p:ext uri="{BB962C8B-B14F-4D97-AF65-F5344CB8AC3E}">
-        <p14:creationId xmlns:p14="http://schemas.microsoft.com/office/powerpoint/2010/main" val="1393713661"/>
+        <p14:creationId xmlns:p14="http://schemas.microsoft.com/office/powerpoint/2010/main" xmlns="" val="1393713661"/>
       </p:ext>
     </p:extLst>
   </p:cSld>
   <p:clrMapOvr>
     <a:masterClrMapping/>
   </p:clrMapOvr>
-  <mc:AlternateContent xmlns:mc="http://schemas.openxmlformats.org/markup-compatibility/2006" xmlns:p14="http://schemas.microsoft.com/office/powerpoint/2010/main">
-    <mc:Choice Requires="p14">
+  <mc:AlternateContent xmlns:mc="http://schemas.openxmlformats.org/markup-compatibility/2006">
+    <mc:Choice xmlns:p14="http://schemas.microsoft.com/office/powerpoint/2010/main" xmlns="" Requires="p14">
       <p:transition spd="med" p14:dur="700">
         <p:fade/>
       </p:transition>
     </mc:Choice>
-    <mc:Fallback xmlns="">
+    <mc:Fallback>
       <p:transition spd="med">
         <p:fade/>
       </p:transition>
@@ -8441,20 +8527,20 @@
     </p:spTree>
     <p:extLst>
       <p:ext uri="{BB962C8B-B14F-4D97-AF65-F5344CB8AC3E}">
-        <p14:creationId xmlns:p14="http://schemas.microsoft.com/office/powerpoint/2010/main" val="4207303638"/>
+        <p14:creationId xmlns:p14="http://schemas.microsoft.com/office/powerpoint/2010/main" xmlns="" val="4207303638"/>
       </p:ext>
     </p:extLst>
   </p:cSld>
   <p:clrMapOvr>
     <a:masterClrMapping/>
   </p:clrMapOvr>
-  <mc:AlternateContent xmlns:mc="http://schemas.openxmlformats.org/markup-compatibility/2006" xmlns:p14="http://schemas.microsoft.com/office/powerpoint/2010/main">
-    <mc:Choice Requires="p14">
+  <mc:AlternateContent xmlns:mc="http://schemas.openxmlformats.org/markup-compatibility/2006">
+    <mc:Choice xmlns:p14="http://schemas.microsoft.com/office/powerpoint/2010/main" xmlns="" Requires="p14">
       <p:transition spd="med" p14:dur="700">
         <p:fade/>
       </p:transition>
     </mc:Choice>
-    <mc:Fallback xmlns="">
+    <mc:Fallback>
       <p:transition spd="med">
         <p:fade/>
       </p:transition>
@@ -8548,20 +8634,20 @@
     </p:spTree>
     <p:extLst>
       <p:ext uri="{BB962C8B-B14F-4D97-AF65-F5344CB8AC3E}">
-        <p14:creationId xmlns:p14="http://schemas.microsoft.com/office/powerpoint/2010/main" val="3772183175"/>
+        <p14:creationId xmlns:p14="http://schemas.microsoft.com/office/powerpoint/2010/main" xmlns="" val="3772183175"/>
       </p:ext>
     </p:extLst>
   </p:cSld>
   <p:clrMapOvr>
     <a:masterClrMapping/>
   </p:clrMapOvr>
-  <mc:AlternateContent xmlns:mc="http://schemas.openxmlformats.org/markup-compatibility/2006" xmlns:p14="http://schemas.microsoft.com/office/powerpoint/2010/main">
-    <mc:Choice Requires="p14">
+  <mc:AlternateContent xmlns:mc="http://schemas.openxmlformats.org/markup-compatibility/2006">
+    <mc:Choice xmlns:p14="http://schemas.microsoft.com/office/powerpoint/2010/main" xmlns="" Requires="p14">
       <p:transition spd="med" p14:dur="700">
         <p:fade/>
       </p:transition>
     </mc:Choice>
-    <mc:Fallback xmlns="">
+    <mc:Fallback>
       <p:transition spd="med">
         <p:fade/>
       </p:transition>
@@ -8769,20 +8855,20 @@
     </p:spTree>
     <p:extLst>
       <p:ext uri="{BB962C8B-B14F-4D97-AF65-F5344CB8AC3E}">
-        <p14:creationId xmlns:p14="http://schemas.microsoft.com/office/powerpoint/2010/main" val="911844652"/>
+        <p14:creationId xmlns:p14="http://schemas.microsoft.com/office/powerpoint/2010/main" xmlns="" val="911844652"/>
       </p:ext>
     </p:extLst>
   </p:cSld>
   <p:clrMapOvr>
     <a:masterClrMapping/>
   </p:clrMapOvr>
-  <mc:AlternateContent xmlns:mc="http://schemas.openxmlformats.org/markup-compatibility/2006" xmlns:p14="http://schemas.microsoft.com/office/powerpoint/2010/main">
-    <mc:Choice Requires="p14">
+  <mc:AlternateContent xmlns:mc="http://schemas.openxmlformats.org/markup-compatibility/2006">
+    <mc:Choice xmlns:p14="http://schemas.microsoft.com/office/powerpoint/2010/main" xmlns="" Requires="p14">
       <p:transition spd="med" p14:dur="700">
         <p:fade/>
       </p:transition>
     </mc:Choice>
-    <mc:Fallback xmlns="">
+    <mc:Fallback>
       <p:transition spd="med">
         <p:fade/>
       </p:transition>
@@ -8956,20 +9042,20 @@
     </p:spTree>
     <p:extLst>
       <p:ext uri="{BB962C8B-B14F-4D97-AF65-F5344CB8AC3E}">
-        <p14:creationId xmlns:p14="http://schemas.microsoft.com/office/powerpoint/2010/main" val="3751154171"/>
+        <p14:creationId xmlns:p14="http://schemas.microsoft.com/office/powerpoint/2010/main" xmlns="" val="3751154171"/>
       </p:ext>
     </p:extLst>
   </p:cSld>
   <p:clrMapOvr>
     <a:masterClrMapping/>
   </p:clrMapOvr>
-  <mc:AlternateContent xmlns:mc="http://schemas.openxmlformats.org/markup-compatibility/2006" xmlns:p14="http://schemas.microsoft.com/office/powerpoint/2010/main">
-    <mc:Choice Requires="p14">
+  <mc:AlternateContent xmlns:mc="http://schemas.openxmlformats.org/markup-compatibility/2006">
+    <mc:Choice xmlns:p14="http://schemas.microsoft.com/office/powerpoint/2010/main" xmlns="" Requires="p14">
       <p:transition spd="med" p14:dur="700">
         <p:fade/>
       </p:transition>
     </mc:Choice>
-    <mc:Fallback xmlns="">
+    <mc:Fallback>
       <p:transition spd="med">
         <p:fade/>
       </p:transition>
@@ -9153,20 +9239,20 @@
     </p:spTree>
     <p:extLst>
       <p:ext uri="{BB962C8B-B14F-4D97-AF65-F5344CB8AC3E}">
-        <p14:creationId xmlns:p14="http://schemas.microsoft.com/office/powerpoint/2010/main" val="2714171304"/>
+        <p14:creationId xmlns:p14="http://schemas.microsoft.com/office/powerpoint/2010/main" xmlns="" val="2714171304"/>
       </p:ext>
     </p:extLst>
   </p:cSld>
   <p:clrMapOvr>
     <a:masterClrMapping/>
   </p:clrMapOvr>
-  <mc:AlternateContent xmlns:mc="http://schemas.openxmlformats.org/markup-compatibility/2006" xmlns:p14="http://schemas.microsoft.com/office/powerpoint/2010/main">
-    <mc:Choice Requires="p14">
+  <mc:AlternateContent xmlns:mc="http://schemas.openxmlformats.org/markup-compatibility/2006">
+    <mc:Choice xmlns:p14="http://schemas.microsoft.com/office/powerpoint/2010/main" xmlns="" Requires="p14">
       <p:transition spd="med" p14:dur="700">
         <p:fade/>
       </p:transition>
     </mc:Choice>
-    <mc:Fallback xmlns="">
+    <mc:Fallback>
       <p:transition spd="med">
         <p:fade/>
       </p:transition>
@@ -9345,20 +9431,20 @@
     </p:spTree>
     <p:extLst>
       <p:ext uri="{BB962C8B-B14F-4D97-AF65-F5344CB8AC3E}">
-        <p14:creationId xmlns:p14="http://schemas.microsoft.com/office/powerpoint/2010/main" val="2246987516"/>
+        <p14:creationId xmlns:p14="http://schemas.microsoft.com/office/powerpoint/2010/main" xmlns="" val="2246987516"/>
       </p:ext>
     </p:extLst>
   </p:cSld>
   <p:clrMapOvr>
     <a:masterClrMapping/>
   </p:clrMapOvr>
-  <mc:AlternateContent xmlns:mc="http://schemas.openxmlformats.org/markup-compatibility/2006" xmlns:p14="http://schemas.microsoft.com/office/powerpoint/2010/main">
-    <mc:Choice Requires="p14">
+  <mc:AlternateContent xmlns:mc="http://schemas.openxmlformats.org/markup-compatibility/2006">
+    <mc:Choice xmlns:p14="http://schemas.microsoft.com/office/powerpoint/2010/main" xmlns="" Requires="p14">
       <p:transition spd="med" p14:dur="700">
         <p:fade/>
       </p:transition>
     </mc:Choice>
-    <mc:Fallback xmlns="">
+    <mc:Fallback>
       <p:transition spd="med">
         <p:fade/>
       </p:transition>
@@ -9556,20 +9642,20 @@
     </p:spTree>
     <p:extLst>
       <p:ext uri="{BB962C8B-B14F-4D97-AF65-F5344CB8AC3E}">
-        <p14:creationId xmlns:p14="http://schemas.microsoft.com/office/powerpoint/2010/main" val="3025649002"/>
+        <p14:creationId xmlns:p14="http://schemas.microsoft.com/office/powerpoint/2010/main" xmlns="" val="3025649002"/>
       </p:ext>
     </p:extLst>
   </p:cSld>
   <p:clrMapOvr>
     <a:masterClrMapping/>
   </p:clrMapOvr>
-  <mc:AlternateContent xmlns:mc="http://schemas.openxmlformats.org/markup-compatibility/2006" xmlns:p14="http://schemas.microsoft.com/office/powerpoint/2010/main">
-    <mc:Choice Requires="p14">
+  <mc:AlternateContent xmlns:mc="http://schemas.openxmlformats.org/markup-compatibility/2006">
+    <mc:Choice xmlns:p14="http://schemas.microsoft.com/office/powerpoint/2010/main" xmlns="" Requires="p14">
       <p:transition spd="med" p14:dur="700">
         <p:fade/>
       </p:transition>
     </mc:Choice>
-    <mc:Fallback xmlns="">
+    <mc:Fallback>
       <p:transition spd="med">
         <p:fade/>
       </p:transition>
@@ -9706,20 +9792,20 @@
     </p:spTree>
     <p:extLst>
       <p:ext uri="{BB962C8B-B14F-4D97-AF65-F5344CB8AC3E}">
-        <p14:creationId xmlns:p14="http://schemas.microsoft.com/office/powerpoint/2010/main" val="3410413250"/>
+        <p14:creationId xmlns:p14="http://schemas.microsoft.com/office/powerpoint/2010/main" xmlns="" val="3410413250"/>
       </p:ext>
     </p:extLst>
   </p:cSld>
   <p:clrMapOvr>
     <a:masterClrMapping/>
   </p:clrMapOvr>
-  <mc:AlternateContent xmlns:mc="http://schemas.openxmlformats.org/markup-compatibility/2006" xmlns:p14="http://schemas.microsoft.com/office/powerpoint/2010/main">
-    <mc:Choice Requires="p14">
+  <mc:AlternateContent xmlns:mc="http://schemas.openxmlformats.org/markup-compatibility/2006">
+    <mc:Choice xmlns:p14="http://schemas.microsoft.com/office/powerpoint/2010/main" xmlns="" Requires="p14">
       <p:transition spd="med" p14:dur="700">
         <p:fade/>
       </p:transition>
     </mc:Choice>
-    <mc:Fallback xmlns="">
+    <mc:Fallback>
       <p:transition spd="med">
         <p:fade/>
       </p:transition>
@@ -9919,20 +10005,20 @@
     </p:spTree>
     <p:extLst>
       <p:ext uri="{BB962C8B-B14F-4D97-AF65-F5344CB8AC3E}">
-        <p14:creationId xmlns:p14="http://schemas.microsoft.com/office/powerpoint/2010/main" val="23673588"/>
+        <p14:creationId xmlns:p14="http://schemas.microsoft.com/office/powerpoint/2010/main" xmlns="" val="23673588"/>
       </p:ext>
     </p:extLst>
   </p:cSld>
   <p:clrMapOvr>
     <a:masterClrMapping/>
   </p:clrMapOvr>
-  <mc:AlternateContent xmlns:mc="http://schemas.openxmlformats.org/markup-compatibility/2006" xmlns:p14="http://schemas.microsoft.com/office/powerpoint/2010/main">
-    <mc:Choice Requires="p14">
+  <mc:AlternateContent xmlns:mc="http://schemas.openxmlformats.org/markup-compatibility/2006">
+    <mc:Choice xmlns:p14="http://schemas.microsoft.com/office/powerpoint/2010/main" xmlns="" Requires="p14">
       <p:transition spd="med" p14:dur="700">
         <p:fade/>
       </p:transition>
     </mc:Choice>
-    <mc:Fallback xmlns="">
+    <mc:Fallback>
       <p:transition spd="med">
         <p:fade/>
       </p:transition>
@@ -10292,20 +10378,20 @@
     </p:spTree>
     <p:extLst>
       <p:ext uri="{BB962C8B-B14F-4D97-AF65-F5344CB8AC3E}">
-        <p14:creationId xmlns:p14="http://schemas.microsoft.com/office/powerpoint/2010/main" val="2139132589"/>
+        <p14:creationId xmlns:p14="http://schemas.microsoft.com/office/powerpoint/2010/main" xmlns="" val="2139132589"/>
       </p:ext>
     </p:extLst>
   </p:cSld>
   <p:clrMapOvr>
     <a:masterClrMapping/>
   </p:clrMapOvr>
-  <mc:AlternateContent xmlns:mc="http://schemas.openxmlformats.org/markup-compatibility/2006" xmlns:p14="http://schemas.microsoft.com/office/powerpoint/2010/main">
-    <mc:Choice Requires="p14">
+  <mc:AlternateContent xmlns:mc="http://schemas.openxmlformats.org/markup-compatibility/2006">
+    <mc:Choice xmlns:p14="http://schemas.microsoft.com/office/powerpoint/2010/main" xmlns="" Requires="p14">
       <p:transition spd="med" p14:dur="700">
         <p:fade/>
       </p:transition>
     </mc:Choice>
-    <mc:Fallback xmlns="">
+    <mc:Fallback>
       <p:transition spd="med">
         <p:fade/>
       </p:transition>
@@ -10564,20 +10650,20 @@
     </p:spTree>
     <p:extLst>
       <p:ext uri="{BB962C8B-B14F-4D97-AF65-F5344CB8AC3E}">
-        <p14:creationId xmlns:p14="http://schemas.microsoft.com/office/powerpoint/2010/main" val="3632379430"/>
+        <p14:creationId xmlns:p14="http://schemas.microsoft.com/office/powerpoint/2010/main" xmlns="" val="3632379430"/>
       </p:ext>
     </p:extLst>
   </p:cSld>
   <p:clrMapOvr>
     <a:masterClrMapping/>
   </p:clrMapOvr>
-  <mc:AlternateContent xmlns:mc="http://schemas.openxmlformats.org/markup-compatibility/2006" xmlns:p14="http://schemas.microsoft.com/office/powerpoint/2010/main">
-    <mc:Choice Requires="p14">
+  <mc:AlternateContent xmlns:mc="http://schemas.openxmlformats.org/markup-compatibility/2006">
+    <mc:Choice xmlns:p14="http://schemas.microsoft.com/office/powerpoint/2010/main" xmlns="" Requires="p14">
       <p:transition spd="med" p14:dur="700">
         <p:fade/>
       </p:transition>
     </mc:Choice>
-    <mc:Fallback xmlns="">
+    <mc:Fallback>
       <p:transition spd="med">
         <p:fade/>
       </p:transition>
@@ -10805,20 +10891,20 @@
     </p:spTree>
     <p:extLst>
       <p:ext uri="{BB962C8B-B14F-4D97-AF65-F5344CB8AC3E}">
-        <p14:creationId xmlns:p14="http://schemas.microsoft.com/office/powerpoint/2010/main" val="3204325395"/>
+        <p14:creationId xmlns:p14="http://schemas.microsoft.com/office/powerpoint/2010/main" xmlns="" val="3204325395"/>
       </p:ext>
     </p:extLst>
   </p:cSld>
   <p:clrMapOvr>
     <a:masterClrMapping/>
   </p:clrMapOvr>
-  <mc:AlternateContent xmlns:mc="http://schemas.openxmlformats.org/markup-compatibility/2006" xmlns:p14="http://schemas.microsoft.com/office/powerpoint/2010/main">
-    <mc:Choice Requires="p14">
+  <mc:AlternateContent xmlns:mc="http://schemas.openxmlformats.org/markup-compatibility/2006">
+    <mc:Choice xmlns:p14="http://schemas.microsoft.com/office/powerpoint/2010/main" xmlns="" Requires="p14">
       <p:transition spd="med" p14:dur="700">
         <p:fade/>
       </p:transition>
     </mc:Choice>
-    <mc:Fallback xmlns="">
+    <mc:Fallback>
       <p:transition spd="med">
         <p:fade/>
       </p:transition>
@@ -11004,20 +11090,20 @@
     </p:spTree>
     <p:extLst>
       <p:ext uri="{BB962C8B-B14F-4D97-AF65-F5344CB8AC3E}">
-        <p14:creationId xmlns:p14="http://schemas.microsoft.com/office/powerpoint/2010/main" val="1496383053"/>
+        <p14:creationId xmlns:p14="http://schemas.microsoft.com/office/powerpoint/2010/main" xmlns="" val="1496383053"/>
       </p:ext>
     </p:extLst>
   </p:cSld>
   <p:clrMapOvr>
     <a:masterClrMapping/>
   </p:clrMapOvr>
-  <mc:AlternateContent xmlns:mc="http://schemas.openxmlformats.org/markup-compatibility/2006" xmlns:p14="http://schemas.microsoft.com/office/powerpoint/2010/main">
-    <mc:Choice Requires="p14">
+  <mc:AlternateContent xmlns:mc="http://schemas.openxmlformats.org/markup-compatibility/2006">
+    <mc:Choice xmlns:p14="http://schemas.microsoft.com/office/powerpoint/2010/main" xmlns="" Requires="p14">
       <p:transition spd="med" p14:dur="700">
         <p:fade/>
       </p:transition>
     </mc:Choice>
-    <mc:Fallback xmlns="">
+    <mc:Fallback>
       <p:transition spd="med">
         <p:fade/>
       </p:transition>
@@ -11236,20 +11322,20 @@
     </p:spTree>
     <p:extLst>
       <p:ext uri="{BB962C8B-B14F-4D97-AF65-F5344CB8AC3E}">
-        <p14:creationId xmlns:p14="http://schemas.microsoft.com/office/powerpoint/2010/main" val="1679218424"/>
+        <p14:creationId xmlns:p14="http://schemas.microsoft.com/office/powerpoint/2010/main" xmlns="" val="1679218424"/>
       </p:ext>
     </p:extLst>
   </p:cSld>
   <p:clrMapOvr>
     <a:masterClrMapping/>
   </p:clrMapOvr>
-  <mc:AlternateContent xmlns:mc="http://schemas.openxmlformats.org/markup-compatibility/2006" xmlns:p14="http://schemas.microsoft.com/office/powerpoint/2010/main">
-    <mc:Choice Requires="p14">
+  <mc:AlternateContent xmlns:mc="http://schemas.openxmlformats.org/markup-compatibility/2006">
+    <mc:Choice xmlns:p14="http://schemas.microsoft.com/office/powerpoint/2010/main" xmlns="" Requires="p14">
       <p:transition spd="med" p14:dur="700">
         <p:fade/>
       </p:transition>
     </mc:Choice>
-    <mc:Fallback xmlns="">
+    <mc:Fallback>
       <p:transition spd="med">
         <p:fade/>
       </p:transition>
@@ -11453,20 +11539,20 @@
     </p:spTree>
     <p:extLst>
       <p:ext uri="{BB962C8B-B14F-4D97-AF65-F5344CB8AC3E}">
-        <p14:creationId xmlns:p14="http://schemas.microsoft.com/office/powerpoint/2010/main" val="1679218424"/>
+        <p14:creationId xmlns:p14="http://schemas.microsoft.com/office/powerpoint/2010/main" xmlns="" val="1679218424"/>
       </p:ext>
     </p:extLst>
   </p:cSld>
   <p:clrMapOvr>
     <a:masterClrMapping/>
   </p:clrMapOvr>
-  <mc:AlternateContent xmlns:mc="http://schemas.openxmlformats.org/markup-compatibility/2006" xmlns:p14="http://schemas.microsoft.com/office/powerpoint/2010/main">
-    <mc:Choice Requires="p14">
+  <mc:AlternateContent xmlns:mc="http://schemas.openxmlformats.org/markup-compatibility/2006">
+    <mc:Choice xmlns:p14="http://schemas.microsoft.com/office/powerpoint/2010/main" xmlns="" Requires="p14">
       <p:transition spd="med" p14:dur="700">
         <p:fade/>
       </p:transition>
     </mc:Choice>
-    <mc:Fallback xmlns="">
+    <mc:Fallback>
       <p:transition spd="med">
         <p:fade/>
       </p:transition>
@@ -11727,13 +11813,13 @@
   <p:clrMapOvr>
     <a:masterClrMapping/>
   </p:clrMapOvr>
-  <mc:AlternateContent xmlns:mc="http://schemas.openxmlformats.org/markup-compatibility/2006" xmlns:p14="http://schemas.microsoft.com/office/powerpoint/2010/main">
-    <mc:Choice Requires="p14">
+  <mc:AlternateContent xmlns:mc="http://schemas.openxmlformats.org/markup-compatibility/2006">
+    <mc:Choice xmlns:p14="http://schemas.microsoft.com/office/powerpoint/2010/main" xmlns="" Requires="p14">
       <p:transition spd="med" p14:dur="700">
         <p:fade/>
       </p:transition>
     </mc:Choice>
-    <mc:Fallback xmlns="">
+    <mc:Fallback>
       <p:transition spd="med">
         <p:fade/>
       </p:transition>
@@ -12016,13 +12102,13 @@
   <p:clrMapOvr>
     <a:masterClrMapping/>
   </p:clrMapOvr>
-  <mc:AlternateContent xmlns:mc="http://schemas.openxmlformats.org/markup-compatibility/2006" xmlns:p14="http://schemas.microsoft.com/office/powerpoint/2010/main">
-    <mc:Choice Requires="p14">
+  <mc:AlternateContent xmlns:mc="http://schemas.openxmlformats.org/markup-compatibility/2006">
+    <mc:Choice xmlns:p14="http://schemas.microsoft.com/office/powerpoint/2010/main" xmlns="" Requires="p14">
       <p:transition spd="med" p14:dur="700">
         <p:fade/>
       </p:transition>
     </mc:Choice>
-    <mc:Fallback xmlns="">
+    <mc:Fallback>
       <p:transition spd="med">
         <p:fade/>
       </p:transition>
@@ -12250,13 +12336,13 @@
   <p:clrMapOvr>
     <a:masterClrMapping/>
   </p:clrMapOvr>
-  <mc:AlternateContent xmlns:mc="http://schemas.openxmlformats.org/markup-compatibility/2006" xmlns:p14="http://schemas.microsoft.com/office/powerpoint/2010/main">
-    <mc:Choice Requires="p14">
+  <mc:AlternateContent xmlns:mc="http://schemas.openxmlformats.org/markup-compatibility/2006">
+    <mc:Choice xmlns:p14="http://schemas.microsoft.com/office/powerpoint/2010/main" xmlns="" Requires="p14">
       <p:transition spd="med" p14:dur="700">
         <p:fade/>
       </p:transition>
     </mc:Choice>
-    <mc:Fallback xmlns="">
+    <mc:Fallback>
       <p:transition spd="med">
         <p:fade/>
       </p:transition>
@@ -12350,20 +12436,20 @@
     </p:spTree>
     <p:extLst>
       <p:ext uri="{BB962C8B-B14F-4D97-AF65-F5344CB8AC3E}">
-        <p14:creationId xmlns:p14="http://schemas.microsoft.com/office/powerpoint/2010/main" val="3439397754"/>
+        <p14:creationId xmlns:p14="http://schemas.microsoft.com/office/powerpoint/2010/main" xmlns="" val="3439397754"/>
       </p:ext>
     </p:extLst>
   </p:cSld>
   <p:clrMapOvr>
     <a:masterClrMapping/>
   </p:clrMapOvr>
-  <mc:AlternateContent xmlns:mc="http://schemas.openxmlformats.org/markup-compatibility/2006" xmlns:p14="http://schemas.microsoft.com/office/powerpoint/2010/main">
-    <mc:Choice Requires="p14">
+  <mc:AlternateContent xmlns:mc="http://schemas.openxmlformats.org/markup-compatibility/2006">
+    <mc:Choice xmlns:p14="http://schemas.microsoft.com/office/powerpoint/2010/main" xmlns="" Requires="p14">
       <p:transition spd="med" p14:dur="700">
         <p:fade/>
       </p:transition>
     </mc:Choice>
-    <mc:Fallback xmlns="">
+    <mc:Fallback>
       <p:transition spd="med">
         <p:fade/>
       </p:transition>
@@ -12532,20 +12618,20 @@
     </p:spTree>
     <p:extLst>
       <p:ext uri="{BB962C8B-B14F-4D97-AF65-F5344CB8AC3E}">
-        <p14:creationId xmlns:p14="http://schemas.microsoft.com/office/powerpoint/2010/main" val="2675216716"/>
+        <p14:creationId xmlns:p14="http://schemas.microsoft.com/office/powerpoint/2010/main" xmlns="" val="2675216716"/>
       </p:ext>
     </p:extLst>
   </p:cSld>
   <p:clrMapOvr>
     <a:masterClrMapping/>
   </p:clrMapOvr>
-  <mc:AlternateContent xmlns:mc="http://schemas.openxmlformats.org/markup-compatibility/2006" xmlns:p14="http://schemas.microsoft.com/office/powerpoint/2010/main">
-    <mc:Choice Requires="p14">
+  <mc:AlternateContent xmlns:mc="http://schemas.openxmlformats.org/markup-compatibility/2006">
+    <mc:Choice xmlns:p14="http://schemas.microsoft.com/office/powerpoint/2010/main" xmlns="" Requires="p14">
       <p:transition spd="med" p14:dur="700">
         <p:fade/>
       </p:transition>
     </mc:Choice>
-    <mc:Fallback xmlns="">
+    <mc:Fallback>
       <p:transition spd="med">
         <p:fade/>
       </p:transition>
@@ -12658,30 +12744,16 @@
                 <a:latin typeface="Segoe UI" panose="020B0502040204020203" pitchFamily="34" charset="0"/>
                 <a:cs typeface="Segoe UI" panose="020B0502040204020203" pitchFamily="34" charset="0"/>
               </a:rPr>
-              <a:t>Fuga de </a:t>
-            </a:r>
+              <a:t>Fuga de información</a:t>
+            </a:r>
+          </a:p>
+          <a:p>
             <a:r>
               <a:rPr lang="es-AR" dirty="0" smtClean="0">
                 <a:latin typeface="Segoe UI" panose="020B0502040204020203" pitchFamily="34" charset="0"/>
                 <a:cs typeface="Segoe UI" panose="020B0502040204020203" pitchFamily="34" charset="0"/>
               </a:rPr>
-              <a:t>información</a:t>
-            </a:r>
-          </a:p>
-          <a:p>
-            <a:r>
-              <a:rPr lang="es-AR" dirty="0" smtClean="0">
-                <a:latin typeface="Segoe UI" panose="020B0502040204020203" pitchFamily="34" charset="0"/>
-                <a:cs typeface="Segoe UI" panose="020B0502040204020203" pitchFamily="34" charset="0"/>
-              </a:rPr>
-              <a:t>Riesgos </a:t>
-            </a:r>
-            <a:r>
-              <a:rPr lang="es-AR" dirty="0" smtClean="0">
-                <a:latin typeface="Segoe UI" panose="020B0502040204020203" pitchFamily="34" charset="0"/>
-                <a:cs typeface="Segoe UI" panose="020B0502040204020203" pitchFamily="34" charset="0"/>
-              </a:rPr>
-              <a:t>existentes</a:t>
+              <a:t>Riesgos existentes</a:t>
             </a:r>
           </a:p>
           <a:p>
@@ -12702,20 +12774,20 @@
     </p:spTree>
     <p:extLst>
       <p:ext uri="{BB962C8B-B14F-4D97-AF65-F5344CB8AC3E}">
-        <p14:creationId xmlns:p14="http://schemas.microsoft.com/office/powerpoint/2010/main" val="3106206852"/>
+        <p14:creationId xmlns:p14="http://schemas.microsoft.com/office/powerpoint/2010/main" xmlns="" val="3106206852"/>
       </p:ext>
     </p:extLst>
   </p:cSld>
   <p:clrMapOvr>
     <a:masterClrMapping/>
   </p:clrMapOvr>
-  <mc:AlternateContent xmlns:mc="http://schemas.openxmlformats.org/markup-compatibility/2006" xmlns:p14="http://schemas.microsoft.com/office/powerpoint/2010/main">
-    <mc:Choice Requires="p14">
+  <mc:AlternateContent xmlns:mc="http://schemas.openxmlformats.org/markup-compatibility/2006">
+    <mc:Choice xmlns:p14="http://schemas.microsoft.com/office/powerpoint/2010/main" xmlns="" Requires="p14">
       <p:transition spd="med" p14:dur="700">
         <p:fade/>
       </p:transition>
     </mc:Choice>
-    <mc:Fallback xmlns="">
+    <mc:Fallback>
       <p:transition spd="med">
         <p:fade/>
       </p:transition>
@@ -13177,7 +13249,7 @@
           <a:blip r:embed="rId3" cstate="print">
             <a:extLst>
               <a:ext uri="{28A0092B-C50C-407E-A947-70E740481C1C}">
-                <a14:useLocalDpi xmlns:a14="http://schemas.microsoft.com/office/drawing/2010/main" val="0"/>
+                <a14:useLocalDpi xmlns:a14="http://schemas.microsoft.com/office/drawing/2010/main" xmlns="" val="0"/>
               </a:ext>
             </a:extLst>
           </a:blip>
@@ -13197,7 +13269,7 @@
           <a:noFill/>
           <a:extLst>
             <a:ext uri="{909E8E84-426E-40DD-AFC4-6F175D3DCCD1}">
-              <a14:hiddenFill xmlns:a14="http://schemas.microsoft.com/office/drawing/2010/main">
+              <a14:hiddenFill xmlns:a14="http://schemas.microsoft.com/office/drawing/2010/main" xmlns="">
                 <a:solidFill>
                   <a:srgbClr val="FFFFFF"/>
                 </a:solidFill>
@@ -13218,7 +13290,7 @@
           <a:blip r:embed="rId4" cstate="print">
             <a:extLst>
               <a:ext uri="{28A0092B-C50C-407E-A947-70E740481C1C}">
-                <a14:useLocalDpi xmlns:a14="http://schemas.microsoft.com/office/drawing/2010/main" val="0"/>
+                <a14:useLocalDpi xmlns:a14="http://schemas.microsoft.com/office/drawing/2010/main" xmlns="" val="0"/>
               </a:ext>
             </a:extLst>
           </a:blip>
@@ -13238,7 +13310,7 @@
           <a:noFill/>
           <a:extLst>
             <a:ext uri="{909E8E84-426E-40DD-AFC4-6F175D3DCCD1}">
-              <a14:hiddenFill xmlns:a14="http://schemas.microsoft.com/office/drawing/2010/main">
+              <a14:hiddenFill xmlns:a14="http://schemas.microsoft.com/office/drawing/2010/main" xmlns="">
                 <a:solidFill>
                   <a:srgbClr val="FFFFFF"/>
                 </a:solidFill>
@@ -13259,7 +13331,7 @@
           <a:blip r:embed="rId5" cstate="print">
             <a:extLst>
               <a:ext uri="{28A0092B-C50C-407E-A947-70E740481C1C}">
-                <a14:useLocalDpi xmlns:a14="http://schemas.microsoft.com/office/drawing/2010/main" val="0"/>
+                <a14:useLocalDpi xmlns:a14="http://schemas.microsoft.com/office/drawing/2010/main" xmlns="" val="0"/>
               </a:ext>
             </a:extLst>
           </a:blip>
@@ -13279,7 +13351,7 @@
           <a:noFill/>
           <a:extLst>
             <a:ext uri="{909E8E84-426E-40DD-AFC4-6F175D3DCCD1}">
-              <a14:hiddenFill xmlns:a14="http://schemas.microsoft.com/office/drawing/2010/main">
+              <a14:hiddenFill xmlns:a14="http://schemas.microsoft.com/office/drawing/2010/main" xmlns="">
                 <a:solidFill>
                   <a:srgbClr val="FFFFFF"/>
                 </a:solidFill>
@@ -13300,7 +13372,7 @@
           <a:blip r:embed="rId6" cstate="print">
             <a:extLst>
               <a:ext uri="{28A0092B-C50C-407E-A947-70E740481C1C}">
-                <a14:useLocalDpi xmlns:a14="http://schemas.microsoft.com/office/drawing/2010/main" val="0"/>
+                <a14:useLocalDpi xmlns:a14="http://schemas.microsoft.com/office/drawing/2010/main" xmlns="" val="0"/>
               </a:ext>
             </a:extLst>
           </a:blip>
@@ -13320,7 +13392,7 @@
           <a:noFill/>
           <a:extLst>
             <a:ext uri="{909E8E84-426E-40DD-AFC4-6F175D3DCCD1}">
-              <a14:hiddenFill xmlns:a14="http://schemas.microsoft.com/office/drawing/2010/main">
+              <a14:hiddenFill xmlns:a14="http://schemas.microsoft.com/office/drawing/2010/main" xmlns="">
                 <a:solidFill>
                   <a:srgbClr val="FFFFFF"/>
                 </a:solidFill>
@@ -13341,7 +13413,7 @@
           <a:blip r:embed="rId7" cstate="print">
             <a:extLst>
               <a:ext uri="{28A0092B-C50C-407E-A947-70E740481C1C}">
-                <a14:useLocalDpi xmlns:a14="http://schemas.microsoft.com/office/drawing/2010/main" val="0"/>
+                <a14:useLocalDpi xmlns:a14="http://schemas.microsoft.com/office/drawing/2010/main" xmlns="" val="0"/>
               </a:ext>
             </a:extLst>
           </a:blip>
@@ -13361,7 +13433,7 @@
           <a:noFill/>
           <a:extLst>
             <a:ext uri="{909E8E84-426E-40DD-AFC4-6F175D3DCCD1}">
-              <a14:hiddenFill xmlns:a14="http://schemas.microsoft.com/office/drawing/2010/main">
+              <a14:hiddenFill xmlns:a14="http://schemas.microsoft.com/office/drawing/2010/main" xmlns="">
                 <a:solidFill>
                   <a:srgbClr val="FFFFFF"/>
                 </a:solidFill>
@@ -13373,20 +13445,20 @@
     </p:spTree>
     <p:extLst>
       <p:ext uri="{BB962C8B-B14F-4D97-AF65-F5344CB8AC3E}">
-        <p14:creationId xmlns:p14="http://schemas.microsoft.com/office/powerpoint/2010/main" val="2564182459"/>
+        <p14:creationId xmlns:p14="http://schemas.microsoft.com/office/powerpoint/2010/main" xmlns="" val="2564182459"/>
       </p:ext>
     </p:extLst>
   </p:cSld>
   <p:clrMapOvr>
     <a:masterClrMapping/>
   </p:clrMapOvr>
-  <mc:AlternateContent xmlns:mc="http://schemas.openxmlformats.org/markup-compatibility/2006" xmlns:p14="http://schemas.microsoft.com/office/powerpoint/2010/main">
-    <mc:Choice Requires="p14">
+  <mc:AlternateContent xmlns:mc="http://schemas.openxmlformats.org/markup-compatibility/2006">
+    <mc:Choice xmlns:p14="http://schemas.microsoft.com/office/powerpoint/2010/main" xmlns="" Requires="p14">
       <p:transition spd="med" p14:dur="700">
         <p:fade/>
       </p:transition>
     </mc:Choice>
-    <mc:Fallback xmlns="">
+    <mc:Fallback>
       <p:transition spd="med">
         <p:fade/>
       </p:transition>
@@ -13545,20 +13617,20 @@
     </p:spTree>
     <p:extLst>
       <p:ext uri="{BB962C8B-B14F-4D97-AF65-F5344CB8AC3E}">
-        <p14:creationId xmlns:p14="http://schemas.microsoft.com/office/powerpoint/2010/main" val="965594786"/>
+        <p14:creationId xmlns:p14="http://schemas.microsoft.com/office/powerpoint/2010/main" xmlns="" val="965594786"/>
       </p:ext>
     </p:extLst>
   </p:cSld>
   <p:clrMapOvr>
     <a:masterClrMapping/>
   </p:clrMapOvr>
-  <mc:AlternateContent xmlns:mc="http://schemas.openxmlformats.org/markup-compatibility/2006" xmlns:p14="http://schemas.microsoft.com/office/powerpoint/2010/main">
-    <mc:Choice Requires="p14">
+  <mc:AlternateContent xmlns:mc="http://schemas.openxmlformats.org/markup-compatibility/2006">
+    <mc:Choice xmlns:p14="http://schemas.microsoft.com/office/powerpoint/2010/main" xmlns="" Requires="p14">
       <p:transition spd="med" p14:dur="700">
         <p:fade/>
       </p:transition>
     </mc:Choice>
-    <mc:Fallback xmlns="">
+    <mc:Fallback>
       <p:transition spd="med">
         <p:fade/>
       </p:transition>
@@ -13816,7 +13888,7 @@
           <a:blip r:embed="rId3" cstate="print">
             <a:extLst>
               <a:ext uri="{28A0092B-C50C-407E-A947-70E740481C1C}">
-                <a14:useLocalDpi xmlns:a14="http://schemas.microsoft.com/office/drawing/2010/main" val="0"/>
+                <a14:useLocalDpi xmlns:a14="http://schemas.microsoft.com/office/drawing/2010/main" xmlns="" val="0"/>
               </a:ext>
             </a:extLst>
           </a:blip>
@@ -13836,7 +13908,7 @@
           <a:noFill/>
           <a:extLst>
             <a:ext uri="{909E8E84-426E-40DD-AFC4-6F175D3DCCD1}">
-              <a14:hiddenFill xmlns:a14="http://schemas.microsoft.com/office/drawing/2010/main">
+              <a14:hiddenFill xmlns:a14="http://schemas.microsoft.com/office/drawing/2010/main" xmlns="">
                 <a:solidFill>
                   <a:srgbClr val="FFFFFF"/>
                 </a:solidFill>
@@ -13848,20 +13920,20 @@
     </p:spTree>
     <p:extLst>
       <p:ext uri="{BB962C8B-B14F-4D97-AF65-F5344CB8AC3E}">
-        <p14:creationId xmlns:p14="http://schemas.microsoft.com/office/powerpoint/2010/main" val="3356351472"/>
+        <p14:creationId xmlns:p14="http://schemas.microsoft.com/office/powerpoint/2010/main" xmlns="" val="3356351472"/>
       </p:ext>
     </p:extLst>
   </p:cSld>
   <p:clrMapOvr>
     <a:masterClrMapping/>
   </p:clrMapOvr>
-  <mc:AlternateContent xmlns:mc="http://schemas.openxmlformats.org/markup-compatibility/2006" xmlns:p14="http://schemas.microsoft.com/office/powerpoint/2010/main">
-    <mc:Choice Requires="p14">
+  <mc:AlternateContent xmlns:mc="http://schemas.openxmlformats.org/markup-compatibility/2006">
+    <mc:Choice xmlns:p14="http://schemas.microsoft.com/office/powerpoint/2010/main" xmlns="" Requires="p14">
       <p:transition spd="med" p14:dur="700">
         <p:fade/>
       </p:transition>
     </mc:Choice>
-    <mc:Fallback xmlns="">
+    <mc:Fallback>
       <p:transition spd="med">
         <p:fade/>
       </p:transition>
@@ -14089,7 +14161,7 @@
           <a:blip r:embed="rId3" cstate="print">
             <a:extLst>
               <a:ext uri="{28A0092B-C50C-407E-A947-70E740481C1C}">
-                <a14:useLocalDpi xmlns:a14="http://schemas.microsoft.com/office/drawing/2010/main" val="0"/>
+                <a14:useLocalDpi xmlns:a14="http://schemas.microsoft.com/office/drawing/2010/main" xmlns="" val="0"/>
               </a:ext>
             </a:extLst>
           </a:blip>
@@ -14109,7 +14181,7 @@
           <a:noFill/>
           <a:extLst>
             <a:ext uri="{909E8E84-426E-40DD-AFC4-6F175D3DCCD1}">
-              <a14:hiddenFill xmlns:a14="http://schemas.microsoft.com/office/drawing/2010/main">
+              <a14:hiddenFill xmlns:a14="http://schemas.microsoft.com/office/drawing/2010/main" xmlns="">
                 <a:solidFill>
                   <a:srgbClr val="FFFFFF"/>
                 </a:solidFill>
@@ -14121,20 +14193,20 @@
     </p:spTree>
     <p:extLst>
       <p:ext uri="{BB962C8B-B14F-4D97-AF65-F5344CB8AC3E}">
-        <p14:creationId xmlns:p14="http://schemas.microsoft.com/office/powerpoint/2010/main" val="3374507202"/>
+        <p14:creationId xmlns:p14="http://schemas.microsoft.com/office/powerpoint/2010/main" xmlns="" val="3374507202"/>
       </p:ext>
     </p:extLst>
   </p:cSld>
   <p:clrMapOvr>
     <a:masterClrMapping/>
   </p:clrMapOvr>
-  <mc:AlternateContent xmlns:mc="http://schemas.openxmlformats.org/markup-compatibility/2006" xmlns:p14="http://schemas.microsoft.com/office/powerpoint/2010/main">
-    <mc:Choice Requires="p14">
+  <mc:AlternateContent xmlns:mc="http://schemas.openxmlformats.org/markup-compatibility/2006">
+    <mc:Choice xmlns:p14="http://schemas.microsoft.com/office/powerpoint/2010/main" xmlns="" Requires="p14">
       <p:transition spd="med" p14:dur="700">
         <p:fade/>
       </p:transition>
     </mc:Choice>
-    <mc:Fallback xmlns="">
+    <mc:Fallback>
       <p:transition spd="med">
         <p:fade/>
       </p:transition>
@@ -14300,20 +14372,20 @@
     </p:spTree>
     <p:extLst>
       <p:ext uri="{BB962C8B-B14F-4D97-AF65-F5344CB8AC3E}">
-        <p14:creationId xmlns:p14="http://schemas.microsoft.com/office/powerpoint/2010/main" val="2238024562"/>
+        <p14:creationId xmlns:p14="http://schemas.microsoft.com/office/powerpoint/2010/main" xmlns="" val="2238024562"/>
       </p:ext>
     </p:extLst>
   </p:cSld>
   <p:clrMapOvr>
     <a:masterClrMapping/>
   </p:clrMapOvr>
-  <mc:AlternateContent xmlns:mc="http://schemas.openxmlformats.org/markup-compatibility/2006" xmlns:p14="http://schemas.microsoft.com/office/powerpoint/2010/main">
-    <mc:Choice Requires="p14">
+  <mc:AlternateContent xmlns:mc="http://schemas.openxmlformats.org/markup-compatibility/2006">
+    <mc:Choice xmlns:p14="http://schemas.microsoft.com/office/powerpoint/2010/main" xmlns="" Requires="p14">
       <p:transition spd="med" p14:dur="700">
         <p:fade/>
       </p:transition>
     </mc:Choice>
-    <mc:Fallback xmlns="">
+    <mc:Fallback>
       <p:transition spd="med">
         <p:fade/>
       </p:transition>
@@ -14483,20 +14555,20 @@
     </p:spTree>
     <p:extLst>
       <p:ext uri="{BB962C8B-B14F-4D97-AF65-F5344CB8AC3E}">
-        <p14:creationId xmlns:p14="http://schemas.microsoft.com/office/powerpoint/2010/main" val="3874537101"/>
+        <p14:creationId xmlns:p14="http://schemas.microsoft.com/office/powerpoint/2010/main" xmlns="" val="3874537101"/>
       </p:ext>
     </p:extLst>
   </p:cSld>
   <p:clrMapOvr>
     <a:masterClrMapping/>
   </p:clrMapOvr>
-  <mc:AlternateContent xmlns:mc="http://schemas.openxmlformats.org/markup-compatibility/2006" xmlns:p14="http://schemas.microsoft.com/office/powerpoint/2010/main">
-    <mc:Choice Requires="p14">
+  <mc:AlternateContent xmlns:mc="http://schemas.openxmlformats.org/markup-compatibility/2006">
+    <mc:Choice xmlns:p14="http://schemas.microsoft.com/office/powerpoint/2010/main" xmlns="" Requires="p14">
       <p:transition spd="med" p14:dur="700">
         <p:fade/>
       </p:transition>
     </mc:Choice>
-    <mc:Fallback xmlns="">
+    <mc:Fallback>
       <p:transition spd="med">
         <p:fade/>
       </p:transition>
@@ -14630,20 +14702,20 @@
     </p:spTree>
     <p:extLst>
       <p:ext uri="{BB962C8B-B14F-4D97-AF65-F5344CB8AC3E}">
-        <p14:creationId xmlns:p14="http://schemas.microsoft.com/office/powerpoint/2010/main" val="1202384585"/>
+        <p14:creationId xmlns:p14="http://schemas.microsoft.com/office/powerpoint/2010/main" xmlns="" val="1202384585"/>
       </p:ext>
     </p:extLst>
   </p:cSld>
   <p:clrMapOvr>
     <a:masterClrMapping/>
   </p:clrMapOvr>
-  <mc:AlternateContent xmlns:mc="http://schemas.openxmlformats.org/markup-compatibility/2006" xmlns:p14="http://schemas.microsoft.com/office/powerpoint/2010/main">
-    <mc:Choice Requires="p14">
+  <mc:AlternateContent xmlns:mc="http://schemas.openxmlformats.org/markup-compatibility/2006">
+    <mc:Choice xmlns:p14="http://schemas.microsoft.com/office/powerpoint/2010/main" xmlns="" Requires="p14">
       <p:transition spd="med" p14:dur="700">
         <p:fade/>
       </p:transition>
     </mc:Choice>
-    <mc:Fallback xmlns="">
+    <mc:Fallback>
       <p:transition spd="med">
         <p:fade/>
       </p:transition>
@@ -14875,20 +14947,20 @@
     </p:spTree>
     <p:extLst>
       <p:ext uri="{BB962C8B-B14F-4D97-AF65-F5344CB8AC3E}">
-        <p14:creationId xmlns:p14="http://schemas.microsoft.com/office/powerpoint/2010/main" val="701687324"/>
+        <p14:creationId xmlns:p14="http://schemas.microsoft.com/office/powerpoint/2010/main" xmlns="" val="701687324"/>
       </p:ext>
     </p:extLst>
   </p:cSld>
   <p:clrMapOvr>
     <a:masterClrMapping/>
   </p:clrMapOvr>
-  <mc:AlternateContent xmlns:mc="http://schemas.openxmlformats.org/markup-compatibility/2006" xmlns:p14="http://schemas.microsoft.com/office/powerpoint/2010/main">
-    <mc:Choice Requires="p14">
+  <mc:AlternateContent xmlns:mc="http://schemas.openxmlformats.org/markup-compatibility/2006">
+    <mc:Choice xmlns:p14="http://schemas.microsoft.com/office/powerpoint/2010/main" xmlns="" Requires="p14">
       <p:transition spd="med" p14:dur="700">
         <p:fade/>
       </p:transition>
     </mc:Choice>
-    <mc:Fallback xmlns="">
+    <mc:Fallback>
       <p:transition spd="med">
         <p:fade/>
       </p:transition>
@@ -15042,20 +15114,20 @@
     </p:spTree>
     <p:extLst>
       <p:ext uri="{BB962C8B-B14F-4D97-AF65-F5344CB8AC3E}">
-        <p14:creationId xmlns:p14="http://schemas.microsoft.com/office/powerpoint/2010/main" val="1445017764"/>
+        <p14:creationId xmlns:p14="http://schemas.microsoft.com/office/powerpoint/2010/main" xmlns="" val="1445017764"/>
       </p:ext>
     </p:extLst>
   </p:cSld>
   <p:clrMapOvr>
     <a:masterClrMapping/>
   </p:clrMapOvr>
-  <mc:AlternateContent xmlns:mc="http://schemas.openxmlformats.org/markup-compatibility/2006" xmlns:p14="http://schemas.microsoft.com/office/powerpoint/2010/main">
-    <mc:Choice Requires="p14">
+  <mc:AlternateContent xmlns:mc="http://schemas.openxmlformats.org/markup-compatibility/2006">
+    <mc:Choice xmlns:p14="http://schemas.microsoft.com/office/powerpoint/2010/main" xmlns="" Requires="p14">
       <p:transition spd="med" p14:dur="700">
         <p:fade/>
       </p:transition>
     </mc:Choice>
-    <mc:Fallback xmlns="">
+    <mc:Fallback>
       <p:transition spd="med">
         <p:fade/>
       </p:transition>
@@ -15236,20 +15308,20 @@
     </p:spTree>
     <p:extLst>
       <p:ext uri="{BB962C8B-B14F-4D97-AF65-F5344CB8AC3E}">
-        <p14:creationId xmlns:p14="http://schemas.microsoft.com/office/powerpoint/2010/main" val="3810472897"/>
+        <p14:creationId xmlns:p14="http://schemas.microsoft.com/office/powerpoint/2010/main" xmlns="" val="3810472897"/>
       </p:ext>
     </p:extLst>
   </p:cSld>
   <p:clrMapOvr>
     <a:masterClrMapping/>
   </p:clrMapOvr>
-  <mc:AlternateContent xmlns:mc="http://schemas.openxmlformats.org/markup-compatibility/2006" xmlns:p14="http://schemas.microsoft.com/office/powerpoint/2010/main">
-    <mc:Choice Requires="p14">
+  <mc:AlternateContent xmlns:mc="http://schemas.openxmlformats.org/markup-compatibility/2006">
+    <mc:Choice xmlns:p14="http://schemas.microsoft.com/office/powerpoint/2010/main" xmlns="" Requires="p14">
       <p:transition spd="med" p14:dur="700">
         <p:fade/>
       </p:transition>
     </mc:Choice>
-    <mc:Fallback xmlns="">
+    <mc:Fallback>
       <p:transition spd="med">
         <p:fade/>
       </p:transition>
@@ -15535,10 +15607,10 @@
           <p:nvPr/>
         </p:nvPicPr>
         <p:blipFill>
-          <a:blip r:embed="rId2">
+          <a:blip r:embed="rId2" cstate="print">
             <a:extLst>
               <a:ext uri="{28A0092B-C50C-407E-A947-70E740481C1C}">
-                <a14:useLocalDpi xmlns:a14="http://schemas.microsoft.com/office/drawing/2010/main" val="0"/>
+                <a14:useLocalDpi xmlns:a14="http://schemas.microsoft.com/office/drawing/2010/main" xmlns="" val="0"/>
               </a:ext>
             </a:extLst>
           </a:blip>
@@ -15589,20 +15661,20 @@
     </p:spTree>
     <p:extLst>
       <p:ext uri="{BB962C8B-B14F-4D97-AF65-F5344CB8AC3E}">
-        <p14:creationId xmlns:p14="http://schemas.microsoft.com/office/powerpoint/2010/main" val="3323359930"/>
+        <p14:creationId xmlns:p14="http://schemas.microsoft.com/office/powerpoint/2010/main" xmlns="" val="3323359930"/>
       </p:ext>
     </p:extLst>
   </p:cSld>
   <p:clrMapOvr>
     <a:masterClrMapping/>
   </p:clrMapOvr>
-  <mc:AlternateContent xmlns:mc="http://schemas.openxmlformats.org/markup-compatibility/2006" xmlns:p14="http://schemas.microsoft.com/office/powerpoint/2010/main">
-    <mc:Choice Requires="p14">
+  <mc:AlternateContent xmlns:mc="http://schemas.openxmlformats.org/markup-compatibility/2006">
+    <mc:Choice xmlns:p14="http://schemas.microsoft.com/office/powerpoint/2010/main" xmlns="" Requires="p14">
       <p:transition spd="med" p14:dur="700">
         <p:fade/>
       </p:transition>
     </mc:Choice>
-    <mc:Fallback xmlns="">
+    <mc:Fallback>
       <p:transition spd="med">
         <p:fade/>
       </p:transition>
@@ -15637,7 +15709,7 @@
       </p:grpSpPr>
       <p:sp>
         <p:nvSpPr>
-          <p:cNvPr id="2" name="Title 1"/>
+          <p:cNvPr id="13" name="Title 12"/>
           <p:cNvSpPr>
             <a:spLocks noGrp="1"/>
           </p:cNvSpPr>
@@ -15651,36 +15723,99 @@
           <a:lstStyle/>
           <a:p>
             <a:r>
-              <a:rPr lang="es-AR" dirty="0" smtClean="0">
-                <a:latin typeface="Segoe UI" panose="020B0502040204020203" pitchFamily="34" charset="0"/>
-                <a:cs typeface="Segoe UI" panose="020B0502040204020203" pitchFamily="34" charset="0"/>
-              </a:rPr>
-              <a:t>Conclusiones</a:t>
-            </a:r>
-            <a:endParaRPr lang="es-AR" dirty="0">
+              <a:rPr lang="es-AR" spc="0" dirty="0" smtClean="0">
+                <a:ln w="0"/>
+                <a:solidFill>
+                  <a:schemeClr val="accent1"/>
+                </a:solidFill>
+                <a:effectLst>
+                  <a:outerShdw blurRad="38100" dist="25400" dir="5400000" algn="ctr" rotWithShape="0">
+                    <a:srgbClr val="6E747A">
+                      <a:alpha val="43000"/>
+                    </a:srgbClr>
+                  </a:outerShdw>
+                </a:effectLst>
+                <a:latin typeface="Segoe UI" panose="020B0502040204020203" pitchFamily="34" charset="0"/>
+                <a:cs typeface="Segoe UI" panose="020B0502040204020203" pitchFamily="34" charset="0"/>
+              </a:rPr>
+              <a:t>Siglo XXI – </a:t>
+            </a:r>
+            <a:r>
+              <a:rPr lang="es-AR" spc="0" dirty="0" smtClean="0">
+                <a:ln w="0"/>
+                <a:solidFill>
+                  <a:schemeClr val="accent1"/>
+                </a:solidFill>
+                <a:effectLst>
+                  <a:outerShdw blurRad="38100" dist="25400" dir="5400000" algn="ctr" rotWithShape="0">
+                    <a:srgbClr val="6E747A">
+                      <a:alpha val="43000"/>
+                    </a:srgbClr>
+                  </a:outerShdw>
+                </a:effectLst>
+                <a:latin typeface="Segoe UI" panose="020B0502040204020203" pitchFamily="34" charset="0"/>
+                <a:cs typeface="Segoe UI" panose="020B0502040204020203" pitchFamily="34" charset="0"/>
+              </a:rPr>
+              <a:t>Información sin protección</a:t>
+            </a:r>
+            <a:endParaRPr lang="es-AR" spc="0" dirty="0">
+              <a:ln w="0"/>
+              <a:solidFill>
+                <a:schemeClr val="accent1"/>
+              </a:solidFill>
+              <a:effectLst>
+                <a:outerShdw blurRad="38100" dist="25400" dir="5400000" algn="ctr" rotWithShape="0">
+                  <a:srgbClr val="6E747A">
+                    <a:alpha val="43000"/>
+                  </a:srgbClr>
+                </a:outerShdw>
+              </a:effectLst>
               <a:latin typeface="Segoe UI" panose="020B0502040204020203" pitchFamily="34" charset="0"/>
               <a:cs typeface="Segoe UI" panose="020B0502040204020203" pitchFamily="34" charset="0"/>
             </a:endParaRPr>
           </a:p>
         </p:txBody>
       </p:sp>
+      <p:pic>
+        <p:nvPicPr>
+          <p:cNvPr id="4" name="3 Marcador de contenido" descr="chart-5-growth-of-unprotected-data-e1323821110648.jpg"/>
+          <p:cNvPicPr>
+            <a:picLocks noGrp="1" noChangeAspect="1"/>
+          </p:cNvPicPr>
+          <p:nvPr>
+            <p:ph idx="1"/>
+          </p:nvPr>
+        </p:nvPicPr>
+        <p:blipFill>
+          <a:blip r:embed="rId3" cstate="print"/>
+          <a:stretch>
+            <a:fillRect/>
+          </a:stretch>
+        </p:blipFill>
+        <p:spPr>
+          <a:xfrm>
+            <a:off x="2133972" y="1844824"/>
+            <a:ext cx="7776864" cy="4536504"/>
+          </a:xfrm>
+        </p:spPr>
+      </p:pic>
     </p:spTree>
     <p:extLst>
       <p:ext uri="{BB962C8B-B14F-4D97-AF65-F5344CB8AC3E}">
-        <p14:creationId xmlns:p14="http://schemas.microsoft.com/office/powerpoint/2010/main" val="1539601608"/>
+        <p14:creationId xmlns:p14="http://schemas.microsoft.com/office/powerpoint/2010/main" xmlns="" val="3810472897"/>
       </p:ext>
     </p:extLst>
   </p:cSld>
   <p:clrMapOvr>
     <a:masterClrMapping/>
   </p:clrMapOvr>
-  <mc:AlternateContent xmlns:mc="http://schemas.openxmlformats.org/markup-compatibility/2006" xmlns:p14="http://schemas.microsoft.com/office/powerpoint/2010/main">
-    <mc:Choice Requires="p14">
+  <mc:AlternateContent xmlns:mc="http://schemas.openxmlformats.org/markup-compatibility/2006">
+    <mc:Choice xmlns:p14="http://schemas.microsoft.com/office/powerpoint/2010/main" xmlns="" Requires="p14">
       <p:transition spd="med" p14:dur="700">
         <p:fade/>
       </p:transition>
     </mc:Choice>
-    <mc:Fallback xmlns="">
+    <mc:Fallback>
       <p:transition spd="med">
         <p:fade/>
       </p:transition>
@@ -15729,93 +15864,12 @@
           <a:lstStyle/>
           <a:p>
             <a:r>
-              <a:rPr lang="es-AR" b="1" spc="0" dirty="0" smtClean="0">
-                <a:ln w="9525">
-                  <a:solidFill>
-                    <a:schemeClr val="bg1"/>
-                  </a:solidFill>
-                  <a:prstDash val="solid"/>
-                </a:ln>
-                <a:solidFill>
-                  <a:schemeClr val="accent1"/>
-                </a:solidFill>
+              <a:rPr lang="es-AR" dirty="0" smtClean="0">
                 <a:latin typeface="Segoe UI" panose="020B0502040204020203" pitchFamily="34" charset="0"/>
                 <a:cs typeface="Segoe UI" panose="020B0502040204020203" pitchFamily="34" charset="0"/>
               </a:rPr>
               <a:t>Conclusiones</a:t>
             </a:r>
-            <a:endParaRPr lang="es-AR" b="1" spc="0" dirty="0">
-              <a:ln w="9525">
-                <a:solidFill>
-                  <a:schemeClr val="bg1"/>
-                </a:solidFill>
-                <a:prstDash val="solid"/>
-              </a:ln>
-              <a:solidFill>
-                <a:schemeClr val="accent1"/>
-              </a:solidFill>
-              <a:latin typeface="Segoe UI" panose="020B0502040204020203" pitchFamily="34" charset="0"/>
-              <a:cs typeface="Segoe UI" panose="020B0502040204020203" pitchFamily="34" charset="0"/>
-            </a:endParaRPr>
-          </a:p>
-        </p:txBody>
-      </p:sp>
-      <p:sp>
-        <p:nvSpPr>
-          <p:cNvPr id="3" name="Content Placeholder 2"/>
-          <p:cNvSpPr>
-            <a:spLocks noGrp="1"/>
-          </p:cNvSpPr>
-          <p:nvPr>
-            <p:ph idx="1"/>
-          </p:nvPr>
-        </p:nvSpPr>
-        <p:spPr/>
-        <p:txBody>
-          <a:bodyPr>
-            <a:normAutofit lnSpcReduction="10000"/>
-          </a:bodyPr>
-          <a:lstStyle/>
-          <a:p>
-            <a:pPr marL="342900" indent="-342900">
-              <a:lnSpc>
-                <a:spcPct val="150000"/>
-              </a:lnSpc>
-            </a:pPr>
-            <a:r>
-              <a:rPr lang="es-AR" dirty="0" smtClean="0">
-                <a:latin typeface="Segoe UI" panose="020B0502040204020203" pitchFamily="34" charset="0"/>
-                <a:cs typeface="Segoe UI" panose="020B0502040204020203" pitchFamily="34" charset="0"/>
-              </a:rPr>
-              <a:t>La amenaza más grande para las organizaciones probablemente no sean los ataques de terceros, ni los empleados maliciosos, sino los empleados descuidados que de forma inintencionada divulgan información sensible</a:t>
-            </a:r>
-          </a:p>
-          <a:p>
-            <a:pPr marL="342900" indent="-342900">
-              <a:lnSpc>
-                <a:spcPct val="150000"/>
-              </a:lnSpc>
-            </a:pPr>
-            <a:r>
-              <a:rPr lang="es-AR" dirty="0" smtClean="0">
-                <a:latin typeface="Segoe UI" panose="020B0502040204020203" pitchFamily="34" charset="0"/>
-                <a:cs typeface="Segoe UI" panose="020B0502040204020203" pitchFamily="34" charset="0"/>
-              </a:rPr>
-              <a:t>Una combinación de protección tecnológica, políticas y procedimientos actualizados, y educación de los usuarios deberían contribuir a paliar los efectos que causan estas fugas</a:t>
-            </a:r>
-          </a:p>
-          <a:p>
-            <a:pPr>
-              <a:lnSpc>
-                <a:spcPct val="150000"/>
-              </a:lnSpc>
-            </a:pPr>
-            <a:endParaRPr lang="es-AR" dirty="0" smtClean="0">
-              <a:latin typeface="Segoe UI" panose="020B0502040204020203" pitchFamily="34" charset="0"/>
-              <a:cs typeface="Segoe UI" panose="020B0502040204020203" pitchFamily="34" charset="0"/>
-            </a:endParaRPr>
-          </a:p>
-          <a:p>
             <a:endParaRPr lang="es-AR" dirty="0">
               <a:latin typeface="Segoe UI" panose="020B0502040204020203" pitchFamily="34" charset="0"/>
               <a:cs typeface="Segoe UI" panose="020B0502040204020203" pitchFamily="34" charset="0"/>
@@ -15826,20 +15880,20 @@
     </p:spTree>
     <p:extLst>
       <p:ext uri="{BB962C8B-B14F-4D97-AF65-F5344CB8AC3E}">
-        <p14:creationId xmlns:p14="http://schemas.microsoft.com/office/powerpoint/2010/main" val="3280227416"/>
+        <p14:creationId xmlns:p14="http://schemas.microsoft.com/office/powerpoint/2010/main" xmlns="" val="1539601608"/>
       </p:ext>
     </p:extLst>
   </p:cSld>
   <p:clrMapOvr>
     <a:masterClrMapping/>
   </p:clrMapOvr>
-  <mc:AlternateContent xmlns:mc="http://schemas.openxmlformats.org/markup-compatibility/2006" xmlns:p14="http://schemas.microsoft.com/office/powerpoint/2010/main">
-    <mc:Choice Requires="p14">
+  <mc:AlternateContent xmlns:mc="http://schemas.openxmlformats.org/markup-compatibility/2006">
+    <mc:Choice xmlns:p14="http://schemas.microsoft.com/office/powerpoint/2010/main" xmlns="" Requires="p14">
       <p:transition spd="med" p14:dur="700">
         <p:fade/>
       </p:transition>
     </mc:Choice>
-    <mc:Fallback xmlns="">
+    <mc:Fallback>
       <p:transition spd="med">
         <p:fade/>
       </p:transition>
@@ -15901,7 +15955,7 @@
                 <a:latin typeface="Segoe UI" panose="020B0502040204020203" pitchFamily="34" charset="0"/>
                 <a:cs typeface="Segoe UI" panose="020B0502040204020203" pitchFamily="34" charset="0"/>
               </a:rPr>
-              <a:t>Conclusiones (cont.)</a:t>
+              <a:t>Conclusiones</a:t>
             </a:r>
             <a:endParaRPr lang="es-AR" b="1" spc="0" dirty="0">
               <a:ln w="9525">
@@ -15932,7 +15986,7 @@
         <p:spPr/>
         <p:txBody>
           <a:bodyPr>
-            <a:normAutofit fontScale="77500" lnSpcReduction="20000"/>
+            <a:normAutofit lnSpcReduction="10000"/>
           </a:bodyPr>
           <a:lstStyle/>
           <a:p>
@@ -15942,91 +15996,11 @@
               </a:lnSpc>
             </a:pPr>
             <a:r>
-              <a:rPr lang="es-AR" dirty="0">
-                <a:latin typeface="Segoe UI" panose="020B0502040204020203" pitchFamily="34" charset="0"/>
-                <a:cs typeface="Segoe UI" panose="020B0502040204020203" pitchFamily="34" charset="0"/>
-              </a:rPr>
-              <a:t>Procedimiento básico para desarrollar una estrategia de protección: </a:t>
-            </a:r>
-          </a:p>
-          <a:p>
-            <a:pPr marL="800100" lvl="1" indent="-342900">
-              <a:lnSpc>
-                <a:spcPct val="150000"/>
-              </a:lnSpc>
-              <a:buFont typeface="Wingdings" panose="05000000000000000000" pitchFamily="2" charset="2"/>
-              <a:buChar char="ü"/>
-            </a:pPr>
-            <a:r>
-              <a:rPr lang="es-AR" sz="2400" dirty="0">
-                <a:latin typeface="Segoe UI" panose="020B0502040204020203" pitchFamily="34" charset="0"/>
-                <a:cs typeface="Segoe UI" panose="020B0502040204020203" pitchFamily="34" charset="0"/>
-              </a:rPr>
-              <a:t>Clasificar la información a proteger</a:t>
-            </a:r>
-          </a:p>
-          <a:p>
-            <a:pPr marL="800100" lvl="1" indent="-342900">
-              <a:lnSpc>
-                <a:spcPct val="150000"/>
-              </a:lnSpc>
-              <a:buFont typeface="Wingdings" panose="05000000000000000000" pitchFamily="2" charset="2"/>
-              <a:buChar char="ü"/>
-            </a:pPr>
-            <a:r>
-              <a:rPr lang="es-AR" sz="2400" dirty="0">
-                <a:latin typeface="Segoe UI" panose="020B0502040204020203" pitchFamily="34" charset="0"/>
-                <a:cs typeface="Segoe UI" panose="020B0502040204020203" pitchFamily="34" charset="0"/>
-              </a:rPr>
-              <a:t>Entender los datos que se manejan </a:t>
-            </a:r>
-          </a:p>
-          <a:p>
-            <a:pPr marL="800100" lvl="1" indent="-342900">
-              <a:lnSpc>
-                <a:spcPct val="150000"/>
-              </a:lnSpc>
-              <a:buFont typeface="Wingdings" panose="05000000000000000000" pitchFamily="2" charset="2"/>
-              <a:buChar char="ü"/>
-            </a:pPr>
-            <a:r>
-              <a:rPr lang="es-AR" sz="2400" dirty="0">
-                <a:latin typeface="Segoe UI" panose="020B0502040204020203" pitchFamily="34" charset="0"/>
-                <a:cs typeface="Segoe UI" panose="020B0502040204020203" pitchFamily="34" charset="0"/>
-              </a:rPr>
-              <a:t>Establecer políticas sobre el manejo de la información</a:t>
-            </a:r>
-          </a:p>
-          <a:p>
-            <a:pPr marL="800100" lvl="1" indent="-342900">
-              <a:lnSpc>
-                <a:spcPct val="150000"/>
-              </a:lnSpc>
-              <a:buFont typeface="Wingdings" panose="05000000000000000000" pitchFamily="2" charset="2"/>
-              <a:buChar char="ü"/>
-            </a:pPr>
-            <a:r>
-              <a:rPr lang="es-AR" sz="2400" dirty="0">
-                <a:latin typeface="Segoe UI" panose="020B0502040204020203" pitchFamily="34" charset="0"/>
-                <a:cs typeface="Segoe UI" panose="020B0502040204020203" pitchFamily="34" charset="0"/>
-              </a:rPr>
-              <a:t>Capacitar al personal en las herramientas </a:t>
-            </a:r>
-          </a:p>
-          <a:p>
-            <a:pPr marL="800100" lvl="1" indent="-342900">
-              <a:lnSpc>
-                <a:spcPct val="150000"/>
-              </a:lnSpc>
-              <a:buFont typeface="Wingdings" panose="05000000000000000000" pitchFamily="2" charset="2"/>
-              <a:buChar char="ü"/>
-            </a:pPr>
-            <a:r>
-              <a:rPr lang="es-AR" sz="2400" dirty="0">
-                <a:latin typeface="Segoe UI" panose="020B0502040204020203" pitchFamily="34" charset="0"/>
-                <a:cs typeface="Segoe UI" panose="020B0502040204020203" pitchFamily="34" charset="0"/>
-              </a:rPr>
-              <a:t>Implementar seguridad a nivel físico</a:t>
+              <a:rPr lang="es-AR" dirty="0" smtClean="0">
+                <a:latin typeface="Segoe UI" panose="020B0502040204020203" pitchFamily="34" charset="0"/>
+                <a:cs typeface="Segoe UI" panose="020B0502040204020203" pitchFamily="34" charset="0"/>
+              </a:rPr>
+              <a:t>La amenaza más grande para las organizaciones probablemente no sean los ataques de terceros, ni los empleados maliciosos, sino los empleados descuidados que de forma inintencionada divulgan información sensible</a:t>
             </a:r>
           </a:p>
           <a:p>
@@ -16036,19 +16010,25 @@
               </a:lnSpc>
             </a:pPr>
             <a:r>
-              <a:rPr lang="es-AR" dirty="0">
-                <a:latin typeface="Segoe UI" panose="020B0502040204020203" pitchFamily="34" charset="0"/>
-                <a:cs typeface="Segoe UI" panose="020B0502040204020203" pitchFamily="34" charset="0"/>
-              </a:rPr>
-              <a:t>No debe olvidarse de ejecutar revisiones periódicas, para mantener las políticas actualizadas y en conformidad con los requisitos y las tendencias </a:t>
-            </a:r>
-            <a:r>
               <a:rPr lang="es-AR" dirty="0" smtClean="0">
                 <a:latin typeface="Segoe UI" panose="020B0502040204020203" pitchFamily="34" charset="0"/>
                 <a:cs typeface="Segoe UI" panose="020B0502040204020203" pitchFamily="34" charset="0"/>
               </a:rPr>
-              <a:t>tecnológicas </a:t>
-            </a:r>
+              <a:t>Una combinación de protección tecnológica, políticas y procedimientos actualizados, y educación de los usuarios deberían contribuir a paliar los efectos que causan estas fugas</a:t>
+            </a:r>
+          </a:p>
+          <a:p>
+            <a:pPr>
+              <a:lnSpc>
+                <a:spcPct val="150000"/>
+              </a:lnSpc>
+            </a:pPr>
+            <a:endParaRPr lang="es-AR" dirty="0" smtClean="0">
+              <a:latin typeface="Segoe UI" panose="020B0502040204020203" pitchFamily="34" charset="0"/>
+              <a:cs typeface="Segoe UI" panose="020B0502040204020203" pitchFamily="34" charset="0"/>
+            </a:endParaRPr>
+          </a:p>
+          <a:p>
             <a:endParaRPr lang="es-AR" dirty="0">
               <a:latin typeface="Segoe UI" panose="020B0502040204020203" pitchFamily="34" charset="0"/>
               <a:cs typeface="Segoe UI" panose="020B0502040204020203" pitchFamily="34" charset="0"/>
@@ -16059,20 +16039,20 @@
     </p:spTree>
     <p:extLst>
       <p:ext uri="{BB962C8B-B14F-4D97-AF65-F5344CB8AC3E}">
-        <p14:creationId xmlns:p14="http://schemas.microsoft.com/office/powerpoint/2010/main" val="3816537714"/>
+        <p14:creationId xmlns:p14="http://schemas.microsoft.com/office/powerpoint/2010/main" xmlns="" val="3280227416"/>
       </p:ext>
     </p:extLst>
   </p:cSld>
   <p:clrMapOvr>
     <a:masterClrMapping/>
   </p:clrMapOvr>
-  <mc:AlternateContent xmlns:mc="http://schemas.openxmlformats.org/markup-compatibility/2006" xmlns:p14="http://schemas.microsoft.com/office/powerpoint/2010/main">
-    <mc:Choice Requires="p14">
+  <mc:AlternateContent xmlns:mc="http://schemas.openxmlformats.org/markup-compatibility/2006">
+    <mc:Choice xmlns:p14="http://schemas.microsoft.com/office/powerpoint/2010/main" xmlns="" Requires="p14">
       <p:transition spd="med" p14:dur="700">
         <p:fade/>
       </p:transition>
     </mc:Choice>
-    <mc:Fallback xmlns="">
+    <mc:Fallback>
       <p:transition spd="med">
         <p:fade/>
       </p:transition>
@@ -16165,105 +16145,147 @@
         <p:spPr/>
         <p:txBody>
           <a:bodyPr>
-            <a:normAutofit/>
+            <a:normAutofit fontScale="77500" lnSpcReduction="20000"/>
           </a:bodyPr>
           <a:lstStyle/>
           <a:p>
-            <a:pPr marL="342900" indent="-342900"/>
+            <a:pPr marL="342900" indent="-342900">
+              <a:lnSpc>
+                <a:spcPct val="150000"/>
+              </a:lnSpc>
+            </a:pPr>
             <a:r>
               <a:rPr lang="es-AR" dirty="0">
                 <a:latin typeface="Segoe UI" panose="020B0502040204020203" pitchFamily="34" charset="0"/>
                 <a:cs typeface="Segoe UI" panose="020B0502040204020203" pitchFamily="34" charset="0"/>
               </a:rPr>
-              <a:t>A pesar de que los ataques maliciosos son una minoría, no deberían ser </a:t>
+              <a:t>Procedimiento básico para desarrollar una estrategia de protección: </a:t>
+            </a:r>
+          </a:p>
+          <a:p>
+            <a:pPr marL="800100" lvl="1" indent="-342900">
+              <a:lnSpc>
+                <a:spcPct val="150000"/>
+              </a:lnSpc>
+              <a:buFont typeface="Wingdings" panose="05000000000000000000" pitchFamily="2" charset="2"/>
+              <a:buChar char="ü"/>
+            </a:pPr>
+            <a:r>
+              <a:rPr lang="es-AR" sz="2400" dirty="0">
+                <a:latin typeface="Segoe UI" panose="020B0502040204020203" pitchFamily="34" charset="0"/>
+                <a:cs typeface="Segoe UI" panose="020B0502040204020203" pitchFamily="34" charset="0"/>
+              </a:rPr>
+              <a:t>Clasificar la información a proteger</a:t>
+            </a:r>
+          </a:p>
+          <a:p>
+            <a:pPr marL="800100" lvl="1" indent="-342900">
+              <a:lnSpc>
+                <a:spcPct val="150000"/>
+              </a:lnSpc>
+              <a:buFont typeface="Wingdings" panose="05000000000000000000" pitchFamily="2" charset="2"/>
+              <a:buChar char="ü"/>
+            </a:pPr>
+            <a:r>
+              <a:rPr lang="es-AR" sz="2400" dirty="0">
+                <a:latin typeface="Segoe UI" panose="020B0502040204020203" pitchFamily="34" charset="0"/>
+                <a:cs typeface="Segoe UI" panose="020B0502040204020203" pitchFamily="34" charset="0"/>
+              </a:rPr>
+              <a:t>Entender los datos que se manejan </a:t>
+            </a:r>
+          </a:p>
+          <a:p>
+            <a:pPr marL="800100" lvl="1" indent="-342900">
+              <a:lnSpc>
+                <a:spcPct val="150000"/>
+              </a:lnSpc>
+              <a:buFont typeface="Wingdings" panose="05000000000000000000" pitchFamily="2" charset="2"/>
+              <a:buChar char="ü"/>
+            </a:pPr>
+            <a:r>
+              <a:rPr lang="es-AR" sz="2400" dirty="0">
+                <a:latin typeface="Segoe UI" panose="020B0502040204020203" pitchFamily="34" charset="0"/>
+                <a:cs typeface="Segoe UI" panose="020B0502040204020203" pitchFamily="34" charset="0"/>
+              </a:rPr>
+              <a:t>Establecer políticas sobre el manejo de la información</a:t>
+            </a:r>
+          </a:p>
+          <a:p>
+            <a:pPr marL="800100" lvl="1" indent="-342900">
+              <a:lnSpc>
+                <a:spcPct val="150000"/>
+              </a:lnSpc>
+              <a:buFont typeface="Wingdings" panose="05000000000000000000" pitchFamily="2" charset="2"/>
+              <a:buChar char="ü"/>
+            </a:pPr>
+            <a:r>
+              <a:rPr lang="es-AR" sz="2400" dirty="0">
+                <a:latin typeface="Segoe UI" panose="020B0502040204020203" pitchFamily="34" charset="0"/>
+                <a:cs typeface="Segoe UI" panose="020B0502040204020203" pitchFamily="34" charset="0"/>
+              </a:rPr>
+              <a:t>Capacitar al personal en las herramientas </a:t>
+            </a:r>
+          </a:p>
+          <a:p>
+            <a:pPr marL="800100" lvl="1" indent="-342900">
+              <a:lnSpc>
+                <a:spcPct val="150000"/>
+              </a:lnSpc>
+              <a:buFont typeface="Wingdings" panose="05000000000000000000" pitchFamily="2" charset="2"/>
+              <a:buChar char="ü"/>
+            </a:pPr>
+            <a:r>
+              <a:rPr lang="es-AR" sz="2400" dirty="0">
+                <a:latin typeface="Segoe UI" panose="020B0502040204020203" pitchFamily="34" charset="0"/>
+                <a:cs typeface="Segoe UI" panose="020B0502040204020203" pitchFamily="34" charset="0"/>
+              </a:rPr>
+              <a:t>Implementar seguridad a nivel físico</a:t>
+            </a:r>
+          </a:p>
+          <a:p>
+            <a:pPr marL="342900" indent="-342900">
+              <a:lnSpc>
+                <a:spcPct val="150000"/>
+              </a:lnSpc>
+            </a:pPr>
+            <a:r>
+              <a:rPr lang="es-AR" dirty="0">
+                <a:latin typeface="Segoe UI" panose="020B0502040204020203" pitchFamily="34" charset="0"/>
+                <a:cs typeface="Segoe UI" panose="020B0502040204020203" pitchFamily="34" charset="0"/>
+              </a:rPr>
+              <a:t>No debe olvidarse de ejecutar revisiones periódicas, para mantener las políticas actualizadas y en conformidad con los requisitos y las tendencias </a:t>
             </a:r>
             <a:r>
               <a:rPr lang="es-AR" dirty="0" smtClean="0">
                 <a:latin typeface="Segoe UI" panose="020B0502040204020203" pitchFamily="34" charset="0"/>
                 <a:cs typeface="Segoe UI" panose="020B0502040204020203" pitchFamily="34" charset="0"/>
               </a:rPr>
-              <a:t>ignorados</a:t>
+              <a:t>tecnológicas </a:t>
             </a:r>
             <a:endParaRPr lang="es-AR" dirty="0">
               <a:latin typeface="Segoe UI" panose="020B0502040204020203" pitchFamily="34" charset="0"/>
               <a:cs typeface="Segoe UI" panose="020B0502040204020203" pitchFamily="34" charset="0"/>
             </a:endParaRPr>
           </a:p>
-          <a:p>
-            <a:pPr marL="342900" indent="-342900"/>
-            <a:r>
-              <a:rPr lang="es-AR" dirty="0" smtClean="0">
-                <a:latin typeface="Segoe UI" panose="020B0502040204020203" pitchFamily="34" charset="0"/>
-                <a:cs typeface="Segoe UI" panose="020B0502040204020203" pitchFamily="34" charset="0"/>
-              </a:rPr>
-              <a:t>Existen </a:t>
-            </a:r>
-            <a:r>
-              <a:rPr lang="es-AR" dirty="0">
-                <a:latin typeface="Segoe UI" panose="020B0502040204020203" pitchFamily="34" charset="0"/>
-                <a:cs typeface="Segoe UI" panose="020B0502040204020203" pitchFamily="34" charset="0"/>
-              </a:rPr>
-              <a:t>múltiples vías de escape de información que deben ser </a:t>
-            </a:r>
-            <a:r>
-              <a:rPr lang="es-AR" dirty="0" smtClean="0">
-                <a:latin typeface="Segoe UI" panose="020B0502040204020203" pitchFamily="34" charset="0"/>
-                <a:cs typeface="Segoe UI" panose="020B0502040204020203" pitchFamily="34" charset="0"/>
-              </a:rPr>
-              <a:t>monitoreadas</a:t>
-            </a:r>
-            <a:endParaRPr lang="es-AR" dirty="0">
-              <a:latin typeface="Segoe UI" panose="020B0502040204020203" pitchFamily="34" charset="0"/>
-              <a:cs typeface="Segoe UI" panose="020B0502040204020203" pitchFamily="34" charset="0"/>
-            </a:endParaRPr>
-          </a:p>
-          <a:p>
-            <a:pPr marL="342900" indent="-342900"/>
-            <a:r>
-              <a:rPr lang="es-AR" dirty="0" smtClean="0">
-                <a:latin typeface="Segoe UI" panose="020B0502040204020203" pitchFamily="34" charset="0"/>
-                <a:cs typeface="Segoe UI" panose="020B0502040204020203" pitchFamily="34" charset="0"/>
-              </a:rPr>
-              <a:t>No </a:t>
-            </a:r>
-            <a:r>
-              <a:rPr lang="es-AR" dirty="0">
-                <a:latin typeface="Segoe UI" panose="020B0502040204020203" pitchFamily="34" charset="0"/>
-                <a:cs typeface="Segoe UI" panose="020B0502040204020203" pitchFamily="34" charset="0"/>
-              </a:rPr>
-              <a:t>existen soluciones que protejan los activos intangibles de forma 100% segura, se puede minimizar la probabilidad de que ocurran pérdidas mediante la aplicación de varios métodos </a:t>
-            </a:r>
-            <a:r>
-              <a:rPr lang="es-AR" dirty="0" smtClean="0">
-                <a:latin typeface="Segoe UI" panose="020B0502040204020203" pitchFamily="34" charset="0"/>
-                <a:cs typeface="Segoe UI" panose="020B0502040204020203" pitchFamily="34" charset="0"/>
-              </a:rPr>
-              <a:t>complementarios</a:t>
-            </a:r>
-            <a:endParaRPr lang="es-AR" dirty="0">
-              <a:latin typeface="Segoe UI" panose="020B0502040204020203" pitchFamily="34" charset="0"/>
-              <a:cs typeface="Segoe UI" panose="020B0502040204020203" pitchFamily="34" charset="0"/>
-            </a:endParaRPr>
-          </a:p>
         </p:txBody>
       </p:sp>
     </p:spTree>
     <p:extLst>
       <p:ext uri="{BB962C8B-B14F-4D97-AF65-F5344CB8AC3E}">
-        <p14:creationId xmlns:p14="http://schemas.microsoft.com/office/powerpoint/2010/main" val="2896967631"/>
+        <p14:creationId xmlns:p14="http://schemas.microsoft.com/office/powerpoint/2010/main" xmlns="" val="3816537714"/>
       </p:ext>
     </p:extLst>
   </p:cSld>
   <p:clrMapOvr>
     <a:masterClrMapping/>
   </p:clrMapOvr>
-  <mc:AlternateContent xmlns:mc="http://schemas.openxmlformats.org/markup-compatibility/2006" xmlns:p14="http://schemas.microsoft.com/office/powerpoint/2010/main">
-    <mc:Choice Requires="p14">
+  <mc:AlternateContent xmlns:mc="http://schemas.openxmlformats.org/markup-compatibility/2006">
+    <mc:Choice xmlns:p14="http://schemas.microsoft.com/office/powerpoint/2010/main" xmlns="" Requires="p14">
       <p:transition spd="med" p14:dur="700">
         <p:fade/>
       </p:transition>
     </mc:Choice>
-    <mc:Fallback xmlns="">
+    <mc:Fallback>
       <p:transition spd="med">
         <p:fade/>
       </p:transition>
@@ -16298,7 +16320,7 @@
       </p:grpSpPr>
       <p:sp>
         <p:nvSpPr>
-          <p:cNvPr id="3" name="Title 2"/>
+          <p:cNvPr id="2" name="Title 1"/>
           <p:cNvSpPr>
             <a:spLocks noGrp="1"/>
           </p:cNvSpPr>
@@ -16306,29 +16328,34 @@
             <p:ph type="title"/>
           </p:nvPr>
         </p:nvSpPr>
-        <p:spPr>
-          <a:xfrm>
-            <a:off x="5302324" y="548680"/>
-            <a:ext cx="1582424" cy="1143000"/>
-          </a:xfrm>
-        </p:spPr>
-        <p:txBody>
-          <a:bodyPr>
-            <a:normAutofit/>
-          </a:bodyPr>
+        <p:spPr/>
+        <p:txBody>
+          <a:bodyPr/>
           <a:lstStyle/>
           <a:p>
             <a:r>
-              <a:rPr lang="es-AR" sz="6600" dirty="0" smtClean="0">
+              <a:rPr lang="es-AR" b="1" spc="0" dirty="0" smtClean="0">
+                <a:ln w="9525">
+                  <a:solidFill>
+                    <a:schemeClr val="bg1"/>
+                  </a:solidFill>
+                  <a:prstDash val="solid"/>
+                </a:ln>
                 <a:solidFill>
                   <a:schemeClr val="accent1"/>
                 </a:solidFill>
                 <a:latin typeface="Segoe UI" panose="020B0502040204020203" pitchFamily="34" charset="0"/>
                 <a:cs typeface="Segoe UI" panose="020B0502040204020203" pitchFamily="34" charset="0"/>
               </a:rPr>
-              <a:t>Fin</a:t>
-            </a:r>
-            <a:endParaRPr lang="en-US" sz="6600" dirty="0">
+              <a:t>Conclusiones (cont.)</a:t>
+            </a:r>
+            <a:endParaRPr lang="es-AR" b="1" spc="0" dirty="0">
+              <a:ln w="9525">
+                <a:solidFill>
+                  <a:schemeClr val="bg1"/>
+                </a:solidFill>
+                <a:prstDash val="solid"/>
+              </a:ln>
               <a:solidFill>
                 <a:schemeClr val="accent1"/>
               </a:solidFill>
@@ -16340,57 +16367,116 @@
       </p:sp>
       <p:sp>
         <p:nvSpPr>
-          <p:cNvPr id="4" name="Text Placeholder 3"/>
+          <p:cNvPr id="3" name="Content Placeholder 2"/>
           <p:cNvSpPr>
             <a:spLocks noGrp="1"/>
           </p:cNvSpPr>
           <p:nvPr>
-            <p:ph type="body" sz="half" idx="2"/>
-          </p:nvPr>
-        </p:nvSpPr>
-        <p:spPr>
-          <a:xfrm>
-            <a:off x="4726260" y="3429000"/>
-            <a:ext cx="3581399" cy="1371600"/>
-          </a:xfrm>
-        </p:spPr>
+            <p:ph idx="1"/>
+          </p:nvPr>
+        </p:nvSpPr>
+        <p:spPr/>
         <p:txBody>
           <a:bodyPr>
             <a:normAutofit/>
           </a:bodyPr>
           <a:lstStyle/>
           <a:p>
-            <a:r>
-              <a:rPr lang="es-AR" sz="3600" dirty="0" smtClean="0">
-                <a:latin typeface="Segoe UI" panose="020B0502040204020203" pitchFamily="34" charset="0"/>
-                <a:cs typeface="Segoe UI" panose="020B0502040204020203" pitchFamily="34" charset="0"/>
-              </a:rPr>
-              <a:t>¿Preguntas?</a:t>
-            </a:r>
-            <a:endParaRPr lang="en-US" sz="3600" dirty="0">
+            <a:pPr marL="342900" indent="-342900"/>
+            <a:r>
+              <a:rPr lang="es-AR" dirty="0">
+                <a:latin typeface="Segoe UI" panose="020B0502040204020203" pitchFamily="34" charset="0"/>
+                <a:cs typeface="Segoe UI" panose="020B0502040204020203" pitchFamily="34" charset="0"/>
+              </a:rPr>
+              <a:t>A pesar de que los ataques maliciosos son una minoría, no deberían ser </a:t>
+            </a:r>
+            <a:r>
+              <a:rPr lang="es-AR" dirty="0" smtClean="0">
+                <a:latin typeface="Segoe UI" panose="020B0502040204020203" pitchFamily="34" charset="0"/>
+                <a:cs typeface="Segoe UI" panose="020B0502040204020203" pitchFamily="34" charset="0"/>
+              </a:rPr>
+              <a:t>ignorados</a:t>
+            </a:r>
+            <a:endParaRPr lang="es-AR" dirty="0">
               <a:latin typeface="Segoe UI" panose="020B0502040204020203" pitchFamily="34" charset="0"/>
               <a:cs typeface="Segoe UI" panose="020B0502040204020203" pitchFamily="34" charset="0"/>
             </a:endParaRPr>
           </a:p>
+          <a:p>
+            <a:pPr marL="342900" indent="-342900"/>
+            <a:r>
+              <a:rPr lang="es-AR" dirty="0" smtClean="0">
+                <a:latin typeface="Segoe UI" panose="020B0502040204020203" pitchFamily="34" charset="0"/>
+                <a:cs typeface="Segoe UI" panose="020B0502040204020203" pitchFamily="34" charset="0"/>
+              </a:rPr>
+              <a:t>Existen </a:t>
+            </a:r>
+            <a:r>
+              <a:rPr lang="es-AR" dirty="0">
+                <a:latin typeface="Segoe UI" panose="020B0502040204020203" pitchFamily="34" charset="0"/>
+                <a:cs typeface="Segoe UI" panose="020B0502040204020203" pitchFamily="34" charset="0"/>
+              </a:rPr>
+              <a:t>múltiples vías de escape de información que deben ser </a:t>
+            </a:r>
+            <a:r>
+              <a:rPr lang="es-AR" dirty="0" smtClean="0">
+                <a:latin typeface="Segoe UI" panose="020B0502040204020203" pitchFamily="34" charset="0"/>
+                <a:cs typeface="Segoe UI" panose="020B0502040204020203" pitchFamily="34" charset="0"/>
+              </a:rPr>
+              <a:t>monitoreadas</a:t>
+            </a:r>
+            <a:endParaRPr lang="es-AR" dirty="0">
+              <a:latin typeface="Segoe UI" panose="020B0502040204020203" pitchFamily="34" charset="0"/>
+              <a:cs typeface="Segoe UI" panose="020B0502040204020203" pitchFamily="34" charset="0"/>
+            </a:endParaRPr>
+          </a:p>
+          <a:p>
+            <a:pPr marL="342900" indent="-342900"/>
+            <a:r>
+              <a:rPr lang="es-AR" dirty="0" smtClean="0">
+                <a:latin typeface="Segoe UI" panose="020B0502040204020203" pitchFamily="34" charset="0"/>
+                <a:cs typeface="Segoe UI" panose="020B0502040204020203" pitchFamily="34" charset="0"/>
+              </a:rPr>
+              <a:t>No </a:t>
+            </a:r>
+            <a:r>
+              <a:rPr lang="es-AR" dirty="0">
+                <a:latin typeface="Segoe UI" panose="020B0502040204020203" pitchFamily="34" charset="0"/>
+                <a:cs typeface="Segoe UI" panose="020B0502040204020203" pitchFamily="34" charset="0"/>
+              </a:rPr>
+              <a:t>existen soluciones que protejan los activos intangibles de forma 100% segura, se puede minimizar la probabilidad de que ocurran pérdidas mediante la aplicación de varios métodos </a:t>
+            </a:r>
+            <a:r>
+              <a:rPr lang="es-AR" dirty="0" smtClean="0">
+                <a:latin typeface="Segoe UI" panose="020B0502040204020203" pitchFamily="34" charset="0"/>
+                <a:cs typeface="Segoe UI" panose="020B0502040204020203" pitchFamily="34" charset="0"/>
+              </a:rPr>
+              <a:t>complementarios</a:t>
+            </a:r>
+            <a:endParaRPr lang="es-AR" dirty="0">
+              <a:latin typeface="Segoe UI" panose="020B0502040204020203" pitchFamily="34" charset="0"/>
+              <a:cs typeface="Segoe UI" panose="020B0502040204020203" pitchFamily="34" charset="0"/>
+            </a:endParaRPr>
+          </a:p>
         </p:txBody>
       </p:sp>
     </p:spTree>
     <p:extLst>
       <p:ext uri="{BB962C8B-B14F-4D97-AF65-F5344CB8AC3E}">
-        <p14:creationId xmlns:p14="http://schemas.microsoft.com/office/powerpoint/2010/main" val="1108506989"/>
+        <p14:creationId xmlns:p14="http://schemas.microsoft.com/office/powerpoint/2010/main" xmlns="" val="2896967631"/>
       </p:ext>
     </p:extLst>
   </p:cSld>
   <p:clrMapOvr>
     <a:masterClrMapping/>
   </p:clrMapOvr>
-  <mc:AlternateContent xmlns:mc="http://schemas.openxmlformats.org/markup-compatibility/2006" xmlns:p14="http://schemas.microsoft.com/office/powerpoint/2010/main">
-    <mc:Choice Requires="p14">
+  <mc:AlternateContent xmlns:mc="http://schemas.openxmlformats.org/markup-compatibility/2006">
+    <mc:Choice xmlns:p14="http://schemas.microsoft.com/office/powerpoint/2010/main" xmlns="" Requires="p14">
       <p:transition spd="med" p14:dur="700">
         <p:fade/>
       </p:transition>
     </mc:Choice>
-    <mc:Fallback xmlns="">
+    <mc:Fallback>
       <p:transition spd="med">
         <p:fade/>
       </p:transition>
@@ -16435,6 +16521,133 @@
         </p:nvSpPr>
         <p:spPr>
           <a:xfrm>
+            <a:off x="5302324" y="548680"/>
+            <a:ext cx="1582424" cy="1143000"/>
+          </a:xfrm>
+        </p:spPr>
+        <p:txBody>
+          <a:bodyPr>
+            <a:normAutofit/>
+          </a:bodyPr>
+          <a:lstStyle/>
+          <a:p>
+            <a:r>
+              <a:rPr lang="es-AR" sz="6600" dirty="0" smtClean="0">
+                <a:solidFill>
+                  <a:schemeClr val="accent1"/>
+                </a:solidFill>
+                <a:latin typeface="Segoe UI" panose="020B0502040204020203" pitchFamily="34" charset="0"/>
+                <a:cs typeface="Segoe UI" panose="020B0502040204020203" pitchFamily="34" charset="0"/>
+              </a:rPr>
+              <a:t>Fin</a:t>
+            </a:r>
+            <a:endParaRPr lang="en-US" sz="6600" dirty="0">
+              <a:solidFill>
+                <a:schemeClr val="accent1"/>
+              </a:solidFill>
+              <a:latin typeface="Segoe UI" panose="020B0502040204020203" pitchFamily="34" charset="0"/>
+              <a:cs typeface="Segoe UI" panose="020B0502040204020203" pitchFamily="34" charset="0"/>
+            </a:endParaRPr>
+          </a:p>
+        </p:txBody>
+      </p:sp>
+      <p:sp>
+        <p:nvSpPr>
+          <p:cNvPr id="4" name="Text Placeholder 3"/>
+          <p:cNvSpPr>
+            <a:spLocks noGrp="1"/>
+          </p:cNvSpPr>
+          <p:nvPr>
+            <p:ph type="body" sz="half" idx="2"/>
+          </p:nvPr>
+        </p:nvSpPr>
+        <p:spPr>
+          <a:xfrm>
+            <a:off x="4726260" y="3429000"/>
+            <a:ext cx="3581399" cy="1371600"/>
+          </a:xfrm>
+        </p:spPr>
+        <p:txBody>
+          <a:bodyPr>
+            <a:normAutofit/>
+          </a:bodyPr>
+          <a:lstStyle/>
+          <a:p>
+            <a:r>
+              <a:rPr lang="es-AR" sz="3600" dirty="0" smtClean="0">
+                <a:latin typeface="Segoe UI" panose="020B0502040204020203" pitchFamily="34" charset="0"/>
+                <a:cs typeface="Segoe UI" panose="020B0502040204020203" pitchFamily="34" charset="0"/>
+              </a:rPr>
+              <a:t>¿Preguntas?</a:t>
+            </a:r>
+            <a:endParaRPr lang="en-US" sz="3600" dirty="0">
+              <a:latin typeface="Segoe UI" panose="020B0502040204020203" pitchFamily="34" charset="0"/>
+              <a:cs typeface="Segoe UI" panose="020B0502040204020203" pitchFamily="34" charset="0"/>
+            </a:endParaRPr>
+          </a:p>
+        </p:txBody>
+      </p:sp>
+    </p:spTree>
+    <p:extLst>
+      <p:ext uri="{BB962C8B-B14F-4D97-AF65-F5344CB8AC3E}">
+        <p14:creationId xmlns:p14="http://schemas.microsoft.com/office/powerpoint/2010/main" xmlns="" val="1108506989"/>
+      </p:ext>
+    </p:extLst>
+  </p:cSld>
+  <p:clrMapOvr>
+    <a:masterClrMapping/>
+  </p:clrMapOvr>
+  <mc:AlternateContent xmlns:mc="http://schemas.openxmlformats.org/markup-compatibility/2006">
+    <mc:Choice xmlns:p14="http://schemas.microsoft.com/office/powerpoint/2010/main" xmlns="" Requires="p14">
+      <p:transition spd="med" p14:dur="700">
+        <p:fade/>
+      </p:transition>
+    </mc:Choice>
+    <mc:Fallback>
+      <p:transition spd="med">
+        <p:fade/>
+      </p:transition>
+    </mc:Fallback>
+  </mc:AlternateContent>
+  <p:timing>
+    <p:tnLst>
+      <p:par>
+        <p:cTn id="1" dur="indefinite" restart="never" nodeType="tmRoot"/>
+      </p:par>
+    </p:tnLst>
+  </p:timing>
+</p:sld>
+</file>
+
+<file path=ppt/slides/slide46.xml><?xml version="1.0" encoding="utf-8"?>
+<p:sld xmlns:a="http://schemas.openxmlformats.org/drawingml/2006/main" xmlns:r="http://schemas.openxmlformats.org/officeDocument/2006/relationships" xmlns:p="http://schemas.openxmlformats.org/presentationml/2006/main">
+  <p:cSld>
+    <p:spTree>
+      <p:nvGrpSpPr>
+        <p:cNvPr id="1" name=""/>
+        <p:cNvGrpSpPr/>
+        <p:nvPr/>
+      </p:nvGrpSpPr>
+      <p:grpSpPr>
+        <a:xfrm>
+          <a:off x="0" y="0"/>
+          <a:ext cx="0" cy="0"/>
+          <a:chOff x="0" y="0"/>
+          <a:chExt cx="0" cy="0"/>
+        </a:xfrm>
+      </p:grpSpPr>
+      <p:sp>
+        <p:nvSpPr>
+          <p:cNvPr id="3" name="Title 2"/>
+          <p:cNvSpPr>
+            <a:spLocks noGrp="1"/>
+          </p:cNvSpPr>
+          <p:nvPr>
+            <p:ph type="title"/>
+          </p:nvPr>
+        </p:nvSpPr>
+        <p:spPr>
+          <a:xfrm>
             <a:off x="1" y="0"/>
             <a:ext cx="12188824" cy="6858000"/>
           </a:xfrm>
@@ -16489,20 +16702,20 @@
     </p:spTree>
     <p:extLst>
       <p:ext uri="{BB962C8B-B14F-4D97-AF65-F5344CB8AC3E}">
-        <p14:creationId xmlns:p14="http://schemas.microsoft.com/office/powerpoint/2010/main" val="1108506989"/>
+        <p14:creationId xmlns:p14="http://schemas.microsoft.com/office/powerpoint/2010/main" xmlns="" val="1108506989"/>
       </p:ext>
     </p:extLst>
   </p:cSld>
   <p:clrMapOvr>
     <a:masterClrMapping/>
   </p:clrMapOvr>
-  <mc:AlternateContent xmlns:mc="http://schemas.openxmlformats.org/markup-compatibility/2006" xmlns:p14="http://schemas.microsoft.com/office/powerpoint/2010/main">
-    <mc:Choice Requires="p14">
+  <mc:AlternateContent xmlns:mc="http://schemas.openxmlformats.org/markup-compatibility/2006">
+    <mc:Choice xmlns:p14="http://schemas.microsoft.com/office/powerpoint/2010/main" xmlns="" Requires="p14">
       <p:transition spd="med" p14:dur="700">
         <p:fade/>
       </p:transition>
     </mc:Choice>
-    <mc:Fallback xmlns="">
+    <mc:Fallback>
       <p:transition spd="med">
         <p:fade/>
       </p:transition>
@@ -16715,14 +16928,7 @@
                 <a:latin typeface="Segoe UI" panose="020B0502040204020203" pitchFamily="34" charset="0"/>
                 <a:cs typeface="Segoe UI" panose="020B0502040204020203" pitchFamily="34" charset="0"/>
               </a:rPr>
-              <a:t>información </a:t>
-            </a:r>
-            <a:r>
-              <a:rPr lang="es-AR" sz="2400" dirty="0" smtClean="0">
-                <a:latin typeface="Segoe UI" panose="020B0502040204020203" pitchFamily="34" charset="0"/>
-                <a:cs typeface="Segoe UI" panose="020B0502040204020203" pitchFamily="34" charset="0"/>
-              </a:rPr>
-              <a:t>son:</a:t>
+              <a:t>información son:</a:t>
             </a:r>
             <a:endParaRPr lang="es-AR" sz="2400" dirty="0">
               <a:latin typeface="Segoe UI" panose="020B0502040204020203" pitchFamily="34" charset="0"/>
@@ -16793,7 +16999,7 @@
           <a:blip r:embed="rId2" cstate="print">
             <a:extLst>
               <a:ext uri="{28A0092B-C50C-407E-A947-70E740481C1C}">
-                <a14:useLocalDpi xmlns:a14="http://schemas.microsoft.com/office/drawing/2010/main" val="0"/>
+                <a14:useLocalDpi xmlns:a14="http://schemas.microsoft.com/office/drawing/2010/main" xmlns="" val="0"/>
               </a:ext>
             </a:extLst>
           </a:blip>
@@ -16813,7 +17019,7 @@
           <a:noFill/>
           <a:extLst>
             <a:ext uri="{909E8E84-426E-40DD-AFC4-6F175D3DCCD1}">
-              <a14:hiddenFill xmlns:a14="http://schemas.microsoft.com/office/drawing/2010/main">
+              <a14:hiddenFill xmlns:a14="http://schemas.microsoft.com/office/drawing/2010/main" xmlns="">
                 <a:solidFill>
                   <a:srgbClr val="FFFFFF"/>
                 </a:solidFill>
@@ -16825,20 +17031,20 @@
     </p:spTree>
     <p:extLst>
       <p:ext uri="{BB962C8B-B14F-4D97-AF65-F5344CB8AC3E}">
-        <p14:creationId xmlns:p14="http://schemas.microsoft.com/office/powerpoint/2010/main" val="1350001534"/>
+        <p14:creationId xmlns:p14="http://schemas.microsoft.com/office/powerpoint/2010/main" xmlns="" val="1350001534"/>
       </p:ext>
     </p:extLst>
   </p:cSld>
   <p:clrMapOvr>
     <a:masterClrMapping/>
   </p:clrMapOvr>
-  <mc:AlternateContent xmlns:mc="http://schemas.openxmlformats.org/markup-compatibility/2006" xmlns:p14="http://schemas.microsoft.com/office/powerpoint/2010/main">
-    <mc:Choice Requires="p14">
+  <mc:AlternateContent xmlns:mc="http://schemas.openxmlformats.org/markup-compatibility/2006">
+    <mc:Choice xmlns:p14="http://schemas.microsoft.com/office/powerpoint/2010/main" xmlns="" Requires="p14">
       <p:transition spd="med" p14:dur="700">
         <p:fade/>
       </p:transition>
     </mc:Choice>
-    <mc:Fallback xmlns="">
+    <mc:Fallback>
       <p:transition spd="med">
         <p:fade/>
       </p:transition>
@@ -16988,25 +17194,21 @@
               </a:rPr>
               <a:t>dispositivos </a:t>
             </a:r>
+          </a:p>
+          <a:p>
+            <a:r>
+              <a:rPr lang="es-AR" sz="2400" dirty="0">
+                <a:latin typeface="Segoe UI" panose="020B0502040204020203" pitchFamily="34" charset="0"/>
+                <a:cs typeface="Segoe UI" panose="020B0502040204020203" pitchFamily="34" charset="0"/>
+              </a:rPr>
+              <a:t> </a:t>
+            </a:r>
             <a:endParaRPr lang="es-AR" sz="2400" dirty="0" smtClean="0">
               <a:latin typeface="Segoe UI" panose="020B0502040204020203" pitchFamily="34" charset="0"/>
               <a:cs typeface="Segoe UI" panose="020B0502040204020203" pitchFamily="34" charset="0"/>
             </a:endParaRPr>
           </a:p>
           <a:p>
-            <a:r>
-              <a:rPr lang="es-AR" sz="2400" dirty="0">
-                <a:latin typeface="Segoe UI" panose="020B0502040204020203" pitchFamily="34" charset="0"/>
-                <a:cs typeface="Segoe UI" panose="020B0502040204020203" pitchFamily="34" charset="0"/>
-              </a:rPr>
-              <a:t> </a:t>
-            </a:r>
-            <a:endParaRPr lang="es-AR" sz="2400" dirty="0" smtClean="0">
-              <a:latin typeface="Segoe UI" panose="020B0502040204020203" pitchFamily="34" charset="0"/>
-              <a:cs typeface="Segoe UI" panose="020B0502040204020203" pitchFamily="34" charset="0"/>
-            </a:endParaRPr>
-          </a:p>
-          <a:p>
             <a:pPr marL="342900" indent="-342900">
               <a:buFont typeface="Arial" panose="020B0604020202020204" pitchFamily="34" charset="0"/>
               <a:buChar char="•"/>
@@ -17016,14 +17218,7 @@
                 <a:latin typeface="Segoe UI" panose="020B0502040204020203" pitchFamily="34" charset="0"/>
                 <a:cs typeface="Segoe UI" panose="020B0502040204020203" pitchFamily="34" charset="0"/>
               </a:rPr>
-              <a:t>Tipos de </a:t>
-            </a:r>
-            <a:r>
-              <a:rPr lang="es-AR" sz="2400" dirty="0" smtClean="0">
-                <a:latin typeface="Segoe UI" panose="020B0502040204020203" pitchFamily="34" charset="0"/>
-                <a:cs typeface="Segoe UI" panose="020B0502040204020203" pitchFamily="34" charset="0"/>
-              </a:rPr>
-              <a:t>dispositivos:</a:t>
+              <a:t>Tipos de dispositivos:</a:t>
             </a:r>
           </a:p>
           <a:p>
@@ -17038,10 +17233,6 @@
               </a:rPr>
               <a:t>Físicos</a:t>
             </a:r>
-            <a:endParaRPr lang="es-AR" sz="2400" dirty="0" smtClean="0">
-              <a:latin typeface="Segoe UI" panose="020B0502040204020203" pitchFamily="34" charset="0"/>
-              <a:cs typeface="Segoe UI" panose="020B0502040204020203" pitchFamily="34" charset="0"/>
-            </a:endParaRPr>
           </a:p>
           <a:p>
             <a:pPr marL="1257300" lvl="2" indent="-342900">
@@ -17055,10 +17246,6 @@
               </a:rPr>
               <a:t>Electrónicos</a:t>
             </a:r>
-            <a:endParaRPr lang="es-AR" sz="2400" dirty="0" smtClean="0">
-              <a:latin typeface="Segoe UI" panose="020B0502040204020203" pitchFamily="34" charset="0"/>
-              <a:cs typeface="Segoe UI" panose="020B0502040204020203" pitchFamily="34" charset="0"/>
-            </a:endParaRPr>
           </a:p>
           <a:p>
             <a:pPr lvl="0"/>
@@ -17175,14 +17362,7 @@
                 <a:latin typeface="Segoe UI" panose="020B0502040204020203" pitchFamily="34" charset="0"/>
                 <a:cs typeface="Segoe UI" panose="020B0502040204020203" pitchFamily="34" charset="0"/>
               </a:rPr>
-              <a:t>Se </a:t>
-            </a:r>
-            <a:r>
-              <a:rPr lang="es-AR" sz="3600" i="1" dirty="0" smtClean="0">
-                <a:latin typeface="Segoe UI" panose="020B0502040204020203" pitchFamily="34" charset="0"/>
-                <a:cs typeface="Segoe UI" panose="020B0502040204020203" pitchFamily="34" charset="0"/>
-              </a:rPr>
-              <a:t>debe </a:t>
+              <a:t>Se debe </a:t>
             </a:r>
             <a:r>
               <a:rPr lang="es-AR" sz="3600" i="1" dirty="0">
@@ -17205,20 +17385,20 @@
     </p:spTree>
     <p:extLst>
       <p:ext uri="{BB962C8B-B14F-4D97-AF65-F5344CB8AC3E}">
-        <p14:creationId xmlns:p14="http://schemas.microsoft.com/office/powerpoint/2010/main" val="3438441757"/>
+        <p14:creationId xmlns:p14="http://schemas.microsoft.com/office/powerpoint/2010/main" xmlns="" val="3438441757"/>
       </p:ext>
     </p:extLst>
   </p:cSld>
   <p:clrMapOvr>
     <a:masterClrMapping/>
   </p:clrMapOvr>
-  <mc:AlternateContent xmlns:mc="http://schemas.openxmlformats.org/markup-compatibility/2006" xmlns:p14="http://schemas.microsoft.com/office/powerpoint/2010/main">
-    <mc:Choice Requires="p14">
+  <mc:AlternateContent xmlns:mc="http://schemas.openxmlformats.org/markup-compatibility/2006">
+    <mc:Choice xmlns:p14="http://schemas.microsoft.com/office/powerpoint/2010/main" xmlns="" Requires="p14">
       <p:transition spd="med" p14:dur="700">
         <p:fade/>
       </p:transition>
     </mc:Choice>
-    <mc:Fallback xmlns="">
+    <mc:Fallback>
       <p:transition spd="med">
         <p:fade/>
       </p:transition>
@@ -17302,17 +17482,7 @@
                 <a:latin typeface="Segoe UI" panose="020B0502040204020203" pitchFamily="34" charset="0"/>
                 <a:cs typeface="Segoe UI" panose="020B0502040204020203" pitchFamily="34" charset="0"/>
               </a:rPr>
-              <a:t>información  (</a:t>
-            </a:r>
-            <a:r>
-              <a:rPr lang="es-AR" dirty="0" smtClean="0">
-                <a:solidFill>
-                  <a:schemeClr val="accent1"/>
-                </a:solidFill>
-                <a:latin typeface="Segoe UI" panose="020B0502040204020203" pitchFamily="34" charset="0"/>
-                <a:cs typeface="Segoe UI" panose="020B0502040204020203" pitchFamily="34" charset="0"/>
-              </a:rPr>
-              <a:t>III)</a:t>
+              <a:t>información  (III)</a:t>
             </a:r>
             <a:endParaRPr lang="es-AR" dirty="0">
               <a:solidFill>
@@ -17384,7 +17554,7 @@
           <p:nvPr/>
         </p:nvPicPr>
         <p:blipFill>
-          <a:blip r:embed="rId2"/>
+          <a:blip r:embed="rId2" cstate="print"/>
           <a:stretch>
             <a:fillRect/>
           </a:stretch>
@@ -17496,7 +17666,7 @@
     </p:spTree>
     <p:extLst>
       <p:ext uri="{BB962C8B-B14F-4D97-AF65-F5344CB8AC3E}">
-        <p14:creationId xmlns:p14="http://schemas.microsoft.com/office/powerpoint/2010/main" val="2324906339"/>
+        <p14:creationId xmlns:p14="http://schemas.microsoft.com/office/powerpoint/2010/main" xmlns="" val="2324906339"/>
       </p:ext>
     </p:extLst>
   </p:cSld>
@@ -17504,7 +17674,7 @@
     <a:masterClrMapping/>
   </p:clrMapOvr>
   <mc:AlternateContent xmlns:mc="http://schemas.openxmlformats.org/markup-compatibility/2006">
-    <mc:Choice xmlns:p14="http://schemas.microsoft.com/office/powerpoint/2010/main" Requires="p14">
+    <mc:Choice xmlns:p14="http://schemas.microsoft.com/office/powerpoint/2010/main" xmlns="" Requires="p14">
       <p:transition spd="med" p14:dur="700">
         <p:fade/>
       </p:transition>
@@ -17759,20 +17929,20 @@
     </p:spTree>
     <p:extLst>
       <p:ext uri="{BB962C8B-B14F-4D97-AF65-F5344CB8AC3E}">
-        <p14:creationId xmlns:p14="http://schemas.microsoft.com/office/powerpoint/2010/main" val="3833366108"/>
+        <p14:creationId xmlns:p14="http://schemas.microsoft.com/office/powerpoint/2010/main" xmlns="" val="3833366108"/>
       </p:ext>
     </p:extLst>
   </p:cSld>
   <p:clrMapOvr>
     <a:masterClrMapping/>
   </p:clrMapOvr>
-  <mc:AlternateContent xmlns:mc="http://schemas.openxmlformats.org/markup-compatibility/2006" xmlns:p14="http://schemas.microsoft.com/office/powerpoint/2010/main">
-    <mc:Choice Requires="p14">
+  <mc:AlternateContent xmlns:mc="http://schemas.openxmlformats.org/markup-compatibility/2006">
+    <mc:Choice xmlns:p14="http://schemas.microsoft.com/office/powerpoint/2010/main" xmlns="" Requires="p14">
       <p:transition spd="med" p14:dur="700">
         <p:fade/>
       </p:transition>
     </mc:Choice>
-    <mc:Fallback xmlns="">
+    <mc:Fallback>
       <p:transition spd="med">
         <p:fade/>
       </p:transition>
@@ -17867,7 +18037,7 @@
           <a:blip r:embed="rId2" cstate="print">
             <a:extLst>
               <a:ext uri="{28A0092B-C50C-407E-A947-70E740481C1C}">
-                <a14:useLocalDpi xmlns:a14="http://schemas.microsoft.com/office/drawing/2010/main" val="0"/>
+                <a14:useLocalDpi xmlns:a14="http://schemas.microsoft.com/office/drawing/2010/main" xmlns="" val="0"/>
               </a:ext>
             </a:extLst>
           </a:blip>
@@ -17890,14 +18060,14 @@
           </a:ln>
           <a:extLst>
             <a:ext uri="{909E8E84-426E-40DD-AFC4-6F175D3DCCD1}">
-              <a14:hiddenFill xmlns:a14="http://schemas.microsoft.com/office/drawing/2010/main">
+              <a14:hiddenFill xmlns:a14="http://schemas.microsoft.com/office/drawing/2010/main" xmlns="">
                 <a:solidFill>
                   <a:schemeClr val="accent1"/>
                 </a:solidFill>
               </a14:hiddenFill>
             </a:ext>
             <a:ext uri="{91240B29-F687-4F45-9708-019B960494DF}">
-              <a14:hiddenLine xmlns:a14="http://schemas.microsoft.com/office/drawing/2010/main" w="9525">
+              <a14:hiddenLine xmlns:a14="http://schemas.microsoft.com/office/drawing/2010/main" xmlns="" w="9525">
                 <a:solidFill>
                   <a:schemeClr val="tx1"/>
                 </a:solidFill>
@@ -17912,20 +18082,20 @@
     </p:spTree>
     <p:extLst>
       <p:ext uri="{BB962C8B-B14F-4D97-AF65-F5344CB8AC3E}">
-        <p14:creationId xmlns:p14="http://schemas.microsoft.com/office/powerpoint/2010/main" val="2112418618"/>
+        <p14:creationId xmlns:p14="http://schemas.microsoft.com/office/powerpoint/2010/main" xmlns="" val="2112418618"/>
       </p:ext>
     </p:extLst>
   </p:cSld>
   <p:clrMapOvr>
     <a:masterClrMapping/>
   </p:clrMapOvr>
-  <mc:AlternateContent xmlns:mc="http://schemas.openxmlformats.org/markup-compatibility/2006" xmlns:p14="http://schemas.microsoft.com/office/powerpoint/2010/main">
-    <mc:Choice Requires="p14">
+  <mc:AlternateContent xmlns:mc="http://schemas.openxmlformats.org/markup-compatibility/2006">
+    <mc:Choice xmlns:p14="http://schemas.microsoft.com/office/powerpoint/2010/main" xmlns="" Requires="p14">
       <p:transition spd="med" p14:dur="700">
         <p:fade/>
       </p:transition>
     </mc:Choice>
-    <mc:Fallback xmlns="">
+    <mc:Fallback>
       <p:transition spd="med">
         <p:fade/>
       </p:transition>

</xml_diff>